<commit_message>
Added database schema diagram
</commit_message>
<xml_diff>
--- a/_docs/DataModel.pptx
+++ b/_docs/DataModel.pptx
@@ -6,6 +6,7 @@
   </p:sldMasterIdLst>
   <p:sldIdLst>
     <p:sldId id="256" r:id="rId2"/>
+    <p:sldId id="257" r:id="rId3"/>
   </p:sldIdLst>
   <p:sldSz cx="12192000" cy="6858000"/>
   <p:notesSz cx="6858000" cy="9144000"/>
@@ -134,7 +135,7 @@
           <p:cNvPr id="2" name="Title 1">
             <a:extLst>
               <a:ext uri="{FF2B5EF4-FFF2-40B4-BE49-F238E27FC236}">
-                <a16:creationId xmlns:a16="http://schemas.microsoft.com/office/drawing/2014/main" id="{7812FAD9-B738-4E2B-A9F3-7D6DA8649C7B}"/>
+                <a16:creationId xmlns:a16="http://schemas.microsoft.com/office/drawing/2014/main" xmlns="" id="{7812FAD9-B738-4E2B-A9F3-7D6DA8649C7B}"/>
               </a:ext>
             </a:extLst>
           </p:cNvPr>
@@ -172,7 +173,7 @@
           <p:cNvPr id="3" name="Subtitle 2">
             <a:extLst>
               <a:ext uri="{FF2B5EF4-FFF2-40B4-BE49-F238E27FC236}">
-                <a16:creationId xmlns:a16="http://schemas.microsoft.com/office/drawing/2014/main" id="{CED3ABCF-AD94-42E3-95E2-D5E653DEF63F}"/>
+                <a16:creationId xmlns:a16="http://schemas.microsoft.com/office/drawing/2014/main" xmlns="" id="{CED3ABCF-AD94-42E3-95E2-D5E653DEF63F}"/>
               </a:ext>
             </a:extLst>
           </p:cNvPr>
@@ -243,7 +244,7 @@
           <p:cNvPr id="4" name="Date Placeholder 3">
             <a:extLst>
               <a:ext uri="{FF2B5EF4-FFF2-40B4-BE49-F238E27FC236}">
-                <a16:creationId xmlns:a16="http://schemas.microsoft.com/office/drawing/2014/main" id="{5AB92BAC-2DD4-42CE-9065-E2518728CD65}"/>
+                <a16:creationId xmlns:a16="http://schemas.microsoft.com/office/drawing/2014/main" xmlns="" id="{5AB92BAC-2DD4-42CE-9065-E2518728CD65}"/>
               </a:ext>
             </a:extLst>
           </p:cNvPr>
@@ -272,7 +273,7 @@
           <p:cNvPr id="5" name="Footer Placeholder 4">
             <a:extLst>
               <a:ext uri="{FF2B5EF4-FFF2-40B4-BE49-F238E27FC236}">
-                <a16:creationId xmlns:a16="http://schemas.microsoft.com/office/drawing/2014/main" id="{137C3D4C-B868-4F83-8919-AE7F2500E437}"/>
+                <a16:creationId xmlns:a16="http://schemas.microsoft.com/office/drawing/2014/main" xmlns="" id="{137C3D4C-B868-4F83-8919-AE7F2500E437}"/>
               </a:ext>
             </a:extLst>
           </p:cNvPr>
@@ -297,7 +298,7 @@
           <p:cNvPr id="6" name="Slide Number Placeholder 5">
             <a:extLst>
               <a:ext uri="{FF2B5EF4-FFF2-40B4-BE49-F238E27FC236}">
-                <a16:creationId xmlns:a16="http://schemas.microsoft.com/office/drawing/2014/main" id="{ABBB53F0-83D7-42D4-90A5-7D5EE7C0AAD3}"/>
+                <a16:creationId xmlns:a16="http://schemas.microsoft.com/office/drawing/2014/main" xmlns="" id="{ABBB53F0-83D7-42D4-90A5-7D5EE7C0AAD3}"/>
               </a:ext>
             </a:extLst>
           </p:cNvPr>
@@ -356,7 +357,7 @@
           <p:cNvPr id="2" name="Title 1">
             <a:extLst>
               <a:ext uri="{FF2B5EF4-FFF2-40B4-BE49-F238E27FC236}">
-                <a16:creationId xmlns:a16="http://schemas.microsoft.com/office/drawing/2014/main" id="{EDEAE3B1-565C-4AD8-A67C-7D2C44ECA18D}"/>
+                <a16:creationId xmlns:a16="http://schemas.microsoft.com/office/drawing/2014/main" xmlns="" id="{EDEAE3B1-565C-4AD8-A67C-7D2C44ECA18D}"/>
               </a:ext>
             </a:extLst>
           </p:cNvPr>
@@ -385,7 +386,7 @@
           <p:cNvPr id="3" name="Vertical Text Placeholder 2">
             <a:extLst>
               <a:ext uri="{FF2B5EF4-FFF2-40B4-BE49-F238E27FC236}">
-                <a16:creationId xmlns:a16="http://schemas.microsoft.com/office/drawing/2014/main" id="{89499874-28E0-4013-933C-7A7F4857D944}"/>
+                <a16:creationId xmlns:a16="http://schemas.microsoft.com/office/drawing/2014/main" xmlns="" id="{89499874-28E0-4013-933C-7A7F4857D944}"/>
               </a:ext>
             </a:extLst>
           </p:cNvPr>
@@ -443,7 +444,7 @@
           <p:cNvPr id="4" name="Date Placeholder 3">
             <a:extLst>
               <a:ext uri="{FF2B5EF4-FFF2-40B4-BE49-F238E27FC236}">
-                <a16:creationId xmlns:a16="http://schemas.microsoft.com/office/drawing/2014/main" id="{30B68540-FC47-4085-8638-DE11BCE14D7E}"/>
+                <a16:creationId xmlns:a16="http://schemas.microsoft.com/office/drawing/2014/main" xmlns="" id="{30B68540-FC47-4085-8638-DE11BCE14D7E}"/>
               </a:ext>
             </a:extLst>
           </p:cNvPr>
@@ -472,7 +473,7 @@
           <p:cNvPr id="5" name="Footer Placeholder 4">
             <a:extLst>
               <a:ext uri="{FF2B5EF4-FFF2-40B4-BE49-F238E27FC236}">
-                <a16:creationId xmlns:a16="http://schemas.microsoft.com/office/drawing/2014/main" id="{149BDF69-9D0A-4871-B742-85D1C27ACA21}"/>
+                <a16:creationId xmlns:a16="http://schemas.microsoft.com/office/drawing/2014/main" xmlns="" id="{149BDF69-9D0A-4871-B742-85D1C27ACA21}"/>
               </a:ext>
             </a:extLst>
           </p:cNvPr>
@@ -497,7 +498,7 @@
           <p:cNvPr id="6" name="Slide Number Placeholder 5">
             <a:extLst>
               <a:ext uri="{FF2B5EF4-FFF2-40B4-BE49-F238E27FC236}">
-                <a16:creationId xmlns:a16="http://schemas.microsoft.com/office/drawing/2014/main" id="{BAC96E6A-25E9-4A3D-BDE5-E881314DE0D7}"/>
+                <a16:creationId xmlns:a16="http://schemas.microsoft.com/office/drawing/2014/main" xmlns="" id="{BAC96E6A-25E9-4A3D-BDE5-E881314DE0D7}"/>
               </a:ext>
             </a:extLst>
           </p:cNvPr>
@@ -556,7 +557,7 @@
           <p:cNvPr id="2" name="Vertical Title 1">
             <a:extLst>
               <a:ext uri="{FF2B5EF4-FFF2-40B4-BE49-F238E27FC236}">
-                <a16:creationId xmlns:a16="http://schemas.microsoft.com/office/drawing/2014/main" id="{8BD4BC0C-9CFC-4FB2-B5C6-6EEC1B7F772D}"/>
+                <a16:creationId xmlns:a16="http://schemas.microsoft.com/office/drawing/2014/main" xmlns="" id="{8BD4BC0C-9CFC-4FB2-B5C6-6EEC1B7F772D}"/>
               </a:ext>
             </a:extLst>
           </p:cNvPr>
@@ -590,7 +591,7 @@
           <p:cNvPr id="3" name="Vertical Text Placeholder 2">
             <a:extLst>
               <a:ext uri="{FF2B5EF4-FFF2-40B4-BE49-F238E27FC236}">
-                <a16:creationId xmlns:a16="http://schemas.microsoft.com/office/drawing/2014/main" id="{5CF7FA3D-9ABB-49C7-AF65-E0869B2150C9}"/>
+                <a16:creationId xmlns:a16="http://schemas.microsoft.com/office/drawing/2014/main" xmlns="" id="{5CF7FA3D-9ABB-49C7-AF65-E0869B2150C9}"/>
               </a:ext>
             </a:extLst>
           </p:cNvPr>
@@ -653,7 +654,7 @@
           <p:cNvPr id="4" name="Date Placeholder 3">
             <a:extLst>
               <a:ext uri="{FF2B5EF4-FFF2-40B4-BE49-F238E27FC236}">
-                <a16:creationId xmlns:a16="http://schemas.microsoft.com/office/drawing/2014/main" id="{FBF00D9E-50E5-4276-BC40-27125BC1B69A}"/>
+                <a16:creationId xmlns:a16="http://schemas.microsoft.com/office/drawing/2014/main" xmlns="" id="{FBF00D9E-50E5-4276-BC40-27125BC1B69A}"/>
               </a:ext>
             </a:extLst>
           </p:cNvPr>
@@ -682,7 +683,7 @@
           <p:cNvPr id="5" name="Footer Placeholder 4">
             <a:extLst>
               <a:ext uri="{FF2B5EF4-FFF2-40B4-BE49-F238E27FC236}">
-                <a16:creationId xmlns:a16="http://schemas.microsoft.com/office/drawing/2014/main" id="{3AA20A04-EE64-4C85-A4C3-C674E216B21E}"/>
+                <a16:creationId xmlns:a16="http://schemas.microsoft.com/office/drawing/2014/main" xmlns="" id="{3AA20A04-EE64-4C85-A4C3-C674E216B21E}"/>
               </a:ext>
             </a:extLst>
           </p:cNvPr>
@@ -707,7 +708,7 @@
           <p:cNvPr id="6" name="Slide Number Placeholder 5">
             <a:extLst>
               <a:ext uri="{FF2B5EF4-FFF2-40B4-BE49-F238E27FC236}">
-                <a16:creationId xmlns:a16="http://schemas.microsoft.com/office/drawing/2014/main" id="{0F34C053-3886-4674-85D6-13CCCB876AEC}"/>
+                <a16:creationId xmlns:a16="http://schemas.microsoft.com/office/drawing/2014/main" xmlns="" id="{0F34C053-3886-4674-85D6-13CCCB876AEC}"/>
               </a:ext>
             </a:extLst>
           </p:cNvPr>
@@ -766,7 +767,7 @@
           <p:cNvPr id="2" name="Title 1">
             <a:extLst>
               <a:ext uri="{FF2B5EF4-FFF2-40B4-BE49-F238E27FC236}">
-                <a16:creationId xmlns:a16="http://schemas.microsoft.com/office/drawing/2014/main" id="{6D70D093-F0D3-479C-B65D-3031107C0DF1}"/>
+                <a16:creationId xmlns:a16="http://schemas.microsoft.com/office/drawing/2014/main" xmlns="" id="{6D70D093-F0D3-479C-B65D-3031107C0DF1}"/>
               </a:ext>
             </a:extLst>
           </p:cNvPr>
@@ -795,7 +796,7 @@
           <p:cNvPr id="3" name="Content Placeholder 2">
             <a:extLst>
               <a:ext uri="{FF2B5EF4-FFF2-40B4-BE49-F238E27FC236}">
-                <a16:creationId xmlns:a16="http://schemas.microsoft.com/office/drawing/2014/main" id="{19F2333E-AD72-4069-9999-D316EB1D2BE2}"/>
+                <a16:creationId xmlns:a16="http://schemas.microsoft.com/office/drawing/2014/main" xmlns="" id="{19F2333E-AD72-4069-9999-D316EB1D2BE2}"/>
               </a:ext>
             </a:extLst>
           </p:cNvPr>
@@ -853,7 +854,7 @@
           <p:cNvPr id="4" name="Date Placeholder 3">
             <a:extLst>
               <a:ext uri="{FF2B5EF4-FFF2-40B4-BE49-F238E27FC236}">
-                <a16:creationId xmlns:a16="http://schemas.microsoft.com/office/drawing/2014/main" id="{A5D0C69D-8EED-4855-9D9D-192FA0501F24}"/>
+                <a16:creationId xmlns:a16="http://schemas.microsoft.com/office/drawing/2014/main" xmlns="" id="{A5D0C69D-8EED-4855-9D9D-192FA0501F24}"/>
               </a:ext>
             </a:extLst>
           </p:cNvPr>
@@ -882,7 +883,7 @@
           <p:cNvPr id="5" name="Footer Placeholder 4">
             <a:extLst>
               <a:ext uri="{FF2B5EF4-FFF2-40B4-BE49-F238E27FC236}">
-                <a16:creationId xmlns:a16="http://schemas.microsoft.com/office/drawing/2014/main" id="{3E40E1C3-407E-4CDD-B265-40C6EAF109CB}"/>
+                <a16:creationId xmlns:a16="http://schemas.microsoft.com/office/drawing/2014/main" xmlns="" id="{3E40E1C3-407E-4CDD-B265-40C6EAF109CB}"/>
               </a:ext>
             </a:extLst>
           </p:cNvPr>
@@ -907,7 +908,7 @@
           <p:cNvPr id="6" name="Slide Number Placeholder 5">
             <a:extLst>
               <a:ext uri="{FF2B5EF4-FFF2-40B4-BE49-F238E27FC236}">
-                <a16:creationId xmlns:a16="http://schemas.microsoft.com/office/drawing/2014/main" id="{845BB6A8-2931-4612-9030-020514B9DFCC}"/>
+                <a16:creationId xmlns:a16="http://schemas.microsoft.com/office/drawing/2014/main" xmlns="" id="{845BB6A8-2931-4612-9030-020514B9DFCC}"/>
               </a:ext>
             </a:extLst>
           </p:cNvPr>
@@ -966,7 +967,7 @@
           <p:cNvPr id="2" name="Title 1">
             <a:extLst>
               <a:ext uri="{FF2B5EF4-FFF2-40B4-BE49-F238E27FC236}">
-                <a16:creationId xmlns:a16="http://schemas.microsoft.com/office/drawing/2014/main" id="{9648ED28-6C5E-4B58-8121-9279F11D3D73}"/>
+                <a16:creationId xmlns:a16="http://schemas.microsoft.com/office/drawing/2014/main" xmlns="" id="{9648ED28-6C5E-4B58-8121-9279F11D3D73}"/>
               </a:ext>
             </a:extLst>
           </p:cNvPr>
@@ -1004,7 +1005,7 @@
           <p:cNvPr id="3" name="Text Placeholder 2">
             <a:extLst>
               <a:ext uri="{FF2B5EF4-FFF2-40B4-BE49-F238E27FC236}">
-                <a16:creationId xmlns:a16="http://schemas.microsoft.com/office/drawing/2014/main" id="{B243195A-3915-4922-B15F-B46A8AB41FEA}"/>
+                <a16:creationId xmlns:a16="http://schemas.microsoft.com/office/drawing/2014/main" xmlns="" id="{B243195A-3915-4922-B15F-B46A8AB41FEA}"/>
               </a:ext>
             </a:extLst>
           </p:cNvPr>
@@ -1129,7 +1130,7 @@
           <p:cNvPr id="4" name="Date Placeholder 3">
             <a:extLst>
               <a:ext uri="{FF2B5EF4-FFF2-40B4-BE49-F238E27FC236}">
-                <a16:creationId xmlns:a16="http://schemas.microsoft.com/office/drawing/2014/main" id="{33A69456-A0E9-4808-8AD0-8E412F7B6478}"/>
+                <a16:creationId xmlns:a16="http://schemas.microsoft.com/office/drawing/2014/main" xmlns="" id="{33A69456-A0E9-4808-8AD0-8E412F7B6478}"/>
               </a:ext>
             </a:extLst>
           </p:cNvPr>
@@ -1158,7 +1159,7 @@
           <p:cNvPr id="5" name="Footer Placeholder 4">
             <a:extLst>
               <a:ext uri="{FF2B5EF4-FFF2-40B4-BE49-F238E27FC236}">
-                <a16:creationId xmlns:a16="http://schemas.microsoft.com/office/drawing/2014/main" id="{E0CD1CF0-CD4A-49A3-A5A3-C4241E2A5F63}"/>
+                <a16:creationId xmlns:a16="http://schemas.microsoft.com/office/drawing/2014/main" xmlns="" id="{E0CD1CF0-CD4A-49A3-A5A3-C4241E2A5F63}"/>
               </a:ext>
             </a:extLst>
           </p:cNvPr>
@@ -1183,7 +1184,7 @@
           <p:cNvPr id="6" name="Slide Number Placeholder 5">
             <a:extLst>
               <a:ext uri="{FF2B5EF4-FFF2-40B4-BE49-F238E27FC236}">
-                <a16:creationId xmlns:a16="http://schemas.microsoft.com/office/drawing/2014/main" id="{977DB6D3-8C4E-4ED5-9327-2DCA26535F2F}"/>
+                <a16:creationId xmlns:a16="http://schemas.microsoft.com/office/drawing/2014/main" xmlns="" id="{977DB6D3-8C4E-4ED5-9327-2DCA26535F2F}"/>
               </a:ext>
             </a:extLst>
           </p:cNvPr>
@@ -1242,7 +1243,7 @@
           <p:cNvPr id="2" name="Title 1">
             <a:extLst>
               <a:ext uri="{FF2B5EF4-FFF2-40B4-BE49-F238E27FC236}">
-                <a16:creationId xmlns:a16="http://schemas.microsoft.com/office/drawing/2014/main" id="{07C65CDB-FECB-413B-B3E2-B8B3289BE67F}"/>
+                <a16:creationId xmlns:a16="http://schemas.microsoft.com/office/drawing/2014/main" xmlns="" id="{07C65CDB-FECB-413B-B3E2-B8B3289BE67F}"/>
               </a:ext>
             </a:extLst>
           </p:cNvPr>
@@ -1271,7 +1272,7 @@
           <p:cNvPr id="3" name="Content Placeholder 2">
             <a:extLst>
               <a:ext uri="{FF2B5EF4-FFF2-40B4-BE49-F238E27FC236}">
-                <a16:creationId xmlns:a16="http://schemas.microsoft.com/office/drawing/2014/main" id="{2E6195E5-493D-470C-8030-A76CAC535D10}"/>
+                <a16:creationId xmlns:a16="http://schemas.microsoft.com/office/drawing/2014/main" xmlns="" id="{2E6195E5-493D-470C-8030-A76CAC535D10}"/>
               </a:ext>
             </a:extLst>
           </p:cNvPr>
@@ -1334,7 +1335,7 @@
           <p:cNvPr id="4" name="Content Placeholder 3">
             <a:extLst>
               <a:ext uri="{FF2B5EF4-FFF2-40B4-BE49-F238E27FC236}">
-                <a16:creationId xmlns:a16="http://schemas.microsoft.com/office/drawing/2014/main" id="{4F75BA75-06D0-4C8F-978B-E8DD198357AB}"/>
+                <a16:creationId xmlns:a16="http://schemas.microsoft.com/office/drawing/2014/main" xmlns="" id="{4F75BA75-06D0-4C8F-978B-E8DD198357AB}"/>
               </a:ext>
             </a:extLst>
           </p:cNvPr>
@@ -1397,7 +1398,7 @@
           <p:cNvPr id="5" name="Date Placeholder 4">
             <a:extLst>
               <a:ext uri="{FF2B5EF4-FFF2-40B4-BE49-F238E27FC236}">
-                <a16:creationId xmlns:a16="http://schemas.microsoft.com/office/drawing/2014/main" id="{B8464B70-E9DB-4711-87B7-24F57EF07851}"/>
+                <a16:creationId xmlns:a16="http://schemas.microsoft.com/office/drawing/2014/main" xmlns="" id="{B8464B70-E9DB-4711-87B7-24F57EF07851}"/>
               </a:ext>
             </a:extLst>
           </p:cNvPr>
@@ -1426,7 +1427,7 @@
           <p:cNvPr id="6" name="Footer Placeholder 5">
             <a:extLst>
               <a:ext uri="{FF2B5EF4-FFF2-40B4-BE49-F238E27FC236}">
-                <a16:creationId xmlns:a16="http://schemas.microsoft.com/office/drawing/2014/main" id="{749AD7CE-527F-410D-975F-A7CD735BDEDC}"/>
+                <a16:creationId xmlns:a16="http://schemas.microsoft.com/office/drawing/2014/main" xmlns="" id="{749AD7CE-527F-410D-975F-A7CD735BDEDC}"/>
               </a:ext>
             </a:extLst>
           </p:cNvPr>
@@ -1451,7 +1452,7 @@
           <p:cNvPr id="7" name="Slide Number Placeholder 6">
             <a:extLst>
               <a:ext uri="{FF2B5EF4-FFF2-40B4-BE49-F238E27FC236}">
-                <a16:creationId xmlns:a16="http://schemas.microsoft.com/office/drawing/2014/main" id="{255D3E42-D06E-4C32-A2BC-75DE87B576C3}"/>
+                <a16:creationId xmlns:a16="http://schemas.microsoft.com/office/drawing/2014/main" xmlns="" id="{255D3E42-D06E-4C32-A2BC-75DE87B576C3}"/>
               </a:ext>
             </a:extLst>
           </p:cNvPr>
@@ -1510,7 +1511,7 @@
           <p:cNvPr id="2" name="Title 1">
             <a:extLst>
               <a:ext uri="{FF2B5EF4-FFF2-40B4-BE49-F238E27FC236}">
-                <a16:creationId xmlns:a16="http://schemas.microsoft.com/office/drawing/2014/main" id="{BE6E0455-D9EF-42F6-B509-7FDC251CFDAF}"/>
+                <a16:creationId xmlns:a16="http://schemas.microsoft.com/office/drawing/2014/main" xmlns="" id="{BE6E0455-D9EF-42F6-B509-7FDC251CFDAF}"/>
               </a:ext>
             </a:extLst>
           </p:cNvPr>
@@ -1544,7 +1545,7 @@
           <p:cNvPr id="3" name="Text Placeholder 2">
             <a:extLst>
               <a:ext uri="{FF2B5EF4-FFF2-40B4-BE49-F238E27FC236}">
-                <a16:creationId xmlns:a16="http://schemas.microsoft.com/office/drawing/2014/main" id="{5117D045-1AD3-424F-855E-BD6F9FACDA1A}"/>
+                <a16:creationId xmlns:a16="http://schemas.microsoft.com/office/drawing/2014/main" xmlns="" id="{5117D045-1AD3-424F-855E-BD6F9FACDA1A}"/>
               </a:ext>
             </a:extLst>
           </p:cNvPr>
@@ -1615,7 +1616,7 @@
           <p:cNvPr id="4" name="Content Placeholder 3">
             <a:extLst>
               <a:ext uri="{FF2B5EF4-FFF2-40B4-BE49-F238E27FC236}">
-                <a16:creationId xmlns:a16="http://schemas.microsoft.com/office/drawing/2014/main" id="{CC38E2F2-5E09-477C-BF9F-8B671E6613BE}"/>
+                <a16:creationId xmlns:a16="http://schemas.microsoft.com/office/drawing/2014/main" xmlns="" id="{CC38E2F2-5E09-477C-BF9F-8B671E6613BE}"/>
               </a:ext>
             </a:extLst>
           </p:cNvPr>
@@ -1678,7 +1679,7 @@
           <p:cNvPr id="5" name="Text Placeholder 4">
             <a:extLst>
               <a:ext uri="{FF2B5EF4-FFF2-40B4-BE49-F238E27FC236}">
-                <a16:creationId xmlns:a16="http://schemas.microsoft.com/office/drawing/2014/main" id="{3A15ED3B-D38C-4255-B016-9BFE9335B63D}"/>
+                <a16:creationId xmlns:a16="http://schemas.microsoft.com/office/drawing/2014/main" xmlns="" id="{3A15ED3B-D38C-4255-B016-9BFE9335B63D}"/>
               </a:ext>
             </a:extLst>
           </p:cNvPr>
@@ -1749,7 +1750,7 @@
           <p:cNvPr id="6" name="Content Placeholder 5">
             <a:extLst>
               <a:ext uri="{FF2B5EF4-FFF2-40B4-BE49-F238E27FC236}">
-                <a16:creationId xmlns:a16="http://schemas.microsoft.com/office/drawing/2014/main" id="{63DAE8AA-C177-4A26-BEC1-435C0D5B2971}"/>
+                <a16:creationId xmlns:a16="http://schemas.microsoft.com/office/drawing/2014/main" xmlns="" id="{63DAE8AA-C177-4A26-BEC1-435C0D5B2971}"/>
               </a:ext>
             </a:extLst>
           </p:cNvPr>
@@ -1812,7 +1813,7 @@
           <p:cNvPr id="7" name="Date Placeholder 6">
             <a:extLst>
               <a:ext uri="{FF2B5EF4-FFF2-40B4-BE49-F238E27FC236}">
-                <a16:creationId xmlns:a16="http://schemas.microsoft.com/office/drawing/2014/main" id="{C91A1DD9-FE74-4BC2-9DFA-85266C81AE87}"/>
+                <a16:creationId xmlns:a16="http://schemas.microsoft.com/office/drawing/2014/main" xmlns="" id="{C91A1DD9-FE74-4BC2-9DFA-85266C81AE87}"/>
               </a:ext>
             </a:extLst>
           </p:cNvPr>
@@ -1841,7 +1842,7 @@
           <p:cNvPr id="8" name="Footer Placeholder 7">
             <a:extLst>
               <a:ext uri="{FF2B5EF4-FFF2-40B4-BE49-F238E27FC236}">
-                <a16:creationId xmlns:a16="http://schemas.microsoft.com/office/drawing/2014/main" id="{03468399-9983-447A-A9C7-60841A2101A5}"/>
+                <a16:creationId xmlns:a16="http://schemas.microsoft.com/office/drawing/2014/main" xmlns="" id="{03468399-9983-447A-A9C7-60841A2101A5}"/>
               </a:ext>
             </a:extLst>
           </p:cNvPr>
@@ -1866,7 +1867,7 @@
           <p:cNvPr id="9" name="Slide Number Placeholder 8">
             <a:extLst>
               <a:ext uri="{FF2B5EF4-FFF2-40B4-BE49-F238E27FC236}">
-                <a16:creationId xmlns:a16="http://schemas.microsoft.com/office/drawing/2014/main" id="{FF353AE5-8C6E-44F3-BD0C-9BE8FC31A3C4}"/>
+                <a16:creationId xmlns:a16="http://schemas.microsoft.com/office/drawing/2014/main" xmlns="" id="{FF353AE5-8C6E-44F3-BD0C-9BE8FC31A3C4}"/>
               </a:ext>
             </a:extLst>
           </p:cNvPr>
@@ -1925,7 +1926,7 @@
           <p:cNvPr id="2" name="Title 1">
             <a:extLst>
               <a:ext uri="{FF2B5EF4-FFF2-40B4-BE49-F238E27FC236}">
-                <a16:creationId xmlns:a16="http://schemas.microsoft.com/office/drawing/2014/main" id="{11AB4E18-777A-4059-8FE3-0C744DDCEF11}"/>
+                <a16:creationId xmlns:a16="http://schemas.microsoft.com/office/drawing/2014/main" xmlns="" id="{11AB4E18-777A-4059-8FE3-0C744DDCEF11}"/>
               </a:ext>
             </a:extLst>
           </p:cNvPr>
@@ -1954,7 +1955,7 @@
           <p:cNvPr id="3" name="Date Placeholder 2">
             <a:extLst>
               <a:ext uri="{FF2B5EF4-FFF2-40B4-BE49-F238E27FC236}">
-                <a16:creationId xmlns:a16="http://schemas.microsoft.com/office/drawing/2014/main" id="{EBBA3A6C-B2BF-4415-9EFA-485140AC1C20}"/>
+                <a16:creationId xmlns:a16="http://schemas.microsoft.com/office/drawing/2014/main" xmlns="" id="{EBBA3A6C-B2BF-4415-9EFA-485140AC1C20}"/>
               </a:ext>
             </a:extLst>
           </p:cNvPr>
@@ -1983,7 +1984,7 @@
           <p:cNvPr id="4" name="Footer Placeholder 3">
             <a:extLst>
               <a:ext uri="{FF2B5EF4-FFF2-40B4-BE49-F238E27FC236}">
-                <a16:creationId xmlns:a16="http://schemas.microsoft.com/office/drawing/2014/main" id="{979E66C2-27F5-4ADA-B05B-28A7E30C72C4}"/>
+                <a16:creationId xmlns:a16="http://schemas.microsoft.com/office/drawing/2014/main" xmlns="" id="{979E66C2-27F5-4ADA-B05B-28A7E30C72C4}"/>
               </a:ext>
             </a:extLst>
           </p:cNvPr>
@@ -2008,7 +2009,7 @@
           <p:cNvPr id="5" name="Slide Number Placeholder 4">
             <a:extLst>
               <a:ext uri="{FF2B5EF4-FFF2-40B4-BE49-F238E27FC236}">
-                <a16:creationId xmlns:a16="http://schemas.microsoft.com/office/drawing/2014/main" id="{339F570E-2EBF-491A-B1A3-7B0020A39D87}"/>
+                <a16:creationId xmlns:a16="http://schemas.microsoft.com/office/drawing/2014/main" xmlns="" id="{339F570E-2EBF-491A-B1A3-7B0020A39D87}"/>
               </a:ext>
             </a:extLst>
           </p:cNvPr>
@@ -2067,7 +2068,7 @@
           <p:cNvPr id="2" name="Date Placeholder 1">
             <a:extLst>
               <a:ext uri="{FF2B5EF4-FFF2-40B4-BE49-F238E27FC236}">
-                <a16:creationId xmlns:a16="http://schemas.microsoft.com/office/drawing/2014/main" id="{31CC9DF5-DDBA-4A27-A2BE-EE4875C95E73}"/>
+                <a16:creationId xmlns:a16="http://schemas.microsoft.com/office/drawing/2014/main" xmlns="" id="{31CC9DF5-DDBA-4A27-A2BE-EE4875C95E73}"/>
               </a:ext>
             </a:extLst>
           </p:cNvPr>
@@ -2096,7 +2097,7 @@
           <p:cNvPr id="3" name="Footer Placeholder 2">
             <a:extLst>
               <a:ext uri="{FF2B5EF4-FFF2-40B4-BE49-F238E27FC236}">
-                <a16:creationId xmlns:a16="http://schemas.microsoft.com/office/drawing/2014/main" id="{5E855F50-D457-4213-B498-4635BD853470}"/>
+                <a16:creationId xmlns:a16="http://schemas.microsoft.com/office/drawing/2014/main" xmlns="" id="{5E855F50-D457-4213-B498-4635BD853470}"/>
               </a:ext>
             </a:extLst>
           </p:cNvPr>
@@ -2121,7 +2122,7 @@
           <p:cNvPr id="4" name="Slide Number Placeholder 3">
             <a:extLst>
               <a:ext uri="{FF2B5EF4-FFF2-40B4-BE49-F238E27FC236}">
-                <a16:creationId xmlns:a16="http://schemas.microsoft.com/office/drawing/2014/main" id="{1424F85B-ACD9-4362-A6F2-B7C48F575113}"/>
+                <a16:creationId xmlns:a16="http://schemas.microsoft.com/office/drawing/2014/main" xmlns="" id="{1424F85B-ACD9-4362-A6F2-B7C48F575113}"/>
               </a:ext>
             </a:extLst>
           </p:cNvPr>
@@ -2180,7 +2181,7 @@
           <p:cNvPr id="2" name="Title 1">
             <a:extLst>
               <a:ext uri="{FF2B5EF4-FFF2-40B4-BE49-F238E27FC236}">
-                <a16:creationId xmlns:a16="http://schemas.microsoft.com/office/drawing/2014/main" id="{BD554F58-5E8E-48ED-8ED9-A0BD06E6F218}"/>
+                <a16:creationId xmlns:a16="http://schemas.microsoft.com/office/drawing/2014/main" xmlns="" id="{BD554F58-5E8E-48ED-8ED9-A0BD06E6F218}"/>
               </a:ext>
             </a:extLst>
           </p:cNvPr>
@@ -2218,7 +2219,7 @@
           <p:cNvPr id="3" name="Content Placeholder 2">
             <a:extLst>
               <a:ext uri="{FF2B5EF4-FFF2-40B4-BE49-F238E27FC236}">
-                <a16:creationId xmlns:a16="http://schemas.microsoft.com/office/drawing/2014/main" id="{88E32398-FD1A-4262-BB8C-6CFB63C85CED}"/>
+                <a16:creationId xmlns:a16="http://schemas.microsoft.com/office/drawing/2014/main" xmlns="" id="{88E32398-FD1A-4262-BB8C-6CFB63C85CED}"/>
               </a:ext>
             </a:extLst>
           </p:cNvPr>
@@ -2309,7 +2310,7 @@
           <p:cNvPr id="4" name="Text Placeholder 3">
             <a:extLst>
               <a:ext uri="{FF2B5EF4-FFF2-40B4-BE49-F238E27FC236}">
-                <a16:creationId xmlns:a16="http://schemas.microsoft.com/office/drawing/2014/main" id="{373EAC1B-2FB9-4226-BCA0-E5D3B01D6FA0}"/>
+                <a16:creationId xmlns:a16="http://schemas.microsoft.com/office/drawing/2014/main" xmlns="" id="{373EAC1B-2FB9-4226-BCA0-E5D3B01D6FA0}"/>
               </a:ext>
             </a:extLst>
           </p:cNvPr>
@@ -2380,7 +2381,7 @@
           <p:cNvPr id="5" name="Date Placeholder 4">
             <a:extLst>
               <a:ext uri="{FF2B5EF4-FFF2-40B4-BE49-F238E27FC236}">
-                <a16:creationId xmlns:a16="http://schemas.microsoft.com/office/drawing/2014/main" id="{D639F409-5438-45DD-BECC-62B7B0AAF361}"/>
+                <a16:creationId xmlns:a16="http://schemas.microsoft.com/office/drawing/2014/main" xmlns="" id="{D639F409-5438-45DD-BECC-62B7B0AAF361}"/>
               </a:ext>
             </a:extLst>
           </p:cNvPr>
@@ -2409,7 +2410,7 @@
           <p:cNvPr id="6" name="Footer Placeholder 5">
             <a:extLst>
               <a:ext uri="{FF2B5EF4-FFF2-40B4-BE49-F238E27FC236}">
-                <a16:creationId xmlns:a16="http://schemas.microsoft.com/office/drawing/2014/main" id="{2311AAC2-3F58-465D-8275-AAB451586BBE}"/>
+                <a16:creationId xmlns:a16="http://schemas.microsoft.com/office/drawing/2014/main" xmlns="" id="{2311AAC2-3F58-465D-8275-AAB451586BBE}"/>
               </a:ext>
             </a:extLst>
           </p:cNvPr>
@@ -2434,7 +2435,7 @@
           <p:cNvPr id="7" name="Slide Number Placeholder 6">
             <a:extLst>
               <a:ext uri="{FF2B5EF4-FFF2-40B4-BE49-F238E27FC236}">
-                <a16:creationId xmlns:a16="http://schemas.microsoft.com/office/drawing/2014/main" id="{4076C87A-5864-468D-9EE2-7F4B0C093074}"/>
+                <a16:creationId xmlns:a16="http://schemas.microsoft.com/office/drawing/2014/main" xmlns="" id="{4076C87A-5864-468D-9EE2-7F4B0C093074}"/>
               </a:ext>
             </a:extLst>
           </p:cNvPr>
@@ -2493,7 +2494,7 @@
           <p:cNvPr id="2" name="Title 1">
             <a:extLst>
               <a:ext uri="{FF2B5EF4-FFF2-40B4-BE49-F238E27FC236}">
-                <a16:creationId xmlns:a16="http://schemas.microsoft.com/office/drawing/2014/main" id="{B5D51929-B485-4C5E-86DE-E6E2074D6CE5}"/>
+                <a16:creationId xmlns:a16="http://schemas.microsoft.com/office/drawing/2014/main" xmlns="" id="{B5D51929-B485-4C5E-86DE-E6E2074D6CE5}"/>
               </a:ext>
             </a:extLst>
           </p:cNvPr>
@@ -2531,7 +2532,7 @@
           <p:cNvPr id="3" name="Picture Placeholder 2">
             <a:extLst>
               <a:ext uri="{FF2B5EF4-FFF2-40B4-BE49-F238E27FC236}">
-                <a16:creationId xmlns:a16="http://schemas.microsoft.com/office/drawing/2014/main" id="{745CAD50-DBFD-4B1E-8C5A-FEC1D2159DDB}"/>
+                <a16:creationId xmlns:a16="http://schemas.microsoft.com/office/drawing/2014/main" xmlns="" id="{745CAD50-DBFD-4B1E-8C5A-FEC1D2159DDB}"/>
               </a:ext>
             </a:extLst>
           </p:cNvPr>
@@ -2598,7 +2599,7 @@
           <p:cNvPr id="4" name="Text Placeholder 3">
             <a:extLst>
               <a:ext uri="{FF2B5EF4-FFF2-40B4-BE49-F238E27FC236}">
-                <a16:creationId xmlns:a16="http://schemas.microsoft.com/office/drawing/2014/main" id="{56CA1066-373C-4A49-B657-9EE7DCD0952D}"/>
+                <a16:creationId xmlns:a16="http://schemas.microsoft.com/office/drawing/2014/main" xmlns="" id="{56CA1066-373C-4A49-B657-9EE7DCD0952D}"/>
               </a:ext>
             </a:extLst>
           </p:cNvPr>
@@ -2669,7 +2670,7 @@
           <p:cNvPr id="5" name="Date Placeholder 4">
             <a:extLst>
               <a:ext uri="{FF2B5EF4-FFF2-40B4-BE49-F238E27FC236}">
-                <a16:creationId xmlns:a16="http://schemas.microsoft.com/office/drawing/2014/main" id="{D4F04E1C-BF5B-43FA-9CA9-C4A3872ABD47}"/>
+                <a16:creationId xmlns:a16="http://schemas.microsoft.com/office/drawing/2014/main" xmlns="" id="{D4F04E1C-BF5B-43FA-9CA9-C4A3872ABD47}"/>
               </a:ext>
             </a:extLst>
           </p:cNvPr>
@@ -2698,7 +2699,7 @@
           <p:cNvPr id="6" name="Footer Placeholder 5">
             <a:extLst>
               <a:ext uri="{FF2B5EF4-FFF2-40B4-BE49-F238E27FC236}">
-                <a16:creationId xmlns:a16="http://schemas.microsoft.com/office/drawing/2014/main" id="{B3F3C200-5776-44B6-80D6-B576FC6FE4A1}"/>
+                <a16:creationId xmlns:a16="http://schemas.microsoft.com/office/drawing/2014/main" xmlns="" id="{B3F3C200-5776-44B6-80D6-B576FC6FE4A1}"/>
               </a:ext>
             </a:extLst>
           </p:cNvPr>
@@ -2723,7 +2724,7 @@
           <p:cNvPr id="7" name="Slide Number Placeholder 6">
             <a:extLst>
               <a:ext uri="{FF2B5EF4-FFF2-40B4-BE49-F238E27FC236}">
-                <a16:creationId xmlns:a16="http://schemas.microsoft.com/office/drawing/2014/main" id="{C83FA351-8092-4D78-A9C7-A20A77930D3D}"/>
+                <a16:creationId xmlns:a16="http://schemas.microsoft.com/office/drawing/2014/main" xmlns="" id="{C83FA351-8092-4D78-A9C7-A20A77930D3D}"/>
               </a:ext>
             </a:extLst>
           </p:cNvPr>
@@ -2787,7 +2788,7 @@
           <p:cNvPr id="2" name="Title Placeholder 1">
             <a:extLst>
               <a:ext uri="{FF2B5EF4-FFF2-40B4-BE49-F238E27FC236}">
-                <a16:creationId xmlns:a16="http://schemas.microsoft.com/office/drawing/2014/main" id="{417237BA-4865-4280-8BD0-E6D106DFB608}"/>
+                <a16:creationId xmlns:a16="http://schemas.microsoft.com/office/drawing/2014/main" xmlns="" id="{417237BA-4865-4280-8BD0-E6D106DFB608}"/>
               </a:ext>
             </a:extLst>
           </p:cNvPr>
@@ -2826,7 +2827,7 @@
           <p:cNvPr id="3" name="Text Placeholder 2">
             <a:extLst>
               <a:ext uri="{FF2B5EF4-FFF2-40B4-BE49-F238E27FC236}">
-                <a16:creationId xmlns:a16="http://schemas.microsoft.com/office/drawing/2014/main" id="{CFD6DF4C-CD43-4DDE-9E26-4DAB0E753402}"/>
+                <a16:creationId xmlns:a16="http://schemas.microsoft.com/office/drawing/2014/main" xmlns="" id="{CFD6DF4C-CD43-4DDE-9E26-4DAB0E753402}"/>
               </a:ext>
             </a:extLst>
           </p:cNvPr>
@@ -2894,7 +2895,7 @@
           <p:cNvPr id="4" name="Date Placeholder 3">
             <a:extLst>
               <a:ext uri="{FF2B5EF4-FFF2-40B4-BE49-F238E27FC236}">
-                <a16:creationId xmlns:a16="http://schemas.microsoft.com/office/drawing/2014/main" id="{4E8F96A9-316E-4272-B736-3B7A5BEFB368}"/>
+                <a16:creationId xmlns:a16="http://schemas.microsoft.com/office/drawing/2014/main" xmlns="" id="{4E8F96A9-316E-4272-B736-3B7A5BEFB368}"/>
               </a:ext>
             </a:extLst>
           </p:cNvPr>
@@ -2941,7 +2942,7 @@
           <p:cNvPr id="5" name="Footer Placeholder 4">
             <a:extLst>
               <a:ext uri="{FF2B5EF4-FFF2-40B4-BE49-F238E27FC236}">
-                <a16:creationId xmlns:a16="http://schemas.microsoft.com/office/drawing/2014/main" id="{5B9B060F-4139-42DD-835A-DD48B4C35B93}"/>
+                <a16:creationId xmlns:a16="http://schemas.microsoft.com/office/drawing/2014/main" xmlns="" id="{5B9B060F-4139-42DD-835A-DD48B4C35B93}"/>
               </a:ext>
             </a:extLst>
           </p:cNvPr>
@@ -2984,7 +2985,7 @@
           <p:cNvPr id="6" name="Slide Number Placeholder 5">
             <a:extLst>
               <a:ext uri="{FF2B5EF4-FFF2-40B4-BE49-F238E27FC236}">
-                <a16:creationId xmlns:a16="http://schemas.microsoft.com/office/drawing/2014/main" id="{419ED261-D27A-4F8B-A664-31C7824BE2CC}"/>
+                <a16:creationId xmlns:a16="http://schemas.microsoft.com/office/drawing/2014/main" xmlns="" id="{419ED261-D27A-4F8B-A664-31C7824BE2CC}"/>
               </a:ext>
             </a:extLst>
           </p:cNvPr>
@@ -3352,7 +3353,7 @@
           <p:cNvPr id="4" name="Rectangle: Rounded Corners 3">
             <a:extLst>
               <a:ext uri="{FF2B5EF4-FFF2-40B4-BE49-F238E27FC236}">
-                <a16:creationId xmlns:a16="http://schemas.microsoft.com/office/drawing/2014/main" id="{54D0FB8B-B098-491A-AD31-AD421AB902EF}"/>
+                <a16:creationId xmlns:a16="http://schemas.microsoft.com/office/drawing/2014/main" xmlns="" id="{54D0FB8B-B098-491A-AD31-AD421AB902EF}"/>
               </a:ext>
             </a:extLst>
           </p:cNvPr>
@@ -3411,7 +3412,7 @@
           <p:cNvPr id="5" name="Rectangle: Rounded Corners 4">
             <a:extLst>
               <a:ext uri="{FF2B5EF4-FFF2-40B4-BE49-F238E27FC236}">
-                <a16:creationId xmlns:a16="http://schemas.microsoft.com/office/drawing/2014/main" id="{5675C345-97DA-44C4-8895-174F9B25EB74}"/>
+                <a16:creationId xmlns:a16="http://schemas.microsoft.com/office/drawing/2014/main" xmlns="" id="{5675C345-97DA-44C4-8895-174F9B25EB74}"/>
               </a:ext>
             </a:extLst>
           </p:cNvPr>
@@ -3470,7 +3471,7 @@
           <p:cNvPr id="10" name="Straight Arrow Connector 9">
             <a:extLst>
               <a:ext uri="{FF2B5EF4-FFF2-40B4-BE49-F238E27FC236}">
-                <a16:creationId xmlns:a16="http://schemas.microsoft.com/office/drawing/2014/main" id="{2738494B-22BB-4E16-AA8E-063441F62080}"/>
+                <a16:creationId xmlns:a16="http://schemas.microsoft.com/office/drawing/2014/main" xmlns="" id="{2738494B-22BB-4E16-AA8E-063441F62080}"/>
               </a:ext>
             </a:extLst>
           </p:cNvPr>
@@ -3512,7 +3513,7 @@
           <p:cNvPr id="11" name="TextBox 10">
             <a:extLst>
               <a:ext uri="{FF2B5EF4-FFF2-40B4-BE49-F238E27FC236}">
-                <a16:creationId xmlns:a16="http://schemas.microsoft.com/office/drawing/2014/main" id="{EA0207FA-CB6D-4700-A943-37A35E7A7F6C}"/>
+                <a16:creationId xmlns:a16="http://schemas.microsoft.com/office/drawing/2014/main" xmlns="" id="{EA0207FA-CB6D-4700-A943-37A35E7A7F6C}"/>
               </a:ext>
             </a:extLst>
           </p:cNvPr>
@@ -3548,7 +3549,7 @@
           <p:cNvPr id="12" name="Rectangle: Rounded Corners 11">
             <a:extLst>
               <a:ext uri="{FF2B5EF4-FFF2-40B4-BE49-F238E27FC236}">
-                <a16:creationId xmlns:a16="http://schemas.microsoft.com/office/drawing/2014/main" id="{0172D6A7-F319-4C98-BCFD-58AB9FFA137C}"/>
+                <a16:creationId xmlns:a16="http://schemas.microsoft.com/office/drawing/2014/main" xmlns="" id="{0172D6A7-F319-4C98-BCFD-58AB9FFA137C}"/>
               </a:ext>
             </a:extLst>
           </p:cNvPr>
@@ -3607,7 +3608,7 @@
           <p:cNvPr id="13" name="Rectangle: Rounded Corners 12">
             <a:extLst>
               <a:ext uri="{FF2B5EF4-FFF2-40B4-BE49-F238E27FC236}">
-                <a16:creationId xmlns:a16="http://schemas.microsoft.com/office/drawing/2014/main" id="{351768B8-B0F4-49E5-A1C4-CB95780972A0}"/>
+                <a16:creationId xmlns:a16="http://schemas.microsoft.com/office/drawing/2014/main" xmlns="" id="{351768B8-B0F4-49E5-A1C4-CB95780972A0}"/>
               </a:ext>
             </a:extLst>
           </p:cNvPr>
@@ -3666,7 +3667,7 @@
           <p:cNvPr id="14" name="Rectangle: Rounded Corners 13">
             <a:extLst>
               <a:ext uri="{FF2B5EF4-FFF2-40B4-BE49-F238E27FC236}">
-                <a16:creationId xmlns:a16="http://schemas.microsoft.com/office/drawing/2014/main" id="{C3BAB69B-ADA0-48E1-A7A3-2F500C2A407E}"/>
+                <a16:creationId xmlns:a16="http://schemas.microsoft.com/office/drawing/2014/main" xmlns="" id="{C3BAB69B-ADA0-48E1-A7A3-2F500C2A407E}"/>
               </a:ext>
             </a:extLst>
           </p:cNvPr>
@@ -3725,7 +3726,7 @@
           <p:cNvPr id="15" name="Rectangle: Rounded Corners 14">
             <a:extLst>
               <a:ext uri="{FF2B5EF4-FFF2-40B4-BE49-F238E27FC236}">
-                <a16:creationId xmlns:a16="http://schemas.microsoft.com/office/drawing/2014/main" id="{415FC0F5-4B41-4A53-9189-AE991ED2BD31}"/>
+                <a16:creationId xmlns:a16="http://schemas.microsoft.com/office/drawing/2014/main" xmlns="" id="{415FC0F5-4B41-4A53-9189-AE991ED2BD31}"/>
               </a:ext>
             </a:extLst>
           </p:cNvPr>
@@ -3784,7 +3785,7 @@
           <p:cNvPr id="16" name="Rectangle: Rounded Corners 15">
             <a:extLst>
               <a:ext uri="{FF2B5EF4-FFF2-40B4-BE49-F238E27FC236}">
-                <a16:creationId xmlns:a16="http://schemas.microsoft.com/office/drawing/2014/main" id="{80DE7B24-B7E9-47B6-8E88-EC972ED19123}"/>
+                <a16:creationId xmlns:a16="http://schemas.microsoft.com/office/drawing/2014/main" xmlns="" id="{80DE7B24-B7E9-47B6-8E88-EC972ED19123}"/>
               </a:ext>
             </a:extLst>
           </p:cNvPr>
@@ -3843,7 +3844,7 @@
           <p:cNvPr id="17" name="Connector: Elbow 16">
             <a:extLst>
               <a:ext uri="{FF2B5EF4-FFF2-40B4-BE49-F238E27FC236}">
-                <a16:creationId xmlns:a16="http://schemas.microsoft.com/office/drawing/2014/main" id="{64514852-CA0B-4B22-9112-9C0EFB8F9B9B}"/>
+                <a16:creationId xmlns:a16="http://schemas.microsoft.com/office/drawing/2014/main" xmlns="" id="{64514852-CA0B-4B22-9112-9C0EFB8F9B9B}"/>
               </a:ext>
             </a:extLst>
           </p:cNvPr>
@@ -3891,7 +3892,7 @@
           <p:cNvPr id="20" name="Connector: Elbow 19">
             <a:extLst>
               <a:ext uri="{FF2B5EF4-FFF2-40B4-BE49-F238E27FC236}">
-                <a16:creationId xmlns:a16="http://schemas.microsoft.com/office/drawing/2014/main" id="{E118E15D-38EF-455D-87FB-59C64F2455B6}"/>
+                <a16:creationId xmlns:a16="http://schemas.microsoft.com/office/drawing/2014/main" xmlns="" id="{E118E15D-38EF-455D-87FB-59C64F2455B6}"/>
               </a:ext>
             </a:extLst>
           </p:cNvPr>
@@ -3939,7 +3940,7 @@
           <p:cNvPr id="23" name="Connector: Elbow 22">
             <a:extLst>
               <a:ext uri="{FF2B5EF4-FFF2-40B4-BE49-F238E27FC236}">
-                <a16:creationId xmlns:a16="http://schemas.microsoft.com/office/drawing/2014/main" id="{B493C084-F212-492E-957C-8BEA879E995D}"/>
+                <a16:creationId xmlns:a16="http://schemas.microsoft.com/office/drawing/2014/main" xmlns="" id="{B493C084-F212-492E-957C-8BEA879E995D}"/>
               </a:ext>
             </a:extLst>
           </p:cNvPr>
@@ -3987,7 +3988,7 @@
           <p:cNvPr id="30" name="Rectangle: Rounded Corners 29">
             <a:extLst>
               <a:ext uri="{FF2B5EF4-FFF2-40B4-BE49-F238E27FC236}">
-                <a16:creationId xmlns:a16="http://schemas.microsoft.com/office/drawing/2014/main" id="{19F24737-7B63-4E7B-9AE5-A87497FA6FAF}"/>
+                <a16:creationId xmlns:a16="http://schemas.microsoft.com/office/drawing/2014/main" xmlns="" id="{19F24737-7B63-4E7B-9AE5-A87497FA6FAF}"/>
               </a:ext>
             </a:extLst>
           </p:cNvPr>
@@ -4046,7 +4047,7 @@
           <p:cNvPr id="31" name="Rectangle: Rounded Corners 30">
             <a:extLst>
               <a:ext uri="{FF2B5EF4-FFF2-40B4-BE49-F238E27FC236}">
-                <a16:creationId xmlns:a16="http://schemas.microsoft.com/office/drawing/2014/main" id="{7BC2DA58-1C14-4D8B-9AF3-E14F6FAD8FC0}"/>
+                <a16:creationId xmlns:a16="http://schemas.microsoft.com/office/drawing/2014/main" xmlns="" id="{7BC2DA58-1C14-4D8B-9AF3-E14F6FAD8FC0}"/>
               </a:ext>
             </a:extLst>
           </p:cNvPr>
@@ -4105,7 +4106,7 @@
           <p:cNvPr id="32" name="Rectangle: Rounded Corners 31">
             <a:extLst>
               <a:ext uri="{FF2B5EF4-FFF2-40B4-BE49-F238E27FC236}">
-                <a16:creationId xmlns:a16="http://schemas.microsoft.com/office/drawing/2014/main" id="{A2415D34-9AEB-4D3C-8B85-9A65A96218FE}"/>
+                <a16:creationId xmlns:a16="http://schemas.microsoft.com/office/drawing/2014/main" xmlns="" id="{A2415D34-9AEB-4D3C-8B85-9A65A96218FE}"/>
               </a:ext>
             </a:extLst>
           </p:cNvPr>
@@ -4164,7 +4165,7 @@
           <p:cNvPr id="33" name="Connector: Elbow 32">
             <a:extLst>
               <a:ext uri="{FF2B5EF4-FFF2-40B4-BE49-F238E27FC236}">
-                <a16:creationId xmlns:a16="http://schemas.microsoft.com/office/drawing/2014/main" id="{821A3089-B696-4653-B73B-39B49F027466}"/>
+                <a16:creationId xmlns:a16="http://schemas.microsoft.com/office/drawing/2014/main" xmlns="" id="{821A3089-B696-4653-B73B-39B49F027466}"/>
               </a:ext>
             </a:extLst>
           </p:cNvPr>
@@ -4212,7 +4213,7 @@
           <p:cNvPr id="36" name="Connector: Elbow 35">
             <a:extLst>
               <a:ext uri="{FF2B5EF4-FFF2-40B4-BE49-F238E27FC236}">
-                <a16:creationId xmlns:a16="http://schemas.microsoft.com/office/drawing/2014/main" id="{0E570848-FE64-4E6A-A947-1CBC1911E97A}"/>
+                <a16:creationId xmlns:a16="http://schemas.microsoft.com/office/drawing/2014/main" xmlns="" id="{0E570848-FE64-4E6A-A947-1CBC1911E97A}"/>
               </a:ext>
             </a:extLst>
           </p:cNvPr>
@@ -4260,7 +4261,7 @@
           <p:cNvPr id="8" name="Straight Arrow Connector 7">
             <a:extLst>
               <a:ext uri="{FF2B5EF4-FFF2-40B4-BE49-F238E27FC236}">
-                <a16:creationId xmlns:a16="http://schemas.microsoft.com/office/drawing/2014/main" id="{02FF8AEF-9744-4B1C-ACB9-E3241ACF27D1}"/>
+                <a16:creationId xmlns:a16="http://schemas.microsoft.com/office/drawing/2014/main" xmlns="" id="{02FF8AEF-9744-4B1C-ACB9-E3241ACF27D1}"/>
               </a:ext>
             </a:extLst>
           </p:cNvPr>
@@ -4305,7 +4306,7 @@
           <p:cNvPr id="25" name="Rectangle: Rounded Corners 24">
             <a:extLst>
               <a:ext uri="{FF2B5EF4-FFF2-40B4-BE49-F238E27FC236}">
-                <a16:creationId xmlns:a16="http://schemas.microsoft.com/office/drawing/2014/main" id="{509E733A-9C35-48BC-B1CE-379C573000FE}"/>
+                <a16:creationId xmlns:a16="http://schemas.microsoft.com/office/drawing/2014/main" xmlns="" id="{509E733A-9C35-48BC-B1CE-379C573000FE}"/>
               </a:ext>
             </a:extLst>
           </p:cNvPr>
@@ -4364,7 +4365,7 @@
           <p:cNvPr id="26" name="Straight Arrow Connector 25">
             <a:extLst>
               <a:ext uri="{FF2B5EF4-FFF2-40B4-BE49-F238E27FC236}">
-                <a16:creationId xmlns:a16="http://schemas.microsoft.com/office/drawing/2014/main" id="{45BB73C4-0487-4332-804D-0640F1C24DD7}"/>
+                <a16:creationId xmlns:a16="http://schemas.microsoft.com/office/drawing/2014/main" xmlns="" id="{45BB73C4-0487-4332-804D-0640F1C24DD7}"/>
               </a:ext>
             </a:extLst>
           </p:cNvPr>
@@ -4411,7 +4412,7 @@
           <p:cNvPr id="29" name="TextBox 28">
             <a:extLst>
               <a:ext uri="{FF2B5EF4-FFF2-40B4-BE49-F238E27FC236}">
-                <a16:creationId xmlns:a16="http://schemas.microsoft.com/office/drawing/2014/main" id="{ECF64CE6-E66F-4FF9-8239-2D9801A3273B}"/>
+                <a16:creationId xmlns:a16="http://schemas.microsoft.com/office/drawing/2014/main" xmlns="" id="{ECF64CE6-E66F-4FF9-8239-2D9801A3273B}"/>
               </a:ext>
             </a:extLst>
           </p:cNvPr>
@@ -4447,7 +4448,7 @@
           <p:cNvPr id="34" name="Connector: Elbow 33">
             <a:extLst>
               <a:ext uri="{FF2B5EF4-FFF2-40B4-BE49-F238E27FC236}">
-                <a16:creationId xmlns:a16="http://schemas.microsoft.com/office/drawing/2014/main" id="{762DA317-C2C5-4F35-8BEE-2475336742C9}"/>
+                <a16:creationId xmlns:a16="http://schemas.microsoft.com/office/drawing/2014/main" xmlns="" id="{762DA317-C2C5-4F35-8BEE-2475336742C9}"/>
               </a:ext>
             </a:extLst>
           </p:cNvPr>
@@ -4496,7 +4497,7 @@
           <p:cNvPr id="35" name="Connector: Elbow 34">
             <a:extLst>
               <a:ext uri="{FF2B5EF4-FFF2-40B4-BE49-F238E27FC236}">
-                <a16:creationId xmlns:a16="http://schemas.microsoft.com/office/drawing/2014/main" id="{326F3BCB-F2A3-492C-A8F3-20922107B29D}"/>
+                <a16:creationId xmlns:a16="http://schemas.microsoft.com/office/drawing/2014/main" xmlns="" id="{326F3BCB-F2A3-492C-A8F3-20922107B29D}"/>
               </a:ext>
             </a:extLst>
           </p:cNvPr>
@@ -4545,7 +4546,7 @@
           <p:cNvPr id="37" name="Connector: Elbow 36">
             <a:extLst>
               <a:ext uri="{FF2B5EF4-FFF2-40B4-BE49-F238E27FC236}">
-                <a16:creationId xmlns:a16="http://schemas.microsoft.com/office/drawing/2014/main" id="{D78C9AF8-6E97-4A41-9699-F00133FB72EE}"/>
+                <a16:creationId xmlns:a16="http://schemas.microsoft.com/office/drawing/2014/main" xmlns="" id="{D78C9AF8-6E97-4A41-9699-F00133FB72EE}"/>
               </a:ext>
             </a:extLst>
           </p:cNvPr>
@@ -4594,7 +4595,7 @@
           <p:cNvPr id="83" name="TextBox 82">
             <a:extLst>
               <a:ext uri="{FF2B5EF4-FFF2-40B4-BE49-F238E27FC236}">
-                <a16:creationId xmlns:a16="http://schemas.microsoft.com/office/drawing/2014/main" id="{C34CC880-1902-497C-A44A-571D93EAD548}"/>
+                <a16:creationId xmlns:a16="http://schemas.microsoft.com/office/drawing/2014/main" xmlns="" id="{C34CC880-1902-497C-A44A-571D93EAD548}"/>
               </a:ext>
             </a:extLst>
           </p:cNvPr>
@@ -4629,7 +4630,7 @@
           <p:cNvPr id="84" name="TextBox 83">
             <a:extLst>
               <a:ext uri="{FF2B5EF4-FFF2-40B4-BE49-F238E27FC236}">
-                <a16:creationId xmlns:a16="http://schemas.microsoft.com/office/drawing/2014/main" id="{582DAA28-77DF-48AB-A0FA-7D0944EEA418}"/>
+                <a16:creationId xmlns:a16="http://schemas.microsoft.com/office/drawing/2014/main" xmlns="" id="{582DAA28-77DF-48AB-A0FA-7D0944EEA418}"/>
               </a:ext>
             </a:extLst>
           </p:cNvPr>
@@ -4664,7 +4665,7 @@
           <p:cNvPr id="85" name="TextBox 84">
             <a:extLst>
               <a:ext uri="{FF2B5EF4-FFF2-40B4-BE49-F238E27FC236}">
-                <a16:creationId xmlns:a16="http://schemas.microsoft.com/office/drawing/2014/main" id="{35632462-2816-4AB9-8863-E2858DF02B69}"/>
+                <a16:creationId xmlns:a16="http://schemas.microsoft.com/office/drawing/2014/main" xmlns="" id="{35632462-2816-4AB9-8863-E2858DF02B69}"/>
               </a:ext>
             </a:extLst>
           </p:cNvPr>
@@ -4699,7 +4700,7 @@
           <p:cNvPr id="98" name="Connector: Elbow 97">
             <a:extLst>
               <a:ext uri="{FF2B5EF4-FFF2-40B4-BE49-F238E27FC236}">
-                <a16:creationId xmlns:a16="http://schemas.microsoft.com/office/drawing/2014/main" id="{A1F2BECA-1D96-4FF9-8754-645C1D7726F8}"/>
+                <a16:creationId xmlns:a16="http://schemas.microsoft.com/office/drawing/2014/main" xmlns="" id="{A1F2BECA-1D96-4FF9-8754-645C1D7726F8}"/>
               </a:ext>
             </a:extLst>
           </p:cNvPr>
@@ -4748,7 +4749,7 @@
           <p:cNvPr id="101" name="Connector: Elbow 100">
             <a:extLst>
               <a:ext uri="{FF2B5EF4-FFF2-40B4-BE49-F238E27FC236}">
-                <a16:creationId xmlns:a16="http://schemas.microsoft.com/office/drawing/2014/main" id="{36519D8D-4EA4-45AD-AD01-BCA533BD100D}"/>
+                <a16:creationId xmlns:a16="http://schemas.microsoft.com/office/drawing/2014/main" xmlns="" id="{36519D8D-4EA4-45AD-AD01-BCA533BD100D}"/>
               </a:ext>
             </a:extLst>
           </p:cNvPr>
@@ -4797,7 +4798,7 @@
           <p:cNvPr id="104" name="TextBox 103">
             <a:extLst>
               <a:ext uri="{FF2B5EF4-FFF2-40B4-BE49-F238E27FC236}">
-                <a16:creationId xmlns:a16="http://schemas.microsoft.com/office/drawing/2014/main" id="{6D855CC4-9F24-4FB0-84C5-F540689823DA}"/>
+                <a16:creationId xmlns:a16="http://schemas.microsoft.com/office/drawing/2014/main" xmlns="" id="{6D855CC4-9F24-4FB0-84C5-F540689823DA}"/>
               </a:ext>
             </a:extLst>
           </p:cNvPr>
@@ -4832,7 +4833,7 @@
           <p:cNvPr id="105" name="TextBox 104">
             <a:extLst>
               <a:ext uri="{FF2B5EF4-FFF2-40B4-BE49-F238E27FC236}">
-                <a16:creationId xmlns:a16="http://schemas.microsoft.com/office/drawing/2014/main" id="{312F8B0D-878E-4CFD-AF2D-6C5C84BC7C3F}"/>
+                <a16:creationId xmlns:a16="http://schemas.microsoft.com/office/drawing/2014/main" xmlns="" id="{312F8B0D-878E-4CFD-AF2D-6C5C84BC7C3F}"/>
               </a:ext>
             </a:extLst>
           </p:cNvPr>
@@ -4867,7 +4868,7 @@
           <p:cNvPr id="106" name="Connector: Elbow 105">
             <a:extLst>
               <a:ext uri="{FF2B5EF4-FFF2-40B4-BE49-F238E27FC236}">
-                <a16:creationId xmlns:a16="http://schemas.microsoft.com/office/drawing/2014/main" id="{AFDAAF80-D279-45C4-BA1C-63276C92DDEA}"/>
+                <a16:creationId xmlns:a16="http://schemas.microsoft.com/office/drawing/2014/main" xmlns="" id="{AFDAAF80-D279-45C4-BA1C-63276C92DDEA}"/>
               </a:ext>
             </a:extLst>
           </p:cNvPr>
@@ -4916,7 +4917,7 @@
           <p:cNvPr id="109" name="TextBox 108">
             <a:extLst>
               <a:ext uri="{FF2B5EF4-FFF2-40B4-BE49-F238E27FC236}">
-                <a16:creationId xmlns:a16="http://schemas.microsoft.com/office/drawing/2014/main" id="{68F80759-A938-4EC4-AB28-CF35C69A0B12}"/>
+                <a16:creationId xmlns:a16="http://schemas.microsoft.com/office/drawing/2014/main" xmlns="" id="{68F80759-A938-4EC4-AB28-CF35C69A0B12}"/>
               </a:ext>
             </a:extLst>
           </p:cNvPr>
@@ -4950,6 +4951,2063 @@
     <p:extLst>
       <p:ext uri="{BB962C8B-B14F-4D97-AF65-F5344CB8AC3E}">
         <p14:creationId xmlns:p14="http://schemas.microsoft.com/office/powerpoint/2010/main" val="1928210434"/>
+      </p:ext>
+    </p:extLst>
+  </p:cSld>
+  <p:clrMapOvr>
+    <a:masterClrMapping/>
+  </p:clrMapOvr>
+</p:sld>
+</file>
+
+<file path=ppt/slides/slide2.xml><?xml version="1.0" encoding="utf-8"?>
+<p:sld xmlns:a="http://schemas.openxmlformats.org/drawingml/2006/main" xmlns:r="http://schemas.openxmlformats.org/officeDocument/2006/relationships" xmlns:p="http://schemas.openxmlformats.org/presentationml/2006/main">
+  <p:cSld>
+    <p:spTree>
+      <p:nvGrpSpPr>
+        <p:cNvPr id="1" name=""/>
+        <p:cNvGrpSpPr/>
+        <p:nvPr/>
+      </p:nvGrpSpPr>
+      <p:grpSpPr>
+        <a:xfrm>
+          <a:off x="0" y="0"/>
+          <a:ext cx="0" cy="0"/>
+          <a:chOff x="0" y="0"/>
+          <a:chExt cx="0" cy="0"/>
+        </a:xfrm>
+      </p:grpSpPr>
+      <p:graphicFrame>
+        <p:nvGraphicFramePr>
+          <p:cNvPr id="4" name="Table 3"/>
+          <p:cNvGraphicFramePr>
+            <a:graphicFrameLocks noGrp="1"/>
+          </p:cNvGraphicFramePr>
+          <p:nvPr>
+            <p:extLst>
+              <p:ext uri="{D42A27DB-BD31-4B8C-83A1-F6EECF244321}">
+                <p14:modId xmlns:p14="http://schemas.microsoft.com/office/powerpoint/2010/main" val="1196620685"/>
+              </p:ext>
+            </p:extLst>
+          </p:nvPr>
+        </p:nvGraphicFramePr>
+        <p:xfrm>
+          <a:off x="9979894" y="1153188"/>
+          <a:ext cx="1557580" cy="1036320"/>
+        </p:xfrm>
+        <a:graphic>
+          <a:graphicData uri="http://schemas.openxmlformats.org/drawingml/2006/table">
+            <a:tbl>
+              <a:tblPr firstRow="1" bandRow="1">
+                <a:tableStyleId>{5C22544A-7EE6-4342-B048-85BDC9FD1C3A}</a:tableStyleId>
+              </a:tblPr>
+              <a:tblGrid>
+                <a:gridCol w="778790"/>
+                <a:gridCol w="778790"/>
+              </a:tblGrid>
+              <a:tr h="0">
+                <a:tc gridSpan="2">
+                  <a:txBody>
+                    <a:bodyPr/>
+                    <a:lstStyle/>
+                    <a:p>
+                      <a:pPr algn="ctr"/>
+                      <a:r>
+                        <a:rPr lang="en-AU" sz="1100" dirty="0" smtClean="0"/>
+                        <a:t>Asset</a:t>
+                      </a:r>
+                      <a:endParaRPr lang="en-AU" sz="1100" dirty="0"/>
+                    </a:p>
+                  </a:txBody>
+                  <a:tcPr/>
+                </a:tc>
+                <a:tc hMerge="1">
+                  <a:txBody>
+                    <a:bodyPr/>
+                    <a:lstStyle/>
+                    <a:p>
+                      <a:endParaRPr lang="en-AU" sz="1100" dirty="0"/>
+                    </a:p>
+                  </a:txBody>
+                  <a:tcPr/>
+                </a:tc>
+              </a:tr>
+              <a:tr h="175982">
+                <a:tc>
+                  <a:txBody>
+                    <a:bodyPr/>
+                    <a:lstStyle/>
+                    <a:p>
+                      <a:r>
+                        <a:rPr lang="en-AU" sz="1100" dirty="0" smtClean="0"/>
+                        <a:t>id</a:t>
+                      </a:r>
+                    </a:p>
+                  </a:txBody>
+                  <a:tcPr/>
+                </a:tc>
+                <a:tc>
+                  <a:txBody>
+                    <a:bodyPr/>
+                    <a:lstStyle/>
+                    <a:p>
+                      <a:r>
+                        <a:rPr lang="en-AU" sz="1100" dirty="0" err="1" smtClean="0"/>
+                        <a:t>int</a:t>
+                      </a:r>
+                      <a:endParaRPr lang="en-AU" sz="1100" dirty="0" smtClean="0"/>
+                    </a:p>
+                  </a:txBody>
+                  <a:tcPr/>
+                </a:tc>
+              </a:tr>
+              <a:tr h="175982">
+                <a:tc>
+                  <a:txBody>
+                    <a:bodyPr/>
+                    <a:lstStyle/>
+                    <a:p>
+                      <a:r>
+                        <a:rPr lang="en-AU" sz="1100" dirty="0" err="1" smtClean="0"/>
+                        <a:t>uri</a:t>
+                      </a:r>
+                      <a:endParaRPr lang="en-AU" sz="1100" dirty="0"/>
+                    </a:p>
+                  </a:txBody>
+                  <a:tcPr/>
+                </a:tc>
+                <a:tc>
+                  <a:txBody>
+                    <a:bodyPr/>
+                    <a:lstStyle/>
+                    <a:p>
+                      <a:r>
+                        <a:rPr lang="en-AU" sz="1100" dirty="0" smtClean="0"/>
+                        <a:t>text</a:t>
+                      </a:r>
+                      <a:endParaRPr lang="en-AU" sz="1100" dirty="0"/>
+                    </a:p>
+                  </a:txBody>
+                  <a:tcPr/>
+                </a:tc>
+              </a:tr>
+              <a:tr h="175982">
+                <a:tc>
+                  <a:txBody>
+                    <a:bodyPr/>
+                    <a:lstStyle/>
+                    <a:p>
+                      <a:r>
+                        <a:rPr lang="en-AU" sz="1100" i="1" dirty="0" err="1" smtClean="0"/>
+                        <a:t>policy_id</a:t>
+                      </a:r>
+                      <a:endParaRPr lang="en-AU" sz="1100" i="1" dirty="0"/>
+                    </a:p>
+                  </a:txBody>
+                  <a:tcPr/>
+                </a:tc>
+                <a:tc>
+                  <a:txBody>
+                    <a:bodyPr/>
+                    <a:lstStyle/>
+                    <a:p>
+                      <a:r>
+                        <a:rPr lang="en-AU" sz="1100" i="1" dirty="0" err="1" smtClean="0"/>
+                        <a:t>int</a:t>
+                      </a:r>
+                      <a:endParaRPr lang="en-AU" sz="1100" i="1" dirty="0" smtClean="0"/>
+                    </a:p>
+                  </a:txBody>
+                  <a:tcPr/>
+                </a:tc>
+              </a:tr>
+            </a:tbl>
+          </a:graphicData>
+        </a:graphic>
+      </p:graphicFrame>
+      <p:graphicFrame>
+        <p:nvGraphicFramePr>
+          <p:cNvPr id="5" name="Table 4"/>
+          <p:cNvGraphicFramePr>
+            <a:graphicFrameLocks noGrp="1"/>
+          </p:cNvGraphicFramePr>
+          <p:nvPr>
+            <p:extLst>
+              <p:ext uri="{D42A27DB-BD31-4B8C-83A1-F6EECF244321}">
+                <p14:modId xmlns:p14="http://schemas.microsoft.com/office/powerpoint/2010/main" val="936693467"/>
+              </p:ext>
+            </p:extLst>
+          </p:nvPr>
+        </p:nvGraphicFramePr>
+        <p:xfrm>
+          <a:off x="9979894" y="2452501"/>
+          <a:ext cx="1557580" cy="4024748"/>
+        </p:xfrm>
+        <a:graphic>
+          <a:graphicData uri="http://schemas.openxmlformats.org/drawingml/2006/table">
+            <a:tbl>
+              <a:tblPr firstRow="1" bandRow="1">
+                <a:tableStyleId>{5C22544A-7EE6-4342-B048-85BDC9FD1C3A}</a:tableStyleId>
+              </a:tblPr>
+              <a:tblGrid>
+                <a:gridCol w="989603"/>
+                <a:gridCol w="567977"/>
+              </a:tblGrid>
+              <a:tr h="287482">
+                <a:tc gridSpan="2">
+                  <a:txBody>
+                    <a:bodyPr/>
+                    <a:lstStyle/>
+                    <a:p>
+                      <a:pPr algn="ctr"/>
+                      <a:r>
+                        <a:rPr lang="en-AU" sz="1100" dirty="0" smtClean="0"/>
+                        <a:t>Policy</a:t>
+                      </a:r>
+                      <a:endParaRPr lang="en-AU" sz="1100" dirty="0"/>
+                    </a:p>
+                  </a:txBody>
+                  <a:tcPr/>
+                </a:tc>
+                <a:tc hMerge="1">
+                  <a:txBody>
+                    <a:bodyPr/>
+                    <a:lstStyle/>
+                    <a:p>
+                      <a:endParaRPr lang="en-AU" sz="1100" dirty="0"/>
+                    </a:p>
+                  </a:txBody>
+                  <a:tcPr/>
+                </a:tc>
+              </a:tr>
+              <a:tr h="287482">
+                <a:tc>
+                  <a:txBody>
+                    <a:bodyPr/>
+                    <a:lstStyle/>
+                    <a:p>
+                      <a:r>
+                        <a:rPr lang="en-AU" sz="1100" b="1" dirty="0" smtClean="0"/>
+                        <a:t>id</a:t>
+                      </a:r>
+                      <a:endParaRPr lang="en-AU" sz="1100" b="1" dirty="0"/>
+                    </a:p>
+                  </a:txBody>
+                  <a:tcPr/>
+                </a:tc>
+                <a:tc>
+                  <a:txBody>
+                    <a:bodyPr/>
+                    <a:lstStyle/>
+                    <a:p>
+                      <a:r>
+                        <a:rPr lang="en-AU" sz="1100" b="1" dirty="0" err="1" smtClean="0"/>
+                        <a:t>int</a:t>
+                      </a:r>
+                      <a:endParaRPr lang="en-AU" sz="1100" b="1" dirty="0" smtClean="0"/>
+                    </a:p>
+                  </a:txBody>
+                  <a:tcPr/>
+                </a:tc>
+              </a:tr>
+              <a:tr h="287482">
+                <a:tc>
+                  <a:txBody>
+                    <a:bodyPr/>
+                    <a:lstStyle/>
+                    <a:p>
+                      <a:r>
+                        <a:rPr lang="en-AU" sz="1100" dirty="0" smtClean="0"/>
+                        <a:t>type(license?)</a:t>
+                      </a:r>
+                      <a:endParaRPr lang="en-AU" sz="1100" dirty="0"/>
+                    </a:p>
+                  </a:txBody>
+                  <a:tcPr/>
+                </a:tc>
+                <a:tc>
+                  <a:txBody>
+                    <a:bodyPr/>
+                    <a:lstStyle/>
+                    <a:p>
+                      <a:r>
+                        <a:rPr lang="en-AU" sz="1100" dirty="0" smtClean="0"/>
+                        <a:t>text</a:t>
+                      </a:r>
+                      <a:endParaRPr lang="en-AU" sz="1100" dirty="0"/>
+                    </a:p>
+                  </a:txBody>
+                  <a:tcPr/>
+                </a:tc>
+              </a:tr>
+              <a:tr h="287482">
+                <a:tc>
+                  <a:txBody>
+                    <a:bodyPr/>
+                    <a:lstStyle/>
+                    <a:p>
+                      <a:r>
+                        <a:rPr lang="en-AU" sz="1100" dirty="0" smtClean="0"/>
+                        <a:t>label</a:t>
+                      </a:r>
+                      <a:endParaRPr lang="en-AU" sz="1100" dirty="0"/>
+                    </a:p>
+                  </a:txBody>
+                  <a:tcPr/>
+                </a:tc>
+                <a:tc>
+                  <a:txBody>
+                    <a:bodyPr/>
+                    <a:lstStyle/>
+                    <a:p>
+                      <a:r>
+                        <a:rPr lang="en-AU" sz="1100" dirty="0" smtClean="0"/>
+                        <a:t>text</a:t>
+                      </a:r>
+                      <a:endParaRPr lang="en-AU" sz="1100" dirty="0"/>
+                    </a:p>
+                  </a:txBody>
+                  <a:tcPr/>
+                </a:tc>
+              </a:tr>
+              <a:tr h="287482">
+                <a:tc>
+                  <a:txBody>
+                    <a:bodyPr/>
+                    <a:lstStyle/>
+                    <a:p>
+                      <a:r>
+                        <a:rPr lang="en-AU" sz="1100" dirty="0" smtClean="0"/>
+                        <a:t>jurisdiction</a:t>
+                      </a:r>
+                      <a:endParaRPr lang="en-AU" sz="1100" dirty="0"/>
+                    </a:p>
+                  </a:txBody>
+                  <a:tcPr/>
+                </a:tc>
+                <a:tc>
+                  <a:txBody>
+                    <a:bodyPr/>
+                    <a:lstStyle/>
+                    <a:p>
+                      <a:r>
+                        <a:rPr lang="en-AU" sz="1100" dirty="0" smtClean="0"/>
+                        <a:t>text</a:t>
+                      </a:r>
+                      <a:endParaRPr lang="en-AU" sz="1100" dirty="0"/>
+                    </a:p>
+                  </a:txBody>
+                  <a:tcPr/>
+                </a:tc>
+              </a:tr>
+              <a:tr h="287482">
+                <a:tc>
+                  <a:txBody>
+                    <a:bodyPr/>
+                    <a:lstStyle/>
+                    <a:p>
+                      <a:r>
+                        <a:rPr lang="en-AU" sz="1100" dirty="0" err="1" smtClean="0"/>
+                        <a:t>legalcode</a:t>
+                      </a:r>
+                      <a:endParaRPr lang="en-AU" sz="1100" dirty="0"/>
+                    </a:p>
+                  </a:txBody>
+                  <a:tcPr/>
+                </a:tc>
+                <a:tc>
+                  <a:txBody>
+                    <a:bodyPr/>
+                    <a:lstStyle/>
+                    <a:p>
+                      <a:r>
+                        <a:rPr lang="en-AU" sz="1100" dirty="0" smtClean="0"/>
+                        <a:t>text</a:t>
+                      </a:r>
+                      <a:endParaRPr lang="en-AU" sz="1100" dirty="0"/>
+                    </a:p>
+                  </a:txBody>
+                  <a:tcPr/>
+                </a:tc>
+              </a:tr>
+              <a:tr h="287482">
+                <a:tc>
+                  <a:txBody>
+                    <a:bodyPr/>
+                    <a:lstStyle/>
+                    <a:p>
+                      <a:r>
+                        <a:rPr lang="en-AU" sz="1100" dirty="0" err="1" smtClean="0"/>
+                        <a:t>hasVersion</a:t>
+                      </a:r>
+                      <a:endParaRPr lang="en-AU" sz="1100" dirty="0"/>
+                    </a:p>
+                  </a:txBody>
+                  <a:tcPr/>
+                </a:tc>
+                <a:tc>
+                  <a:txBody>
+                    <a:bodyPr/>
+                    <a:lstStyle/>
+                    <a:p>
+                      <a:r>
+                        <a:rPr lang="en-AU" sz="1100" dirty="0" smtClean="0"/>
+                        <a:t>text</a:t>
+                      </a:r>
+                      <a:endParaRPr lang="en-AU" sz="1100" dirty="0"/>
+                    </a:p>
+                  </a:txBody>
+                  <a:tcPr/>
+                </a:tc>
+              </a:tr>
+              <a:tr h="287482">
+                <a:tc>
+                  <a:txBody>
+                    <a:bodyPr/>
+                    <a:lstStyle/>
+                    <a:p>
+                      <a:r>
+                        <a:rPr lang="en-AU" sz="1100" dirty="0" smtClean="0"/>
+                        <a:t>language</a:t>
+                      </a:r>
+                      <a:endParaRPr lang="en-AU" sz="1100" dirty="0"/>
+                    </a:p>
+                  </a:txBody>
+                  <a:tcPr/>
+                </a:tc>
+                <a:tc>
+                  <a:txBody>
+                    <a:bodyPr/>
+                    <a:lstStyle/>
+                    <a:p>
+                      <a:r>
+                        <a:rPr lang="en-AU" sz="1100" dirty="0" smtClean="0"/>
+                        <a:t>text</a:t>
+                      </a:r>
+                      <a:endParaRPr lang="en-AU" sz="1100" dirty="0"/>
+                    </a:p>
+                  </a:txBody>
+                  <a:tcPr/>
+                </a:tc>
+              </a:tr>
+              <a:tr h="287482">
+                <a:tc>
+                  <a:txBody>
+                    <a:bodyPr/>
+                    <a:lstStyle/>
+                    <a:p>
+                      <a:r>
+                        <a:rPr lang="en-AU" sz="1100" dirty="0" err="1" smtClean="0"/>
+                        <a:t>seeAlso</a:t>
+                      </a:r>
+                      <a:endParaRPr lang="en-AU" sz="1100" dirty="0"/>
+                    </a:p>
+                  </a:txBody>
+                  <a:tcPr/>
+                </a:tc>
+                <a:tc>
+                  <a:txBody>
+                    <a:bodyPr/>
+                    <a:lstStyle/>
+                    <a:p>
+                      <a:r>
+                        <a:rPr lang="en-AU" sz="1100" dirty="0" smtClean="0"/>
+                        <a:t>text</a:t>
+                      </a:r>
+                      <a:endParaRPr lang="en-AU" sz="1100" dirty="0"/>
+                    </a:p>
+                  </a:txBody>
+                  <a:tcPr/>
+                </a:tc>
+              </a:tr>
+              <a:tr h="287482">
+                <a:tc>
+                  <a:txBody>
+                    <a:bodyPr/>
+                    <a:lstStyle/>
+                    <a:p>
+                      <a:r>
+                        <a:rPr lang="en-AU" sz="1100" dirty="0" err="1" smtClean="0"/>
+                        <a:t>sameAs</a:t>
+                      </a:r>
+                      <a:endParaRPr lang="en-AU" sz="1100" dirty="0"/>
+                    </a:p>
+                  </a:txBody>
+                  <a:tcPr/>
+                </a:tc>
+                <a:tc>
+                  <a:txBody>
+                    <a:bodyPr/>
+                    <a:lstStyle/>
+                    <a:p>
+                      <a:r>
+                        <a:rPr lang="en-AU" sz="1100" dirty="0" smtClean="0"/>
+                        <a:t>text</a:t>
+                      </a:r>
+                      <a:endParaRPr lang="en-AU" sz="1100" dirty="0"/>
+                    </a:p>
+                  </a:txBody>
+                  <a:tcPr/>
+                </a:tc>
+              </a:tr>
+              <a:tr h="287482">
+                <a:tc>
+                  <a:txBody>
+                    <a:bodyPr/>
+                    <a:lstStyle/>
+                    <a:p>
+                      <a:r>
+                        <a:rPr lang="en-AU" sz="1100" dirty="0" smtClean="0"/>
+                        <a:t>comment</a:t>
+                      </a:r>
+                      <a:endParaRPr lang="en-AU" sz="1100" dirty="0"/>
+                    </a:p>
+                  </a:txBody>
+                  <a:tcPr/>
+                </a:tc>
+                <a:tc>
+                  <a:txBody>
+                    <a:bodyPr/>
+                    <a:lstStyle/>
+                    <a:p>
+                      <a:r>
+                        <a:rPr lang="en-AU" sz="1100" dirty="0" smtClean="0"/>
+                        <a:t>text</a:t>
+                      </a:r>
+                      <a:endParaRPr lang="en-AU" sz="1100" dirty="0"/>
+                    </a:p>
+                  </a:txBody>
+                  <a:tcPr/>
+                </a:tc>
+              </a:tr>
+              <a:tr h="287482">
+                <a:tc>
+                  <a:txBody>
+                    <a:bodyPr/>
+                    <a:lstStyle/>
+                    <a:p>
+                      <a:r>
+                        <a:rPr lang="en-AU" sz="1100" dirty="0" smtClean="0"/>
+                        <a:t>logo</a:t>
+                      </a:r>
+                      <a:endParaRPr lang="en-AU" sz="1100" dirty="0"/>
+                    </a:p>
+                  </a:txBody>
+                  <a:tcPr/>
+                </a:tc>
+                <a:tc>
+                  <a:txBody>
+                    <a:bodyPr/>
+                    <a:lstStyle/>
+                    <a:p>
+                      <a:r>
+                        <a:rPr lang="en-AU" sz="1100" dirty="0" smtClean="0"/>
+                        <a:t>text</a:t>
+                      </a:r>
+                      <a:endParaRPr lang="en-AU" sz="1100" dirty="0"/>
+                    </a:p>
+                  </a:txBody>
+                  <a:tcPr/>
+                </a:tc>
+              </a:tr>
+              <a:tr h="287482">
+                <a:tc>
+                  <a:txBody>
+                    <a:bodyPr/>
+                    <a:lstStyle/>
+                    <a:p>
+                      <a:r>
+                        <a:rPr lang="en-AU" sz="1100" dirty="0" smtClean="0"/>
+                        <a:t>created</a:t>
+                      </a:r>
+                      <a:endParaRPr lang="en-AU" sz="1100" dirty="0"/>
+                    </a:p>
+                  </a:txBody>
+                  <a:tcPr/>
+                </a:tc>
+                <a:tc>
+                  <a:txBody>
+                    <a:bodyPr/>
+                    <a:lstStyle/>
+                    <a:p>
+                      <a:r>
+                        <a:rPr lang="en-AU" sz="1100" dirty="0" err="1" smtClean="0"/>
+                        <a:t>int</a:t>
+                      </a:r>
+                      <a:endParaRPr lang="en-AU" sz="1100" dirty="0"/>
+                    </a:p>
+                  </a:txBody>
+                  <a:tcPr/>
+                </a:tc>
+              </a:tr>
+              <a:tr h="287482">
+                <a:tc>
+                  <a:txBody>
+                    <a:bodyPr/>
+                    <a:lstStyle/>
+                    <a:p>
+                      <a:r>
+                        <a:rPr lang="en-AU" sz="1100" dirty="0" smtClean="0"/>
+                        <a:t>status</a:t>
+                      </a:r>
+                      <a:endParaRPr lang="en-AU" sz="1100" dirty="0"/>
+                    </a:p>
+                  </a:txBody>
+                  <a:tcPr/>
+                </a:tc>
+                <a:tc>
+                  <a:txBody>
+                    <a:bodyPr/>
+                    <a:lstStyle/>
+                    <a:p>
+                      <a:r>
+                        <a:rPr lang="en-AU" sz="1100" dirty="0" smtClean="0"/>
+                        <a:t>text</a:t>
+                      </a:r>
+                      <a:endParaRPr lang="en-AU" sz="1100" dirty="0"/>
+                    </a:p>
+                  </a:txBody>
+                  <a:tcPr/>
+                </a:tc>
+              </a:tr>
+            </a:tbl>
+          </a:graphicData>
+        </a:graphic>
+      </p:graphicFrame>
+      <p:graphicFrame>
+        <p:nvGraphicFramePr>
+          <p:cNvPr id="10" name="Table 9"/>
+          <p:cNvGraphicFramePr>
+            <a:graphicFrameLocks noGrp="1"/>
+          </p:cNvGraphicFramePr>
+          <p:nvPr>
+            <p:extLst>
+              <p:ext uri="{D42A27DB-BD31-4B8C-83A1-F6EECF244321}">
+                <p14:modId xmlns:p14="http://schemas.microsoft.com/office/powerpoint/2010/main" val="3458964260"/>
+              </p:ext>
+            </p:extLst>
+          </p:nvPr>
+        </p:nvGraphicFramePr>
+        <p:xfrm>
+          <a:off x="4637473" y="2723565"/>
+          <a:ext cx="1122920" cy="777240"/>
+        </p:xfrm>
+        <a:graphic>
+          <a:graphicData uri="http://schemas.openxmlformats.org/drawingml/2006/table">
+            <a:tbl>
+              <a:tblPr firstRow="1" bandRow="1">
+                <a:tableStyleId>{5C22544A-7EE6-4342-B048-85BDC9FD1C3A}</a:tableStyleId>
+              </a:tblPr>
+              <a:tblGrid>
+                <a:gridCol w="561460"/>
+                <a:gridCol w="561460"/>
+              </a:tblGrid>
+              <a:tr h="238423">
+                <a:tc gridSpan="2">
+                  <a:txBody>
+                    <a:bodyPr/>
+                    <a:lstStyle/>
+                    <a:p>
+                      <a:pPr algn="ctr"/>
+                      <a:r>
+                        <a:rPr lang="en-AU" sz="1100" dirty="0" smtClean="0"/>
+                        <a:t>Rule</a:t>
+                      </a:r>
+                      <a:endParaRPr lang="en-AU" sz="1100" dirty="0"/>
+                    </a:p>
+                  </a:txBody>
+                  <a:tcPr/>
+                </a:tc>
+                <a:tc hMerge="1">
+                  <a:txBody>
+                    <a:bodyPr/>
+                    <a:lstStyle/>
+                    <a:p>
+                      <a:endParaRPr lang="en-AU" sz="1100" dirty="0"/>
+                    </a:p>
+                  </a:txBody>
+                  <a:tcPr/>
+                </a:tc>
+              </a:tr>
+              <a:tr h="0">
+                <a:tc>
+                  <a:txBody>
+                    <a:bodyPr/>
+                    <a:lstStyle/>
+                    <a:p>
+                      <a:r>
+                        <a:rPr lang="en-AU" sz="1100" b="1" dirty="0" smtClean="0"/>
+                        <a:t>id</a:t>
+                      </a:r>
+                      <a:endParaRPr lang="en-AU" sz="1100" b="1" dirty="0"/>
+                    </a:p>
+                  </a:txBody>
+                  <a:tcPr/>
+                </a:tc>
+                <a:tc>
+                  <a:txBody>
+                    <a:bodyPr/>
+                    <a:lstStyle/>
+                    <a:p>
+                      <a:r>
+                        <a:rPr lang="en-AU" sz="1100" b="1" dirty="0" err="1" smtClean="0"/>
+                        <a:t>int</a:t>
+                      </a:r>
+                      <a:endParaRPr lang="en-AU" sz="1100" b="1" dirty="0"/>
+                    </a:p>
+                  </a:txBody>
+                  <a:tcPr/>
+                </a:tc>
+              </a:tr>
+              <a:tr h="0">
+                <a:tc>
+                  <a:txBody>
+                    <a:bodyPr/>
+                    <a:lstStyle/>
+                    <a:p>
+                      <a:r>
+                        <a:rPr lang="en-AU" sz="1100" i="1" dirty="0" smtClean="0"/>
+                        <a:t>type</a:t>
+                      </a:r>
+                      <a:endParaRPr lang="en-AU" sz="1100" i="1" dirty="0"/>
+                    </a:p>
+                  </a:txBody>
+                  <a:tcPr/>
+                </a:tc>
+                <a:tc>
+                  <a:txBody>
+                    <a:bodyPr/>
+                    <a:lstStyle/>
+                    <a:p>
+                      <a:r>
+                        <a:rPr lang="en-AU" sz="1100" i="1" dirty="0" smtClean="0"/>
+                        <a:t>text</a:t>
+                      </a:r>
+                      <a:endParaRPr lang="en-AU" sz="1100" i="1" dirty="0"/>
+                    </a:p>
+                  </a:txBody>
+                  <a:tcPr/>
+                </a:tc>
+              </a:tr>
+            </a:tbl>
+          </a:graphicData>
+        </a:graphic>
+      </p:graphicFrame>
+      <p:graphicFrame>
+        <p:nvGraphicFramePr>
+          <p:cNvPr id="11" name="Table 10"/>
+          <p:cNvGraphicFramePr>
+            <a:graphicFrameLocks noGrp="1"/>
+          </p:cNvGraphicFramePr>
+          <p:nvPr>
+            <p:extLst>
+              <p:ext uri="{D42A27DB-BD31-4B8C-83A1-F6EECF244321}">
+                <p14:modId xmlns:p14="http://schemas.microsoft.com/office/powerpoint/2010/main" val="1975495458"/>
+              </p:ext>
+            </p:extLst>
+          </p:nvPr>
+        </p:nvGraphicFramePr>
+        <p:xfrm>
+          <a:off x="7227454" y="3649534"/>
+          <a:ext cx="1407392" cy="1112520"/>
+        </p:xfrm>
+        <a:graphic>
+          <a:graphicData uri="http://schemas.openxmlformats.org/drawingml/2006/table">
+            <a:tbl>
+              <a:tblPr firstRow="1" bandRow="1">
+                <a:tableStyleId>{5C22544A-7EE6-4342-B048-85BDC9FD1C3A}</a:tableStyleId>
+              </a:tblPr>
+              <a:tblGrid>
+                <a:gridCol w="703696"/>
+                <a:gridCol w="703696"/>
+              </a:tblGrid>
+              <a:tr h="0">
+                <a:tc gridSpan="2">
+                  <a:txBody>
+                    <a:bodyPr/>
+                    <a:lstStyle/>
+                    <a:p>
+                      <a:pPr algn="ctr"/>
+                      <a:r>
+                        <a:rPr lang="en-AU" sz="1100" dirty="0" err="1" smtClean="0"/>
+                        <a:t>RuleType</a:t>
+                      </a:r>
+                      <a:endParaRPr lang="en-AU" sz="1100" dirty="0"/>
+                    </a:p>
+                  </a:txBody>
+                  <a:tcPr/>
+                </a:tc>
+                <a:tc hMerge="1">
+                  <a:txBody>
+                    <a:bodyPr/>
+                    <a:lstStyle/>
+                    <a:p>
+                      <a:endParaRPr lang="en-AU" sz="1100" dirty="0"/>
+                    </a:p>
+                  </a:txBody>
+                  <a:tcPr/>
+                </a:tc>
+              </a:tr>
+              <a:tr h="0">
+                <a:tc>
+                  <a:txBody>
+                    <a:bodyPr/>
+                    <a:lstStyle/>
+                    <a:p>
+                      <a:r>
+                        <a:rPr lang="en-AU" sz="1100" b="1" dirty="0" smtClean="0"/>
+                        <a:t>type</a:t>
+                      </a:r>
+                      <a:endParaRPr lang="en-AU" sz="1100" b="1" dirty="0"/>
+                    </a:p>
+                  </a:txBody>
+                  <a:tcPr/>
+                </a:tc>
+                <a:tc>
+                  <a:txBody>
+                    <a:bodyPr/>
+                    <a:lstStyle/>
+                    <a:p>
+                      <a:r>
+                        <a:rPr lang="en-AU" sz="1100" b="1" dirty="0" smtClean="0"/>
+                        <a:t>text</a:t>
+                      </a:r>
+                      <a:endParaRPr lang="en-AU" sz="1100" b="1" dirty="0"/>
+                    </a:p>
+                  </a:txBody>
+                  <a:tcPr/>
+                </a:tc>
+              </a:tr>
+              <a:tr h="369711">
+                <a:tc gridSpan="2">
+                  <a:txBody>
+                    <a:bodyPr/>
+                    <a:lstStyle/>
+                    <a:p>
+                      <a:r>
+                        <a:rPr lang="en-AU" sz="1100" dirty="0" smtClean="0"/>
+                        <a:t>preloaded with ‘permission’, ‘duty’ and ‘prohibition’</a:t>
+                      </a:r>
+                      <a:endParaRPr lang="en-AU" sz="1100" dirty="0"/>
+                    </a:p>
+                  </a:txBody>
+                  <a:tcPr/>
+                </a:tc>
+                <a:tc hMerge="1">
+                  <a:txBody>
+                    <a:bodyPr/>
+                    <a:lstStyle/>
+                    <a:p>
+                      <a:endParaRPr lang="en-AU" sz="1100" dirty="0"/>
+                    </a:p>
+                  </a:txBody>
+                  <a:tcPr/>
+                </a:tc>
+              </a:tr>
+            </a:tbl>
+          </a:graphicData>
+        </a:graphic>
+      </p:graphicFrame>
+      <p:graphicFrame>
+        <p:nvGraphicFramePr>
+          <p:cNvPr id="12" name="Table 11"/>
+          <p:cNvGraphicFramePr>
+            <a:graphicFrameLocks noGrp="1"/>
+          </p:cNvGraphicFramePr>
+          <p:nvPr>
+            <p:extLst>
+              <p:ext uri="{D42A27DB-BD31-4B8C-83A1-F6EECF244321}">
+                <p14:modId xmlns:p14="http://schemas.microsoft.com/office/powerpoint/2010/main" val="504961736"/>
+              </p:ext>
+            </p:extLst>
+          </p:nvPr>
+        </p:nvGraphicFramePr>
+        <p:xfrm>
+          <a:off x="7227454" y="2483674"/>
+          <a:ext cx="2010066" cy="777240"/>
+        </p:xfrm>
+        <a:graphic>
+          <a:graphicData uri="http://schemas.openxmlformats.org/drawingml/2006/table">
+            <a:tbl>
+              <a:tblPr firstRow="1" bandRow="1">
+                <a:tableStyleId>{5C22544A-7EE6-4342-B048-85BDC9FD1C3A}</a:tableStyleId>
+              </a:tblPr>
+              <a:tblGrid>
+                <a:gridCol w="1005033"/>
+                <a:gridCol w="1005033"/>
+              </a:tblGrid>
+              <a:tr h="0">
+                <a:tc gridSpan="2">
+                  <a:txBody>
+                    <a:bodyPr/>
+                    <a:lstStyle/>
+                    <a:p>
+                      <a:pPr algn="ctr"/>
+                      <a:r>
+                        <a:rPr lang="en-AU" sz="1100" dirty="0" err="1" smtClean="0"/>
+                        <a:t>PolicyHasRule</a:t>
+                      </a:r>
+                      <a:endParaRPr lang="en-AU" sz="1100" dirty="0"/>
+                    </a:p>
+                  </a:txBody>
+                  <a:tcPr/>
+                </a:tc>
+                <a:tc hMerge="1">
+                  <a:txBody>
+                    <a:bodyPr/>
+                    <a:lstStyle/>
+                    <a:p>
+                      <a:endParaRPr lang="en-AU" dirty="0"/>
+                    </a:p>
+                  </a:txBody>
+                  <a:tcPr/>
+                </a:tc>
+              </a:tr>
+              <a:tr h="188690">
+                <a:tc>
+                  <a:txBody>
+                    <a:bodyPr/>
+                    <a:lstStyle/>
+                    <a:p>
+                      <a:r>
+                        <a:rPr lang="en-AU" sz="1100" b="1" i="1" dirty="0" err="1" smtClean="0"/>
+                        <a:t>policy_id</a:t>
+                      </a:r>
+                      <a:endParaRPr lang="en-AU" sz="1100" b="1" i="1" dirty="0"/>
+                    </a:p>
+                  </a:txBody>
+                  <a:tcPr/>
+                </a:tc>
+                <a:tc>
+                  <a:txBody>
+                    <a:bodyPr/>
+                    <a:lstStyle/>
+                    <a:p>
+                      <a:r>
+                        <a:rPr lang="en-AU" sz="1100" b="1" i="1" dirty="0" err="1" smtClean="0"/>
+                        <a:t>int</a:t>
+                      </a:r>
+                      <a:endParaRPr lang="en-AU" sz="1100" b="1" i="1" dirty="0"/>
+                    </a:p>
+                  </a:txBody>
+                  <a:tcPr/>
+                </a:tc>
+              </a:tr>
+              <a:tr h="0">
+                <a:tc>
+                  <a:txBody>
+                    <a:bodyPr/>
+                    <a:lstStyle/>
+                    <a:p>
+                      <a:r>
+                        <a:rPr lang="en-AU" sz="1100" b="1" i="1" dirty="0" err="1" smtClean="0"/>
+                        <a:t>rule_id</a:t>
+                      </a:r>
+                      <a:endParaRPr lang="en-AU" sz="1100" b="1" i="1" dirty="0"/>
+                    </a:p>
+                  </a:txBody>
+                  <a:tcPr/>
+                </a:tc>
+                <a:tc>
+                  <a:txBody>
+                    <a:bodyPr/>
+                    <a:lstStyle/>
+                    <a:p>
+                      <a:r>
+                        <a:rPr lang="en-AU" sz="1100" b="1" i="1" dirty="0" err="1" smtClean="0"/>
+                        <a:t>int</a:t>
+                      </a:r>
+                      <a:endParaRPr lang="en-AU" sz="1100" b="1" i="1" dirty="0"/>
+                    </a:p>
+                  </a:txBody>
+                  <a:tcPr/>
+                </a:tc>
+              </a:tr>
+            </a:tbl>
+          </a:graphicData>
+        </a:graphic>
+      </p:graphicFrame>
+      <p:cxnSp>
+        <p:nvCxnSpPr>
+          <p:cNvPr id="14" name="Straight Arrow Connector 13"/>
+          <p:cNvCxnSpPr/>
+          <p:nvPr/>
+        </p:nvCxnSpPr>
+        <p:spPr>
+          <a:xfrm>
+            <a:off x="9237520" y="2881749"/>
+            <a:ext cx="748144" cy="0"/>
+          </a:xfrm>
+          <a:prstGeom prst="straightConnector1">
+            <a:avLst/>
+          </a:prstGeom>
+          <a:ln>
+            <a:tailEnd type="triangle"/>
+          </a:ln>
+        </p:spPr>
+        <p:style>
+          <a:lnRef idx="1">
+            <a:schemeClr val="accent1"/>
+          </a:lnRef>
+          <a:fillRef idx="0">
+            <a:schemeClr val="accent1"/>
+          </a:fillRef>
+          <a:effectRef idx="0">
+            <a:schemeClr val="accent1"/>
+          </a:effectRef>
+          <a:fontRef idx="minor">
+            <a:schemeClr val="tx1"/>
+          </a:fontRef>
+        </p:style>
+      </p:cxnSp>
+      <p:cxnSp>
+        <p:nvCxnSpPr>
+          <p:cNvPr id="32" name="Straight Arrow Connector 31"/>
+          <p:cNvCxnSpPr>
+            <a:endCxn id="10" idx="3"/>
+          </p:cNvCxnSpPr>
+          <p:nvPr/>
+        </p:nvCxnSpPr>
+        <p:spPr>
+          <a:xfrm flipH="1">
+            <a:off x="5760393" y="3112185"/>
+            <a:ext cx="1467061" cy="0"/>
+          </a:xfrm>
+          <a:prstGeom prst="straightConnector1">
+            <a:avLst/>
+          </a:prstGeom>
+          <a:ln>
+            <a:tailEnd type="triangle"/>
+          </a:ln>
+        </p:spPr>
+        <p:style>
+          <a:lnRef idx="1">
+            <a:schemeClr val="accent1"/>
+          </a:lnRef>
+          <a:fillRef idx="0">
+            <a:schemeClr val="accent1"/>
+          </a:fillRef>
+          <a:effectRef idx="0">
+            <a:schemeClr val="accent1"/>
+          </a:effectRef>
+          <a:fontRef idx="minor">
+            <a:schemeClr val="tx1"/>
+          </a:fontRef>
+        </p:style>
+      </p:cxnSp>
+      <p:cxnSp>
+        <p:nvCxnSpPr>
+          <p:cNvPr id="34" name="Straight Arrow Connector 33"/>
+          <p:cNvCxnSpPr/>
+          <p:nvPr/>
+        </p:nvCxnSpPr>
+        <p:spPr>
+          <a:xfrm>
+            <a:off x="5760393" y="3333754"/>
+            <a:ext cx="1467061" cy="711777"/>
+          </a:xfrm>
+          <a:prstGeom prst="straightConnector1">
+            <a:avLst/>
+          </a:prstGeom>
+          <a:ln>
+            <a:tailEnd type="triangle"/>
+          </a:ln>
+        </p:spPr>
+        <p:style>
+          <a:lnRef idx="1">
+            <a:schemeClr val="accent1"/>
+          </a:lnRef>
+          <a:fillRef idx="0">
+            <a:schemeClr val="accent1"/>
+          </a:fillRef>
+          <a:effectRef idx="0">
+            <a:schemeClr val="accent1"/>
+          </a:effectRef>
+          <a:fontRef idx="minor">
+            <a:schemeClr val="tx1"/>
+          </a:fontRef>
+        </p:style>
+      </p:cxnSp>
+      <p:graphicFrame>
+        <p:nvGraphicFramePr>
+          <p:cNvPr id="35" name="Table 34"/>
+          <p:cNvGraphicFramePr>
+            <a:graphicFrameLocks noGrp="1"/>
+          </p:cNvGraphicFramePr>
+          <p:nvPr>
+            <p:extLst>
+              <p:ext uri="{D42A27DB-BD31-4B8C-83A1-F6EECF244321}">
+                <p14:modId xmlns:p14="http://schemas.microsoft.com/office/powerpoint/2010/main" val="1208308774"/>
+              </p:ext>
+            </p:extLst>
+          </p:nvPr>
+        </p:nvGraphicFramePr>
+        <p:xfrm>
+          <a:off x="2071081" y="3488268"/>
+          <a:ext cx="1732068" cy="777240"/>
+        </p:xfrm>
+        <a:graphic>
+          <a:graphicData uri="http://schemas.openxmlformats.org/drawingml/2006/table">
+            <a:tbl>
+              <a:tblPr firstRow="1" bandRow="1">
+                <a:tableStyleId>{5C22544A-7EE6-4342-B048-85BDC9FD1C3A}</a:tableStyleId>
+              </a:tblPr>
+              <a:tblGrid>
+                <a:gridCol w="866034"/>
+                <a:gridCol w="866034"/>
+              </a:tblGrid>
+              <a:tr h="235283">
+                <a:tc gridSpan="2">
+                  <a:txBody>
+                    <a:bodyPr/>
+                    <a:lstStyle/>
+                    <a:p>
+                      <a:pPr algn="ctr"/>
+                      <a:r>
+                        <a:rPr lang="en-AU" sz="1100" dirty="0" err="1" smtClean="0"/>
+                        <a:t>RuleHasAction</a:t>
+                      </a:r>
+                      <a:endParaRPr lang="en-AU" sz="1100" dirty="0"/>
+                    </a:p>
+                  </a:txBody>
+                  <a:tcPr/>
+                </a:tc>
+                <a:tc hMerge="1">
+                  <a:txBody>
+                    <a:bodyPr/>
+                    <a:lstStyle/>
+                    <a:p>
+                      <a:endParaRPr lang="en-AU" sz="1100" dirty="0"/>
+                    </a:p>
+                  </a:txBody>
+                  <a:tcPr/>
+                </a:tc>
+              </a:tr>
+              <a:tr h="153892">
+                <a:tc>
+                  <a:txBody>
+                    <a:bodyPr/>
+                    <a:lstStyle/>
+                    <a:p>
+                      <a:r>
+                        <a:rPr lang="en-AU" sz="1100" b="1" i="1" dirty="0" err="1" smtClean="0"/>
+                        <a:t>rule_id</a:t>
+                      </a:r>
+                      <a:endParaRPr lang="en-AU" sz="1100" b="1" i="1" dirty="0"/>
+                    </a:p>
+                  </a:txBody>
+                  <a:tcPr/>
+                </a:tc>
+                <a:tc>
+                  <a:txBody>
+                    <a:bodyPr/>
+                    <a:lstStyle/>
+                    <a:p>
+                      <a:r>
+                        <a:rPr lang="en-AU" sz="1100" b="1" i="1" dirty="0" err="1" smtClean="0"/>
+                        <a:t>int</a:t>
+                      </a:r>
+                      <a:endParaRPr lang="en-AU" sz="1100" b="1" i="1" dirty="0"/>
+                    </a:p>
+                  </a:txBody>
+                  <a:tcPr/>
+                </a:tc>
+              </a:tr>
+              <a:tr h="153892">
+                <a:tc>
+                  <a:txBody>
+                    <a:bodyPr/>
+                    <a:lstStyle/>
+                    <a:p>
+                      <a:r>
+                        <a:rPr lang="en-AU" sz="1100" b="1" i="1" dirty="0" smtClean="0"/>
+                        <a:t>action</a:t>
+                      </a:r>
+                      <a:endParaRPr lang="en-AU" sz="1100" b="1" i="1" dirty="0"/>
+                    </a:p>
+                  </a:txBody>
+                  <a:tcPr/>
+                </a:tc>
+                <a:tc>
+                  <a:txBody>
+                    <a:bodyPr/>
+                    <a:lstStyle/>
+                    <a:p>
+                      <a:r>
+                        <a:rPr lang="en-AU" sz="1100" b="1" i="1" dirty="0" err="1" smtClean="0"/>
+                        <a:t>int</a:t>
+                      </a:r>
+                      <a:endParaRPr lang="en-AU" sz="1100" b="1" i="1" dirty="0"/>
+                    </a:p>
+                  </a:txBody>
+                  <a:tcPr/>
+                </a:tc>
+              </a:tr>
+            </a:tbl>
+          </a:graphicData>
+        </a:graphic>
+      </p:graphicFrame>
+      <p:cxnSp>
+        <p:nvCxnSpPr>
+          <p:cNvPr id="37" name="Straight Arrow Connector 36"/>
+          <p:cNvCxnSpPr>
+            <a:stCxn id="35" idx="3"/>
+            <a:endCxn id="10" idx="1"/>
+          </p:cNvCxnSpPr>
+          <p:nvPr/>
+        </p:nvCxnSpPr>
+        <p:spPr>
+          <a:xfrm flipV="1">
+            <a:off x="3803149" y="3112185"/>
+            <a:ext cx="834324" cy="764703"/>
+          </a:xfrm>
+          <a:prstGeom prst="straightConnector1">
+            <a:avLst/>
+          </a:prstGeom>
+          <a:ln>
+            <a:tailEnd type="triangle"/>
+          </a:ln>
+        </p:spPr>
+        <p:style>
+          <a:lnRef idx="1">
+            <a:schemeClr val="accent1"/>
+          </a:lnRef>
+          <a:fillRef idx="0">
+            <a:schemeClr val="accent1"/>
+          </a:fillRef>
+          <a:effectRef idx="0">
+            <a:schemeClr val="accent1"/>
+          </a:effectRef>
+          <a:fontRef idx="minor">
+            <a:schemeClr val="tx1"/>
+          </a:fontRef>
+        </p:style>
+      </p:cxnSp>
+      <p:graphicFrame>
+        <p:nvGraphicFramePr>
+          <p:cNvPr id="38" name="Table 37"/>
+          <p:cNvGraphicFramePr>
+            <a:graphicFrameLocks noGrp="1"/>
+          </p:cNvGraphicFramePr>
+          <p:nvPr>
+            <p:extLst>
+              <p:ext uri="{D42A27DB-BD31-4B8C-83A1-F6EECF244321}">
+                <p14:modId xmlns:p14="http://schemas.microsoft.com/office/powerpoint/2010/main" val="1975689443"/>
+              </p:ext>
+            </p:extLst>
+          </p:nvPr>
+        </p:nvGraphicFramePr>
+        <p:xfrm>
+          <a:off x="4467593" y="4289614"/>
+          <a:ext cx="1597812" cy="944880"/>
+        </p:xfrm>
+        <a:graphic>
+          <a:graphicData uri="http://schemas.openxmlformats.org/drawingml/2006/table">
+            <a:tbl>
+              <a:tblPr firstRow="1" bandRow="1">
+                <a:tableStyleId>{5C22544A-7EE6-4342-B048-85BDC9FD1C3A}</a:tableStyleId>
+              </a:tblPr>
+              <a:tblGrid>
+                <a:gridCol w="798906"/>
+                <a:gridCol w="798906"/>
+              </a:tblGrid>
+              <a:tr h="177442">
+                <a:tc gridSpan="2">
+                  <a:txBody>
+                    <a:bodyPr/>
+                    <a:lstStyle/>
+                    <a:p>
+                      <a:pPr algn="ctr"/>
+                      <a:r>
+                        <a:rPr lang="en-AU" sz="1100" dirty="0" smtClean="0"/>
+                        <a:t>Action</a:t>
+                      </a:r>
+                      <a:endParaRPr lang="en-AU" sz="1100" dirty="0"/>
+                    </a:p>
+                  </a:txBody>
+                  <a:tcPr/>
+                </a:tc>
+                <a:tc hMerge="1">
+                  <a:txBody>
+                    <a:bodyPr/>
+                    <a:lstStyle/>
+                    <a:p>
+                      <a:pPr algn="l"/>
+                      <a:endParaRPr lang="en-AU" sz="1100" dirty="0"/>
+                    </a:p>
+                  </a:txBody>
+                  <a:tcPr/>
+                </a:tc>
+              </a:tr>
+              <a:tr h="177442">
+                <a:tc>
+                  <a:txBody>
+                    <a:bodyPr/>
+                    <a:lstStyle/>
+                    <a:p>
+                      <a:pPr algn="l"/>
+                      <a:r>
+                        <a:rPr lang="en-AU" sz="1100" b="1" dirty="0" smtClean="0"/>
+                        <a:t>type</a:t>
+                      </a:r>
+                      <a:endParaRPr lang="en-AU" sz="1100" b="1" dirty="0"/>
+                    </a:p>
+                  </a:txBody>
+                  <a:tcPr/>
+                </a:tc>
+                <a:tc>
+                  <a:txBody>
+                    <a:bodyPr/>
+                    <a:lstStyle/>
+                    <a:p>
+                      <a:pPr algn="l"/>
+                      <a:r>
+                        <a:rPr lang="en-AU" sz="1100" b="1" dirty="0" smtClean="0"/>
+                        <a:t>text</a:t>
+                      </a:r>
+                      <a:endParaRPr lang="en-AU" sz="1100" b="1" dirty="0"/>
+                    </a:p>
+                  </a:txBody>
+                  <a:tcPr/>
+                </a:tc>
+              </a:tr>
+              <a:tr h="177442">
+                <a:tc gridSpan="2">
+                  <a:txBody>
+                    <a:bodyPr/>
+                    <a:lstStyle/>
+                    <a:p>
+                      <a:pPr algn="l"/>
+                      <a:r>
+                        <a:rPr lang="en-AU" sz="1100" dirty="0" smtClean="0"/>
+                        <a:t>preloaded with actions (there are a lot)</a:t>
+                      </a:r>
+                      <a:endParaRPr lang="en-AU" sz="1100" dirty="0"/>
+                    </a:p>
+                  </a:txBody>
+                  <a:tcPr/>
+                </a:tc>
+                <a:tc hMerge="1">
+                  <a:txBody>
+                    <a:bodyPr/>
+                    <a:lstStyle/>
+                    <a:p>
+                      <a:pPr algn="l"/>
+                      <a:endParaRPr lang="en-AU" sz="1100" dirty="0"/>
+                    </a:p>
+                  </a:txBody>
+                  <a:tcPr/>
+                </a:tc>
+              </a:tr>
+            </a:tbl>
+          </a:graphicData>
+        </a:graphic>
+      </p:graphicFrame>
+      <p:cxnSp>
+        <p:nvCxnSpPr>
+          <p:cNvPr id="40" name="Straight Arrow Connector 39"/>
+          <p:cNvCxnSpPr/>
+          <p:nvPr/>
+        </p:nvCxnSpPr>
+        <p:spPr>
+          <a:xfrm>
+            <a:off x="3791705" y="4118925"/>
+            <a:ext cx="675888" cy="529279"/>
+          </a:xfrm>
+          <a:prstGeom prst="straightConnector1">
+            <a:avLst/>
+          </a:prstGeom>
+          <a:ln>
+            <a:tailEnd type="triangle"/>
+          </a:ln>
+        </p:spPr>
+        <p:style>
+          <a:lnRef idx="1">
+            <a:schemeClr val="accent1"/>
+          </a:lnRef>
+          <a:fillRef idx="0">
+            <a:schemeClr val="accent1"/>
+          </a:fillRef>
+          <a:effectRef idx="0">
+            <a:schemeClr val="accent1"/>
+          </a:effectRef>
+          <a:fontRef idx="minor">
+            <a:schemeClr val="tx1"/>
+          </a:fontRef>
+        </p:style>
+      </p:cxnSp>
+      <p:cxnSp>
+        <p:nvCxnSpPr>
+          <p:cNvPr id="45" name="Straight Connector 44"/>
+          <p:cNvCxnSpPr/>
+          <p:nvPr/>
+        </p:nvCxnSpPr>
+        <p:spPr>
+          <a:xfrm>
+            <a:off x="11537474" y="2063881"/>
+            <a:ext cx="349728" cy="0"/>
+          </a:xfrm>
+          <a:prstGeom prst="line">
+            <a:avLst/>
+          </a:prstGeom>
+        </p:spPr>
+        <p:style>
+          <a:lnRef idx="1">
+            <a:schemeClr val="accent1"/>
+          </a:lnRef>
+          <a:fillRef idx="0">
+            <a:schemeClr val="accent1"/>
+          </a:fillRef>
+          <a:effectRef idx="0">
+            <a:schemeClr val="accent1"/>
+          </a:effectRef>
+          <a:fontRef idx="minor">
+            <a:schemeClr val="tx1"/>
+          </a:fontRef>
+        </p:style>
+      </p:cxnSp>
+      <p:cxnSp>
+        <p:nvCxnSpPr>
+          <p:cNvPr id="49" name="Straight Connector 48"/>
+          <p:cNvCxnSpPr/>
+          <p:nvPr/>
+        </p:nvCxnSpPr>
+        <p:spPr>
+          <a:xfrm>
+            <a:off x="11887202" y="2063881"/>
+            <a:ext cx="0" cy="777240"/>
+          </a:xfrm>
+          <a:prstGeom prst="line">
+            <a:avLst/>
+          </a:prstGeom>
+        </p:spPr>
+        <p:style>
+          <a:lnRef idx="1">
+            <a:schemeClr val="accent1"/>
+          </a:lnRef>
+          <a:fillRef idx="0">
+            <a:schemeClr val="accent1"/>
+          </a:fillRef>
+          <a:effectRef idx="0">
+            <a:schemeClr val="accent1"/>
+          </a:effectRef>
+          <a:fontRef idx="minor">
+            <a:schemeClr val="tx1"/>
+          </a:fontRef>
+        </p:style>
+      </p:cxnSp>
+      <p:cxnSp>
+        <p:nvCxnSpPr>
+          <p:cNvPr id="51" name="Straight Arrow Connector 50"/>
+          <p:cNvCxnSpPr/>
+          <p:nvPr/>
+        </p:nvCxnSpPr>
+        <p:spPr>
+          <a:xfrm flipH="1">
+            <a:off x="11537474" y="2841121"/>
+            <a:ext cx="349728" cy="0"/>
+          </a:xfrm>
+          <a:prstGeom prst="straightConnector1">
+            <a:avLst/>
+          </a:prstGeom>
+          <a:ln>
+            <a:tailEnd type="triangle"/>
+          </a:ln>
+        </p:spPr>
+        <p:style>
+          <a:lnRef idx="1">
+            <a:schemeClr val="accent1"/>
+          </a:lnRef>
+          <a:fillRef idx="0">
+            <a:schemeClr val="accent1"/>
+          </a:fillRef>
+          <a:effectRef idx="0">
+            <a:schemeClr val="accent1"/>
+          </a:effectRef>
+          <a:fontRef idx="minor">
+            <a:schemeClr val="tx1"/>
+          </a:fontRef>
+        </p:style>
+      </p:cxnSp>
+      <p:graphicFrame>
+        <p:nvGraphicFramePr>
+          <p:cNvPr id="53" name="Table 52"/>
+          <p:cNvGraphicFramePr>
+            <a:graphicFrameLocks noGrp="1"/>
+          </p:cNvGraphicFramePr>
+          <p:nvPr>
+            <p:extLst>
+              <p:ext uri="{D42A27DB-BD31-4B8C-83A1-F6EECF244321}">
+                <p14:modId xmlns:p14="http://schemas.microsoft.com/office/powerpoint/2010/main" val="861548680"/>
+              </p:ext>
+            </p:extLst>
+          </p:nvPr>
+        </p:nvGraphicFramePr>
+        <p:xfrm>
+          <a:off x="4556333" y="1401599"/>
+          <a:ext cx="1029196" cy="777240"/>
+        </p:xfrm>
+        <a:graphic>
+          <a:graphicData uri="http://schemas.openxmlformats.org/drawingml/2006/table">
+            <a:tbl>
+              <a:tblPr firstRow="1" bandRow="1">
+                <a:tableStyleId>{5C22544A-7EE6-4342-B048-85BDC9FD1C3A}</a:tableStyleId>
+              </a:tblPr>
+              <a:tblGrid>
+                <a:gridCol w="460102"/>
+                <a:gridCol w="569094"/>
+              </a:tblGrid>
+              <a:tr h="227008">
+                <a:tc gridSpan="2">
+                  <a:txBody>
+                    <a:bodyPr/>
+                    <a:lstStyle/>
+                    <a:p>
+                      <a:pPr algn="ctr"/>
+                      <a:r>
+                        <a:rPr lang="en-AU" sz="1100" dirty="0" smtClean="0"/>
+                        <a:t>Party</a:t>
+                      </a:r>
+                      <a:endParaRPr lang="en-AU" sz="1100" dirty="0"/>
+                    </a:p>
+                  </a:txBody>
+                  <a:tcPr/>
+                </a:tc>
+                <a:tc hMerge="1">
+                  <a:txBody>
+                    <a:bodyPr/>
+                    <a:lstStyle/>
+                    <a:p>
+                      <a:endParaRPr lang="en-AU" dirty="0"/>
+                    </a:p>
+                  </a:txBody>
+                  <a:tcPr/>
+                </a:tc>
+              </a:tr>
+              <a:tr h="232449">
+                <a:tc>
+                  <a:txBody>
+                    <a:bodyPr/>
+                    <a:lstStyle/>
+                    <a:p>
+                      <a:r>
+                        <a:rPr lang="en-AU" sz="1100" b="1" dirty="0" smtClean="0"/>
+                        <a:t>id</a:t>
+                      </a:r>
+                      <a:endParaRPr lang="en-AU" sz="1100" b="1" dirty="0"/>
+                    </a:p>
+                  </a:txBody>
+                  <a:tcPr/>
+                </a:tc>
+                <a:tc>
+                  <a:txBody>
+                    <a:bodyPr/>
+                    <a:lstStyle/>
+                    <a:p>
+                      <a:r>
+                        <a:rPr lang="en-AU" sz="1100" b="1" dirty="0" err="1" smtClean="0"/>
+                        <a:t>int</a:t>
+                      </a:r>
+                      <a:endParaRPr lang="en-AU" sz="1100" b="1" dirty="0"/>
+                    </a:p>
+                  </a:txBody>
+                  <a:tcPr/>
+                </a:tc>
+              </a:tr>
+              <a:tr h="232449">
+                <a:tc>
+                  <a:txBody>
+                    <a:bodyPr/>
+                    <a:lstStyle/>
+                    <a:p>
+                      <a:r>
+                        <a:rPr lang="en-AU" sz="1100" dirty="0" err="1" smtClean="0"/>
+                        <a:t>uri</a:t>
+                      </a:r>
+                      <a:endParaRPr lang="en-AU" sz="1100" dirty="0"/>
+                    </a:p>
+                  </a:txBody>
+                  <a:tcPr/>
+                </a:tc>
+                <a:tc>
+                  <a:txBody>
+                    <a:bodyPr/>
+                    <a:lstStyle/>
+                    <a:p>
+                      <a:r>
+                        <a:rPr lang="en-AU" sz="1100" dirty="0" smtClean="0"/>
+                        <a:t>text</a:t>
+                      </a:r>
+                      <a:endParaRPr lang="en-AU" sz="1100" dirty="0"/>
+                    </a:p>
+                  </a:txBody>
+                  <a:tcPr/>
+                </a:tc>
+              </a:tr>
+            </a:tbl>
+          </a:graphicData>
+        </a:graphic>
+      </p:graphicFrame>
+      <p:graphicFrame>
+        <p:nvGraphicFramePr>
+          <p:cNvPr id="54" name="Table 53"/>
+          <p:cNvGraphicFramePr>
+            <a:graphicFrameLocks noGrp="1"/>
+          </p:cNvGraphicFramePr>
+          <p:nvPr>
+            <p:extLst>
+              <p:ext uri="{D42A27DB-BD31-4B8C-83A1-F6EECF244321}">
+                <p14:modId xmlns:p14="http://schemas.microsoft.com/office/powerpoint/2010/main" val="1393699291"/>
+              </p:ext>
+            </p:extLst>
+          </p:nvPr>
+        </p:nvGraphicFramePr>
+        <p:xfrm>
+          <a:off x="2152350" y="1412547"/>
+          <a:ext cx="1511302" cy="777240"/>
+        </p:xfrm>
+        <a:graphic>
+          <a:graphicData uri="http://schemas.openxmlformats.org/drawingml/2006/table">
+            <a:tbl>
+              <a:tblPr firstRow="1" bandRow="1">
+                <a:tableStyleId>{5C22544A-7EE6-4342-B048-85BDC9FD1C3A}</a:tableStyleId>
+              </a:tblPr>
+              <a:tblGrid>
+                <a:gridCol w="981366"/>
+                <a:gridCol w="529936"/>
+              </a:tblGrid>
+              <a:tr h="123793">
+                <a:tc gridSpan="2">
+                  <a:txBody>
+                    <a:bodyPr/>
+                    <a:lstStyle/>
+                    <a:p>
+                      <a:pPr algn="ctr"/>
+                      <a:r>
+                        <a:rPr lang="en-AU" sz="1100" dirty="0" err="1" smtClean="0"/>
+                        <a:t>RuleHasAssignor</a:t>
+                      </a:r>
+                      <a:endParaRPr lang="en-AU" sz="1100" dirty="0"/>
+                    </a:p>
+                  </a:txBody>
+                  <a:tcPr/>
+                </a:tc>
+                <a:tc hMerge="1">
+                  <a:txBody>
+                    <a:bodyPr/>
+                    <a:lstStyle/>
+                    <a:p>
+                      <a:endParaRPr lang="en-AU" sz="1100" dirty="0"/>
+                    </a:p>
+                  </a:txBody>
+                  <a:tcPr/>
+                </a:tc>
+              </a:tr>
+              <a:tr h="123793">
+                <a:tc>
+                  <a:txBody>
+                    <a:bodyPr/>
+                    <a:lstStyle/>
+                    <a:p>
+                      <a:r>
+                        <a:rPr lang="en-AU" sz="1100" dirty="0" err="1" smtClean="0"/>
+                        <a:t>party_id</a:t>
+                      </a:r>
+                      <a:endParaRPr lang="en-AU" sz="1100" dirty="0"/>
+                    </a:p>
+                  </a:txBody>
+                  <a:tcPr/>
+                </a:tc>
+                <a:tc>
+                  <a:txBody>
+                    <a:bodyPr/>
+                    <a:lstStyle/>
+                    <a:p>
+                      <a:r>
+                        <a:rPr lang="en-AU" sz="1100" dirty="0" err="1" smtClean="0"/>
+                        <a:t>int</a:t>
+                      </a:r>
+                      <a:endParaRPr lang="en-AU" sz="1100" dirty="0"/>
+                    </a:p>
+                  </a:txBody>
+                  <a:tcPr/>
+                </a:tc>
+              </a:tr>
+              <a:tr h="123793">
+                <a:tc>
+                  <a:txBody>
+                    <a:bodyPr/>
+                    <a:lstStyle/>
+                    <a:p>
+                      <a:r>
+                        <a:rPr lang="en-AU" sz="1100" dirty="0" err="1" smtClean="0"/>
+                        <a:t>rule_id</a:t>
+                      </a:r>
+                      <a:endParaRPr lang="en-AU" sz="1100" dirty="0"/>
+                    </a:p>
+                  </a:txBody>
+                  <a:tcPr/>
+                </a:tc>
+                <a:tc>
+                  <a:txBody>
+                    <a:bodyPr/>
+                    <a:lstStyle/>
+                    <a:p>
+                      <a:r>
+                        <a:rPr lang="en-AU" sz="1100" dirty="0" err="1" smtClean="0"/>
+                        <a:t>int</a:t>
+                      </a:r>
+                      <a:endParaRPr lang="en-AU" sz="1100" dirty="0"/>
+                    </a:p>
+                  </a:txBody>
+                  <a:tcPr/>
+                </a:tc>
+              </a:tr>
+            </a:tbl>
+          </a:graphicData>
+        </a:graphic>
+      </p:graphicFrame>
+      <p:graphicFrame>
+        <p:nvGraphicFramePr>
+          <p:cNvPr id="55" name="Table 54"/>
+          <p:cNvGraphicFramePr>
+            <a:graphicFrameLocks noGrp="1"/>
+          </p:cNvGraphicFramePr>
+          <p:nvPr>
+            <p:extLst>
+              <p:ext uri="{D42A27DB-BD31-4B8C-83A1-F6EECF244321}">
+                <p14:modId xmlns:p14="http://schemas.microsoft.com/office/powerpoint/2010/main" val="2314236767"/>
+              </p:ext>
+            </p:extLst>
+          </p:nvPr>
+        </p:nvGraphicFramePr>
+        <p:xfrm>
+          <a:off x="6706261" y="1378531"/>
+          <a:ext cx="1398652" cy="777240"/>
+        </p:xfrm>
+        <a:graphic>
+          <a:graphicData uri="http://schemas.openxmlformats.org/drawingml/2006/table">
+            <a:tbl>
+              <a:tblPr firstRow="1" bandRow="1">
+                <a:tableStyleId>{5C22544A-7EE6-4342-B048-85BDC9FD1C3A}</a:tableStyleId>
+              </a:tblPr>
+              <a:tblGrid>
+                <a:gridCol w="744025"/>
+                <a:gridCol w="654627"/>
+              </a:tblGrid>
+              <a:tr h="123793">
+                <a:tc gridSpan="2">
+                  <a:txBody>
+                    <a:bodyPr/>
+                    <a:lstStyle/>
+                    <a:p>
+                      <a:pPr algn="ctr"/>
+                      <a:r>
+                        <a:rPr lang="en-AU" sz="1100" dirty="0" err="1" smtClean="0"/>
+                        <a:t>RuleHasAssignee</a:t>
+                      </a:r>
+                      <a:endParaRPr lang="en-AU" sz="1100" dirty="0"/>
+                    </a:p>
+                  </a:txBody>
+                  <a:tcPr/>
+                </a:tc>
+                <a:tc hMerge="1">
+                  <a:txBody>
+                    <a:bodyPr/>
+                    <a:lstStyle/>
+                    <a:p>
+                      <a:endParaRPr lang="en-AU" sz="1100" dirty="0"/>
+                    </a:p>
+                  </a:txBody>
+                  <a:tcPr/>
+                </a:tc>
+              </a:tr>
+              <a:tr h="123793">
+                <a:tc>
+                  <a:txBody>
+                    <a:bodyPr/>
+                    <a:lstStyle/>
+                    <a:p>
+                      <a:r>
+                        <a:rPr lang="en-AU" sz="1100" dirty="0" err="1" smtClean="0"/>
+                        <a:t>party_id</a:t>
+                      </a:r>
+                      <a:endParaRPr lang="en-AU" sz="1100" dirty="0"/>
+                    </a:p>
+                  </a:txBody>
+                  <a:tcPr/>
+                </a:tc>
+                <a:tc>
+                  <a:txBody>
+                    <a:bodyPr/>
+                    <a:lstStyle/>
+                    <a:p>
+                      <a:r>
+                        <a:rPr lang="en-AU" sz="1100" dirty="0" err="1" smtClean="0"/>
+                        <a:t>int</a:t>
+                      </a:r>
+                      <a:endParaRPr lang="en-AU" sz="1100" dirty="0"/>
+                    </a:p>
+                  </a:txBody>
+                  <a:tcPr/>
+                </a:tc>
+              </a:tr>
+              <a:tr h="123793">
+                <a:tc>
+                  <a:txBody>
+                    <a:bodyPr/>
+                    <a:lstStyle/>
+                    <a:p>
+                      <a:r>
+                        <a:rPr lang="en-AU" sz="1100" dirty="0" err="1" smtClean="0"/>
+                        <a:t>rule_id</a:t>
+                      </a:r>
+                      <a:endParaRPr lang="en-AU" sz="1100" dirty="0"/>
+                    </a:p>
+                  </a:txBody>
+                  <a:tcPr/>
+                </a:tc>
+                <a:tc>
+                  <a:txBody>
+                    <a:bodyPr/>
+                    <a:lstStyle/>
+                    <a:p>
+                      <a:r>
+                        <a:rPr lang="en-AU" sz="1100" dirty="0" err="1" smtClean="0"/>
+                        <a:t>int</a:t>
+                      </a:r>
+                      <a:endParaRPr lang="en-AU" sz="1100" dirty="0"/>
+                    </a:p>
+                  </a:txBody>
+                  <a:tcPr/>
+                </a:tc>
+              </a:tr>
+            </a:tbl>
+          </a:graphicData>
+        </a:graphic>
+      </p:graphicFrame>
+      <p:cxnSp>
+        <p:nvCxnSpPr>
+          <p:cNvPr id="61" name="Straight Arrow Connector 60"/>
+          <p:cNvCxnSpPr>
+            <a:endCxn id="10" idx="1"/>
+          </p:cNvCxnSpPr>
+          <p:nvPr/>
+        </p:nvCxnSpPr>
+        <p:spPr>
+          <a:xfrm>
+            <a:off x="3663652" y="2063881"/>
+            <a:ext cx="973821" cy="1048304"/>
+          </a:xfrm>
+          <a:prstGeom prst="straightConnector1">
+            <a:avLst/>
+          </a:prstGeom>
+          <a:ln>
+            <a:tailEnd type="triangle"/>
+          </a:ln>
+        </p:spPr>
+        <p:style>
+          <a:lnRef idx="1">
+            <a:schemeClr val="accent1"/>
+          </a:lnRef>
+          <a:fillRef idx="0">
+            <a:schemeClr val="accent1"/>
+          </a:fillRef>
+          <a:effectRef idx="0">
+            <a:schemeClr val="accent1"/>
+          </a:effectRef>
+          <a:fontRef idx="minor">
+            <a:schemeClr val="tx1"/>
+          </a:fontRef>
+        </p:style>
+      </p:cxnSp>
+      <p:cxnSp>
+        <p:nvCxnSpPr>
+          <p:cNvPr id="63" name="Straight Arrow Connector 62"/>
+          <p:cNvCxnSpPr>
+            <a:stCxn id="54" idx="3"/>
+            <a:endCxn id="53" idx="1"/>
+          </p:cNvCxnSpPr>
+          <p:nvPr/>
+        </p:nvCxnSpPr>
+        <p:spPr>
+          <a:xfrm flipV="1">
+            <a:off x="3663652" y="1790219"/>
+            <a:ext cx="892681" cy="10948"/>
+          </a:xfrm>
+          <a:prstGeom prst="straightConnector1">
+            <a:avLst/>
+          </a:prstGeom>
+          <a:ln>
+            <a:tailEnd type="triangle"/>
+          </a:ln>
+        </p:spPr>
+        <p:style>
+          <a:lnRef idx="1">
+            <a:schemeClr val="accent1"/>
+          </a:lnRef>
+          <a:fillRef idx="0">
+            <a:schemeClr val="accent1"/>
+          </a:fillRef>
+          <a:effectRef idx="0">
+            <a:schemeClr val="accent1"/>
+          </a:effectRef>
+          <a:fontRef idx="minor">
+            <a:schemeClr val="tx1"/>
+          </a:fontRef>
+        </p:style>
+      </p:cxnSp>
+      <p:cxnSp>
+        <p:nvCxnSpPr>
+          <p:cNvPr id="65" name="Straight Arrow Connector 64"/>
+          <p:cNvCxnSpPr/>
+          <p:nvPr/>
+        </p:nvCxnSpPr>
+        <p:spPr>
+          <a:xfrm flipH="1">
+            <a:off x="5758205" y="2022735"/>
+            <a:ext cx="948056" cy="969847"/>
+          </a:xfrm>
+          <a:prstGeom prst="straightConnector1">
+            <a:avLst/>
+          </a:prstGeom>
+          <a:ln>
+            <a:tailEnd type="triangle"/>
+          </a:ln>
+        </p:spPr>
+        <p:style>
+          <a:lnRef idx="1">
+            <a:schemeClr val="accent1"/>
+          </a:lnRef>
+          <a:fillRef idx="0">
+            <a:schemeClr val="accent1"/>
+          </a:fillRef>
+          <a:effectRef idx="0">
+            <a:schemeClr val="accent1"/>
+          </a:effectRef>
+          <a:fontRef idx="minor">
+            <a:schemeClr val="tx1"/>
+          </a:fontRef>
+        </p:style>
+      </p:cxnSp>
+      <p:cxnSp>
+        <p:nvCxnSpPr>
+          <p:cNvPr id="67" name="Straight Arrow Connector 66"/>
+          <p:cNvCxnSpPr>
+            <a:stCxn id="55" idx="1"/>
+            <a:endCxn id="53" idx="3"/>
+          </p:cNvCxnSpPr>
+          <p:nvPr/>
+        </p:nvCxnSpPr>
+        <p:spPr>
+          <a:xfrm flipH="1">
+            <a:off x="5585529" y="1767151"/>
+            <a:ext cx="1120732" cy="23068"/>
+          </a:xfrm>
+          <a:prstGeom prst="straightConnector1">
+            <a:avLst/>
+          </a:prstGeom>
+          <a:ln>
+            <a:tailEnd type="triangle"/>
+          </a:ln>
+        </p:spPr>
+        <p:style>
+          <a:lnRef idx="1">
+            <a:schemeClr val="accent1"/>
+          </a:lnRef>
+          <a:fillRef idx="0">
+            <a:schemeClr val="accent1"/>
+          </a:fillRef>
+          <a:effectRef idx="0">
+            <a:schemeClr val="accent1"/>
+          </a:effectRef>
+          <a:fontRef idx="minor">
+            <a:schemeClr val="tx1"/>
+          </a:fontRef>
+        </p:style>
+      </p:cxnSp>
+      <p:sp>
+        <p:nvSpPr>
+          <p:cNvPr id="80" name="TextBox 79"/>
+          <p:cNvSpPr txBox="1"/>
+          <p:nvPr/>
+        </p:nvSpPr>
+        <p:spPr>
+          <a:xfrm>
+            <a:off x="696191" y="4762054"/>
+            <a:ext cx="1456159" cy="1169551"/>
+          </a:xfrm>
+          <a:prstGeom prst="rect">
+            <a:avLst/>
+          </a:prstGeom>
+          <a:noFill/>
+        </p:spPr>
+        <p:txBody>
+          <a:bodyPr wrap="square" rtlCol="0">
+            <a:spAutoFit/>
+          </a:bodyPr>
+          <a:lstStyle/>
+          <a:p>
+            <a:r>
+              <a:rPr lang="en-AU" sz="1400" b="1" dirty="0" smtClean="0"/>
+              <a:t>Primary key</a:t>
+            </a:r>
+          </a:p>
+          <a:p>
+            <a:r>
+              <a:rPr lang="en-AU" sz="1400" i="1" dirty="0" smtClean="0"/>
+              <a:t>Foreign key</a:t>
+            </a:r>
+          </a:p>
+          <a:p>
+            <a:endParaRPr lang="en-AU" sz="1400" i="1" dirty="0" smtClean="0"/>
+          </a:p>
+          <a:p>
+            <a:r>
+              <a:rPr lang="en-AU" sz="1400" dirty="0" smtClean="0"/>
+              <a:t>Foreign key reference</a:t>
+            </a:r>
+            <a:endParaRPr lang="en-AU" sz="1400" dirty="0"/>
+          </a:p>
+        </p:txBody>
+      </p:sp>
+      <p:cxnSp>
+        <p:nvCxnSpPr>
+          <p:cNvPr id="82" name="Straight Arrow Connector 81"/>
+          <p:cNvCxnSpPr/>
+          <p:nvPr/>
+        </p:nvCxnSpPr>
+        <p:spPr>
+          <a:xfrm>
+            <a:off x="1747104" y="5666972"/>
+            <a:ext cx="810491" cy="0"/>
+          </a:xfrm>
+          <a:prstGeom prst="straightConnector1">
+            <a:avLst/>
+          </a:prstGeom>
+          <a:ln>
+            <a:tailEnd type="triangle"/>
+          </a:ln>
+        </p:spPr>
+        <p:style>
+          <a:lnRef idx="1">
+            <a:schemeClr val="accent1"/>
+          </a:lnRef>
+          <a:fillRef idx="0">
+            <a:schemeClr val="accent1"/>
+          </a:fillRef>
+          <a:effectRef idx="0">
+            <a:schemeClr val="accent1"/>
+          </a:effectRef>
+          <a:fontRef idx="minor">
+            <a:schemeClr val="tx1"/>
+          </a:fontRef>
+        </p:style>
+      </p:cxnSp>
+    </p:spTree>
+    <p:extLst>
+      <p:ext uri="{BB962C8B-B14F-4D97-AF65-F5344CB8AC3E}">
+        <p14:creationId xmlns:p14="http://schemas.microsoft.com/office/powerpoint/2010/main" val="2009638835"/>
       </p:ext>
     </p:extLst>
   </p:cSld>

</xml_diff>

<commit_message>
Added create_database.py for database setup Updated database schema diagram
</commit_message>
<xml_diff>
--- a/_docs/DataModel.pptx
+++ b/_docs/DataModel.pptx
@@ -135,7 +135,7 @@
           <p:cNvPr id="2" name="Title 1">
             <a:extLst>
               <a:ext uri="{FF2B5EF4-FFF2-40B4-BE49-F238E27FC236}">
-                <a16:creationId xmlns:a16="http://schemas.microsoft.com/office/drawing/2014/main" xmlns="" id="{7812FAD9-B738-4E2B-A9F3-7D6DA8649C7B}"/>
+                <a16:creationId xmlns="" xmlns:a16="http://schemas.microsoft.com/office/drawing/2014/main" id="{7812FAD9-B738-4E2B-A9F3-7D6DA8649C7B}"/>
               </a:ext>
             </a:extLst>
           </p:cNvPr>
@@ -173,7 +173,7 @@
           <p:cNvPr id="3" name="Subtitle 2">
             <a:extLst>
               <a:ext uri="{FF2B5EF4-FFF2-40B4-BE49-F238E27FC236}">
-                <a16:creationId xmlns:a16="http://schemas.microsoft.com/office/drawing/2014/main" xmlns="" id="{CED3ABCF-AD94-42E3-95E2-D5E653DEF63F}"/>
+                <a16:creationId xmlns="" xmlns:a16="http://schemas.microsoft.com/office/drawing/2014/main" id="{CED3ABCF-AD94-42E3-95E2-D5E653DEF63F}"/>
               </a:ext>
             </a:extLst>
           </p:cNvPr>
@@ -244,7 +244,7 @@
           <p:cNvPr id="4" name="Date Placeholder 3">
             <a:extLst>
               <a:ext uri="{FF2B5EF4-FFF2-40B4-BE49-F238E27FC236}">
-                <a16:creationId xmlns:a16="http://schemas.microsoft.com/office/drawing/2014/main" xmlns="" id="{5AB92BAC-2DD4-42CE-9065-E2518728CD65}"/>
+                <a16:creationId xmlns="" xmlns:a16="http://schemas.microsoft.com/office/drawing/2014/main" id="{5AB92BAC-2DD4-42CE-9065-E2518728CD65}"/>
               </a:ext>
             </a:extLst>
           </p:cNvPr>
@@ -262,7 +262,7 @@
           <a:p>
             <a:fld id="{2F956D3E-0B91-471C-9743-3F865EE6F573}" type="datetimeFigureOut">
               <a:rPr lang="en-AU" smtClean="0"/>
-              <a:t>1/08/2018</a:t>
+              <a:t>2/08/2018</a:t>
             </a:fld>
             <a:endParaRPr lang="en-AU"/>
           </a:p>
@@ -273,7 +273,7 @@
           <p:cNvPr id="5" name="Footer Placeholder 4">
             <a:extLst>
               <a:ext uri="{FF2B5EF4-FFF2-40B4-BE49-F238E27FC236}">
-                <a16:creationId xmlns:a16="http://schemas.microsoft.com/office/drawing/2014/main" xmlns="" id="{137C3D4C-B868-4F83-8919-AE7F2500E437}"/>
+                <a16:creationId xmlns="" xmlns:a16="http://schemas.microsoft.com/office/drawing/2014/main" id="{137C3D4C-B868-4F83-8919-AE7F2500E437}"/>
               </a:ext>
             </a:extLst>
           </p:cNvPr>
@@ -298,7 +298,7 @@
           <p:cNvPr id="6" name="Slide Number Placeholder 5">
             <a:extLst>
               <a:ext uri="{FF2B5EF4-FFF2-40B4-BE49-F238E27FC236}">
-                <a16:creationId xmlns:a16="http://schemas.microsoft.com/office/drawing/2014/main" xmlns="" id="{ABBB53F0-83D7-42D4-90A5-7D5EE7C0AAD3}"/>
+                <a16:creationId xmlns="" xmlns:a16="http://schemas.microsoft.com/office/drawing/2014/main" id="{ABBB53F0-83D7-42D4-90A5-7D5EE7C0AAD3}"/>
               </a:ext>
             </a:extLst>
           </p:cNvPr>
@@ -357,7 +357,7 @@
           <p:cNvPr id="2" name="Title 1">
             <a:extLst>
               <a:ext uri="{FF2B5EF4-FFF2-40B4-BE49-F238E27FC236}">
-                <a16:creationId xmlns:a16="http://schemas.microsoft.com/office/drawing/2014/main" xmlns="" id="{EDEAE3B1-565C-4AD8-A67C-7D2C44ECA18D}"/>
+                <a16:creationId xmlns="" xmlns:a16="http://schemas.microsoft.com/office/drawing/2014/main" id="{EDEAE3B1-565C-4AD8-A67C-7D2C44ECA18D}"/>
               </a:ext>
             </a:extLst>
           </p:cNvPr>
@@ -386,7 +386,7 @@
           <p:cNvPr id="3" name="Vertical Text Placeholder 2">
             <a:extLst>
               <a:ext uri="{FF2B5EF4-FFF2-40B4-BE49-F238E27FC236}">
-                <a16:creationId xmlns:a16="http://schemas.microsoft.com/office/drawing/2014/main" xmlns="" id="{89499874-28E0-4013-933C-7A7F4857D944}"/>
+                <a16:creationId xmlns="" xmlns:a16="http://schemas.microsoft.com/office/drawing/2014/main" id="{89499874-28E0-4013-933C-7A7F4857D944}"/>
               </a:ext>
             </a:extLst>
           </p:cNvPr>
@@ -444,7 +444,7 @@
           <p:cNvPr id="4" name="Date Placeholder 3">
             <a:extLst>
               <a:ext uri="{FF2B5EF4-FFF2-40B4-BE49-F238E27FC236}">
-                <a16:creationId xmlns:a16="http://schemas.microsoft.com/office/drawing/2014/main" xmlns="" id="{30B68540-FC47-4085-8638-DE11BCE14D7E}"/>
+                <a16:creationId xmlns="" xmlns:a16="http://schemas.microsoft.com/office/drawing/2014/main" id="{30B68540-FC47-4085-8638-DE11BCE14D7E}"/>
               </a:ext>
             </a:extLst>
           </p:cNvPr>
@@ -462,7 +462,7 @@
           <a:p>
             <a:fld id="{2F956D3E-0B91-471C-9743-3F865EE6F573}" type="datetimeFigureOut">
               <a:rPr lang="en-AU" smtClean="0"/>
-              <a:t>1/08/2018</a:t>
+              <a:t>2/08/2018</a:t>
             </a:fld>
             <a:endParaRPr lang="en-AU"/>
           </a:p>
@@ -473,7 +473,7 @@
           <p:cNvPr id="5" name="Footer Placeholder 4">
             <a:extLst>
               <a:ext uri="{FF2B5EF4-FFF2-40B4-BE49-F238E27FC236}">
-                <a16:creationId xmlns:a16="http://schemas.microsoft.com/office/drawing/2014/main" xmlns="" id="{149BDF69-9D0A-4871-B742-85D1C27ACA21}"/>
+                <a16:creationId xmlns="" xmlns:a16="http://schemas.microsoft.com/office/drawing/2014/main" id="{149BDF69-9D0A-4871-B742-85D1C27ACA21}"/>
               </a:ext>
             </a:extLst>
           </p:cNvPr>
@@ -498,7 +498,7 @@
           <p:cNvPr id="6" name="Slide Number Placeholder 5">
             <a:extLst>
               <a:ext uri="{FF2B5EF4-FFF2-40B4-BE49-F238E27FC236}">
-                <a16:creationId xmlns:a16="http://schemas.microsoft.com/office/drawing/2014/main" xmlns="" id="{BAC96E6A-25E9-4A3D-BDE5-E881314DE0D7}"/>
+                <a16:creationId xmlns="" xmlns:a16="http://schemas.microsoft.com/office/drawing/2014/main" id="{BAC96E6A-25E9-4A3D-BDE5-E881314DE0D7}"/>
               </a:ext>
             </a:extLst>
           </p:cNvPr>
@@ -557,7 +557,7 @@
           <p:cNvPr id="2" name="Vertical Title 1">
             <a:extLst>
               <a:ext uri="{FF2B5EF4-FFF2-40B4-BE49-F238E27FC236}">
-                <a16:creationId xmlns:a16="http://schemas.microsoft.com/office/drawing/2014/main" xmlns="" id="{8BD4BC0C-9CFC-4FB2-B5C6-6EEC1B7F772D}"/>
+                <a16:creationId xmlns="" xmlns:a16="http://schemas.microsoft.com/office/drawing/2014/main" id="{8BD4BC0C-9CFC-4FB2-B5C6-6EEC1B7F772D}"/>
               </a:ext>
             </a:extLst>
           </p:cNvPr>
@@ -591,7 +591,7 @@
           <p:cNvPr id="3" name="Vertical Text Placeholder 2">
             <a:extLst>
               <a:ext uri="{FF2B5EF4-FFF2-40B4-BE49-F238E27FC236}">
-                <a16:creationId xmlns:a16="http://schemas.microsoft.com/office/drawing/2014/main" xmlns="" id="{5CF7FA3D-9ABB-49C7-AF65-E0869B2150C9}"/>
+                <a16:creationId xmlns="" xmlns:a16="http://schemas.microsoft.com/office/drawing/2014/main" id="{5CF7FA3D-9ABB-49C7-AF65-E0869B2150C9}"/>
               </a:ext>
             </a:extLst>
           </p:cNvPr>
@@ -654,7 +654,7 @@
           <p:cNvPr id="4" name="Date Placeholder 3">
             <a:extLst>
               <a:ext uri="{FF2B5EF4-FFF2-40B4-BE49-F238E27FC236}">
-                <a16:creationId xmlns:a16="http://schemas.microsoft.com/office/drawing/2014/main" xmlns="" id="{FBF00D9E-50E5-4276-BC40-27125BC1B69A}"/>
+                <a16:creationId xmlns="" xmlns:a16="http://schemas.microsoft.com/office/drawing/2014/main" id="{FBF00D9E-50E5-4276-BC40-27125BC1B69A}"/>
               </a:ext>
             </a:extLst>
           </p:cNvPr>
@@ -672,7 +672,7 @@
           <a:p>
             <a:fld id="{2F956D3E-0B91-471C-9743-3F865EE6F573}" type="datetimeFigureOut">
               <a:rPr lang="en-AU" smtClean="0"/>
-              <a:t>1/08/2018</a:t>
+              <a:t>2/08/2018</a:t>
             </a:fld>
             <a:endParaRPr lang="en-AU"/>
           </a:p>
@@ -683,7 +683,7 @@
           <p:cNvPr id="5" name="Footer Placeholder 4">
             <a:extLst>
               <a:ext uri="{FF2B5EF4-FFF2-40B4-BE49-F238E27FC236}">
-                <a16:creationId xmlns:a16="http://schemas.microsoft.com/office/drawing/2014/main" xmlns="" id="{3AA20A04-EE64-4C85-A4C3-C674E216B21E}"/>
+                <a16:creationId xmlns="" xmlns:a16="http://schemas.microsoft.com/office/drawing/2014/main" id="{3AA20A04-EE64-4C85-A4C3-C674E216B21E}"/>
               </a:ext>
             </a:extLst>
           </p:cNvPr>
@@ -708,7 +708,7 @@
           <p:cNvPr id="6" name="Slide Number Placeholder 5">
             <a:extLst>
               <a:ext uri="{FF2B5EF4-FFF2-40B4-BE49-F238E27FC236}">
-                <a16:creationId xmlns:a16="http://schemas.microsoft.com/office/drawing/2014/main" xmlns="" id="{0F34C053-3886-4674-85D6-13CCCB876AEC}"/>
+                <a16:creationId xmlns="" xmlns:a16="http://schemas.microsoft.com/office/drawing/2014/main" id="{0F34C053-3886-4674-85D6-13CCCB876AEC}"/>
               </a:ext>
             </a:extLst>
           </p:cNvPr>
@@ -767,7 +767,7 @@
           <p:cNvPr id="2" name="Title 1">
             <a:extLst>
               <a:ext uri="{FF2B5EF4-FFF2-40B4-BE49-F238E27FC236}">
-                <a16:creationId xmlns:a16="http://schemas.microsoft.com/office/drawing/2014/main" xmlns="" id="{6D70D093-F0D3-479C-B65D-3031107C0DF1}"/>
+                <a16:creationId xmlns="" xmlns:a16="http://schemas.microsoft.com/office/drawing/2014/main" id="{6D70D093-F0D3-479C-B65D-3031107C0DF1}"/>
               </a:ext>
             </a:extLst>
           </p:cNvPr>
@@ -796,7 +796,7 @@
           <p:cNvPr id="3" name="Content Placeholder 2">
             <a:extLst>
               <a:ext uri="{FF2B5EF4-FFF2-40B4-BE49-F238E27FC236}">
-                <a16:creationId xmlns:a16="http://schemas.microsoft.com/office/drawing/2014/main" xmlns="" id="{19F2333E-AD72-4069-9999-D316EB1D2BE2}"/>
+                <a16:creationId xmlns="" xmlns:a16="http://schemas.microsoft.com/office/drawing/2014/main" id="{19F2333E-AD72-4069-9999-D316EB1D2BE2}"/>
               </a:ext>
             </a:extLst>
           </p:cNvPr>
@@ -854,7 +854,7 @@
           <p:cNvPr id="4" name="Date Placeholder 3">
             <a:extLst>
               <a:ext uri="{FF2B5EF4-FFF2-40B4-BE49-F238E27FC236}">
-                <a16:creationId xmlns:a16="http://schemas.microsoft.com/office/drawing/2014/main" xmlns="" id="{A5D0C69D-8EED-4855-9D9D-192FA0501F24}"/>
+                <a16:creationId xmlns="" xmlns:a16="http://schemas.microsoft.com/office/drawing/2014/main" id="{A5D0C69D-8EED-4855-9D9D-192FA0501F24}"/>
               </a:ext>
             </a:extLst>
           </p:cNvPr>
@@ -872,7 +872,7 @@
           <a:p>
             <a:fld id="{2F956D3E-0B91-471C-9743-3F865EE6F573}" type="datetimeFigureOut">
               <a:rPr lang="en-AU" smtClean="0"/>
-              <a:t>1/08/2018</a:t>
+              <a:t>2/08/2018</a:t>
             </a:fld>
             <a:endParaRPr lang="en-AU"/>
           </a:p>
@@ -883,7 +883,7 @@
           <p:cNvPr id="5" name="Footer Placeholder 4">
             <a:extLst>
               <a:ext uri="{FF2B5EF4-FFF2-40B4-BE49-F238E27FC236}">
-                <a16:creationId xmlns:a16="http://schemas.microsoft.com/office/drawing/2014/main" xmlns="" id="{3E40E1C3-407E-4CDD-B265-40C6EAF109CB}"/>
+                <a16:creationId xmlns="" xmlns:a16="http://schemas.microsoft.com/office/drawing/2014/main" id="{3E40E1C3-407E-4CDD-B265-40C6EAF109CB}"/>
               </a:ext>
             </a:extLst>
           </p:cNvPr>
@@ -908,7 +908,7 @@
           <p:cNvPr id="6" name="Slide Number Placeholder 5">
             <a:extLst>
               <a:ext uri="{FF2B5EF4-FFF2-40B4-BE49-F238E27FC236}">
-                <a16:creationId xmlns:a16="http://schemas.microsoft.com/office/drawing/2014/main" xmlns="" id="{845BB6A8-2931-4612-9030-020514B9DFCC}"/>
+                <a16:creationId xmlns="" xmlns:a16="http://schemas.microsoft.com/office/drawing/2014/main" id="{845BB6A8-2931-4612-9030-020514B9DFCC}"/>
               </a:ext>
             </a:extLst>
           </p:cNvPr>
@@ -967,7 +967,7 @@
           <p:cNvPr id="2" name="Title 1">
             <a:extLst>
               <a:ext uri="{FF2B5EF4-FFF2-40B4-BE49-F238E27FC236}">
-                <a16:creationId xmlns:a16="http://schemas.microsoft.com/office/drawing/2014/main" xmlns="" id="{9648ED28-6C5E-4B58-8121-9279F11D3D73}"/>
+                <a16:creationId xmlns="" xmlns:a16="http://schemas.microsoft.com/office/drawing/2014/main" id="{9648ED28-6C5E-4B58-8121-9279F11D3D73}"/>
               </a:ext>
             </a:extLst>
           </p:cNvPr>
@@ -1005,7 +1005,7 @@
           <p:cNvPr id="3" name="Text Placeholder 2">
             <a:extLst>
               <a:ext uri="{FF2B5EF4-FFF2-40B4-BE49-F238E27FC236}">
-                <a16:creationId xmlns:a16="http://schemas.microsoft.com/office/drawing/2014/main" xmlns="" id="{B243195A-3915-4922-B15F-B46A8AB41FEA}"/>
+                <a16:creationId xmlns="" xmlns:a16="http://schemas.microsoft.com/office/drawing/2014/main" id="{B243195A-3915-4922-B15F-B46A8AB41FEA}"/>
               </a:ext>
             </a:extLst>
           </p:cNvPr>
@@ -1130,7 +1130,7 @@
           <p:cNvPr id="4" name="Date Placeholder 3">
             <a:extLst>
               <a:ext uri="{FF2B5EF4-FFF2-40B4-BE49-F238E27FC236}">
-                <a16:creationId xmlns:a16="http://schemas.microsoft.com/office/drawing/2014/main" xmlns="" id="{33A69456-A0E9-4808-8AD0-8E412F7B6478}"/>
+                <a16:creationId xmlns="" xmlns:a16="http://schemas.microsoft.com/office/drawing/2014/main" id="{33A69456-A0E9-4808-8AD0-8E412F7B6478}"/>
               </a:ext>
             </a:extLst>
           </p:cNvPr>
@@ -1148,7 +1148,7 @@
           <a:p>
             <a:fld id="{2F956D3E-0B91-471C-9743-3F865EE6F573}" type="datetimeFigureOut">
               <a:rPr lang="en-AU" smtClean="0"/>
-              <a:t>1/08/2018</a:t>
+              <a:t>2/08/2018</a:t>
             </a:fld>
             <a:endParaRPr lang="en-AU"/>
           </a:p>
@@ -1159,7 +1159,7 @@
           <p:cNvPr id="5" name="Footer Placeholder 4">
             <a:extLst>
               <a:ext uri="{FF2B5EF4-FFF2-40B4-BE49-F238E27FC236}">
-                <a16:creationId xmlns:a16="http://schemas.microsoft.com/office/drawing/2014/main" xmlns="" id="{E0CD1CF0-CD4A-49A3-A5A3-C4241E2A5F63}"/>
+                <a16:creationId xmlns="" xmlns:a16="http://schemas.microsoft.com/office/drawing/2014/main" id="{E0CD1CF0-CD4A-49A3-A5A3-C4241E2A5F63}"/>
               </a:ext>
             </a:extLst>
           </p:cNvPr>
@@ -1184,7 +1184,7 @@
           <p:cNvPr id="6" name="Slide Number Placeholder 5">
             <a:extLst>
               <a:ext uri="{FF2B5EF4-FFF2-40B4-BE49-F238E27FC236}">
-                <a16:creationId xmlns:a16="http://schemas.microsoft.com/office/drawing/2014/main" xmlns="" id="{977DB6D3-8C4E-4ED5-9327-2DCA26535F2F}"/>
+                <a16:creationId xmlns="" xmlns:a16="http://schemas.microsoft.com/office/drawing/2014/main" id="{977DB6D3-8C4E-4ED5-9327-2DCA26535F2F}"/>
               </a:ext>
             </a:extLst>
           </p:cNvPr>
@@ -1243,7 +1243,7 @@
           <p:cNvPr id="2" name="Title 1">
             <a:extLst>
               <a:ext uri="{FF2B5EF4-FFF2-40B4-BE49-F238E27FC236}">
-                <a16:creationId xmlns:a16="http://schemas.microsoft.com/office/drawing/2014/main" xmlns="" id="{07C65CDB-FECB-413B-B3E2-B8B3289BE67F}"/>
+                <a16:creationId xmlns="" xmlns:a16="http://schemas.microsoft.com/office/drawing/2014/main" id="{07C65CDB-FECB-413B-B3E2-B8B3289BE67F}"/>
               </a:ext>
             </a:extLst>
           </p:cNvPr>
@@ -1272,7 +1272,7 @@
           <p:cNvPr id="3" name="Content Placeholder 2">
             <a:extLst>
               <a:ext uri="{FF2B5EF4-FFF2-40B4-BE49-F238E27FC236}">
-                <a16:creationId xmlns:a16="http://schemas.microsoft.com/office/drawing/2014/main" xmlns="" id="{2E6195E5-493D-470C-8030-A76CAC535D10}"/>
+                <a16:creationId xmlns="" xmlns:a16="http://schemas.microsoft.com/office/drawing/2014/main" id="{2E6195E5-493D-470C-8030-A76CAC535D10}"/>
               </a:ext>
             </a:extLst>
           </p:cNvPr>
@@ -1335,7 +1335,7 @@
           <p:cNvPr id="4" name="Content Placeholder 3">
             <a:extLst>
               <a:ext uri="{FF2B5EF4-FFF2-40B4-BE49-F238E27FC236}">
-                <a16:creationId xmlns:a16="http://schemas.microsoft.com/office/drawing/2014/main" xmlns="" id="{4F75BA75-06D0-4C8F-978B-E8DD198357AB}"/>
+                <a16:creationId xmlns="" xmlns:a16="http://schemas.microsoft.com/office/drawing/2014/main" id="{4F75BA75-06D0-4C8F-978B-E8DD198357AB}"/>
               </a:ext>
             </a:extLst>
           </p:cNvPr>
@@ -1398,7 +1398,7 @@
           <p:cNvPr id="5" name="Date Placeholder 4">
             <a:extLst>
               <a:ext uri="{FF2B5EF4-FFF2-40B4-BE49-F238E27FC236}">
-                <a16:creationId xmlns:a16="http://schemas.microsoft.com/office/drawing/2014/main" xmlns="" id="{B8464B70-E9DB-4711-87B7-24F57EF07851}"/>
+                <a16:creationId xmlns="" xmlns:a16="http://schemas.microsoft.com/office/drawing/2014/main" id="{B8464B70-E9DB-4711-87B7-24F57EF07851}"/>
               </a:ext>
             </a:extLst>
           </p:cNvPr>
@@ -1416,7 +1416,7 @@
           <a:p>
             <a:fld id="{2F956D3E-0B91-471C-9743-3F865EE6F573}" type="datetimeFigureOut">
               <a:rPr lang="en-AU" smtClean="0"/>
-              <a:t>1/08/2018</a:t>
+              <a:t>2/08/2018</a:t>
             </a:fld>
             <a:endParaRPr lang="en-AU"/>
           </a:p>
@@ -1427,7 +1427,7 @@
           <p:cNvPr id="6" name="Footer Placeholder 5">
             <a:extLst>
               <a:ext uri="{FF2B5EF4-FFF2-40B4-BE49-F238E27FC236}">
-                <a16:creationId xmlns:a16="http://schemas.microsoft.com/office/drawing/2014/main" xmlns="" id="{749AD7CE-527F-410D-975F-A7CD735BDEDC}"/>
+                <a16:creationId xmlns="" xmlns:a16="http://schemas.microsoft.com/office/drawing/2014/main" id="{749AD7CE-527F-410D-975F-A7CD735BDEDC}"/>
               </a:ext>
             </a:extLst>
           </p:cNvPr>
@@ -1452,7 +1452,7 @@
           <p:cNvPr id="7" name="Slide Number Placeholder 6">
             <a:extLst>
               <a:ext uri="{FF2B5EF4-FFF2-40B4-BE49-F238E27FC236}">
-                <a16:creationId xmlns:a16="http://schemas.microsoft.com/office/drawing/2014/main" xmlns="" id="{255D3E42-D06E-4C32-A2BC-75DE87B576C3}"/>
+                <a16:creationId xmlns="" xmlns:a16="http://schemas.microsoft.com/office/drawing/2014/main" id="{255D3E42-D06E-4C32-A2BC-75DE87B576C3}"/>
               </a:ext>
             </a:extLst>
           </p:cNvPr>
@@ -1511,7 +1511,7 @@
           <p:cNvPr id="2" name="Title 1">
             <a:extLst>
               <a:ext uri="{FF2B5EF4-FFF2-40B4-BE49-F238E27FC236}">
-                <a16:creationId xmlns:a16="http://schemas.microsoft.com/office/drawing/2014/main" xmlns="" id="{BE6E0455-D9EF-42F6-B509-7FDC251CFDAF}"/>
+                <a16:creationId xmlns="" xmlns:a16="http://schemas.microsoft.com/office/drawing/2014/main" id="{BE6E0455-D9EF-42F6-B509-7FDC251CFDAF}"/>
               </a:ext>
             </a:extLst>
           </p:cNvPr>
@@ -1545,7 +1545,7 @@
           <p:cNvPr id="3" name="Text Placeholder 2">
             <a:extLst>
               <a:ext uri="{FF2B5EF4-FFF2-40B4-BE49-F238E27FC236}">
-                <a16:creationId xmlns:a16="http://schemas.microsoft.com/office/drawing/2014/main" xmlns="" id="{5117D045-1AD3-424F-855E-BD6F9FACDA1A}"/>
+                <a16:creationId xmlns="" xmlns:a16="http://schemas.microsoft.com/office/drawing/2014/main" id="{5117D045-1AD3-424F-855E-BD6F9FACDA1A}"/>
               </a:ext>
             </a:extLst>
           </p:cNvPr>
@@ -1616,7 +1616,7 @@
           <p:cNvPr id="4" name="Content Placeholder 3">
             <a:extLst>
               <a:ext uri="{FF2B5EF4-FFF2-40B4-BE49-F238E27FC236}">
-                <a16:creationId xmlns:a16="http://schemas.microsoft.com/office/drawing/2014/main" xmlns="" id="{CC38E2F2-5E09-477C-BF9F-8B671E6613BE}"/>
+                <a16:creationId xmlns="" xmlns:a16="http://schemas.microsoft.com/office/drawing/2014/main" id="{CC38E2F2-5E09-477C-BF9F-8B671E6613BE}"/>
               </a:ext>
             </a:extLst>
           </p:cNvPr>
@@ -1679,7 +1679,7 @@
           <p:cNvPr id="5" name="Text Placeholder 4">
             <a:extLst>
               <a:ext uri="{FF2B5EF4-FFF2-40B4-BE49-F238E27FC236}">
-                <a16:creationId xmlns:a16="http://schemas.microsoft.com/office/drawing/2014/main" xmlns="" id="{3A15ED3B-D38C-4255-B016-9BFE9335B63D}"/>
+                <a16:creationId xmlns="" xmlns:a16="http://schemas.microsoft.com/office/drawing/2014/main" id="{3A15ED3B-D38C-4255-B016-9BFE9335B63D}"/>
               </a:ext>
             </a:extLst>
           </p:cNvPr>
@@ -1750,7 +1750,7 @@
           <p:cNvPr id="6" name="Content Placeholder 5">
             <a:extLst>
               <a:ext uri="{FF2B5EF4-FFF2-40B4-BE49-F238E27FC236}">
-                <a16:creationId xmlns:a16="http://schemas.microsoft.com/office/drawing/2014/main" xmlns="" id="{63DAE8AA-C177-4A26-BEC1-435C0D5B2971}"/>
+                <a16:creationId xmlns="" xmlns:a16="http://schemas.microsoft.com/office/drawing/2014/main" id="{63DAE8AA-C177-4A26-BEC1-435C0D5B2971}"/>
               </a:ext>
             </a:extLst>
           </p:cNvPr>
@@ -1813,7 +1813,7 @@
           <p:cNvPr id="7" name="Date Placeholder 6">
             <a:extLst>
               <a:ext uri="{FF2B5EF4-FFF2-40B4-BE49-F238E27FC236}">
-                <a16:creationId xmlns:a16="http://schemas.microsoft.com/office/drawing/2014/main" xmlns="" id="{C91A1DD9-FE74-4BC2-9DFA-85266C81AE87}"/>
+                <a16:creationId xmlns="" xmlns:a16="http://schemas.microsoft.com/office/drawing/2014/main" id="{C91A1DD9-FE74-4BC2-9DFA-85266C81AE87}"/>
               </a:ext>
             </a:extLst>
           </p:cNvPr>
@@ -1831,7 +1831,7 @@
           <a:p>
             <a:fld id="{2F956D3E-0B91-471C-9743-3F865EE6F573}" type="datetimeFigureOut">
               <a:rPr lang="en-AU" smtClean="0"/>
-              <a:t>1/08/2018</a:t>
+              <a:t>2/08/2018</a:t>
             </a:fld>
             <a:endParaRPr lang="en-AU"/>
           </a:p>
@@ -1842,7 +1842,7 @@
           <p:cNvPr id="8" name="Footer Placeholder 7">
             <a:extLst>
               <a:ext uri="{FF2B5EF4-FFF2-40B4-BE49-F238E27FC236}">
-                <a16:creationId xmlns:a16="http://schemas.microsoft.com/office/drawing/2014/main" xmlns="" id="{03468399-9983-447A-A9C7-60841A2101A5}"/>
+                <a16:creationId xmlns="" xmlns:a16="http://schemas.microsoft.com/office/drawing/2014/main" id="{03468399-9983-447A-A9C7-60841A2101A5}"/>
               </a:ext>
             </a:extLst>
           </p:cNvPr>
@@ -1867,7 +1867,7 @@
           <p:cNvPr id="9" name="Slide Number Placeholder 8">
             <a:extLst>
               <a:ext uri="{FF2B5EF4-FFF2-40B4-BE49-F238E27FC236}">
-                <a16:creationId xmlns:a16="http://schemas.microsoft.com/office/drawing/2014/main" xmlns="" id="{FF353AE5-8C6E-44F3-BD0C-9BE8FC31A3C4}"/>
+                <a16:creationId xmlns="" xmlns:a16="http://schemas.microsoft.com/office/drawing/2014/main" id="{FF353AE5-8C6E-44F3-BD0C-9BE8FC31A3C4}"/>
               </a:ext>
             </a:extLst>
           </p:cNvPr>
@@ -1926,7 +1926,7 @@
           <p:cNvPr id="2" name="Title 1">
             <a:extLst>
               <a:ext uri="{FF2B5EF4-FFF2-40B4-BE49-F238E27FC236}">
-                <a16:creationId xmlns:a16="http://schemas.microsoft.com/office/drawing/2014/main" xmlns="" id="{11AB4E18-777A-4059-8FE3-0C744DDCEF11}"/>
+                <a16:creationId xmlns="" xmlns:a16="http://schemas.microsoft.com/office/drawing/2014/main" id="{11AB4E18-777A-4059-8FE3-0C744DDCEF11}"/>
               </a:ext>
             </a:extLst>
           </p:cNvPr>
@@ -1955,7 +1955,7 @@
           <p:cNvPr id="3" name="Date Placeholder 2">
             <a:extLst>
               <a:ext uri="{FF2B5EF4-FFF2-40B4-BE49-F238E27FC236}">
-                <a16:creationId xmlns:a16="http://schemas.microsoft.com/office/drawing/2014/main" xmlns="" id="{EBBA3A6C-B2BF-4415-9EFA-485140AC1C20}"/>
+                <a16:creationId xmlns="" xmlns:a16="http://schemas.microsoft.com/office/drawing/2014/main" id="{EBBA3A6C-B2BF-4415-9EFA-485140AC1C20}"/>
               </a:ext>
             </a:extLst>
           </p:cNvPr>
@@ -1973,7 +1973,7 @@
           <a:p>
             <a:fld id="{2F956D3E-0B91-471C-9743-3F865EE6F573}" type="datetimeFigureOut">
               <a:rPr lang="en-AU" smtClean="0"/>
-              <a:t>1/08/2018</a:t>
+              <a:t>2/08/2018</a:t>
             </a:fld>
             <a:endParaRPr lang="en-AU"/>
           </a:p>
@@ -1984,7 +1984,7 @@
           <p:cNvPr id="4" name="Footer Placeholder 3">
             <a:extLst>
               <a:ext uri="{FF2B5EF4-FFF2-40B4-BE49-F238E27FC236}">
-                <a16:creationId xmlns:a16="http://schemas.microsoft.com/office/drawing/2014/main" xmlns="" id="{979E66C2-27F5-4ADA-B05B-28A7E30C72C4}"/>
+                <a16:creationId xmlns="" xmlns:a16="http://schemas.microsoft.com/office/drawing/2014/main" id="{979E66C2-27F5-4ADA-B05B-28A7E30C72C4}"/>
               </a:ext>
             </a:extLst>
           </p:cNvPr>
@@ -2009,7 +2009,7 @@
           <p:cNvPr id="5" name="Slide Number Placeholder 4">
             <a:extLst>
               <a:ext uri="{FF2B5EF4-FFF2-40B4-BE49-F238E27FC236}">
-                <a16:creationId xmlns:a16="http://schemas.microsoft.com/office/drawing/2014/main" xmlns="" id="{339F570E-2EBF-491A-B1A3-7B0020A39D87}"/>
+                <a16:creationId xmlns="" xmlns:a16="http://schemas.microsoft.com/office/drawing/2014/main" id="{339F570E-2EBF-491A-B1A3-7B0020A39D87}"/>
               </a:ext>
             </a:extLst>
           </p:cNvPr>
@@ -2068,7 +2068,7 @@
           <p:cNvPr id="2" name="Date Placeholder 1">
             <a:extLst>
               <a:ext uri="{FF2B5EF4-FFF2-40B4-BE49-F238E27FC236}">
-                <a16:creationId xmlns:a16="http://schemas.microsoft.com/office/drawing/2014/main" xmlns="" id="{31CC9DF5-DDBA-4A27-A2BE-EE4875C95E73}"/>
+                <a16:creationId xmlns="" xmlns:a16="http://schemas.microsoft.com/office/drawing/2014/main" id="{31CC9DF5-DDBA-4A27-A2BE-EE4875C95E73}"/>
               </a:ext>
             </a:extLst>
           </p:cNvPr>
@@ -2086,7 +2086,7 @@
           <a:p>
             <a:fld id="{2F956D3E-0B91-471C-9743-3F865EE6F573}" type="datetimeFigureOut">
               <a:rPr lang="en-AU" smtClean="0"/>
-              <a:t>1/08/2018</a:t>
+              <a:t>2/08/2018</a:t>
             </a:fld>
             <a:endParaRPr lang="en-AU"/>
           </a:p>
@@ -2097,7 +2097,7 @@
           <p:cNvPr id="3" name="Footer Placeholder 2">
             <a:extLst>
               <a:ext uri="{FF2B5EF4-FFF2-40B4-BE49-F238E27FC236}">
-                <a16:creationId xmlns:a16="http://schemas.microsoft.com/office/drawing/2014/main" xmlns="" id="{5E855F50-D457-4213-B498-4635BD853470}"/>
+                <a16:creationId xmlns="" xmlns:a16="http://schemas.microsoft.com/office/drawing/2014/main" id="{5E855F50-D457-4213-B498-4635BD853470}"/>
               </a:ext>
             </a:extLst>
           </p:cNvPr>
@@ -2122,7 +2122,7 @@
           <p:cNvPr id="4" name="Slide Number Placeholder 3">
             <a:extLst>
               <a:ext uri="{FF2B5EF4-FFF2-40B4-BE49-F238E27FC236}">
-                <a16:creationId xmlns:a16="http://schemas.microsoft.com/office/drawing/2014/main" xmlns="" id="{1424F85B-ACD9-4362-A6F2-B7C48F575113}"/>
+                <a16:creationId xmlns="" xmlns:a16="http://schemas.microsoft.com/office/drawing/2014/main" id="{1424F85B-ACD9-4362-A6F2-B7C48F575113}"/>
               </a:ext>
             </a:extLst>
           </p:cNvPr>
@@ -2181,7 +2181,7 @@
           <p:cNvPr id="2" name="Title 1">
             <a:extLst>
               <a:ext uri="{FF2B5EF4-FFF2-40B4-BE49-F238E27FC236}">
-                <a16:creationId xmlns:a16="http://schemas.microsoft.com/office/drawing/2014/main" xmlns="" id="{BD554F58-5E8E-48ED-8ED9-A0BD06E6F218}"/>
+                <a16:creationId xmlns="" xmlns:a16="http://schemas.microsoft.com/office/drawing/2014/main" id="{BD554F58-5E8E-48ED-8ED9-A0BD06E6F218}"/>
               </a:ext>
             </a:extLst>
           </p:cNvPr>
@@ -2219,7 +2219,7 @@
           <p:cNvPr id="3" name="Content Placeholder 2">
             <a:extLst>
               <a:ext uri="{FF2B5EF4-FFF2-40B4-BE49-F238E27FC236}">
-                <a16:creationId xmlns:a16="http://schemas.microsoft.com/office/drawing/2014/main" xmlns="" id="{88E32398-FD1A-4262-BB8C-6CFB63C85CED}"/>
+                <a16:creationId xmlns="" xmlns:a16="http://schemas.microsoft.com/office/drawing/2014/main" id="{88E32398-FD1A-4262-BB8C-6CFB63C85CED}"/>
               </a:ext>
             </a:extLst>
           </p:cNvPr>
@@ -2310,7 +2310,7 @@
           <p:cNvPr id="4" name="Text Placeholder 3">
             <a:extLst>
               <a:ext uri="{FF2B5EF4-FFF2-40B4-BE49-F238E27FC236}">
-                <a16:creationId xmlns:a16="http://schemas.microsoft.com/office/drawing/2014/main" xmlns="" id="{373EAC1B-2FB9-4226-BCA0-E5D3B01D6FA0}"/>
+                <a16:creationId xmlns="" xmlns:a16="http://schemas.microsoft.com/office/drawing/2014/main" id="{373EAC1B-2FB9-4226-BCA0-E5D3B01D6FA0}"/>
               </a:ext>
             </a:extLst>
           </p:cNvPr>
@@ -2381,7 +2381,7 @@
           <p:cNvPr id="5" name="Date Placeholder 4">
             <a:extLst>
               <a:ext uri="{FF2B5EF4-FFF2-40B4-BE49-F238E27FC236}">
-                <a16:creationId xmlns:a16="http://schemas.microsoft.com/office/drawing/2014/main" xmlns="" id="{D639F409-5438-45DD-BECC-62B7B0AAF361}"/>
+                <a16:creationId xmlns="" xmlns:a16="http://schemas.microsoft.com/office/drawing/2014/main" id="{D639F409-5438-45DD-BECC-62B7B0AAF361}"/>
               </a:ext>
             </a:extLst>
           </p:cNvPr>
@@ -2399,7 +2399,7 @@
           <a:p>
             <a:fld id="{2F956D3E-0B91-471C-9743-3F865EE6F573}" type="datetimeFigureOut">
               <a:rPr lang="en-AU" smtClean="0"/>
-              <a:t>1/08/2018</a:t>
+              <a:t>2/08/2018</a:t>
             </a:fld>
             <a:endParaRPr lang="en-AU"/>
           </a:p>
@@ -2410,7 +2410,7 @@
           <p:cNvPr id="6" name="Footer Placeholder 5">
             <a:extLst>
               <a:ext uri="{FF2B5EF4-FFF2-40B4-BE49-F238E27FC236}">
-                <a16:creationId xmlns:a16="http://schemas.microsoft.com/office/drawing/2014/main" xmlns="" id="{2311AAC2-3F58-465D-8275-AAB451586BBE}"/>
+                <a16:creationId xmlns="" xmlns:a16="http://schemas.microsoft.com/office/drawing/2014/main" id="{2311AAC2-3F58-465D-8275-AAB451586BBE}"/>
               </a:ext>
             </a:extLst>
           </p:cNvPr>
@@ -2435,7 +2435,7 @@
           <p:cNvPr id="7" name="Slide Number Placeholder 6">
             <a:extLst>
               <a:ext uri="{FF2B5EF4-FFF2-40B4-BE49-F238E27FC236}">
-                <a16:creationId xmlns:a16="http://schemas.microsoft.com/office/drawing/2014/main" xmlns="" id="{4076C87A-5864-468D-9EE2-7F4B0C093074}"/>
+                <a16:creationId xmlns="" xmlns:a16="http://schemas.microsoft.com/office/drawing/2014/main" id="{4076C87A-5864-468D-9EE2-7F4B0C093074}"/>
               </a:ext>
             </a:extLst>
           </p:cNvPr>
@@ -2494,7 +2494,7 @@
           <p:cNvPr id="2" name="Title 1">
             <a:extLst>
               <a:ext uri="{FF2B5EF4-FFF2-40B4-BE49-F238E27FC236}">
-                <a16:creationId xmlns:a16="http://schemas.microsoft.com/office/drawing/2014/main" xmlns="" id="{B5D51929-B485-4C5E-86DE-E6E2074D6CE5}"/>
+                <a16:creationId xmlns="" xmlns:a16="http://schemas.microsoft.com/office/drawing/2014/main" id="{B5D51929-B485-4C5E-86DE-E6E2074D6CE5}"/>
               </a:ext>
             </a:extLst>
           </p:cNvPr>
@@ -2532,7 +2532,7 @@
           <p:cNvPr id="3" name="Picture Placeholder 2">
             <a:extLst>
               <a:ext uri="{FF2B5EF4-FFF2-40B4-BE49-F238E27FC236}">
-                <a16:creationId xmlns:a16="http://schemas.microsoft.com/office/drawing/2014/main" xmlns="" id="{745CAD50-DBFD-4B1E-8C5A-FEC1D2159DDB}"/>
+                <a16:creationId xmlns="" xmlns:a16="http://schemas.microsoft.com/office/drawing/2014/main" id="{745CAD50-DBFD-4B1E-8C5A-FEC1D2159DDB}"/>
               </a:ext>
             </a:extLst>
           </p:cNvPr>
@@ -2599,7 +2599,7 @@
           <p:cNvPr id="4" name="Text Placeholder 3">
             <a:extLst>
               <a:ext uri="{FF2B5EF4-FFF2-40B4-BE49-F238E27FC236}">
-                <a16:creationId xmlns:a16="http://schemas.microsoft.com/office/drawing/2014/main" xmlns="" id="{56CA1066-373C-4A49-B657-9EE7DCD0952D}"/>
+                <a16:creationId xmlns="" xmlns:a16="http://schemas.microsoft.com/office/drawing/2014/main" id="{56CA1066-373C-4A49-B657-9EE7DCD0952D}"/>
               </a:ext>
             </a:extLst>
           </p:cNvPr>
@@ -2670,7 +2670,7 @@
           <p:cNvPr id="5" name="Date Placeholder 4">
             <a:extLst>
               <a:ext uri="{FF2B5EF4-FFF2-40B4-BE49-F238E27FC236}">
-                <a16:creationId xmlns:a16="http://schemas.microsoft.com/office/drawing/2014/main" xmlns="" id="{D4F04E1C-BF5B-43FA-9CA9-C4A3872ABD47}"/>
+                <a16:creationId xmlns="" xmlns:a16="http://schemas.microsoft.com/office/drawing/2014/main" id="{D4F04E1C-BF5B-43FA-9CA9-C4A3872ABD47}"/>
               </a:ext>
             </a:extLst>
           </p:cNvPr>
@@ -2688,7 +2688,7 @@
           <a:p>
             <a:fld id="{2F956D3E-0B91-471C-9743-3F865EE6F573}" type="datetimeFigureOut">
               <a:rPr lang="en-AU" smtClean="0"/>
-              <a:t>1/08/2018</a:t>
+              <a:t>2/08/2018</a:t>
             </a:fld>
             <a:endParaRPr lang="en-AU"/>
           </a:p>
@@ -2699,7 +2699,7 @@
           <p:cNvPr id="6" name="Footer Placeholder 5">
             <a:extLst>
               <a:ext uri="{FF2B5EF4-FFF2-40B4-BE49-F238E27FC236}">
-                <a16:creationId xmlns:a16="http://schemas.microsoft.com/office/drawing/2014/main" xmlns="" id="{B3F3C200-5776-44B6-80D6-B576FC6FE4A1}"/>
+                <a16:creationId xmlns="" xmlns:a16="http://schemas.microsoft.com/office/drawing/2014/main" id="{B3F3C200-5776-44B6-80D6-B576FC6FE4A1}"/>
               </a:ext>
             </a:extLst>
           </p:cNvPr>
@@ -2724,7 +2724,7 @@
           <p:cNvPr id="7" name="Slide Number Placeholder 6">
             <a:extLst>
               <a:ext uri="{FF2B5EF4-FFF2-40B4-BE49-F238E27FC236}">
-                <a16:creationId xmlns:a16="http://schemas.microsoft.com/office/drawing/2014/main" xmlns="" id="{C83FA351-8092-4D78-A9C7-A20A77930D3D}"/>
+                <a16:creationId xmlns="" xmlns:a16="http://schemas.microsoft.com/office/drawing/2014/main" id="{C83FA351-8092-4D78-A9C7-A20A77930D3D}"/>
               </a:ext>
             </a:extLst>
           </p:cNvPr>
@@ -2788,7 +2788,7 @@
           <p:cNvPr id="2" name="Title Placeholder 1">
             <a:extLst>
               <a:ext uri="{FF2B5EF4-FFF2-40B4-BE49-F238E27FC236}">
-                <a16:creationId xmlns:a16="http://schemas.microsoft.com/office/drawing/2014/main" xmlns="" id="{417237BA-4865-4280-8BD0-E6D106DFB608}"/>
+                <a16:creationId xmlns="" xmlns:a16="http://schemas.microsoft.com/office/drawing/2014/main" id="{417237BA-4865-4280-8BD0-E6D106DFB608}"/>
               </a:ext>
             </a:extLst>
           </p:cNvPr>
@@ -2827,7 +2827,7 @@
           <p:cNvPr id="3" name="Text Placeholder 2">
             <a:extLst>
               <a:ext uri="{FF2B5EF4-FFF2-40B4-BE49-F238E27FC236}">
-                <a16:creationId xmlns:a16="http://schemas.microsoft.com/office/drawing/2014/main" xmlns="" id="{CFD6DF4C-CD43-4DDE-9E26-4DAB0E753402}"/>
+                <a16:creationId xmlns="" xmlns:a16="http://schemas.microsoft.com/office/drawing/2014/main" id="{CFD6DF4C-CD43-4DDE-9E26-4DAB0E753402}"/>
               </a:ext>
             </a:extLst>
           </p:cNvPr>
@@ -2895,7 +2895,7 @@
           <p:cNvPr id="4" name="Date Placeholder 3">
             <a:extLst>
               <a:ext uri="{FF2B5EF4-FFF2-40B4-BE49-F238E27FC236}">
-                <a16:creationId xmlns:a16="http://schemas.microsoft.com/office/drawing/2014/main" xmlns="" id="{4E8F96A9-316E-4272-B736-3B7A5BEFB368}"/>
+                <a16:creationId xmlns="" xmlns:a16="http://schemas.microsoft.com/office/drawing/2014/main" id="{4E8F96A9-316E-4272-B736-3B7A5BEFB368}"/>
               </a:ext>
             </a:extLst>
           </p:cNvPr>
@@ -2931,7 +2931,7 @@
           <a:p>
             <a:fld id="{2F956D3E-0B91-471C-9743-3F865EE6F573}" type="datetimeFigureOut">
               <a:rPr lang="en-AU" smtClean="0"/>
-              <a:t>1/08/2018</a:t>
+              <a:t>2/08/2018</a:t>
             </a:fld>
             <a:endParaRPr lang="en-AU"/>
           </a:p>
@@ -2942,7 +2942,7 @@
           <p:cNvPr id="5" name="Footer Placeholder 4">
             <a:extLst>
               <a:ext uri="{FF2B5EF4-FFF2-40B4-BE49-F238E27FC236}">
-                <a16:creationId xmlns:a16="http://schemas.microsoft.com/office/drawing/2014/main" xmlns="" id="{5B9B060F-4139-42DD-835A-DD48B4C35B93}"/>
+                <a16:creationId xmlns="" xmlns:a16="http://schemas.microsoft.com/office/drawing/2014/main" id="{5B9B060F-4139-42DD-835A-DD48B4C35B93}"/>
               </a:ext>
             </a:extLst>
           </p:cNvPr>
@@ -2985,7 +2985,7 @@
           <p:cNvPr id="6" name="Slide Number Placeholder 5">
             <a:extLst>
               <a:ext uri="{FF2B5EF4-FFF2-40B4-BE49-F238E27FC236}">
-                <a16:creationId xmlns:a16="http://schemas.microsoft.com/office/drawing/2014/main" xmlns="" id="{419ED261-D27A-4F8B-A664-31C7824BE2CC}"/>
+                <a16:creationId xmlns="" xmlns:a16="http://schemas.microsoft.com/office/drawing/2014/main" id="{419ED261-D27A-4F8B-A664-31C7824BE2CC}"/>
               </a:ext>
             </a:extLst>
           </p:cNvPr>
@@ -3353,7 +3353,7 @@
           <p:cNvPr id="4" name="Rectangle: Rounded Corners 3">
             <a:extLst>
               <a:ext uri="{FF2B5EF4-FFF2-40B4-BE49-F238E27FC236}">
-                <a16:creationId xmlns:a16="http://schemas.microsoft.com/office/drawing/2014/main" xmlns="" id="{54D0FB8B-B098-491A-AD31-AD421AB902EF}"/>
+                <a16:creationId xmlns="" xmlns:a16="http://schemas.microsoft.com/office/drawing/2014/main" id="{54D0FB8B-B098-491A-AD31-AD421AB902EF}"/>
               </a:ext>
             </a:extLst>
           </p:cNvPr>
@@ -3412,7 +3412,7 @@
           <p:cNvPr id="5" name="Rectangle: Rounded Corners 4">
             <a:extLst>
               <a:ext uri="{FF2B5EF4-FFF2-40B4-BE49-F238E27FC236}">
-                <a16:creationId xmlns:a16="http://schemas.microsoft.com/office/drawing/2014/main" xmlns="" id="{5675C345-97DA-44C4-8895-174F9B25EB74}"/>
+                <a16:creationId xmlns="" xmlns:a16="http://schemas.microsoft.com/office/drawing/2014/main" id="{5675C345-97DA-44C4-8895-174F9B25EB74}"/>
               </a:ext>
             </a:extLst>
           </p:cNvPr>
@@ -3471,7 +3471,7 @@
           <p:cNvPr id="10" name="Straight Arrow Connector 9">
             <a:extLst>
               <a:ext uri="{FF2B5EF4-FFF2-40B4-BE49-F238E27FC236}">
-                <a16:creationId xmlns:a16="http://schemas.microsoft.com/office/drawing/2014/main" xmlns="" id="{2738494B-22BB-4E16-AA8E-063441F62080}"/>
+                <a16:creationId xmlns="" xmlns:a16="http://schemas.microsoft.com/office/drawing/2014/main" id="{2738494B-22BB-4E16-AA8E-063441F62080}"/>
               </a:ext>
             </a:extLst>
           </p:cNvPr>
@@ -3513,7 +3513,7 @@
           <p:cNvPr id="11" name="TextBox 10">
             <a:extLst>
               <a:ext uri="{FF2B5EF4-FFF2-40B4-BE49-F238E27FC236}">
-                <a16:creationId xmlns:a16="http://schemas.microsoft.com/office/drawing/2014/main" xmlns="" id="{EA0207FA-CB6D-4700-A943-37A35E7A7F6C}"/>
+                <a16:creationId xmlns="" xmlns:a16="http://schemas.microsoft.com/office/drawing/2014/main" id="{EA0207FA-CB6D-4700-A943-37A35E7A7F6C}"/>
               </a:ext>
             </a:extLst>
           </p:cNvPr>
@@ -3549,7 +3549,7 @@
           <p:cNvPr id="12" name="Rectangle: Rounded Corners 11">
             <a:extLst>
               <a:ext uri="{FF2B5EF4-FFF2-40B4-BE49-F238E27FC236}">
-                <a16:creationId xmlns:a16="http://schemas.microsoft.com/office/drawing/2014/main" xmlns="" id="{0172D6A7-F319-4C98-BCFD-58AB9FFA137C}"/>
+                <a16:creationId xmlns="" xmlns:a16="http://schemas.microsoft.com/office/drawing/2014/main" id="{0172D6A7-F319-4C98-BCFD-58AB9FFA137C}"/>
               </a:ext>
             </a:extLst>
           </p:cNvPr>
@@ -3608,7 +3608,7 @@
           <p:cNvPr id="13" name="Rectangle: Rounded Corners 12">
             <a:extLst>
               <a:ext uri="{FF2B5EF4-FFF2-40B4-BE49-F238E27FC236}">
-                <a16:creationId xmlns:a16="http://schemas.microsoft.com/office/drawing/2014/main" xmlns="" id="{351768B8-B0F4-49E5-A1C4-CB95780972A0}"/>
+                <a16:creationId xmlns="" xmlns:a16="http://schemas.microsoft.com/office/drawing/2014/main" id="{351768B8-B0F4-49E5-A1C4-CB95780972A0}"/>
               </a:ext>
             </a:extLst>
           </p:cNvPr>
@@ -3667,7 +3667,7 @@
           <p:cNvPr id="14" name="Rectangle: Rounded Corners 13">
             <a:extLst>
               <a:ext uri="{FF2B5EF4-FFF2-40B4-BE49-F238E27FC236}">
-                <a16:creationId xmlns:a16="http://schemas.microsoft.com/office/drawing/2014/main" xmlns="" id="{C3BAB69B-ADA0-48E1-A7A3-2F500C2A407E}"/>
+                <a16:creationId xmlns="" xmlns:a16="http://schemas.microsoft.com/office/drawing/2014/main" id="{C3BAB69B-ADA0-48E1-A7A3-2F500C2A407E}"/>
               </a:ext>
             </a:extLst>
           </p:cNvPr>
@@ -3726,7 +3726,7 @@
           <p:cNvPr id="15" name="Rectangle: Rounded Corners 14">
             <a:extLst>
               <a:ext uri="{FF2B5EF4-FFF2-40B4-BE49-F238E27FC236}">
-                <a16:creationId xmlns:a16="http://schemas.microsoft.com/office/drawing/2014/main" xmlns="" id="{415FC0F5-4B41-4A53-9189-AE991ED2BD31}"/>
+                <a16:creationId xmlns="" xmlns:a16="http://schemas.microsoft.com/office/drawing/2014/main" id="{415FC0F5-4B41-4A53-9189-AE991ED2BD31}"/>
               </a:ext>
             </a:extLst>
           </p:cNvPr>
@@ -3785,7 +3785,7 @@
           <p:cNvPr id="16" name="Rectangle: Rounded Corners 15">
             <a:extLst>
               <a:ext uri="{FF2B5EF4-FFF2-40B4-BE49-F238E27FC236}">
-                <a16:creationId xmlns:a16="http://schemas.microsoft.com/office/drawing/2014/main" xmlns="" id="{80DE7B24-B7E9-47B6-8E88-EC972ED19123}"/>
+                <a16:creationId xmlns="" xmlns:a16="http://schemas.microsoft.com/office/drawing/2014/main" id="{80DE7B24-B7E9-47B6-8E88-EC972ED19123}"/>
               </a:ext>
             </a:extLst>
           </p:cNvPr>
@@ -3844,7 +3844,7 @@
           <p:cNvPr id="17" name="Connector: Elbow 16">
             <a:extLst>
               <a:ext uri="{FF2B5EF4-FFF2-40B4-BE49-F238E27FC236}">
-                <a16:creationId xmlns:a16="http://schemas.microsoft.com/office/drawing/2014/main" xmlns="" id="{64514852-CA0B-4B22-9112-9C0EFB8F9B9B}"/>
+                <a16:creationId xmlns="" xmlns:a16="http://schemas.microsoft.com/office/drawing/2014/main" id="{64514852-CA0B-4B22-9112-9C0EFB8F9B9B}"/>
               </a:ext>
             </a:extLst>
           </p:cNvPr>
@@ -3892,7 +3892,7 @@
           <p:cNvPr id="20" name="Connector: Elbow 19">
             <a:extLst>
               <a:ext uri="{FF2B5EF4-FFF2-40B4-BE49-F238E27FC236}">
-                <a16:creationId xmlns:a16="http://schemas.microsoft.com/office/drawing/2014/main" xmlns="" id="{E118E15D-38EF-455D-87FB-59C64F2455B6}"/>
+                <a16:creationId xmlns="" xmlns:a16="http://schemas.microsoft.com/office/drawing/2014/main" id="{E118E15D-38EF-455D-87FB-59C64F2455B6}"/>
               </a:ext>
             </a:extLst>
           </p:cNvPr>
@@ -3940,7 +3940,7 @@
           <p:cNvPr id="23" name="Connector: Elbow 22">
             <a:extLst>
               <a:ext uri="{FF2B5EF4-FFF2-40B4-BE49-F238E27FC236}">
-                <a16:creationId xmlns:a16="http://schemas.microsoft.com/office/drawing/2014/main" xmlns="" id="{B493C084-F212-492E-957C-8BEA879E995D}"/>
+                <a16:creationId xmlns="" xmlns:a16="http://schemas.microsoft.com/office/drawing/2014/main" id="{B493C084-F212-492E-957C-8BEA879E995D}"/>
               </a:ext>
             </a:extLst>
           </p:cNvPr>
@@ -3988,7 +3988,7 @@
           <p:cNvPr id="30" name="Rectangle: Rounded Corners 29">
             <a:extLst>
               <a:ext uri="{FF2B5EF4-FFF2-40B4-BE49-F238E27FC236}">
-                <a16:creationId xmlns:a16="http://schemas.microsoft.com/office/drawing/2014/main" xmlns="" id="{19F24737-7B63-4E7B-9AE5-A87497FA6FAF}"/>
+                <a16:creationId xmlns="" xmlns:a16="http://schemas.microsoft.com/office/drawing/2014/main" id="{19F24737-7B63-4E7B-9AE5-A87497FA6FAF}"/>
               </a:ext>
             </a:extLst>
           </p:cNvPr>
@@ -4047,7 +4047,7 @@
           <p:cNvPr id="31" name="Rectangle: Rounded Corners 30">
             <a:extLst>
               <a:ext uri="{FF2B5EF4-FFF2-40B4-BE49-F238E27FC236}">
-                <a16:creationId xmlns:a16="http://schemas.microsoft.com/office/drawing/2014/main" xmlns="" id="{7BC2DA58-1C14-4D8B-9AF3-E14F6FAD8FC0}"/>
+                <a16:creationId xmlns="" xmlns:a16="http://schemas.microsoft.com/office/drawing/2014/main" id="{7BC2DA58-1C14-4D8B-9AF3-E14F6FAD8FC0}"/>
               </a:ext>
             </a:extLst>
           </p:cNvPr>
@@ -4106,7 +4106,7 @@
           <p:cNvPr id="32" name="Rectangle: Rounded Corners 31">
             <a:extLst>
               <a:ext uri="{FF2B5EF4-FFF2-40B4-BE49-F238E27FC236}">
-                <a16:creationId xmlns:a16="http://schemas.microsoft.com/office/drawing/2014/main" xmlns="" id="{A2415D34-9AEB-4D3C-8B85-9A65A96218FE}"/>
+                <a16:creationId xmlns="" xmlns:a16="http://schemas.microsoft.com/office/drawing/2014/main" id="{A2415D34-9AEB-4D3C-8B85-9A65A96218FE}"/>
               </a:ext>
             </a:extLst>
           </p:cNvPr>
@@ -4165,7 +4165,7 @@
           <p:cNvPr id="33" name="Connector: Elbow 32">
             <a:extLst>
               <a:ext uri="{FF2B5EF4-FFF2-40B4-BE49-F238E27FC236}">
-                <a16:creationId xmlns:a16="http://schemas.microsoft.com/office/drawing/2014/main" xmlns="" id="{821A3089-B696-4653-B73B-39B49F027466}"/>
+                <a16:creationId xmlns="" xmlns:a16="http://schemas.microsoft.com/office/drawing/2014/main" id="{821A3089-B696-4653-B73B-39B49F027466}"/>
               </a:ext>
             </a:extLst>
           </p:cNvPr>
@@ -4213,7 +4213,7 @@
           <p:cNvPr id="36" name="Connector: Elbow 35">
             <a:extLst>
               <a:ext uri="{FF2B5EF4-FFF2-40B4-BE49-F238E27FC236}">
-                <a16:creationId xmlns:a16="http://schemas.microsoft.com/office/drawing/2014/main" xmlns="" id="{0E570848-FE64-4E6A-A947-1CBC1911E97A}"/>
+                <a16:creationId xmlns="" xmlns:a16="http://schemas.microsoft.com/office/drawing/2014/main" id="{0E570848-FE64-4E6A-A947-1CBC1911E97A}"/>
               </a:ext>
             </a:extLst>
           </p:cNvPr>
@@ -4261,7 +4261,7 @@
           <p:cNvPr id="8" name="Straight Arrow Connector 7">
             <a:extLst>
               <a:ext uri="{FF2B5EF4-FFF2-40B4-BE49-F238E27FC236}">
-                <a16:creationId xmlns:a16="http://schemas.microsoft.com/office/drawing/2014/main" xmlns="" id="{02FF8AEF-9744-4B1C-ACB9-E3241ACF27D1}"/>
+                <a16:creationId xmlns="" xmlns:a16="http://schemas.microsoft.com/office/drawing/2014/main" id="{02FF8AEF-9744-4B1C-ACB9-E3241ACF27D1}"/>
               </a:ext>
             </a:extLst>
           </p:cNvPr>
@@ -4306,7 +4306,7 @@
           <p:cNvPr id="25" name="Rectangle: Rounded Corners 24">
             <a:extLst>
               <a:ext uri="{FF2B5EF4-FFF2-40B4-BE49-F238E27FC236}">
-                <a16:creationId xmlns:a16="http://schemas.microsoft.com/office/drawing/2014/main" xmlns="" id="{509E733A-9C35-48BC-B1CE-379C573000FE}"/>
+                <a16:creationId xmlns="" xmlns:a16="http://schemas.microsoft.com/office/drawing/2014/main" id="{509E733A-9C35-48BC-B1CE-379C573000FE}"/>
               </a:ext>
             </a:extLst>
           </p:cNvPr>
@@ -4365,7 +4365,7 @@
           <p:cNvPr id="26" name="Straight Arrow Connector 25">
             <a:extLst>
               <a:ext uri="{FF2B5EF4-FFF2-40B4-BE49-F238E27FC236}">
-                <a16:creationId xmlns:a16="http://schemas.microsoft.com/office/drawing/2014/main" xmlns="" id="{45BB73C4-0487-4332-804D-0640F1C24DD7}"/>
+                <a16:creationId xmlns="" xmlns:a16="http://schemas.microsoft.com/office/drawing/2014/main" id="{45BB73C4-0487-4332-804D-0640F1C24DD7}"/>
               </a:ext>
             </a:extLst>
           </p:cNvPr>
@@ -4412,7 +4412,7 @@
           <p:cNvPr id="29" name="TextBox 28">
             <a:extLst>
               <a:ext uri="{FF2B5EF4-FFF2-40B4-BE49-F238E27FC236}">
-                <a16:creationId xmlns:a16="http://schemas.microsoft.com/office/drawing/2014/main" xmlns="" id="{ECF64CE6-E66F-4FF9-8239-2D9801A3273B}"/>
+                <a16:creationId xmlns="" xmlns:a16="http://schemas.microsoft.com/office/drawing/2014/main" id="{ECF64CE6-E66F-4FF9-8239-2D9801A3273B}"/>
               </a:ext>
             </a:extLst>
           </p:cNvPr>
@@ -4448,7 +4448,7 @@
           <p:cNvPr id="34" name="Connector: Elbow 33">
             <a:extLst>
               <a:ext uri="{FF2B5EF4-FFF2-40B4-BE49-F238E27FC236}">
-                <a16:creationId xmlns:a16="http://schemas.microsoft.com/office/drawing/2014/main" xmlns="" id="{762DA317-C2C5-4F35-8BEE-2475336742C9}"/>
+                <a16:creationId xmlns="" xmlns:a16="http://schemas.microsoft.com/office/drawing/2014/main" id="{762DA317-C2C5-4F35-8BEE-2475336742C9}"/>
               </a:ext>
             </a:extLst>
           </p:cNvPr>
@@ -4497,7 +4497,7 @@
           <p:cNvPr id="35" name="Connector: Elbow 34">
             <a:extLst>
               <a:ext uri="{FF2B5EF4-FFF2-40B4-BE49-F238E27FC236}">
-                <a16:creationId xmlns:a16="http://schemas.microsoft.com/office/drawing/2014/main" xmlns="" id="{326F3BCB-F2A3-492C-A8F3-20922107B29D}"/>
+                <a16:creationId xmlns="" xmlns:a16="http://schemas.microsoft.com/office/drawing/2014/main" id="{326F3BCB-F2A3-492C-A8F3-20922107B29D}"/>
               </a:ext>
             </a:extLst>
           </p:cNvPr>
@@ -4546,7 +4546,7 @@
           <p:cNvPr id="37" name="Connector: Elbow 36">
             <a:extLst>
               <a:ext uri="{FF2B5EF4-FFF2-40B4-BE49-F238E27FC236}">
-                <a16:creationId xmlns:a16="http://schemas.microsoft.com/office/drawing/2014/main" xmlns="" id="{D78C9AF8-6E97-4A41-9699-F00133FB72EE}"/>
+                <a16:creationId xmlns="" xmlns:a16="http://schemas.microsoft.com/office/drawing/2014/main" id="{D78C9AF8-6E97-4A41-9699-F00133FB72EE}"/>
               </a:ext>
             </a:extLst>
           </p:cNvPr>
@@ -4595,7 +4595,7 @@
           <p:cNvPr id="83" name="TextBox 82">
             <a:extLst>
               <a:ext uri="{FF2B5EF4-FFF2-40B4-BE49-F238E27FC236}">
-                <a16:creationId xmlns:a16="http://schemas.microsoft.com/office/drawing/2014/main" xmlns="" id="{C34CC880-1902-497C-A44A-571D93EAD548}"/>
+                <a16:creationId xmlns="" xmlns:a16="http://schemas.microsoft.com/office/drawing/2014/main" id="{C34CC880-1902-497C-A44A-571D93EAD548}"/>
               </a:ext>
             </a:extLst>
           </p:cNvPr>
@@ -4630,7 +4630,7 @@
           <p:cNvPr id="84" name="TextBox 83">
             <a:extLst>
               <a:ext uri="{FF2B5EF4-FFF2-40B4-BE49-F238E27FC236}">
-                <a16:creationId xmlns:a16="http://schemas.microsoft.com/office/drawing/2014/main" xmlns="" id="{582DAA28-77DF-48AB-A0FA-7D0944EEA418}"/>
+                <a16:creationId xmlns="" xmlns:a16="http://schemas.microsoft.com/office/drawing/2014/main" id="{582DAA28-77DF-48AB-A0FA-7D0944EEA418}"/>
               </a:ext>
             </a:extLst>
           </p:cNvPr>
@@ -4665,7 +4665,7 @@
           <p:cNvPr id="85" name="TextBox 84">
             <a:extLst>
               <a:ext uri="{FF2B5EF4-FFF2-40B4-BE49-F238E27FC236}">
-                <a16:creationId xmlns:a16="http://schemas.microsoft.com/office/drawing/2014/main" xmlns="" id="{35632462-2816-4AB9-8863-E2858DF02B69}"/>
+                <a16:creationId xmlns="" xmlns:a16="http://schemas.microsoft.com/office/drawing/2014/main" id="{35632462-2816-4AB9-8863-E2858DF02B69}"/>
               </a:ext>
             </a:extLst>
           </p:cNvPr>
@@ -4700,7 +4700,7 @@
           <p:cNvPr id="98" name="Connector: Elbow 97">
             <a:extLst>
               <a:ext uri="{FF2B5EF4-FFF2-40B4-BE49-F238E27FC236}">
-                <a16:creationId xmlns:a16="http://schemas.microsoft.com/office/drawing/2014/main" xmlns="" id="{A1F2BECA-1D96-4FF9-8754-645C1D7726F8}"/>
+                <a16:creationId xmlns="" xmlns:a16="http://schemas.microsoft.com/office/drawing/2014/main" id="{A1F2BECA-1D96-4FF9-8754-645C1D7726F8}"/>
               </a:ext>
             </a:extLst>
           </p:cNvPr>
@@ -4749,7 +4749,7 @@
           <p:cNvPr id="101" name="Connector: Elbow 100">
             <a:extLst>
               <a:ext uri="{FF2B5EF4-FFF2-40B4-BE49-F238E27FC236}">
-                <a16:creationId xmlns:a16="http://schemas.microsoft.com/office/drawing/2014/main" xmlns="" id="{36519D8D-4EA4-45AD-AD01-BCA533BD100D}"/>
+                <a16:creationId xmlns="" xmlns:a16="http://schemas.microsoft.com/office/drawing/2014/main" id="{36519D8D-4EA4-45AD-AD01-BCA533BD100D}"/>
               </a:ext>
             </a:extLst>
           </p:cNvPr>
@@ -4798,7 +4798,7 @@
           <p:cNvPr id="104" name="TextBox 103">
             <a:extLst>
               <a:ext uri="{FF2B5EF4-FFF2-40B4-BE49-F238E27FC236}">
-                <a16:creationId xmlns:a16="http://schemas.microsoft.com/office/drawing/2014/main" xmlns="" id="{6D855CC4-9F24-4FB0-84C5-F540689823DA}"/>
+                <a16:creationId xmlns="" xmlns:a16="http://schemas.microsoft.com/office/drawing/2014/main" id="{6D855CC4-9F24-4FB0-84C5-F540689823DA}"/>
               </a:ext>
             </a:extLst>
           </p:cNvPr>
@@ -4833,7 +4833,7 @@
           <p:cNvPr id="105" name="TextBox 104">
             <a:extLst>
               <a:ext uri="{FF2B5EF4-FFF2-40B4-BE49-F238E27FC236}">
-                <a16:creationId xmlns:a16="http://schemas.microsoft.com/office/drawing/2014/main" xmlns="" id="{312F8B0D-878E-4CFD-AF2D-6C5C84BC7C3F}"/>
+                <a16:creationId xmlns="" xmlns:a16="http://schemas.microsoft.com/office/drawing/2014/main" id="{312F8B0D-878E-4CFD-AF2D-6C5C84BC7C3F}"/>
               </a:ext>
             </a:extLst>
           </p:cNvPr>
@@ -4868,7 +4868,7 @@
           <p:cNvPr id="106" name="Connector: Elbow 105">
             <a:extLst>
               <a:ext uri="{FF2B5EF4-FFF2-40B4-BE49-F238E27FC236}">
-                <a16:creationId xmlns:a16="http://schemas.microsoft.com/office/drawing/2014/main" xmlns="" id="{AFDAAF80-D279-45C4-BA1C-63276C92DDEA}"/>
+                <a16:creationId xmlns="" xmlns:a16="http://schemas.microsoft.com/office/drawing/2014/main" id="{AFDAAF80-D279-45C4-BA1C-63276C92DDEA}"/>
               </a:ext>
             </a:extLst>
           </p:cNvPr>
@@ -4917,7 +4917,7 @@
           <p:cNvPr id="109" name="TextBox 108">
             <a:extLst>
               <a:ext uri="{FF2B5EF4-FFF2-40B4-BE49-F238E27FC236}">
-                <a16:creationId xmlns:a16="http://schemas.microsoft.com/office/drawing/2014/main" xmlns="" id="{68F80759-A938-4EC4-AB28-CF35C69A0B12}"/>
+                <a16:creationId xmlns="" xmlns:a16="http://schemas.microsoft.com/office/drawing/2014/main" id="{68F80759-A938-4EC4-AB28-CF35C69A0B12}"/>
               </a:ext>
             </a:extLst>
           </p:cNvPr>
@@ -5702,7 +5702,7 @@
           <p:nvPr>
             <p:extLst>
               <p:ext uri="{D42A27DB-BD31-4B8C-83A1-F6EECF244321}">
-                <p14:modId xmlns:p14="http://schemas.microsoft.com/office/powerpoint/2010/main" val="1975495458"/>
+                <p14:modId xmlns:p14="http://schemas.microsoft.com/office/powerpoint/2010/main" val="1196971147"/>
               </p:ext>
             </p:extLst>
           </p:nvPr>
@@ -6037,7 +6037,7 @@
           <p:nvPr>
             <p:extLst>
               <p:ext uri="{D42A27DB-BD31-4B8C-83A1-F6EECF244321}">
-                <p14:modId xmlns:p14="http://schemas.microsoft.com/office/powerpoint/2010/main" val="1208308774"/>
+                <p14:modId xmlns:p14="http://schemas.microsoft.com/office/powerpoint/2010/main" val="4205617760"/>
               </p:ext>
             </p:extLst>
           </p:nvPr>
@@ -6134,8 +6134,8 @@
                     <a:lstStyle/>
                     <a:p>
                       <a:r>
-                        <a:rPr lang="en-AU" sz="1100" b="1" i="1" dirty="0" err="1" smtClean="0"/>
-                        <a:t>int</a:t>
+                        <a:rPr lang="en-AU" sz="1100" b="1" i="1" dirty="0" smtClean="0"/>
+                        <a:t>text</a:t>
                       </a:r>
                       <a:endParaRPr lang="en-AU" sz="1100" b="1" i="1" dirty="0"/>
                     </a:p>
@@ -6557,7 +6557,7 @@
           <p:nvPr>
             <p:extLst>
               <p:ext uri="{D42A27DB-BD31-4B8C-83A1-F6EECF244321}">
-                <p14:modId xmlns:p14="http://schemas.microsoft.com/office/powerpoint/2010/main" val="1393699291"/>
+                <p14:modId xmlns:p14="http://schemas.microsoft.com/office/powerpoint/2010/main" val="3354401884"/>
               </p:ext>
             </p:extLst>
           </p:nvPr>
@@ -6610,10 +6610,10 @@
                     <a:lstStyle/>
                     <a:p>
                       <a:r>
-                        <a:rPr lang="en-AU" sz="1100" dirty="0" err="1" smtClean="0"/>
+                        <a:rPr lang="en-AU" sz="1100" b="1" i="1" dirty="0" err="1" smtClean="0"/>
                         <a:t>party_id</a:t>
                       </a:r>
-                      <a:endParaRPr lang="en-AU" sz="1100" dirty="0"/>
+                      <a:endParaRPr lang="en-AU" sz="1100" b="1" i="1" dirty="0"/>
                     </a:p>
                   </a:txBody>
                   <a:tcPr/>
@@ -6624,10 +6624,10 @@
                     <a:lstStyle/>
                     <a:p>
                       <a:r>
-                        <a:rPr lang="en-AU" sz="1100" dirty="0" err="1" smtClean="0"/>
+                        <a:rPr lang="en-AU" sz="1100" b="1" i="1" dirty="0" err="1" smtClean="0"/>
                         <a:t>int</a:t>
                       </a:r>
-                      <a:endParaRPr lang="en-AU" sz="1100" dirty="0"/>
+                      <a:endParaRPr lang="en-AU" sz="1100" b="1" i="1" dirty="0"/>
                     </a:p>
                   </a:txBody>
                   <a:tcPr/>
@@ -6640,10 +6640,10 @@
                     <a:lstStyle/>
                     <a:p>
                       <a:r>
-                        <a:rPr lang="en-AU" sz="1100" dirty="0" err="1" smtClean="0"/>
+                        <a:rPr lang="en-AU" sz="1100" b="1" i="1" dirty="0" err="1" smtClean="0"/>
                         <a:t>rule_id</a:t>
                       </a:r>
-                      <a:endParaRPr lang="en-AU" sz="1100" dirty="0"/>
+                      <a:endParaRPr lang="en-AU" sz="1100" b="1" i="1" dirty="0"/>
                     </a:p>
                   </a:txBody>
                   <a:tcPr/>
@@ -6654,10 +6654,10 @@
                     <a:lstStyle/>
                     <a:p>
                       <a:r>
-                        <a:rPr lang="en-AU" sz="1100" dirty="0" err="1" smtClean="0"/>
+                        <a:rPr lang="en-AU" sz="1100" b="1" i="1" dirty="0" err="1" smtClean="0"/>
                         <a:t>int</a:t>
                       </a:r>
-                      <a:endParaRPr lang="en-AU" sz="1100" dirty="0"/>
+                      <a:endParaRPr lang="en-AU" sz="1100" b="1" i="1" dirty="0"/>
                     </a:p>
                   </a:txBody>
                   <a:tcPr/>
@@ -6676,7 +6676,7 @@
           <p:nvPr>
             <p:extLst>
               <p:ext uri="{D42A27DB-BD31-4B8C-83A1-F6EECF244321}">
-                <p14:modId xmlns:p14="http://schemas.microsoft.com/office/powerpoint/2010/main" val="2314236767"/>
+                <p14:modId xmlns:p14="http://schemas.microsoft.com/office/powerpoint/2010/main" val="3603093489"/>
               </p:ext>
             </p:extLst>
           </p:nvPr>
@@ -6729,10 +6729,10 @@
                     <a:lstStyle/>
                     <a:p>
                       <a:r>
-                        <a:rPr lang="en-AU" sz="1100" dirty="0" err="1" smtClean="0"/>
+                        <a:rPr lang="en-AU" sz="1100" b="1" i="1" dirty="0" err="1" smtClean="0"/>
                         <a:t>party_id</a:t>
                       </a:r>
-                      <a:endParaRPr lang="en-AU" sz="1100" dirty="0"/>
+                      <a:endParaRPr lang="en-AU" sz="1100" b="1" i="1" dirty="0"/>
                     </a:p>
                   </a:txBody>
                   <a:tcPr/>
@@ -6743,10 +6743,10 @@
                     <a:lstStyle/>
                     <a:p>
                       <a:r>
-                        <a:rPr lang="en-AU" sz="1100" dirty="0" err="1" smtClean="0"/>
+                        <a:rPr lang="en-AU" sz="1100" b="1" i="1" dirty="0" err="1" smtClean="0"/>
                         <a:t>int</a:t>
                       </a:r>
-                      <a:endParaRPr lang="en-AU" sz="1100" dirty="0"/>
+                      <a:endParaRPr lang="en-AU" sz="1100" b="1" i="1" dirty="0"/>
                     </a:p>
                   </a:txBody>
                   <a:tcPr/>
@@ -6759,10 +6759,10 @@
                     <a:lstStyle/>
                     <a:p>
                       <a:r>
-                        <a:rPr lang="en-AU" sz="1100" dirty="0" err="1" smtClean="0"/>
+                        <a:rPr lang="en-AU" sz="1100" b="1" i="1" dirty="0" err="1" smtClean="0"/>
                         <a:t>rule_id</a:t>
                       </a:r>
-                      <a:endParaRPr lang="en-AU" sz="1100" dirty="0"/>
+                      <a:endParaRPr lang="en-AU" sz="1100" b="1" i="1" dirty="0"/>
                     </a:p>
                   </a:txBody>
                   <a:tcPr/>
@@ -6773,10 +6773,10 @@
                     <a:lstStyle/>
                     <a:p>
                       <a:r>
-                        <a:rPr lang="en-AU" sz="1100" dirty="0" err="1" smtClean="0"/>
+                        <a:rPr lang="en-AU" sz="1100" b="1" i="1" dirty="0" err="1" smtClean="0"/>
                         <a:t>int</a:t>
                       </a:r>
-                      <a:endParaRPr lang="en-AU" sz="1100" dirty="0"/>
+                      <a:endParaRPr lang="en-AU" sz="1100" b="1" i="1" dirty="0"/>
                     </a:p>
                   </a:txBody>
                   <a:tcPr/>

</xml_diff>

<commit_message>
Added POLICY_TYPE table Added ON DELETE CASCADE to appropriate tables create_database.py can now be accessed via importing a module or by the command-line Updated DataModel with changes to the database Added db_access.py Set up unit testing for db_access.py
</commit_message>
<xml_diff>
--- a/_docs/DataModel.pptx
+++ b/_docs/DataModel.pptx
@@ -262,7 +262,7 @@
           <a:p>
             <a:fld id="{2F956D3E-0B91-471C-9743-3F865EE6F573}" type="datetimeFigureOut">
               <a:rPr lang="en-AU" smtClean="0"/>
-              <a:t>2/08/2018</a:t>
+              <a:t>3/08/2018</a:t>
             </a:fld>
             <a:endParaRPr lang="en-AU"/>
           </a:p>
@@ -462,7 +462,7 @@
           <a:p>
             <a:fld id="{2F956D3E-0B91-471C-9743-3F865EE6F573}" type="datetimeFigureOut">
               <a:rPr lang="en-AU" smtClean="0"/>
-              <a:t>2/08/2018</a:t>
+              <a:t>3/08/2018</a:t>
             </a:fld>
             <a:endParaRPr lang="en-AU"/>
           </a:p>
@@ -672,7 +672,7 @@
           <a:p>
             <a:fld id="{2F956D3E-0B91-471C-9743-3F865EE6F573}" type="datetimeFigureOut">
               <a:rPr lang="en-AU" smtClean="0"/>
-              <a:t>2/08/2018</a:t>
+              <a:t>3/08/2018</a:t>
             </a:fld>
             <a:endParaRPr lang="en-AU"/>
           </a:p>
@@ -872,7 +872,7 @@
           <a:p>
             <a:fld id="{2F956D3E-0B91-471C-9743-3F865EE6F573}" type="datetimeFigureOut">
               <a:rPr lang="en-AU" smtClean="0"/>
-              <a:t>2/08/2018</a:t>
+              <a:t>3/08/2018</a:t>
             </a:fld>
             <a:endParaRPr lang="en-AU"/>
           </a:p>
@@ -1148,7 +1148,7 @@
           <a:p>
             <a:fld id="{2F956D3E-0B91-471C-9743-3F865EE6F573}" type="datetimeFigureOut">
               <a:rPr lang="en-AU" smtClean="0"/>
-              <a:t>2/08/2018</a:t>
+              <a:t>3/08/2018</a:t>
             </a:fld>
             <a:endParaRPr lang="en-AU"/>
           </a:p>
@@ -1416,7 +1416,7 @@
           <a:p>
             <a:fld id="{2F956D3E-0B91-471C-9743-3F865EE6F573}" type="datetimeFigureOut">
               <a:rPr lang="en-AU" smtClean="0"/>
-              <a:t>2/08/2018</a:t>
+              <a:t>3/08/2018</a:t>
             </a:fld>
             <a:endParaRPr lang="en-AU"/>
           </a:p>
@@ -1831,7 +1831,7 @@
           <a:p>
             <a:fld id="{2F956D3E-0B91-471C-9743-3F865EE6F573}" type="datetimeFigureOut">
               <a:rPr lang="en-AU" smtClean="0"/>
-              <a:t>2/08/2018</a:t>
+              <a:t>3/08/2018</a:t>
             </a:fld>
             <a:endParaRPr lang="en-AU"/>
           </a:p>
@@ -1973,7 +1973,7 @@
           <a:p>
             <a:fld id="{2F956D3E-0B91-471C-9743-3F865EE6F573}" type="datetimeFigureOut">
               <a:rPr lang="en-AU" smtClean="0"/>
-              <a:t>2/08/2018</a:t>
+              <a:t>3/08/2018</a:t>
             </a:fld>
             <a:endParaRPr lang="en-AU"/>
           </a:p>
@@ -2086,7 +2086,7 @@
           <a:p>
             <a:fld id="{2F956D3E-0B91-471C-9743-3F865EE6F573}" type="datetimeFigureOut">
               <a:rPr lang="en-AU" smtClean="0"/>
-              <a:t>2/08/2018</a:t>
+              <a:t>3/08/2018</a:t>
             </a:fld>
             <a:endParaRPr lang="en-AU"/>
           </a:p>
@@ -2399,7 +2399,7 @@
           <a:p>
             <a:fld id="{2F956D3E-0B91-471C-9743-3F865EE6F573}" type="datetimeFigureOut">
               <a:rPr lang="en-AU" smtClean="0"/>
-              <a:t>2/08/2018</a:t>
+              <a:t>3/08/2018</a:t>
             </a:fld>
             <a:endParaRPr lang="en-AU"/>
           </a:p>
@@ -2688,7 +2688,7 @@
           <a:p>
             <a:fld id="{2F956D3E-0B91-471C-9743-3F865EE6F573}" type="datetimeFigureOut">
               <a:rPr lang="en-AU" smtClean="0"/>
-              <a:t>2/08/2018</a:t>
+              <a:t>3/08/2018</a:t>
             </a:fld>
             <a:endParaRPr lang="en-AU"/>
           </a:p>
@@ -2931,7 +2931,7 @@
           <a:p>
             <a:fld id="{2F956D3E-0B91-471C-9743-3F865EE6F573}" type="datetimeFigureOut">
               <a:rPr lang="en-AU" smtClean="0"/>
-              <a:t>2/08/2018</a:t>
+              <a:t>3/08/2018</a:t>
             </a:fld>
             <a:endParaRPr lang="en-AU"/>
           </a:p>
@@ -4986,7 +4986,7 @@
           <p:nvPr>
             <p:extLst>
               <p:ext uri="{D42A27DB-BD31-4B8C-83A1-F6EECF244321}">
-                <p14:modId xmlns:p14="http://schemas.microsoft.com/office/powerpoint/2010/main" val="1196620685"/>
+                <p14:modId xmlns:p14="http://schemas.microsoft.com/office/powerpoint/2010/main" val="2786715868"/>
               </p:ext>
             </p:extLst>
           </p:nvPr>
@@ -5039,7 +5039,7 @@
                     <a:lstStyle/>
                     <a:p>
                       <a:r>
-                        <a:rPr lang="en-AU" sz="1100" dirty="0" smtClean="0"/>
+                        <a:rPr lang="en-AU" sz="1100" b="1" dirty="0" smtClean="0"/>
                         <a:t>id</a:t>
                       </a:r>
                     </a:p>
@@ -5052,10 +5052,10 @@
                     <a:lstStyle/>
                     <a:p>
                       <a:r>
-                        <a:rPr lang="en-AU" sz="1100" dirty="0" err="1" smtClean="0"/>
+                        <a:rPr lang="en-AU" sz="1100" b="1" dirty="0" err="1" smtClean="0"/>
                         <a:t>int</a:t>
                       </a:r>
-                      <a:endParaRPr lang="en-AU" sz="1100" dirty="0" smtClean="0"/>
+                      <a:endParaRPr lang="en-AU" sz="1100" b="1" dirty="0" smtClean="0"/>
                     </a:p>
                   </a:txBody>
                   <a:tcPr/>
@@ -5134,14 +5134,14 @@
           <p:nvPr>
             <p:extLst>
               <p:ext uri="{D42A27DB-BD31-4B8C-83A1-F6EECF244321}">
-                <p14:modId xmlns:p14="http://schemas.microsoft.com/office/powerpoint/2010/main" val="936693467"/>
+                <p14:modId xmlns:p14="http://schemas.microsoft.com/office/powerpoint/2010/main" val="3580802807"/>
               </p:ext>
             </p:extLst>
           </p:nvPr>
         </p:nvGraphicFramePr>
         <p:xfrm>
           <a:off x="9979894" y="2452501"/>
-          <a:ext cx="1557580" cy="4024748"/>
+          <a:ext cx="1557580" cy="4312230"/>
         </p:xfrm>
         <a:graphic>
           <a:graphicData uri="http://schemas.openxmlformats.org/drawingml/2006/table">
@@ -5205,6 +5205,36 @@
                         <a:t>int</a:t>
                       </a:r>
                       <a:endParaRPr lang="en-AU" sz="1100" b="1" dirty="0" smtClean="0"/>
+                    </a:p>
+                  </a:txBody>
+                  <a:tcPr/>
+                </a:tc>
+              </a:tr>
+              <a:tr h="287482">
+                <a:tc>
+                  <a:txBody>
+                    <a:bodyPr/>
+                    <a:lstStyle/>
+                    <a:p>
+                      <a:r>
+                        <a:rPr lang="en-AU" sz="1100" b="0" smtClean="0"/>
+                        <a:t>uri</a:t>
+                      </a:r>
+                      <a:endParaRPr lang="en-AU" sz="1100" b="0" dirty="0"/>
+                    </a:p>
+                  </a:txBody>
+                  <a:tcPr/>
+                </a:tc>
+                <a:tc>
+                  <a:txBody>
+                    <a:bodyPr/>
+                    <a:lstStyle/>
+                    <a:p>
+                      <a:r>
+                        <a:rPr lang="en-AU" sz="1100" b="0" dirty="0" smtClean="0"/>
+                        <a:t>text</a:t>
+                      </a:r>
+                      <a:endParaRPr lang="en-AU" sz="1100" b="0" dirty="0" smtClean="0"/>
                     </a:p>
                   </a:txBody>
                   <a:tcPr/>
@@ -5702,7 +5732,7 @@
           <p:nvPr>
             <p:extLst>
               <p:ext uri="{D42A27DB-BD31-4B8C-83A1-F6EECF244321}">
-                <p14:modId xmlns:p14="http://schemas.microsoft.com/office/powerpoint/2010/main" val="1196971147"/>
+                <p14:modId xmlns:p14="http://schemas.microsoft.com/office/powerpoint/2010/main" val="3513400047"/>
               </p:ext>
             </p:extLst>
           </p:nvPr>
@@ -6037,7 +6067,7 @@
           <p:nvPr>
             <p:extLst>
               <p:ext uri="{D42A27DB-BD31-4B8C-83A1-F6EECF244321}">
-                <p14:modId xmlns:p14="http://schemas.microsoft.com/office/powerpoint/2010/main" val="4205617760"/>
+                <p14:modId xmlns:p14="http://schemas.microsoft.com/office/powerpoint/2010/main" val="2951076628"/>
               </p:ext>
             </p:extLst>
           </p:nvPr>
@@ -6120,8 +6150,8 @@
                     <a:lstStyle/>
                     <a:p>
                       <a:r>
-                        <a:rPr lang="en-AU" sz="1100" b="1" i="1" dirty="0" smtClean="0"/>
-                        <a:t>action</a:t>
+                        <a:rPr lang="en-AU" sz="1100" b="1" i="1" dirty="0" err="1" smtClean="0"/>
+                        <a:t>action_id</a:t>
                       </a:r>
                       <a:endParaRPr lang="en-AU" sz="1100" b="1" i="1" dirty="0"/>
                     </a:p>
@@ -6134,8 +6164,8 @@
                     <a:lstStyle/>
                     <a:p>
                       <a:r>
-                        <a:rPr lang="en-AU" sz="1100" b="1" i="1" dirty="0" smtClean="0"/>
-                        <a:t>text</a:t>
+                        <a:rPr lang="en-AU" sz="1100" b="1" i="1" dirty="0" err="1" smtClean="0"/>
+                        <a:t>int</a:t>
                       </a:r>
                       <a:endParaRPr lang="en-AU" sz="1100" b="1" i="1" dirty="0"/>
                     </a:p>
@@ -6192,14 +6222,14 @@
           <p:nvPr>
             <p:extLst>
               <p:ext uri="{D42A27DB-BD31-4B8C-83A1-F6EECF244321}">
-                <p14:modId xmlns:p14="http://schemas.microsoft.com/office/powerpoint/2010/main" val="1975689443"/>
+                <p14:modId xmlns:p14="http://schemas.microsoft.com/office/powerpoint/2010/main" val="3805028368"/>
               </p:ext>
             </p:extLst>
           </p:nvPr>
         </p:nvGraphicFramePr>
         <p:xfrm>
           <a:off x="4467593" y="4289614"/>
-          <a:ext cx="1597812" cy="944880"/>
+          <a:ext cx="1597812" cy="1722120"/>
         </p:xfrm>
         <a:graphic>
           <a:graphicData uri="http://schemas.openxmlformats.org/drawingml/2006/table">
@@ -6245,10 +6275,9 @@
                     <a:bodyPr/>
                     <a:lstStyle/>
                     <a:p>
-                      <a:pPr algn="l"/>
                       <a:r>
                         <a:rPr lang="en-AU" sz="1100" b="1" dirty="0" smtClean="0"/>
-                        <a:t>type</a:t>
+                        <a:t>id</a:t>
                       </a:r>
                       <a:endParaRPr lang="en-AU" sz="1100" b="1" dirty="0"/>
                     </a:p>
@@ -6260,12 +6289,101 @@
                     <a:bodyPr/>
                     <a:lstStyle/>
                     <a:p>
-                      <a:pPr algn="l"/>
-                      <a:r>
-                        <a:rPr lang="en-AU" sz="1100" b="1" dirty="0" smtClean="0"/>
+                      <a:r>
+                        <a:rPr lang="en-AU" sz="1100" b="1" dirty="0" err="1" smtClean="0"/>
+                        <a:t>int</a:t>
+                      </a:r>
+                      <a:endParaRPr lang="en-AU" sz="1100" b="1" dirty="0"/>
+                    </a:p>
+                  </a:txBody>
+                  <a:tcPr/>
+                </a:tc>
+              </a:tr>
+              <a:tr h="177442">
+                <a:tc>
+                  <a:txBody>
+                    <a:bodyPr/>
+                    <a:lstStyle/>
+                    <a:p>
+                      <a:r>
+                        <a:rPr lang="en-AU" sz="1100" b="0" dirty="0" smtClean="0"/>
+                        <a:t>label</a:t>
+                      </a:r>
+                      <a:endParaRPr lang="en-AU" sz="1100" b="0" dirty="0"/>
+                    </a:p>
+                  </a:txBody>
+                  <a:tcPr/>
+                </a:tc>
+                <a:tc>
+                  <a:txBody>
+                    <a:bodyPr/>
+                    <a:lstStyle/>
+                    <a:p>
+                      <a:r>
+                        <a:rPr lang="en-AU" sz="1100" b="0" dirty="0" smtClean="0"/>
                         <a:t>text</a:t>
                       </a:r>
-                      <a:endParaRPr lang="en-AU" sz="1100" b="1" dirty="0"/>
+                      <a:endParaRPr lang="en-AU" sz="1100" b="0" dirty="0"/>
+                    </a:p>
+                  </a:txBody>
+                  <a:tcPr/>
+                </a:tc>
+              </a:tr>
+              <a:tr h="177442">
+                <a:tc>
+                  <a:txBody>
+                    <a:bodyPr/>
+                    <a:lstStyle/>
+                    <a:p>
+                      <a:r>
+                        <a:rPr lang="en-AU" sz="1100" b="0" dirty="0" err="1" smtClean="0"/>
+                        <a:t>uri</a:t>
+                      </a:r>
+                      <a:endParaRPr lang="en-AU" sz="1100" b="0" dirty="0"/>
+                    </a:p>
+                  </a:txBody>
+                  <a:tcPr/>
+                </a:tc>
+                <a:tc>
+                  <a:txBody>
+                    <a:bodyPr/>
+                    <a:lstStyle/>
+                    <a:p>
+                      <a:r>
+                        <a:rPr lang="en-AU" sz="1100" b="0" dirty="0" smtClean="0"/>
+                        <a:t>text</a:t>
+                      </a:r>
+                      <a:endParaRPr lang="en-AU" sz="1100" b="0" dirty="0"/>
+                    </a:p>
+                  </a:txBody>
+                  <a:tcPr/>
+                </a:tc>
+              </a:tr>
+              <a:tr h="177442">
+                <a:tc>
+                  <a:txBody>
+                    <a:bodyPr/>
+                    <a:lstStyle/>
+                    <a:p>
+                      <a:r>
+                        <a:rPr lang="en-AU" sz="1100" b="0" dirty="0" smtClean="0"/>
+                        <a:t>definition</a:t>
+                      </a:r>
+                      <a:endParaRPr lang="en-AU" sz="1100" b="0" dirty="0"/>
+                    </a:p>
+                  </a:txBody>
+                  <a:tcPr/>
+                </a:tc>
+                <a:tc>
+                  <a:txBody>
+                    <a:bodyPr/>
+                    <a:lstStyle/>
+                    <a:p>
+                      <a:r>
+                        <a:rPr lang="en-AU" sz="1100" b="0" dirty="0" smtClean="0"/>
+                        <a:t>text</a:t>
+                      </a:r>
+                      <a:endParaRPr lang="en-AU" sz="1100" b="0" dirty="0"/>
                     </a:p>
                   </a:txBody>
                   <a:tcPr/>
@@ -7004,6 +7122,212 @@
           </a:fontRef>
         </p:style>
       </p:cxnSp>
+      <p:graphicFrame>
+        <p:nvGraphicFramePr>
+          <p:cNvPr id="2" name="Table 1"/>
+          <p:cNvGraphicFramePr>
+            <a:graphicFrameLocks noGrp="1"/>
+          </p:cNvGraphicFramePr>
+          <p:nvPr>
+            <p:extLst>
+              <p:ext uri="{D42A27DB-BD31-4B8C-83A1-F6EECF244321}">
+                <p14:modId xmlns:p14="http://schemas.microsoft.com/office/powerpoint/2010/main" val="2143358870"/>
+              </p:ext>
+            </p:extLst>
+          </p:nvPr>
+        </p:nvGraphicFramePr>
+        <p:xfrm>
+          <a:off x="7227454" y="5077834"/>
+          <a:ext cx="1407392" cy="1015858"/>
+        </p:xfrm>
+        <a:graphic>
+          <a:graphicData uri="http://schemas.openxmlformats.org/drawingml/2006/table">
+            <a:tbl>
+              <a:tblPr firstRow="1" bandRow="1">
+                <a:tableStyleId>{5C22544A-7EE6-4342-B048-85BDC9FD1C3A}</a:tableStyleId>
+              </a:tblPr>
+              <a:tblGrid>
+                <a:gridCol w="703696"/>
+                <a:gridCol w="703696"/>
+              </a:tblGrid>
+              <a:tr h="294569">
+                <a:tc gridSpan="2">
+                  <a:txBody>
+                    <a:bodyPr/>
+                    <a:lstStyle/>
+                    <a:p>
+                      <a:pPr algn="ctr"/>
+                      <a:r>
+                        <a:rPr lang="en-AU" sz="1100" dirty="0" err="1" smtClean="0"/>
+                        <a:t>PolicyType</a:t>
+                      </a:r>
+                      <a:endParaRPr lang="en-AU" sz="1100" dirty="0"/>
+                    </a:p>
+                  </a:txBody>
+                  <a:tcPr/>
+                </a:tc>
+                <a:tc hMerge="1">
+                  <a:txBody>
+                    <a:bodyPr/>
+                    <a:lstStyle/>
+                    <a:p>
+                      <a:endParaRPr lang="en-AU" sz="1100" dirty="0"/>
+                    </a:p>
+                  </a:txBody>
+                  <a:tcPr/>
+                </a:tc>
+              </a:tr>
+              <a:tr h="294569">
+                <a:tc>
+                  <a:txBody>
+                    <a:bodyPr/>
+                    <a:lstStyle/>
+                    <a:p>
+                      <a:r>
+                        <a:rPr lang="en-AU" sz="1100" b="1" dirty="0" smtClean="0"/>
+                        <a:t>type</a:t>
+                      </a:r>
+                      <a:endParaRPr lang="en-AU" sz="1100" b="1" dirty="0"/>
+                    </a:p>
+                  </a:txBody>
+                  <a:tcPr/>
+                </a:tc>
+                <a:tc>
+                  <a:txBody>
+                    <a:bodyPr/>
+                    <a:lstStyle/>
+                    <a:p>
+                      <a:r>
+                        <a:rPr lang="en-AU" sz="1100" b="1" dirty="0" smtClean="0"/>
+                        <a:t>text</a:t>
+                      </a:r>
+                      <a:endParaRPr lang="en-AU" sz="1100" b="1" dirty="0"/>
+                    </a:p>
+                  </a:txBody>
+                  <a:tcPr/>
+                </a:tc>
+              </a:tr>
+              <a:tr h="294569">
+                <a:tc gridSpan="2">
+                  <a:txBody>
+                    <a:bodyPr/>
+                    <a:lstStyle/>
+                    <a:p>
+                      <a:r>
+                        <a:rPr lang="en-AU" sz="1100" dirty="0" smtClean="0"/>
+                        <a:t>preloaded with ‘licence’</a:t>
+                      </a:r>
+                      <a:endParaRPr lang="en-AU" sz="1100" dirty="0"/>
+                    </a:p>
+                  </a:txBody>
+                  <a:tcPr/>
+                </a:tc>
+                <a:tc hMerge="1">
+                  <a:txBody>
+                    <a:bodyPr/>
+                    <a:lstStyle/>
+                    <a:p>
+                      <a:endParaRPr lang="en-AU" sz="1100" dirty="0"/>
+                    </a:p>
+                  </a:txBody>
+                  <a:tcPr/>
+                </a:tc>
+              </a:tr>
+            </a:tbl>
+          </a:graphicData>
+        </a:graphic>
+      </p:graphicFrame>
+      <p:cxnSp>
+        <p:nvCxnSpPr>
+          <p:cNvPr id="6" name="Straight Arrow Connector 5"/>
+          <p:cNvCxnSpPr>
+            <a:endCxn id="2" idx="3"/>
+          </p:cNvCxnSpPr>
+          <p:nvPr/>
+        </p:nvCxnSpPr>
+        <p:spPr>
+          <a:xfrm flipH="1">
+            <a:off x="8634846" y="3488268"/>
+            <a:ext cx="1345048" cy="2097495"/>
+          </a:xfrm>
+          <a:prstGeom prst="straightConnector1">
+            <a:avLst/>
+          </a:prstGeom>
+          <a:ln>
+            <a:tailEnd type="triangle"/>
+          </a:ln>
+        </p:spPr>
+        <p:style>
+          <a:lnRef idx="1">
+            <a:schemeClr val="accent1"/>
+          </a:lnRef>
+          <a:fillRef idx="0">
+            <a:schemeClr val="accent1"/>
+          </a:fillRef>
+          <a:effectRef idx="0">
+            <a:schemeClr val="accent1"/>
+          </a:effectRef>
+          <a:fontRef idx="minor">
+            <a:schemeClr val="tx1"/>
+          </a:fontRef>
+        </p:style>
+      </p:cxnSp>
+      <p:sp>
+        <p:nvSpPr>
+          <p:cNvPr id="7" name="TextBox 6"/>
+          <p:cNvSpPr txBox="1"/>
+          <p:nvPr/>
+        </p:nvSpPr>
+        <p:spPr>
+          <a:xfrm>
+            <a:off x="2381250" y="428625"/>
+            <a:ext cx="6051657" cy="430887"/>
+          </a:xfrm>
+          <a:prstGeom prst="rect">
+            <a:avLst/>
+          </a:prstGeom>
+          <a:noFill/>
+        </p:spPr>
+        <p:txBody>
+          <a:bodyPr wrap="none" rtlCol="0">
+            <a:spAutoFit/>
+          </a:bodyPr>
+          <a:lstStyle/>
+          <a:p>
+            <a:r>
+              <a:rPr lang="en-AU" sz="1100" dirty="0" smtClean="0"/>
+              <a:t>The purpose of the ‘Action’, ‘</a:t>
+            </a:r>
+            <a:r>
+              <a:rPr lang="en-AU" sz="1100" dirty="0" err="1" smtClean="0"/>
+              <a:t>PolicyType</a:t>
+            </a:r>
+            <a:r>
+              <a:rPr lang="en-AU" sz="1100" dirty="0" smtClean="0"/>
+              <a:t>’ and ‘</a:t>
+            </a:r>
+            <a:r>
+              <a:rPr lang="en-AU" sz="1100" dirty="0" err="1" smtClean="0"/>
+              <a:t>RuleType</a:t>
+            </a:r>
+            <a:r>
+              <a:rPr lang="en-AU" sz="1100" dirty="0" smtClean="0"/>
+              <a:t>’ tables are to restrict the allowed values in the </a:t>
+            </a:r>
+          </a:p>
+          <a:p>
+            <a:r>
+              <a:rPr lang="en-AU" sz="1100" dirty="0"/>
+              <a:t>t</a:t>
+            </a:r>
+            <a:r>
+              <a:rPr lang="en-AU" sz="1100" dirty="0" smtClean="0"/>
+              <a:t>ables which reference them with a foreign key.</a:t>
+            </a:r>
+            <a:endParaRPr lang="en-AU" sz="1100" dirty="0"/>
+          </a:p>
+        </p:txBody>
+      </p:sp>
     </p:spTree>
     <p:extLst>
       <p:ext uri="{BB962C8B-B14F-4D97-AF65-F5344CB8AC3E}">

</xml_diff>

<commit_message>
Revised and simplified database design. Eliminated unnecessary int primary keys. Added get_permitted_rule_types() and action_exists() to db_access.py. Switched to using pytest fixtures in tests.
</commit_message>
<xml_diff>
--- a/_docs/DataModel.pptx
+++ b/_docs/DataModel.pptx
@@ -135,7 +135,7 @@
           <p:cNvPr id="2" name="Title 1">
             <a:extLst>
               <a:ext uri="{FF2B5EF4-FFF2-40B4-BE49-F238E27FC236}">
-                <a16:creationId xmlns="" xmlns:a16="http://schemas.microsoft.com/office/drawing/2014/main" id="{7812FAD9-B738-4E2B-A9F3-7D6DA8649C7B}"/>
+                <a16:creationId xmlns:a16="http://schemas.microsoft.com/office/drawing/2014/main" xmlns="" id="{7812FAD9-B738-4E2B-A9F3-7D6DA8649C7B}"/>
               </a:ext>
             </a:extLst>
           </p:cNvPr>
@@ -173,7 +173,7 @@
           <p:cNvPr id="3" name="Subtitle 2">
             <a:extLst>
               <a:ext uri="{FF2B5EF4-FFF2-40B4-BE49-F238E27FC236}">
-                <a16:creationId xmlns="" xmlns:a16="http://schemas.microsoft.com/office/drawing/2014/main" id="{CED3ABCF-AD94-42E3-95E2-D5E653DEF63F}"/>
+                <a16:creationId xmlns:a16="http://schemas.microsoft.com/office/drawing/2014/main" xmlns="" id="{CED3ABCF-AD94-42E3-95E2-D5E653DEF63F}"/>
               </a:ext>
             </a:extLst>
           </p:cNvPr>
@@ -244,7 +244,7 @@
           <p:cNvPr id="4" name="Date Placeholder 3">
             <a:extLst>
               <a:ext uri="{FF2B5EF4-FFF2-40B4-BE49-F238E27FC236}">
-                <a16:creationId xmlns="" xmlns:a16="http://schemas.microsoft.com/office/drawing/2014/main" id="{5AB92BAC-2DD4-42CE-9065-E2518728CD65}"/>
+                <a16:creationId xmlns:a16="http://schemas.microsoft.com/office/drawing/2014/main" xmlns="" id="{5AB92BAC-2DD4-42CE-9065-E2518728CD65}"/>
               </a:ext>
             </a:extLst>
           </p:cNvPr>
@@ -262,7 +262,7 @@
           <a:p>
             <a:fld id="{2F956D3E-0B91-471C-9743-3F865EE6F573}" type="datetimeFigureOut">
               <a:rPr lang="en-AU" smtClean="0"/>
-              <a:t>3/08/2018</a:t>
+              <a:t>14/08/2018</a:t>
             </a:fld>
             <a:endParaRPr lang="en-AU"/>
           </a:p>
@@ -273,7 +273,7 @@
           <p:cNvPr id="5" name="Footer Placeholder 4">
             <a:extLst>
               <a:ext uri="{FF2B5EF4-FFF2-40B4-BE49-F238E27FC236}">
-                <a16:creationId xmlns="" xmlns:a16="http://schemas.microsoft.com/office/drawing/2014/main" id="{137C3D4C-B868-4F83-8919-AE7F2500E437}"/>
+                <a16:creationId xmlns:a16="http://schemas.microsoft.com/office/drawing/2014/main" xmlns="" id="{137C3D4C-B868-4F83-8919-AE7F2500E437}"/>
               </a:ext>
             </a:extLst>
           </p:cNvPr>
@@ -298,7 +298,7 @@
           <p:cNvPr id="6" name="Slide Number Placeholder 5">
             <a:extLst>
               <a:ext uri="{FF2B5EF4-FFF2-40B4-BE49-F238E27FC236}">
-                <a16:creationId xmlns="" xmlns:a16="http://schemas.microsoft.com/office/drawing/2014/main" id="{ABBB53F0-83D7-42D4-90A5-7D5EE7C0AAD3}"/>
+                <a16:creationId xmlns:a16="http://schemas.microsoft.com/office/drawing/2014/main" xmlns="" id="{ABBB53F0-83D7-42D4-90A5-7D5EE7C0AAD3}"/>
               </a:ext>
             </a:extLst>
           </p:cNvPr>
@@ -357,7 +357,7 @@
           <p:cNvPr id="2" name="Title 1">
             <a:extLst>
               <a:ext uri="{FF2B5EF4-FFF2-40B4-BE49-F238E27FC236}">
-                <a16:creationId xmlns="" xmlns:a16="http://schemas.microsoft.com/office/drawing/2014/main" id="{EDEAE3B1-565C-4AD8-A67C-7D2C44ECA18D}"/>
+                <a16:creationId xmlns:a16="http://schemas.microsoft.com/office/drawing/2014/main" xmlns="" id="{EDEAE3B1-565C-4AD8-A67C-7D2C44ECA18D}"/>
               </a:ext>
             </a:extLst>
           </p:cNvPr>
@@ -386,7 +386,7 @@
           <p:cNvPr id="3" name="Vertical Text Placeholder 2">
             <a:extLst>
               <a:ext uri="{FF2B5EF4-FFF2-40B4-BE49-F238E27FC236}">
-                <a16:creationId xmlns="" xmlns:a16="http://schemas.microsoft.com/office/drawing/2014/main" id="{89499874-28E0-4013-933C-7A7F4857D944}"/>
+                <a16:creationId xmlns:a16="http://schemas.microsoft.com/office/drawing/2014/main" xmlns="" id="{89499874-28E0-4013-933C-7A7F4857D944}"/>
               </a:ext>
             </a:extLst>
           </p:cNvPr>
@@ -444,7 +444,7 @@
           <p:cNvPr id="4" name="Date Placeholder 3">
             <a:extLst>
               <a:ext uri="{FF2B5EF4-FFF2-40B4-BE49-F238E27FC236}">
-                <a16:creationId xmlns="" xmlns:a16="http://schemas.microsoft.com/office/drawing/2014/main" id="{30B68540-FC47-4085-8638-DE11BCE14D7E}"/>
+                <a16:creationId xmlns:a16="http://schemas.microsoft.com/office/drawing/2014/main" xmlns="" id="{30B68540-FC47-4085-8638-DE11BCE14D7E}"/>
               </a:ext>
             </a:extLst>
           </p:cNvPr>
@@ -462,7 +462,7 @@
           <a:p>
             <a:fld id="{2F956D3E-0B91-471C-9743-3F865EE6F573}" type="datetimeFigureOut">
               <a:rPr lang="en-AU" smtClean="0"/>
-              <a:t>3/08/2018</a:t>
+              <a:t>14/08/2018</a:t>
             </a:fld>
             <a:endParaRPr lang="en-AU"/>
           </a:p>
@@ -473,7 +473,7 @@
           <p:cNvPr id="5" name="Footer Placeholder 4">
             <a:extLst>
               <a:ext uri="{FF2B5EF4-FFF2-40B4-BE49-F238E27FC236}">
-                <a16:creationId xmlns="" xmlns:a16="http://schemas.microsoft.com/office/drawing/2014/main" id="{149BDF69-9D0A-4871-B742-85D1C27ACA21}"/>
+                <a16:creationId xmlns:a16="http://schemas.microsoft.com/office/drawing/2014/main" xmlns="" id="{149BDF69-9D0A-4871-B742-85D1C27ACA21}"/>
               </a:ext>
             </a:extLst>
           </p:cNvPr>
@@ -498,7 +498,7 @@
           <p:cNvPr id="6" name="Slide Number Placeholder 5">
             <a:extLst>
               <a:ext uri="{FF2B5EF4-FFF2-40B4-BE49-F238E27FC236}">
-                <a16:creationId xmlns="" xmlns:a16="http://schemas.microsoft.com/office/drawing/2014/main" id="{BAC96E6A-25E9-4A3D-BDE5-E881314DE0D7}"/>
+                <a16:creationId xmlns:a16="http://schemas.microsoft.com/office/drawing/2014/main" xmlns="" id="{BAC96E6A-25E9-4A3D-BDE5-E881314DE0D7}"/>
               </a:ext>
             </a:extLst>
           </p:cNvPr>
@@ -557,7 +557,7 @@
           <p:cNvPr id="2" name="Vertical Title 1">
             <a:extLst>
               <a:ext uri="{FF2B5EF4-FFF2-40B4-BE49-F238E27FC236}">
-                <a16:creationId xmlns="" xmlns:a16="http://schemas.microsoft.com/office/drawing/2014/main" id="{8BD4BC0C-9CFC-4FB2-B5C6-6EEC1B7F772D}"/>
+                <a16:creationId xmlns:a16="http://schemas.microsoft.com/office/drawing/2014/main" xmlns="" id="{8BD4BC0C-9CFC-4FB2-B5C6-6EEC1B7F772D}"/>
               </a:ext>
             </a:extLst>
           </p:cNvPr>
@@ -591,7 +591,7 @@
           <p:cNvPr id="3" name="Vertical Text Placeholder 2">
             <a:extLst>
               <a:ext uri="{FF2B5EF4-FFF2-40B4-BE49-F238E27FC236}">
-                <a16:creationId xmlns="" xmlns:a16="http://schemas.microsoft.com/office/drawing/2014/main" id="{5CF7FA3D-9ABB-49C7-AF65-E0869B2150C9}"/>
+                <a16:creationId xmlns:a16="http://schemas.microsoft.com/office/drawing/2014/main" xmlns="" id="{5CF7FA3D-9ABB-49C7-AF65-E0869B2150C9}"/>
               </a:ext>
             </a:extLst>
           </p:cNvPr>
@@ -654,7 +654,7 @@
           <p:cNvPr id="4" name="Date Placeholder 3">
             <a:extLst>
               <a:ext uri="{FF2B5EF4-FFF2-40B4-BE49-F238E27FC236}">
-                <a16:creationId xmlns="" xmlns:a16="http://schemas.microsoft.com/office/drawing/2014/main" id="{FBF00D9E-50E5-4276-BC40-27125BC1B69A}"/>
+                <a16:creationId xmlns:a16="http://schemas.microsoft.com/office/drawing/2014/main" xmlns="" id="{FBF00D9E-50E5-4276-BC40-27125BC1B69A}"/>
               </a:ext>
             </a:extLst>
           </p:cNvPr>
@@ -672,7 +672,7 @@
           <a:p>
             <a:fld id="{2F956D3E-0B91-471C-9743-3F865EE6F573}" type="datetimeFigureOut">
               <a:rPr lang="en-AU" smtClean="0"/>
-              <a:t>3/08/2018</a:t>
+              <a:t>14/08/2018</a:t>
             </a:fld>
             <a:endParaRPr lang="en-AU"/>
           </a:p>
@@ -683,7 +683,7 @@
           <p:cNvPr id="5" name="Footer Placeholder 4">
             <a:extLst>
               <a:ext uri="{FF2B5EF4-FFF2-40B4-BE49-F238E27FC236}">
-                <a16:creationId xmlns="" xmlns:a16="http://schemas.microsoft.com/office/drawing/2014/main" id="{3AA20A04-EE64-4C85-A4C3-C674E216B21E}"/>
+                <a16:creationId xmlns:a16="http://schemas.microsoft.com/office/drawing/2014/main" xmlns="" id="{3AA20A04-EE64-4C85-A4C3-C674E216B21E}"/>
               </a:ext>
             </a:extLst>
           </p:cNvPr>
@@ -708,7 +708,7 @@
           <p:cNvPr id="6" name="Slide Number Placeholder 5">
             <a:extLst>
               <a:ext uri="{FF2B5EF4-FFF2-40B4-BE49-F238E27FC236}">
-                <a16:creationId xmlns="" xmlns:a16="http://schemas.microsoft.com/office/drawing/2014/main" id="{0F34C053-3886-4674-85D6-13CCCB876AEC}"/>
+                <a16:creationId xmlns:a16="http://schemas.microsoft.com/office/drawing/2014/main" xmlns="" id="{0F34C053-3886-4674-85D6-13CCCB876AEC}"/>
               </a:ext>
             </a:extLst>
           </p:cNvPr>
@@ -767,7 +767,7 @@
           <p:cNvPr id="2" name="Title 1">
             <a:extLst>
               <a:ext uri="{FF2B5EF4-FFF2-40B4-BE49-F238E27FC236}">
-                <a16:creationId xmlns="" xmlns:a16="http://schemas.microsoft.com/office/drawing/2014/main" id="{6D70D093-F0D3-479C-B65D-3031107C0DF1}"/>
+                <a16:creationId xmlns:a16="http://schemas.microsoft.com/office/drawing/2014/main" xmlns="" id="{6D70D093-F0D3-479C-B65D-3031107C0DF1}"/>
               </a:ext>
             </a:extLst>
           </p:cNvPr>
@@ -796,7 +796,7 @@
           <p:cNvPr id="3" name="Content Placeholder 2">
             <a:extLst>
               <a:ext uri="{FF2B5EF4-FFF2-40B4-BE49-F238E27FC236}">
-                <a16:creationId xmlns="" xmlns:a16="http://schemas.microsoft.com/office/drawing/2014/main" id="{19F2333E-AD72-4069-9999-D316EB1D2BE2}"/>
+                <a16:creationId xmlns:a16="http://schemas.microsoft.com/office/drawing/2014/main" xmlns="" id="{19F2333E-AD72-4069-9999-D316EB1D2BE2}"/>
               </a:ext>
             </a:extLst>
           </p:cNvPr>
@@ -854,7 +854,7 @@
           <p:cNvPr id="4" name="Date Placeholder 3">
             <a:extLst>
               <a:ext uri="{FF2B5EF4-FFF2-40B4-BE49-F238E27FC236}">
-                <a16:creationId xmlns="" xmlns:a16="http://schemas.microsoft.com/office/drawing/2014/main" id="{A5D0C69D-8EED-4855-9D9D-192FA0501F24}"/>
+                <a16:creationId xmlns:a16="http://schemas.microsoft.com/office/drawing/2014/main" xmlns="" id="{A5D0C69D-8EED-4855-9D9D-192FA0501F24}"/>
               </a:ext>
             </a:extLst>
           </p:cNvPr>
@@ -872,7 +872,7 @@
           <a:p>
             <a:fld id="{2F956D3E-0B91-471C-9743-3F865EE6F573}" type="datetimeFigureOut">
               <a:rPr lang="en-AU" smtClean="0"/>
-              <a:t>3/08/2018</a:t>
+              <a:t>14/08/2018</a:t>
             </a:fld>
             <a:endParaRPr lang="en-AU"/>
           </a:p>
@@ -883,7 +883,7 @@
           <p:cNvPr id="5" name="Footer Placeholder 4">
             <a:extLst>
               <a:ext uri="{FF2B5EF4-FFF2-40B4-BE49-F238E27FC236}">
-                <a16:creationId xmlns="" xmlns:a16="http://schemas.microsoft.com/office/drawing/2014/main" id="{3E40E1C3-407E-4CDD-B265-40C6EAF109CB}"/>
+                <a16:creationId xmlns:a16="http://schemas.microsoft.com/office/drawing/2014/main" xmlns="" id="{3E40E1C3-407E-4CDD-B265-40C6EAF109CB}"/>
               </a:ext>
             </a:extLst>
           </p:cNvPr>
@@ -908,7 +908,7 @@
           <p:cNvPr id="6" name="Slide Number Placeholder 5">
             <a:extLst>
               <a:ext uri="{FF2B5EF4-FFF2-40B4-BE49-F238E27FC236}">
-                <a16:creationId xmlns="" xmlns:a16="http://schemas.microsoft.com/office/drawing/2014/main" id="{845BB6A8-2931-4612-9030-020514B9DFCC}"/>
+                <a16:creationId xmlns:a16="http://schemas.microsoft.com/office/drawing/2014/main" xmlns="" id="{845BB6A8-2931-4612-9030-020514B9DFCC}"/>
               </a:ext>
             </a:extLst>
           </p:cNvPr>
@@ -967,7 +967,7 @@
           <p:cNvPr id="2" name="Title 1">
             <a:extLst>
               <a:ext uri="{FF2B5EF4-FFF2-40B4-BE49-F238E27FC236}">
-                <a16:creationId xmlns="" xmlns:a16="http://schemas.microsoft.com/office/drawing/2014/main" id="{9648ED28-6C5E-4B58-8121-9279F11D3D73}"/>
+                <a16:creationId xmlns:a16="http://schemas.microsoft.com/office/drawing/2014/main" xmlns="" id="{9648ED28-6C5E-4B58-8121-9279F11D3D73}"/>
               </a:ext>
             </a:extLst>
           </p:cNvPr>
@@ -1005,7 +1005,7 @@
           <p:cNvPr id="3" name="Text Placeholder 2">
             <a:extLst>
               <a:ext uri="{FF2B5EF4-FFF2-40B4-BE49-F238E27FC236}">
-                <a16:creationId xmlns="" xmlns:a16="http://schemas.microsoft.com/office/drawing/2014/main" id="{B243195A-3915-4922-B15F-B46A8AB41FEA}"/>
+                <a16:creationId xmlns:a16="http://schemas.microsoft.com/office/drawing/2014/main" xmlns="" id="{B243195A-3915-4922-B15F-B46A8AB41FEA}"/>
               </a:ext>
             </a:extLst>
           </p:cNvPr>
@@ -1130,7 +1130,7 @@
           <p:cNvPr id="4" name="Date Placeholder 3">
             <a:extLst>
               <a:ext uri="{FF2B5EF4-FFF2-40B4-BE49-F238E27FC236}">
-                <a16:creationId xmlns="" xmlns:a16="http://schemas.microsoft.com/office/drawing/2014/main" id="{33A69456-A0E9-4808-8AD0-8E412F7B6478}"/>
+                <a16:creationId xmlns:a16="http://schemas.microsoft.com/office/drawing/2014/main" xmlns="" id="{33A69456-A0E9-4808-8AD0-8E412F7B6478}"/>
               </a:ext>
             </a:extLst>
           </p:cNvPr>
@@ -1148,7 +1148,7 @@
           <a:p>
             <a:fld id="{2F956D3E-0B91-471C-9743-3F865EE6F573}" type="datetimeFigureOut">
               <a:rPr lang="en-AU" smtClean="0"/>
-              <a:t>3/08/2018</a:t>
+              <a:t>14/08/2018</a:t>
             </a:fld>
             <a:endParaRPr lang="en-AU"/>
           </a:p>
@@ -1159,7 +1159,7 @@
           <p:cNvPr id="5" name="Footer Placeholder 4">
             <a:extLst>
               <a:ext uri="{FF2B5EF4-FFF2-40B4-BE49-F238E27FC236}">
-                <a16:creationId xmlns="" xmlns:a16="http://schemas.microsoft.com/office/drawing/2014/main" id="{E0CD1CF0-CD4A-49A3-A5A3-C4241E2A5F63}"/>
+                <a16:creationId xmlns:a16="http://schemas.microsoft.com/office/drawing/2014/main" xmlns="" id="{E0CD1CF0-CD4A-49A3-A5A3-C4241E2A5F63}"/>
               </a:ext>
             </a:extLst>
           </p:cNvPr>
@@ -1184,7 +1184,7 @@
           <p:cNvPr id="6" name="Slide Number Placeholder 5">
             <a:extLst>
               <a:ext uri="{FF2B5EF4-FFF2-40B4-BE49-F238E27FC236}">
-                <a16:creationId xmlns="" xmlns:a16="http://schemas.microsoft.com/office/drawing/2014/main" id="{977DB6D3-8C4E-4ED5-9327-2DCA26535F2F}"/>
+                <a16:creationId xmlns:a16="http://schemas.microsoft.com/office/drawing/2014/main" xmlns="" id="{977DB6D3-8C4E-4ED5-9327-2DCA26535F2F}"/>
               </a:ext>
             </a:extLst>
           </p:cNvPr>
@@ -1243,7 +1243,7 @@
           <p:cNvPr id="2" name="Title 1">
             <a:extLst>
               <a:ext uri="{FF2B5EF4-FFF2-40B4-BE49-F238E27FC236}">
-                <a16:creationId xmlns="" xmlns:a16="http://schemas.microsoft.com/office/drawing/2014/main" id="{07C65CDB-FECB-413B-B3E2-B8B3289BE67F}"/>
+                <a16:creationId xmlns:a16="http://schemas.microsoft.com/office/drawing/2014/main" xmlns="" id="{07C65CDB-FECB-413B-B3E2-B8B3289BE67F}"/>
               </a:ext>
             </a:extLst>
           </p:cNvPr>
@@ -1272,7 +1272,7 @@
           <p:cNvPr id="3" name="Content Placeholder 2">
             <a:extLst>
               <a:ext uri="{FF2B5EF4-FFF2-40B4-BE49-F238E27FC236}">
-                <a16:creationId xmlns="" xmlns:a16="http://schemas.microsoft.com/office/drawing/2014/main" id="{2E6195E5-493D-470C-8030-A76CAC535D10}"/>
+                <a16:creationId xmlns:a16="http://schemas.microsoft.com/office/drawing/2014/main" xmlns="" id="{2E6195E5-493D-470C-8030-A76CAC535D10}"/>
               </a:ext>
             </a:extLst>
           </p:cNvPr>
@@ -1335,7 +1335,7 @@
           <p:cNvPr id="4" name="Content Placeholder 3">
             <a:extLst>
               <a:ext uri="{FF2B5EF4-FFF2-40B4-BE49-F238E27FC236}">
-                <a16:creationId xmlns="" xmlns:a16="http://schemas.microsoft.com/office/drawing/2014/main" id="{4F75BA75-06D0-4C8F-978B-E8DD198357AB}"/>
+                <a16:creationId xmlns:a16="http://schemas.microsoft.com/office/drawing/2014/main" xmlns="" id="{4F75BA75-06D0-4C8F-978B-E8DD198357AB}"/>
               </a:ext>
             </a:extLst>
           </p:cNvPr>
@@ -1398,7 +1398,7 @@
           <p:cNvPr id="5" name="Date Placeholder 4">
             <a:extLst>
               <a:ext uri="{FF2B5EF4-FFF2-40B4-BE49-F238E27FC236}">
-                <a16:creationId xmlns="" xmlns:a16="http://schemas.microsoft.com/office/drawing/2014/main" id="{B8464B70-E9DB-4711-87B7-24F57EF07851}"/>
+                <a16:creationId xmlns:a16="http://schemas.microsoft.com/office/drawing/2014/main" xmlns="" id="{B8464B70-E9DB-4711-87B7-24F57EF07851}"/>
               </a:ext>
             </a:extLst>
           </p:cNvPr>
@@ -1416,7 +1416,7 @@
           <a:p>
             <a:fld id="{2F956D3E-0B91-471C-9743-3F865EE6F573}" type="datetimeFigureOut">
               <a:rPr lang="en-AU" smtClean="0"/>
-              <a:t>3/08/2018</a:t>
+              <a:t>14/08/2018</a:t>
             </a:fld>
             <a:endParaRPr lang="en-AU"/>
           </a:p>
@@ -1427,7 +1427,7 @@
           <p:cNvPr id="6" name="Footer Placeholder 5">
             <a:extLst>
               <a:ext uri="{FF2B5EF4-FFF2-40B4-BE49-F238E27FC236}">
-                <a16:creationId xmlns="" xmlns:a16="http://schemas.microsoft.com/office/drawing/2014/main" id="{749AD7CE-527F-410D-975F-A7CD735BDEDC}"/>
+                <a16:creationId xmlns:a16="http://schemas.microsoft.com/office/drawing/2014/main" xmlns="" id="{749AD7CE-527F-410D-975F-A7CD735BDEDC}"/>
               </a:ext>
             </a:extLst>
           </p:cNvPr>
@@ -1452,7 +1452,7 @@
           <p:cNvPr id="7" name="Slide Number Placeholder 6">
             <a:extLst>
               <a:ext uri="{FF2B5EF4-FFF2-40B4-BE49-F238E27FC236}">
-                <a16:creationId xmlns="" xmlns:a16="http://schemas.microsoft.com/office/drawing/2014/main" id="{255D3E42-D06E-4C32-A2BC-75DE87B576C3}"/>
+                <a16:creationId xmlns:a16="http://schemas.microsoft.com/office/drawing/2014/main" xmlns="" id="{255D3E42-D06E-4C32-A2BC-75DE87B576C3}"/>
               </a:ext>
             </a:extLst>
           </p:cNvPr>
@@ -1511,7 +1511,7 @@
           <p:cNvPr id="2" name="Title 1">
             <a:extLst>
               <a:ext uri="{FF2B5EF4-FFF2-40B4-BE49-F238E27FC236}">
-                <a16:creationId xmlns="" xmlns:a16="http://schemas.microsoft.com/office/drawing/2014/main" id="{BE6E0455-D9EF-42F6-B509-7FDC251CFDAF}"/>
+                <a16:creationId xmlns:a16="http://schemas.microsoft.com/office/drawing/2014/main" xmlns="" id="{BE6E0455-D9EF-42F6-B509-7FDC251CFDAF}"/>
               </a:ext>
             </a:extLst>
           </p:cNvPr>
@@ -1545,7 +1545,7 @@
           <p:cNvPr id="3" name="Text Placeholder 2">
             <a:extLst>
               <a:ext uri="{FF2B5EF4-FFF2-40B4-BE49-F238E27FC236}">
-                <a16:creationId xmlns="" xmlns:a16="http://schemas.microsoft.com/office/drawing/2014/main" id="{5117D045-1AD3-424F-855E-BD6F9FACDA1A}"/>
+                <a16:creationId xmlns:a16="http://schemas.microsoft.com/office/drawing/2014/main" xmlns="" id="{5117D045-1AD3-424F-855E-BD6F9FACDA1A}"/>
               </a:ext>
             </a:extLst>
           </p:cNvPr>
@@ -1616,7 +1616,7 @@
           <p:cNvPr id="4" name="Content Placeholder 3">
             <a:extLst>
               <a:ext uri="{FF2B5EF4-FFF2-40B4-BE49-F238E27FC236}">
-                <a16:creationId xmlns="" xmlns:a16="http://schemas.microsoft.com/office/drawing/2014/main" id="{CC38E2F2-5E09-477C-BF9F-8B671E6613BE}"/>
+                <a16:creationId xmlns:a16="http://schemas.microsoft.com/office/drawing/2014/main" xmlns="" id="{CC38E2F2-5E09-477C-BF9F-8B671E6613BE}"/>
               </a:ext>
             </a:extLst>
           </p:cNvPr>
@@ -1679,7 +1679,7 @@
           <p:cNvPr id="5" name="Text Placeholder 4">
             <a:extLst>
               <a:ext uri="{FF2B5EF4-FFF2-40B4-BE49-F238E27FC236}">
-                <a16:creationId xmlns="" xmlns:a16="http://schemas.microsoft.com/office/drawing/2014/main" id="{3A15ED3B-D38C-4255-B016-9BFE9335B63D}"/>
+                <a16:creationId xmlns:a16="http://schemas.microsoft.com/office/drawing/2014/main" xmlns="" id="{3A15ED3B-D38C-4255-B016-9BFE9335B63D}"/>
               </a:ext>
             </a:extLst>
           </p:cNvPr>
@@ -1750,7 +1750,7 @@
           <p:cNvPr id="6" name="Content Placeholder 5">
             <a:extLst>
               <a:ext uri="{FF2B5EF4-FFF2-40B4-BE49-F238E27FC236}">
-                <a16:creationId xmlns="" xmlns:a16="http://schemas.microsoft.com/office/drawing/2014/main" id="{63DAE8AA-C177-4A26-BEC1-435C0D5B2971}"/>
+                <a16:creationId xmlns:a16="http://schemas.microsoft.com/office/drawing/2014/main" xmlns="" id="{63DAE8AA-C177-4A26-BEC1-435C0D5B2971}"/>
               </a:ext>
             </a:extLst>
           </p:cNvPr>
@@ -1813,7 +1813,7 @@
           <p:cNvPr id="7" name="Date Placeholder 6">
             <a:extLst>
               <a:ext uri="{FF2B5EF4-FFF2-40B4-BE49-F238E27FC236}">
-                <a16:creationId xmlns="" xmlns:a16="http://schemas.microsoft.com/office/drawing/2014/main" id="{C91A1DD9-FE74-4BC2-9DFA-85266C81AE87}"/>
+                <a16:creationId xmlns:a16="http://schemas.microsoft.com/office/drawing/2014/main" xmlns="" id="{C91A1DD9-FE74-4BC2-9DFA-85266C81AE87}"/>
               </a:ext>
             </a:extLst>
           </p:cNvPr>
@@ -1831,7 +1831,7 @@
           <a:p>
             <a:fld id="{2F956D3E-0B91-471C-9743-3F865EE6F573}" type="datetimeFigureOut">
               <a:rPr lang="en-AU" smtClean="0"/>
-              <a:t>3/08/2018</a:t>
+              <a:t>14/08/2018</a:t>
             </a:fld>
             <a:endParaRPr lang="en-AU"/>
           </a:p>
@@ -1842,7 +1842,7 @@
           <p:cNvPr id="8" name="Footer Placeholder 7">
             <a:extLst>
               <a:ext uri="{FF2B5EF4-FFF2-40B4-BE49-F238E27FC236}">
-                <a16:creationId xmlns="" xmlns:a16="http://schemas.microsoft.com/office/drawing/2014/main" id="{03468399-9983-447A-A9C7-60841A2101A5}"/>
+                <a16:creationId xmlns:a16="http://schemas.microsoft.com/office/drawing/2014/main" xmlns="" id="{03468399-9983-447A-A9C7-60841A2101A5}"/>
               </a:ext>
             </a:extLst>
           </p:cNvPr>
@@ -1867,7 +1867,7 @@
           <p:cNvPr id="9" name="Slide Number Placeholder 8">
             <a:extLst>
               <a:ext uri="{FF2B5EF4-FFF2-40B4-BE49-F238E27FC236}">
-                <a16:creationId xmlns="" xmlns:a16="http://schemas.microsoft.com/office/drawing/2014/main" id="{FF353AE5-8C6E-44F3-BD0C-9BE8FC31A3C4}"/>
+                <a16:creationId xmlns:a16="http://schemas.microsoft.com/office/drawing/2014/main" xmlns="" id="{FF353AE5-8C6E-44F3-BD0C-9BE8FC31A3C4}"/>
               </a:ext>
             </a:extLst>
           </p:cNvPr>
@@ -1926,7 +1926,7 @@
           <p:cNvPr id="2" name="Title 1">
             <a:extLst>
               <a:ext uri="{FF2B5EF4-FFF2-40B4-BE49-F238E27FC236}">
-                <a16:creationId xmlns="" xmlns:a16="http://schemas.microsoft.com/office/drawing/2014/main" id="{11AB4E18-777A-4059-8FE3-0C744DDCEF11}"/>
+                <a16:creationId xmlns:a16="http://schemas.microsoft.com/office/drawing/2014/main" xmlns="" id="{11AB4E18-777A-4059-8FE3-0C744DDCEF11}"/>
               </a:ext>
             </a:extLst>
           </p:cNvPr>
@@ -1955,7 +1955,7 @@
           <p:cNvPr id="3" name="Date Placeholder 2">
             <a:extLst>
               <a:ext uri="{FF2B5EF4-FFF2-40B4-BE49-F238E27FC236}">
-                <a16:creationId xmlns="" xmlns:a16="http://schemas.microsoft.com/office/drawing/2014/main" id="{EBBA3A6C-B2BF-4415-9EFA-485140AC1C20}"/>
+                <a16:creationId xmlns:a16="http://schemas.microsoft.com/office/drawing/2014/main" xmlns="" id="{EBBA3A6C-B2BF-4415-9EFA-485140AC1C20}"/>
               </a:ext>
             </a:extLst>
           </p:cNvPr>
@@ -1973,7 +1973,7 @@
           <a:p>
             <a:fld id="{2F956D3E-0B91-471C-9743-3F865EE6F573}" type="datetimeFigureOut">
               <a:rPr lang="en-AU" smtClean="0"/>
-              <a:t>3/08/2018</a:t>
+              <a:t>14/08/2018</a:t>
             </a:fld>
             <a:endParaRPr lang="en-AU"/>
           </a:p>
@@ -1984,7 +1984,7 @@
           <p:cNvPr id="4" name="Footer Placeholder 3">
             <a:extLst>
               <a:ext uri="{FF2B5EF4-FFF2-40B4-BE49-F238E27FC236}">
-                <a16:creationId xmlns="" xmlns:a16="http://schemas.microsoft.com/office/drawing/2014/main" id="{979E66C2-27F5-4ADA-B05B-28A7E30C72C4}"/>
+                <a16:creationId xmlns:a16="http://schemas.microsoft.com/office/drawing/2014/main" xmlns="" id="{979E66C2-27F5-4ADA-B05B-28A7E30C72C4}"/>
               </a:ext>
             </a:extLst>
           </p:cNvPr>
@@ -2009,7 +2009,7 @@
           <p:cNvPr id="5" name="Slide Number Placeholder 4">
             <a:extLst>
               <a:ext uri="{FF2B5EF4-FFF2-40B4-BE49-F238E27FC236}">
-                <a16:creationId xmlns="" xmlns:a16="http://schemas.microsoft.com/office/drawing/2014/main" id="{339F570E-2EBF-491A-B1A3-7B0020A39D87}"/>
+                <a16:creationId xmlns:a16="http://schemas.microsoft.com/office/drawing/2014/main" xmlns="" id="{339F570E-2EBF-491A-B1A3-7B0020A39D87}"/>
               </a:ext>
             </a:extLst>
           </p:cNvPr>
@@ -2068,7 +2068,7 @@
           <p:cNvPr id="2" name="Date Placeholder 1">
             <a:extLst>
               <a:ext uri="{FF2B5EF4-FFF2-40B4-BE49-F238E27FC236}">
-                <a16:creationId xmlns="" xmlns:a16="http://schemas.microsoft.com/office/drawing/2014/main" id="{31CC9DF5-DDBA-4A27-A2BE-EE4875C95E73}"/>
+                <a16:creationId xmlns:a16="http://schemas.microsoft.com/office/drawing/2014/main" xmlns="" id="{31CC9DF5-DDBA-4A27-A2BE-EE4875C95E73}"/>
               </a:ext>
             </a:extLst>
           </p:cNvPr>
@@ -2086,7 +2086,7 @@
           <a:p>
             <a:fld id="{2F956D3E-0B91-471C-9743-3F865EE6F573}" type="datetimeFigureOut">
               <a:rPr lang="en-AU" smtClean="0"/>
-              <a:t>3/08/2018</a:t>
+              <a:t>14/08/2018</a:t>
             </a:fld>
             <a:endParaRPr lang="en-AU"/>
           </a:p>
@@ -2097,7 +2097,7 @@
           <p:cNvPr id="3" name="Footer Placeholder 2">
             <a:extLst>
               <a:ext uri="{FF2B5EF4-FFF2-40B4-BE49-F238E27FC236}">
-                <a16:creationId xmlns="" xmlns:a16="http://schemas.microsoft.com/office/drawing/2014/main" id="{5E855F50-D457-4213-B498-4635BD853470}"/>
+                <a16:creationId xmlns:a16="http://schemas.microsoft.com/office/drawing/2014/main" xmlns="" id="{5E855F50-D457-4213-B498-4635BD853470}"/>
               </a:ext>
             </a:extLst>
           </p:cNvPr>
@@ -2122,7 +2122,7 @@
           <p:cNvPr id="4" name="Slide Number Placeholder 3">
             <a:extLst>
               <a:ext uri="{FF2B5EF4-FFF2-40B4-BE49-F238E27FC236}">
-                <a16:creationId xmlns="" xmlns:a16="http://schemas.microsoft.com/office/drawing/2014/main" id="{1424F85B-ACD9-4362-A6F2-B7C48F575113}"/>
+                <a16:creationId xmlns:a16="http://schemas.microsoft.com/office/drawing/2014/main" xmlns="" id="{1424F85B-ACD9-4362-A6F2-B7C48F575113}"/>
               </a:ext>
             </a:extLst>
           </p:cNvPr>
@@ -2181,7 +2181,7 @@
           <p:cNvPr id="2" name="Title 1">
             <a:extLst>
               <a:ext uri="{FF2B5EF4-FFF2-40B4-BE49-F238E27FC236}">
-                <a16:creationId xmlns="" xmlns:a16="http://schemas.microsoft.com/office/drawing/2014/main" id="{BD554F58-5E8E-48ED-8ED9-A0BD06E6F218}"/>
+                <a16:creationId xmlns:a16="http://schemas.microsoft.com/office/drawing/2014/main" xmlns="" id="{BD554F58-5E8E-48ED-8ED9-A0BD06E6F218}"/>
               </a:ext>
             </a:extLst>
           </p:cNvPr>
@@ -2219,7 +2219,7 @@
           <p:cNvPr id="3" name="Content Placeholder 2">
             <a:extLst>
               <a:ext uri="{FF2B5EF4-FFF2-40B4-BE49-F238E27FC236}">
-                <a16:creationId xmlns="" xmlns:a16="http://schemas.microsoft.com/office/drawing/2014/main" id="{88E32398-FD1A-4262-BB8C-6CFB63C85CED}"/>
+                <a16:creationId xmlns:a16="http://schemas.microsoft.com/office/drawing/2014/main" xmlns="" id="{88E32398-FD1A-4262-BB8C-6CFB63C85CED}"/>
               </a:ext>
             </a:extLst>
           </p:cNvPr>
@@ -2310,7 +2310,7 @@
           <p:cNvPr id="4" name="Text Placeholder 3">
             <a:extLst>
               <a:ext uri="{FF2B5EF4-FFF2-40B4-BE49-F238E27FC236}">
-                <a16:creationId xmlns="" xmlns:a16="http://schemas.microsoft.com/office/drawing/2014/main" id="{373EAC1B-2FB9-4226-BCA0-E5D3B01D6FA0}"/>
+                <a16:creationId xmlns:a16="http://schemas.microsoft.com/office/drawing/2014/main" xmlns="" id="{373EAC1B-2FB9-4226-BCA0-E5D3B01D6FA0}"/>
               </a:ext>
             </a:extLst>
           </p:cNvPr>
@@ -2381,7 +2381,7 @@
           <p:cNvPr id="5" name="Date Placeholder 4">
             <a:extLst>
               <a:ext uri="{FF2B5EF4-FFF2-40B4-BE49-F238E27FC236}">
-                <a16:creationId xmlns="" xmlns:a16="http://schemas.microsoft.com/office/drawing/2014/main" id="{D639F409-5438-45DD-BECC-62B7B0AAF361}"/>
+                <a16:creationId xmlns:a16="http://schemas.microsoft.com/office/drawing/2014/main" xmlns="" id="{D639F409-5438-45DD-BECC-62B7B0AAF361}"/>
               </a:ext>
             </a:extLst>
           </p:cNvPr>
@@ -2399,7 +2399,7 @@
           <a:p>
             <a:fld id="{2F956D3E-0B91-471C-9743-3F865EE6F573}" type="datetimeFigureOut">
               <a:rPr lang="en-AU" smtClean="0"/>
-              <a:t>3/08/2018</a:t>
+              <a:t>14/08/2018</a:t>
             </a:fld>
             <a:endParaRPr lang="en-AU"/>
           </a:p>
@@ -2410,7 +2410,7 @@
           <p:cNvPr id="6" name="Footer Placeholder 5">
             <a:extLst>
               <a:ext uri="{FF2B5EF4-FFF2-40B4-BE49-F238E27FC236}">
-                <a16:creationId xmlns="" xmlns:a16="http://schemas.microsoft.com/office/drawing/2014/main" id="{2311AAC2-3F58-465D-8275-AAB451586BBE}"/>
+                <a16:creationId xmlns:a16="http://schemas.microsoft.com/office/drawing/2014/main" xmlns="" id="{2311AAC2-3F58-465D-8275-AAB451586BBE}"/>
               </a:ext>
             </a:extLst>
           </p:cNvPr>
@@ -2435,7 +2435,7 @@
           <p:cNvPr id="7" name="Slide Number Placeholder 6">
             <a:extLst>
               <a:ext uri="{FF2B5EF4-FFF2-40B4-BE49-F238E27FC236}">
-                <a16:creationId xmlns="" xmlns:a16="http://schemas.microsoft.com/office/drawing/2014/main" id="{4076C87A-5864-468D-9EE2-7F4B0C093074}"/>
+                <a16:creationId xmlns:a16="http://schemas.microsoft.com/office/drawing/2014/main" xmlns="" id="{4076C87A-5864-468D-9EE2-7F4B0C093074}"/>
               </a:ext>
             </a:extLst>
           </p:cNvPr>
@@ -2494,7 +2494,7 @@
           <p:cNvPr id="2" name="Title 1">
             <a:extLst>
               <a:ext uri="{FF2B5EF4-FFF2-40B4-BE49-F238E27FC236}">
-                <a16:creationId xmlns="" xmlns:a16="http://schemas.microsoft.com/office/drawing/2014/main" id="{B5D51929-B485-4C5E-86DE-E6E2074D6CE5}"/>
+                <a16:creationId xmlns:a16="http://schemas.microsoft.com/office/drawing/2014/main" xmlns="" id="{B5D51929-B485-4C5E-86DE-E6E2074D6CE5}"/>
               </a:ext>
             </a:extLst>
           </p:cNvPr>
@@ -2532,7 +2532,7 @@
           <p:cNvPr id="3" name="Picture Placeholder 2">
             <a:extLst>
               <a:ext uri="{FF2B5EF4-FFF2-40B4-BE49-F238E27FC236}">
-                <a16:creationId xmlns="" xmlns:a16="http://schemas.microsoft.com/office/drawing/2014/main" id="{745CAD50-DBFD-4B1E-8C5A-FEC1D2159DDB}"/>
+                <a16:creationId xmlns:a16="http://schemas.microsoft.com/office/drawing/2014/main" xmlns="" id="{745CAD50-DBFD-4B1E-8C5A-FEC1D2159DDB}"/>
               </a:ext>
             </a:extLst>
           </p:cNvPr>
@@ -2599,7 +2599,7 @@
           <p:cNvPr id="4" name="Text Placeholder 3">
             <a:extLst>
               <a:ext uri="{FF2B5EF4-FFF2-40B4-BE49-F238E27FC236}">
-                <a16:creationId xmlns="" xmlns:a16="http://schemas.microsoft.com/office/drawing/2014/main" id="{56CA1066-373C-4A49-B657-9EE7DCD0952D}"/>
+                <a16:creationId xmlns:a16="http://schemas.microsoft.com/office/drawing/2014/main" xmlns="" id="{56CA1066-373C-4A49-B657-9EE7DCD0952D}"/>
               </a:ext>
             </a:extLst>
           </p:cNvPr>
@@ -2670,7 +2670,7 @@
           <p:cNvPr id="5" name="Date Placeholder 4">
             <a:extLst>
               <a:ext uri="{FF2B5EF4-FFF2-40B4-BE49-F238E27FC236}">
-                <a16:creationId xmlns="" xmlns:a16="http://schemas.microsoft.com/office/drawing/2014/main" id="{D4F04E1C-BF5B-43FA-9CA9-C4A3872ABD47}"/>
+                <a16:creationId xmlns:a16="http://schemas.microsoft.com/office/drawing/2014/main" xmlns="" id="{D4F04E1C-BF5B-43FA-9CA9-C4A3872ABD47}"/>
               </a:ext>
             </a:extLst>
           </p:cNvPr>
@@ -2688,7 +2688,7 @@
           <a:p>
             <a:fld id="{2F956D3E-0B91-471C-9743-3F865EE6F573}" type="datetimeFigureOut">
               <a:rPr lang="en-AU" smtClean="0"/>
-              <a:t>3/08/2018</a:t>
+              <a:t>14/08/2018</a:t>
             </a:fld>
             <a:endParaRPr lang="en-AU"/>
           </a:p>
@@ -2699,7 +2699,7 @@
           <p:cNvPr id="6" name="Footer Placeholder 5">
             <a:extLst>
               <a:ext uri="{FF2B5EF4-FFF2-40B4-BE49-F238E27FC236}">
-                <a16:creationId xmlns="" xmlns:a16="http://schemas.microsoft.com/office/drawing/2014/main" id="{B3F3C200-5776-44B6-80D6-B576FC6FE4A1}"/>
+                <a16:creationId xmlns:a16="http://schemas.microsoft.com/office/drawing/2014/main" xmlns="" id="{B3F3C200-5776-44B6-80D6-B576FC6FE4A1}"/>
               </a:ext>
             </a:extLst>
           </p:cNvPr>
@@ -2724,7 +2724,7 @@
           <p:cNvPr id="7" name="Slide Number Placeholder 6">
             <a:extLst>
               <a:ext uri="{FF2B5EF4-FFF2-40B4-BE49-F238E27FC236}">
-                <a16:creationId xmlns="" xmlns:a16="http://schemas.microsoft.com/office/drawing/2014/main" id="{C83FA351-8092-4D78-A9C7-A20A77930D3D}"/>
+                <a16:creationId xmlns:a16="http://schemas.microsoft.com/office/drawing/2014/main" xmlns="" id="{C83FA351-8092-4D78-A9C7-A20A77930D3D}"/>
               </a:ext>
             </a:extLst>
           </p:cNvPr>
@@ -2788,7 +2788,7 @@
           <p:cNvPr id="2" name="Title Placeholder 1">
             <a:extLst>
               <a:ext uri="{FF2B5EF4-FFF2-40B4-BE49-F238E27FC236}">
-                <a16:creationId xmlns="" xmlns:a16="http://schemas.microsoft.com/office/drawing/2014/main" id="{417237BA-4865-4280-8BD0-E6D106DFB608}"/>
+                <a16:creationId xmlns:a16="http://schemas.microsoft.com/office/drawing/2014/main" xmlns="" id="{417237BA-4865-4280-8BD0-E6D106DFB608}"/>
               </a:ext>
             </a:extLst>
           </p:cNvPr>
@@ -2827,7 +2827,7 @@
           <p:cNvPr id="3" name="Text Placeholder 2">
             <a:extLst>
               <a:ext uri="{FF2B5EF4-FFF2-40B4-BE49-F238E27FC236}">
-                <a16:creationId xmlns="" xmlns:a16="http://schemas.microsoft.com/office/drawing/2014/main" id="{CFD6DF4C-CD43-4DDE-9E26-4DAB0E753402}"/>
+                <a16:creationId xmlns:a16="http://schemas.microsoft.com/office/drawing/2014/main" xmlns="" id="{CFD6DF4C-CD43-4DDE-9E26-4DAB0E753402}"/>
               </a:ext>
             </a:extLst>
           </p:cNvPr>
@@ -2895,7 +2895,7 @@
           <p:cNvPr id="4" name="Date Placeholder 3">
             <a:extLst>
               <a:ext uri="{FF2B5EF4-FFF2-40B4-BE49-F238E27FC236}">
-                <a16:creationId xmlns="" xmlns:a16="http://schemas.microsoft.com/office/drawing/2014/main" id="{4E8F96A9-316E-4272-B736-3B7A5BEFB368}"/>
+                <a16:creationId xmlns:a16="http://schemas.microsoft.com/office/drawing/2014/main" xmlns="" id="{4E8F96A9-316E-4272-B736-3B7A5BEFB368}"/>
               </a:ext>
             </a:extLst>
           </p:cNvPr>
@@ -2931,7 +2931,7 @@
           <a:p>
             <a:fld id="{2F956D3E-0B91-471C-9743-3F865EE6F573}" type="datetimeFigureOut">
               <a:rPr lang="en-AU" smtClean="0"/>
-              <a:t>3/08/2018</a:t>
+              <a:t>14/08/2018</a:t>
             </a:fld>
             <a:endParaRPr lang="en-AU"/>
           </a:p>
@@ -2942,7 +2942,7 @@
           <p:cNvPr id="5" name="Footer Placeholder 4">
             <a:extLst>
               <a:ext uri="{FF2B5EF4-FFF2-40B4-BE49-F238E27FC236}">
-                <a16:creationId xmlns="" xmlns:a16="http://schemas.microsoft.com/office/drawing/2014/main" id="{5B9B060F-4139-42DD-835A-DD48B4C35B93}"/>
+                <a16:creationId xmlns:a16="http://schemas.microsoft.com/office/drawing/2014/main" xmlns="" id="{5B9B060F-4139-42DD-835A-DD48B4C35B93}"/>
               </a:ext>
             </a:extLst>
           </p:cNvPr>
@@ -2985,7 +2985,7 @@
           <p:cNvPr id="6" name="Slide Number Placeholder 5">
             <a:extLst>
               <a:ext uri="{FF2B5EF4-FFF2-40B4-BE49-F238E27FC236}">
-                <a16:creationId xmlns="" xmlns:a16="http://schemas.microsoft.com/office/drawing/2014/main" id="{419ED261-D27A-4F8B-A664-31C7824BE2CC}"/>
+                <a16:creationId xmlns:a16="http://schemas.microsoft.com/office/drawing/2014/main" xmlns="" id="{419ED261-D27A-4F8B-A664-31C7824BE2CC}"/>
               </a:ext>
             </a:extLst>
           </p:cNvPr>
@@ -3353,7 +3353,7 @@
           <p:cNvPr id="4" name="Rectangle: Rounded Corners 3">
             <a:extLst>
               <a:ext uri="{FF2B5EF4-FFF2-40B4-BE49-F238E27FC236}">
-                <a16:creationId xmlns="" xmlns:a16="http://schemas.microsoft.com/office/drawing/2014/main" id="{54D0FB8B-B098-491A-AD31-AD421AB902EF}"/>
+                <a16:creationId xmlns:a16="http://schemas.microsoft.com/office/drawing/2014/main" xmlns="" id="{54D0FB8B-B098-491A-AD31-AD421AB902EF}"/>
               </a:ext>
             </a:extLst>
           </p:cNvPr>
@@ -3412,7 +3412,7 @@
           <p:cNvPr id="5" name="Rectangle: Rounded Corners 4">
             <a:extLst>
               <a:ext uri="{FF2B5EF4-FFF2-40B4-BE49-F238E27FC236}">
-                <a16:creationId xmlns="" xmlns:a16="http://schemas.microsoft.com/office/drawing/2014/main" id="{5675C345-97DA-44C4-8895-174F9B25EB74}"/>
+                <a16:creationId xmlns:a16="http://schemas.microsoft.com/office/drawing/2014/main" xmlns="" id="{5675C345-97DA-44C4-8895-174F9B25EB74}"/>
               </a:ext>
             </a:extLst>
           </p:cNvPr>
@@ -3471,7 +3471,7 @@
           <p:cNvPr id="10" name="Straight Arrow Connector 9">
             <a:extLst>
               <a:ext uri="{FF2B5EF4-FFF2-40B4-BE49-F238E27FC236}">
-                <a16:creationId xmlns="" xmlns:a16="http://schemas.microsoft.com/office/drawing/2014/main" id="{2738494B-22BB-4E16-AA8E-063441F62080}"/>
+                <a16:creationId xmlns:a16="http://schemas.microsoft.com/office/drawing/2014/main" xmlns="" id="{2738494B-22BB-4E16-AA8E-063441F62080}"/>
               </a:ext>
             </a:extLst>
           </p:cNvPr>
@@ -3513,7 +3513,7 @@
           <p:cNvPr id="11" name="TextBox 10">
             <a:extLst>
               <a:ext uri="{FF2B5EF4-FFF2-40B4-BE49-F238E27FC236}">
-                <a16:creationId xmlns="" xmlns:a16="http://schemas.microsoft.com/office/drawing/2014/main" id="{EA0207FA-CB6D-4700-A943-37A35E7A7F6C}"/>
+                <a16:creationId xmlns:a16="http://schemas.microsoft.com/office/drawing/2014/main" xmlns="" id="{EA0207FA-CB6D-4700-A943-37A35E7A7F6C}"/>
               </a:ext>
             </a:extLst>
           </p:cNvPr>
@@ -3549,7 +3549,7 @@
           <p:cNvPr id="12" name="Rectangle: Rounded Corners 11">
             <a:extLst>
               <a:ext uri="{FF2B5EF4-FFF2-40B4-BE49-F238E27FC236}">
-                <a16:creationId xmlns="" xmlns:a16="http://schemas.microsoft.com/office/drawing/2014/main" id="{0172D6A7-F319-4C98-BCFD-58AB9FFA137C}"/>
+                <a16:creationId xmlns:a16="http://schemas.microsoft.com/office/drawing/2014/main" xmlns="" id="{0172D6A7-F319-4C98-BCFD-58AB9FFA137C}"/>
               </a:ext>
             </a:extLst>
           </p:cNvPr>
@@ -3608,7 +3608,7 @@
           <p:cNvPr id="13" name="Rectangle: Rounded Corners 12">
             <a:extLst>
               <a:ext uri="{FF2B5EF4-FFF2-40B4-BE49-F238E27FC236}">
-                <a16:creationId xmlns="" xmlns:a16="http://schemas.microsoft.com/office/drawing/2014/main" id="{351768B8-B0F4-49E5-A1C4-CB95780972A0}"/>
+                <a16:creationId xmlns:a16="http://schemas.microsoft.com/office/drawing/2014/main" xmlns="" id="{351768B8-B0F4-49E5-A1C4-CB95780972A0}"/>
               </a:ext>
             </a:extLst>
           </p:cNvPr>
@@ -3667,7 +3667,7 @@
           <p:cNvPr id="14" name="Rectangle: Rounded Corners 13">
             <a:extLst>
               <a:ext uri="{FF2B5EF4-FFF2-40B4-BE49-F238E27FC236}">
-                <a16:creationId xmlns="" xmlns:a16="http://schemas.microsoft.com/office/drawing/2014/main" id="{C3BAB69B-ADA0-48E1-A7A3-2F500C2A407E}"/>
+                <a16:creationId xmlns:a16="http://schemas.microsoft.com/office/drawing/2014/main" xmlns="" id="{C3BAB69B-ADA0-48E1-A7A3-2F500C2A407E}"/>
               </a:ext>
             </a:extLst>
           </p:cNvPr>
@@ -3726,7 +3726,7 @@
           <p:cNvPr id="15" name="Rectangle: Rounded Corners 14">
             <a:extLst>
               <a:ext uri="{FF2B5EF4-FFF2-40B4-BE49-F238E27FC236}">
-                <a16:creationId xmlns="" xmlns:a16="http://schemas.microsoft.com/office/drawing/2014/main" id="{415FC0F5-4B41-4A53-9189-AE991ED2BD31}"/>
+                <a16:creationId xmlns:a16="http://schemas.microsoft.com/office/drawing/2014/main" xmlns="" id="{415FC0F5-4B41-4A53-9189-AE991ED2BD31}"/>
               </a:ext>
             </a:extLst>
           </p:cNvPr>
@@ -3785,7 +3785,7 @@
           <p:cNvPr id="16" name="Rectangle: Rounded Corners 15">
             <a:extLst>
               <a:ext uri="{FF2B5EF4-FFF2-40B4-BE49-F238E27FC236}">
-                <a16:creationId xmlns="" xmlns:a16="http://schemas.microsoft.com/office/drawing/2014/main" id="{80DE7B24-B7E9-47B6-8E88-EC972ED19123}"/>
+                <a16:creationId xmlns:a16="http://schemas.microsoft.com/office/drawing/2014/main" xmlns="" id="{80DE7B24-B7E9-47B6-8E88-EC972ED19123}"/>
               </a:ext>
             </a:extLst>
           </p:cNvPr>
@@ -3844,7 +3844,7 @@
           <p:cNvPr id="17" name="Connector: Elbow 16">
             <a:extLst>
               <a:ext uri="{FF2B5EF4-FFF2-40B4-BE49-F238E27FC236}">
-                <a16:creationId xmlns="" xmlns:a16="http://schemas.microsoft.com/office/drawing/2014/main" id="{64514852-CA0B-4B22-9112-9C0EFB8F9B9B}"/>
+                <a16:creationId xmlns:a16="http://schemas.microsoft.com/office/drawing/2014/main" xmlns="" id="{64514852-CA0B-4B22-9112-9C0EFB8F9B9B}"/>
               </a:ext>
             </a:extLst>
           </p:cNvPr>
@@ -3892,7 +3892,7 @@
           <p:cNvPr id="20" name="Connector: Elbow 19">
             <a:extLst>
               <a:ext uri="{FF2B5EF4-FFF2-40B4-BE49-F238E27FC236}">
-                <a16:creationId xmlns="" xmlns:a16="http://schemas.microsoft.com/office/drawing/2014/main" id="{E118E15D-38EF-455D-87FB-59C64F2455B6}"/>
+                <a16:creationId xmlns:a16="http://schemas.microsoft.com/office/drawing/2014/main" xmlns="" id="{E118E15D-38EF-455D-87FB-59C64F2455B6}"/>
               </a:ext>
             </a:extLst>
           </p:cNvPr>
@@ -3940,7 +3940,7 @@
           <p:cNvPr id="23" name="Connector: Elbow 22">
             <a:extLst>
               <a:ext uri="{FF2B5EF4-FFF2-40B4-BE49-F238E27FC236}">
-                <a16:creationId xmlns="" xmlns:a16="http://schemas.microsoft.com/office/drawing/2014/main" id="{B493C084-F212-492E-957C-8BEA879E995D}"/>
+                <a16:creationId xmlns:a16="http://schemas.microsoft.com/office/drawing/2014/main" xmlns="" id="{B493C084-F212-492E-957C-8BEA879E995D}"/>
               </a:ext>
             </a:extLst>
           </p:cNvPr>
@@ -3988,7 +3988,7 @@
           <p:cNvPr id="30" name="Rectangle: Rounded Corners 29">
             <a:extLst>
               <a:ext uri="{FF2B5EF4-FFF2-40B4-BE49-F238E27FC236}">
-                <a16:creationId xmlns="" xmlns:a16="http://schemas.microsoft.com/office/drawing/2014/main" id="{19F24737-7B63-4E7B-9AE5-A87497FA6FAF}"/>
+                <a16:creationId xmlns:a16="http://schemas.microsoft.com/office/drawing/2014/main" xmlns="" id="{19F24737-7B63-4E7B-9AE5-A87497FA6FAF}"/>
               </a:ext>
             </a:extLst>
           </p:cNvPr>
@@ -4047,7 +4047,7 @@
           <p:cNvPr id="31" name="Rectangle: Rounded Corners 30">
             <a:extLst>
               <a:ext uri="{FF2B5EF4-FFF2-40B4-BE49-F238E27FC236}">
-                <a16:creationId xmlns="" xmlns:a16="http://schemas.microsoft.com/office/drawing/2014/main" id="{7BC2DA58-1C14-4D8B-9AF3-E14F6FAD8FC0}"/>
+                <a16:creationId xmlns:a16="http://schemas.microsoft.com/office/drawing/2014/main" xmlns="" id="{7BC2DA58-1C14-4D8B-9AF3-E14F6FAD8FC0}"/>
               </a:ext>
             </a:extLst>
           </p:cNvPr>
@@ -4106,7 +4106,7 @@
           <p:cNvPr id="32" name="Rectangle: Rounded Corners 31">
             <a:extLst>
               <a:ext uri="{FF2B5EF4-FFF2-40B4-BE49-F238E27FC236}">
-                <a16:creationId xmlns="" xmlns:a16="http://schemas.microsoft.com/office/drawing/2014/main" id="{A2415D34-9AEB-4D3C-8B85-9A65A96218FE}"/>
+                <a16:creationId xmlns:a16="http://schemas.microsoft.com/office/drawing/2014/main" xmlns="" id="{A2415D34-9AEB-4D3C-8B85-9A65A96218FE}"/>
               </a:ext>
             </a:extLst>
           </p:cNvPr>
@@ -4165,7 +4165,7 @@
           <p:cNvPr id="33" name="Connector: Elbow 32">
             <a:extLst>
               <a:ext uri="{FF2B5EF4-FFF2-40B4-BE49-F238E27FC236}">
-                <a16:creationId xmlns="" xmlns:a16="http://schemas.microsoft.com/office/drawing/2014/main" id="{821A3089-B696-4653-B73B-39B49F027466}"/>
+                <a16:creationId xmlns:a16="http://schemas.microsoft.com/office/drawing/2014/main" xmlns="" id="{821A3089-B696-4653-B73B-39B49F027466}"/>
               </a:ext>
             </a:extLst>
           </p:cNvPr>
@@ -4213,7 +4213,7 @@
           <p:cNvPr id="36" name="Connector: Elbow 35">
             <a:extLst>
               <a:ext uri="{FF2B5EF4-FFF2-40B4-BE49-F238E27FC236}">
-                <a16:creationId xmlns="" xmlns:a16="http://schemas.microsoft.com/office/drawing/2014/main" id="{0E570848-FE64-4E6A-A947-1CBC1911E97A}"/>
+                <a16:creationId xmlns:a16="http://schemas.microsoft.com/office/drawing/2014/main" xmlns="" id="{0E570848-FE64-4E6A-A947-1CBC1911E97A}"/>
               </a:ext>
             </a:extLst>
           </p:cNvPr>
@@ -4261,7 +4261,7 @@
           <p:cNvPr id="8" name="Straight Arrow Connector 7">
             <a:extLst>
               <a:ext uri="{FF2B5EF4-FFF2-40B4-BE49-F238E27FC236}">
-                <a16:creationId xmlns="" xmlns:a16="http://schemas.microsoft.com/office/drawing/2014/main" id="{02FF8AEF-9744-4B1C-ACB9-E3241ACF27D1}"/>
+                <a16:creationId xmlns:a16="http://schemas.microsoft.com/office/drawing/2014/main" xmlns="" id="{02FF8AEF-9744-4B1C-ACB9-E3241ACF27D1}"/>
               </a:ext>
             </a:extLst>
           </p:cNvPr>
@@ -4306,7 +4306,7 @@
           <p:cNvPr id="25" name="Rectangle: Rounded Corners 24">
             <a:extLst>
               <a:ext uri="{FF2B5EF4-FFF2-40B4-BE49-F238E27FC236}">
-                <a16:creationId xmlns="" xmlns:a16="http://schemas.microsoft.com/office/drawing/2014/main" id="{509E733A-9C35-48BC-B1CE-379C573000FE}"/>
+                <a16:creationId xmlns:a16="http://schemas.microsoft.com/office/drawing/2014/main" xmlns="" id="{509E733A-9C35-48BC-B1CE-379C573000FE}"/>
               </a:ext>
             </a:extLst>
           </p:cNvPr>
@@ -4365,7 +4365,7 @@
           <p:cNvPr id="26" name="Straight Arrow Connector 25">
             <a:extLst>
               <a:ext uri="{FF2B5EF4-FFF2-40B4-BE49-F238E27FC236}">
-                <a16:creationId xmlns="" xmlns:a16="http://schemas.microsoft.com/office/drawing/2014/main" id="{45BB73C4-0487-4332-804D-0640F1C24DD7}"/>
+                <a16:creationId xmlns:a16="http://schemas.microsoft.com/office/drawing/2014/main" xmlns="" id="{45BB73C4-0487-4332-804D-0640F1C24DD7}"/>
               </a:ext>
             </a:extLst>
           </p:cNvPr>
@@ -4412,7 +4412,7 @@
           <p:cNvPr id="29" name="TextBox 28">
             <a:extLst>
               <a:ext uri="{FF2B5EF4-FFF2-40B4-BE49-F238E27FC236}">
-                <a16:creationId xmlns="" xmlns:a16="http://schemas.microsoft.com/office/drawing/2014/main" id="{ECF64CE6-E66F-4FF9-8239-2D9801A3273B}"/>
+                <a16:creationId xmlns:a16="http://schemas.microsoft.com/office/drawing/2014/main" xmlns="" id="{ECF64CE6-E66F-4FF9-8239-2D9801A3273B}"/>
               </a:ext>
             </a:extLst>
           </p:cNvPr>
@@ -4448,7 +4448,7 @@
           <p:cNvPr id="34" name="Connector: Elbow 33">
             <a:extLst>
               <a:ext uri="{FF2B5EF4-FFF2-40B4-BE49-F238E27FC236}">
-                <a16:creationId xmlns="" xmlns:a16="http://schemas.microsoft.com/office/drawing/2014/main" id="{762DA317-C2C5-4F35-8BEE-2475336742C9}"/>
+                <a16:creationId xmlns:a16="http://schemas.microsoft.com/office/drawing/2014/main" xmlns="" id="{762DA317-C2C5-4F35-8BEE-2475336742C9}"/>
               </a:ext>
             </a:extLst>
           </p:cNvPr>
@@ -4497,7 +4497,7 @@
           <p:cNvPr id="35" name="Connector: Elbow 34">
             <a:extLst>
               <a:ext uri="{FF2B5EF4-FFF2-40B4-BE49-F238E27FC236}">
-                <a16:creationId xmlns="" xmlns:a16="http://schemas.microsoft.com/office/drawing/2014/main" id="{326F3BCB-F2A3-492C-A8F3-20922107B29D}"/>
+                <a16:creationId xmlns:a16="http://schemas.microsoft.com/office/drawing/2014/main" xmlns="" id="{326F3BCB-F2A3-492C-A8F3-20922107B29D}"/>
               </a:ext>
             </a:extLst>
           </p:cNvPr>
@@ -4546,7 +4546,7 @@
           <p:cNvPr id="37" name="Connector: Elbow 36">
             <a:extLst>
               <a:ext uri="{FF2B5EF4-FFF2-40B4-BE49-F238E27FC236}">
-                <a16:creationId xmlns="" xmlns:a16="http://schemas.microsoft.com/office/drawing/2014/main" id="{D78C9AF8-6E97-4A41-9699-F00133FB72EE}"/>
+                <a16:creationId xmlns:a16="http://schemas.microsoft.com/office/drawing/2014/main" xmlns="" id="{D78C9AF8-6E97-4A41-9699-F00133FB72EE}"/>
               </a:ext>
             </a:extLst>
           </p:cNvPr>
@@ -4595,7 +4595,7 @@
           <p:cNvPr id="83" name="TextBox 82">
             <a:extLst>
               <a:ext uri="{FF2B5EF4-FFF2-40B4-BE49-F238E27FC236}">
-                <a16:creationId xmlns="" xmlns:a16="http://schemas.microsoft.com/office/drawing/2014/main" id="{C34CC880-1902-497C-A44A-571D93EAD548}"/>
+                <a16:creationId xmlns:a16="http://schemas.microsoft.com/office/drawing/2014/main" xmlns="" id="{C34CC880-1902-497C-A44A-571D93EAD548}"/>
               </a:ext>
             </a:extLst>
           </p:cNvPr>
@@ -4630,7 +4630,7 @@
           <p:cNvPr id="84" name="TextBox 83">
             <a:extLst>
               <a:ext uri="{FF2B5EF4-FFF2-40B4-BE49-F238E27FC236}">
-                <a16:creationId xmlns="" xmlns:a16="http://schemas.microsoft.com/office/drawing/2014/main" id="{582DAA28-77DF-48AB-A0FA-7D0944EEA418}"/>
+                <a16:creationId xmlns:a16="http://schemas.microsoft.com/office/drawing/2014/main" xmlns="" id="{582DAA28-77DF-48AB-A0FA-7D0944EEA418}"/>
               </a:ext>
             </a:extLst>
           </p:cNvPr>
@@ -4665,7 +4665,7 @@
           <p:cNvPr id="85" name="TextBox 84">
             <a:extLst>
               <a:ext uri="{FF2B5EF4-FFF2-40B4-BE49-F238E27FC236}">
-                <a16:creationId xmlns="" xmlns:a16="http://schemas.microsoft.com/office/drawing/2014/main" id="{35632462-2816-4AB9-8863-E2858DF02B69}"/>
+                <a16:creationId xmlns:a16="http://schemas.microsoft.com/office/drawing/2014/main" xmlns="" id="{35632462-2816-4AB9-8863-E2858DF02B69}"/>
               </a:ext>
             </a:extLst>
           </p:cNvPr>
@@ -4700,7 +4700,7 @@
           <p:cNvPr id="98" name="Connector: Elbow 97">
             <a:extLst>
               <a:ext uri="{FF2B5EF4-FFF2-40B4-BE49-F238E27FC236}">
-                <a16:creationId xmlns="" xmlns:a16="http://schemas.microsoft.com/office/drawing/2014/main" id="{A1F2BECA-1D96-4FF9-8754-645C1D7726F8}"/>
+                <a16:creationId xmlns:a16="http://schemas.microsoft.com/office/drawing/2014/main" xmlns="" id="{A1F2BECA-1D96-4FF9-8754-645C1D7726F8}"/>
               </a:ext>
             </a:extLst>
           </p:cNvPr>
@@ -4749,7 +4749,7 @@
           <p:cNvPr id="101" name="Connector: Elbow 100">
             <a:extLst>
               <a:ext uri="{FF2B5EF4-FFF2-40B4-BE49-F238E27FC236}">
-                <a16:creationId xmlns="" xmlns:a16="http://schemas.microsoft.com/office/drawing/2014/main" id="{36519D8D-4EA4-45AD-AD01-BCA533BD100D}"/>
+                <a16:creationId xmlns:a16="http://schemas.microsoft.com/office/drawing/2014/main" xmlns="" id="{36519D8D-4EA4-45AD-AD01-BCA533BD100D}"/>
               </a:ext>
             </a:extLst>
           </p:cNvPr>
@@ -4798,7 +4798,7 @@
           <p:cNvPr id="104" name="TextBox 103">
             <a:extLst>
               <a:ext uri="{FF2B5EF4-FFF2-40B4-BE49-F238E27FC236}">
-                <a16:creationId xmlns="" xmlns:a16="http://schemas.microsoft.com/office/drawing/2014/main" id="{6D855CC4-9F24-4FB0-84C5-F540689823DA}"/>
+                <a16:creationId xmlns:a16="http://schemas.microsoft.com/office/drawing/2014/main" xmlns="" id="{6D855CC4-9F24-4FB0-84C5-F540689823DA}"/>
               </a:ext>
             </a:extLst>
           </p:cNvPr>
@@ -4833,7 +4833,7 @@
           <p:cNvPr id="105" name="TextBox 104">
             <a:extLst>
               <a:ext uri="{FF2B5EF4-FFF2-40B4-BE49-F238E27FC236}">
-                <a16:creationId xmlns="" xmlns:a16="http://schemas.microsoft.com/office/drawing/2014/main" id="{312F8B0D-878E-4CFD-AF2D-6C5C84BC7C3F}"/>
+                <a16:creationId xmlns:a16="http://schemas.microsoft.com/office/drawing/2014/main" xmlns="" id="{312F8B0D-878E-4CFD-AF2D-6C5C84BC7C3F}"/>
               </a:ext>
             </a:extLst>
           </p:cNvPr>
@@ -4868,7 +4868,7 @@
           <p:cNvPr id="106" name="Connector: Elbow 105">
             <a:extLst>
               <a:ext uri="{FF2B5EF4-FFF2-40B4-BE49-F238E27FC236}">
-                <a16:creationId xmlns="" xmlns:a16="http://schemas.microsoft.com/office/drawing/2014/main" id="{AFDAAF80-D279-45C4-BA1C-63276C92DDEA}"/>
+                <a16:creationId xmlns:a16="http://schemas.microsoft.com/office/drawing/2014/main" xmlns="" id="{AFDAAF80-D279-45C4-BA1C-63276C92DDEA}"/>
               </a:ext>
             </a:extLst>
           </p:cNvPr>
@@ -4917,7 +4917,7 @@
           <p:cNvPr id="109" name="TextBox 108">
             <a:extLst>
               <a:ext uri="{FF2B5EF4-FFF2-40B4-BE49-F238E27FC236}">
-                <a16:creationId xmlns="" xmlns:a16="http://schemas.microsoft.com/office/drawing/2014/main" id="{68F80759-A938-4EC4-AB28-CF35C69A0B12}"/>
+                <a16:creationId xmlns:a16="http://schemas.microsoft.com/office/drawing/2014/main" xmlns="" id="{68F80759-A938-4EC4-AB28-CF35C69A0B12}"/>
               </a:ext>
             </a:extLst>
           </p:cNvPr>
@@ -4986,14 +4986,14 @@
           <p:nvPr>
             <p:extLst>
               <p:ext uri="{D42A27DB-BD31-4B8C-83A1-F6EECF244321}">
-                <p14:modId xmlns:p14="http://schemas.microsoft.com/office/powerpoint/2010/main" val="2786715868"/>
+                <p14:modId xmlns:p14="http://schemas.microsoft.com/office/powerpoint/2010/main" val="2870740131"/>
               </p:ext>
             </p:extLst>
           </p:nvPr>
         </p:nvGraphicFramePr>
         <p:xfrm>
           <a:off x="9979894" y="1153188"/>
-          <a:ext cx="1557580" cy="1036320"/>
+          <a:ext cx="1557580" cy="777240"/>
         </p:xfrm>
         <a:graphic>
           <a:graphicData uri="http://schemas.openxmlformats.org/drawingml/2006/table">
@@ -5039,23 +5039,24 @@
                     <a:lstStyle/>
                     <a:p>
                       <a:r>
+                        <a:rPr lang="en-AU" sz="1100" b="1" dirty="0" err="1" smtClean="0"/>
+                        <a:t>uri</a:t>
+                      </a:r>
+                      <a:endParaRPr lang="en-AU" sz="1100" b="1" dirty="0"/>
+                    </a:p>
+                  </a:txBody>
+                  <a:tcPr/>
+                </a:tc>
+                <a:tc>
+                  <a:txBody>
+                    <a:bodyPr/>
+                    <a:lstStyle/>
+                    <a:p>
+                      <a:r>
                         <a:rPr lang="en-AU" sz="1100" b="1" dirty="0" smtClean="0"/>
-                        <a:t>id</a:t>
+                        <a:t>text</a:t>
                       </a:r>
-                    </a:p>
-                  </a:txBody>
-                  <a:tcPr/>
-                </a:tc>
-                <a:tc>
-                  <a:txBody>
-                    <a:bodyPr/>
-                    <a:lstStyle/>
-                    <a:p>
-                      <a:r>
-                        <a:rPr lang="en-AU" sz="1100" b="1" dirty="0" err="1" smtClean="0"/>
-                        <a:t>int</a:t>
-                      </a:r>
-                      <a:endParaRPr lang="en-AU" sz="1100" b="1" dirty="0" smtClean="0"/>
+                      <a:endParaRPr lang="en-AU" sz="1100" b="1" dirty="0"/>
                     </a:p>
                   </a:txBody>
                   <a:tcPr/>
@@ -5068,38 +5069,8 @@
                     <a:lstStyle/>
                     <a:p>
                       <a:r>
-                        <a:rPr lang="en-AU" sz="1100" dirty="0" err="1" smtClean="0"/>
-                        <a:t>uri</a:t>
-                      </a:r>
-                      <a:endParaRPr lang="en-AU" sz="1100" dirty="0"/>
-                    </a:p>
-                  </a:txBody>
-                  <a:tcPr/>
-                </a:tc>
-                <a:tc>
-                  <a:txBody>
-                    <a:bodyPr/>
-                    <a:lstStyle/>
-                    <a:p>
-                      <a:r>
-                        <a:rPr lang="en-AU" sz="1100" dirty="0" smtClean="0"/>
-                        <a:t>text</a:t>
-                      </a:r>
-                      <a:endParaRPr lang="en-AU" sz="1100" dirty="0"/>
-                    </a:p>
-                  </a:txBody>
-                  <a:tcPr/>
-                </a:tc>
-              </a:tr>
-              <a:tr h="175982">
-                <a:tc>
-                  <a:txBody>
-                    <a:bodyPr/>
-                    <a:lstStyle/>
-                    <a:p>
-                      <a:r>
                         <a:rPr lang="en-AU" sz="1100" i="1" dirty="0" err="1" smtClean="0"/>
-                        <a:t>policy_id</a:t>
+                        <a:t>policy_uri</a:t>
                       </a:r>
                       <a:endParaRPr lang="en-AU" sz="1100" i="1" dirty="0"/>
                     </a:p>
@@ -5112,8 +5083,8 @@
                     <a:lstStyle/>
                     <a:p>
                       <a:r>
-                        <a:rPr lang="en-AU" sz="1100" i="1" dirty="0" err="1" smtClean="0"/>
-                        <a:t>int</a:t>
+                        <a:rPr lang="en-AU" sz="1100" i="1" dirty="0" smtClean="0"/>
+                        <a:t>text</a:t>
                       </a:r>
                       <a:endParaRPr lang="en-AU" sz="1100" i="1" dirty="0" smtClean="0"/>
                     </a:p>
@@ -5134,14 +5105,14 @@
           <p:nvPr>
             <p:extLst>
               <p:ext uri="{D42A27DB-BD31-4B8C-83A1-F6EECF244321}">
-                <p14:modId xmlns:p14="http://schemas.microsoft.com/office/powerpoint/2010/main" val="3580802807"/>
+                <p14:modId xmlns:p14="http://schemas.microsoft.com/office/powerpoint/2010/main" val="3530041007"/>
               </p:ext>
             </p:extLst>
           </p:nvPr>
         </p:nvGraphicFramePr>
         <p:xfrm>
           <a:off x="9979894" y="2452501"/>
-          <a:ext cx="1557580" cy="4312230"/>
+          <a:ext cx="1557580" cy="4024748"/>
         </p:xfrm>
         <a:graphic>
           <a:graphicData uri="http://schemas.openxmlformats.org/drawingml/2006/table">
@@ -5187,8 +5158,8 @@
                     <a:lstStyle/>
                     <a:p>
                       <a:r>
-                        <a:rPr lang="en-AU" sz="1100" b="1" dirty="0" smtClean="0"/>
-                        <a:t>id</a:t>
+                        <a:rPr lang="en-AU" sz="1100" b="1" dirty="0" err="1" smtClean="0"/>
+                        <a:t>uri</a:t>
                       </a:r>
                       <a:endParaRPr lang="en-AU" sz="1100" b="1" dirty="0"/>
                     </a:p>
@@ -5201,40 +5172,9 @@
                     <a:lstStyle/>
                     <a:p>
                       <a:r>
-                        <a:rPr lang="en-AU" sz="1100" b="1" dirty="0" err="1" smtClean="0"/>
-                        <a:t>int</a:t>
-                      </a:r>
-                      <a:endParaRPr lang="en-AU" sz="1100" b="1" dirty="0" smtClean="0"/>
-                    </a:p>
-                  </a:txBody>
-                  <a:tcPr/>
-                </a:tc>
-              </a:tr>
-              <a:tr h="287482">
-                <a:tc>
-                  <a:txBody>
-                    <a:bodyPr/>
-                    <a:lstStyle/>
-                    <a:p>
-                      <a:r>
-                        <a:rPr lang="en-AU" sz="1100" b="0" smtClean="0"/>
-                        <a:t>uri</a:t>
-                      </a:r>
-                      <a:endParaRPr lang="en-AU" sz="1100" b="0" dirty="0"/>
-                    </a:p>
-                  </a:txBody>
-                  <a:tcPr/>
-                </a:tc>
-                <a:tc>
-                  <a:txBody>
-                    <a:bodyPr/>
-                    <a:lstStyle/>
-                    <a:p>
-                      <a:r>
-                        <a:rPr lang="en-AU" sz="1100" b="0" dirty="0" smtClean="0"/>
+                        <a:rPr lang="en-AU" sz="1100" b="1" dirty="0" smtClean="0"/>
                         <a:t>text</a:t>
                       </a:r>
-                      <a:endParaRPr lang="en-AU" sz="1100" b="0" dirty="0" smtClean="0"/>
                     </a:p>
                   </a:txBody>
                   <a:tcPr/>
@@ -5613,7 +5553,7 @@
           <p:nvPr>
             <p:extLst>
               <p:ext uri="{D42A27DB-BD31-4B8C-83A1-F6EECF244321}">
-                <p14:modId xmlns:p14="http://schemas.microsoft.com/office/powerpoint/2010/main" val="3458964260"/>
+                <p14:modId xmlns:p14="http://schemas.microsoft.com/office/powerpoint/2010/main" val="530910977"/>
               </p:ext>
             </p:extLst>
           </p:nvPr>
@@ -5666,8 +5606,8 @@
                     <a:lstStyle/>
                     <a:p>
                       <a:r>
-                        <a:rPr lang="en-AU" sz="1100" b="1" dirty="0" smtClean="0"/>
-                        <a:t>id</a:t>
+                        <a:rPr lang="en-AU" sz="1100" b="1" dirty="0" err="1" smtClean="0"/>
+                        <a:t>uri</a:t>
                       </a:r>
                       <a:endParaRPr lang="en-AU" sz="1100" b="1" dirty="0"/>
                     </a:p>
@@ -5680,8 +5620,8 @@
                     <a:lstStyle/>
                     <a:p>
                       <a:r>
-                        <a:rPr lang="en-AU" sz="1100" b="1" dirty="0" err="1" smtClean="0"/>
-                        <a:t>int</a:t>
+                        <a:rPr lang="en-AU" sz="1100" b="1" dirty="0" smtClean="0"/>
+                        <a:t>text</a:t>
                       </a:r>
                       <a:endParaRPr lang="en-AU" sz="1100" b="1" dirty="0"/>
                     </a:p>
@@ -5847,7 +5787,7 @@
           <p:nvPr>
             <p:extLst>
               <p:ext uri="{D42A27DB-BD31-4B8C-83A1-F6EECF244321}">
-                <p14:modId xmlns:p14="http://schemas.microsoft.com/office/powerpoint/2010/main" val="504961736"/>
+                <p14:modId xmlns:p14="http://schemas.microsoft.com/office/powerpoint/2010/main" val="3106796470"/>
               </p:ext>
             </p:extLst>
           </p:nvPr>
@@ -5901,7 +5841,7 @@
                     <a:p>
                       <a:r>
                         <a:rPr lang="en-AU" sz="1100" b="1" i="1" dirty="0" err="1" smtClean="0"/>
-                        <a:t>policy_id</a:t>
+                        <a:t>policy_uri</a:t>
                       </a:r>
                       <a:endParaRPr lang="en-AU" sz="1100" b="1" i="1" dirty="0"/>
                     </a:p>
@@ -5914,8 +5854,8 @@
                     <a:lstStyle/>
                     <a:p>
                       <a:r>
-                        <a:rPr lang="en-AU" sz="1100" b="1" i="1" dirty="0" err="1" smtClean="0"/>
-                        <a:t>int</a:t>
+                        <a:rPr lang="en-AU" sz="1100" b="1" i="1" dirty="0" smtClean="0"/>
+                        <a:t>text</a:t>
                       </a:r>
                       <a:endParaRPr lang="en-AU" sz="1100" b="1" i="1" dirty="0"/>
                     </a:p>
@@ -5931,7 +5871,7 @@
                     <a:p>
                       <a:r>
                         <a:rPr lang="en-AU" sz="1100" b="1" i="1" dirty="0" err="1" smtClean="0"/>
-                        <a:t>rule_id</a:t>
+                        <a:t>rule_uri</a:t>
                       </a:r>
                       <a:endParaRPr lang="en-AU" sz="1100" b="1" i="1" dirty="0"/>
                     </a:p>
@@ -5944,8 +5884,8 @@
                     <a:lstStyle/>
                     <a:p>
                       <a:r>
-                        <a:rPr lang="en-AU" sz="1100" b="1" i="1" dirty="0" err="1" smtClean="0"/>
-                        <a:t>int</a:t>
+                        <a:rPr lang="en-AU" sz="1100" b="1" i="1" dirty="0" smtClean="0"/>
+                        <a:t>text</a:t>
                       </a:r>
                       <a:endParaRPr lang="en-AU" sz="1100" b="1" i="1" dirty="0"/>
                     </a:p>
@@ -6067,7 +6007,7 @@
           <p:nvPr>
             <p:extLst>
               <p:ext uri="{D42A27DB-BD31-4B8C-83A1-F6EECF244321}">
-                <p14:modId xmlns:p14="http://schemas.microsoft.com/office/powerpoint/2010/main" val="2951076628"/>
+                <p14:modId xmlns:p14="http://schemas.microsoft.com/office/powerpoint/2010/main" val="1320225478"/>
               </p:ext>
             </p:extLst>
           </p:nvPr>
@@ -6121,7 +6061,7 @@
                     <a:p>
                       <a:r>
                         <a:rPr lang="en-AU" sz="1100" b="1" i="1" dirty="0" err="1" smtClean="0"/>
-                        <a:t>rule_id</a:t>
+                        <a:t>rule_uri</a:t>
                       </a:r>
                       <a:endParaRPr lang="en-AU" sz="1100" b="1" i="1" dirty="0"/>
                     </a:p>
@@ -6134,8 +6074,8 @@
                     <a:lstStyle/>
                     <a:p>
                       <a:r>
-                        <a:rPr lang="en-AU" sz="1100" b="1" i="1" dirty="0" err="1" smtClean="0"/>
-                        <a:t>int</a:t>
+                        <a:rPr lang="en-AU" sz="1100" b="1" i="1" dirty="0" smtClean="0"/>
+                        <a:t>text</a:t>
                       </a:r>
                       <a:endParaRPr lang="en-AU" sz="1100" b="1" i="1" dirty="0"/>
                     </a:p>
@@ -6151,7 +6091,7 @@
                     <a:p>
                       <a:r>
                         <a:rPr lang="en-AU" sz="1100" b="1" i="1" dirty="0" err="1" smtClean="0"/>
-                        <a:t>action_id</a:t>
+                        <a:t>action_uri</a:t>
                       </a:r>
                       <a:endParaRPr lang="en-AU" sz="1100" b="1" i="1" dirty="0"/>
                     </a:p>
@@ -6164,8 +6104,8 @@
                     <a:lstStyle/>
                     <a:p>
                       <a:r>
-                        <a:rPr lang="en-AU" sz="1100" b="1" i="1" dirty="0" err="1" smtClean="0"/>
-                        <a:t>int</a:t>
+                        <a:rPr lang="en-AU" sz="1100" b="1" i="1" dirty="0" smtClean="0"/>
+                        <a:t>text</a:t>
                       </a:r>
                       <a:endParaRPr lang="en-AU" sz="1100" b="1" i="1" dirty="0"/>
                     </a:p>
@@ -6222,14 +6162,14 @@
           <p:nvPr>
             <p:extLst>
               <p:ext uri="{D42A27DB-BD31-4B8C-83A1-F6EECF244321}">
-                <p14:modId xmlns:p14="http://schemas.microsoft.com/office/powerpoint/2010/main" val="3805028368"/>
+                <p14:modId xmlns:p14="http://schemas.microsoft.com/office/powerpoint/2010/main" val="2570158488"/>
               </p:ext>
             </p:extLst>
           </p:nvPr>
         </p:nvGraphicFramePr>
         <p:xfrm>
           <a:off x="4467593" y="4289614"/>
-          <a:ext cx="1597812" cy="1722120"/>
+          <a:ext cx="1597812" cy="1463040"/>
         </p:xfrm>
         <a:graphic>
           <a:graphicData uri="http://schemas.openxmlformats.org/drawingml/2006/table">
@@ -6276,38 +6216,8 @@
                     <a:lstStyle/>
                     <a:p>
                       <a:r>
-                        <a:rPr lang="en-AU" sz="1100" b="1" dirty="0" smtClean="0"/>
-                        <a:t>id</a:t>
-                      </a:r>
-                      <a:endParaRPr lang="en-AU" sz="1100" b="1" dirty="0"/>
-                    </a:p>
-                  </a:txBody>
-                  <a:tcPr/>
-                </a:tc>
-                <a:tc>
-                  <a:txBody>
-                    <a:bodyPr/>
-                    <a:lstStyle/>
-                    <a:p>
-                      <a:r>
-                        <a:rPr lang="en-AU" sz="1100" b="1" dirty="0" err="1" smtClean="0"/>
-                        <a:t>int</a:t>
-                      </a:r>
-                      <a:endParaRPr lang="en-AU" sz="1100" b="1" dirty="0"/>
-                    </a:p>
-                  </a:txBody>
-                  <a:tcPr/>
-                </a:tc>
-              </a:tr>
-              <a:tr h="177442">
-                <a:tc>
-                  <a:txBody>
-                    <a:bodyPr/>
-                    <a:lstStyle/>
-                    <a:p>
-                      <a:r>
-                        <a:rPr lang="en-AU" sz="1100" b="0" dirty="0" smtClean="0"/>
-                        <a:t>label</a:t>
+                        <a:rPr lang="en-AU" sz="1100" b="0" smtClean="0"/>
+                        <a:t>uri</a:t>
                       </a:r>
                       <a:endParaRPr lang="en-AU" sz="1100" b="0" dirty="0"/>
                     </a:p>
@@ -6336,8 +6246,8 @@
                     <a:lstStyle/>
                     <a:p>
                       <a:r>
-                        <a:rPr lang="en-AU" sz="1100" b="0" dirty="0" err="1" smtClean="0"/>
-                        <a:t>uri</a:t>
+                        <a:rPr lang="en-AU" sz="1100" b="0" dirty="0" smtClean="0"/>
+                        <a:t>label</a:t>
                       </a:r>
                       <a:endParaRPr lang="en-AU" sz="1100" b="0" dirty="0"/>
                     </a:p>
@@ -6462,8 +6372,8 @@
         </p:nvCxnSpPr>
         <p:spPr>
           <a:xfrm>
-            <a:off x="11537474" y="2063881"/>
-            <a:ext cx="349728" cy="0"/>
+            <a:off x="11537474" y="1801167"/>
+            <a:ext cx="349728" cy="262714"/>
           </a:xfrm>
           <a:prstGeom prst="line">
             <a:avLst/>
@@ -6556,14 +6466,14 @@
           <p:nvPr>
             <p:extLst>
               <p:ext uri="{D42A27DB-BD31-4B8C-83A1-F6EECF244321}">
-                <p14:modId xmlns:p14="http://schemas.microsoft.com/office/powerpoint/2010/main" val="861548680"/>
+                <p14:modId xmlns:p14="http://schemas.microsoft.com/office/powerpoint/2010/main" val="3217417250"/>
               </p:ext>
             </p:extLst>
           </p:nvPr>
         </p:nvGraphicFramePr>
         <p:xfrm>
           <a:off x="4556333" y="1401599"/>
-          <a:ext cx="1029196" cy="777240"/>
+          <a:ext cx="1029196" cy="518160"/>
         </p:xfrm>
         <a:graphic>
           <a:graphicData uri="http://schemas.openxmlformats.org/drawingml/2006/table">
@@ -6597,36 +6507,6 @@
                     <a:lstStyle/>
                     <a:p>
                       <a:endParaRPr lang="en-AU" dirty="0"/>
-                    </a:p>
-                  </a:txBody>
-                  <a:tcPr/>
-                </a:tc>
-              </a:tr>
-              <a:tr h="232449">
-                <a:tc>
-                  <a:txBody>
-                    <a:bodyPr/>
-                    <a:lstStyle/>
-                    <a:p>
-                      <a:r>
-                        <a:rPr lang="en-AU" sz="1100" b="1" dirty="0" smtClean="0"/>
-                        <a:t>id</a:t>
-                      </a:r>
-                      <a:endParaRPr lang="en-AU" sz="1100" b="1" dirty="0"/>
-                    </a:p>
-                  </a:txBody>
-                  <a:tcPr/>
-                </a:tc>
-                <a:tc>
-                  <a:txBody>
-                    <a:bodyPr/>
-                    <a:lstStyle/>
-                    <a:p>
-                      <a:r>
-                        <a:rPr lang="en-AU" sz="1100" b="1" dirty="0" err="1" smtClean="0"/>
-                        <a:t>int</a:t>
-                      </a:r>
-                      <a:endParaRPr lang="en-AU" sz="1100" b="1" dirty="0"/>
                     </a:p>
                   </a:txBody>
                   <a:tcPr/>
@@ -6675,7 +6555,7 @@
           <p:nvPr>
             <p:extLst>
               <p:ext uri="{D42A27DB-BD31-4B8C-83A1-F6EECF244321}">
-                <p14:modId xmlns:p14="http://schemas.microsoft.com/office/powerpoint/2010/main" val="3354401884"/>
+                <p14:modId xmlns:p14="http://schemas.microsoft.com/office/powerpoint/2010/main" val="2181716243"/>
               </p:ext>
             </p:extLst>
           </p:nvPr>
@@ -6729,7 +6609,7 @@
                     <a:p>
                       <a:r>
                         <a:rPr lang="en-AU" sz="1100" b="1" i="1" dirty="0" err="1" smtClean="0"/>
-                        <a:t>party_id</a:t>
+                        <a:t>party_uri</a:t>
                       </a:r>
                       <a:endParaRPr lang="en-AU" sz="1100" b="1" i="1" dirty="0"/>
                     </a:p>
@@ -6742,8 +6622,8 @@
                     <a:lstStyle/>
                     <a:p>
                       <a:r>
-                        <a:rPr lang="en-AU" sz="1100" b="1" i="1" dirty="0" err="1" smtClean="0"/>
-                        <a:t>int</a:t>
+                        <a:rPr lang="en-AU" sz="1100" b="1" i="1" dirty="0" smtClean="0"/>
+                        <a:t>text</a:t>
                       </a:r>
                       <a:endParaRPr lang="en-AU" sz="1100" b="1" i="1" dirty="0"/>
                     </a:p>
@@ -6759,7 +6639,7 @@
                     <a:p>
                       <a:r>
                         <a:rPr lang="en-AU" sz="1100" b="1" i="1" dirty="0" err="1" smtClean="0"/>
-                        <a:t>rule_id</a:t>
+                        <a:t>rule_uri</a:t>
                       </a:r>
                       <a:endParaRPr lang="en-AU" sz="1100" b="1" i="1" dirty="0"/>
                     </a:p>
@@ -6772,8 +6652,8 @@
                     <a:lstStyle/>
                     <a:p>
                       <a:r>
-                        <a:rPr lang="en-AU" sz="1100" b="1" i="1" dirty="0" err="1" smtClean="0"/>
-                        <a:t>int</a:t>
+                        <a:rPr lang="en-AU" sz="1100" b="1" i="1" dirty="0" smtClean="0"/>
+                        <a:t>text</a:t>
                       </a:r>
                       <a:endParaRPr lang="en-AU" sz="1100" b="1" i="1" dirty="0"/>
                     </a:p>
@@ -6794,7 +6674,7 @@
           <p:nvPr>
             <p:extLst>
               <p:ext uri="{D42A27DB-BD31-4B8C-83A1-F6EECF244321}">
-                <p14:modId xmlns:p14="http://schemas.microsoft.com/office/powerpoint/2010/main" val="3603093489"/>
+                <p14:modId xmlns:p14="http://schemas.microsoft.com/office/powerpoint/2010/main" val="693576311"/>
               </p:ext>
             </p:extLst>
           </p:nvPr>
@@ -6848,7 +6728,7 @@
                     <a:p>
                       <a:r>
                         <a:rPr lang="en-AU" sz="1100" b="1" i="1" dirty="0" err="1" smtClean="0"/>
-                        <a:t>party_id</a:t>
+                        <a:t>party_uri</a:t>
                       </a:r>
                       <a:endParaRPr lang="en-AU" sz="1100" b="1" i="1" dirty="0"/>
                     </a:p>
@@ -6861,8 +6741,8 @@
                     <a:lstStyle/>
                     <a:p>
                       <a:r>
-                        <a:rPr lang="en-AU" sz="1100" b="1" i="1" dirty="0" err="1" smtClean="0"/>
-                        <a:t>int</a:t>
+                        <a:rPr lang="en-AU" sz="1100" b="1" i="1" dirty="0" smtClean="0"/>
+                        <a:t>text</a:t>
                       </a:r>
                       <a:endParaRPr lang="en-AU" sz="1100" b="1" i="1" dirty="0"/>
                     </a:p>
@@ -6878,7 +6758,7 @@
                     <a:p>
                       <a:r>
                         <a:rPr lang="en-AU" sz="1100" b="1" i="1" dirty="0" err="1" smtClean="0"/>
-                        <a:t>rule_id</a:t>
+                        <a:t>rule_uri</a:t>
                       </a:r>
                       <a:endParaRPr lang="en-AU" sz="1100" b="1" i="1" dirty="0"/>
                     </a:p>
@@ -6891,8 +6771,8 @@
                     <a:lstStyle/>
                     <a:p>
                       <a:r>
-                        <a:rPr lang="en-AU" sz="1100" b="1" i="1" dirty="0" err="1" smtClean="0"/>
-                        <a:t>int</a:t>
+                        <a:rPr lang="en-AU" sz="1100" b="1" i="1" dirty="0" smtClean="0"/>
+                        <a:t>text</a:t>
                       </a:r>
                       <a:endParaRPr lang="en-AU" sz="1100" b="1" i="1" dirty="0"/>
                     </a:p>
@@ -6944,14 +6824,13 @@
           <p:cNvPr id="63" name="Straight Arrow Connector 62"/>
           <p:cNvCxnSpPr>
             <a:stCxn id="54" idx="3"/>
-            <a:endCxn id="53" idx="1"/>
           </p:cNvCxnSpPr>
           <p:nvPr/>
         </p:nvCxnSpPr>
         <p:spPr>
-          <a:xfrm flipV="1">
-            <a:off x="3663652" y="1790219"/>
-            <a:ext cx="892681" cy="10948"/>
+          <a:xfrm>
+            <a:off x="3663652" y="1801167"/>
+            <a:ext cx="892681" cy="0"/>
           </a:xfrm>
           <a:prstGeom prst="straightConnector1">
             <a:avLst/>
@@ -7013,14 +6892,13 @@
           <p:cNvPr id="67" name="Straight Arrow Connector 66"/>
           <p:cNvCxnSpPr>
             <a:stCxn id="55" idx="1"/>
-            <a:endCxn id="53" idx="3"/>
           </p:cNvCxnSpPr>
           <p:nvPr/>
         </p:nvCxnSpPr>
         <p:spPr>
           <a:xfrm flipH="1">
             <a:off x="5585529" y="1767151"/>
-            <a:ext cx="1120732" cy="23068"/>
+            <a:ext cx="1120732" cy="34016"/>
           </a:xfrm>
           <a:prstGeom prst="straightConnector1">
             <a:avLst/>
@@ -7247,8 +7125,8 @@
         </p:nvCxnSpPr>
         <p:spPr>
           <a:xfrm flipH="1">
-            <a:off x="8634846" y="3488268"/>
-            <a:ext cx="1345048" cy="2097495"/>
+            <a:off x="8634846" y="3260914"/>
+            <a:ext cx="1345048" cy="2324849"/>
           </a:xfrm>
           <a:prstGeom prst="straightConnector1">
             <a:avLst/>

</xml_diff>

<commit_message>
Switched to using pytest fixtures in tests
</commit_message>
<xml_diff>
--- a/_docs/DataModel.pptx
+++ b/_docs/DataModel.pptx
@@ -135,7 +135,7 @@
           <p:cNvPr id="2" name="Title 1">
             <a:extLst>
               <a:ext uri="{FF2B5EF4-FFF2-40B4-BE49-F238E27FC236}">
-                <a16:creationId xmlns:a16="http://schemas.microsoft.com/office/drawing/2014/main" xmlns="" id="{7812FAD9-B738-4E2B-A9F3-7D6DA8649C7B}"/>
+                <a16:creationId xmlns="" xmlns:a16="http://schemas.microsoft.com/office/drawing/2014/main" id="{7812FAD9-B738-4E2B-A9F3-7D6DA8649C7B}"/>
               </a:ext>
             </a:extLst>
           </p:cNvPr>
@@ -173,7 +173,7 @@
           <p:cNvPr id="3" name="Subtitle 2">
             <a:extLst>
               <a:ext uri="{FF2B5EF4-FFF2-40B4-BE49-F238E27FC236}">
-                <a16:creationId xmlns:a16="http://schemas.microsoft.com/office/drawing/2014/main" xmlns="" id="{CED3ABCF-AD94-42E3-95E2-D5E653DEF63F}"/>
+                <a16:creationId xmlns="" xmlns:a16="http://schemas.microsoft.com/office/drawing/2014/main" id="{CED3ABCF-AD94-42E3-95E2-D5E653DEF63F}"/>
               </a:ext>
             </a:extLst>
           </p:cNvPr>
@@ -244,7 +244,7 @@
           <p:cNvPr id="4" name="Date Placeholder 3">
             <a:extLst>
               <a:ext uri="{FF2B5EF4-FFF2-40B4-BE49-F238E27FC236}">
-                <a16:creationId xmlns:a16="http://schemas.microsoft.com/office/drawing/2014/main" xmlns="" id="{5AB92BAC-2DD4-42CE-9065-E2518728CD65}"/>
+                <a16:creationId xmlns="" xmlns:a16="http://schemas.microsoft.com/office/drawing/2014/main" id="{5AB92BAC-2DD4-42CE-9065-E2518728CD65}"/>
               </a:ext>
             </a:extLst>
           </p:cNvPr>
@@ -262,7 +262,7 @@
           <a:p>
             <a:fld id="{2F956D3E-0B91-471C-9743-3F865EE6F573}" type="datetimeFigureOut">
               <a:rPr lang="en-AU" smtClean="0"/>
-              <a:t>14/08/2018</a:t>
+              <a:t>17/08/2018</a:t>
             </a:fld>
             <a:endParaRPr lang="en-AU"/>
           </a:p>
@@ -273,7 +273,7 @@
           <p:cNvPr id="5" name="Footer Placeholder 4">
             <a:extLst>
               <a:ext uri="{FF2B5EF4-FFF2-40B4-BE49-F238E27FC236}">
-                <a16:creationId xmlns:a16="http://schemas.microsoft.com/office/drawing/2014/main" xmlns="" id="{137C3D4C-B868-4F83-8919-AE7F2500E437}"/>
+                <a16:creationId xmlns="" xmlns:a16="http://schemas.microsoft.com/office/drawing/2014/main" id="{137C3D4C-B868-4F83-8919-AE7F2500E437}"/>
               </a:ext>
             </a:extLst>
           </p:cNvPr>
@@ -298,7 +298,7 @@
           <p:cNvPr id="6" name="Slide Number Placeholder 5">
             <a:extLst>
               <a:ext uri="{FF2B5EF4-FFF2-40B4-BE49-F238E27FC236}">
-                <a16:creationId xmlns:a16="http://schemas.microsoft.com/office/drawing/2014/main" xmlns="" id="{ABBB53F0-83D7-42D4-90A5-7D5EE7C0AAD3}"/>
+                <a16:creationId xmlns="" xmlns:a16="http://schemas.microsoft.com/office/drawing/2014/main" id="{ABBB53F0-83D7-42D4-90A5-7D5EE7C0AAD3}"/>
               </a:ext>
             </a:extLst>
           </p:cNvPr>
@@ -357,7 +357,7 @@
           <p:cNvPr id="2" name="Title 1">
             <a:extLst>
               <a:ext uri="{FF2B5EF4-FFF2-40B4-BE49-F238E27FC236}">
-                <a16:creationId xmlns:a16="http://schemas.microsoft.com/office/drawing/2014/main" xmlns="" id="{EDEAE3B1-565C-4AD8-A67C-7D2C44ECA18D}"/>
+                <a16:creationId xmlns="" xmlns:a16="http://schemas.microsoft.com/office/drawing/2014/main" id="{EDEAE3B1-565C-4AD8-A67C-7D2C44ECA18D}"/>
               </a:ext>
             </a:extLst>
           </p:cNvPr>
@@ -386,7 +386,7 @@
           <p:cNvPr id="3" name="Vertical Text Placeholder 2">
             <a:extLst>
               <a:ext uri="{FF2B5EF4-FFF2-40B4-BE49-F238E27FC236}">
-                <a16:creationId xmlns:a16="http://schemas.microsoft.com/office/drawing/2014/main" xmlns="" id="{89499874-28E0-4013-933C-7A7F4857D944}"/>
+                <a16:creationId xmlns="" xmlns:a16="http://schemas.microsoft.com/office/drawing/2014/main" id="{89499874-28E0-4013-933C-7A7F4857D944}"/>
               </a:ext>
             </a:extLst>
           </p:cNvPr>
@@ -444,7 +444,7 @@
           <p:cNvPr id="4" name="Date Placeholder 3">
             <a:extLst>
               <a:ext uri="{FF2B5EF4-FFF2-40B4-BE49-F238E27FC236}">
-                <a16:creationId xmlns:a16="http://schemas.microsoft.com/office/drawing/2014/main" xmlns="" id="{30B68540-FC47-4085-8638-DE11BCE14D7E}"/>
+                <a16:creationId xmlns="" xmlns:a16="http://schemas.microsoft.com/office/drawing/2014/main" id="{30B68540-FC47-4085-8638-DE11BCE14D7E}"/>
               </a:ext>
             </a:extLst>
           </p:cNvPr>
@@ -462,7 +462,7 @@
           <a:p>
             <a:fld id="{2F956D3E-0B91-471C-9743-3F865EE6F573}" type="datetimeFigureOut">
               <a:rPr lang="en-AU" smtClean="0"/>
-              <a:t>14/08/2018</a:t>
+              <a:t>17/08/2018</a:t>
             </a:fld>
             <a:endParaRPr lang="en-AU"/>
           </a:p>
@@ -473,7 +473,7 @@
           <p:cNvPr id="5" name="Footer Placeholder 4">
             <a:extLst>
               <a:ext uri="{FF2B5EF4-FFF2-40B4-BE49-F238E27FC236}">
-                <a16:creationId xmlns:a16="http://schemas.microsoft.com/office/drawing/2014/main" xmlns="" id="{149BDF69-9D0A-4871-B742-85D1C27ACA21}"/>
+                <a16:creationId xmlns="" xmlns:a16="http://schemas.microsoft.com/office/drawing/2014/main" id="{149BDF69-9D0A-4871-B742-85D1C27ACA21}"/>
               </a:ext>
             </a:extLst>
           </p:cNvPr>
@@ -498,7 +498,7 @@
           <p:cNvPr id="6" name="Slide Number Placeholder 5">
             <a:extLst>
               <a:ext uri="{FF2B5EF4-FFF2-40B4-BE49-F238E27FC236}">
-                <a16:creationId xmlns:a16="http://schemas.microsoft.com/office/drawing/2014/main" xmlns="" id="{BAC96E6A-25E9-4A3D-BDE5-E881314DE0D7}"/>
+                <a16:creationId xmlns="" xmlns:a16="http://schemas.microsoft.com/office/drawing/2014/main" id="{BAC96E6A-25E9-4A3D-BDE5-E881314DE0D7}"/>
               </a:ext>
             </a:extLst>
           </p:cNvPr>
@@ -557,7 +557,7 @@
           <p:cNvPr id="2" name="Vertical Title 1">
             <a:extLst>
               <a:ext uri="{FF2B5EF4-FFF2-40B4-BE49-F238E27FC236}">
-                <a16:creationId xmlns:a16="http://schemas.microsoft.com/office/drawing/2014/main" xmlns="" id="{8BD4BC0C-9CFC-4FB2-B5C6-6EEC1B7F772D}"/>
+                <a16:creationId xmlns="" xmlns:a16="http://schemas.microsoft.com/office/drawing/2014/main" id="{8BD4BC0C-9CFC-4FB2-B5C6-6EEC1B7F772D}"/>
               </a:ext>
             </a:extLst>
           </p:cNvPr>
@@ -591,7 +591,7 @@
           <p:cNvPr id="3" name="Vertical Text Placeholder 2">
             <a:extLst>
               <a:ext uri="{FF2B5EF4-FFF2-40B4-BE49-F238E27FC236}">
-                <a16:creationId xmlns:a16="http://schemas.microsoft.com/office/drawing/2014/main" xmlns="" id="{5CF7FA3D-9ABB-49C7-AF65-E0869B2150C9}"/>
+                <a16:creationId xmlns="" xmlns:a16="http://schemas.microsoft.com/office/drawing/2014/main" id="{5CF7FA3D-9ABB-49C7-AF65-E0869B2150C9}"/>
               </a:ext>
             </a:extLst>
           </p:cNvPr>
@@ -654,7 +654,7 @@
           <p:cNvPr id="4" name="Date Placeholder 3">
             <a:extLst>
               <a:ext uri="{FF2B5EF4-FFF2-40B4-BE49-F238E27FC236}">
-                <a16:creationId xmlns:a16="http://schemas.microsoft.com/office/drawing/2014/main" xmlns="" id="{FBF00D9E-50E5-4276-BC40-27125BC1B69A}"/>
+                <a16:creationId xmlns="" xmlns:a16="http://schemas.microsoft.com/office/drawing/2014/main" id="{FBF00D9E-50E5-4276-BC40-27125BC1B69A}"/>
               </a:ext>
             </a:extLst>
           </p:cNvPr>
@@ -672,7 +672,7 @@
           <a:p>
             <a:fld id="{2F956D3E-0B91-471C-9743-3F865EE6F573}" type="datetimeFigureOut">
               <a:rPr lang="en-AU" smtClean="0"/>
-              <a:t>14/08/2018</a:t>
+              <a:t>17/08/2018</a:t>
             </a:fld>
             <a:endParaRPr lang="en-AU"/>
           </a:p>
@@ -683,7 +683,7 @@
           <p:cNvPr id="5" name="Footer Placeholder 4">
             <a:extLst>
               <a:ext uri="{FF2B5EF4-FFF2-40B4-BE49-F238E27FC236}">
-                <a16:creationId xmlns:a16="http://schemas.microsoft.com/office/drawing/2014/main" xmlns="" id="{3AA20A04-EE64-4C85-A4C3-C674E216B21E}"/>
+                <a16:creationId xmlns="" xmlns:a16="http://schemas.microsoft.com/office/drawing/2014/main" id="{3AA20A04-EE64-4C85-A4C3-C674E216B21E}"/>
               </a:ext>
             </a:extLst>
           </p:cNvPr>
@@ -708,7 +708,7 @@
           <p:cNvPr id="6" name="Slide Number Placeholder 5">
             <a:extLst>
               <a:ext uri="{FF2B5EF4-FFF2-40B4-BE49-F238E27FC236}">
-                <a16:creationId xmlns:a16="http://schemas.microsoft.com/office/drawing/2014/main" xmlns="" id="{0F34C053-3886-4674-85D6-13CCCB876AEC}"/>
+                <a16:creationId xmlns="" xmlns:a16="http://schemas.microsoft.com/office/drawing/2014/main" id="{0F34C053-3886-4674-85D6-13CCCB876AEC}"/>
               </a:ext>
             </a:extLst>
           </p:cNvPr>
@@ -767,7 +767,7 @@
           <p:cNvPr id="2" name="Title 1">
             <a:extLst>
               <a:ext uri="{FF2B5EF4-FFF2-40B4-BE49-F238E27FC236}">
-                <a16:creationId xmlns:a16="http://schemas.microsoft.com/office/drawing/2014/main" xmlns="" id="{6D70D093-F0D3-479C-B65D-3031107C0DF1}"/>
+                <a16:creationId xmlns="" xmlns:a16="http://schemas.microsoft.com/office/drawing/2014/main" id="{6D70D093-F0D3-479C-B65D-3031107C0DF1}"/>
               </a:ext>
             </a:extLst>
           </p:cNvPr>
@@ -796,7 +796,7 @@
           <p:cNvPr id="3" name="Content Placeholder 2">
             <a:extLst>
               <a:ext uri="{FF2B5EF4-FFF2-40B4-BE49-F238E27FC236}">
-                <a16:creationId xmlns:a16="http://schemas.microsoft.com/office/drawing/2014/main" xmlns="" id="{19F2333E-AD72-4069-9999-D316EB1D2BE2}"/>
+                <a16:creationId xmlns="" xmlns:a16="http://schemas.microsoft.com/office/drawing/2014/main" id="{19F2333E-AD72-4069-9999-D316EB1D2BE2}"/>
               </a:ext>
             </a:extLst>
           </p:cNvPr>
@@ -854,7 +854,7 @@
           <p:cNvPr id="4" name="Date Placeholder 3">
             <a:extLst>
               <a:ext uri="{FF2B5EF4-FFF2-40B4-BE49-F238E27FC236}">
-                <a16:creationId xmlns:a16="http://schemas.microsoft.com/office/drawing/2014/main" xmlns="" id="{A5D0C69D-8EED-4855-9D9D-192FA0501F24}"/>
+                <a16:creationId xmlns="" xmlns:a16="http://schemas.microsoft.com/office/drawing/2014/main" id="{A5D0C69D-8EED-4855-9D9D-192FA0501F24}"/>
               </a:ext>
             </a:extLst>
           </p:cNvPr>
@@ -872,7 +872,7 @@
           <a:p>
             <a:fld id="{2F956D3E-0B91-471C-9743-3F865EE6F573}" type="datetimeFigureOut">
               <a:rPr lang="en-AU" smtClean="0"/>
-              <a:t>14/08/2018</a:t>
+              <a:t>17/08/2018</a:t>
             </a:fld>
             <a:endParaRPr lang="en-AU"/>
           </a:p>
@@ -883,7 +883,7 @@
           <p:cNvPr id="5" name="Footer Placeholder 4">
             <a:extLst>
               <a:ext uri="{FF2B5EF4-FFF2-40B4-BE49-F238E27FC236}">
-                <a16:creationId xmlns:a16="http://schemas.microsoft.com/office/drawing/2014/main" xmlns="" id="{3E40E1C3-407E-4CDD-B265-40C6EAF109CB}"/>
+                <a16:creationId xmlns="" xmlns:a16="http://schemas.microsoft.com/office/drawing/2014/main" id="{3E40E1C3-407E-4CDD-B265-40C6EAF109CB}"/>
               </a:ext>
             </a:extLst>
           </p:cNvPr>
@@ -908,7 +908,7 @@
           <p:cNvPr id="6" name="Slide Number Placeholder 5">
             <a:extLst>
               <a:ext uri="{FF2B5EF4-FFF2-40B4-BE49-F238E27FC236}">
-                <a16:creationId xmlns:a16="http://schemas.microsoft.com/office/drawing/2014/main" xmlns="" id="{845BB6A8-2931-4612-9030-020514B9DFCC}"/>
+                <a16:creationId xmlns="" xmlns:a16="http://schemas.microsoft.com/office/drawing/2014/main" id="{845BB6A8-2931-4612-9030-020514B9DFCC}"/>
               </a:ext>
             </a:extLst>
           </p:cNvPr>
@@ -967,7 +967,7 @@
           <p:cNvPr id="2" name="Title 1">
             <a:extLst>
               <a:ext uri="{FF2B5EF4-FFF2-40B4-BE49-F238E27FC236}">
-                <a16:creationId xmlns:a16="http://schemas.microsoft.com/office/drawing/2014/main" xmlns="" id="{9648ED28-6C5E-4B58-8121-9279F11D3D73}"/>
+                <a16:creationId xmlns="" xmlns:a16="http://schemas.microsoft.com/office/drawing/2014/main" id="{9648ED28-6C5E-4B58-8121-9279F11D3D73}"/>
               </a:ext>
             </a:extLst>
           </p:cNvPr>
@@ -1005,7 +1005,7 @@
           <p:cNvPr id="3" name="Text Placeholder 2">
             <a:extLst>
               <a:ext uri="{FF2B5EF4-FFF2-40B4-BE49-F238E27FC236}">
-                <a16:creationId xmlns:a16="http://schemas.microsoft.com/office/drawing/2014/main" xmlns="" id="{B243195A-3915-4922-B15F-B46A8AB41FEA}"/>
+                <a16:creationId xmlns="" xmlns:a16="http://schemas.microsoft.com/office/drawing/2014/main" id="{B243195A-3915-4922-B15F-B46A8AB41FEA}"/>
               </a:ext>
             </a:extLst>
           </p:cNvPr>
@@ -1130,7 +1130,7 @@
           <p:cNvPr id="4" name="Date Placeholder 3">
             <a:extLst>
               <a:ext uri="{FF2B5EF4-FFF2-40B4-BE49-F238E27FC236}">
-                <a16:creationId xmlns:a16="http://schemas.microsoft.com/office/drawing/2014/main" xmlns="" id="{33A69456-A0E9-4808-8AD0-8E412F7B6478}"/>
+                <a16:creationId xmlns="" xmlns:a16="http://schemas.microsoft.com/office/drawing/2014/main" id="{33A69456-A0E9-4808-8AD0-8E412F7B6478}"/>
               </a:ext>
             </a:extLst>
           </p:cNvPr>
@@ -1148,7 +1148,7 @@
           <a:p>
             <a:fld id="{2F956D3E-0B91-471C-9743-3F865EE6F573}" type="datetimeFigureOut">
               <a:rPr lang="en-AU" smtClean="0"/>
-              <a:t>14/08/2018</a:t>
+              <a:t>17/08/2018</a:t>
             </a:fld>
             <a:endParaRPr lang="en-AU"/>
           </a:p>
@@ -1159,7 +1159,7 @@
           <p:cNvPr id="5" name="Footer Placeholder 4">
             <a:extLst>
               <a:ext uri="{FF2B5EF4-FFF2-40B4-BE49-F238E27FC236}">
-                <a16:creationId xmlns:a16="http://schemas.microsoft.com/office/drawing/2014/main" xmlns="" id="{E0CD1CF0-CD4A-49A3-A5A3-C4241E2A5F63}"/>
+                <a16:creationId xmlns="" xmlns:a16="http://schemas.microsoft.com/office/drawing/2014/main" id="{E0CD1CF0-CD4A-49A3-A5A3-C4241E2A5F63}"/>
               </a:ext>
             </a:extLst>
           </p:cNvPr>
@@ -1184,7 +1184,7 @@
           <p:cNvPr id="6" name="Slide Number Placeholder 5">
             <a:extLst>
               <a:ext uri="{FF2B5EF4-FFF2-40B4-BE49-F238E27FC236}">
-                <a16:creationId xmlns:a16="http://schemas.microsoft.com/office/drawing/2014/main" xmlns="" id="{977DB6D3-8C4E-4ED5-9327-2DCA26535F2F}"/>
+                <a16:creationId xmlns="" xmlns:a16="http://schemas.microsoft.com/office/drawing/2014/main" id="{977DB6D3-8C4E-4ED5-9327-2DCA26535F2F}"/>
               </a:ext>
             </a:extLst>
           </p:cNvPr>
@@ -1243,7 +1243,7 @@
           <p:cNvPr id="2" name="Title 1">
             <a:extLst>
               <a:ext uri="{FF2B5EF4-FFF2-40B4-BE49-F238E27FC236}">
-                <a16:creationId xmlns:a16="http://schemas.microsoft.com/office/drawing/2014/main" xmlns="" id="{07C65CDB-FECB-413B-B3E2-B8B3289BE67F}"/>
+                <a16:creationId xmlns="" xmlns:a16="http://schemas.microsoft.com/office/drawing/2014/main" id="{07C65CDB-FECB-413B-B3E2-B8B3289BE67F}"/>
               </a:ext>
             </a:extLst>
           </p:cNvPr>
@@ -1272,7 +1272,7 @@
           <p:cNvPr id="3" name="Content Placeholder 2">
             <a:extLst>
               <a:ext uri="{FF2B5EF4-FFF2-40B4-BE49-F238E27FC236}">
-                <a16:creationId xmlns:a16="http://schemas.microsoft.com/office/drawing/2014/main" xmlns="" id="{2E6195E5-493D-470C-8030-A76CAC535D10}"/>
+                <a16:creationId xmlns="" xmlns:a16="http://schemas.microsoft.com/office/drawing/2014/main" id="{2E6195E5-493D-470C-8030-A76CAC535D10}"/>
               </a:ext>
             </a:extLst>
           </p:cNvPr>
@@ -1335,7 +1335,7 @@
           <p:cNvPr id="4" name="Content Placeholder 3">
             <a:extLst>
               <a:ext uri="{FF2B5EF4-FFF2-40B4-BE49-F238E27FC236}">
-                <a16:creationId xmlns:a16="http://schemas.microsoft.com/office/drawing/2014/main" xmlns="" id="{4F75BA75-06D0-4C8F-978B-E8DD198357AB}"/>
+                <a16:creationId xmlns="" xmlns:a16="http://schemas.microsoft.com/office/drawing/2014/main" id="{4F75BA75-06D0-4C8F-978B-E8DD198357AB}"/>
               </a:ext>
             </a:extLst>
           </p:cNvPr>
@@ -1398,7 +1398,7 @@
           <p:cNvPr id="5" name="Date Placeholder 4">
             <a:extLst>
               <a:ext uri="{FF2B5EF4-FFF2-40B4-BE49-F238E27FC236}">
-                <a16:creationId xmlns:a16="http://schemas.microsoft.com/office/drawing/2014/main" xmlns="" id="{B8464B70-E9DB-4711-87B7-24F57EF07851}"/>
+                <a16:creationId xmlns="" xmlns:a16="http://schemas.microsoft.com/office/drawing/2014/main" id="{B8464B70-E9DB-4711-87B7-24F57EF07851}"/>
               </a:ext>
             </a:extLst>
           </p:cNvPr>
@@ -1416,7 +1416,7 @@
           <a:p>
             <a:fld id="{2F956D3E-0B91-471C-9743-3F865EE6F573}" type="datetimeFigureOut">
               <a:rPr lang="en-AU" smtClean="0"/>
-              <a:t>14/08/2018</a:t>
+              <a:t>17/08/2018</a:t>
             </a:fld>
             <a:endParaRPr lang="en-AU"/>
           </a:p>
@@ -1427,7 +1427,7 @@
           <p:cNvPr id="6" name="Footer Placeholder 5">
             <a:extLst>
               <a:ext uri="{FF2B5EF4-FFF2-40B4-BE49-F238E27FC236}">
-                <a16:creationId xmlns:a16="http://schemas.microsoft.com/office/drawing/2014/main" xmlns="" id="{749AD7CE-527F-410D-975F-A7CD735BDEDC}"/>
+                <a16:creationId xmlns="" xmlns:a16="http://schemas.microsoft.com/office/drawing/2014/main" id="{749AD7CE-527F-410D-975F-A7CD735BDEDC}"/>
               </a:ext>
             </a:extLst>
           </p:cNvPr>
@@ -1452,7 +1452,7 @@
           <p:cNvPr id="7" name="Slide Number Placeholder 6">
             <a:extLst>
               <a:ext uri="{FF2B5EF4-FFF2-40B4-BE49-F238E27FC236}">
-                <a16:creationId xmlns:a16="http://schemas.microsoft.com/office/drawing/2014/main" xmlns="" id="{255D3E42-D06E-4C32-A2BC-75DE87B576C3}"/>
+                <a16:creationId xmlns="" xmlns:a16="http://schemas.microsoft.com/office/drawing/2014/main" id="{255D3E42-D06E-4C32-A2BC-75DE87B576C3}"/>
               </a:ext>
             </a:extLst>
           </p:cNvPr>
@@ -1511,7 +1511,7 @@
           <p:cNvPr id="2" name="Title 1">
             <a:extLst>
               <a:ext uri="{FF2B5EF4-FFF2-40B4-BE49-F238E27FC236}">
-                <a16:creationId xmlns:a16="http://schemas.microsoft.com/office/drawing/2014/main" xmlns="" id="{BE6E0455-D9EF-42F6-B509-7FDC251CFDAF}"/>
+                <a16:creationId xmlns="" xmlns:a16="http://schemas.microsoft.com/office/drawing/2014/main" id="{BE6E0455-D9EF-42F6-B509-7FDC251CFDAF}"/>
               </a:ext>
             </a:extLst>
           </p:cNvPr>
@@ -1545,7 +1545,7 @@
           <p:cNvPr id="3" name="Text Placeholder 2">
             <a:extLst>
               <a:ext uri="{FF2B5EF4-FFF2-40B4-BE49-F238E27FC236}">
-                <a16:creationId xmlns:a16="http://schemas.microsoft.com/office/drawing/2014/main" xmlns="" id="{5117D045-1AD3-424F-855E-BD6F9FACDA1A}"/>
+                <a16:creationId xmlns="" xmlns:a16="http://schemas.microsoft.com/office/drawing/2014/main" id="{5117D045-1AD3-424F-855E-BD6F9FACDA1A}"/>
               </a:ext>
             </a:extLst>
           </p:cNvPr>
@@ -1616,7 +1616,7 @@
           <p:cNvPr id="4" name="Content Placeholder 3">
             <a:extLst>
               <a:ext uri="{FF2B5EF4-FFF2-40B4-BE49-F238E27FC236}">
-                <a16:creationId xmlns:a16="http://schemas.microsoft.com/office/drawing/2014/main" xmlns="" id="{CC38E2F2-5E09-477C-BF9F-8B671E6613BE}"/>
+                <a16:creationId xmlns="" xmlns:a16="http://schemas.microsoft.com/office/drawing/2014/main" id="{CC38E2F2-5E09-477C-BF9F-8B671E6613BE}"/>
               </a:ext>
             </a:extLst>
           </p:cNvPr>
@@ -1679,7 +1679,7 @@
           <p:cNvPr id="5" name="Text Placeholder 4">
             <a:extLst>
               <a:ext uri="{FF2B5EF4-FFF2-40B4-BE49-F238E27FC236}">
-                <a16:creationId xmlns:a16="http://schemas.microsoft.com/office/drawing/2014/main" xmlns="" id="{3A15ED3B-D38C-4255-B016-9BFE9335B63D}"/>
+                <a16:creationId xmlns="" xmlns:a16="http://schemas.microsoft.com/office/drawing/2014/main" id="{3A15ED3B-D38C-4255-B016-9BFE9335B63D}"/>
               </a:ext>
             </a:extLst>
           </p:cNvPr>
@@ -1750,7 +1750,7 @@
           <p:cNvPr id="6" name="Content Placeholder 5">
             <a:extLst>
               <a:ext uri="{FF2B5EF4-FFF2-40B4-BE49-F238E27FC236}">
-                <a16:creationId xmlns:a16="http://schemas.microsoft.com/office/drawing/2014/main" xmlns="" id="{63DAE8AA-C177-4A26-BEC1-435C0D5B2971}"/>
+                <a16:creationId xmlns="" xmlns:a16="http://schemas.microsoft.com/office/drawing/2014/main" id="{63DAE8AA-C177-4A26-BEC1-435C0D5B2971}"/>
               </a:ext>
             </a:extLst>
           </p:cNvPr>
@@ -1813,7 +1813,7 @@
           <p:cNvPr id="7" name="Date Placeholder 6">
             <a:extLst>
               <a:ext uri="{FF2B5EF4-FFF2-40B4-BE49-F238E27FC236}">
-                <a16:creationId xmlns:a16="http://schemas.microsoft.com/office/drawing/2014/main" xmlns="" id="{C91A1DD9-FE74-4BC2-9DFA-85266C81AE87}"/>
+                <a16:creationId xmlns="" xmlns:a16="http://schemas.microsoft.com/office/drawing/2014/main" id="{C91A1DD9-FE74-4BC2-9DFA-85266C81AE87}"/>
               </a:ext>
             </a:extLst>
           </p:cNvPr>
@@ -1831,7 +1831,7 @@
           <a:p>
             <a:fld id="{2F956D3E-0B91-471C-9743-3F865EE6F573}" type="datetimeFigureOut">
               <a:rPr lang="en-AU" smtClean="0"/>
-              <a:t>14/08/2018</a:t>
+              <a:t>17/08/2018</a:t>
             </a:fld>
             <a:endParaRPr lang="en-AU"/>
           </a:p>
@@ -1842,7 +1842,7 @@
           <p:cNvPr id="8" name="Footer Placeholder 7">
             <a:extLst>
               <a:ext uri="{FF2B5EF4-FFF2-40B4-BE49-F238E27FC236}">
-                <a16:creationId xmlns:a16="http://schemas.microsoft.com/office/drawing/2014/main" xmlns="" id="{03468399-9983-447A-A9C7-60841A2101A5}"/>
+                <a16:creationId xmlns="" xmlns:a16="http://schemas.microsoft.com/office/drawing/2014/main" id="{03468399-9983-447A-A9C7-60841A2101A5}"/>
               </a:ext>
             </a:extLst>
           </p:cNvPr>
@@ -1867,7 +1867,7 @@
           <p:cNvPr id="9" name="Slide Number Placeholder 8">
             <a:extLst>
               <a:ext uri="{FF2B5EF4-FFF2-40B4-BE49-F238E27FC236}">
-                <a16:creationId xmlns:a16="http://schemas.microsoft.com/office/drawing/2014/main" xmlns="" id="{FF353AE5-8C6E-44F3-BD0C-9BE8FC31A3C4}"/>
+                <a16:creationId xmlns="" xmlns:a16="http://schemas.microsoft.com/office/drawing/2014/main" id="{FF353AE5-8C6E-44F3-BD0C-9BE8FC31A3C4}"/>
               </a:ext>
             </a:extLst>
           </p:cNvPr>
@@ -1926,7 +1926,7 @@
           <p:cNvPr id="2" name="Title 1">
             <a:extLst>
               <a:ext uri="{FF2B5EF4-FFF2-40B4-BE49-F238E27FC236}">
-                <a16:creationId xmlns:a16="http://schemas.microsoft.com/office/drawing/2014/main" xmlns="" id="{11AB4E18-777A-4059-8FE3-0C744DDCEF11}"/>
+                <a16:creationId xmlns="" xmlns:a16="http://schemas.microsoft.com/office/drawing/2014/main" id="{11AB4E18-777A-4059-8FE3-0C744DDCEF11}"/>
               </a:ext>
             </a:extLst>
           </p:cNvPr>
@@ -1955,7 +1955,7 @@
           <p:cNvPr id="3" name="Date Placeholder 2">
             <a:extLst>
               <a:ext uri="{FF2B5EF4-FFF2-40B4-BE49-F238E27FC236}">
-                <a16:creationId xmlns:a16="http://schemas.microsoft.com/office/drawing/2014/main" xmlns="" id="{EBBA3A6C-B2BF-4415-9EFA-485140AC1C20}"/>
+                <a16:creationId xmlns="" xmlns:a16="http://schemas.microsoft.com/office/drawing/2014/main" id="{EBBA3A6C-B2BF-4415-9EFA-485140AC1C20}"/>
               </a:ext>
             </a:extLst>
           </p:cNvPr>
@@ -1973,7 +1973,7 @@
           <a:p>
             <a:fld id="{2F956D3E-0B91-471C-9743-3F865EE6F573}" type="datetimeFigureOut">
               <a:rPr lang="en-AU" smtClean="0"/>
-              <a:t>14/08/2018</a:t>
+              <a:t>17/08/2018</a:t>
             </a:fld>
             <a:endParaRPr lang="en-AU"/>
           </a:p>
@@ -1984,7 +1984,7 @@
           <p:cNvPr id="4" name="Footer Placeholder 3">
             <a:extLst>
               <a:ext uri="{FF2B5EF4-FFF2-40B4-BE49-F238E27FC236}">
-                <a16:creationId xmlns:a16="http://schemas.microsoft.com/office/drawing/2014/main" xmlns="" id="{979E66C2-27F5-4ADA-B05B-28A7E30C72C4}"/>
+                <a16:creationId xmlns="" xmlns:a16="http://schemas.microsoft.com/office/drawing/2014/main" id="{979E66C2-27F5-4ADA-B05B-28A7E30C72C4}"/>
               </a:ext>
             </a:extLst>
           </p:cNvPr>
@@ -2009,7 +2009,7 @@
           <p:cNvPr id="5" name="Slide Number Placeholder 4">
             <a:extLst>
               <a:ext uri="{FF2B5EF4-FFF2-40B4-BE49-F238E27FC236}">
-                <a16:creationId xmlns:a16="http://schemas.microsoft.com/office/drawing/2014/main" xmlns="" id="{339F570E-2EBF-491A-B1A3-7B0020A39D87}"/>
+                <a16:creationId xmlns="" xmlns:a16="http://schemas.microsoft.com/office/drawing/2014/main" id="{339F570E-2EBF-491A-B1A3-7B0020A39D87}"/>
               </a:ext>
             </a:extLst>
           </p:cNvPr>
@@ -2068,7 +2068,7 @@
           <p:cNvPr id="2" name="Date Placeholder 1">
             <a:extLst>
               <a:ext uri="{FF2B5EF4-FFF2-40B4-BE49-F238E27FC236}">
-                <a16:creationId xmlns:a16="http://schemas.microsoft.com/office/drawing/2014/main" xmlns="" id="{31CC9DF5-DDBA-4A27-A2BE-EE4875C95E73}"/>
+                <a16:creationId xmlns="" xmlns:a16="http://schemas.microsoft.com/office/drawing/2014/main" id="{31CC9DF5-DDBA-4A27-A2BE-EE4875C95E73}"/>
               </a:ext>
             </a:extLst>
           </p:cNvPr>
@@ -2086,7 +2086,7 @@
           <a:p>
             <a:fld id="{2F956D3E-0B91-471C-9743-3F865EE6F573}" type="datetimeFigureOut">
               <a:rPr lang="en-AU" smtClean="0"/>
-              <a:t>14/08/2018</a:t>
+              <a:t>17/08/2018</a:t>
             </a:fld>
             <a:endParaRPr lang="en-AU"/>
           </a:p>
@@ -2097,7 +2097,7 @@
           <p:cNvPr id="3" name="Footer Placeholder 2">
             <a:extLst>
               <a:ext uri="{FF2B5EF4-FFF2-40B4-BE49-F238E27FC236}">
-                <a16:creationId xmlns:a16="http://schemas.microsoft.com/office/drawing/2014/main" xmlns="" id="{5E855F50-D457-4213-B498-4635BD853470}"/>
+                <a16:creationId xmlns="" xmlns:a16="http://schemas.microsoft.com/office/drawing/2014/main" id="{5E855F50-D457-4213-B498-4635BD853470}"/>
               </a:ext>
             </a:extLst>
           </p:cNvPr>
@@ -2122,7 +2122,7 @@
           <p:cNvPr id="4" name="Slide Number Placeholder 3">
             <a:extLst>
               <a:ext uri="{FF2B5EF4-FFF2-40B4-BE49-F238E27FC236}">
-                <a16:creationId xmlns:a16="http://schemas.microsoft.com/office/drawing/2014/main" xmlns="" id="{1424F85B-ACD9-4362-A6F2-B7C48F575113}"/>
+                <a16:creationId xmlns="" xmlns:a16="http://schemas.microsoft.com/office/drawing/2014/main" id="{1424F85B-ACD9-4362-A6F2-B7C48F575113}"/>
               </a:ext>
             </a:extLst>
           </p:cNvPr>
@@ -2181,7 +2181,7 @@
           <p:cNvPr id="2" name="Title 1">
             <a:extLst>
               <a:ext uri="{FF2B5EF4-FFF2-40B4-BE49-F238E27FC236}">
-                <a16:creationId xmlns:a16="http://schemas.microsoft.com/office/drawing/2014/main" xmlns="" id="{BD554F58-5E8E-48ED-8ED9-A0BD06E6F218}"/>
+                <a16:creationId xmlns="" xmlns:a16="http://schemas.microsoft.com/office/drawing/2014/main" id="{BD554F58-5E8E-48ED-8ED9-A0BD06E6F218}"/>
               </a:ext>
             </a:extLst>
           </p:cNvPr>
@@ -2219,7 +2219,7 @@
           <p:cNvPr id="3" name="Content Placeholder 2">
             <a:extLst>
               <a:ext uri="{FF2B5EF4-FFF2-40B4-BE49-F238E27FC236}">
-                <a16:creationId xmlns:a16="http://schemas.microsoft.com/office/drawing/2014/main" xmlns="" id="{88E32398-FD1A-4262-BB8C-6CFB63C85CED}"/>
+                <a16:creationId xmlns="" xmlns:a16="http://schemas.microsoft.com/office/drawing/2014/main" id="{88E32398-FD1A-4262-BB8C-6CFB63C85CED}"/>
               </a:ext>
             </a:extLst>
           </p:cNvPr>
@@ -2310,7 +2310,7 @@
           <p:cNvPr id="4" name="Text Placeholder 3">
             <a:extLst>
               <a:ext uri="{FF2B5EF4-FFF2-40B4-BE49-F238E27FC236}">
-                <a16:creationId xmlns:a16="http://schemas.microsoft.com/office/drawing/2014/main" xmlns="" id="{373EAC1B-2FB9-4226-BCA0-E5D3B01D6FA0}"/>
+                <a16:creationId xmlns="" xmlns:a16="http://schemas.microsoft.com/office/drawing/2014/main" id="{373EAC1B-2FB9-4226-BCA0-E5D3B01D6FA0}"/>
               </a:ext>
             </a:extLst>
           </p:cNvPr>
@@ -2381,7 +2381,7 @@
           <p:cNvPr id="5" name="Date Placeholder 4">
             <a:extLst>
               <a:ext uri="{FF2B5EF4-FFF2-40B4-BE49-F238E27FC236}">
-                <a16:creationId xmlns:a16="http://schemas.microsoft.com/office/drawing/2014/main" xmlns="" id="{D639F409-5438-45DD-BECC-62B7B0AAF361}"/>
+                <a16:creationId xmlns="" xmlns:a16="http://schemas.microsoft.com/office/drawing/2014/main" id="{D639F409-5438-45DD-BECC-62B7B0AAF361}"/>
               </a:ext>
             </a:extLst>
           </p:cNvPr>
@@ -2399,7 +2399,7 @@
           <a:p>
             <a:fld id="{2F956D3E-0B91-471C-9743-3F865EE6F573}" type="datetimeFigureOut">
               <a:rPr lang="en-AU" smtClean="0"/>
-              <a:t>14/08/2018</a:t>
+              <a:t>17/08/2018</a:t>
             </a:fld>
             <a:endParaRPr lang="en-AU"/>
           </a:p>
@@ -2410,7 +2410,7 @@
           <p:cNvPr id="6" name="Footer Placeholder 5">
             <a:extLst>
               <a:ext uri="{FF2B5EF4-FFF2-40B4-BE49-F238E27FC236}">
-                <a16:creationId xmlns:a16="http://schemas.microsoft.com/office/drawing/2014/main" xmlns="" id="{2311AAC2-3F58-465D-8275-AAB451586BBE}"/>
+                <a16:creationId xmlns="" xmlns:a16="http://schemas.microsoft.com/office/drawing/2014/main" id="{2311AAC2-3F58-465D-8275-AAB451586BBE}"/>
               </a:ext>
             </a:extLst>
           </p:cNvPr>
@@ -2435,7 +2435,7 @@
           <p:cNvPr id="7" name="Slide Number Placeholder 6">
             <a:extLst>
               <a:ext uri="{FF2B5EF4-FFF2-40B4-BE49-F238E27FC236}">
-                <a16:creationId xmlns:a16="http://schemas.microsoft.com/office/drawing/2014/main" xmlns="" id="{4076C87A-5864-468D-9EE2-7F4B0C093074}"/>
+                <a16:creationId xmlns="" xmlns:a16="http://schemas.microsoft.com/office/drawing/2014/main" id="{4076C87A-5864-468D-9EE2-7F4B0C093074}"/>
               </a:ext>
             </a:extLst>
           </p:cNvPr>
@@ -2494,7 +2494,7 @@
           <p:cNvPr id="2" name="Title 1">
             <a:extLst>
               <a:ext uri="{FF2B5EF4-FFF2-40B4-BE49-F238E27FC236}">
-                <a16:creationId xmlns:a16="http://schemas.microsoft.com/office/drawing/2014/main" xmlns="" id="{B5D51929-B485-4C5E-86DE-E6E2074D6CE5}"/>
+                <a16:creationId xmlns="" xmlns:a16="http://schemas.microsoft.com/office/drawing/2014/main" id="{B5D51929-B485-4C5E-86DE-E6E2074D6CE5}"/>
               </a:ext>
             </a:extLst>
           </p:cNvPr>
@@ -2532,7 +2532,7 @@
           <p:cNvPr id="3" name="Picture Placeholder 2">
             <a:extLst>
               <a:ext uri="{FF2B5EF4-FFF2-40B4-BE49-F238E27FC236}">
-                <a16:creationId xmlns:a16="http://schemas.microsoft.com/office/drawing/2014/main" xmlns="" id="{745CAD50-DBFD-4B1E-8C5A-FEC1D2159DDB}"/>
+                <a16:creationId xmlns="" xmlns:a16="http://schemas.microsoft.com/office/drawing/2014/main" id="{745CAD50-DBFD-4B1E-8C5A-FEC1D2159DDB}"/>
               </a:ext>
             </a:extLst>
           </p:cNvPr>
@@ -2599,7 +2599,7 @@
           <p:cNvPr id="4" name="Text Placeholder 3">
             <a:extLst>
               <a:ext uri="{FF2B5EF4-FFF2-40B4-BE49-F238E27FC236}">
-                <a16:creationId xmlns:a16="http://schemas.microsoft.com/office/drawing/2014/main" xmlns="" id="{56CA1066-373C-4A49-B657-9EE7DCD0952D}"/>
+                <a16:creationId xmlns="" xmlns:a16="http://schemas.microsoft.com/office/drawing/2014/main" id="{56CA1066-373C-4A49-B657-9EE7DCD0952D}"/>
               </a:ext>
             </a:extLst>
           </p:cNvPr>
@@ -2670,7 +2670,7 @@
           <p:cNvPr id="5" name="Date Placeholder 4">
             <a:extLst>
               <a:ext uri="{FF2B5EF4-FFF2-40B4-BE49-F238E27FC236}">
-                <a16:creationId xmlns:a16="http://schemas.microsoft.com/office/drawing/2014/main" xmlns="" id="{D4F04E1C-BF5B-43FA-9CA9-C4A3872ABD47}"/>
+                <a16:creationId xmlns="" xmlns:a16="http://schemas.microsoft.com/office/drawing/2014/main" id="{D4F04E1C-BF5B-43FA-9CA9-C4A3872ABD47}"/>
               </a:ext>
             </a:extLst>
           </p:cNvPr>
@@ -2688,7 +2688,7 @@
           <a:p>
             <a:fld id="{2F956D3E-0B91-471C-9743-3F865EE6F573}" type="datetimeFigureOut">
               <a:rPr lang="en-AU" smtClean="0"/>
-              <a:t>14/08/2018</a:t>
+              <a:t>17/08/2018</a:t>
             </a:fld>
             <a:endParaRPr lang="en-AU"/>
           </a:p>
@@ -2699,7 +2699,7 @@
           <p:cNvPr id="6" name="Footer Placeholder 5">
             <a:extLst>
               <a:ext uri="{FF2B5EF4-FFF2-40B4-BE49-F238E27FC236}">
-                <a16:creationId xmlns:a16="http://schemas.microsoft.com/office/drawing/2014/main" xmlns="" id="{B3F3C200-5776-44B6-80D6-B576FC6FE4A1}"/>
+                <a16:creationId xmlns="" xmlns:a16="http://schemas.microsoft.com/office/drawing/2014/main" id="{B3F3C200-5776-44B6-80D6-B576FC6FE4A1}"/>
               </a:ext>
             </a:extLst>
           </p:cNvPr>
@@ -2724,7 +2724,7 @@
           <p:cNvPr id="7" name="Slide Number Placeholder 6">
             <a:extLst>
               <a:ext uri="{FF2B5EF4-FFF2-40B4-BE49-F238E27FC236}">
-                <a16:creationId xmlns:a16="http://schemas.microsoft.com/office/drawing/2014/main" xmlns="" id="{C83FA351-8092-4D78-A9C7-A20A77930D3D}"/>
+                <a16:creationId xmlns="" xmlns:a16="http://schemas.microsoft.com/office/drawing/2014/main" id="{C83FA351-8092-4D78-A9C7-A20A77930D3D}"/>
               </a:ext>
             </a:extLst>
           </p:cNvPr>
@@ -2788,7 +2788,7 @@
           <p:cNvPr id="2" name="Title Placeholder 1">
             <a:extLst>
               <a:ext uri="{FF2B5EF4-FFF2-40B4-BE49-F238E27FC236}">
-                <a16:creationId xmlns:a16="http://schemas.microsoft.com/office/drawing/2014/main" xmlns="" id="{417237BA-4865-4280-8BD0-E6D106DFB608}"/>
+                <a16:creationId xmlns="" xmlns:a16="http://schemas.microsoft.com/office/drawing/2014/main" id="{417237BA-4865-4280-8BD0-E6D106DFB608}"/>
               </a:ext>
             </a:extLst>
           </p:cNvPr>
@@ -2827,7 +2827,7 @@
           <p:cNvPr id="3" name="Text Placeholder 2">
             <a:extLst>
               <a:ext uri="{FF2B5EF4-FFF2-40B4-BE49-F238E27FC236}">
-                <a16:creationId xmlns:a16="http://schemas.microsoft.com/office/drawing/2014/main" xmlns="" id="{CFD6DF4C-CD43-4DDE-9E26-4DAB0E753402}"/>
+                <a16:creationId xmlns="" xmlns:a16="http://schemas.microsoft.com/office/drawing/2014/main" id="{CFD6DF4C-CD43-4DDE-9E26-4DAB0E753402}"/>
               </a:ext>
             </a:extLst>
           </p:cNvPr>
@@ -2895,7 +2895,7 @@
           <p:cNvPr id="4" name="Date Placeholder 3">
             <a:extLst>
               <a:ext uri="{FF2B5EF4-FFF2-40B4-BE49-F238E27FC236}">
-                <a16:creationId xmlns:a16="http://schemas.microsoft.com/office/drawing/2014/main" xmlns="" id="{4E8F96A9-316E-4272-B736-3B7A5BEFB368}"/>
+                <a16:creationId xmlns="" xmlns:a16="http://schemas.microsoft.com/office/drawing/2014/main" id="{4E8F96A9-316E-4272-B736-3B7A5BEFB368}"/>
               </a:ext>
             </a:extLst>
           </p:cNvPr>
@@ -2931,7 +2931,7 @@
           <a:p>
             <a:fld id="{2F956D3E-0B91-471C-9743-3F865EE6F573}" type="datetimeFigureOut">
               <a:rPr lang="en-AU" smtClean="0"/>
-              <a:t>14/08/2018</a:t>
+              <a:t>17/08/2018</a:t>
             </a:fld>
             <a:endParaRPr lang="en-AU"/>
           </a:p>
@@ -2942,7 +2942,7 @@
           <p:cNvPr id="5" name="Footer Placeholder 4">
             <a:extLst>
               <a:ext uri="{FF2B5EF4-FFF2-40B4-BE49-F238E27FC236}">
-                <a16:creationId xmlns:a16="http://schemas.microsoft.com/office/drawing/2014/main" xmlns="" id="{5B9B060F-4139-42DD-835A-DD48B4C35B93}"/>
+                <a16:creationId xmlns="" xmlns:a16="http://schemas.microsoft.com/office/drawing/2014/main" id="{5B9B060F-4139-42DD-835A-DD48B4C35B93}"/>
               </a:ext>
             </a:extLst>
           </p:cNvPr>
@@ -2985,7 +2985,7 @@
           <p:cNvPr id="6" name="Slide Number Placeholder 5">
             <a:extLst>
               <a:ext uri="{FF2B5EF4-FFF2-40B4-BE49-F238E27FC236}">
-                <a16:creationId xmlns:a16="http://schemas.microsoft.com/office/drawing/2014/main" xmlns="" id="{419ED261-D27A-4F8B-A664-31C7824BE2CC}"/>
+                <a16:creationId xmlns="" xmlns:a16="http://schemas.microsoft.com/office/drawing/2014/main" id="{419ED261-D27A-4F8B-A664-31C7824BE2CC}"/>
               </a:ext>
             </a:extLst>
           </p:cNvPr>
@@ -3353,7 +3353,7 @@
           <p:cNvPr id="4" name="Rectangle: Rounded Corners 3">
             <a:extLst>
               <a:ext uri="{FF2B5EF4-FFF2-40B4-BE49-F238E27FC236}">
-                <a16:creationId xmlns:a16="http://schemas.microsoft.com/office/drawing/2014/main" xmlns="" id="{54D0FB8B-B098-491A-AD31-AD421AB902EF}"/>
+                <a16:creationId xmlns="" xmlns:a16="http://schemas.microsoft.com/office/drawing/2014/main" id="{54D0FB8B-B098-491A-AD31-AD421AB902EF}"/>
               </a:ext>
             </a:extLst>
           </p:cNvPr>
@@ -3412,7 +3412,7 @@
           <p:cNvPr id="5" name="Rectangle: Rounded Corners 4">
             <a:extLst>
               <a:ext uri="{FF2B5EF4-FFF2-40B4-BE49-F238E27FC236}">
-                <a16:creationId xmlns:a16="http://schemas.microsoft.com/office/drawing/2014/main" xmlns="" id="{5675C345-97DA-44C4-8895-174F9B25EB74}"/>
+                <a16:creationId xmlns="" xmlns:a16="http://schemas.microsoft.com/office/drawing/2014/main" id="{5675C345-97DA-44C4-8895-174F9B25EB74}"/>
               </a:ext>
             </a:extLst>
           </p:cNvPr>
@@ -3471,7 +3471,7 @@
           <p:cNvPr id="10" name="Straight Arrow Connector 9">
             <a:extLst>
               <a:ext uri="{FF2B5EF4-FFF2-40B4-BE49-F238E27FC236}">
-                <a16:creationId xmlns:a16="http://schemas.microsoft.com/office/drawing/2014/main" xmlns="" id="{2738494B-22BB-4E16-AA8E-063441F62080}"/>
+                <a16:creationId xmlns="" xmlns:a16="http://schemas.microsoft.com/office/drawing/2014/main" id="{2738494B-22BB-4E16-AA8E-063441F62080}"/>
               </a:ext>
             </a:extLst>
           </p:cNvPr>
@@ -3513,7 +3513,7 @@
           <p:cNvPr id="11" name="TextBox 10">
             <a:extLst>
               <a:ext uri="{FF2B5EF4-FFF2-40B4-BE49-F238E27FC236}">
-                <a16:creationId xmlns:a16="http://schemas.microsoft.com/office/drawing/2014/main" xmlns="" id="{EA0207FA-CB6D-4700-A943-37A35E7A7F6C}"/>
+                <a16:creationId xmlns="" xmlns:a16="http://schemas.microsoft.com/office/drawing/2014/main" id="{EA0207FA-CB6D-4700-A943-37A35E7A7F6C}"/>
               </a:ext>
             </a:extLst>
           </p:cNvPr>
@@ -3549,7 +3549,7 @@
           <p:cNvPr id="12" name="Rectangle: Rounded Corners 11">
             <a:extLst>
               <a:ext uri="{FF2B5EF4-FFF2-40B4-BE49-F238E27FC236}">
-                <a16:creationId xmlns:a16="http://schemas.microsoft.com/office/drawing/2014/main" xmlns="" id="{0172D6A7-F319-4C98-BCFD-58AB9FFA137C}"/>
+                <a16:creationId xmlns="" xmlns:a16="http://schemas.microsoft.com/office/drawing/2014/main" id="{0172D6A7-F319-4C98-BCFD-58AB9FFA137C}"/>
               </a:ext>
             </a:extLst>
           </p:cNvPr>
@@ -3608,7 +3608,7 @@
           <p:cNvPr id="13" name="Rectangle: Rounded Corners 12">
             <a:extLst>
               <a:ext uri="{FF2B5EF4-FFF2-40B4-BE49-F238E27FC236}">
-                <a16:creationId xmlns:a16="http://schemas.microsoft.com/office/drawing/2014/main" xmlns="" id="{351768B8-B0F4-49E5-A1C4-CB95780972A0}"/>
+                <a16:creationId xmlns="" xmlns:a16="http://schemas.microsoft.com/office/drawing/2014/main" id="{351768B8-B0F4-49E5-A1C4-CB95780972A0}"/>
               </a:ext>
             </a:extLst>
           </p:cNvPr>
@@ -3667,7 +3667,7 @@
           <p:cNvPr id="14" name="Rectangle: Rounded Corners 13">
             <a:extLst>
               <a:ext uri="{FF2B5EF4-FFF2-40B4-BE49-F238E27FC236}">
-                <a16:creationId xmlns:a16="http://schemas.microsoft.com/office/drawing/2014/main" xmlns="" id="{C3BAB69B-ADA0-48E1-A7A3-2F500C2A407E}"/>
+                <a16:creationId xmlns="" xmlns:a16="http://schemas.microsoft.com/office/drawing/2014/main" id="{C3BAB69B-ADA0-48E1-A7A3-2F500C2A407E}"/>
               </a:ext>
             </a:extLst>
           </p:cNvPr>
@@ -3726,7 +3726,7 @@
           <p:cNvPr id="15" name="Rectangle: Rounded Corners 14">
             <a:extLst>
               <a:ext uri="{FF2B5EF4-FFF2-40B4-BE49-F238E27FC236}">
-                <a16:creationId xmlns:a16="http://schemas.microsoft.com/office/drawing/2014/main" xmlns="" id="{415FC0F5-4B41-4A53-9189-AE991ED2BD31}"/>
+                <a16:creationId xmlns="" xmlns:a16="http://schemas.microsoft.com/office/drawing/2014/main" id="{415FC0F5-4B41-4A53-9189-AE991ED2BD31}"/>
               </a:ext>
             </a:extLst>
           </p:cNvPr>
@@ -3785,7 +3785,7 @@
           <p:cNvPr id="16" name="Rectangle: Rounded Corners 15">
             <a:extLst>
               <a:ext uri="{FF2B5EF4-FFF2-40B4-BE49-F238E27FC236}">
-                <a16:creationId xmlns:a16="http://schemas.microsoft.com/office/drawing/2014/main" xmlns="" id="{80DE7B24-B7E9-47B6-8E88-EC972ED19123}"/>
+                <a16:creationId xmlns="" xmlns:a16="http://schemas.microsoft.com/office/drawing/2014/main" id="{80DE7B24-B7E9-47B6-8E88-EC972ED19123}"/>
               </a:ext>
             </a:extLst>
           </p:cNvPr>
@@ -3844,7 +3844,7 @@
           <p:cNvPr id="17" name="Connector: Elbow 16">
             <a:extLst>
               <a:ext uri="{FF2B5EF4-FFF2-40B4-BE49-F238E27FC236}">
-                <a16:creationId xmlns:a16="http://schemas.microsoft.com/office/drawing/2014/main" xmlns="" id="{64514852-CA0B-4B22-9112-9C0EFB8F9B9B}"/>
+                <a16:creationId xmlns="" xmlns:a16="http://schemas.microsoft.com/office/drawing/2014/main" id="{64514852-CA0B-4B22-9112-9C0EFB8F9B9B}"/>
               </a:ext>
             </a:extLst>
           </p:cNvPr>
@@ -3892,7 +3892,7 @@
           <p:cNvPr id="20" name="Connector: Elbow 19">
             <a:extLst>
               <a:ext uri="{FF2B5EF4-FFF2-40B4-BE49-F238E27FC236}">
-                <a16:creationId xmlns:a16="http://schemas.microsoft.com/office/drawing/2014/main" xmlns="" id="{E118E15D-38EF-455D-87FB-59C64F2455B6}"/>
+                <a16:creationId xmlns="" xmlns:a16="http://schemas.microsoft.com/office/drawing/2014/main" id="{E118E15D-38EF-455D-87FB-59C64F2455B6}"/>
               </a:ext>
             </a:extLst>
           </p:cNvPr>
@@ -3940,7 +3940,7 @@
           <p:cNvPr id="23" name="Connector: Elbow 22">
             <a:extLst>
               <a:ext uri="{FF2B5EF4-FFF2-40B4-BE49-F238E27FC236}">
-                <a16:creationId xmlns:a16="http://schemas.microsoft.com/office/drawing/2014/main" xmlns="" id="{B493C084-F212-492E-957C-8BEA879E995D}"/>
+                <a16:creationId xmlns="" xmlns:a16="http://schemas.microsoft.com/office/drawing/2014/main" id="{B493C084-F212-492E-957C-8BEA879E995D}"/>
               </a:ext>
             </a:extLst>
           </p:cNvPr>
@@ -3988,7 +3988,7 @@
           <p:cNvPr id="30" name="Rectangle: Rounded Corners 29">
             <a:extLst>
               <a:ext uri="{FF2B5EF4-FFF2-40B4-BE49-F238E27FC236}">
-                <a16:creationId xmlns:a16="http://schemas.microsoft.com/office/drawing/2014/main" xmlns="" id="{19F24737-7B63-4E7B-9AE5-A87497FA6FAF}"/>
+                <a16:creationId xmlns="" xmlns:a16="http://schemas.microsoft.com/office/drawing/2014/main" id="{19F24737-7B63-4E7B-9AE5-A87497FA6FAF}"/>
               </a:ext>
             </a:extLst>
           </p:cNvPr>
@@ -4047,7 +4047,7 @@
           <p:cNvPr id="31" name="Rectangle: Rounded Corners 30">
             <a:extLst>
               <a:ext uri="{FF2B5EF4-FFF2-40B4-BE49-F238E27FC236}">
-                <a16:creationId xmlns:a16="http://schemas.microsoft.com/office/drawing/2014/main" xmlns="" id="{7BC2DA58-1C14-4D8B-9AF3-E14F6FAD8FC0}"/>
+                <a16:creationId xmlns="" xmlns:a16="http://schemas.microsoft.com/office/drawing/2014/main" id="{7BC2DA58-1C14-4D8B-9AF3-E14F6FAD8FC0}"/>
               </a:ext>
             </a:extLst>
           </p:cNvPr>
@@ -4106,7 +4106,7 @@
           <p:cNvPr id="32" name="Rectangle: Rounded Corners 31">
             <a:extLst>
               <a:ext uri="{FF2B5EF4-FFF2-40B4-BE49-F238E27FC236}">
-                <a16:creationId xmlns:a16="http://schemas.microsoft.com/office/drawing/2014/main" xmlns="" id="{A2415D34-9AEB-4D3C-8B85-9A65A96218FE}"/>
+                <a16:creationId xmlns="" xmlns:a16="http://schemas.microsoft.com/office/drawing/2014/main" id="{A2415D34-9AEB-4D3C-8B85-9A65A96218FE}"/>
               </a:ext>
             </a:extLst>
           </p:cNvPr>
@@ -4165,7 +4165,7 @@
           <p:cNvPr id="33" name="Connector: Elbow 32">
             <a:extLst>
               <a:ext uri="{FF2B5EF4-FFF2-40B4-BE49-F238E27FC236}">
-                <a16:creationId xmlns:a16="http://schemas.microsoft.com/office/drawing/2014/main" xmlns="" id="{821A3089-B696-4653-B73B-39B49F027466}"/>
+                <a16:creationId xmlns="" xmlns:a16="http://schemas.microsoft.com/office/drawing/2014/main" id="{821A3089-B696-4653-B73B-39B49F027466}"/>
               </a:ext>
             </a:extLst>
           </p:cNvPr>
@@ -4213,7 +4213,7 @@
           <p:cNvPr id="36" name="Connector: Elbow 35">
             <a:extLst>
               <a:ext uri="{FF2B5EF4-FFF2-40B4-BE49-F238E27FC236}">
-                <a16:creationId xmlns:a16="http://schemas.microsoft.com/office/drawing/2014/main" xmlns="" id="{0E570848-FE64-4E6A-A947-1CBC1911E97A}"/>
+                <a16:creationId xmlns="" xmlns:a16="http://schemas.microsoft.com/office/drawing/2014/main" id="{0E570848-FE64-4E6A-A947-1CBC1911E97A}"/>
               </a:ext>
             </a:extLst>
           </p:cNvPr>
@@ -4261,7 +4261,7 @@
           <p:cNvPr id="8" name="Straight Arrow Connector 7">
             <a:extLst>
               <a:ext uri="{FF2B5EF4-FFF2-40B4-BE49-F238E27FC236}">
-                <a16:creationId xmlns:a16="http://schemas.microsoft.com/office/drawing/2014/main" xmlns="" id="{02FF8AEF-9744-4B1C-ACB9-E3241ACF27D1}"/>
+                <a16:creationId xmlns="" xmlns:a16="http://schemas.microsoft.com/office/drawing/2014/main" id="{02FF8AEF-9744-4B1C-ACB9-E3241ACF27D1}"/>
               </a:ext>
             </a:extLst>
           </p:cNvPr>
@@ -4306,7 +4306,7 @@
           <p:cNvPr id="25" name="Rectangle: Rounded Corners 24">
             <a:extLst>
               <a:ext uri="{FF2B5EF4-FFF2-40B4-BE49-F238E27FC236}">
-                <a16:creationId xmlns:a16="http://schemas.microsoft.com/office/drawing/2014/main" xmlns="" id="{509E733A-9C35-48BC-B1CE-379C573000FE}"/>
+                <a16:creationId xmlns="" xmlns:a16="http://schemas.microsoft.com/office/drawing/2014/main" id="{509E733A-9C35-48BC-B1CE-379C573000FE}"/>
               </a:ext>
             </a:extLst>
           </p:cNvPr>
@@ -4365,7 +4365,7 @@
           <p:cNvPr id="26" name="Straight Arrow Connector 25">
             <a:extLst>
               <a:ext uri="{FF2B5EF4-FFF2-40B4-BE49-F238E27FC236}">
-                <a16:creationId xmlns:a16="http://schemas.microsoft.com/office/drawing/2014/main" xmlns="" id="{45BB73C4-0487-4332-804D-0640F1C24DD7}"/>
+                <a16:creationId xmlns="" xmlns:a16="http://schemas.microsoft.com/office/drawing/2014/main" id="{45BB73C4-0487-4332-804D-0640F1C24DD7}"/>
               </a:ext>
             </a:extLst>
           </p:cNvPr>
@@ -4412,7 +4412,7 @@
           <p:cNvPr id="29" name="TextBox 28">
             <a:extLst>
               <a:ext uri="{FF2B5EF4-FFF2-40B4-BE49-F238E27FC236}">
-                <a16:creationId xmlns:a16="http://schemas.microsoft.com/office/drawing/2014/main" xmlns="" id="{ECF64CE6-E66F-4FF9-8239-2D9801A3273B}"/>
+                <a16:creationId xmlns="" xmlns:a16="http://schemas.microsoft.com/office/drawing/2014/main" id="{ECF64CE6-E66F-4FF9-8239-2D9801A3273B}"/>
               </a:ext>
             </a:extLst>
           </p:cNvPr>
@@ -4448,7 +4448,7 @@
           <p:cNvPr id="34" name="Connector: Elbow 33">
             <a:extLst>
               <a:ext uri="{FF2B5EF4-FFF2-40B4-BE49-F238E27FC236}">
-                <a16:creationId xmlns:a16="http://schemas.microsoft.com/office/drawing/2014/main" xmlns="" id="{762DA317-C2C5-4F35-8BEE-2475336742C9}"/>
+                <a16:creationId xmlns="" xmlns:a16="http://schemas.microsoft.com/office/drawing/2014/main" id="{762DA317-C2C5-4F35-8BEE-2475336742C9}"/>
               </a:ext>
             </a:extLst>
           </p:cNvPr>
@@ -4497,7 +4497,7 @@
           <p:cNvPr id="35" name="Connector: Elbow 34">
             <a:extLst>
               <a:ext uri="{FF2B5EF4-FFF2-40B4-BE49-F238E27FC236}">
-                <a16:creationId xmlns:a16="http://schemas.microsoft.com/office/drawing/2014/main" xmlns="" id="{326F3BCB-F2A3-492C-A8F3-20922107B29D}"/>
+                <a16:creationId xmlns="" xmlns:a16="http://schemas.microsoft.com/office/drawing/2014/main" id="{326F3BCB-F2A3-492C-A8F3-20922107B29D}"/>
               </a:ext>
             </a:extLst>
           </p:cNvPr>
@@ -4546,7 +4546,7 @@
           <p:cNvPr id="37" name="Connector: Elbow 36">
             <a:extLst>
               <a:ext uri="{FF2B5EF4-FFF2-40B4-BE49-F238E27FC236}">
-                <a16:creationId xmlns:a16="http://schemas.microsoft.com/office/drawing/2014/main" xmlns="" id="{D78C9AF8-6E97-4A41-9699-F00133FB72EE}"/>
+                <a16:creationId xmlns="" xmlns:a16="http://schemas.microsoft.com/office/drawing/2014/main" id="{D78C9AF8-6E97-4A41-9699-F00133FB72EE}"/>
               </a:ext>
             </a:extLst>
           </p:cNvPr>
@@ -4595,7 +4595,7 @@
           <p:cNvPr id="83" name="TextBox 82">
             <a:extLst>
               <a:ext uri="{FF2B5EF4-FFF2-40B4-BE49-F238E27FC236}">
-                <a16:creationId xmlns:a16="http://schemas.microsoft.com/office/drawing/2014/main" xmlns="" id="{C34CC880-1902-497C-A44A-571D93EAD548}"/>
+                <a16:creationId xmlns="" xmlns:a16="http://schemas.microsoft.com/office/drawing/2014/main" id="{C34CC880-1902-497C-A44A-571D93EAD548}"/>
               </a:ext>
             </a:extLst>
           </p:cNvPr>
@@ -4630,7 +4630,7 @@
           <p:cNvPr id="84" name="TextBox 83">
             <a:extLst>
               <a:ext uri="{FF2B5EF4-FFF2-40B4-BE49-F238E27FC236}">
-                <a16:creationId xmlns:a16="http://schemas.microsoft.com/office/drawing/2014/main" xmlns="" id="{582DAA28-77DF-48AB-A0FA-7D0944EEA418}"/>
+                <a16:creationId xmlns="" xmlns:a16="http://schemas.microsoft.com/office/drawing/2014/main" id="{582DAA28-77DF-48AB-A0FA-7D0944EEA418}"/>
               </a:ext>
             </a:extLst>
           </p:cNvPr>
@@ -4665,7 +4665,7 @@
           <p:cNvPr id="85" name="TextBox 84">
             <a:extLst>
               <a:ext uri="{FF2B5EF4-FFF2-40B4-BE49-F238E27FC236}">
-                <a16:creationId xmlns:a16="http://schemas.microsoft.com/office/drawing/2014/main" xmlns="" id="{35632462-2816-4AB9-8863-E2858DF02B69}"/>
+                <a16:creationId xmlns="" xmlns:a16="http://schemas.microsoft.com/office/drawing/2014/main" id="{35632462-2816-4AB9-8863-E2858DF02B69}"/>
               </a:ext>
             </a:extLst>
           </p:cNvPr>
@@ -4700,7 +4700,7 @@
           <p:cNvPr id="98" name="Connector: Elbow 97">
             <a:extLst>
               <a:ext uri="{FF2B5EF4-FFF2-40B4-BE49-F238E27FC236}">
-                <a16:creationId xmlns:a16="http://schemas.microsoft.com/office/drawing/2014/main" xmlns="" id="{A1F2BECA-1D96-4FF9-8754-645C1D7726F8}"/>
+                <a16:creationId xmlns="" xmlns:a16="http://schemas.microsoft.com/office/drawing/2014/main" id="{A1F2BECA-1D96-4FF9-8754-645C1D7726F8}"/>
               </a:ext>
             </a:extLst>
           </p:cNvPr>
@@ -4749,7 +4749,7 @@
           <p:cNvPr id="101" name="Connector: Elbow 100">
             <a:extLst>
               <a:ext uri="{FF2B5EF4-FFF2-40B4-BE49-F238E27FC236}">
-                <a16:creationId xmlns:a16="http://schemas.microsoft.com/office/drawing/2014/main" xmlns="" id="{36519D8D-4EA4-45AD-AD01-BCA533BD100D}"/>
+                <a16:creationId xmlns="" xmlns:a16="http://schemas.microsoft.com/office/drawing/2014/main" id="{36519D8D-4EA4-45AD-AD01-BCA533BD100D}"/>
               </a:ext>
             </a:extLst>
           </p:cNvPr>
@@ -4798,7 +4798,7 @@
           <p:cNvPr id="104" name="TextBox 103">
             <a:extLst>
               <a:ext uri="{FF2B5EF4-FFF2-40B4-BE49-F238E27FC236}">
-                <a16:creationId xmlns:a16="http://schemas.microsoft.com/office/drawing/2014/main" xmlns="" id="{6D855CC4-9F24-4FB0-84C5-F540689823DA}"/>
+                <a16:creationId xmlns="" xmlns:a16="http://schemas.microsoft.com/office/drawing/2014/main" id="{6D855CC4-9F24-4FB0-84C5-F540689823DA}"/>
               </a:ext>
             </a:extLst>
           </p:cNvPr>
@@ -4833,7 +4833,7 @@
           <p:cNvPr id="105" name="TextBox 104">
             <a:extLst>
               <a:ext uri="{FF2B5EF4-FFF2-40B4-BE49-F238E27FC236}">
-                <a16:creationId xmlns:a16="http://schemas.microsoft.com/office/drawing/2014/main" xmlns="" id="{312F8B0D-878E-4CFD-AF2D-6C5C84BC7C3F}"/>
+                <a16:creationId xmlns="" xmlns:a16="http://schemas.microsoft.com/office/drawing/2014/main" id="{312F8B0D-878E-4CFD-AF2D-6C5C84BC7C3F}"/>
               </a:ext>
             </a:extLst>
           </p:cNvPr>
@@ -4868,7 +4868,7 @@
           <p:cNvPr id="106" name="Connector: Elbow 105">
             <a:extLst>
               <a:ext uri="{FF2B5EF4-FFF2-40B4-BE49-F238E27FC236}">
-                <a16:creationId xmlns:a16="http://schemas.microsoft.com/office/drawing/2014/main" xmlns="" id="{AFDAAF80-D279-45C4-BA1C-63276C92DDEA}"/>
+                <a16:creationId xmlns="" xmlns:a16="http://schemas.microsoft.com/office/drawing/2014/main" id="{AFDAAF80-D279-45C4-BA1C-63276C92DDEA}"/>
               </a:ext>
             </a:extLst>
           </p:cNvPr>
@@ -4917,7 +4917,7 @@
           <p:cNvPr id="109" name="TextBox 108">
             <a:extLst>
               <a:ext uri="{FF2B5EF4-FFF2-40B4-BE49-F238E27FC236}">
-                <a16:creationId xmlns:a16="http://schemas.microsoft.com/office/drawing/2014/main" xmlns="" id="{68F80759-A938-4EC4-AB28-CF35C69A0B12}"/>
+                <a16:creationId xmlns="" xmlns:a16="http://schemas.microsoft.com/office/drawing/2014/main" id="{68F80759-A938-4EC4-AB28-CF35C69A0B12}"/>
               </a:ext>
             </a:extLst>
           </p:cNvPr>
@@ -5086,7 +5086,6 @@
                         <a:rPr lang="en-AU" sz="1100" i="1" dirty="0" smtClean="0"/>
                         <a:t>text</a:t>
                       </a:r>
-                      <a:endParaRPr lang="en-AU" sz="1100" i="1" dirty="0" smtClean="0"/>
                     </a:p>
                   </a:txBody>
                   <a:tcPr/>

</xml_diff>

<commit_message>
Added Class Diagram (sort of) to docs
</commit_message>
<xml_diff>
--- a/_docs/DataModel.pptx
+++ b/_docs/DataModel.pptx
@@ -6,7 +6,8 @@
   </p:sldMasterIdLst>
   <p:sldIdLst>
     <p:sldId id="256" r:id="rId2"/>
-    <p:sldId id="257" r:id="rId3"/>
+    <p:sldId id="259" r:id="rId3"/>
+    <p:sldId id="257" r:id="rId4"/>
   </p:sldIdLst>
   <p:sldSz cx="12192000" cy="6858000"/>
   <p:notesSz cx="6858000" cy="9144000"/>
@@ -135,7 +136,7 @@
           <p:cNvPr id="2" name="Title 1">
             <a:extLst>
               <a:ext uri="{FF2B5EF4-FFF2-40B4-BE49-F238E27FC236}">
-                <a16:creationId xmlns="" xmlns:a16="http://schemas.microsoft.com/office/drawing/2014/main" id="{7812FAD9-B738-4E2B-A9F3-7D6DA8649C7B}"/>
+                <a16:creationId xmlns:a16="http://schemas.microsoft.com/office/drawing/2014/main" xmlns="" id="{7812FAD9-B738-4E2B-A9F3-7D6DA8649C7B}"/>
               </a:ext>
             </a:extLst>
           </p:cNvPr>
@@ -173,7 +174,7 @@
           <p:cNvPr id="3" name="Subtitle 2">
             <a:extLst>
               <a:ext uri="{FF2B5EF4-FFF2-40B4-BE49-F238E27FC236}">
-                <a16:creationId xmlns="" xmlns:a16="http://schemas.microsoft.com/office/drawing/2014/main" id="{CED3ABCF-AD94-42E3-95E2-D5E653DEF63F}"/>
+                <a16:creationId xmlns:a16="http://schemas.microsoft.com/office/drawing/2014/main" xmlns="" id="{CED3ABCF-AD94-42E3-95E2-D5E653DEF63F}"/>
               </a:ext>
             </a:extLst>
           </p:cNvPr>
@@ -244,7 +245,7 @@
           <p:cNvPr id="4" name="Date Placeholder 3">
             <a:extLst>
               <a:ext uri="{FF2B5EF4-FFF2-40B4-BE49-F238E27FC236}">
-                <a16:creationId xmlns="" xmlns:a16="http://schemas.microsoft.com/office/drawing/2014/main" id="{5AB92BAC-2DD4-42CE-9065-E2518728CD65}"/>
+                <a16:creationId xmlns:a16="http://schemas.microsoft.com/office/drawing/2014/main" xmlns="" id="{5AB92BAC-2DD4-42CE-9065-E2518728CD65}"/>
               </a:ext>
             </a:extLst>
           </p:cNvPr>
@@ -273,7 +274,7 @@
           <p:cNvPr id="5" name="Footer Placeholder 4">
             <a:extLst>
               <a:ext uri="{FF2B5EF4-FFF2-40B4-BE49-F238E27FC236}">
-                <a16:creationId xmlns="" xmlns:a16="http://schemas.microsoft.com/office/drawing/2014/main" id="{137C3D4C-B868-4F83-8919-AE7F2500E437}"/>
+                <a16:creationId xmlns:a16="http://schemas.microsoft.com/office/drawing/2014/main" xmlns="" id="{137C3D4C-B868-4F83-8919-AE7F2500E437}"/>
               </a:ext>
             </a:extLst>
           </p:cNvPr>
@@ -298,7 +299,7 @@
           <p:cNvPr id="6" name="Slide Number Placeholder 5">
             <a:extLst>
               <a:ext uri="{FF2B5EF4-FFF2-40B4-BE49-F238E27FC236}">
-                <a16:creationId xmlns="" xmlns:a16="http://schemas.microsoft.com/office/drawing/2014/main" id="{ABBB53F0-83D7-42D4-90A5-7D5EE7C0AAD3}"/>
+                <a16:creationId xmlns:a16="http://schemas.microsoft.com/office/drawing/2014/main" xmlns="" id="{ABBB53F0-83D7-42D4-90A5-7D5EE7C0AAD3}"/>
               </a:ext>
             </a:extLst>
           </p:cNvPr>
@@ -357,7 +358,7 @@
           <p:cNvPr id="2" name="Title 1">
             <a:extLst>
               <a:ext uri="{FF2B5EF4-FFF2-40B4-BE49-F238E27FC236}">
-                <a16:creationId xmlns="" xmlns:a16="http://schemas.microsoft.com/office/drawing/2014/main" id="{EDEAE3B1-565C-4AD8-A67C-7D2C44ECA18D}"/>
+                <a16:creationId xmlns:a16="http://schemas.microsoft.com/office/drawing/2014/main" xmlns="" id="{EDEAE3B1-565C-4AD8-A67C-7D2C44ECA18D}"/>
               </a:ext>
             </a:extLst>
           </p:cNvPr>
@@ -386,7 +387,7 @@
           <p:cNvPr id="3" name="Vertical Text Placeholder 2">
             <a:extLst>
               <a:ext uri="{FF2B5EF4-FFF2-40B4-BE49-F238E27FC236}">
-                <a16:creationId xmlns="" xmlns:a16="http://schemas.microsoft.com/office/drawing/2014/main" id="{89499874-28E0-4013-933C-7A7F4857D944}"/>
+                <a16:creationId xmlns:a16="http://schemas.microsoft.com/office/drawing/2014/main" xmlns="" id="{89499874-28E0-4013-933C-7A7F4857D944}"/>
               </a:ext>
             </a:extLst>
           </p:cNvPr>
@@ -444,7 +445,7 @@
           <p:cNvPr id="4" name="Date Placeholder 3">
             <a:extLst>
               <a:ext uri="{FF2B5EF4-FFF2-40B4-BE49-F238E27FC236}">
-                <a16:creationId xmlns="" xmlns:a16="http://schemas.microsoft.com/office/drawing/2014/main" id="{30B68540-FC47-4085-8638-DE11BCE14D7E}"/>
+                <a16:creationId xmlns:a16="http://schemas.microsoft.com/office/drawing/2014/main" xmlns="" id="{30B68540-FC47-4085-8638-DE11BCE14D7E}"/>
               </a:ext>
             </a:extLst>
           </p:cNvPr>
@@ -473,7 +474,7 @@
           <p:cNvPr id="5" name="Footer Placeholder 4">
             <a:extLst>
               <a:ext uri="{FF2B5EF4-FFF2-40B4-BE49-F238E27FC236}">
-                <a16:creationId xmlns="" xmlns:a16="http://schemas.microsoft.com/office/drawing/2014/main" id="{149BDF69-9D0A-4871-B742-85D1C27ACA21}"/>
+                <a16:creationId xmlns:a16="http://schemas.microsoft.com/office/drawing/2014/main" xmlns="" id="{149BDF69-9D0A-4871-B742-85D1C27ACA21}"/>
               </a:ext>
             </a:extLst>
           </p:cNvPr>
@@ -498,7 +499,7 @@
           <p:cNvPr id="6" name="Slide Number Placeholder 5">
             <a:extLst>
               <a:ext uri="{FF2B5EF4-FFF2-40B4-BE49-F238E27FC236}">
-                <a16:creationId xmlns="" xmlns:a16="http://schemas.microsoft.com/office/drawing/2014/main" id="{BAC96E6A-25E9-4A3D-BDE5-E881314DE0D7}"/>
+                <a16:creationId xmlns:a16="http://schemas.microsoft.com/office/drawing/2014/main" xmlns="" id="{BAC96E6A-25E9-4A3D-BDE5-E881314DE0D7}"/>
               </a:ext>
             </a:extLst>
           </p:cNvPr>
@@ -557,7 +558,7 @@
           <p:cNvPr id="2" name="Vertical Title 1">
             <a:extLst>
               <a:ext uri="{FF2B5EF4-FFF2-40B4-BE49-F238E27FC236}">
-                <a16:creationId xmlns="" xmlns:a16="http://schemas.microsoft.com/office/drawing/2014/main" id="{8BD4BC0C-9CFC-4FB2-B5C6-6EEC1B7F772D}"/>
+                <a16:creationId xmlns:a16="http://schemas.microsoft.com/office/drawing/2014/main" xmlns="" id="{8BD4BC0C-9CFC-4FB2-B5C6-6EEC1B7F772D}"/>
               </a:ext>
             </a:extLst>
           </p:cNvPr>
@@ -591,7 +592,7 @@
           <p:cNvPr id="3" name="Vertical Text Placeholder 2">
             <a:extLst>
               <a:ext uri="{FF2B5EF4-FFF2-40B4-BE49-F238E27FC236}">
-                <a16:creationId xmlns="" xmlns:a16="http://schemas.microsoft.com/office/drawing/2014/main" id="{5CF7FA3D-9ABB-49C7-AF65-E0869B2150C9}"/>
+                <a16:creationId xmlns:a16="http://schemas.microsoft.com/office/drawing/2014/main" xmlns="" id="{5CF7FA3D-9ABB-49C7-AF65-E0869B2150C9}"/>
               </a:ext>
             </a:extLst>
           </p:cNvPr>
@@ -654,7 +655,7 @@
           <p:cNvPr id="4" name="Date Placeholder 3">
             <a:extLst>
               <a:ext uri="{FF2B5EF4-FFF2-40B4-BE49-F238E27FC236}">
-                <a16:creationId xmlns="" xmlns:a16="http://schemas.microsoft.com/office/drawing/2014/main" id="{FBF00D9E-50E5-4276-BC40-27125BC1B69A}"/>
+                <a16:creationId xmlns:a16="http://schemas.microsoft.com/office/drawing/2014/main" xmlns="" id="{FBF00D9E-50E5-4276-BC40-27125BC1B69A}"/>
               </a:ext>
             </a:extLst>
           </p:cNvPr>
@@ -683,7 +684,7 @@
           <p:cNvPr id="5" name="Footer Placeholder 4">
             <a:extLst>
               <a:ext uri="{FF2B5EF4-FFF2-40B4-BE49-F238E27FC236}">
-                <a16:creationId xmlns="" xmlns:a16="http://schemas.microsoft.com/office/drawing/2014/main" id="{3AA20A04-EE64-4C85-A4C3-C674E216B21E}"/>
+                <a16:creationId xmlns:a16="http://schemas.microsoft.com/office/drawing/2014/main" xmlns="" id="{3AA20A04-EE64-4C85-A4C3-C674E216B21E}"/>
               </a:ext>
             </a:extLst>
           </p:cNvPr>
@@ -708,7 +709,7 @@
           <p:cNvPr id="6" name="Slide Number Placeholder 5">
             <a:extLst>
               <a:ext uri="{FF2B5EF4-FFF2-40B4-BE49-F238E27FC236}">
-                <a16:creationId xmlns="" xmlns:a16="http://schemas.microsoft.com/office/drawing/2014/main" id="{0F34C053-3886-4674-85D6-13CCCB876AEC}"/>
+                <a16:creationId xmlns:a16="http://schemas.microsoft.com/office/drawing/2014/main" xmlns="" id="{0F34C053-3886-4674-85D6-13CCCB876AEC}"/>
               </a:ext>
             </a:extLst>
           </p:cNvPr>
@@ -767,7 +768,7 @@
           <p:cNvPr id="2" name="Title 1">
             <a:extLst>
               <a:ext uri="{FF2B5EF4-FFF2-40B4-BE49-F238E27FC236}">
-                <a16:creationId xmlns="" xmlns:a16="http://schemas.microsoft.com/office/drawing/2014/main" id="{6D70D093-F0D3-479C-B65D-3031107C0DF1}"/>
+                <a16:creationId xmlns:a16="http://schemas.microsoft.com/office/drawing/2014/main" xmlns="" id="{6D70D093-F0D3-479C-B65D-3031107C0DF1}"/>
               </a:ext>
             </a:extLst>
           </p:cNvPr>
@@ -796,7 +797,7 @@
           <p:cNvPr id="3" name="Content Placeholder 2">
             <a:extLst>
               <a:ext uri="{FF2B5EF4-FFF2-40B4-BE49-F238E27FC236}">
-                <a16:creationId xmlns="" xmlns:a16="http://schemas.microsoft.com/office/drawing/2014/main" id="{19F2333E-AD72-4069-9999-D316EB1D2BE2}"/>
+                <a16:creationId xmlns:a16="http://schemas.microsoft.com/office/drawing/2014/main" xmlns="" id="{19F2333E-AD72-4069-9999-D316EB1D2BE2}"/>
               </a:ext>
             </a:extLst>
           </p:cNvPr>
@@ -854,7 +855,7 @@
           <p:cNvPr id="4" name="Date Placeholder 3">
             <a:extLst>
               <a:ext uri="{FF2B5EF4-FFF2-40B4-BE49-F238E27FC236}">
-                <a16:creationId xmlns="" xmlns:a16="http://schemas.microsoft.com/office/drawing/2014/main" id="{A5D0C69D-8EED-4855-9D9D-192FA0501F24}"/>
+                <a16:creationId xmlns:a16="http://schemas.microsoft.com/office/drawing/2014/main" xmlns="" id="{A5D0C69D-8EED-4855-9D9D-192FA0501F24}"/>
               </a:ext>
             </a:extLst>
           </p:cNvPr>
@@ -883,7 +884,7 @@
           <p:cNvPr id="5" name="Footer Placeholder 4">
             <a:extLst>
               <a:ext uri="{FF2B5EF4-FFF2-40B4-BE49-F238E27FC236}">
-                <a16:creationId xmlns="" xmlns:a16="http://schemas.microsoft.com/office/drawing/2014/main" id="{3E40E1C3-407E-4CDD-B265-40C6EAF109CB}"/>
+                <a16:creationId xmlns:a16="http://schemas.microsoft.com/office/drawing/2014/main" xmlns="" id="{3E40E1C3-407E-4CDD-B265-40C6EAF109CB}"/>
               </a:ext>
             </a:extLst>
           </p:cNvPr>
@@ -908,7 +909,7 @@
           <p:cNvPr id="6" name="Slide Number Placeholder 5">
             <a:extLst>
               <a:ext uri="{FF2B5EF4-FFF2-40B4-BE49-F238E27FC236}">
-                <a16:creationId xmlns="" xmlns:a16="http://schemas.microsoft.com/office/drawing/2014/main" id="{845BB6A8-2931-4612-9030-020514B9DFCC}"/>
+                <a16:creationId xmlns:a16="http://schemas.microsoft.com/office/drawing/2014/main" xmlns="" id="{845BB6A8-2931-4612-9030-020514B9DFCC}"/>
               </a:ext>
             </a:extLst>
           </p:cNvPr>
@@ -967,7 +968,7 @@
           <p:cNvPr id="2" name="Title 1">
             <a:extLst>
               <a:ext uri="{FF2B5EF4-FFF2-40B4-BE49-F238E27FC236}">
-                <a16:creationId xmlns="" xmlns:a16="http://schemas.microsoft.com/office/drawing/2014/main" id="{9648ED28-6C5E-4B58-8121-9279F11D3D73}"/>
+                <a16:creationId xmlns:a16="http://schemas.microsoft.com/office/drawing/2014/main" xmlns="" id="{9648ED28-6C5E-4B58-8121-9279F11D3D73}"/>
               </a:ext>
             </a:extLst>
           </p:cNvPr>
@@ -1005,7 +1006,7 @@
           <p:cNvPr id="3" name="Text Placeholder 2">
             <a:extLst>
               <a:ext uri="{FF2B5EF4-FFF2-40B4-BE49-F238E27FC236}">
-                <a16:creationId xmlns="" xmlns:a16="http://schemas.microsoft.com/office/drawing/2014/main" id="{B243195A-3915-4922-B15F-B46A8AB41FEA}"/>
+                <a16:creationId xmlns:a16="http://schemas.microsoft.com/office/drawing/2014/main" xmlns="" id="{B243195A-3915-4922-B15F-B46A8AB41FEA}"/>
               </a:ext>
             </a:extLst>
           </p:cNvPr>
@@ -1130,7 +1131,7 @@
           <p:cNvPr id="4" name="Date Placeholder 3">
             <a:extLst>
               <a:ext uri="{FF2B5EF4-FFF2-40B4-BE49-F238E27FC236}">
-                <a16:creationId xmlns="" xmlns:a16="http://schemas.microsoft.com/office/drawing/2014/main" id="{33A69456-A0E9-4808-8AD0-8E412F7B6478}"/>
+                <a16:creationId xmlns:a16="http://schemas.microsoft.com/office/drawing/2014/main" xmlns="" id="{33A69456-A0E9-4808-8AD0-8E412F7B6478}"/>
               </a:ext>
             </a:extLst>
           </p:cNvPr>
@@ -1159,7 +1160,7 @@
           <p:cNvPr id="5" name="Footer Placeholder 4">
             <a:extLst>
               <a:ext uri="{FF2B5EF4-FFF2-40B4-BE49-F238E27FC236}">
-                <a16:creationId xmlns="" xmlns:a16="http://schemas.microsoft.com/office/drawing/2014/main" id="{E0CD1CF0-CD4A-49A3-A5A3-C4241E2A5F63}"/>
+                <a16:creationId xmlns:a16="http://schemas.microsoft.com/office/drawing/2014/main" xmlns="" id="{E0CD1CF0-CD4A-49A3-A5A3-C4241E2A5F63}"/>
               </a:ext>
             </a:extLst>
           </p:cNvPr>
@@ -1184,7 +1185,7 @@
           <p:cNvPr id="6" name="Slide Number Placeholder 5">
             <a:extLst>
               <a:ext uri="{FF2B5EF4-FFF2-40B4-BE49-F238E27FC236}">
-                <a16:creationId xmlns="" xmlns:a16="http://schemas.microsoft.com/office/drawing/2014/main" id="{977DB6D3-8C4E-4ED5-9327-2DCA26535F2F}"/>
+                <a16:creationId xmlns:a16="http://schemas.microsoft.com/office/drawing/2014/main" xmlns="" id="{977DB6D3-8C4E-4ED5-9327-2DCA26535F2F}"/>
               </a:ext>
             </a:extLst>
           </p:cNvPr>
@@ -1243,7 +1244,7 @@
           <p:cNvPr id="2" name="Title 1">
             <a:extLst>
               <a:ext uri="{FF2B5EF4-FFF2-40B4-BE49-F238E27FC236}">
-                <a16:creationId xmlns="" xmlns:a16="http://schemas.microsoft.com/office/drawing/2014/main" id="{07C65CDB-FECB-413B-B3E2-B8B3289BE67F}"/>
+                <a16:creationId xmlns:a16="http://schemas.microsoft.com/office/drawing/2014/main" xmlns="" id="{07C65CDB-FECB-413B-B3E2-B8B3289BE67F}"/>
               </a:ext>
             </a:extLst>
           </p:cNvPr>
@@ -1272,7 +1273,7 @@
           <p:cNvPr id="3" name="Content Placeholder 2">
             <a:extLst>
               <a:ext uri="{FF2B5EF4-FFF2-40B4-BE49-F238E27FC236}">
-                <a16:creationId xmlns="" xmlns:a16="http://schemas.microsoft.com/office/drawing/2014/main" id="{2E6195E5-493D-470C-8030-A76CAC535D10}"/>
+                <a16:creationId xmlns:a16="http://schemas.microsoft.com/office/drawing/2014/main" xmlns="" id="{2E6195E5-493D-470C-8030-A76CAC535D10}"/>
               </a:ext>
             </a:extLst>
           </p:cNvPr>
@@ -1335,7 +1336,7 @@
           <p:cNvPr id="4" name="Content Placeholder 3">
             <a:extLst>
               <a:ext uri="{FF2B5EF4-FFF2-40B4-BE49-F238E27FC236}">
-                <a16:creationId xmlns="" xmlns:a16="http://schemas.microsoft.com/office/drawing/2014/main" id="{4F75BA75-06D0-4C8F-978B-E8DD198357AB}"/>
+                <a16:creationId xmlns:a16="http://schemas.microsoft.com/office/drawing/2014/main" xmlns="" id="{4F75BA75-06D0-4C8F-978B-E8DD198357AB}"/>
               </a:ext>
             </a:extLst>
           </p:cNvPr>
@@ -1398,7 +1399,7 @@
           <p:cNvPr id="5" name="Date Placeholder 4">
             <a:extLst>
               <a:ext uri="{FF2B5EF4-FFF2-40B4-BE49-F238E27FC236}">
-                <a16:creationId xmlns="" xmlns:a16="http://schemas.microsoft.com/office/drawing/2014/main" id="{B8464B70-E9DB-4711-87B7-24F57EF07851}"/>
+                <a16:creationId xmlns:a16="http://schemas.microsoft.com/office/drawing/2014/main" xmlns="" id="{B8464B70-E9DB-4711-87B7-24F57EF07851}"/>
               </a:ext>
             </a:extLst>
           </p:cNvPr>
@@ -1427,7 +1428,7 @@
           <p:cNvPr id="6" name="Footer Placeholder 5">
             <a:extLst>
               <a:ext uri="{FF2B5EF4-FFF2-40B4-BE49-F238E27FC236}">
-                <a16:creationId xmlns="" xmlns:a16="http://schemas.microsoft.com/office/drawing/2014/main" id="{749AD7CE-527F-410D-975F-A7CD735BDEDC}"/>
+                <a16:creationId xmlns:a16="http://schemas.microsoft.com/office/drawing/2014/main" xmlns="" id="{749AD7CE-527F-410D-975F-A7CD735BDEDC}"/>
               </a:ext>
             </a:extLst>
           </p:cNvPr>
@@ -1452,7 +1453,7 @@
           <p:cNvPr id="7" name="Slide Number Placeholder 6">
             <a:extLst>
               <a:ext uri="{FF2B5EF4-FFF2-40B4-BE49-F238E27FC236}">
-                <a16:creationId xmlns="" xmlns:a16="http://schemas.microsoft.com/office/drawing/2014/main" id="{255D3E42-D06E-4C32-A2BC-75DE87B576C3}"/>
+                <a16:creationId xmlns:a16="http://schemas.microsoft.com/office/drawing/2014/main" xmlns="" id="{255D3E42-D06E-4C32-A2BC-75DE87B576C3}"/>
               </a:ext>
             </a:extLst>
           </p:cNvPr>
@@ -1511,7 +1512,7 @@
           <p:cNvPr id="2" name="Title 1">
             <a:extLst>
               <a:ext uri="{FF2B5EF4-FFF2-40B4-BE49-F238E27FC236}">
-                <a16:creationId xmlns="" xmlns:a16="http://schemas.microsoft.com/office/drawing/2014/main" id="{BE6E0455-D9EF-42F6-B509-7FDC251CFDAF}"/>
+                <a16:creationId xmlns:a16="http://schemas.microsoft.com/office/drawing/2014/main" xmlns="" id="{BE6E0455-D9EF-42F6-B509-7FDC251CFDAF}"/>
               </a:ext>
             </a:extLst>
           </p:cNvPr>
@@ -1545,7 +1546,7 @@
           <p:cNvPr id="3" name="Text Placeholder 2">
             <a:extLst>
               <a:ext uri="{FF2B5EF4-FFF2-40B4-BE49-F238E27FC236}">
-                <a16:creationId xmlns="" xmlns:a16="http://schemas.microsoft.com/office/drawing/2014/main" id="{5117D045-1AD3-424F-855E-BD6F9FACDA1A}"/>
+                <a16:creationId xmlns:a16="http://schemas.microsoft.com/office/drawing/2014/main" xmlns="" id="{5117D045-1AD3-424F-855E-BD6F9FACDA1A}"/>
               </a:ext>
             </a:extLst>
           </p:cNvPr>
@@ -1616,7 +1617,7 @@
           <p:cNvPr id="4" name="Content Placeholder 3">
             <a:extLst>
               <a:ext uri="{FF2B5EF4-FFF2-40B4-BE49-F238E27FC236}">
-                <a16:creationId xmlns="" xmlns:a16="http://schemas.microsoft.com/office/drawing/2014/main" id="{CC38E2F2-5E09-477C-BF9F-8B671E6613BE}"/>
+                <a16:creationId xmlns:a16="http://schemas.microsoft.com/office/drawing/2014/main" xmlns="" id="{CC38E2F2-5E09-477C-BF9F-8B671E6613BE}"/>
               </a:ext>
             </a:extLst>
           </p:cNvPr>
@@ -1679,7 +1680,7 @@
           <p:cNvPr id="5" name="Text Placeholder 4">
             <a:extLst>
               <a:ext uri="{FF2B5EF4-FFF2-40B4-BE49-F238E27FC236}">
-                <a16:creationId xmlns="" xmlns:a16="http://schemas.microsoft.com/office/drawing/2014/main" id="{3A15ED3B-D38C-4255-B016-9BFE9335B63D}"/>
+                <a16:creationId xmlns:a16="http://schemas.microsoft.com/office/drawing/2014/main" xmlns="" id="{3A15ED3B-D38C-4255-B016-9BFE9335B63D}"/>
               </a:ext>
             </a:extLst>
           </p:cNvPr>
@@ -1750,7 +1751,7 @@
           <p:cNvPr id="6" name="Content Placeholder 5">
             <a:extLst>
               <a:ext uri="{FF2B5EF4-FFF2-40B4-BE49-F238E27FC236}">
-                <a16:creationId xmlns="" xmlns:a16="http://schemas.microsoft.com/office/drawing/2014/main" id="{63DAE8AA-C177-4A26-BEC1-435C0D5B2971}"/>
+                <a16:creationId xmlns:a16="http://schemas.microsoft.com/office/drawing/2014/main" xmlns="" id="{63DAE8AA-C177-4A26-BEC1-435C0D5B2971}"/>
               </a:ext>
             </a:extLst>
           </p:cNvPr>
@@ -1813,7 +1814,7 @@
           <p:cNvPr id="7" name="Date Placeholder 6">
             <a:extLst>
               <a:ext uri="{FF2B5EF4-FFF2-40B4-BE49-F238E27FC236}">
-                <a16:creationId xmlns="" xmlns:a16="http://schemas.microsoft.com/office/drawing/2014/main" id="{C91A1DD9-FE74-4BC2-9DFA-85266C81AE87}"/>
+                <a16:creationId xmlns:a16="http://schemas.microsoft.com/office/drawing/2014/main" xmlns="" id="{C91A1DD9-FE74-4BC2-9DFA-85266C81AE87}"/>
               </a:ext>
             </a:extLst>
           </p:cNvPr>
@@ -1842,7 +1843,7 @@
           <p:cNvPr id="8" name="Footer Placeholder 7">
             <a:extLst>
               <a:ext uri="{FF2B5EF4-FFF2-40B4-BE49-F238E27FC236}">
-                <a16:creationId xmlns="" xmlns:a16="http://schemas.microsoft.com/office/drawing/2014/main" id="{03468399-9983-447A-A9C7-60841A2101A5}"/>
+                <a16:creationId xmlns:a16="http://schemas.microsoft.com/office/drawing/2014/main" xmlns="" id="{03468399-9983-447A-A9C7-60841A2101A5}"/>
               </a:ext>
             </a:extLst>
           </p:cNvPr>
@@ -1867,7 +1868,7 @@
           <p:cNvPr id="9" name="Slide Number Placeholder 8">
             <a:extLst>
               <a:ext uri="{FF2B5EF4-FFF2-40B4-BE49-F238E27FC236}">
-                <a16:creationId xmlns="" xmlns:a16="http://schemas.microsoft.com/office/drawing/2014/main" id="{FF353AE5-8C6E-44F3-BD0C-9BE8FC31A3C4}"/>
+                <a16:creationId xmlns:a16="http://schemas.microsoft.com/office/drawing/2014/main" xmlns="" id="{FF353AE5-8C6E-44F3-BD0C-9BE8FC31A3C4}"/>
               </a:ext>
             </a:extLst>
           </p:cNvPr>
@@ -1926,7 +1927,7 @@
           <p:cNvPr id="2" name="Title 1">
             <a:extLst>
               <a:ext uri="{FF2B5EF4-FFF2-40B4-BE49-F238E27FC236}">
-                <a16:creationId xmlns="" xmlns:a16="http://schemas.microsoft.com/office/drawing/2014/main" id="{11AB4E18-777A-4059-8FE3-0C744DDCEF11}"/>
+                <a16:creationId xmlns:a16="http://schemas.microsoft.com/office/drawing/2014/main" xmlns="" id="{11AB4E18-777A-4059-8FE3-0C744DDCEF11}"/>
               </a:ext>
             </a:extLst>
           </p:cNvPr>
@@ -1955,7 +1956,7 @@
           <p:cNvPr id="3" name="Date Placeholder 2">
             <a:extLst>
               <a:ext uri="{FF2B5EF4-FFF2-40B4-BE49-F238E27FC236}">
-                <a16:creationId xmlns="" xmlns:a16="http://schemas.microsoft.com/office/drawing/2014/main" id="{EBBA3A6C-B2BF-4415-9EFA-485140AC1C20}"/>
+                <a16:creationId xmlns:a16="http://schemas.microsoft.com/office/drawing/2014/main" xmlns="" id="{EBBA3A6C-B2BF-4415-9EFA-485140AC1C20}"/>
               </a:ext>
             </a:extLst>
           </p:cNvPr>
@@ -1984,7 +1985,7 @@
           <p:cNvPr id="4" name="Footer Placeholder 3">
             <a:extLst>
               <a:ext uri="{FF2B5EF4-FFF2-40B4-BE49-F238E27FC236}">
-                <a16:creationId xmlns="" xmlns:a16="http://schemas.microsoft.com/office/drawing/2014/main" id="{979E66C2-27F5-4ADA-B05B-28A7E30C72C4}"/>
+                <a16:creationId xmlns:a16="http://schemas.microsoft.com/office/drawing/2014/main" xmlns="" id="{979E66C2-27F5-4ADA-B05B-28A7E30C72C4}"/>
               </a:ext>
             </a:extLst>
           </p:cNvPr>
@@ -2009,7 +2010,7 @@
           <p:cNvPr id="5" name="Slide Number Placeholder 4">
             <a:extLst>
               <a:ext uri="{FF2B5EF4-FFF2-40B4-BE49-F238E27FC236}">
-                <a16:creationId xmlns="" xmlns:a16="http://schemas.microsoft.com/office/drawing/2014/main" id="{339F570E-2EBF-491A-B1A3-7B0020A39D87}"/>
+                <a16:creationId xmlns:a16="http://schemas.microsoft.com/office/drawing/2014/main" xmlns="" id="{339F570E-2EBF-491A-B1A3-7B0020A39D87}"/>
               </a:ext>
             </a:extLst>
           </p:cNvPr>
@@ -2068,7 +2069,7 @@
           <p:cNvPr id="2" name="Date Placeholder 1">
             <a:extLst>
               <a:ext uri="{FF2B5EF4-FFF2-40B4-BE49-F238E27FC236}">
-                <a16:creationId xmlns="" xmlns:a16="http://schemas.microsoft.com/office/drawing/2014/main" id="{31CC9DF5-DDBA-4A27-A2BE-EE4875C95E73}"/>
+                <a16:creationId xmlns:a16="http://schemas.microsoft.com/office/drawing/2014/main" xmlns="" id="{31CC9DF5-DDBA-4A27-A2BE-EE4875C95E73}"/>
               </a:ext>
             </a:extLst>
           </p:cNvPr>
@@ -2097,7 +2098,7 @@
           <p:cNvPr id="3" name="Footer Placeholder 2">
             <a:extLst>
               <a:ext uri="{FF2B5EF4-FFF2-40B4-BE49-F238E27FC236}">
-                <a16:creationId xmlns="" xmlns:a16="http://schemas.microsoft.com/office/drawing/2014/main" id="{5E855F50-D457-4213-B498-4635BD853470}"/>
+                <a16:creationId xmlns:a16="http://schemas.microsoft.com/office/drawing/2014/main" xmlns="" id="{5E855F50-D457-4213-B498-4635BD853470}"/>
               </a:ext>
             </a:extLst>
           </p:cNvPr>
@@ -2122,7 +2123,7 @@
           <p:cNvPr id="4" name="Slide Number Placeholder 3">
             <a:extLst>
               <a:ext uri="{FF2B5EF4-FFF2-40B4-BE49-F238E27FC236}">
-                <a16:creationId xmlns="" xmlns:a16="http://schemas.microsoft.com/office/drawing/2014/main" id="{1424F85B-ACD9-4362-A6F2-B7C48F575113}"/>
+                <a16:creationId xmlns:a16="http://schemas.microsoft.com/office/drawing/2014/main" xmlns="" id="{1424F85B-ACD9-4362-A6F2-B7C48F575113}"/>
               </a:ext>
             </a:extLst>
           </p:cNvPr>
@@ -2181,7 +2182,7 @@
           <p:cNvPr id="2" name="Title 1">
             <a:extLst>
               <a:ext uri="{FF2B5EF4-FFF2-40B4-BE49-F238E27FC236}">
-                <a16:creationId xmlns="" xmlns:a16="http://schemas.microsoft.com/office/drawing/2014/main" id="{BD554F58-5E8E-48ED-8ED9-A0BD06E6F218}"/>
+                <a16:creationId xmlns:a16="http://schemas.microsoft.com/office/drawing/2014/main" xmlns="" id="{BD554F58-5E8E-48ED-8ED9-A0BD06E6F218}"/>
               </a:ext>
             </a:extLst>
           </p:cNvPr>
@@ -2219,7 +2220,7 @@
           <p:cNvPr id="3" name="Content Placeholder 2">
             <a:extLst>
               <a:ext uri="{FF2B5EF4-FFF2-40B4-BE49-F238E27FC236}">
-                <a16:creationId xmlns="" xmlns:a16="http://schemas.microsoft.com/office/drawing/2014/main" id="{88E32398-FD1A-4262-BB8C-6CFB63C85CED}"/>
+                <a16:creationId xmlns:a16="http://schemas.microsoft.com/office/drawing/2014/main" xmlns="" id="{88E32398-FD1A-4262-BB8C-6CFB63C85CED}"/>
               </a:ext>
             </a:extLst>
           </p:cNvPr>
@@ -2310,7 +2311,7 @@
           <p:cNvPr id="4" name="Text Placeholder 3">
             <a:extLst>
               <a:ext uri="{FF2B5EF4-FFF2-40B4-BE49-F238E27FC236}">
-                <a16:creationId xmlns="" xmlns:a16="http://schemas.microsoft.com/office/drawing/2014/main" id="{373EAC1B-2FB9-4226-BCA0-E5D3B01D6FA0}"/>
+                <a16:creationId xmlns:a16="http://schemas.microsoft.com/office/drawing/2014/main" xmlns="" id="{373EAC1B-2FB9-4226-BCA0-E5D3B01D6FA0}"/>
               </a:ext>
             </a:extLst>
           </p:cNvPr>
@@ -2381,7 +2382,7 @@
           <p:cNvPr id="5" name="Date Placeholder 4">
             <a:extLst>
               <a:ext uri="{FF2B5EF4-FFF2-40B4-BE49-F238E27FC236}">
-                <a16:creationId xmlns="" xmlns:a16="http://schemas.microsoft.com/office/drawing/2014/main" id="{D639F409-5438-45DD-BECC-62B7B0AAF361}"/>
+                <a16:creationId xmlns:a16="http://schemas.microsoft.com/office/drawing/2014/main" xmlns="" id="{D639F409-5438-45DD-BECC-62B7B0AAF361}"/>
               </a:ext>
             </a:extLst>
           </p:cNvPr>
@@ -2410,7 +2411,7 @@
           <p:cNvPr id="6" name="Footer Placeholder 5">
             <a:extLst>
               <a:ext uri="{FF2B5EF4-FFF2-40B4-BE49-F238E27FC236}">
-                <a16:creationId xmlns="" xmlns:a16="http://schemas.microsoft.com/office/drawing/2014/main" id="{2311AAC2-3F58-465D-8275-AAB451586BBE}"/>
+                <a16:creationId xmlns:a16="http://schemas.microsoft.com/office/drawing/2014/main" xmlns="" id="{2311AAC2-3F58-465D-8275-AAB451586BBE}"/>
               </a:ext>
             </a:extLst>
           </p:cNvPr>
@@ -2435,7 +2436,7 @@
           <p:cNvPr id="7" name="Slide Number Placeholder 6">
             <a:extLst>
               <a:ext uri="{FF2B5EF4-FFF2-40B4-BE49-F238E27FC236}">
-                <a16:creationId xmlns="" xmlns:a16="http://schemas.microsoft.com/office/drawing/2014/main" id="{4076C87A-5864-468D-9EE2-7F4B0C093074}"/>
+                <a16:creationId xmlns:a16="http://schemas.microsoft.com/office/drawing/2014/main" xmlns="" id="{4076C87A-5864-468D-9EE2-7F4B0C093074}"/>
               </a:ext>
             </a:extLst>
           </p:cNvPr>
@@ -2494,7 +2495,7 @@
           <p:cNvPr id="2" name="Title 1">
             <a:extLst>
               <a:ext uri="{FF2B5EF4-FFF2-40B4-BE49-F238E27FC236}">
-                <a16:creationId xmlns="" xmlns:a16="http://schemas.microsoft.com/office/drawing/2014/main" id="{B5D51929-B485-4C5E-86DE-E6E2074D6CE5}"/>
+                <a16:creationId xmlns:a16="http://schemas.microsoft.com/office/drawing/2014/main" xmlns="" id="{B5D51929-B485-4C5E-86DE-E6E2074D6CE5}"/>
               </a:ext>
             </a:extLst>
           </p:cNvPr>
@@ -2532,7 +2533,7 @@
           <p:cNvPr id="3" name="Picture Placeholder 2">
             <a:extLst>
               <a:ext uri="{FF2B5EF4-FFF2-40B4-BE49-F238E27FC236}">
-                <a16:creationId xmlns="" xmlns:a16="http://schemas.microsoft.com/office/drawing/2014/main" id="{745CAD50-DBFD-4B1E-8C5A-FEC1D2159DDB}"/>
+                <a16:creationId xmlns:a16="http://schemas.microsoft.com/office/drawing/2014/main" xmlns="" id="{745CAD50-DBFD-4B1E-8C5A-FEC1D2159DDB}"/>
               </a:ext>
             </a:extLst>
           </p:cNvPr>
@@ -2599,7 +2600,7 @@
           <p:cNvPr id="4" name="Text Placeholder 3">
             <a:extLst>
               <a:ext uri="{FF2B5EF4-FFF2-40B4-BE49-F238E27FC236}">
-                <a16:creationId xmlns="" xmlns:a16="http://schemas.microsoft.com/office/drawing/2014/main" id="{56CA1066-373C-4A49-B657-9EE7DCD0952D}"/>
+                <a16:creationId xmlns:a16="http://schemas.microsoft.com/office/drawing/2014/main" xmlns="" id="{56CA1066-373C-4A49-B657-9EE7DCD0952D}"/>
               </a:ext>
             </a:extLst>
           </p:cNvPr>
@@ -2670,7 +2671,7 @@
           <p:cNvPr id="5" name="Date Placeholder 4">
             <a:extLst>
               <a:ext uri="{FF2B5EF4-FFF2-40B4-BE49-F238E27FC236}">
-                <a16:creationId xmlns="" xmlns:a16="http://schemas.microsoft.com/office/drawing/2014/main" id="{D4F04E1C-BF5B-43FA-9CA9-C4A3872ABD47}"/>
+                <a16:creationId xmlns:a16="http://schemas.microsoft.com/office/drawing/2014/main" xmlns="" id="{D4F04E1C-BF5B-43FA-9CA9-C4A3872ABD47}"/>
               </a:ext>
             </a:extLst>
           </p:cNvPr>
@@ -2699,7 +2700,7 @@
           <p:cNvPr id="6" name="Footer Placeholder 5">
             <a:extLst>
               <a:ext uri="{FF2B5EF4-FFF2-40B4-BE49-F238E27FC236}">
-                <a16:creationId xmlns="" xmlns:a16="http://schemas.microsoft.com/office/drawing/2014/main" id="{B3F3C200-5776-44B6-80D6-B576FC6FE4A1}"/>
+                <a16:creationId xmlns:a16="http://schemas.microsoft.com/office/drawing/2014/main" xmlns="" id="{B3F3C200-5776-44B6-80D6-B576FC6FE4A1}"/>
               </a:ext>
             </a:extLst>
           </p:cNvPr>
@@ -2724,7 +2725,7 @@
           <p:cNvPr id="7" name="Slide Number Placeholder 6">
             <a:extLst>
               <a:ext uri="{FF2B5EF4-FFF2-40B4-BE49-F238E27FC236}">
-                <a16:creationId xmlns="" xmlns:a16="http://schemas.microsoft.com/office/drawing/2014/main" id="{C83FA351-8092-4D78-A9C7-A20A77930D3D}"/>
+                <a16:creationId xmlns:a16="http://schemas.microsoft.com/office/drawing/2014/main" xmlns="" id="{C83FA351-8092-4D78-A9C7-A20A77930D3D}"/>
               </a:ext>
             </a:extLst>
           </p:cNvPr>
@@ -2788,7 +2789,7 @@
           <p:cNvPr id="2" name="Title Placeholder 1">
             <a:extLst>
               <a:ext uri="{FF2B5EF4-FFF2-40B4-BE49-F238E27FC236}">
-                <a16:creationId xmlns="" xmlns:a16="http://schemas.microsoft.com/office/drawing/2014/main" id="{417237BA-4865-4280-8BD0-E6D106DFB608}"/>
+                <a16:creationId xmlns:a16="http://schemas.microsoft.com/office/drawing/2014/main" xmlns="" id="{417237BA-4865-4280-8BD0-E6D106DFB608}"/>
               </a:ext>
             </a:extLst>
           </p:cNvPr>
@@ -2827,7 +2828,7 @@
           <p:cNvPr id="3" name="Text Placeholder 2">
             <a:extLst>
               <a:ext uri="{FF2B5EF4-FFF2-40B4-BE49-F238E27FC236}">
-                <a16:creationId xmlns="" xmlns:a16="http://schemas.microsoft.com/office/drawing/2014/main" id="{CFD6DF4C-CD43-4DDE-9E26-4DAB0E753402}"/>
+                <a16:creationId xmlns:a16="http://schemas.microsoft.com/office/drawing/2014/main" xmlns="" id="{CFD6DF4C-CD43-4DDE-9E26-4DAB0E753402}"/>
               </a:ext>
             </a:extLst>
           </p:cNvPr>
@@ -2895,7 +2896,7 @@
           <p:cNvPr id="4" name="Date Placeholder 3">
             <a:extLst>
               <a:ext uri="{FF2B5EF4-FFF2-40B4-BE49-F238E27FC236}">
-                <a16:creationId xmlns="" xmlns:a16="http://schemas.microsoft.com/office/drawing/2014/main" id="{4E8F96A9-316E-4272-B736-3B7A5BEFB368}"/>
+                <a16:creationId xmlns:a16="http://schemas.microsoft.com/office/drawing/2014/main" xmlns="" id="{4E8F96A9-316E-4272-B736-3B7A5BEFB368}"/>
               </a:ext>
             </a:extLst>
           </p:cNvPr>
@@ -2942,7 +2943,7 @@
           <p:cNvPr id="5" name="Footer Placeholder 4">
             <a:extLst>
               <a:ext uri="{FF2B5EF4-FFF2-40B4-BE49-F238E27FC236}">
-                <a16:creationId xmlns="" xmlns:a16="http://schemas.microsoft.com/office/drawing/2014/main" id="{5B9B060F-4139-42DD-835A-DD48B4C35B93}"/>
+                <a16:creationId xmlns:a16="http://schemas.microsoft.com/office/drawing/2014/main" xmlns="" id="{5B9B060F-4139-42DD-835A-DD48B4C35B93}"/>
               </a:ext>
             </a:extLst>
           </p:cNvPr>
@@ -2985,7 +2986,7 @@
           <p:cNvPr id="6" name="Slide Number Placeholder 5">
             <a:extLst>
               <a:ext uri="{FF2B5EF4-FFF2-40B4-BE49-F238E27FC236}">
-                <a16:creationId xmlns="" xmlns:a16="http://schemas.microsoft.com/office/drawing/2014/main" id="{419ED261-D27A-4F8B-A664-31C7824BE2CC}"/>
+                <a16:creationId xmlns:a16="http://schemas.microsoft.com/office/drawing/2014/main" xmlns="" id="{419ED261-D27A-4F8B-A664-31C7824BE2CC}"/>
               </a:ext>
             </a:extLst>
           </p:cNvPr>
@@ -3353,7 +3354,7 @@
           <p:cNvPr id="4" name="Rectangle: Rounded Corners 3">
             <a:extLst>
               <a:ext uri="{FF2B5EF4-FFF2-40B4-BE49-F238E27FC236}">
-                <a16:creationId xmlns="" xmlns:a16="http://schemas.microsoft.com/office/drawing/2014/main" id="{54D0FB8B-B098-491A-AD31-AD421AB902EF}"/>
+                <a16:creationId xmlns:a16="http://schemas.microsoft.com/office/drawing/2014/main" xmlns="" id="{54D0FB8B-B098-491A-AD31-AD421AB902EF}"/>
               </a:ext>
             </a:extLst>
           </p:cNvPr>
@@ -3412,7 +3413,7 @@
           <p:cNvPr id="5" name="Rectangle: Rounded Corners 4">
             <a:extLst>
               <a:ext uri="{FF2B5EF4-FFF2-40B4-BE49-F238E27FC236}">
-                <a16:creationId xmlns="" xmlns:a16="http://schemas.microsoft.com/office/drawing/2014/main" id="{5675C345-97DA-44C4-8895-174F9B25EB74}"/>
+                <a16:creationId xmlns:a16="http://schemas.microsoft.com/office/drawing/2014/main" xmlns="" id="{5675C345-97DA-44C4-8895-174F9B25EB74}"/>
               </a:ext>
             </a:extLst>
           </p:cNvPr>
@@ -3471,7 +3472,7 @@
           <p:cNvPr id="10" name="Straight Arrow Connector 9">
             <a:extLst>
               <a:ext uri="{FF2B5EF4-FFF2-40B4-BE49-F238E27FC236}">
-                <a16:creationId xmlns="" xmlns:a16="http://schemas.microsoft.com/office/drawing/2014/main" id="{2738494B-22BB-4E16-AA8E-063441F62080}"/>
+                <a16:creationId xmlns:a16="http://schemas.microsoft.com/office/drawing/2014/main" xmlns="" id="{2738494B-22BB-4E16-AA8E-063441F62080}"/>
               </a:ext>
             </a:extLst>
           </p:cNvPr>
@@ -3513,7 +3514,7 @@
           <p:cNvPr id="11" name="TextBox 10">
             <a:extLst>
               <a:ext uri="{FF2B5EF4-FFF2-40B4-BE49-F238E27FC236}">
-                <a16:creationId xmlns="" xmlns:a16="http://schemas.microsoft.com/office/drawing/2014/main" id="{EA0207FA-CB6D-4700-A943-37A35E7A7F6C}"/>
+                <a16:creationId xmlns:a16="http://schemas.microsoft.com/office/drawing/2014/main" xmlns="" id="{EA0207FA-CB6D-4700-A943-37A35E7A7F6C}"/>
               </a:ext>
             </a:extLst>
           </p:cNvPr>
@@ -3549,7 +3550,7 @@
           <p:cNvPr id="12" name="Rectangle: Rounded Corners 11">
             <a:extLst>
               <a:ext uri="{FF2B5EF4-FFF2-40B4-BE49-F238E27FC236}">
-                <a16:creationId xmlns="" xmlns:a16="http://schemas.microsoft.com/office/drawing/2014/main" id="{0172D6A7-F319-4C98-BCFD-58AB9FFA137C}"/>
+                <a16:creationId xmlns:a16="http://schemas.microsoft.com/office/drawing/2014/main" xmlns="" id="{0172D6A7-F319-4C98-BCFD-58AB9FFA137C}"/>
               </a:ext>
             </a:extLst>
           </p:cNvPr>
@@ -3608,7 +3609,7 @@
           <p:cNvPr id="13" name="Rectangle: Rounded Corners 12">
             <a:extLst>
               <a:ext uri="{FF2B5EF4-FFF2-40B4-BE49-F238E27FC236}">
-                <a16:creationId xmlns="" xmlns:a16="http://schemas.microsoft.com/office/drawing/2014/main" id="{351768B8-B0F4-49E5-A1C4-CB95780972A0}"/>
+                <a16:creationId xmlns:a16="http://schemas.microsoft.com/office/drawing/2014/main" xmlns="" id="{351768B8-B0F4-49E5-A1C4-CB95780972A0}"/>
               </a:ext>
             </a:extLst>
           </p:cNvPr>
@@ -3667,7 +3668,7 @@
           <p:cNvPr id="14" name="Rectangle: Rounded Corners 13">
             <a:extLst>
               <a:ext uri="{FF2B5EF4-FFF2-40B4-BE49-F238E27FC236}">
-                <a16:creationId xmlns="" xmlns:a16="http://schemas.microsoft.com/office/drawing/2014/main" id="{C3BAB69B-ADA0-48E1-A7A3-2F500C2A407E}"/>
+                <a16:creationId xmlns:a16="http://schemas.microsoft.com/office/drawing/2014/main" xmlns="" id="{C3BAB69B-ADA0-48E1-A7A3-2F500C2A407E}"/>
               </a:ext>
             </a:extLst>
           </p:cNvPr>
@@ -3726,7 +3727,7 @@
           <p:cNvPr id="15" name="Rectangle: Rounded Corners 14">
             <a:extLst>
               <a:ext uri="{FF2B5EF4-FFF2-40B4-BE49-F238E27FC236}">
-                <a16:creationId xmlns="" xmlns:a16="http://schemas.microsoft.com/office/drawing/2014/main" id="{415FC0F5-4B41-4A53-9189-AE991ED2BD31}"/>
+                <a16:creationId xmlns:a16="http://schemas.microsoft.com/office/drawing/2014/main" xmlns="" id="{415FC0F5-4B41-4A53-9189-AE991ED2BD31}"/>
               </a:ext>
             </a:extLst>
           </p:cNvPr>
@@ -3785,7 +3786,7 @@
           <p:cNvPr id="16" name="Rectangle: Rounded Corners 15">
             <a:extLst>
               <a:ext uri="{FF2B5EF4-FFF2-40B4-BE49-F238E27FC236}">
-                <a16:creationId xmlns="" xmlns:a16="http://schemas.microsoft.com/office/drawing/2014/main" id="{80DE7B24-B7E9-47B6-8E88-EC972ED19123}"/>
+                <a16:creationId xmlns:a16="http://schemas.microsoft.com/office/drawing/2014/main" xmlns="" id="{80DE7B24-B7E9-47B6-8E88-EC972ED19123}"/>
               </a:ext>
             </a:extLst>
           </p:cNvPr>
@@ -3844,7 +3845,7 @@
           <p:cNvPr id="17" name="Connector: Elbow 16">
             <a:extLst>
               <a:ext uri="{FF2B5EF4-FFF2-40B4-BE49-F238E27FC236}">
-                <a16:creationId xmlns="" xmlns:a16="http://schemas.microsoft.com/office/drawing/2014/main" id="{64514852-CA0B-4B22-9112-9C0EFB8F9B9B}"/>
+                <a16:creationId xmlns:a16="http://schemas.microsoft.com/office/drawing/2014/main" xmlns="" id="{64514852-CA0B-4B22-9112-9C0EFB8F9B9B}"/>
               </a:ext>
             </a:extLst>
           </p:cNvPr>
@@ -3892,7 +3893,7 @@
           <p:cNvPr id="20" name="Connector: Elbow 19">
             <a:extLst>
               <a:ext uri="{FF2B5EF4-FFF2-40B4-BE49-F238E27FC236}">
-                <a16:creationId xmlns="" xmlns:a16="http://schemas.microsoft.com/office/drawing/2014/main" id="{E118E15D-38EF-455D-87FB-59C64F2455B6}"/>
+                <a16:creationId xmlns:a16="http://schemas.microsoft.com/office/drawing/2014/main" xmlns="" id="{E118E15D-38EF-455D-87FB-59C64F2455B6}"/>
               </a:ext>
             </a:extLst>
           </p:cNvPr>
@@ -3940,7 +3941,7 @@
           <p:cNvPr id="23" name="Connector: Elbow 22">
             <a:extLst>
               <a:ext uri="{FF2B5EF4-FFF2-40B4-BE49-F238E27FC236}">
-                <a16:creationId xmlns="" xmlns:a16="http://schemas.microsoft.com/office/drawing/2014/main" id="{B493C084-F212-492E-957C-8BEA879E995D}"/>
+                <a16:creationId xmlns:a16="http://schemas.microsoft.com/office/drawing/2014/main" xmlns="" id="{B493C084-F212-492E-957C-8BEA879E995D}"/>
               </a:ext>
             </a:extLst>
           </p:cNvPr>
@@ -3988,7 +3989,7 @@
           <p:cNvPr id="30" name="Rectangle: Rounded Corners 29">
             <a:extLst>
               <a:ext uri="{FF2B5EF4-FFF2-40B4-BE49-F238E27FC236}">
-                <a16:creationId xmlns="" xmlns:a16="http://schemas.microsoft.com/office/drawing/2014/main" id="{19F24737-7B63-4E7B-9AE5-A87497FA6FAF}"/>
+                <a16:creationId xmlns:a16="http://schemas.microsoft.com/office/drawing/2014/main" xmlns="" id="{19F24737-7B63-4E7B-9AE5-A87497FA6FAF}"/>
               </a:ext>
             </a:extLst>
           </p:cNvPr>
@@ -4047,7 +4048,7 @@
           <p:cNvPr id="31" name="Rectangle: Rounded Corners 30">
             <a:extLst>
               <a:ext uri="{FF2B5EF4-FFF2-40B4-BE49-F238E27FC236}">
-                <a16:creationId xmlns="" xmlns:a16="http://schemas.microsoft.com/office/drawing/2014/main" id="{7BC2DA58-1C14-4D8B-9AF3-E14F6FAD8FC0}"/>
+                <a16:creationId xmlns:a16="http://schemas.microsoft.com/office/drawing/2014/main" xmlns="" id="{7BC2DA58-1C14-4D8B-9AF3-E14F6FAD8FC0}"/>
               </a:ext>
             </a:extLst>
           </p:cNvPr>
@@ -4106,7 +4107,7 @@
           <p:cNvPr id="32" name="Rectangle: Rounded Corners 31">
             <a:extLst>
               <a:ext uri="{FF2B5EF4-FFF2-40B4-BE49-F238E27FC236}">
-                <a16:creationId xmlns="" xmlns:a16="http://schemas.microsoft.com/office/drawing/2014/main" id="{A2415D34-9AEB-4D3C-8B85-9A65A96218FE}"/>
+                <a16:creationId xmlns:a16="http://schemas.microsoft.com/office/drawing/2014/main" xmlns="" id="{A2415D34-9AEB-4D3C-8B85-9A65A96218FE}"/>
               </a:ext>
             </a:extLst>
           </p:cNvPr>
@@ -4165,7 +4166,7 @@
           <p:cNvPr id="33" name="Connector: Elbow 32">
             <a:extLst>
               <a:ext uri="{FF2B5EF4-FFF2-40B4-BE49-F238E27FC236}">
-                <a16:creationId xmlns="" xmlns:a16="http://schemas.microsoft.com/office/drawing/2014/main" id="{821A3089-B696-4653-B73B-39B49F027466}"/>
+                <a16:creationId xmlns:a16="http://schemas.microsoft.com/office/drawing/2014/main" xmlns="" id="{821A3089-B696-4653-B73B-39B49F027466}"/>
               </a:ext>
             </a:extLst>
           </p:cNvPr>
@@ -4213,7 +4214,7 @@
           <p:cNvPr id="36" name="Connector: Elbow 35">
             <a:extLst>
               <a:ext uri="{FF2B5EF4-FFF2-40B4-BE49-F238E27FC236}">
-                <a16:creationId xmlns="" xmlns:a16="http://schemas.microsoft.com/office/drawing/2014/main" id="{0E570848-FE64-4E6A-A947-1CBC1911E97A}"/>
+                <a16:creationId xmlns:a16="http://schemas.microsoft.com/office/drawing/2014/main" xmlns="" id="{0E570848-FE64-4E6A-A947-1CBC1911E97A}"/>
               </a:ext>
             </a:extLst>
           </p:cNvPr>
@@ -4261,7 +4262,7 @@
           <p:cNvPr id="8" name="Straight Arrow Connector 7">
             <a:extLst>
               <a:ext uri="{FF2B5EF4-FFF2-40B4-BE49-F238E27FC236}">
-                <a16:creationId xmlns="" xmlns:a16="http://schemas.microsoft.com/office/drawing/2014/main" id="{02FF8AEF-9744-4B1C-ACB9-E3241ACF27D1}"/>
+                <a16:creationId xmlns:a16="http://schemas.microsoft.com/office/drawing/2014/main" xmlns="" id="{02FF8AEF-9744-4B1C-ACB9-E3241ACF27D1}"/>
               </a:ext>
             </a:extLst>
           </p:cNvPr>
@@ -4306,7 +4307,7 @@
           <p:cNvPr id="25" name="Rectangle: Rounded Corners 24">
             <a:extLst>
               <a:ext uri="{FF2B5EF4-FFF2-40B4-BE49-F238E27FC236}">
-                <a16:creationId xmlns="" xmlns:a16="http://schemas.microsoft.com/office/drawing/2014/main" id="{509E733A-9C35-48BC-B1CE-379C573000FE}"/>
+                <a16:creationId xmlns:a16="http://schemas.microsoft.com/office/drawing/2014/main" xmlns="" id="{509E733A-9C35-48BC-B1CE-379C573000FE}"/>
               </a:ext>
             </a:extLst>
           </p:cNvPr>
@@ -4365,7 +4366,7 @@
           <p:cNvPr id="26" name="Straight Arrow Connector 25">
             <a:extLst>
               <a:ext uri="{FF2B5EF4-FFF2-40B4-BE49-F238E27FC236}">
-                <a16:creationId xmlns="" xmlns:a16="http://schemas.microsoft.com/office/drawing/2014/main" id="{45BB73C4-0487-4332-804D-0640F1C24DD7}"/>
+                <a16:creationId xmlns:a16="http://schemas.microsoft.com/office/drawing/2014/main" xmlns="" id="{45BB73C4-0487-4332-804D-0640F1C24DD7}"/>
               </a:ext>
             </a:extLst>
           </p:cNvPr>
@@ -4412,7 +4413,7 @@
           <p:cNvPr id="29" name="TextBox 28">
             <a:extLst>
               <a:ext uri="{FF2B5EF4-FFF2-40B4-BE49-F238E27FC236}">
-                <a16:creationId xmlns="" xmlns:a16="http://schemas.microsoft.com/office/drawing/2014/main" id="{ECF64CE6-E66F-4FF9-8239-2D9801A3273B}"/>
+                <a16:creationId xmlns:a16="http://schemas.microsoft.com/office/drawing/2014/main" xmlns="" id="{ECF64CE6-E66F-4FF9-8239-2D9801A3273B}"/>
               </a:ext>
             </a:extLst>
           </p:cNvPr>
@@ -4448,7 +4449,7 @@
           <p:cNvPr id="34" name="Connector: Elbow 33">
             <a:extLst>
               <a:ext uri="{FF2B5EF4-FFF2-40B4-BE49-F238E27FC236}">
-                <a16:creationId xmlns="" xmlns:a16="http://schemas.microsoft.com/office/drawing/2014/main" id="{762DA317-C2C5-4F35-8BEE-2475336742C9}"/>
+                <a16:creationId xmlns:a16="http://schemas.microsoft.com/office/drawing/2014/main" xmlns="" id="{762DA317-C2C5-4F35-8BEE-2475336742C9}"/>
               </a:ext>
             </a:extLst>
           </p:cNvPr>
@@ -4497,7 +4498,7 @@
           <p:cNvPr id="35" name="Connector: Elbow 34">
             <a:extLst>
               <a:ext uri="{FF2B5EF4-FFF2-40B4-BE49-F238E27FC236}">
-                <a16:creationId xmlns="" xmlns:a16="http://schemas.microsoft.com/office/drawing/2014/main" id="{326F3BCB-F2A3-492C-A8F3-20922107B29D}"/>
+                <a16:creationId xmlns:a16="http://schemas.microsoft.com/office/drawing/2014/main" xmlns="" id="{326F3BCB-F2A3-492C-A8F3-20922107B29D}"/>
               </a:ext>
             </a:extLst>
           </p:cNvPr>
@@ -4546,7 +4547,7 @@
           <p:cNvPr id="37" name="Connector: Elbow 36">
             <a:extLst>
               <a:ext uri="{FF2B5EF4-FFF2-40B4-BE49-F238E27FC236}">
-                <a16:creationId xmlns="" xmlns:a16="http://schemas.microsoft.com/office/drawing/2014/main" id="{D78C9AF8-6E97-4A41-9699-F00133FB72EE}"/>
+                <a16:creationId xmlns:a16="http://schemas.microsoft.com/office/drawing/2014/main" xmlns="" id="{D78C9AF8-6E97-4A41-9699-F00133FB72EE}"/>
               </a:ext>
             </a:extLst>
           </p:cNvPr>
@@ -4595,7 +4596,7 @@
           <p:cNvPr id="83" name="TextBox 82">
             <a:extLst>
               <a:ext uri="{FF2B5EF4-FFF2-40B4-BE49-F238E27FC236}">
-                <a16:creationId xmlns="" xmlns:a16="http://schemas.microsoft.com/office/drawing/2014/main" id="{C34CC880-1902-497C-A44A-571D93EAD548}"/>
+                <a16:creationId xmlns:a16="http://schemas.microsoft.com/office/drawing/2014/main" xmlns="" id="{C34CC880-1902-497C-A44A-571D93EAD548}"/>
               </a:ext>
             </a:extLst>
           </p:cNvPr>
@@ -4630,7 +4631,7 @@
           <p:cNvPr id="84" name="TextBox 83">
             <a:extLst>
               <a:ext uri="{FF2B5EF4-FFF2-40B4-BE49-F238E27FC236}">
-                <a16:creationId xmlns="" xmlns:a16="http://schemas.microsoft.com/office/drawing/2014/main" id="{582DAA28-77DF-48AB-A0FA-7D0944EEA418}"/>
+                <a16:creationId xmlns:a16="http://schemas.microsoft.com/office/drawing/2014/main" xmlns="" id="{582DAA28-77DF-48AB-A0FA-7D0944EEA418}"/>
               </a:ext>
             </a:extLst>
           </p:cNvPr>
@@ -4665,7 +4666,7 @@
           <p:cNvPr id="85" name="TextBox 84">
             <a:extLst>
               <a:ext uri="{FF2B5EF4-FFF2-40B4-BE49-F238E27FC236}">
-                <a16:creationId xmlns="" xmlns:a16="http://schemas.microsoft.com/office/drawing/2014/main" id="{35632462-2816-4AB9-8863-E2858DF02B69}"/>
+                <a16:creationId xmlns:a16="http://schemas.microsoft.com/office/drawing/2014/main" xmlns="" id="{35632462-2816-4AB9-8863-E2858DF02B69}"/>
               </a:ext>
             </a:extLst>
           </p:cNvPr>
@@ -4700,7 +4701,7 @@
           <p:cNvPr id="98" name="Connector: Elbow 97">
             <a:extLst>
               <a:ext uri="{FF2B5EF4-FFF2-40B4-BE49-F238E27FC236}">
-                <a16:creationId xmlns="" xmlns:a16="http://schemas.microsoft.com/office/drawing/2014/main" id="{A1F2BECA-1D96-4FF9-8754-645C1D7726F8}"/>
+                <a16:creationId xmlns:a16="http://schemas.microsoft.com/office/drawing/2014/main" xmlns="" id="{A1F2BECA-1D96-4FF9-8754-645C1D7726F8}"/>
               </a:ext>
             </a:extLst>
           </p:cNvPr>
@@ -4749,7 +4750,7 @@
           <p:cNvPr id="101" name="Connector: Elbow 100">
             <a:extLst>
               <a:ext uri="{FF2B5EF4-FFF2-40B4-BE49-F238E27FC236}">
-                <a16:creationId xmlns="" xmlns:a16="http://schemas.microsoft.com/office/drawing/2014/main" id="{36519D8D-4EA4-45AD-AD01-BCA533BD100D}"/>
+                <a16:creationId xmlns:a16="http://schemas.microsoft.com/office/drawing/2014/main" xmlns="" id="{36519D8D-4EA4-45AD-AD01-BCA533BD100D}"/>
               </a:ext>
             </a:extLst>
           </p:cNvPr>
@@ -4798,7 +4799,7 @@
           <p:cNvPr id="104" name="TextBox 103">
             <a:extLst>
               <a:ext uri="{FF2B5EF4-FFF2-40B4-BE49-F238E27FC236}">
-                <a16:creationId xmlns="" xmlns:a16="http://schemas.microsoft.com/office/drawing/2014/main" id="{6D855CC4-9F24-4FB0-84C5-F540689823DA}"/>
+                <a16:creationId xmlns:a16="http://schemas.microsoft.com/office/drawing/2014/main" xmlns="" id="{6D855CC4-9F24-4FB0-84C5-F540689823DA}"/>
               </a:ext>
             </a:extLst>
           </p:cNvPr>
@@ -4833,7 +4834,7 @@
           <p:cNvPr id="105" name="TextBox 104">
             <a:extLst>
               <a:ext uri="{FF2B5EF4-FFF2-40B4-BE49-F238E27FC236}">
-                <a16:creationId xmlns="" xmlns:a16="http://schemas.microsoft.com/office/drawing/2014/main" id="{312F8B0D-878E-4CFD-AF2D-6C5C84BC7C3F}"/>
+                <a16:creationId xmlns:a16="http://schemas.microsoft.com/office/drawing/2014/main" xmlns="" id="{312F8B0D-878E-4CFD-AF2D-6C5C84BC7C3F}"/>
               </a:ext>
             </a:extLst>
           </p:cNvPr>
@@ -4868,7 +4869,7 @@
           <p:cNvPr id="106" name="Connector: Elbow 105">
             <a:extLst>
               <a:ext uri="{FF2B5EF4-FFF2-40B4-BE49-F238E27FC236}">
-                <a16:creationId xmlns="" xmlns:a16="http://schemas.microsoft.com/office/drawing/2014/main" id="{AFDAAF80-D279-45C4-BA1C-63276C92DDEA}"/>
+                <a16:creationId xmlns:a16="http://schemas.microsoft.com/office/drawing/2014/main" xmlns="" id="{AFDAAF80-D279-45C4-BA1C-63276C92DDEA}"/>
               </a:ext>
             </a:extLst>
           </p:cNvPr>
@@ -4917,7 +4918,7 @@
           <p:cNvPr id="109" name="TextBox 108">
             <a:extLst>
               <a:ext uri="{FF2B5EF4-FFF2-40B4-BE49-F238E27FC236}">
-                <a16:creationId xmlns="" xmlns:a16="http://schemas.microsoft.com/office/drawing/2014/main" id="{68F80759-A938-4EC4-AB28-CF35C69A0B12}"/>
+                <a16:creationId xmlns:a16="http://schemas.microsoft.com/office/drawing/2014/main" xmlns="" id="{68F80759-A938-4EC4-AB28-CF35C69A0B12}"/>
               </a:ext>
             </a:extLst>
           </p:cNvPr>
@@ -4961,6 +4962,3062 @@
 </file>
 
 <file path=ppt/slides/slide2.xml><?xml version="1.0" encoding="utf-8"?>
+<p:sld xmlns:a="http://schemas.openxmlformats.org/drawingml/2006/main" xmlns:r="http://schemas.openxmlformats.org/officeDocument/2006/relationships" xmlns:p="http://schemas.openxmlformats.org/presentationml/2006/main">
+  <p:cSld>
+    <p:spTree>
+      <p:nvGrpSpPr>
+        <p:cNvPr id="1" name=""/>
+        <p:cNvGrpSpPr/>
+        <p:nvPr/>
+      </p:nvGrpSpPr>
+      <p:grpSpPr>
+        <a:xfrm>
+          <a:off x="0" y="0"/>
+          <a:ext cx="0" cy="0"/>
+          <a:chOff x="0" y="0"/>
+          <a:chExt cx="0" cy="0"/>
+        </a:xfrm>
+      </p:grpSpPr>
+      <p:graphicFrame>
+        <p:nvGraphicFramePr>
+          <p:cNvPr id="4" name="Table 3"/>
+          <p:cNvGraphicFramePr>
+            <a:graphicFrameLocks noGrp="1"/>
+          </p:cNvGraphicFramePr>
+          <p:nvPr>
+            <p:extLst>
+              <p:ext uri="{D42A27DB-BD31-4B8C-83A1-F6EECF244321}">
+                <p14:modId xmlns:p14="http://schemas.microsoft.com/office/powerpoint/2010/main" val="684467582"/>
+              </p:ext>
+            </p:extLst>
+          </p:nvPr>
+        </p:nvGraphicFramePr>
+        <p:xfrm>
+          <a:off x="2381813" y="825137"/>
+          <a:ext cx="1413861" cy="4572000"/>
+        </p:xfrm>
+        <a:graphic>
+          <a:graphicData uri="http://schemas.openxmlformats.org/drawingml/2006/table">
+            <a:tbl>
+              <a:tblPr firstRow="1" bandRow="1">
+                <a:tableStyleId>{5C22544A-7EE6-4342-B048-85BDC9FD1C3A}</a:tableStyleId>
+              </a:tblPr>
+              <a:tblGrid>
+                <a:gridCol w="1413861"/>
+              </a:tblGrid>
+              <a:tr h="0">
+                <a:tc>
+                  <a:txBody>
+                    <a:bodyPr/>
+                    <a:lstStyle/>
+                    <a:p>
+                      <a:pPr algn="ctr"/>
+                      <a:r>
+                        <a:rPr lang="en-AU" sz="1100" dirty="0" smtClean="0"/>
+                        <a:t>Policy</a:t>
+                      </a:r>
+                      <a:endParaRPr lang="en-AU" sz="1100" dirty="0"/>
+                    </a:p>
+                  </a:txBody>
+                  <a:tcPr>
+                    <a:lnL w="12700" cap="flat" cmpd="sng" algn="ctr">
+                      <a:solidFill>
+                        <a:schemeClr val="tx1"/>
+                      </a:solidFill>
+                      <a:prstDash val="solid"/>
+                      <a:round/>
+                      <a:headEnd type="none" w="med" len="med"/>
+                      <a:tailEnd type="none" w="med" len="med"/>
+                    </a:lnL>
+                    <a:lnR w="12700" cap="flat" cmpd="sng" algn="ctr">
+                      <a:solidFill>
+                        <a:schemeClr val="tx1"/>
+                      </a:solidFill>
+                      <a:prstDash val="solid"/>
+                      <a:round/>
+                      <a:headEnd type="none" w="med" len="med"/>
+                      <a:tailEnd type="none" w="med" len="med"/>
+                    </a:lnR>
+                    <a:lnT w="12700" cap="flat" cmpd="sng" algn="ctr">
+                      <a:solidFill>
+                        <a:schemeClr val="tx1"/>
+                      </a:solidFill>
+                      <a:prstDash val="solid"/>
+                      <a:round/>
+                      <a:headEnd type="none" w="med" len="med"/>
+                      <a:tailEnd type="none" w="med" len="med"/>
+                    </a:lnT>
+                    <a:lnB w="12700" cap="flat" cmpd="sng" algn="ctr">
+                      <a:solidFill>
+                        <a:schemeClr val="tx1"/>
+                      </a:solidFill>
+                      <a:prstDash val="solid"/>
+                      <a:round/>
+                      <a:headEnd type="none" w="med" len="med"/>
+                      <a:tailEnd type="none" w="med" len="med"/>
+                    </a:lnB>
+                  </a:tcPr>
+                </a:tc>
+              </a:tr>
+              <a:tr h="0">
+                <a:tc>
+                  <a:txBody>
+                    <a:bodyPr/>
+                    <a:lstStyle/>
+                    <a:p>
+                      <a:r>
+                        <a:rPr lang="en-AU" sz="1100" dirty="0" smtClean="0"/>
+                        <a:t>URI: string (</a:t>
+                      </a:r>
+                      <a:r>
+                        <a:rPr lang="en-AU" sz="1100" dirty="0" err="1" smtClean="0"/>
+                        <a:t>uri</a:t>
+                      </a:r>
+                      <a:r>
+                        <a:rPr lang="en-AU" sz="1100" dirty="0" smtClean="0"/>
+                        <a:t>)</a:t>
+                      </a:r>
+                      <a:endParaRPr lang="en-AU" sz="1100" dirty="0"/>
+                    </a:p>
+                  </a:txBody>
+                  <a:tcPr>
+                    <a:lnL w="12700" cap="flat" cmpd="sng" algn="ctr">
+                      <a:solidFill>
+                        <a:schemeClr val="tx1"/>
+                      </a:solidFill>
+                      <a:prstDash val="solid"/>
+                      <a:round/>
+                      <a:headEnd type="none" w="med" len="med"/>
+                      <a:tailEnd type="none" w="med" len="med"/>
+                    </a:lnL>
+                    <a:lnR w="12700" cap="flat" cmpd="sng" algn="ctr">
+                      <a:solidFill>
+                        <a:schemeClr val="tx1"/>
+                      </a:solidFill>
+                      <a:prstDash val="solid"/>
+                      <a:round/>
+                      <a:headEnd type="none" w="med" len="med"/>
+                      <a:tailEnd type="none" w="med" len="med"/>
+                    </a:lnR>
+                    <a:lnT w="12700" cap="flat" cmpd="sng" algn="ctr">
+                      <a:solidFill>
+                        <a:schemeClr val="tx1"/>
+                      </a:solidFill>
+                      <a:prstDash val="solid"/>
+                      <a:round/>
+                      <a:headEnd type="none" w="med" len="med"/>
+                      <a:tailEnd type="none" w="med" len="med"/>
+                    </a:lnT>
+                  </a:tcPr>
+                </a:tc>
+              </a:tr>
+              <a:tr h="0">
+                <a:tc>
+                  <a:txBody>
+                    <a:bodyPr/>
+                    <a:lstStyle/>
+                    <a:p>
+                      <a:r>
+                        <a:rPr lang="en-AU" sz="1100" dirty="0" smtClean="0"/>
+                        <a:t>Type: string (</a:t>
+                      </a:r>
+                      <a:r>
+                        <a:rPr lang="en-AU" sz="1100" dirty="0" err="1" smtClean="0"/>
+                        <a:t>uri</a:t>
+                      </a:r>
+                      <a:r>
+                        <a:rPr lang="en-AU" sz="1100" dirty="0" smtClean="0"/>
+                        <a:t>)</a:t>
+                      </a:r>
+                      <a:endParaRPr lang="en-AU" sz="1100" dirty="0"/>
+                    </a:p>
+                  </a:txBody>
+                  <a:tcPr>
+                    <a:lnL w="12700" cap="flat" cmpd="sng" algn="ctr">
+                      <a:solidFill>
+                        <a:schemeClr val="tx1"/>
+                      </a:solidFill>
+                      <a:prstDash val="solid"/>
+                      <a:round/>
+                      <a:headEnd type="none" w="med" len="med"/>
+                      <a:tailEnd type="none" w="med" len="med"/>
+                    </a:lnL>
+                    <a:lnR w="12700" cap="flat" cmpd="sng" algn="ctr">
+                      <a:solidFill>
+                        <a:schemeClr val="tx1"/>
+                      </a:solidFill>
+                      <a:prstDash val="solid"/>
+                      <a:round/>
+                      <a:headEnd type="none" w="med" len="med"/>
+                      <a:tailEnd type="none" w="med" len="med"/>
+                    </a:lnR>
+                  </a:tcPr>
+                </a:tc>
+              </a:tr>
+              <a:tr h="0">
+                <a:tc>
+                  <a:txBody>
+                    <a:bodyPr/>
+                    <a:lstStyle/>
+                    <a:p>
+                      <a:r>
+                        <a:rPr lang="en-AU" sz="1100" dirty="0" smtClean="0"/>
+                        <a:t>Jurisdiction: string (</a:t>
+                      </a:r>
+                      <a:r>
+                        <a:rPr lang="en-AU" sz="1100" dirty="0" err="1" smtClean="0"/>
+                        <a:t>uri</a:t>
+                      </a:r>
+                      <a:r>
+                        <a:rPr lang="en-AU" sz="1100" dirty="0" smtClean="0"/>
+                        <a:t>)</a:t>
+                      </a:r>
+                      <a:endParaRPr lang="en-AU" sz="1100" dirty="0"/>
+                    </a:p>
+                  </a:txBody>
+                  <a:tcPr>
+                    <a:lnL w="12700" cap="flat" cmpd="sng" algn="ctr">
+                      <a:solidFill>
+                        <a:schemeClr val="tx1"/>
+                      </a:solidFill>
+                      <a:prstDash val="solid"/>
+                      <a:round/>
+                      <a:headEnd type="none" w="med" len="med"/>
+                      <a:tailEnd type="none" w="med" len="med"/>
+                    </a:lnL>
+                    <a:lnR w="12700" cap="flat" cmpd="sng" algn="ctr">
+                      <a:solidFill>
+                        <a:schemeClr val="tx1"/>
+                      </a:solidFill>
+                      <a:prstDash val="solid"/>
+                      <a:round/>
+                      <a:headEnd type="none" w="med" len="med"/>
+                      <a:tailEnd type="none" w="med" len="med"/>
+                    </a:lnR>
+                  </a:tcPr>
+                </a:tc>
+              </a:tr>
+              <a:tr h="0">
+                <a:tc>
+                  <a:txBody>
+                    <a:bodyPr/>
+                    <a:lstStyle/>
+                    <a:p>
+                      <a:r>
+                        <a:rPr lang="en-AU" sz="1100" dirty="0" smtClean="0"/>
+                        <a:t>Version:</a:t>
+                      </a:r>
+                      <a:r>
+                        <a:rPr lang="en-AU" sz="1100" baseline="0" dirty="0" smtClean="0"/>
+                        <a:t> string</a:t>
+                      </a:r>
+                      <a:endParaRPr lang="en-AU" sz="1100" dirty="0"/>
+                    </a:p>
+                  </a:txBody>
+                  <a:tcPr>
+                    <a:lnL w="12700" cap="flat" cmpd="sng" algn="ctr">
+                      <a:solidFill>
+                        <a:schemeClr val="tx1"/>
+                      </a:solidFill>
+                      <a:prstDash val="solid"/>
+                      <a:round/>
+                      <a:headEnd type="none" w="med" len="med"/>
+                      <a:tailEnd type="none" w="med" len="med"/>
+                    </a:lnL>
+                    <a:lnR w="12700" cap="flat" cmpd="sng" algn="ctr">
+                      <a:solidFill>
+                        <a:schemeClr val="tx1"/>
+                      </a:solidFill>
+                      <a:prstDash val="solid"/>
+                      <a:round/>
+                      <a:headEnd type="none" w="med" len="med"/>
+                      <a:tailEnd type="none" w="med" len="med"/>
+                    </a:lnR>
+                  </a:tcPr>
+                </a:tc>
+              </a:tr>
+              <a:tr h="0">
+                <a:tc>
+                  <a:txBody>
+                    <a:bodyPr/>
+                    <a:lstStyle/>
+                    <a:p>
+                      <a:r>
+                        <a:rPr lang="en-AU" sz="1100" dirty="0" smtClean="0"/>
+                        <a:t>Language:</a:t>
+                      </a:r>
+                      <a:r>
+                        <a:rPr lang="en-AU" sz="1100" baseline="0" dirty="0" smtClean="0"/>
+                        <a:t> string (</a:t>
+                      </a:r>
+                      <a:r>
+                        <a:rPr lang="en-AU" sz="1100" baseline="0" dirty="0" err="1" smtClean="0"/>
+                        <a:t>uri</a:t>
+                      </a:r>
+                      <a:r>
+                        <a:rPr lang="en-AU" sz="1100" baseline="0" dirty="0" smtClean="0"/>
+                        <a:t>)</a:t>
+                      </a:r>
+                      <a:endParaRPr lang="en-AU" sz="1100" dirty="0"/>
+                    </a:p>
+                  </a:txBody>
+                  <a:tcPr>
+                    <a:lnL w="12700" cap="flat" cmpd="sng" algn="ctr">
+                      <a:solidFill>
+                        <a:schemeClr val="tx1"/>
+                      </a:solidFill>
+                      <a:prstDash val="solid"/>
+                      <a:round/>
+                      <a:headEnd type="none" w="med" len="med"/>
+                      <a:tailEnd type="none" w="med" len="med"/>
+                    </a:lnL>
+                    <a:lnR w="12700" cap="flat" cmpd="sng" algn="ctr">
+                      <a:solidFill>
+                        <a:schemeClr val="tx1"/>
+                      </a:solidFill>
+                      <a:prstDash val="solid"/>
+                      <a:round/>
+                      <a:headEnd type="none" w="med" len="med"/>
+                      <a:tailEnd type="none" w="med" len="med"/>
+                    </a:lnR>
+                  </a:tcPr>
+                </a:tc>
+              </a:tr>
+              <a:tr h="0">
+                <a:tc>
+                  <a:txBody>
+                    <a:bodyPr/>
+                    <a:lstStyle/>
+                    <a:p>
+                      <a:r>
+                        <a:rPr lang="en-AU" sz="1100" dirty="0" smtClean="0"/>
+                        <a:t>See</a:t>
+                      </a:r>
+                      <a:r>
+                        <a:rPr lang="en-AU" sz="1100" baseline="0" dirty="0" smtClean="0"/>
+                        <a:t> Also: string (</a:t>
+                      </a:r>
+                      <a:r>
+                        <a:rPr lang="en-AU" sz="1100" baseline="0" dirty="0" err="1" smtClean="0"/>
+                        <a:t>uri</a:t>
+                      </a:r>
+                      <a:r>
+                        <a:rPr lang="en-AU" sz="1100" baseline="0" dirty="0" smtClean="0"/>
+                        <a:t>)</a:t>
+                      </a:r>
+                      <a:endParaRPr lang="en-AU" sz="1100" dirty="0"/>
+                    </a:p>
+                  </a:txBody>
+                  <a:tcPr>
+                    <a:lnL w="12700" cap="flat" cmpd="sng" algn="ctr">
+                      <a:solidFill>
+                        <a:schemeClr val="tx1"/>
+                      </a:solidFill>
+                      <a:prstDash val="solid"/>
+                      <a:round/>
+                      <a:headEnd type="none" w="med" len="med"/>
+                      <a:tailEnd type="none" w="med" len="med"/>
+                    </a:lnL>
+                    <a:lnR w="12700" cap="flat" cmpd="sng" algn="ctr">
+                      <a:solidFill>
+                        <a:schemeClr val="tx1"/>
+                      </a:solidFill>
+                      <a:prstDash val="solid"/>
+                      <a:round/>
+                      <a:headEnd type="none" w="med" len="med"/>
+                      <a:tailEnd type="none" w="med" len="med"/>
+                    </a:lnR>
+                  </a:tcPr>
+                </a:tc>
+              </a:tr>
+              <a:tr h="0">
+                <a:tc>
+                  <a:txBody>
+                    <a:bodyPr/>
+                    <a:lstStyle/>
+                    <a:p>
+                      <a:r>
+                        <a:rPr lang="en-AU" sz="1100" dirty="0" smtClean="0"/>
+                        <a:t>Same As: string</a:t>
+                      </a:r>
+                      <a:r>
+                        <a:rPr lang="en-AU" sz="1100" baseline="0" dirty="0" smtClean="0"/>
+                        <a:t> (</a:t>
+                      </a:r>
+                      <a:r>
+                        <a:rPr lang="en-AU" sz="1100" baseline="0" dirty="0" err="1" smtClean="0"/>
+                        <a:t>uri</a:t>
+                      </a:r>
+                      <a:r>
+                        <a:rPr lang="en-AU" sz="1100" baseline="0" dirty="0" smtClean="0"/>
+                        <a:t>)</a:t>
+                      </a:r>
+                      <a:endParaRPr lang="en-AU" sz="1100" dirty="0"/>
+                    </a:p>
+                  </a:txBody>
+                  <a:tcPr>
+                    <a:lnL w="12700" cap="flat" cmpd="sng" algn="ctr">
+                      <a:solidFill>
+                        <a:schemeClr val="tx1"/>
+                      </a:solidFill>
+                      <a:prstDash val="solid"/>
+                      <a:round/>
+                      <a:headEnd type="none" w="med" len="med"/>
+                      <a:tailEnd type="none" w="med" len="med"/>
+                    </a:lnL>
+                    <a:lnR w="12700" cap="flat" cmpd="sng" algn="ctr">
+                      <a:solidFill>
+                        <a:schemeClr val="tx1"/>
+                      </a:solidFill>
+                      <a:prstDash val="solid"/>
+                      <a:round/>
+                      <a:headEnd type="none" w="med" len="med"/>
+                      <a:tailEnd type="none" w="med" len="med"/>
+                    </a:lnR>
+                  </a:tcPr>
+                </a:tc>
+              </a:tr>
+              <a:tr h="0">
+                <a:tc>
+                  <a:txBody>
+                    <a:bodyPr/>
+                    <a:lstStyle/>
+                    <a:p>
+                      <a:r>
+                        <a:rPr lang="en-AU" sz="1100" dirty="0" smtClean="0"/>
+                        <a:t>Comment: string</a:t>
+                      </a:r>
+                      <a:endParaRPr lang="en-AU" sz="1100" dirty="0"/>
+                    </a:p>
+                  </a:txBody>
+                  <a:tcPr>
+                    <a:lnL w="12700" cap="flat" cmpd="sng" algn="ctr">
+                      <a:solidFill>
+                        <a:schemeClr val="tx1"/>
+                      </a:solidFill>
+                      <a:prstDash val="solid"/>
+                      <a:round/>
+                      <a:headEnd type="none" w="med" len="med"/>
+                      <a:tailEnd type="none" w="med" len="med"/>
+                    </a:lnL>
+                    <a:lnR w="12700" cap="flat" cmpd="sng" algn="ctr">
+                      <a:solidFill>
+                        <a:schemeClr val="tx1"/>
+                      </a:solidFill>
+                      <a:prstDash val="solid"/>
+                      <a:round/>
+                      <a:headEnd type="none" w="med" len="med"/>
+                      <a:tailEnd type="none" w="med" len="med"/>
+                    </a:lnR>
+                  </a:tcPr>
+                </a:tc>
+              </a:tr>
+              <a:tr h="0">
+                <a:tc>
+                  <a:txBody>
+                    <a:bodyPr/>
+                    <a:lstStyle/>
+                    <a:p>
+                      <a:r>
+                        <a:rPr lang="en-AU" sz="1100" dirty="0" smtClean="0"/>
+                        <a:t>Logo: string (</a:t>
+                      </a:r>
+                      <a:r>
+                        <a:rPr lang="en-AU" sz="1100" dirty="0" err="1" smtClean="0"/>
+                        <a:t>uri</a:t>
+                      </a:r>
+                      <a:r>
+                        <a:rPr lang="en-AU" sz="1100" dirty="0" smtClean="0"/>
+                        <a:t>)</a:t>
+                      </a:r>
+                      <a:endParaRPr lang="en-AU" sz="1100" dirty="0"/>
+                    </a:p>
+                  </a:txBody>
+                  <a:tcPr>
+                    <a:lnL w="12700" cap="flat" cmpd="sng" algn="ctr">
+                      <a:solidFill>
+                        <a:schemeClr val="tx1"/>
+                      </a:solidFill>
+                      <a:prstDash val="solid"/>
+                      <a:round/>
+                      <a:headEnd type="none" w="med" len="med"/>
+                      <a:tailEnd type="none" w="med" len="med"/>
+                    </a:lnL>
+                    <a:lnR w="12700" cap="flat" cmpd="sng" algn="ctr">
+                      <a:solidFill>
+                        <a:schemeClr val="tx1"/>
+                      </a:solidFill>
+                      <a:prstDash val="solid"/>
+                      <a:round/>
+                      <a:headEnd type="none" w="med" len="med"/>
+                      <a:tailEnd type="none" w="med" len="med"/>
+                    </a:lnR>
+                  </a:tcPr>
+                </a:tc>
+              </a:tr>
+              <a:tr h="0">
+                <a:tc>
+                  <a:txBody>
+                    <a:bodyPr/>
+                    <a:lstStyle/>
+                    <a:p>
+                      <a:r>
+                        <a:rPr lang="en-AU" sz="1100" dirty="0" smtClean="0"/>
+                        <a:t>Status:</a:t>
+                      </a:r>
+                      <a:r>
+                        <a:rPr lang="en-AU" sz="1100" baseline="0" dirty="0" smtClean="0"/>
+                        <a:t> string (</a:t>
+                      </a:r>
+                      <a:r>
+                        <a:rPr lang="en-AU" sz="1100" baseline="0" dirty="0" err="1" smtClean="0"/>
+                        <a:t>uri</a:t>
+                      </a:r>
+                      <a:r>
+                        <a:rPr lang="en-AU" sz="1100" baseline="0" dirty="0" smtClean="0"/>
+                        <a:t>)</a:t>
+                      </a:r>
+                      <a:endParaRPr lang="en-AU" sz="1100" dirty="0"/>
+                    </a:p>
+                  </a:txBody>
+                  <a:tcPr>
+                    <a:lnL w="12700" cap="flat" cmpd="sng" algn="ctr">
+                      <a:solidFill>
+                        <a:schemeClr val="tx1"/>
+                      </a:solidFill>
+                      <a:prstDash val="solid"/>
+                      <a:round/>
+                      <a:headEnd type="none" w="med" len="med"/>
+                      <a:tailEnd type="none" w="med" len="med"/>
+                    </a:lnL>
+                    <a:lnR w="12700" cap="flat" cmpd="sng" algn="ctr">
+                      <a:solidFill>
+                        <a:schemeClr val="tx1"/>
+                      </a:solidFill>
+                      <a:prstDash val="solid"/>
+                      <a:round/>
+                      <a:headEnd type="none" w="med" len="med"/>
+                      <a:tailEnd type="none" w="med" len="med"/>
+                    </a:lnR>
+                    <a:lnB w="12700" cap="flat" cmpd="sng" algn="ctr">
+                      <a:solidFill>
+                        <a:schemeClr val="tx1"/>
+                      </a:solidFill>
+                      <a:prstDash val="solid"/>
+                      <a:round/>
+                      <a:headEnd type="none" w="med" len="med"/>
+                      <a:tailEnd type="none" w="med" len="med"/>
+                    </a:lnB>
+                  </a:tcPr>
+                </a:tc>
+              </a:tr>
+              <a:tr h="0">
+                <a:tc>
+                  <a:txBody>
+                    <a:bodyPr/>
+                    <a:lstStyle/>
+                    <a:p>
+                      <a:r>
+                        <a:rPr lang="en-AU" sz="1100" dirty="0" err="1" smtClean="0"/>
+                        <a:t>create_policy</a:t>
+                      </a:r>
+                      <a:r>
+                        <a:rPr lang="en-AU" sz="1100" dirty="0" smtClean="0"/>
+                        <a:t>()</a:t>
+                      </a:r>
+                      <a:endParaRPr lang="en-AU" sz="1100" dirty="0"/>
+                    </a:p>
+                  </a:txBody>
+                  <a:tcPr>
+                    <a:lnL w="12700" cap="flat" cmpd="sng" algn="ctr">
+                      <a:solidFill>
+                        <a:schemeClr val="tx1"/>
+                      </a:solidFill>
+                      <a:prstDash val="solid"/>
+                      <a:round/>
+                      <a:headEnd type="none" w="med" len="med"/>
+                      <a:tailEnd type="none" w="med" len="med"/>
+                    </a:lnL>
+                    <a:lnR w="12700" cap="flat" cmpd="sng" algn="ctr">
+                      <a:solidFill>
+                        <a:schemeClr val="tx1"/>
+                      </a:solidFill>
+                      <a:prstDash val="solid"/>
+                      <a:round/>
+                      <a:headEnd type="none" w="med" len="med"/>
+                      <a:tailEnd type="none" w="med" len="med"/>
+                    </a:lnR>
+                    <a:lnT w="12700" cap="flat" cmpd="sng" algn="ctr">
+                      <a:solidFill>
+                        <a:schemeClr val="tx1"/>
+                      </a:solidFill>
+                      <a:prstDash val="solid"/>
+                      <a:round/>
+                      <a:headEnd type="none" w="med" len="med"/>
+                      <a:tailEnd type="none" w="med" len="med"/>
+                    </a:lnT>
+                  </a:tcPr>
+                </a:tc>
+              </a:tr>
+              <a:tr h="0">
+                <a:tc>
+                  <a:txBody>
+                    <a:bodyPr/>
+                    <a:lstStyle/>
+                    <a:p>
+                      <a:r>
+                        <a:rPr lang="en-AU" sz="1100" dirty="0" err="1" smtClean="0"/>
+                        <a:t>delete_policy</a:t>
+                      </a:r>
+                      <a:r>
+                        <a:rPr lang="en-AU" sz="1100" dirty="0" smtClean="0"/>
+                        <a:t>()</a:t>
+                      </a:r>
+                      <a:endParaRPr lang="en-AU" sz="1100" dirty="0"/>
+                    </a:p>
+                  </a:txBody>
+                  <a:tcPr>
+                    <a:lnL w="12700" cap="flat" cmpd="sng" algn="ctr">
+                      <a:solidFill>
+                        <a:schemeClr val="tx1"/>
+                      </a:solidFill>
+                      <a:prstDash val="solid"/>
+                      <a:round/>
+                      <a:headEnd type="none" w="med" len="med"/>
+                      <a:tailEnd type="none" w="med" len="med"/>
+                    </a:lnL>
+                    <a:lnR w="12700" cap="flat" cmpd="sng" algn="ctr">
+                      <a:solidFill>
+                        <a:schemeClr val="tx1"/>
+                      </a:solidFill>
+                      <a:prstDash val="solid"/>
+                      <a:round/>
+                      <a:headEnd type="none" w="med" len="med"/>
+                      <a:tailEnd type="none" w="med" len="med"/>
+                    </a:lnR>
+                  </a:tcPr>
+                </a:tc>
+              </a:tr>
+              <a:tr h="0">
+                <a:tc>
+                  <a:txBody>
+                    <a:bodyPr/>
+                    <a:lstStyle/>
+                    <a:p>
+                      <a:r>
+                        <a:rPr lang="en-AU" sz="1100" dirty="0" err="1" smtClean="0"/>
+                        <a:t>policy_exists</a:t>
+                      </a:r>
+                      <a:r>
+                        <a:rPr lang="en-AU" sz="1100" dirty="0" smtClean="0"/>
+                        <a:t>()</a:t>
+                      </a:r>
+                      <a:endParaRPr lang="en-AU" sz="1100" dirty="0"/>
+                    </a:p>
+                  </a:txBody>
+                  <a:tcPr>
+                    <a:lnL w="12700" cap="flat" cmpd="sng" algn="ctr">
+                      <a:solidFill>
+                        <a:schemeClr val="tx1"/>
+                      </a:solidFill>
+                      <a:prstDash val="solid"/>
+                      <a:round/>
+                      <a:headEnd type="none" w="med" len="med"/>
+                      <a:tailEnd type="none" w="med" len="med"/>
+                    </a:lnL>
+                    <a:lnR w="12700" cap="flat" cmpd="sng" algn="ctr">
+                      <a:solidFill>
+                        <a:schemeClr val="tx1"/>
+                      </a:solidFill>
+                      <a:prstDash val="solid"/>
+                      <a:round/>
+                      <a:headEnd type="none" w="med" len="med"/>
+                      <a:tailEnd type="none" w="med" len="med"/>
+                    </a:lnR>
+                  </a:tcPr>
+                </a:tc>
+              </a:tr>
+              <a:tr h="0">
+                <a:tc>
+                  <a:txBody>
+                    <a:bodyPr/>
+                    <a:lstStyle/>
+                    <a:p>
+                      <a:r>
+                        <a:rPr lang="en-AU" sz="1100" dirty="0" err="1" smtClean="0"/>
+                        <a:t>set_policy_attribute</a:t>
+                      </a:r>
+                      <a:r>
+                        <a:rPr lang="en-AU" sz="1100" dirty="0" smtClean="0"/>
+                        <a:t>()</a:t>
+                      </a:r>
+                      <a:endParaRPr lang="en-AU" sz="1100" dirty="0"/>
+                    </a:p>
+                  </a:txBody>
+                  <a:tcPr>
+                    <a:lnL w="12700" cap="flat" cmpd="sng" algn="ctr">
+                      <a:solidFill>
+                        <a:schemeClr val="tx1"/>
+                      </a:solidFill>
+                      <a:prstDash val="solid"/>
+                      <a:round/>
+                      <a:headEnd type="none" w="med" len="med"/>
+                      <a:tailEnd type="none" w="med" len="med"/>
+                    </a:lnL>
+                    <a:lnR w="12700" cap="flat" cmpd="sng" algn="ctr">
+                      <a:solidFill>
+                        <a:schemeClr val="tx1"/>
+                      </a:solidFill>
+                      <a:prstDash val="solid"/>
+                      <a:round/>
+                      <a:headEnd type="none" w="med" len="med"/>
+                      <a:tailEnd type="none" w="med" len="med"/>
+                    </a:lnR>
+                  </a:tcPr>
+                </a:tc>
+              </a:tr>
+              <a:tr h="0">
+                <a:tc>
+                  <a:txBody>
+                    <a:bodyPr/>
+                    <a:lstStyle/>
+                    <a:p>
+                      <a:r>
+                        <a:rPr lang="en-AU" sz="1100" dirty="0" err="1" smtClean="0"/>
+                        <a:t>get_policy</a:t>
+                      </a:r>
+                      <a:r>
+                        <a:rPr lang="en-AU" sz="1100" dirty="0" smtClean="0"/>
+                        <a:t>()</a:t>
+                      </a:r>
+                      <a:endParaRPr lang="en-AU" sz="1100" dirty="0"/>
+                    </a:p>
+                  </a:txBody>
+                  <a:tcPr>
+                    <a:lnL w="12700" cap="flat" cmpd="sng" algn="ctr">
+                      <a:solidFill>
+                        <a:schemeClr val="tx1"/>
+                      </a:solidFill>
+                      <a:prstDash val="solid"/>
+                      <a:round/>
+                      <a:headEnd type="none" w="med" len="med"/>
+                      <a:tailEnd type="none" w="med" len="med"/>
+                    </a:lnL>
+                    <a:lnR w="12700" cap="flat" cmpd="sng" algn="ctr">
+                      <a:solidFill>
+                        <a:schemeClr val="tx1"/>
+                      </a:solidFill>
+                      <a:prstDash val="solid"/>
+                      <a:round/>
+                      <a:headEnd type="none" w="med" len="med"/>
+                      <a:tailEnd type="none" w="med" len="med"/>
+                    </a:lnR>
+                  </a:tcPr>
+                </a:tc>
+              </a:tr>
+              <a:tr h="0">
+                <a:tc>
+                  <a:txBody>
+                    <a:bodyPr/>
+                    <a:lstStyle/>
+                    <a:p>
+                      <a:r>
+                        <a:rPr lang="en-AU" sz="1100" dirty="0" err="1" smtClean="0"/>
+                        <a:t>get_all_policies</a:t>
+                      </a:r>
+                      <a:r>
+                        <a:rPr lang="en-AU" sz="1100" dirty="0" smtClean="0"/>
+                        <a:t>()</a:t>
+                      </a:r>
+                      <a:endParaRPr lang="en-AU" sz="1100" dirty="0"/>
+                    </a:p>
+                  </a:txBody>
+                  <a:tcPr>
+                    <a:lnL w="12700" cap="flat" cmpd="sng" algn="ctr">
+                      <a:solidFill>
+                        <a:schemeClr val="tx1"/>
+                      </a:solidFill>
+                      <a:prstDash val="solid"/>
+                      <a:round/>
+                      <a:headEnd type="none" w="med" len="med"/>
+                      <a:tailEnd type="none" w="med" len="med"/>
+                    </a:lnL>
+                    <a:lnR w="12700" cap="flat" cmpd="sng" algn="ctr">
+                      <a:solidFill>
+                        <a:schemeClr val="tx1"/>
+                      </a:solidFill>
+                      <a:prstDash val="solid"/>
+                      <a:round/>
+                      <a:headEnd type="none" w="med" len="med"/>
+                      <a:tailEnd type="none" w="med" len="med"/>
+                    </a:lnR>
+                    <a:lnB w="12700" cap="flat" cmpd="sng" algn="ctr">
+                      <a:solidFill>
+                        <a:schemeClr val="tx1"/>
+                      </a:solidFill>
+                      <a:prstDash val="solid"/>
+                      <a:round/>
+                      <a:headEnd type="none" w="med" len="med"/>
+                      <a:tailEnd type="none" w="med" len="med"/>
+                    </a:lnB>
+                  </a:tcPr>
+                </a:tc>
+              </a:tr>
+            </a:tbl>
+          </a:graphicData>
+        </a:graphic>
+      </p:graphicFrame>
+      <p:graphicFrame>
+        <p:nvGraphicFramePr>
+          <p:cNvPr id="7" name="Table 6"/>
+          <p:cNvGraphicFramePr>
+            <a:graphicFrameLocks noGrp="1"/>
+          </p:cNvGraphicFramePr>
+          <p:nvPr>
+            <p:extLst>
+              <p:ext uri="{D42A27DB-BD31-4B8C-83A1-F6EECF244321}">
+                <p14:modId xmlns:p14="http://schemas.microsoft.com/office/powerpoint/2010/main" val="1368935557"/>
+              </p:ext>
+            </p:extLst>
+          </p:nvPr>
+        </p:nvGraphicFramePr>
+        <p:xfrm>
+          <a:off x="422822" y="2512967"/>
+          <a:ext cx="1170960" cy="1554480"/>
+        </p:xfrm>
+        <a:graphic>
+          <a:graphicData uri="http://schemas.openxmlformats.org/drawingml/2006/table">
+            <a:tbl>
+              <a:tblPr firstRow="1" bandRow="1">
+                <a:tableStyleId>{5C22544A-7EE6-4342-B048-85BDC9FD1C3A}</a:tableStyleId>
+              </a:tblPr>
+              <a:tblGrid>
+                <a:gridCol w="1170960"/>
+              </a:tblGrid>
+              <a:tr h="0">
+                <a:tc>
+                  <a:txBody>
+                    <a:bodyPr/>
+                    <a:lstStyle/>
+                    <a:p>
+                      <a:pPr algn="ctr"/>
+                      <a:r>
+                        <a:rPr lang="en-AU" sz="1100" dirty="0" smtClean="0"/>
+                        <a:t>Asset</a:t>
+                      </a:r>
+                      <a:endParaRPr lang="en-AU" sz="1100" dirty="0"/>
+                    </a:p>
+                  </a:txBody>
+                  <a:tcPr>
+                    <a:lnL w="12700" cap="flat" cmpd="sng" algn="ctr">
+                      <a:solidFill>
+                        <a:schemeClr val="tx1"/>
+                      </a:solidFill>
+                      <a:prstDash val="solid"/>
+                      <a:round/>
+                      <a:headEnd type="none" w="med" len="med"/>
+                      <a:tailEnd type="none" w="med" len="med"/>
+                    </a:lnL>
+                    <a:lnR w="12700" cap="flat" cmpd="sng" algn="ctr">
+                      <a:solidFill>
+                        <a:schemeClr val="tx1"/>
+                      </a:solidFill>
+                      <a:prstDash val="solid"/>
+                      <a:round/>
+                      <a:headEnd type="none" w="med" len="med"/>
+                      <a:tailEnd type="none" w="med" len="med"/>
+                    </a:lnR>
+                    <a:lnT w="12700" cap="flat" cmpd="sng" algn="ctr">
+                      <a:solidFill>
+                        <a:schemeClr val="tx1"/>
+                      </a:solidFill>
+                      <a:prstDash val="solid"/>
+                      <a:round/>
+                      <a:headEnd type="none" w="med" len="med"/>
+                      <a:tailEnd type="none" w="med" len="med"/>
+                    </a:lnT>
+                    <a:lnB w="12700" cap="flat" cmpd="sng" algn="ctr">
+                      <a:solidFill>
+                        <a:schemeClr val="tx1"/>
+                      </a:solidFill>
+                      <a:prstDash val="solid"/>
+                      <a:round/>
+                      <a:headEnd type="none" w="med" len="med"/>
+                      <a:tailEnd type="none" w="med" len="med"/>
+                    </a:lnB>
+                  </a:tcPr>
+                </a:tc>
+              </a:tr>
+              <a:tr h="0">
+                <a:tc>
+                  <a:txBody>
+                    <a:bodyPr/>
+                    <a:lstStyle/>
+                    <a:p>
+                      <a:r>
+                        <a:rPr lang="en-AU" sz="1100" dirty="0" smtClean="0"/>
+                        <a:t>URI: string (</a:t>
+                      </a:r>
+                      <a:r>
+                        <a:rPr lang="en-AU" sz="1100" dirty="0" err="1" smtClean="0"/>
+                        <a:t>uri</a:t>
+                      </a:r>
+                      <a:r>
+                        <a:rPr lang="en-AU" sz="1100" dirty="0" smtClean="0"/>
+                        <a:t>)</a:t>
+                      </a:r>
+                      <a:endParaRPr lang="en-AU" sz="1100" dirty="0"/>
+                    </a:p>
+                  </a:txBody>
+                  <a:tcPr>
+                    <a:lnL w="12700" cap="flat" cmpd="sng" algn="ctr">
+                      <a:solidFill>
+                        <a:schemeClr val="tx1"/>
+                      </a:solidFill>
+                      <a:prstDash val="solid"/>
+                      <a:round/>
+                      <a:headEnd type="none" w="med" len="med"/>
+                      <a:tailEnd type="none" w="med" len="med"/>
+                    </a:lnL>
+                    <a:lnR w="12700" cap="flat" cmpd="sng" algn="ctr">
+                      <a:solidFill>
+                        <a:schemeClr val="tx1"/>
+                      </a:solidFill>
+                      <a:prstDash val="solid"/>
+                      <a:round/>
+                      <a:headEnd type="none" w="med" len="med"/>
+                      <a:tailEnd type="none" w="med" len="med"/>
+                    </a:lnR>
+                    <a:lnT w="12700" cap="flat" cmpd="sng" algn="ctr">
+                      <a:solidFill>
+                        <a:schemeClr val="tx1"/>
+                      </a:solidFill>
+                      <a:prstDash val="solid"/>
+                      <a:round/>
+                      <a:headEnd type="none" w="med" len="med"/>
+                      <a:tailEnd type="none" w="med" len="med"/>
+                    </a:lnT>
+                    <a:lnB w="12700" cap="flat" cmpd="sng" algn="ctr">
+                      <a:solidFill>
+                        <a:schemeClr val="tx1"/>
+                      </a:solidFill>
+                      <a:prstDash val="solid"/>
+                      <a:round/>
+                      <a:headEnd type="none" w="med" len="med"/>
+                      <a:tailEnd type="none" w="med" len="med"/>
+                    </a:lnB>
+                  </a:tcPr>
+                </a:tc>
+              </a:tr>
+              <a:tr h="0">
+                <a:tc>
+                  <a:txBody>
+                    <a:bodyPr/>
+                    <a:lstStyle/>
+                    <a:p>
+                      <a:r>
+                        <a:rPr lang="en-AU" sz="1100" dirty="0" err="1" smtClean="0"/>
+                        <a:t>add_asset</a:t>
+                      </a:r>
+                      <a:r>
+                        <a:rPr lang="en-AU" sz="1100" dirty="0" smtClean="0"/>
+                        <a:t>()</a:t>
+                      </a:r>
+                      <a:endParaRPr lang="en-AU" sz="1100" dirty="0"/>
+                    </a:p>
+                  </a:txBody>
+                  <a:tcPr>
+                    <a:lnL w="12700" cap="flat" cmpd="sng" algn="ctr">
+                      <a:solidFill>
+                        <a:schemeClr val="tx1"/>
+                      </a:solidFill>
+                      <a:prstDash val="solid"/>
+                      <a:round/>
+                      <a:headEnd type="none" w="med" len="med"/>
+                      <a:tailEnd type="none" w="med" len="med"/>
+                    </a:lnL>
+                    <a:lnR w="12700" cap="flat" cmpd="sng" algn="ctr">
+                      <a:solidFill>
+                        <a:schemeClr val="tx1"/>
+                      </a:solidFill>
+                      <a:prstDash val="solid"/>
+                      <a:round/>
+                      <a:headEnd type="none" w="med" len="med"/>
+                      <a:tailEnd type="none" w="med" len="med"/>
+                    </a:lnR>
+                    <a:lnT w="12700" cap="flat" cmpd="sng" algn="ctr">
+                      <a:solidFill>
+                        <a:schemeClr val="tx1"/>
+                      </a:solidFill>
+                      <a:prstDash val="solid"/>
+                      <a:round/>
+                      <a:headEnd type="none" w="med" len="med"/>
+                      <a:tailEnd type="none" w="med" len="med"/>
+                    </a:lnT>
+                  </a:tcPr>
+                </a:tc>
+              </a:tr>
+              <a:tr h="0">
+                <a:tc>
+                  <a:txBody>
+                    <a:bodyPr/>
+                    <a:lstStyle/>
+                    <a:p>
+                      <a:r>
+                        <a:rPr lang="en-AU" sz="1100" dirty="0" err="1" smtClean="0"/>
+                        <a:t>remove_asset</a:t>
+                      </a:r>
+                      <a:r>
+                        <a:rPr lang="en-AU" sz="1100" dirty="0" smtClean="0"/>
+                        <a:t>()</a:t>
+                      </a:r>
+                      <a:endParaRPr lang="en-AU" sz="1100" dirty="0"/>
+                    </a:p>
+                  </a:txBody>
+                  <a:tcPr>
+                    <a:lnL w="12700" cap="flat" cmpd="sng" algn="ctr">
+                      <a:solidFill>
+                        <a:schemeClr val="tx1"/>
+                      </a:solidFill>
+                      <a:prstDash val="solid"/>
+                      <a:round/>
+                      <a:headEnd type="none" w="med" len="med"/>
+                      <a:tailEnd type="none" w="med" len="med"/>
+                    </a:lnL>
+                    <a:lnR w="12700" cap="flat" cmpd="sng" algn="ctr">
+                      <a:solidFill>
+                        <a:schemeClr val="tx1"/>
+                      </a:solidFill>
+                      <a:prstDash val="solid"/>
+                      <a:round/>
+                      <a:headEnd type="none" w="med" len="med"/>
+                      <a:tailEnd type="none" w="med" len="med"/>
+                    </a:lnR>
+                  </a:tcPr>
+                </a:tc>
+              </a:tr>
+              <a:tr h="0">
+                <a:tc>
+                  <a:txBody>
+                    <a:bodyPr/>
+                    <a:lstStyle/>
+                    <a:p>
+                      <a:r>
+                        <a:rPr lang="en-AU" sz="1100" dirty="0" err="1" smtClean="0"/>
+                        <a:t>asset_exists</a:t>
+                      </a:r>
+                      <a:r>
+                        <a:rPr lang="en-AU" sz="1100" dirty="0" smtClean="0"/>
+                        <a:t>()</a:t>
+                      </a:r>
+                      <a:endParaRPr lang="en-AU" sz="1100" dirty="0"/>
+                    </a:p>
+                  </a:txBody>
+                  <a:tcPr>
+                    <a:lnL w="12700" cap="flat" cmpd="sng" algn="ctr">
+                      <a:solidFill>
+                        <a:schemeClr val="tx1"/>
+                      </a:solidFill>
+                      <a:prstDash val="solid"/>
+                      <a:round/>
+                      <a:headEnd type="none" w="med" len="med"/>
+                      <a:tailEnd type="none" w="med" len="med"/>
+                    </a:lnL>
+                    <a:lnR w="12700" cap="flat" cmpd="sng" algn="ctr">
+                      <a:solidFill>
+                        <a:schemeClr val="tx1"/>
+                      </a:solidFill>
+                      <a:prstDash val="solid"/>
+                      <a:round/>
+                      <a:headEnd type="none" w="med" len="med"/>
+                      <a:tailEnd type="none" w="med" len="med"/>
+                    </a:lnR>
+                  </a:tcPr>
+                </a:tc>
+              </a:tr>
+              <a:tr h="0">
+                <a:tc>
+                  <a:txBody>
+                    <a:bodyPr/>
+                    <a:lstStyle/>
+                    <a:p>
+                      <a:r>
+                        <a:rPr lang="en-AU" sz="1100" dirty="0" err="1" smtClean="0"/>
+                        <a:t>get_all_assets</a:t>
+                      </a:r>
+                      <a:r>
+                        <a:rPr lang="en-AU" sz="1100" dirty="0" smtClean="0"/>
+                        <a:t>()</a:t>
+                      </a:r>
+                      <a:endParaRPr lang="en-AU" sz="1100" dirty="0"/>
+                    </a:p>
+                  </a:txBody>
+                  <a:tcPr>
+                    <a:lnL w="12700" cap="flat" cmpd="sng" algn="ctr">
+                      <a:solidFill>
+                        <a:schemeClr val="tx1"/>
+                      </a:solidFill>
+                      <a:prstDash val="solid"/>
+                      <a:round/>
+                      <a:headEnd type="none" w="med" len="med"/>
+                      <a:tailEnd type="none" w="med" len="med"/>
+                    </a:lnL>
+                    <a:lnR w="12700" cap="flat" cmpd="sng" algn="ctr">
+                      <a:solidFill>
+                        <a:schemeClr val="tx1"/>
+                      </a:solidFill>
+                      <a:prstDash val="solid"/>
+                      <a:round/>
+                      <a:headEnd type="none" w="med" len="med"/>
+                      <a:tailEnd type="none" w="med" len="med"/>
+                    </a:lnR>
+                    <a:lnB w="12700" cap="flat" cmpd="sng" algn="ctr">
+                      <a:solidFill>
+                        <a:schemeClr val="tx1"/>
+                      </a:solidFill>
+                      <a:prstDash val="solid"/>
+                      <a:round/>
+                      <a:headEnd type="none" w="med" len="med"/>
+                      <a:tailEnd type="none" w="med" len="med"/>
+                    </a:lnB>
+                  </a:tcPr>
+                </a:tc>
+              </a:tr>
+            </a:tbl>
+          </a:graphicData>
+        </a:graphic>
+      </p:graphicFrame>
+      <p:graphicFrame>
+        <p:nvGraphicFramePr>
+          <p:cNvPr id="10" name="Table 9"/>
+          <p:cNvGraphicFramePr>
+            <a:graphicFrameLocks noGrp="1"/>
+          </p:cNvGraphicFramePr>
+          <p:nvPr>
+            <p:extLst>
+              <p:ext uri="{D42A27DB-BD31-4B8C-83A1-F6EECF244321}">
+                <p14:modId xmlns:p14="http://schemas.microsoft.com/office/powerpoint/2010/main" val="1345142785"/>
+              </p:ext>
+            </p:extLst>
+          </p:nvPr>
+        </p:nvGraphicFramePr>
+        <p:xfrm>
+          <a:off x="4583705" y="1686197"/>
+          <a:ext cx="1802165" cy="2849880"/>
+        </p:xfrm>
+        <a:graphic>
+          <a:graphicData uri="http://schemas.openxmlformats.org/drawingml/2006/table">
+            <a:tbl>
+              <a:tblPr firstRow="1" bandRow="1">
+                <a:tableStyleId>{5C22544A-7EE6-4342-B048-85BDC9FD1C3A}</a:tableStyleId>
+              </a:tblPr>
+              <a:tblGrid>
+                <a:gridCol w="1802165"/>
+              </a:tblGrid>
+              <a:tr h="0">
+                <a:tc>
+                  <a:txBody>
+                    <a:bodyPr/>
+                    <a:lstStyle/>
+                    <a:p>
+                      <a:pPr algn="ctr"/>
+                      <a:r>
+                        <a:rPr lang="en-AU" sz="1100" dirty="0" smtClean="0"/>
+                        <a:t>Rule</a:t>
+                      </a:r>
+                      <a:endParaRPr lang="en-AU" sz="1100" dirty="0"/>
+                    </a:p>
+                  </a:txBody>
+                  <a:tcPr>
+                    <a:lnL w="12700" cap="flat" cmpd="sng" algn="ctr">
+                      <a:solidFill>
+                        <a:schemeClr val="tx1"/>
+                      </a:solidFill>
+                      <a:prstDash val="solid"/>
+                      <a:round/>
+                      <a:headEnd type="none" w="med" len="med"/>
+                      <a:tailEnd type="none" w="med" len="med"/>
+                    </a:lnL>
+                    <a:lnR w="12700" cap="flat" cmpd="sng" algn="ctr">
+                      <a:solidFill>
+                        <a:schemeClr val="tx1"/>
+                      </a:solidFill>
+                      <a:prstDash val="solid"/>
+                      <a:round/>
+                      <a:headEnd type="none" w="med" len="med"/>
+                      <a:tailEnd type="none" w="med" len="med"/>
+                    </a:lnR>
+                    <a:lnT w="12700" cap="flat" cmpd="sng" algn="ctr">
+                      <a:solidFill>
+                        <a:schemeClr val="tx1"/>
+                      </a:solidFill>
+                      <a:prstDash val="solid"/>
+                      <a:round/>
+                      <a:headEnd type="none" w="med" len="med"/>
+                      <a:tailEnd type="none" w="med" len="med"/>
+                    </a:lnT>
+                    <a:lnB w="12700" cap="flat" cmpd="sng" algn="ctr">
+                      <a:solidFill>
+                        <a:schemeClr val="tx1"/>
+                      </a:solidFill>
+                      <a:prstDash val="solid"/>
+                      <a:round/>
+                      <a:headEnd type="none" w="med" len="med"/>
+                      <a:tailEnd type="none" w="med" len="med"/>
+                    </a:lnB>
+                  </a:tcPr>
+                </a:tc>
+              </a:tr>
+              <a:tr h="0">
+                <a:tc>
+                  <a:txBody>
+                    <a:bodyPr/>
+                    <a:lstStyle/>
+                    <a:p>
+                      <a:r>
+                        <a:rPr lang="en-AU" sz="1100" dirty="0" smtClean="0"/>
+                        <a:t>URI: string (</a:t>
+                      </a:r>
+                      <a:r>
+                        <a:rPr lang="en-AU" sz="1100" dirty="0" err="1" smtClean="0"/>
+                        <a:t>uri</a:t>
+                      </a:r>
+                      <a:r>
+                        <a:rPr lang="en-AU" sz="1100" dirty="0" smtClean="0"/>
+                        <a:t>)</a:t>
+                      </a:r>
+                      <a:endParaRPr lang="en-AU" sz="1100" dirty="0"/>
+                    </a:p>
+                  </a:txBody>
+                  <a:tcPr>
+                    <a:lnL w="12700" cap="flat" cmpd="sng" algn="ctr">
+                      <a:solidFill>
+                        <a:schemeClr val="tx1"/>
+                      </a:solidFill>
+                      <a:prstDash val="solid"/>
+                      <a:round/>
+                      <a:headEnd type="none" w="med" len="med"/>
+                      <a:tailEnd type="none" w="med" len="med"/>
+                    </a:lnL>
+                    <a:lnR w="12700" cap="flat" cmpd="sng" algn="ctr">
+                      <a:solidFill>
+                        <a:schemeClr val="tx1"/>
+                      </a:solidFill>
+                      <a:prstDash val="solid"/>
+                      <a:round/>
+                      <a:headEnd type="none" w="med" len="med"/>
+                      <a:tailEnd type="none" w="med" len="med"/>
+                    </a:lnR>
+                    <a:lnT w="12700" cap="flat" cmpd="sng" algn="ctr">
+                      <a:solidFill>
+                        <a:schemeClr val="tx1"/>
+                      </a:solidFill>
+                      <a:prstDash val="solid"/>
+                      <a:round/>
+                      <a:headEnd type="none" w="med" len="med"/>
+                      <a:tailEnd type="none" w="med" len="med"/>
+                    </a:lnT>
+                    <a:lnB w="12700" cap="flat" cmpd="sng" algn="ctr">
+                      <a:noFill/>
+                      <a:prstDash val="solid"/>
+                      <a:round/>
+                      <a:headEnd type="none" w="med" len="med"/>
+                      <a:tailEnd type="none" w="med" len="med"/>
+                    </a:lnB>
+                    <a:lnTlToBr w="12700" cmpd="sng">
+                      <a:noFill/>
+                      <a:prstDash val="solid"/>
+                    </a:lnTlToBr>
+                    <a:lnBlToTr w="12700" cmpd="sng">
+                      <a:noFill/>
+                      <a:prstDash val="solid"/>
+                    </a:lnBlToTr>
+                  </a:tcPr>
+                </a:tc>
+              </a:tr>
+              <a:tr h="0">
+                <a:tc>
+                  <a:txBody>
+                    <a:bodyPr/>
+                    <a:lstStyle/>
+                    <a:p>
+                      <a:r>
+                        <a:rPr lang="en-AU" sz="1100" dirty="0" smtClean="0"/>
+                        <a:t>Type: string (</a:t>
+                      </a:r>
+                      <a:r>
+                        <a:rPr lang="en-AU" sz="1100" dirty="0" err="1" smtClean="0"/>
+                        <a:t>uri</a:t>
+                      </a:r>
+                      <a:r>
+                        <a:rPr lang="en-AU" sz="1100" dirty="0" smtClean="0"/>
+                        <a:t>)</a:t>
+                      </a:r>
+                      <a:endParaRPr lang="en-AU" sz="1100" dirty="0"/>
+                    </a:p>
+                  </a:txBody>
+                  <a:tcPr>
+                    <a:lnL w="12700" cap="flat" cmpd="sng" algn="ctr">
+                      <a:solidFill>
+                        <a:schemeClr val="tx1"/>
+                      </a:solidFill>
+                      <a:prstDash val="solid"/>
+                      <a:round/>
+                      <a:headEnd type="none" w="med" len="med"/>
+                      <a:tailEnd type="none" w="med" len="med"/>
+                    </a:lnL>
+                    <a:lnR w="12700" cap="flat" cmpd="sng" algn="ctr">
+                      <a:solidFill>
+                        <a:schemeClr val="tx1"/>
+                      </a:solidFill>
+                      <a:prstDash val="solid"/>
+                      <a:round/>
+                      <a:headEnd type="none" w="med" len="med"/>
+                      <a:tailEnd type="none" w="med" len="med"/>
+                    </a:lnR>
+                    <a:lnT w="12700" cap="flat" cmpd="sng" algn="ctr">
+                      <a:noFill/>
+                      <a:prstDash val="solid"/>
+                      <a:round/>
+                      <a:headEnd type="none" w="med" len="med"/>
+                      <a:tailEnd type="none" w="med" len="med"/>
+                    </a:lnT>
+                    <a:lnB w="12700" cap="flat" cmpd="sng" algn="ctr">
+                      <a:solidFill>
+                        <a:schemeClr val="tx1"/>
+                      </a:solidFill>
+                      <a:prstDash val="solid"/>
+                      <a:round/>
+                      <a:headEnd type="none" w="med" len="med"/>
+                      <a:tailEnd type="none" w="med" len="med"/>
+                    </a:lnB>
+                    <a:lnTlToBr w="12700" cmpd="sng">
+                      <a:noFill/>
+                      <a:prstDash val="solid"/>
+                    </a:lnTlToBr>
+                    <a:lnBlToTr w="12700" cmpd="sng">
+                      <a:noFill/>
+                      <a:prstDash val="solid"/>
+                    </a:lnBlToTr>
+                  </a:tcPr>
+                </a:tc>
+              </a:tr>
+              <a:tr h="0">
+                <a:tc>
+                  <a:txBody>
+                    <a:bodyPr/>
+                    <a:lstStyle/>
+                    <a:p>
+                      <a:r>
+                        <a:rPr lang="en-AU" sz="1100" dirty="0" err="1" smtClean="0"/>
+                        <a:t>create_rule</a:t>
+                      </a:r>
+                      <a:r>
+                        <a:rPr lang="en-AU" sz="1100" dirty="0" smtClean="0"/>
+                        <a:t>()</a:t>
+                      </a:r>
+                      <a:endParaRPr lang="en-AU" sz="1100" dirty="0"/>
+                    </a:p>
+                  </a:txBody>
+                  <a:tcPr>
+                    <a:lnL w="12700" cap="flat" cmpd="sng" algn="ctr">
+                      <a:solidFill>
+                        <a:schemeClr val="tx1"/>
+                      </a:solidFill>
+                      <a:prstDash val="solid"/>
+                      <a:round/>
+                      <a:headEnd type="none" w="med" len="med"/>
+                      <a:tailEnd type="none" w="med" len="med"/>
+                    </a:lnL>
+                    <a:lnR w="12700" cap="flat" cmpd="sng" algn="ctr">
+                      <a:solidFill>
+                        <a:schemeClr val="tx1"/>
+                      </a:solidFill>
+                      <a:prstDash val="solid"/>
+                      <a:round/>
+                      <a:headEnd type="none" w="med" len="med"/>
+                      <a:tailEnd type="none" w="med" len="med"/>
+                    </a:lnR>
+                    <a:lnT w="12700" cap="flat" cmpd="sng" algn="ctr">
+                      <a:solidFill>
+                        <a:schemeClr val="tx1"/>
+                      </a:solidFill>
+                      <a:prstDash val="solid"/>
+                      <a:round/>
+                      <a:headEnd type="none" w="med" len="med"/>
+                      <a:tailEnd type="none" w="med" len="med"/>
+                    </a:lnT>
+                  </a:tcPr>
+                </a:tc>
+              </a:tr>
+              <a:tr h="0">
+                <a:tc>
+                  <a:txBody>
+                    <a:bodyPr/>
+                    <a:lstStyle/>
+                    <a:p>
+                      <a:r>
+                        <a:rPr lang="en-AU" sz="1100" dirty="0" err="1" smtClean="0"/>
+                        <a:t>delete_rule</a:t>
+                      </a:r>
+                      <a:r>
+                        <a:rPr lang="en-AU" sz="1100" dirty="0" smtClean="0"/>
+                        <a:t>()</a:t>
+                      </a:r>
+                      <a:endParaRPr lang="en-AU" sz="1100" dirty="0"/>
+                    </a:p>
+                  </a:txBody>
+                  <a:tcPr>
+                    <a:lnL w="12700" cap="flat" cmpd="sng" algn="ctr">
+                      <a:solidFill>
+                        <a:schemeClr val="tx1"/>
+                      </a:solidFill>
+                      <a:prstDash val="solid"/>
+                      <a:round/>
+                      <a:headEnd type="none" w="med" len="med"/>
+                      <a:tailEnd type="none" w="med" len="med"/>
+                    </a:lnL>
+                    <a:lnR w="12700" cap="flat" cmpd="sng" algn="ctr">
+                      <a:solidFill>
+                        <a:schemeClr val="tx1"/>
+                      </a:solidFill>
+                      <a:prstDash val="solid"/>
+                      <a:round/>
+                      <a:headEnd type="none" w="med" len="med"/>
+                      <a:tailEnd type="none" w="med" len="med"/>
+                    </a:lnR>
+                  </a:tcPr>
+                </a:tc>
+              </a:tr>
+              <a:tr h="0">
+                <a:tc>
+                  <a:txBody>
+                    <a:bodyPr/>
+                    <a:lstStyle/>
+                    <a:p>
+                      <a:r>
+                        <a:rPr lang="en-AU" sz="1100" dirty="0" err="1" smtClean="0"/>
+                        <a:t>add_rule_to_policy</a:t>
+                      </a:r>
+                      <a:r>
+                        <a:rPr lang="en-AU" sz="1100" dirty="0" smtClean="0"/>
+                        <a:t>()</a:t>
+                      </a:r>
+                      <a:endParaRPr lang="en-AU" sz="1100" dirty="0"/>
+                    </a:p>
+                  </a:txBody>
+                  <a:tcPr>
+                    <a:lnL w="12700" cap="flat" cmpd="sng" algn="ctr">
+                      <a:solidFill>
+                        <a:schemeClr val="tx1"/>
+                      </a:solidFill>
+                      <a:prstDash val="solid"/>
+                      <a:round/>
+                      <a:headEnd type="none" w="med" len="med"/>
+                      <a:tailEnd type="none" w="med" len="med"/>
+                    </a:lnL>
+                    <a:lnR w="12700" cap="flat" cmpd="sng" algn="ctr">
+                      <a:solidFill>
+                        <a:schemeClr val="tx1"/>
+                      </a:solidFill>
+                      <a:prstDash val="solid"/>
+                      <a:round/>
+                      <a:headEnd type="none" w="med" len="med"/>
+                      <a:tailEnd type="none" w="med" len="med"/>
+                    </a:lnR>
+                  </a:tcPr>
+                </a:tc>
+              </a:tr>
+              <a:tr h="0">
+                <a:tc>
+                  <a:txBody>
+                    <a:bodyPr/>
+                    <a:lstStyle/>
+                    <a:p>
+                      <a:r>
+                        <a:rPr lang="en-AU" sz="1100" dirty="0" err="1" smtClean="0"/>
+                        <a:t>remove_rule_from_policy</a:t>
+                      </a:r>
+                      <a:r>
+                        <a:rPr lang="en-AU" sz="1100" dirty="0" smtClean="0"/>
+                        <a:t>()</a:t>
+                      </a:r>
+                      <a:endParaRPr lang="en-AU" sz="1100" dirty="0"/>
+                    </a:p>
+                  </a:txBody>
+                  <a:tcPr>
+                    <a:lnL w="12700" cap="flat" cmpd="sng" algn="ctr">
+                      <a:solidFill>
+                        <a:schemeClr val="tx1"/>
+                      </a:solidFill>
+                      <a:prstDash val="solid"/>
+                      <a:round/>
+                      <a:headEnd type="none" w="med" len="med"/>
+                      <a:tailEnd type="none" w="med" len="med"/>
+                    </a:lnL>
+                    <a:lnR w="12700" cap="flat" cmpd="sng" algn="ctr">
+                      <a:solidFill>
+                        <a:schemeClr val="tx1"/>
+                      </a:solidFill>
+                      <a:prstDash val="solid"/>
+                      <a:round/>
+                      <a:headEnd type="none" w="med" len="med"/>
+                      <a:tailEnd type="none" w="med" len="med"/>
+                    </a:lnR>
+                  </a:tcPr>
+                </a:tc>
+              </a:tr>
+              <a:tr h="0">
+                <a:tc>
+                  <a:txBody>
+                    <a:bodyPr/>
+                    <a:lstStyle/>
+                    <a:p>
+                      <a:r>
+                        <a:rPr lang="en-AU" sz="1100" dirty="0" err="1" smtClean="0"/>
+                        <a:t>get_rules_for_policy</a:t>
+                      </a:r>
+                      <a:r>
+                        <a:rPr lang="en-AU" sz="1100" dirty="0" smtClean="0"/>
+                        <a:t>()</a:t>
+                      </a:r>
+                      <a:endParaRPr lang="en-AU" sz="1100" dirty="0"/>
+                    </a:p>
+                  </a:txBody>
+                  <a:tcPr>
+                    <a:lnL w="12700" cap="flat" cmpd="sng" algn="ctr">
+                      <a:solidFill>
+                        <a:schemeClr val="tx1"/>
+                      </a:solidFill>
+                      <a:prstDash val="solid"/>
+                      <a:round/>
+                      <a:headEnd type="none" w="med" len="med"/>
+                      <a:tailEnd type="none" w="med" len="med"/>
+                    </a:lnL>
+                    <a:lnR w="12700" cap="flat" cmpd="sng" algn="ctr">
+                      <a:solidFill>
+                        <a:schemeClr val="tx1"/>
+                      </a:solidFill>
+                      <a:prstDash val="solid"/>
+                      <a:round/>
+                      <a:headEnd type="none" w="med" len="med"/>
+                      <a:tailEnd type="none" w="med" len="med"/>
+                    </a:lnR>
+                  </a:tcPr>
+                </a:tc>
+              </a:tr>
+              <a:tr h="0">
+                <a:tc>
+                  <a:txBody>
+                    <a:bodyPr/>
+                    <a:lstStyle/>
+                    <a:p>
+                      <a:r>
+                        <a:rPr lang="en-AU" sz="1100" dirty="0" err="1" smtClean="0"/>
+                        <a:t>get_all_rules</a:t>
+                      </a:r>
+                      <a:r>
+                        <a:rPr lang="en-AU" sz="1100" dirty="0" smtClean="0"/>
+                        <a:t>()</a:t>
+                      </a:r>
+                      <a:endParaRPr lang="en-AU" sz="1100" dirty="0"/>
+                    </a:p>
+                  </a:txBody>
+                  <a:tcPr>
+                    <a:lnL w="12700" cap="flat" cmpd="sng" algn="ctr">
+                      <a:solidFill>
+                        <a:schemeClr val="tx1"/>
+                      </a:solidFill>
+                      <a:prstDash val="solid"/>
+                      <a:round/>
+                      <a:headEnd type="none" w="med" len="med"/>
+                      <a:tailEnd type="none" w="med" len="med"/>
+                    </a:lnL>
+                    <a:lnR w="12700" cap="flat" cmpd="sng" algn="ctr">
+                      <a:solidFill>
+                        <a:schemeClr val="tx1"/>
+                      </a:solidFill>
+                      <a:prstDash val="solid"/>
+                      <a:round/>
+                      <a:headEnd type="none" w="med" len="med"/>
+                      <a:tailEnd type="none" w="med" len="med"/>
+                    </a:lnR>
+                  </a:tcPr>
+                </a:tc>
+              </a:tr>
+              <a:tr h="0">
+                <a:tc>
+                  <a:txBody>
+                    <a:bodyPr/>
+                    <a:lstStyle/>
+                    <a:p>
+                      <a:r>
+                        <a:rPr lang="en-AU" sz="1100" dirty="0" err="1" smtClean="0"/>
+                        <a:t>rule_exists</a:t>
+                      </a:r>
+                      <a:r>
+                        <a:rPr lang="en-AU" sz="1100" dirty="0" smtClean="0"/>
+                        <a:t>()</a:t>
+                      </a:r>
+                      <a:endParaRPr lang="en-AU" sz="1100" dirty="0"/>
+                    </a:p>
+                  </a:txBody>
+                  <a:tcPr>
+                    <a:lnL w="12700" cap="flat" cmpd="sng" algn="ctr">
+                      <a:solidFill>
+                        <a:schemeClr val="tx1"/>
+                      </a:solidFill>
+                      <a:prstDash val="solid"/>
+                      <a:round/>
+                      <a:headEnd type="none" w="med" len="med"/>
+                      <a:tailEnd type="none" w="med" len="med"/>
+                    </a:lnL>
+                    <a:lnR w="12700" cap="flat" cmpd="sng" algn="ctr">
+                      <a:solidFill>
+                        <a:schemeClr val="tx1"/>
+                      </a:solidFill>
+                      <a:prstDash val="solid"/>
+                      <a:round/>
+                      <a:headEnd type="none" w="med" len="med"/>
+                      <a:tailEnd type="none" w="med" len="med"/>
+                    </a:lnR>
+                  </a:tcPr>
+                </a:tc>
+              </a:tr>
+              <a:tr h="0">
+                <a:tc>
+                  <a:txBody>
+                    <a:bodyPr/>
+                    <a:lstStyle/>
+                    <a:p>
+                      <a:r>
+                        <a:rPr lang="en-AU" sz="1100" dirty="0" err="1" smtClean="0"/>
+                        <a:t>get_permitted_rule_types</a:t>
+                      </a:r>
+                      <a:r>
+                        <a:rPr lang="en-AU" sz="1100" dirty="0" smtClean="0"/>
+                        <a:t>()</a:t>
+                      </a:r>
+                      <a:endParaRPr lang="en-AU" sz="1100" dirty="0"/>
+                    </a:p>
+                  </a:txBody>
+                  <a:tcPr>
+                    <a:lnL w="12700" cap="flat" cmpd="sng" algn="ctr">
+                      <a:solidFill>
+                        <a:schemeClr val="tx1"/>
+                      </a:solidFill>
+                      <a:prstDash val="solid"/>
+                      <a:round/>
+                      <a:headEnd type="none" w="med" len="med"/>
+                      <a:tailEnd type="none" w="med" len="med"/>
+                    </a:lnL>
+                    <a:lnR w="12700" cap="flat" cmpd="sng" algn="ctr">
+                      <a:solidFill>
+                        <a:schemeClr val="tx1"/>
+                      </a:solidFill>
+                      <a:prstDash val="solid"/>
+                      <a:round/>
+                      <a:headEnd type="none" w="med" len="med"/>
+                      <a:tailEnd type="none" w="med" len="med"/>
+                    </a:lnR>
+                    <a:lnB w="12700" cap="flat" cmpd="sng" algn="ctr">
+                      <a:solidFill>
+                        <a:schemeClr val="tx1"/>
+                      </a:solidFill>
+                      <a:prstDash val="solid"/>
+                      <a:round/>
+                      <a:headEnd type="none" w="med" len="med"/>
+                      <a:tailEnd type="none" w="med" len="med"/>
+                    </a:lnB>
+                  </a:tcPr>
+                </a:tc>
+              </a:tr>
+            </a:tbl>
+          </a:graphicData>
+        </a:graphic>
+      </p:graphicFrame>
+      <p:graphicFrame>
+        <p:nvGraphicFramePr>
+          <p:cNvPr id="11" name="Table 10"/>
+          <p:cNvGraphicFramePr>
+            <a:graphicFrameLocks noGrp="1"/>
+          </p:cNvGraphicFramePr>
+          <p:nvPr>
+            <p:extLst>
+              <p:ext uri="{D42A27DB-BD31-4B8C-83A1-F6EECF244321}">
+                <p14:modId xmlns:p14="http://schemas.microsoft.com/office/powerpoint/2010/main" val="3273842253"/>
+              </p:ext>
+            </p:extLst>
+          </p:nvPr>
+        </p:nvGraphicFramePr>
+        <p:xfrm>
+          <a:off x="7454558" y="3290207"/>
+          <a:ext cx="1918682" cy="3108960"/>
+        </p:xfrm>
+        <a:graphic>
+          <a:graphicData uri="http://schemas.openxmlformats.org/drawingml/2006/table">
+            <a:tbl>
+              <a:tblPr firstRow="1" bandRow="1">
+                <a:tableStyleId>{5C22544A-7EE6-4342-B048-85BDC9FD1C3A}</a:tableStyleId>
+              </a:tblPr>
+              <a:tblGrid>
+                <a:gridCol w="1918682"/>
+              </a:tblGrid>
+              <a:tr h="0">
+                <a:tc>
+                  <a:txBody>
+                    <a:bodyPr/>
+                    <a:lstStyle/>
+                    <a:p>
+                      <a:pPr algn="ctr"/>
+                      <a:r>
+                        <a:rPr lang="en-AU" sz="1100" dirty="0" smtClean="0"/>
+                        <a:t>Party</a:t>
+                      </a:r>
+                      <a:endParaRPr lang="en-AU" sz="1100" dirty="0"/>
+                    </a:p>
+                  </a:txBody>
+                  <a:tcPr>
+                    <a:lnL w="12700" cap="flat" cmpd="sng" algn="ctr">
+                      <a:solidFill>
+                        <a:schemeClr val="tx1"/>
+                      </a:solidFill>
+                      <a:prstDash val="solid"/>
+                      <a:round/>
+                      <a:headEnd type="none" w="med" len="med"/>
+                      <a:tailEnd type="none" w="med" len="med"/>
+                    </a:lnL>
+                    <a:lnR w="12700" cap="flat" cmpd="sng" algn="ctr">
+                      <a:solidFill>
+                        <a:schemeClr val="tx1"/>
+                      </a:solidFill>
+                      <a:prstDash val="solid"/>
+                      <a:round/>
+                      <a:headEnd type="none" w="med" len="med"/>
+                      <a:tailEnd type="none" w="med" len="med"/>
+                    </a:lnR>
+                    <a:lnT w="12700" cap="flat" cmpd="sng" algn="ctr">
+                      <a:solidFill>
+                        <a:schemeClr val="tx1"/>
+                      </a:solidFill>
+                      <a:prstDash val="solid"/>
+                      <a:round/>
+                      <a:headEnd type="none" w="med" len="med"/>
+                      <a:tailEnd type="none" w="med" len="med"/>
+                    </a:lnT>
+                    <a:lnB w="12700" cap="flat" cmpd="sng" algn="ctr">
+                      <a:solidFill>
+                        <a:schemeClr val="tx1"/>
+                      </a:solidFill>
+                      <a:prstDash val="solid"/>
+                      <a:round/>
+                      <a:headEnd type="none" w="med" len="med"/>
+                      <a:tailEnd type="none" w="med" len="med"/>
+                    </a:lnB>
+                  </a:tcPr>
+                </a:tc>
+              </a:tr>
+              <a:tr h="0">
+                <a:tc>
+                  <a:txBody>
+                    <a:bodyPr/>
+                    <a:lstStyle/>
+                    <a:p>
+                      <a:r>
+                        <a:rPr lang="en-AU" sz="1100" dirty="0" smtClean="0"/>
+                        <a:t>URI: string (</a:t>
+                      </a:r>
+                      <a:r>
+                        <a:rPr lang="en-AU" sz="1100" dirty="0" err="1" smtClean="0"/>
+                        <a:t>uri</a:t>
+                      </a:r>
+                      <a:r>
+                        <a:rPr lang="en-AU" sz="1100" dirty="0" smtClean="0"/>
+                        <a:t>)</a:t>
+                      </a:r>
+                      <a:endParaRPr lang="en-AU" sz="1100" dirty="0"/>
+                    </a:p>
+                  </a:txBody>
+                  <a:tcPr>
+                    <a:lnL w="12700" cap="flat" cmpd="sng" algn="ctr">
+                      <a:solidFill>
+                        <a:schemeClr val="tx1"/>
+                      </a:solidFill>
+                      <a:prstDash val="solid"/>
+                      <a:round/>
+                      <a:headEnd type="none" w="med" len="med"/>
+                      <a:tailEnd type="none" w="med" len="med"/>
+                    </a:lnL>
+                    <a:lnR w="12700" cap="flat" cmpd="sng" algn="ctr">
+                      <a:solidFill>
+                        <a:schemeClr val="tx1"/>
+                      </a:solidFill>
+                      <a:prstDash val="solid"/>
+                      <a:round/>
+                      <a:headEnd type="none" w="med" len="med"/>
+                      <a:tailEnd type="none" w="med" len="med"/>
+                    </a:lnR>
+                    <a:lnT w="12700" cap="flat" cmpd="sng" algn="ctr">
+                      <a:solidFill>
+                        <a:schemeClr val="tx1"/>
+                      </a:solidFill>
+                      <a:prstDash val="solid"/>
+                      <a:round/>
+                      <a:headEnd type="none" w="med" len="med"/>
+                      <a:tailEnd type="none" w="med" len="med"/>
+                    </a:lnT>
+                    <a:lnB w="12700" cap="flat" cmpd="sng" algn="ctr">
+                      <a:solidFill>
+                        <a:schemeClr val="tx1"/>
+                      </a:solidFill>
+                      <a:prstDash val="solid"/>
+                      <a:round/>
+                      <a:headEnd type="none" w="med" len="med"/>
+                      <a:tailEnd type="none" w="med" len="med"/>
+                    </a:lnB>
+                  </a:tcPr>
+                </a:tc>
+              </a:tr>
+              <a:tr h="0">
+                <a:tc>
+                  <a:txBody>
+                    <a:bodyPr/>
+                    <a:lstStyle/>
+                    <a:p>
+                      <a:r>
+                        <a:rPr lang="en-AU" sz="1100" dirty="0" err="1" smtClean="0"/>
+                        <a:t>create_party</a:t>
+                      </a:r>
+                      <a:r>
+                        <a:rPr lang="en-AU" sz="1100" dirty="0" smtClean="0"/>
+                        <a:t>()</a:t>
+                      </a:r>
+                      <a:endParaRPr lang="en-AU" sz="1100" dirty="0"/>
+                    </a:p>
+                  </a:txBody>
+                  <a:tcPr>
+                    <a:lnL w="12700" cap="flat" cmpd="sng" algn="ctr">
+                      <a:solidFill>
+                        <a:schemeClr val="tx1"/>
+                      </a:solidFill>
+                      <a:prstDash val="solid"/>
+                      <a:round/>
+                      <a:headEnd type="none" w="med" len="med"/>
+                      <a:tailEnd type="none" w="med" len="med"/>
+                    </a:lnL>
+                    <a:lnR w="12700" cap="flat" cmpd="sng" algn="ctr">
+                      <a:solidFill>
+                        <a:schemeClr val="tx1"/>
+                      </a:solidFill>
+                      <a:prstDash val="solid"/>
+                      <a:round/>
+                      <a:headEnd type="none" w="med" len="med"/>
+                      <a:tailEnd type="none" w="med" len="med"/>
+                    </a:lnR>
+                    <a:lnT w="12700" cap="flat" cmpd="sng" algn="ctr">
+                      <a:solidFill>
+                        <a:schemeClr val="tx1"/>
+                      </a:solidFill>
+                      <a:prstDash val="solid"/>
+                      <a:round/>
+                      <a:headEnd type="none" w="med" len="med"/>
+                      <a:tailEnd type="none" w="med" len="med"/>
+                    </a:lnT>
+                  </a:tcPr>
+                </a:tc>
+              </a:tr>
+              <a:tr h="0">
+                <a:tc>
+                  <a:txBody>
+                    <a:bodyPr/>
+                    <a:lstStyle/>
+                    <a:p>
+                      <a:r>
+                        <a:rPr lang="en-AU" sz="1100" dirty="0" err="1" smtClean="0"/>
+                        <a:t>delete_party</a:t>
+                      </a:r>
+                      <a:r>
+                        <a:rPr lang="en-AU" sz="1100" dirty="0" smtClean="0"/>
+                        <a:t>()</a:t>
+                      </a:r>
+                      <a:endParaRPr lang="en-AU" sz="1100" dirty="0"/>
+                    </a:p>
+                  </a:txBody>
+                  <a:tcPr>
+                    <a:lnL w="12700" cap="flat" cmpd="sng" algn="ctr">
+                      <a:solidFill>
+                        <a:schemeClr val="tx1"/>
+                      </a:solidFill>
+                      <a:prstDash val="solid"/>
+                      <a:round/>
+                      <a:headEnd type="none" w="med" len="med"/>
+                      <a:tailEnd type="none" w="med" len="med"/>
+                    </a:lnL>
+                    <a:lnR w="12700" cap="flat" cmpd="sng" algn="ctr">
+                      <a:solidFill>
+                        <a:schemeClr val="tx1"/>
+                      </a:solidFill>
+                      <a:prstDash val="solid"/>
+                      <a:round/>
+                      <a:headEnd type="none" w="med" len="med"/>
+                      <a:tailEnd type="none" w="med" len="med"/>
+                    </a:lnR>
+                  </a:tcPr>
+                </a:tc>
+              </a:tr>
+              <a:tr h="0">
+                <a:tc>
+                  <a:txBody>
+                    <a:bodyPr/>
+                    <a:lstStyle/>
+                    <a:p>
+                      <a:r>
+                        <a:rPr lang="en-AU" sz="1100" dirty="0" err="1" smtClean="0"/>
+                        <a:t>party_exists</a:t>
+                      </a:r>
+                      <a:r>
+                        <a:rPr lang="en-AU" sz="1100" dirty="0" smtClean="0"/>
+                        <a:t>()</a:t>
+                      </a:r>
+                      <a:endParaRPr lang="en-AU" sz="1100" dirty="0"/>
+                    </a:p>
+                  </a:txBody>
+                  <a:tcPr>
+                    <a:lnL w="12700" cap="flat" cmpd="sng" algn="ctr">
+                      <a:solidFill>
+                        <a:schemeClr val="tx1"/>
+                      </a:solidFill>
+                      <a:prstDash val="solid"/>
+                      <a:round/>
+                      <a:headEnd type="none" w="med" len="med"/>
+                      <a:tailEnd type="none" w="med" len="med"/>
+                    </a:lnL>
+                    <a:lnR w="12700" cap="flat" cmpd="sng" algn="ctr">
+                      <a:solidFill>
+                        <a:schemeClr val="tx1"/>
+                      </a:solidFill>
+                      <a:prstDash val="solid"/>
+                      <a:round/>
+                      <a:headEnd type="none" w="med" len="med"/>
+                      <a:tailEnd type="none" w="med" len="med"/>
+                    </a:lnR>
+                  </a:tcPr>
+                </a:tc>
+              </a:tr>
+              <a:tr h="0">
+                <a:tc>
+                  <a:txBody>
+                    <a:bodyPr/>
+                    <a:lstStyle/>
+                    <a:p>
+                      <a:r>
+                        <a:rPr lang="en-AU" sz="1100" dirty="0" err="1" smtClean="0"/>
+                        <a:t>get_all_parties</a:t>
+                      </a:r>
+                      <a:r>
+                        <a:rPr lang="en-AU" sz="1100" dirty="0" smtClean="0"/>
+                        <a:t>()</a:t>
+                      </a:r>
+                      <a:endParaRPr lang="en-AU" sz="1100" dirty="0"/>
+                    </a:p>
+                  </a:txBody>
+                  <a:tcPr>
+                    <a:lnL w="12700" cap="flat" cmpd="sng" algn="ctr">
+                      <a:solidFill>
+                        <a:schemeClr val="tx1"/>
+                      </a:solidFill>
+                      <a:prstDash val="solid"/>
+                      <a:round/>
+                      <a:headEnd type="none" w="med" len="med"/>
+                      <a:tailEnd type="none" w="med" len="med"/>
+                    </a:lnL>
+                    <a:lnR w="12700" cap="flat" cmpd="sng" algn="ctr">
+                      <a:solidFill>
+                        <a:schemeClr val="tx1"/>
+                      </a:solidFill>
+                      <a:prstDash val="solid"/>
+                      <a:round/>
+                      <a:headEnd type="none" w="med" len="med"/>
+                      <a:tailEnd type="none" w="med" len="med"/>
+                    </a:lnR>
+                  </a:tcPr>
+                </a:tc>
+              </a:tr>
+              <a:tr h="0">
+                <a:tc>
+                  <a:txBody>
+                    <a:bodyPr/>
+                    <a:lstStyle/>
+                    <a:p>
+                      <a:r>
+                        <a:rPr lang="en-AU" sz="1100" dirty="0" err="1" smtClean="0"/>
+                        <a:t>add_assignor_to_rule</a:t>
+                      </a:r>
+                      <a:r>
+                        <a:rPr lang="en-AU" sz="1100" dirty="0" smtClean="0"/>
+                        <a:t>()</a:t>
+                      </a:r>
+                      <a:endParaRPr lang="en-AU" sz="1100" dirty="0"/>
+                    </a:p>
+                  </a:txBody>
+                  <a:tcPr>
+                    <a:lnL w="12700" cap="flat" cmpd="sng" algn="ctr">
+                      <a:solidFill>
+                        <a:schemeClr val="tx1"/>
+                      </a:solidFill>
+                      <a:prstDash val="solid"/>
+                      <a:round/>
+                      <a:headEnd type="none" w="med" len="med"/>
+                      <a:tailEnd type="none" w="med" len="med"/>
+                    </a:lnL>
+                    <a:lnR w="12700" cap="flat" cmpd="sng" algn="ctr">
+                      <a:solidFill>
+                        <a:schemeClr val="tx1"/>
+                      </a:solidFill>
+                      <a:prstDash val="solid"/>
+                      <a:round/>
+                      <a:headEnd type="none" w="med" len="med"/>
+                      <a:tailEnd type="none" w="med" len="med"/>
+                    </a:lnR>
+                  </a:tcPr>
+                </a:tc>
+              </a:tr>
+              <a:tr h="0">
+                <a:tc>
+                  <a:txBody>
+                    <a:bodyPr/>
+                    <a:lstStyle/>
+                    <a:p>
+                      <a:r>
+                        <a:rPr lang="en-AU" sz="1100" dirty="0" err="1" smtClean="0"/>
+                        <a:t>remove_assignor_from_rule</a:t>
+                      </a:r>
+                      <a:r>
+                        <a:rPr lang="en-AU" sz="1100" dirty="0" smtClean="0"/>
+                        <a:t>()</a:t>
+                      </a:r>
+                      <a:endParaRPr lang="en-AU" sz="1100" dirty="0"/>
+                    </a:p>
+                  </a:txBody>
+                  <a:tcPr>
+                    <a:lnL w="12700" cap="flat" cmpd="sng" algn="ctr">
+                      <a:solidFill>
+                        <a:schemeClr val="tx1"/>
+                      </a:solidFill>
+                      <a:prstDash val="solid"/>
+                      <a:round/>
+                      <a:headEnd type="none" w="med" len="med"/>
+                      <a:tailEnd type="none" w="med" len="med"/>
+                    </a:lnL>
+                    <a:lnR w="12700" cap="flat" cmpd="sng" algn="ctr">
+                      <a:solidFill>
+                        <a:schemeClr val="tx1"/>
+                      </a:solidFill>
+                      <a:prstDash val="solid"/>
+                      <a:round/>
+                      <a:headEnd type="none" w="med" len="med"/>
+                      <a:tailEnd type="none" w="med" len="med"/>
+                    </a:lnR>
+                  </a:tcPr>
+                </a:tc>
+              </a:tr>
+              <a:tr h="0">
+                <a:tc>
+                  <a:txBody>
+                    <a:bodyPr/>
+                    <a:lstStyle/>
+                    <a:p>
+                      <a:r>
+                        <a:rPr lang="en-AU" sz="1100" dirty="0" err="1" smtClean="0"/>
+                        <a:t>get_assignors_for_rule</a:t>
+                      </a:r>
+                      <a:r>
+                        <a:rPr lang="en-AU" sz="1100" dirty="0" smtClean="0"/>
+                        <a:t>()</a:t>
+                      </a:r>
+                      <a:endParaRPr lang="en-AU" sz="1100" dirty="0"/>
+                    </a:p>
+                  </a:txBody>
+                  <a:tcPr>
+                    <a:lnL w="12700" cap="flat" cmpd="sng" algn="ctr">
+                      <a:solidFill>
+                        <a:schemeClr val="tx1"/>
+                      </a:solidFill>
+                      <a:prstDash val="solid"/>
+                      <a:round/>
+                      <a:headEnd type="none" w="med" len="med"/>
+                      <a:tailEnd type="none" w="med" len="med"/>
+                    </a:lnL>
+                    <a:lnR w="12700" cap="flat" cmpd="sng" algn="ctr">
+                      <a:solidFill>
+                        <a:schemeClr val="tx1"/>
+                      </a:solidFill>
+                      <a:prstDash val="solid"/>
+                      <a:round/>
+                      <a:headEnd type="none" w="med" len="med"/>
+                      <a:tailEnd type="none" w="med" len="med"/>
+                    </a:lnR>
+                  </a:tcPr>
+                </a:tc>
+              </a:tr>
+              <a:tr h="0">
+                <a:tc>
+                  <a:txBody>
+                    <a:bodyPr/>
+                    <a:lstStyle/>
+                    <a:p>
+                      <a:r>
+                        <a:rPr lang="en-AU" sz="1100" dirty="0" err="1" smtClean="0"/>
+                        <a:t>add_assignee_to_rule</a:t>
+                      </a:r>
+                      <a:r>
+                        <a:rPr lang="en-AU" sz="1100" dirty="0" smtClean="0"/>
+                        <a:t>()</a:t>
+                      </a:r>
+                      <a:endParaRPr lang="en-AU" sz="1100" dirty="0"/>
+                    </a:p>
+                  </a:txBody>
+                  <a:tcPr>
+                    <a:lnL w="12700" cap="flat" cmpd="sng" algn="ctr">
+                      <a:solidFill>
+                        <a:schemeClr val="tx1"/>
+                      </a:solidFill>
+                      <a:prstDash val="solid"/>
+                      <a:round/>
+                      <a:headEnd type="none" w="med" len="med"/>
+                      <a:tailEnd type="none" w="med" len="med"/>
+                    </a:lnL>
+                    <a:lnR w="12700" cap="flat" cmpd="sng" algn="ctr">
+                      <a:solidFill>
+                        <a:schemeClr val="tx1"/>
+                      </a:solidFill>
+                      <a:prstDash val="solid"/>
+                      <a:round/>
+                      <a:headEnd type="none" w="med" len="med"/>
+                      <a:tailEnd type="none" w="med" len="med"/>
+                    </a:lnR>
+                  </a:tcPr>
+                </a:tc>
+              </a:tr>
+              <a:tr h="0">
+                <a:tc>
+                  <a:txBody>
+                    <a:bodyPr/>
+                    <a:lstStyle/>
+                    <a:p>
+                      <a:r>
+                        <a:rPr lang="en-AU" sz="1100" dirty="0" err="1" smtClean="0"/>
+                        <a:t>remove_assignee_from_rule</a:t>
+                      </a:r>
+                      <a:r>
+                        <a:rPr lang="en-AU" sz="1100" dirty="0" smtClean="0"/>
+                        <a:t>()</a:t>
+                      </a:r>
+                      <a:endParaRPr lang="en-AU" sz="1100" dirty="0"/>
+                    </a:p>
+                  </a:txBody>
+                  <a:tcPr>
+                    <a:lnL w="12700" cap="flat" cmpd="sng" algn="ctr">
+                      <a:solidFill>
+                        <a:schemeClr val="tx1"/>
+                      </a:solidFill>
+                      <a:prstDash val="solid"/>
+                      <a:round/>
+                      <a:headEnd type="none" w="med" len="med"/>
+                      <a:tailEnd type="none" w="med" len="med"/>
+                    </a:lnL>
+                    <a:lnR w="12700" cap="flat" cmpd="sng" algn="ctr">
+                      <a:solidFill>
+                        <a:schemeClr val="tx1"/>
+                      </a:solidFill>
+                      <a:prstDash val="solid"/>
+                      <a:round/>
+                      <a:headEnd type="none" w="med" len="med"/>
+                      <a:tailEnd type="none" w="med" len="med"/>
+                    </a:lnR>
+                  </a:tcPr>
+                </a:tc>
+              </a:tr>
+              <a:tr h="0">
+                <a:tc>
+                  <a:txBody>
+                    <a:bodyPr/>
+                    <a:lstStyle/>
+                    <a:p>
+                      <a:r>
+                        <a:rPr lang="en-AU" sz="1100" dirty="0" err="1" smtClean="0"/>
+                        <a:t>get_assignees_for_rule</a:t>
+                      </a:r>
+                      <a:r>
+                        <a:rPr lang="en-AU" sz="1100" dirty="0" smtClean="0"/>
+                        <a:t>()</a:t>
+                      </a:r>
+                      <a:endParaRPr lang="en-AU" sz="1100" dirty="0"/>
+                    </a:p>
+                  </a:txBody>
+                  <a:tcPr>
+                    <a:lnL w="12700" cap="flat" cmpd="sng" algn="ctr">
+                      <a:solidFill>
+                        <a:schemeClr val="tx1"/>
+                      </a:solidFill>
+                      <a:prstDash val="solid"/>
+                      <a:round/>
+                      <a:headEnd type="none" w="med" len="med"/>
+                      <a:tailEnd type="none" w="med" len="med"/>
+                    </a:lnL>
+                    <a:lnR w="12700" cap="flat" cmpd="sng" algn="ctr">
+                      <a:solidFill>
+                        <a:schemeClr val="tx1"/>
+                      </a:solidFill>
+                      <a:prstDash val="solid"/>
+                      <a:round/>
+                      <a:headEnd type="none" w="med" len="med"/>
+                      <a:tailEnd type="none" w="med" len="med"/>
+                    </a:lnR>
+                    <a:lnB w="12700" cap="flat" cmpd="sng" algn="ctr">
+                      <a:solidFill>
+                        <a:schemeClr val="tx1"/>
+                      </a:solidFill>
+                      <a:prstDash val="solid"/>
+                      <a:round/>
+                      <a:headEnd type="none" w="med" len="med"/>
+                      <a:tailEnd type="none" w="med" len="med"/>
+                    </a:lnB>
+                  </a:tcPr>
+                </a:tc>
+              </a:tr>
+            </a:tbl>
+          </a:graphicData>
+        </a:graphic>
+      </p:graphicFrame>
+      <p:graphicFrame>
+        <p:nvGraphicFramePr>
+          <p:cNvPr id="12" name="Table 11"/>
+          <p:cNvGraphicFramePr>
+            <a:graphicFrameLocks noGrp="1"/>
+          </p:cNvGraphicFramePr>
+          <p:nvPr>
+            <p:extLst>
+              <p:ext uri="{D42A27DB-BD31-4B8C-83A1-F6EECF244321}">
+                <p14:modId xmlns:p14="http://schemas.microsoft.com/office/powerpoint/2010/main" val="3238390632"/>
+              </p:ext>
+            </p:extLst>
+          </p:nvPr>
+        </p:nvGraphicFramePr>
+        <p:xfrm>
+          <a:off x="7521872" y="649877"/>
+          <a:ext cx="1784054" cy="2072640"/>
+        </p:xfrm>
+        <a:graphic>
+          <a:graphicData uri="http://schemas.openxmlformats.org/drawingml/2006/table">
+            <a:tbl>
+              <a:tblPr firstRow="1" bandRow="1">
+                <a:tableStyleId>{5C22544A-7EE6-4342-B048-85BDC9FD1C3A}</a:tableStyleId>
+              </a:tblPr>
+              <a:tblGrid>
+                <a:gridCol w="1784054"/>
+              </a:tblGrid>
+              <a:tr h="0">
+                <a:tc>
+                  <a:txBody>
+                    <a:bodyPr/>
+                    <a:lstStyle/>
+                    <a:p>
+                      <a:pPr algn="ctr"/>
+                      <a:r>
+                        <a:rPr lang="en-AU" sz="1100" dirty="0" smtClean="0"/>
+                        <a:t>Action</a:t>
+                      </a:r>
+                      <a:endParaRPr lang="en-AU" sz="1100" dirty="0"/>
+                    </a:p>
+                  </a:txBody>
+                  <a:tcPr>
+                    <a:lnL w="12700" cap="flat" cmpd="sng" algn="ctr">
+                      <a:solidFill>
+                        <a:schemeClr val="tx1"/>
+                      </a:solidFill>
+                      <a:prstDash val="solid"/>
+                      <a:round/>
+                      <a:headEnd type="none" w="med" len="med"/>
+                      <a:tailEnd type="none" w="med" len="med"/>
+                    </a:lnL>
+                    <a:lnR w="12700" cap="flat" cmpd="sng" algn="ctr">
+                      <a:solidFill>
+                        <a:schemeClr val="tx1"/>
+                      </a:solidFill>
+                      <a:prstDash val="solid"/>
+                      <a:round/>
+                      <a:headEnd type="none" w="med" len="med"/>
+                      <a:tailEnd type="none" w="med" len="med"/>
+                    </a:lnR>
+                    <a:lnT w="12700" cap="flat" cmpd="sng" algn="ctr">
+                      <a:solidFill>
+                        <a:schemeClr val="tx1"/>
+                      </a:solidFill>
+                      <a:prstDash val="solid"/>
+                      <a:round/>
+                      <a:headEnd type="none" w="med" len="med"/>
+                      <a:tailEnd type="none" w="med" len="med"/>
+                    </a:lnT>
+                    <a:lnB w="12700" cap="flat" cmpd="sng" algn="ctr">
+                      <a:solidFill>
+                        <a:schemeClr val="tx1"/>
+                      </a:solidFill>
+                      <a:prstDash val="solid"/>
+                      <a:round/>
+                      <a:headEnd type="none" w="med" len="med"/>
+                      <a:tailEnd type="none" w="med" len="med"/>
+                    </a:lnB>
+                  </a:tcPr>
+                </a:tc>
+              </a:tr>
+              <a:tr h="0">
+                <a:tc>
+                  <a:txBody>
+                    <a:bodyPr/>
+                    <a:lstStyle/>
+                    <a:p>
+                      <a:r>
+                        <a:rPr lang="en-AU" sz="1100" dirty="0" smtClean="0"/>
+                        <a:t>URI: string (</a:t>
+                      </a:r>
+                      <a:r>
+                        <a:rPr lang="en-AU" sz="1100" dirty="0" err="1" smtClean="0"/>
+                        <a:t>uri</a:t>
+                      </a:r>
+                      <a:r>
+                        <a:rPr lang="en-AU" sz="1100" dirty="0" smtClean="0"/>
+                        <a:t>)</a:t>
+                      </a:r>
+                      <a:endParaRPr lang="en-AU" sz="1100" dirty="0"/>
+                    </a:p>
+                  </a:txBody>
+                  <a:tcPr>
+                    <a:lnL w="12700" cap="flat" cmpd="sng" algn="ctr">
+                      <a:solidFill>
+                        <a:schemeClr val="tx1"/>
+                      </a:solidFill>
+                      <a:prstDash val="solid"/>
+                      <a:round/>
+                      <a:headEnd type="none" w="med" len="med"/>
+                      <a:tailEnd type="none" w="med" len="med"/>
+                    </a:lnL>
+                    <a:lnR w="12700" cap="flat" cmpd="sng" algn="ctr">
+                      <a:solidFill>
+                        <a:schemeClr val="tx1"/>
+                      </a:solidFill>
+                      <a:prstDash val="solid"/>
+                      <a:round/>
+                      <a:headEnd type="none" w="med" len="med"/>
+                      <a:tailEnd type="none" w="med" len="med"/>
+                    </a:lnR>
+                    <a:lnT w="12700" cap="flat" cmpd="sng" algn="ctr">
+                      <a:solidFill>
+                        <a:schemeClr val="tx1"/>
+                      </a:solidFill>
+                      <a:prstDash val="solid"/>
+                      <a:round/>
+                      <a:headEnd type="none" w="med" len="med"/>
+                      <a:tailEnd type="none" w="med" len="med"/>
+                    </a:lnT>
+                    <a:lnB w="12700" cap="flat" cmpd="sng" algn="ctr">
+                      <a:noFill/>
+                      <a:prstDash val="solid"/>
+                      <a:round/>
+                      <a:headEnd type="none" w="med" len="med"/>
+                      <a:tailEnd type="none" w="med" len="med"/>
+                    </a:lnB>
+                    <a:lnTlToBr w="12700" cmpd="sng">
+                      <a:noFill/>
+                      <a:prstDash val="solid"/>
+                    </a:lnTlToBr>
+                    <a:lnBlToTr w="12700" cmpd="sng">
+                      <a:noFill/>
+                      <a:prstDash val="solid"/>
+                    </a:lnBlToTr>
+                  </a:tcPr>
+                </a:tc>
+              </a:tr>
+              <a:tr h="0">
+                <a:tc>
+                  <a:txBody>
+                    <a:bodyPr/>
+                    <a:lstStyle/>
+                    <a:p>
+                      <a:r>
+                        <a:rPr lang="en-AU" sz="1100" dirty="0" smtClean="0"/>
+                        <a:t>Label: string</a:t>
+                      </a:r>
+                      <a:endParaRPr lang="en-AU" sz="1100" dirty="0"/>
+                    </a:p>
+                  </a:txBody>
+                  <a:tcPr>
+                    <a:lnL w="12700" cap="flat" cmpd="sng" algn="ctr">
+                      <a:solidFill>
+                        <a:schemeClr val="tx1"/>
+                      </a:solidFill>
+                      <a:prstDash val="solid"/>
+                      <a:round/>
+                      <a:headEnd type="none" w="med" len="med"/>
+                      <a:tailEnd type="none" w="med" len="med"/>
+                    </a:lnL>
+                    <a:lnR w="12700" cap="flat" cmpd="sng" algn="ctr">
+                      <a:solidFill>
+                        <a:schemeClr val="tx1"/>
+                      </a:solidFill>
+                      <a:prstDash val="solid"/>
+                      <a:round/>
+                      <a:headEnd type="none" w="med" len="med"/>
+                      <a:tailEnd type="none" w="med" len="med"/>
+                    </a:lnR>
+                    <a:lnT w="12700" cap="flat" cmpd="sng" algn="ctr">
+                      <a:noFill/>
+                      <a:prstDash val="solid"/>
+                      <a:round/>
+                      <a:headEnd type="none" w="med" len="med"/>
+                      <a:tailEnd type="none" w="med" len="med"/>
+                    </a:lnT>
+                    <a:lnB w="12700" cap="flat" cmpd="sng" algn="ctr">
+                      <a:noFill/>
+                      <a:prstDash val="solid"/>
+                      <a:round/>
+                      <a:headEnd type="none" w="med" len="med"/>
+                      <a:tailEnd type="none" w="med" len="med"/>
+                    </a:lnB>
+                    <a:lnTlToBr w="12700" cmpd="sng">
+                      <a:noFill/>
+                      <a:prstDash val="solid"/>
+                    </a:lnTlToBr>
+                    <a:lnBlToTr w="12700" cmpd="sng">
+                      <a:noFill/>
+                      <a:prstDash val="solid"/>
+                    </a:lnBlToTr>
+                  </a:tcPr>
+                </a:tc>
+              </a:tr>
+              <a:tr h="0">
+                <a:tc>
+                  <a:txBody>
+                    <a:bodyPr/>
+                    <a:lstStyle/>
+                    <a:p>
+                      <a:r>
+                        <a:rPr lang="en-AU" sz="1100" dirty="0" smtClean="0"/>
+                        <a:t>Definition:</a:t>
+                      </a:r>
+                      <a:r>
+                        <a:rPr lang="en-AU" sz="1100" baseline="0" dirty="0" smtClean="0"/>
+                        <a:t> string</a:t>
+                      </a:r>
+                      <a:endParaRPr lang="en-AU" sz="1100" dirty="0"/>
+                    </a:p>
+                  </a:txBody>
+                  <a:tcPr>
+                    <a:lnL w="12700" cap="flat" cmpd="sng" algn="ctr">
+                      <a:solidFill>
+                        <a:schemeClr val="tx1"/>
+                      </a:solidFill>
+                      <a:prstDash val="solid"/>
+                      <a:round/>
+                      <a:headEnd type="none" w="med" len="med"/>
+                      <a:tailEnd type="none" w="med" len="med"/>
+                    </a:lnL>
+                    <a:lnR w="12700" cap="flat" cmpd="sng" algn="ctr">
+                      <a:solidFill>
+                        <a:schemeClr val="tx1"/>
+                      </a:solidFill>
+                      <a:prstDash val="solid"/>
+                      <a:round/>
+                      <a:headEnd type="none" w="med" len="med"/>
+                      <a:tailEnd type="none" w="med" len="med"/>
+                    </a:lnR>
+                    <a:lnT w="12700" cap="flat" cmpd="sng" algn="ctr">
+                      <a:noFill/>
+                      <a:prstDash val="solid"/>
+                      <a:round/>
+                      <a:headEnd type="none" w="med" len="med"/>
+                      <a:tailEnd type="none" w="med" len="med"/>
+                    </a:lnT>
+                    <a:lnB w="12700" cap="flat" cmpd="sng" algn="ctr">
+                      <a:solidFill>
+                        <a:schemeClr val="tx1"/>
+                      </a:solidFill>
+                      <a:prstDash val="solid"/>
+                      <a:round/>
+                      <a:headEnd type="none" w="med" len="med"/>
+                      <a:tailEnd type="none" w="med" len="med"/>
+                    </a:lnB>
+                    <a:lnTlToBr w="12700" cmpd="sng">
+                      <a:noFill/>
+                      <a:prstDash val="solid"/>
+                    </a:lnTlToBr>
+                    <a:lnBlToTr w="12700" cmpd="sng">
+                      <a:noFill/>
+                      <a:prstDash val="solid"/>
+                    </a:lnBlToTr>
+                  </a:tcPr>
+                </a:tc>
+              </a:tr>
+              <a:tr h="0">
+                <a:tc>
+                  <a:txBody>
+                    <a:bodyPr/>
+                    <a:lstStyle/>
+                    <a:p>
+                      <a:r>
+                        <a:rPr lang="en-AU" sz="1100" dirty="0" err="1" smtClean="0"/>
+                        <a:t>action_exists</a:t>
+                      </a:r>
+                      <a:r>
+                        <a:rPr lang="en-AU" sz="1100" dirty="0" smtClean="0"/>
+                        <a:t>()</a:t>
+                      </a:r>
+                      <a:endParaRPr lang="en-AU" sz="1100" dirty="0"/>
+                    </a:p>
+                  </a:txBody>
+                  <a:tcPr>
+                    <a:lnL w="12700" cap="flat" cmpd="sng" algn="ctr">
+                      <a:solidFill>
+                        <a:schemeClr val="tx1"/>
+                      </a:solidFill>
+                      <a:prstDash val="solid"/>
+                      <a:round/>
+                      <a:headEnd type="none" w="med" len="med"/>
+                      <a:tailEnd type="none" w="med" len="med"/>
+                    </a:lnL>
+                    <a:lnR w="12700" cap="flat" cmpd="sng" algn="ctr">
+                      <a:solidFill>
+                        <a:schemeClr val="tx1"/>
+                      </a:solidFill>
+                      <a:prstDash val="solid"/>
+                      <a:round/>
+                      <a:headEnd type="none" w="med" len="med"/>
+                      <a:tailEnd type="none" w="med" len="med"/>
+                    </a:lnR>
+                    <a:lnT w="12700" cap="flat" cmpd="sng" algn="ctr">
+                      <a:solidFill>
+                        <a:schemeClr val="tx1"/>
+                      </a:solidFill>
+                      <a:prstDash val="solid"/>
+                      <a:round/>
+                      <a:headEnd type="none" w="med" len="med"/>
+                      <a:tailEnd type="none" w="med" len="med"/>
+                    </a:lnT>
+                  </a:tcPr>
+                </a:tc>
+              </a:tr>
+              <a:tr h="0">
+                <a:tc>
+                  <a:txBody>
+                    <a:bodyPr/>
+                    <a:lstStyle/>
+                    <a:p>
+                      <a:r>
+                        <a:rPr lang="en-AU" sz="1100" dirty="0" err="1" smtClean="0"/>
+                        <a:t>add_action_to_rule</a:t>
+                      </a:r>
+                      <a:r>
+                        <a:rPr lang="en-AU" sz="1100" dirty="0" smtClean="0"/>
+                        <a:t>()</a:t>
+                      </a:r>
+                      <a:endParaRPr lang="en-AU" sz="1100" dirty="0"/>
+                    </a:p>
+                  </a:txBody>
+                  <a:tcPr>
+                    <a:lnL w="12700" cap="flat" cmpd="sng" algn="ctr">
+                      <a:solidFill>
+                        <a:schemeClr val="tx1"/>
+                      </a:solidFill>
+                      <a:prstDash val="solid"/>
+                      <a:round/>
+                      <a:headEnd type="none" w="med" len="med"/>
+                      <a:tailEnd type="none" w="med" len="med"/>
+                    </a:lnL>
+                    <a:lnR w="12700" cap="flat" cmpd="sng" algn="ctr">
+                      <a:solidFill>
+                        <a:schemeClr val="tx1"/>
+                      </a:solidFill>
+                      <a:prstDash val="solid"/>
+                      <a:round/>
+                      <a:headEnd type="none" w="med" len="med"/>
+                      <a:tailEnd type="none" w="med" len="med"/>
+                    </a:lnR>
+                  </a:tcPr>
+                </a:tc>
+              </a:tr>
+              <a:tr h="0">
+                <a:tc>
+                  <a:txBody>
+                    <a:bodyPr/>
+                    <a:lstStyle/>
+                    <a:p>
+                      <a:r>
+                        <a:rPr lang="en-AU" sz="1100" dirty="0" err="1" smtClean="0"/>
+                        <a:t>remove_action_from_rule</a:t>
+                      </a:r>
+                      <a:r>
+                        <a:rPr lang="en-AU" sz="1100" dirty="0" smtClean="0"/>
+                        <a:t>()</a:t>
+                      </a:r>
+                      <a:endParaRPr lang="en-AU" sz="1100" dirty="0"/>
+                    </a:p>
+                  </a:txBody>
+                  <a:tcPr>
+                    <a:lnL w="12700" cap="flat" cmpd="sng" algn="ctr">
+                      <a:solidFill>
+                        <a:schemeClr val="tx1"/>
+                      </a:solidFill>
+                      <a:prstDash val="solid"/>
+                      <a:round/>
+                      <a:headEnd type="none" w="med" len="med"/>
+                      <a:tailEnd type="none" w="med" len="med"/>
+                    </a:lnL>
+                    <a:lnR w="12700" cap="flat" cmpd="sng" algn="ctr">
+                      <a:solidFill>
+                        <a:schemeClr val="tx1"/>
+                      </a:solidFill>
+                      <a:prstDash val="solid"/>
+                      <a:round/>
+                      <a:headEnd type="none" w="med" len="med"/>
+                      <a:tailEnd type="none" w="med" len="med"/>
+                    </a:lnR>
+                  </a:tcPr>
+                </a:tc>
+              </a:tr>
+              <a:tr h="0">
+                <a:tc>
+                  <a:txBody>
+                    <a:bodyPr/>
+                    <a:lstStyle/>
+                    <a:p>
+                      <a:r>
+                        <a:rPr lang="en-AU" sz="1100" dirty="0" err="1" smtClean="0"/>
+                        <a:t>get_actions_for_rule</a:t>
+                      </a:r>
+                      <a:r>
+                        <a:rPr lang="en-AU" sz="1100" dirty="0" smtClean="0"/>
+                        <a:t>()</a:t>
+                      </a:r>
+                      <a:endParaRPr lang="en-AU" sz="1100" dirty="0"/>
+                    </a:p>
+                  </a:txBody>
+                  <a:tcPr>
+                    <a:lnL w="12700" cap="flat" cmpd="sng" algn="ctr">
+                      <a:solidFill>
+                        <a:schemeClr val="tx1"/>
+                      </a:solidFill>
+                      <a:prstDash val="solid"/>
+                      <a:round/>
+                      <a:headEnd type="none" w="med" len="med"/>
+                      <a:tailEnd type="none" w="med" len="med"/>
+                    </a:lnL>
+                    <a:lnR w="12700" cap="flat" cmpd="sng" algn="ctr">
+                      <a:solidFill>
+                        <a:schemeClr val="tx1"/>
+                      </a:solidFill>
+                      <a:prstDash val="solid"/>
+                      <a:round/>
+                      <a:headEnd type="none" w="med" len="med"/>
+                      <a:tailEnd type="none" w="med" len="med"/>
+                    </a:lnR>
+                    <a:lnB w="12700" cap="flat" cmpd="sng" algn="ctr">
+                      <a:solidFill>
+                        <a:schemeClr val="tx1"/>
+                      </a:solidFill>
+                      <a:prstDash val="solid"/>
+                      <a:round/>
+                      <a:headEnd type="none" w="med" len="med"/>
+                      <a:tailEnd type="none" w="med" len="med"/>
+                    </a:lnB>
+                  </a:tcPr>
+                </a:tc>
+              </a:tr>
+            </a:tbl>
+          </a:graphicData>
+        </a:graphic>
+      </p:graphicFrame>
+      <p:cxnSp>
+        <p:nvCxnSpPr>
+          <p:cNvPr id="16" name="Straight Arrow Connector 15"/>
+          <p:cNvCxnSpPr/>
+          <p:nvPr/>
+        </p:nvCxnSpPr>
+        <p:spPr>
+          <a:xfrm>
+            <a:off x="1593782" y="3409950"/>
+            <a:ext cx="788031" cy="0"/>
+          </a:xfrm>
+          <a:prstGeom prst="straightConnector1">
+            <a:avLst/>
+          </a:prstGeom>
+          <a:ln>
+            <a:tailEnd type="triangle"/>
+          </a:ln>
+        </p:spPr>
+        <p:style>
+          <a:lnRef idx="1">
+            <a:schemeClr val="accent1"/>
+          </a:lnRef>
+          <a:fillRef idx="0">
+            <a:schemeClr val="accent1"/>
+          </a:fillRef>
+          <a:effectRef idx="0">
+            <a:schemeClr val="accent1"/>
+          </a:effectRef>
+          <a:fontRef idx="minor">
+            <a:schemeClr val="tx1"/>
+          </a:fontRef>
+        </p:style>
+      </p:cxnSp>
+      <p:sp>
+        <p:nvSpPr>
+          <p:cNvPr id="17" name="TextBox 16"/>
+          <p:cNvSpPr txBox="1"/>
+          <p:nvPr/>
+        </p:nvSpPr>
+        <p:spPr>
+          <a:xfrm>
+            <a:off x="1593782" y="3111137"/>
+            <a:ext cx="284052" cy="276999"/>
+          </a:xfrm>
+          <a:prstGeom prst="rect">
+            <a:avLst/>
+          </a:prstGeom>
+          <a:noFill/>
+        </p:spPr>
+        <p:txBody>
+          <a:bodyPr wrap="none" rtlCol="0">
+            <a:spAutoFit/>
+          </a:bodyPr>
+          <a:lstStyle/>
+          <a:p>
+            <a:r>
+              <a:rPr lang="en-AU" sz="1200" dirty="0"/>
+              <a:t>N</a:t>
+            </a:r>
+          </a:p>
+        </p:txBody>
+      </p:sp>
+      <p:sp>
+        <p:nvSpPr>
+          <p:cNvPr id="18" name="TextBox 17"/>
+          <p:cNvSpPr txBox="1"/>
+          <p:nvPr/>
+        </p:nvSpPr>
+        <p:spPr>
+          <a:xfrm>
+            <a:off x="2097761" y="3111136"/>
+            <a:ext cx="263214" cy="276999"/>
+          </a:xfrm>
+          <a:prstGeom prst="rect">
+            <a:avLst/>
+          </a:prstGeom>
+          <a:noFill/>
+        </p:spPr>
+        <p:txBody>
+          <a:bodyPr wrap="none" rtlCol="0">
+            <a:spAutoFit/>
+          </a:bodyPr>
+          <a:lstStyle/>
+          <a:p>
+            <a:r>
+              <a:rPr lang="en-AU" sz="1200" dirty="0" smtClean="0"/>
+              <a:t>1</a:t>
+            </a:r>
+            <a:endParaRPr lang="en-AU" sz="1200" dirty="0"/>
+          </a:p>
+        </p:txBody>
+      </p:sp>
+      <p:cxnSp>
+        <p:nvCxnSpPr>
+          <p:cNvPr id="20" name="Straight Arrow Connector 19"/>
+          <p:cNvCxnSpPr/>
+          <p:nvPr/>
+        </p:nvCxnSpPr>
+        <p:spPr>
+          <a:xfrm>
+            <a:off x="3795674" y="3409950"/>
+            <a:ext cx="788031" cy="0"/>
+          </a:xfrm>
+          <a:prstGeom prst="straightConnector1">
+            <a:avLst/>
+          </a:prstGeom>
+          <a:ln>
+            <a:tailEnd type="triangle"/>
+          </a:ln>
+        </p:spPr>
+        <p:style>
+          <a:lnRef idx="1">
+            <a:schemeClr val="accent1"/>
+          </a:lnRef>
+          <a:fillRef idx="0">
+            <a:schemeClr val="accent1"/>
+          </a:fillRef>
+          <a:effectRef idx="0">
+            <a:schemeClr val="accent1"/>
+          </a:effectRef>
+          <a:fontRef idx="minor">
+            <a:schemeClr val="tx1"/>
+          </a:fontRef>
+        </p:style>
+      </p:cxnSp>
+      <p:sp>
+        <p:nvSpPr>
+          <p:cNvPr id="21" name="TextBox 20"/>
+          <p:cNvSpPr txBox="1"/>
+          <p:nvPr/>
+        </p:nvSpPr>
+        <p:spPr>
+          <a:xfrm>
+            <a:off x="3795212" y="3132950"/>
+            <a:ext cx="284052" cy="276999"/>
+          </a:xfrm>
+          <a:prstGeom prst="rect">
+            <a:avLst/>
+          </a:prstGeom>
+          <a:noFill/>
+        </p:spPr>
+        <p:txBody>
+          <a:bodyPr wrap="none" rtlCol="0">
+            <a:spAutoFit/>
+          </a:bodyPr>
+          <a:lstStyle/>
+          <a:p>
+            <a:r>
+              <a:rPr lang="en-AU" sz="1200" dirty="0"/>
+              <a:t>N</a:t>
+            </a:r>
+          </a:p>
+        </p:txBody>
+      </p:sp>
+      <p:sp>
+        <p:nvSpPr>
+          <p:cNvPr id="22" name="TextBox 21"/>
+          <p:cNvSpPr txBox="1"/>
+          <p:nvPr/>
+        </p:nvSpPr>
+        <p:spPr>
+          <a:xfrm>
+            <a:off x="4267593" y="3132951"/>
+            <a:ext cx="316112" cy="276999"/>
+          </a:xfrm>
+          <a:prstGeom prst="rect">
+            <a:avLst/>
+          </a:prstGeom>
+          <a:noFill/>
+        </p:spPr>
+        <p:txBody>
+          <a:bodyPr wrap="none" rtlCol="0">
+            <a:spAutoFit/>
+          </a:bodyPr>
+          <a:lstStyle/>
+          <a:p>
+            <a:r>
+              <a:rPr lang="en-AU" sz="1200" dirty="0" smtClean="0"/>
+              <a:t>M</a:t>
+            </a:r>
+            <a:endParaRPr lang="en-AU" sz="1200" dirty="0"/>
+          </a:p>
+        </p:txBody>
+      </p:sp>
+      <p:cxnSp>
+        <p:nvCxnSpPr>
+          <p:cNvPr id="24" name="Straight Arrow Connector 23"/>
+          <p:cNvCxnSpPr/>
+          <p:nvPr/>
+        </p:nvCxnSpPr>
+        <p:spPr>
+          <a:xfrm flipV="1">
+            <a:off x="6385870" y="1943100"/>
+            <a:ext cx="1136002" cy="676275"/>
+          </a:xfrm>
+          <a:prstGeom prst="straightConnector1">
+            <a:avLst/>
+          </a:prstGeom>
+          <a:ln>
+            <a:tailEnd type="triangle"/>
+          </a:ln>
+        </p:spPr>
+        <p:style>
+          <a:lnRef idx="1">
+            <a:schemeClr val="accent1"/>
+          </a:lnRef>
+          <a:fillRef idx="0">
+            <a:schemeClr val="accent1"/>
+          </a:fillRef>
+          <a:effectRef idx="0">
+            <a:schemeClr val="accent1"/>
+          </a:effectRef>
+          <a:fontRef idx="minor">
+            <a:schemeClr val="tx1"/>
+          </a:fontRef>
+        </p:style>
+      </p:cxnSp>
+      <p:cxnSp>
+        <p:nvCxnSpPr>
+          <p:cNvPr id="26" name="Straight Arrow Connector 25"/>
+          <p:cNvCxnSpPr/>
+          <p:nvPr/>
+        </p:nvCxnSpPr>
+        <p:spPr>
+          <a:xfrm>
+            <a:off x="6385870" y="3409949"/>
+            <a:ext cx="1068688" cy="800101"/>
+          </a:xfrm>
+          <a:prstGeom prst="straightConnector1">
+            <a:avLst/>
+          </a:prstGeom>
+          <a:ln>
+            <a:tailEnd type="triangle"/>
+          </a:ln>
+        </p:spPr>
+        <p:style>
+          <a:lnRef idx="1">
+            <a:schemeClr val="accent1"/>
+          </a:lnRef>
+          <a:fillRef idx="0">
+            <a:schemeClr val="accent1"/>
+          </a:fillRef>
+          <a:effectRef idx="0">
+            <a:schemeClr val="accent1"/>
+          </a:effectRef>
+          <a:fontRef idx="minor">
+            <a:schemeClr val="tx1"/>
+          </a:fontRef>
+        </p:style>
+      </p:cxnSp>
+      <p:sp>
+        <p:nvSpPr>
+          <p:cNvPr id="27" name="TextBox 26"/>
+          <p:cNvSpPr txBox="1"/>
+          <p:nvPr/>
+        </p:nvSpPr>
+        <p:spPr>
+          <a:xfrm>
+            <a:off x="6336738" y="2599163"/>
+            <a:ext cx="284052" cy="276999"/>
+          </a:xfrm>
+          <a:prstGeom prst="rect">
+            <a:avLst/>
+          </a:prstGeom>
+          <a:noFill/>
+        </p:spPr>
+        <p:txBody>
+          <a:bodyPr wrap="none" rtlCol="0">
+            <a:spAutoFit/>
+          </a:bodyPr>
+          <a:lstStyle/>
+          <a:p>
+            <a:r>
+              <a:rPr lang="en-AU" sz="1200" dirty="0"/>
+              <a:t>N</a:t>
+            </a:r>
+          </a:p>
+        </p:txBody>
+      </p:sp>
+      <p:sp>
+        <p:nvSpPr>
+          <p:cNvPr id="28" name="TextBox 27"/>
+          <p:cNvSpPr txBox="1"/>
+          <p:nvPr/>
+        </p:nvSpPr>
+        <p:spPr>
+          <a:xfrm>
+            <a:off x="7254892" y="1739287"/>
+            <a:ext cx="316112" cy="276999"/>
+          </a:xfrm>
+          <a:prstGeom prst="rect">
+            <a:avLst/>
+          </a:prstGeom>
+          <a:noFill/>
+        </p:spPr>
+        <p:txBody>
+          <a:bodyPr wrap="none" rtlCol="0">
+            <a:spAutoFit/>
+          </a:bodyPr>
+          <a:lstStyle/>
+          <a:p>
+            <a:r>
+              <a:rPr lang="en-AU" sz="1200" dirty="0" smtClean="0"/>
+              <a:t>M</a:t>
+            </a:r>
+            <a:endParaRPr lang="en-AU" sz="1200" dirty="0"/>
+          </a:p>
+        </p:txBody>
+      </p:sp>
+      <p:sp>
+        <p:nvSpPr>
+          <p:cNvPr id="29" name="TextBox 28"/>
+          <p:cNvSpPr txBox="1"/>
+          <p:nvPr/>
+        </p:nvSpPr>
+        <p:spPr>
+          <a:xfrm>
+            <a:off x="6346978" y="3215661"/>
+            <a:ext cx="284052" cy="276999"/>
+          </a:xfrm>
+          <a:prstGeom prst="rect">
+            <a:avLst/>
+          </a:prstGeom>
+          <a:noFill/>
+        </p:spPr>
+        <p:txBody>
+          <a:bodyPr wrap="none" rtlCol="0">
+            <a:spAutoFit/>
+          </a:bodyPr>
+          <a:lstStyle/>
+          <a:p>
+            <a:r>
+              <a:rPr lang="en-AU" sz="1200" dirty="0"/>
+              <a:t>N</a:t>
+            </a:r>
+          </a:p>
+        </p:txBody>
+      </p:sp>
+      <p:sp>
+        <p:nvSpPr>
+          <p:cNvPr id="30" name="TextBox 29"/>
+          <p:cNvSpPr txBox="1"/>
+          <p:nvPr/>
+        </p:nvSpPr>
+        <p:spPr>
+          <a:xfrm>
+            <a:off x="7144903" y="4131421"/>
+            <a:ext cx="316112" cy="276999"/>
+          </a:xfrm>
+          <a:prstGeom prst="rect">
+            <a:avLst/>
+          </a:prstGeom>
+          <a:noFill/>
+        </p:spPr>
+        <p:txBody>
+          <a:bodyPr wrap="none" rtlCol="0">
+            <a:spAutoFit/>
+          </a:bodyPr>
+          <a:lstStyle/>
+          <a:p>
+            <a:r>
+              <a:rPr lang="en-AU" sz="1200" dirty="0" smtClean="0"/>
+              <a:t>M</a:t>
+            </a:r>
+            <a:endParaRPr lang="en-AU" sz="1200" dirty="0"/>
+          </a:p>
+        </p:txBody>
+      </p:sp>
+    </p:spTree>
+    <p:extLst>
+      <p:ext uri="{BB962C8B-B14F-4D97-AF65-F5344CB8AC3E}">
+        <p14:creationId xmlns:p14="http://schemas.microsoft.com/office/powerpoint/2010/main" val="2413432855"/>
+      </p:ext>
+    </p:extLst>
+  </p:cSld>
+  <p:clrMapOvr>
+    <a:masterClrMapping/>
+  </p:clrMapOvr>
+</p:sld>
+</file>
+
+<file path=ppt/slides/slide3.xml><?xml version="1.0" encoding="utf-8"?>
 <p:sld xmlns:a="http://schemas.openxmlformats.org/drawingml/2006/main" xmlns:r="http://schemas.openxmlformats.org/officeDocument/2006/relationships" xmlns:p="http://schemas.openxmlformats.org/presentationml/2006/main">
   <p:cSld>
     <p:spTree>

</xml_diff>

<commit_message>
Added mockup for policy search pages to _docs
</commit_message>
<xml_diff>
--- a/_docs/DataModel.pptx
+++ b/_docs/DataModel.pptx
@@ -8,6 +8,8 @@
     <p:sldId id="256" r:id="rId2"/>
     <p:sldId id="259" r:id="rId3"/>
     <p:sldId id="257" r:id="rId4"/>
+    <p:sldId id="260" r:id="rId5"/>
+    <p:sldId id="261" r:id="rId6"/>
   </p:sldIdLst>
   <p:sldSz cx="12192000" cy="6858000"/>
   <p:notesSz cx="6858000" cy="9144000"/>
@@ -136,7 +138,7 @@
           <p:cNvPr id="2" name="Title 1">
             <a:extLst>
               <a:ext uri="{FF2B5EF4-FFF2-40B4-BE49-F238E27FC236}">
-                <a16:creationId xmlns:a16="http://schemas.microsoft.com/office/drawing/2014/main" xmlns="" id="{7812FAD9-B738-4E2B-A9F3-7D6DA8649C7B}"/>
+                <a16:creationId xmlns="" xmlns:a16="http://schemas.microsoft.com/office/drawing/2014/main" id="{7812FAD9-B738-4E2B-A9F3-7D6DA8649C7B}"/>
               </a:ext>
             </a:extLst>
           </p:cNvPr>
@@ -174,7 +176,7 @@
           <p:cNvPr id="3" name="Subtitle 2">
             <a:extLst>
               <a:ext uri="{FF2B5EF4-FFF2-40B4-BE49-F238E27FC236}">
-                <a16:creationId xmlns:a16="http://schemas.microsoft.com/office/drawing/2014/main" xmlns="" id="{CED3ABCF-AD94-42E3-95E2-D5E653DEF63F}"/>
+                <a16:creationId xmlns="" xmlns:a16="http://schemas.microsoft.com/office/drawing/2014/main" id="{CED3ABCF-AD94-42E3-95E2-D5E653DEF63F}"/>
               </a:ext>
             </a:extLst>
           </p:cNvPr>
@@ -245,7 +247,7 @@
           <p:cNvPr id="4" name="Date Placeholder 3">
             <a:extLst>
               <a:ext uri="{FF2B5EF4-FFF2-40B4-BE49-F238E27FC236}">
-                <a16:creationId xmlns:a16="http://schemas.microsoft.com/office/drawing/2014/main" xmlns="" id="{5AB92BAC-2DD4-42CE-9065-E2518728CD65}"/>
+                <a16:creationId xmlns="" xmlns:a16="http://schemas.microsoft.com/office/drawing/2014/main" id="{5AB92BAC-2DD4-42CE-9065-E2518728CD65}"/>
               </a:ext>
             </a:extLst>
           </p:cNvPr>
@@ -263,7 +265,7 @@
           <a:p>
             <a:fld id="{2F956D3E-0B91-471C-9743-3F865EE6F573}" type="datetimeFigureOut">
               <a:rPr lang="en-AU" smtClean="0"/>
-              <a:t>17/08/2018</a:t>
+              <a:t>20/08/2018</a:t>
             </a:fld>
             <a:endParaRPr lang="en-AU"/>
           </a:p>
@@ -274,7 +276,7 @@
           <p:cNvPr id="5" name="Footer Placeholder 4">
             <a:extLst>
               <a:ext uri="{FF2B5EF4-FFF2-40B4-BE49-F238E27FC236}">
-                <a16:creationId xmlns:a16="http://schemas.microsoft.com/office/drawing/2014/main" xmlns="" id="{137C3D4C-B868-4F83-8919-AE7F2500E437}"/>
+                <a16:creationId xmlns="" xmlns:a16="http://schemas.microsoft.com/office/drawing/2014/main" id="{137C3D4C-B868-4F83-8919-AE7F2500E437}"/>
               </a:ext>
             </a:extLst>
           </p:cNvPr>
@@ -299,7 +301,7 @@
           <p:cNvPr id="6" name="Slide Number Placeholder 5">
             <a:extLst>
               <a:ext uri="{FF2B5EF4-FFF2-40B4-BE49-F238E27FC236}">
-                <a16:creationId xmlns:a16="http://schemas.microsoft.com/office/drawing/2014/main" xmlns="" id="{ABBB53F0-83D7-42D4-90A5-7D5EE7C0AAD3}"/>
+                <a16:creationId xmlns="" xmlns:a16="http://schemas.microsoft.com/office/drawing/2014/main" id="{ABBB53F0-83D7-42D4-90A5-7D5EE7C0AAD3}"/>
               </a:ext>
             </a:extLst>
           </p:cNvPr>
@@ -358,7 +360,7 @@
           <p:cNvPr id="2" name="Title 1">
             <a:extLst>
               <a:ext uri="{FF2B5EF4-FFF2-40B4-BE49-F238E27FC236}">
-                <a16:creationId xmlns:a16="http://schemas.microsoft.com/office/drawing/2014/main" xmlns="" id="{EDEAE3B1-565C-4AD8-A67C-7D2C44ECA18D}"/>
+                <a16:creationId xmlns="" xmlns:a16="http://schemas.microsoft.com/office/drawing/2014/main" id="{EDEAE3B1-565C-4AD8-A67C-7D2C44ECA18D}"/>
               </a:ext>
             </a:extLst>
           </p:cNvPr>
@@ -387,7 +389,7 @@
           <p:cNvPr id="3" name="Vertical Text Placeholder 2">
             <a:extLst>
               <a:ext uri="{FF2B5EF4-FFF2-40B4-BE49-F238E27FC236}">
-                <a16:creationId xmlns:a16="http://schemas.microsoft.com/office/drawing/2014/main" xmlns="" id="{89499874-28E0-4013-933C-7A7F4857D944}"/>
+                <a16:creationId xmlns="" xmlns:a16="http://schemas.microsoft.com/office/drawing/2014/main" id="{89499874-28E0-4013-933C-7A7F4857D944}"/>
               </a:ext>
             </a:extLst>
           </p:cNvPr>
@@ -445,7 +447,7 @@
           <p:cNvPr id="4" name="Date Placeholder 3">
             <a:extLst>
               <a:ext uri="{FF2B5EF4-FFF2-40B4-BE49-F238E27FC236}">
-                <a16:creationId xmlns:a16="http://schemas.microsoft.com/office/drawing/2014/main" xmlns="" id="{30B68540-FC47-4085-8638-DE11BCE14D7E}"/>
+                <a16:creationId xmlns="" xmlns:a16="http://schemas.microsoft.com/office/drawing/2014/main" id="{30B68540-FC47-4085-8638-DE11BCE14D7E}"/>
               </a:ext>
             </a:extLst>
           </p:cNvPr>
@@ -463,7 +465,7 @@
           <a:p>
             <a:fld id="{2F956D3E-0B91-471C-9743-3F865EE6F573}" type="datetimeFigureOut">
               <a:rPr lang="en-AU" smtClean="0"/>
-              <a:t>17/08/2018</a:t>
+              <a:t>20/08/2018</a:t>
             </a:fld>
             <a:endParaRPr lang="en-AU"/>
           </a:p>
@@ -474,7 +476,7 @@
           <p:cNvPr id="5" name="Footer Placeholder 4">
             <a:extLst>
               <a:ext uri="{FF2B5EF4-FFF2-40B4-BE49-F238E27FC236}">
-                <a16:creationId xmlns:a16="http://schemas.microsoft.com/office/drawing/2014/main" xmlns="" id="{149BDF69-9D0A-4871-B742-85D1C27ACA21}"/>
+                <a16:creationId xmlns="" xmlns:a16="http://schemas.microsoft.com/office/drawing/2014/main" id="{149BDF69-9D0A-4871-B742-85D1C27ACA21}"/>
               </a:ext>
             </a:extLst>
           </p:cNvPr>
@@ -499,7 +501,7 @@
           <p:cNvPr id="6" name="Slide Number Placeholder 5">
             <a:extLst>
               <a:ext uri="{FF2B5EF4-FFF2-40B4-BE49-F238E27FC236}">
-                <a16:creationId xmlns:a16="http://schemas.microsoft.com/office/drawing/2014/main" xmlns="" id="{BAC96E6A-25E9-4A3D-BDE5-E881314DE0D7}"/>
+                <a16:creationId xmlns="" xmlns:a16="http://schemas.microsoft.com/office/drawing/2014/main" id="{BAC96E6A-25E9-4A3D-BDE5-E881314DE0D7}"/>
               </a:ext>
             </a:extLst>
           </p:cNvPr>
@@ -558,7 +560,7 @@
           <p:cNvPr id="2" name="Vertical Title 1">
             <a:extLst>
               <a:ext uri="{FF2B5EF4-FFF2-40B4-BE49-F238E27FC236}">
-                <a16:creationId xmlns:a16="http://schemas.microsoft.com/office/drawing/2014/main" xmlns="" id="{8BD4BC0C-9CFC-4FB2-B5C6-6EEC1B7F772D}"/>
+                <a16:creationId xmlns="" xmlns:a16="http://schemas.microsoft.com/office/drawing/2014/main" id="{8BD4BC0C-9CFC-4FB2-B5C6-6EEC1B7F772D}"/>
               </a:ext>
             </a:extLst>
           </p:cNvPr>
@@ -592,7 +594,7 @@
           <p:cNvPr id="3" name="Vertical Text Placeholder 2">
             <a:extLst>
               <a:ext uri="{FF2B5EF4-FFF2-40B4-BE49-F238E27FC236}">
-                <a16:creationId xmlns:a16="http://schemas.microsoft.com/office/drawing/2014/main" xmlns="" id="{5CF7FA3D-9ABB-49C7-AF65-E0869B2150C9}"/>
+                <a16:creationId xmlns="" xmlns:a16="http://schemas.microsoft.com/office/drawing/2014/main" id="{5CF7FA3D-9ABB-49C7-AF65-E0869B2150C9}"/>
               </a:ext>
             </a:extLst>
           </p:cNvPr>
@@ -655,7 +657,7 @@
           <p:cNvPr id="4" name="Date Placeholder 3">
             <a:extLst>
               <a:ext uri="{FF2B5EF4-FFF2-40B4-BE49-F238E27FC236}">
-                <a16:creationId xmlns:a16="http://schemas.microsoft.com/office/drawing/2014/main" xmlns="" id="{FBF00D9E-50E5-4276-BC40-27125BC1B69A}"/>
+                <a16:creationId xmlns="" xmlns:a16="http://schemas.microsoft.com/office/drawing/2014/main" id="{FBF00D9E-50E5-4276-BC40-27125BC1B69A}"/>
               </a:ext>
             </a:extLst>
           </p:cNvPr>
@@ -673,7 +675,7 @@
           <a:p>
             <a:fld id="{2F956D3E-0B91-471C-9743-3F865EE6F573}" type="datetimeFigureOut">
               <a:rPr lang="en-AU" smtClean="0"/>
-              <a:t>17/08/2018</a:t>
+              <a:t>20/08/2018</a:t>
             </a:fld>
             <a:endParaRPr lang="en-AU"/>
           </a:p>
@@ -684,7 +686,7 @@
           <p:cNvPr id="5" name="Footer Placeholder 4">
             <a:extLst>
               <a:ext uri="{FF2B5EF4-FFF2-40B4-BE49-F238E27FC236}">
-                <a16:creationId xmlns:a16="http://schemas.microsoft.com/office/drawing/2014/main" xmlns="" id="{3AA20A04-EE64-4C85-A4C3-C674E216B21E}"/>
+                <a16:creationId xmlns="" xmlns:a16="http://schemas.microsoft.com/office/drawing/2014/main" id="{3AA20A04-EE64-4C85-A4C3-C674E216B21E}"/>
               </a:ext>
             </a:extLst>
           </p:cNvPr>
@@ -709,7 +711,7 @@
           <p:cNvPr id="6" name="Slide Number Placeholder 5">
             <a:extLst>
               <a:ext uri="{FF2B5EF4-FFF2-40B4-BE49-F238E27FC236}">
-                <a16:creationId xmlns:a16="http://schemas.microsoft.com/office/drawing/2014/main" xmlns="" id="{0F34C053-3886-4674-85D6-13CCCB876AEC}"/>
+                <a16:creationId xmlns="" xmlns:a16="http://schemas.microsoft.com/office/drawing/2014/main" id="{0F34C053-3886-4674-85D6-13CCCB876AEC}"/>
               </a:ext>
             </a:extLst>
           </p:cNvPr>
@@ -768,7 +770,7 @@
           <p:cNvPr id="2" name="Title 1">
             <a:extLst>
               <a:ext uri="{FF2B5EF4-FFF2-40B4-BE49-F238E27FC236}">
-                <a16:creationId xmlns:a16="http://schemas.microsoft.com/office/drawing/2014/main" xmlns="" id="{6D70D093-F0D3-479C-B65D-3031107C0DF1}"/>
+                <a16:creationId xmlns="" xmlns:a16="http://schemas.microsoft.com/office/drawing/2014/main" id="{6D70D093-F0D3-479C-B65D-3031107C0DF1}"/>
               </a:ext>
             </a:extLst>
           </p:cNvPr>
@@ -797,7 +799,7 @@
           <p:cNvPr id="3" name="Content Placeholder 2">
             <a:extLst>
               <a:ext uri="{FF2B5EF4-FFF2-40B4-BE49-F238E27FC236}">
-                <a16:creationId xmlns:a16="http://schemas.microsoft.com/office/drawing/2014/main" xmlns="" id="{19F2333E-AD72-4069-9999-D316EB1D2BE2}"/>
+                <a16:creationId xmlns="" xmlns:a16="http://schemas.microsoft.com/office/drawing/2014/main" id="{19F2333E-AD72-4069-9999-D316EB1D2BE2}"/>
               </a:ext>
             </a:extLst>
           </p:cNvPr>
@@ -855,7 +857,7 @@
           <p:cNvPr id="4" name="Date Placeholder 3">
             <a:extLst>
               <a:ext uri="{FF2B5EF4-FFF2-40B4-BE49-F238E27FC236}">
-                <a16:creationId xmlns:a16="http://schemas.microsoft.com/office/drawing/2014/main" xmlns="" id="{A5D0C69D-8EED-4855-9D9D-192FA0501F24}"/>
+                <a16:creationId xmlns="" xmlns:a16="http://schemas.microsoft.com/office/drawing/2014/main" id="{A5D0C69D-8EED-4855-9D9D-192FA0501F24}"/>
               </a:ext>
             </a:extLst>
           </p:cNvPr>
@@ -873,7 +875,7 @@
           <a:p>
             <a:fld id="{2F956D3E-0B91-471C-9743-3F865EE6F573}" type="datetimeFigureOut">
               <a:rPr lang="en-AU" smtClean="0"/>
-              <a:t>17/08/2018</a:t>
+              <a:t>20/08/2018</a:t>
             </a:fld>
             <a:endParaRPr lang="en-AU"/>
           </a:p>
@@ -884,7 +886,7 @@
           <p:cNvPr id="5" name="Footer Placeholder 4">
             <a:extLst>
               <a:ext uri="{FF2B5EF4-FFF2-40B4-BE49-F238E27FC236}">
-                <a16:creationId xmlns:a16="http://schemas.microsoft.com/office/drawing/2014/main" xmlns="" id="{3E40E1C3-407E-4CDD-B265-40C6EAF109CB}"/>
+                <a16:creationId xmlns="" xmlns:a16="http://schemas.microsoft.com/office/drawing/2014/main" id="{3E40E1C3-407E-4CDD-B265-40C6EAF109CB}"/>
               </a:ext>
             </a:extLst>
           </p:cNvPr>
@@ -909,7 +911,7 @@
           <p:cNvPr id="6" name="Slide Number Placeholder 5">
             <a:extLst>
               <a:ext uri="{FF2B5EF4-FFF2-40B4-BE49-F238E27FC236}">
-                <a16:creationId xmlns:a16="http://schemas.microsoft.com/office/drawing/2014/main" xmlns="" id="{845BB6A8-2931-4612-9030-020514B9DFCC}"/>
+                <a16:creationId xmlns="" xmlns:a16="http://schemas.microsoft.com/office/drawing/2014/main" id="{845BB6A8-2931-4612-9030-020514B9DFCC}"/>
               </a:ext>
             </a:extLst>
           </p:cNvPr>
@@ -968,7 +970,7 @@
           <p:cNvPr id="2" name="Title 1">
             <a:extLst>
               <a:ext uri="{FF2B5EF4-FFF2-40B4-BE49-F238E27FC236}">
-                <a16:creationId xmlns:a16="http://schemas.microsoft.com/office/drawing/2014/main" xmlns="" id="{9648ED28-6C5E-4B58-8121-9279F11D3D73}"/>
+                <a16:creationId xmlns="" xmlns:a16="http://schemas.microsoft.com/office/drawing/2014/main" id="{9648ED28-6C5E-4B58-8121-9279F11D3D73}"/>
               </a:ext>
             </a:extLst>
           </p:cNvPr>
@@ -1006,7 +1008,7 @@
           <p:cNvPr id="3" name="Text Placeholder 2">
             <a:extLst>
               <a:ext uri="{FF2B5EF4-FFF2-40B4-BE49-F238E27FC236}">
-                <a16:creationId xmlns:a16="http://schemas.microsoft.com/office/drawing/2014/main" xmlns="" id="{B243195A-3915-4922-B15F-B46A8AB41FEA}"/>
+                <a16:creationId xmlns="" xmlns:a16="http://schemas.microsoft.com/office/drawing/2014/main" id="{B243195A-3915-4922-B15F-B46A8AB41FEA}"/>
               </a:ext>
             </a:extLst>
           </p:cNvPr>
@@ -1131,7 +1133,7 @@
           <p:cNvPr id="4" name="Date Placeholder 3">
             <a:extLst>
               <a:ext uri="{FF2B5EF4-FFF2-40B4-BE49-F238E27FC236}">
-                <a16:creationId xmlns:a16="http://schemas.microsoft.com/office/drawing/2014/main" xmlns="" id="{33A69456-A0E9-4808-8AD0-8E412F7B6478}"/>
+                <a16:creationId xmlns="" xmlns:a16="http://schemas.microsoft.com/office/drawing/2014/main" id="{33A69456-A0E9-4808-8AD0-8E412F7B6478}"/>
               </a:ext>
             </a:extLst>
           </p:cNvPr>
@@ -1149,7 +1151,7 @@
           <a:p>
             <a:fld id="{2F956D3E-0B91-471C-9743-3F865EE6F573}" type="datetimeFigureOut">
               <a:rPr lang="en-AU" smtClean="0"/>
-              <a:t>17/08/2018</a:t>
+              <a:t>20/08/2018</a:t>
             </a:fld>
             <a:endParaRPr lang="en-AU"/>
           </a:p>
@@ -1160,7 +1162,7 @@
           <p:cNvPr id="5" name="Footer Placeholder 4">
             <a:extLst>
               <a:ext uri="{FF2B5EF4-FFF2-40B4-BE49-F238E27FC236}">
-                <a16:creationId xmlns:a16="http://schemas.microsoft.com/office/drawing/2014/main" xmlns="" id="{E0CD1CF0-CD4A-49A3-A5A3-C4241E2A5F63}"/>
+                <a16:creationId xmlns="" xmlns:a16="http://schemas.microsoft.com/office/drawing/2014/main" id="{E0CD1CF0-CD4A-49A3-A5A3-C4241E2A5F63}"/>
               </a:ext>
             </a:extLst>
           </p:cNvPr>
@@ -1185,7 +1187,7 @@
           <p:cNvPr id="6" name="Slide Number Placeholder 5">
             <a:extLst>
               <a:ext uri="{FF2B5EF4-FFF2-40B4-BE49-F238E27FC236}">
-                <a16:creationId xmlns:a16="http://schemas.microsoft.com/office/drawing/2014/main" xmlns="" id="{977DB6D3-8C4E-4ED5-9327-2DCA26535F2F}"/>
+                <a16:creationId xmlns="" xmlns:a16="http://schemas.microsoft.com/office/drawing/2014/main" id="{977DB6D3-8C4E-4ED5-9327-2DCA26535F2F}"/>
               </a:ext>
             </a:extLst>
           </p:cNvPr>
@@ -1244,7 +1246,7 @@
           <p:cNvPr id="2" name="Title 1">
             <a:extLst>
               <a:ext uri="{FF2B5EF4-FFF2-40B4-BE49-F238E27FC236}">
-                <a16:creationId xmlns:a16="http://schemas.microsoft.com/office/drawing/2014/main" xmlns="" id="{07C65CDB-FECB-413B-B3E2-B8B3289BE67F}"/>
+                <a16:creationId xmlns="" xmlns:a16="http://schemas.microsoft.com/office/drawing/2014/main" id="{07C65CDB-FECB-413B-B3E2-B8B3289BE67F}"/>
               </a:ext>
             </a:extLst>
           </p:cNvPr>
@@ -1273,7 +1275,7 @@
           <p:cNvPr id="3" name="Content Placeholder 2">
             <a:extLst>
               <a:ext uri="{FF2B5EF4-FFF2-40B4-BE49-F238E27FC236}">
-                <a16:creationId xmlns:a16="http://schemas.microsoft.com/office/drawing/2014/main" xmlns="" id="{2E6195E5-493D-470C-8030-A76CAC535D10}"/>
+                <a16:creationId xmlns="" xmlns:a16="http://schemas.microsoft.com/office/drawing/2014/main" id="{2E6195E5-493D-470C-8030-A76CAC535D10}"/>
               </a:ext>
             </a:extLst>
           </p:cNvPr>
@@ -1336,7 +1338,7 @@
           <p:cNvPr id="4" name="Content Placeholder 3">
             <a:extLst>
               <a:ext uri="{FF2B5EF4-FFF2-40B4-BE49-F238E27FC236}">
-                <a16:creationId xmlns:a16="http://schemas.microsoft.com/office/drawing/2014/main" xmlns="" id="{4F75BA75-06D0-4C8F-978B-E8DD198357AB}"/>
+                <a16:creationId xmlns="" xmlns:a16="http://schemas.microsoft.com/office/drawing/2014/main" id="{4F75BA75-06D0-4C8F-978B-E8DD198357AB}"/>
               </a:ext>
             </a:extLst>
           </p:cNvPr>
@@ -1399,7 +1401,7 @@
           <p:cNvPr id="5" name="Date Placeholder 4">
             <a:extLst>
               <a:ext uri="{FF2B5EF4-FFF2-40B4-BE49-F238E27FC236}">
-                <a16:creationId xmlns:a16="http://schemas.microsoft.com/office/drawing/2014/main" xmlns="" id="{B8464B70-E9DB-4711-87B7-24F57EF07851}"/>
+                <a16:creationId xmlns="" xmlns:a16="http://schemas.microsoft.com/office/drawing/2014/main" id="{B8464B70-E9DB-4711-87B7-24F57EF07851}"/>
               </a:ext>
             </a:extLst>
           </p:cNvPr>
@@ -1417,7 +1419,7 @@
           <a:p>
             <a:fld id="{2F956D3E-0B91-471C-9743-3F865EE6F573}" type="datetimeFigureOut">
               <a:rPr lang="en-AU" smtClean="0"/>
-              <a:t>17/08/2018</a:t>
+              <a:t>20/08/2018</a:t>
             </a:fld>
             <a:endParaRPr lang="en-AU"/>
           </a:p>
@@ -1428,7 +1430,7 @@
           <p:cNvPr id="6" name="Footer Placeholder 5">
             <a:extLst>
               <a:ext uri="{FF2B5EF4-FFF2-40B4-BE49-F238E27FC236}">
-                <a16:creationId xmlns:a16="http://schemas.microsoft.com/office/drawing/2014/main" xmlns="" id="{749AD7CE-527F-410D-975F-A7CD735BDEDC}"/>
+                <a16:creationId xmlns="" xmlns:a16="http://schemas.microsoft.com/office/drawing/2014/main" id="{749AD7CE-527F-410D-975F-A7CD735BDEDC}"/>
               </a:ext>
             </a:extLst>
           </p:cNvPr>
@@ -1453,7 +1455,7 @@
           <p:cNvPr id="7" name="Slide Number Placeholder 6">
             <a:extLst>
               <a:ext uri="{FF2B5EF4-FFF2-40B4-BE49-F238E27FC236}">
-                <a16:creationId xmlns:a16="http://schemas.microsoft.com/office/drawing/2014/main" xmlns="" id="{255D3E42-D06E-4C32-A2BC-75DE87B576C3}"/>
+                <a16:creationId xmlns="" xmlns:a16="http://schemas.microsoft.com/office/drawing/2014/main" id="{255D3E42-D06E-4C32-A2BC-75DE87B576C3}"/>
               </a:ext>
             </a:extLst>
           </p:cNvPr>
@@ -1512,7 +1514,7 @@
           <p:cNvPr id="2" name="Title 1">
             <a:extLst>
               <a:ext uri="{FF2B5EF4-FFF2-40B4-BE49-F238E27FC236}">
-                <a16:creationId xmlns:a16="http://schemas.microsoft.com/office/drawing/2014/main" xmlns="" id="{BE6E0455-D9EF-42F6-B509-7FDC251CFDAF}"/>
+                <a16:creationId xmlns="" xmlns:a16="http://schemas.microsoft.com/office/drawing/2014/main" id="{BE6E0455-D9EF-42F6-B509-7FDC251CFDAF}"/>
               </a:ext>
             </a:extLst>
           </p:cNvPr>
@@ -1546,7 +1548,7 @@
           <p:cNvPr id="3" name="Text Placeholder 2">
             <a:extLst>
               <a:ext uri="{FF2B5EF4-FFF2-40B4-BE49-F238E27FC236}">
-                <a16:creationId xmlns:a16="http://schemas.microsoft.com/office/drawing/2014/main" xmlns="" id="{5117D045-1AD3-424F-855E-BD6F9FACDA1A}"/>
+                <a16:creationId xmlns="" xmlns:a16="http://schemas.microsoft.com/office/drawing/2014/main" id="{5117D045-1AD3-424F-855E-BD6F9FACDA1A}"/>
               </a:ext>
             </a:extLst>
           </p:cNvPr>
@@ -1617,7 +1619,7 @@
           <p:cNvPr id="4" name="Content Placeholder 3">
             <a:extLst>
               <a:ext uri="{FF2B5EF4-FFF2-40B4-BE49-F238E27FC236}">
-                <a16:creationId xmlns:a16="http://schemas.microsoft.com/office/drawing/2014/main" xmlns="" id="{CC38E2F2-5E09-477C-BF9F-8B671E6613BE}"/>
+                <a16:creationId xmlns="" xmlns:a16="http://schemas.microsoft.com/office/drawing/2014/main" id="{CC38E2F2-5E09-477C-BF9F-8B671E6613BE}"/>
               </a:ext>
             </a:extLst>
           </p:cNvPr>
@@ -1680,7 +1682,7 @@
           <p:cNvPr id="5" name="Text Placeholder 4">
             <a:extLst>
               <a:ext uri="{FF2B5EF4-FFF2-40B4-BE49-F238E27FC236}">
-                <a16:creationId xmlns:a16="http://schemas.microsoft.com/office/drawing/2014/main" xmlns="" id="{3A15ED3B-D38C-4255-B016-9BFE9335B63D}"/>
+                <a16:creationId xmlns="" xmlns:a16="http://schemas.microsoft.com/office/drawing/2014/main" id="{3A15ED3B-D38C-4255-B016-9BFE9335B63D}"/>
               </a:ext>
             </a:extLst>
           </p:cNvPr>
@@ -1751,7 +1753,7 @@
           <p:cNvPr id="6" name="Content Placeholder 5">
             <a:extLst>
               <a:ext uri="{FF2B5EF4-FFF2-40B4-BE49-F238E27FC236}">
-                <a16:creationId xmlns:a16="http://schemas.microsoft.com/office/drawing/2014/main" xmlns="" id="{63DAE8AA-C177-4A26-BEC1-435C0D5B2971}"/>
+                <a16:creationId xmlns="" xmlns:a16="http://schemas.microsoft.com/office/drawing/2014/main" id="{63DAE8AA-C177-4A26-BEC1-435C0D5B2971}"/>
               </a:ext>
             </a:extLst>
           </p:cNvPr>
@@ -1814,7 +1816,7 @@
           <p:cNvPr id="7" name="Date Placeholder 6">
             <a:extLst>
               <a:ext uri="{FF2B5EF4-FFF2-40B4-BE49-F238E27FC236}">
-                <a16:creationId xmlns:a16="http://schemas.microsoft.com/office/drawing/2014/main" xmlns="" id="{C91A1DD9-FE74-4BC2-9DFA-85266C81AE87}"/>
+                <a16:creationId xmlns="" xmlns:a16="http://schemas.microsoft.com/office/drawing/2014/main" id="{C91A1DD9-FE74-4BC2-9DFA-85266C81AE87}"/>
               </a:ext>
             </a:extLst>
           </p:cNvPr>
@@ -1832,7 +1834,7 @@
           <a:p>
             <a:fld id="{2F956D3E-0B91-471C-9743-3F865EE6F573}" type="datetimeFigureOut">
               <a:rPr lang="en-AU" smtClean="0"/>
-              <a:t>17/08/2018</a:t>
+              <a:t>20/08/2018</a:t>
             </a:fld>
             <a:endParaRPr lang="en-AU"/>
           </a:p>
@@ -1843,7 +1845,7 @@
           <p:cNvPr id="8" name="Footer Placeholder 7">
             <a:extLst>
               <a:ext uri="{FF2B5EF4-FFF2-40B4-BE49-F238E27FC236}">
-                <a16:creationId xmlns:a16="http://schemas.microsoft.com/office/drawing/2014/main" xmlns="" id="{03468399-9983-447A-A9C7-60841A2101A5}"/>
+                <a16:creationId xmlns="" xmlns:a16="http://schemas.microsoft.com/office/drawing/2014/main" id="{03468399-9983-447A-A9C7-60841A2101A5}"/>
               </a:ext>
             </a:extLst>
           </p:cNvPr>
@@ -1868,7 +1870,7 @@
           <p:cNvPr id="9" name="Slide Number Placeholder 8">
             <a:extLst>
               <a:ext uri="{FF2B5EF4-FFF2-40B4-BE49-F238E27FC236}">
-                <a16:creationId xmlns:a16="http://schemas.microsoft.com/office/drawing/2014/main" xmlns="" id="{FF353AE5-8C6E-44F3-BD0C-9BE8FC31A3C4}"/>
+                <a16:creationId xmlns="" xmlns:a16="http://schemas.microsoft.com/office/drawing/2014/main" id="{FF353AE5-8C6E-44F3-BD0C-9BE8FC31A3C4}"/>
               </a:ext>
             </a:extLst>
           </p:cNvPr>
@@ -1927,7 +1929,7 @@
           <p:cNvPr id="2" name="Title 1">
             <a:extLst>
               <a:ext uri="{FF2B5EF4-FFF2-40B4-BE49-F238E27FC236}">
-                <a16:creationId xmlns:a16="http://schemas.microsoft.com/office/drawing/2014/main" xmlns="" id="{11AB4E18-777A-4059-8FE3-0C744DDCEF11}"/>
+                <a16:creationId xmlns="" xmlns:a16="http://schemas.microsoft.com/office/drawing/2014/main" id="{11AB4E18-777A-4059-8FE3-0C744DDCEF11}"/>
               </a:ext>
             </a:extLst>
           </p:cNvPr>
@@ -1956,7 +1958,7 @@
           <p:cNvPr id="3" name="Date Placeholder 2">
             <a:extLst>
               <a:ext uri="{FF2B5EF4-FFF2-40B4-BE49-F238E27FC236}">
-                <a16:creationId xmlns:a16="http://schemas.microsoft.com/office/drawing/2014/main" xmlns="" id="{EBBA3A6C-B2BF-4415-9EFA-485140AC1C20}"/>
+                <a16:creationId xmlns="" xmlns:a16="http://schemas.microsoft.com/office/drawing/2014/main" id="{EBBA3A6C-B2BF-4415-9EFA-485140AC1C20}"/>
               </a:ext>
             </a:extLst>
           </p:cNvPr>
@@ -1974,7 +1976,7 @@
           <a:p>
             <a:fld id="{2F956D3E-0B91-471C-9743-3F865EE6F573}" type="datetimeFigureOut">
               <a:rPr lang="en-AU" smtClean="0"/>
-              <a:t>17/08/2018</a:t>
+              <a:t>20/08/2018</a:t>
             </a:fld>
             <a:endParaRPr lang="en-AU"/>
           </a:p>
@@ -1985,7 +1987,7 @@
           <p:cNvPr id="4" name="Footer Placeholder 3">
             <a:extLst>
               <a:ext uri="{FF2B5EF4-FFF2-40B4-BE49-F238E27FC236}">
-                <a16:creationId xmlns:a16="http://schemas.microsoft.com/office/drawing/2014/main" xmlns="" id="{979E66C2-27F5-4ADA-B05B-28A7E30C72C4}"/>
+                <a16:creationId xmlns="" xmlns:a16="http://schemas.microsoft.com/office/drawing/2014/main" id="{979E66C2-27F5-4ADA-B05B-28A7E30C72C4}"/>
               </a:ext>
             </a:extLst>
           </p:cNvPr>
@@ -2010,7 +2012,7 @@
           <p:cNvPr id="5" name="Slide Number Placeholder 4">
             <a:extLst>
               <a:ext uri="{FF2B5EF4-FFF2-40B4-BE49-F238E27FC236}">
-                <a16:creationId xmlns:a16="http://schemas.microsoft.com/office/drawing/2014/main" xmlns="" id="{339F570E-2EBF-491A-B1A3-7B0020A39D87}"/>
+                <a16:creationId xmlns="" xmlns:a16="http://schemas.microsoft.com/office/drawing/2014/main" id="{339F570E-2EBF-491A-B1A3-7B0020A39D87}"/>
               </a:ext>
             </a:extLst>
           </p:cNvPr>
@@ -2069,7 +2071,7 @@
           <p:cNvPr id="2" name="Date Placeholder 1">
             <a:extLst>
               <a:ext uri="{FF2B5EF4-FFF2-40B4-BE49-F238E27FC236}">
-                <a16:creationId xmlns:a16="http://schemas.microsoft.com/office/drawing/2014/main" xmlns="" id="{31CC9DF5-DDBA-4A27-A2BE-EE4875C95E73}"/>
+                <a16:creationId xmlns="" xmlns:a16="http://schemas.microsoft.com/office/drawing/2014/main" id="{31CC9DF5-DDBA-4A27-A2BE-EE4875C95E73}"/>
               </a:ext>
             </a:extLst>
           </p:cNvPr>
@@ -2087,7 +2089,7 @@
           <a:p>
             <a:fld id="{2F956D3E-0B91-471C-9743-3F865EE6F573}" type="datetimeFigureOut">
               <a:rPr lang="en-AU" smtClean="0"/>
-              <a:t>17/08/2018</a:t>
+              <a:t>20/08/2018</a:t>
             </a:fld>
             <a:endParaRPr lang="en-AU"/>
           </a:p>
@@ -2098,7 +2100,7 @@
           <p:cNvPr id="3" name="Footer Placeholder 2">
             <a:extLst>
               <a:ext uri="{FF2B5EF4-FFF2-40B4-BE49-F238E27FC236}">
-                <a16:creationId xmlns:a16="http://schemas.microsoft.com/office/drawing/2014/main" xmlns="" id="{5E855F50-D457-4213-B498-4635BD853470}"/>
+                <a16:creationId xmlns="" xmlns:a16="http://schemas.microsoft.com/office/drawing/2014/main" id="{5E855F50-D457-4213-B498-4635BD853470}"/>
               </a:ext>
             </a:extLst>
           </p:cNvPr>
@@ -2123,7 +2125,7 @@
           <p:cNvPr id="4" name="Slide Number Placeholder 3">
             <a:extLst>
               <a:ext uri="{FF2B5EF4-FFF2-40B4-BE49-F238E27FC236}">
-                <a16:creationId xmlns:a16="http://schemas.microsoft.com/office/drawing/2014/main" xmlns="" id="{1424F85B-ACD9-4362-A6F2-B7C48F575113}"/>
+                <a16:creationId xmlns="" xmlns:a16="http://schemas.microsoft.com/office/drawing/2014/main" id="{1424F85B-ACD9-4362-A6F2-B7C48F575113}"/>
               </a:ext>
             </a:extLst>
           </p:cNvPr>
@@ -2182,7 +2184,7 @@
           <p:cNvPr id="2" name="Title 1">
             <a:extLst>
               <a:ext uri="{FF2B5EF4-FFF2-40B4-BE49-F238E27FC236}">
-                <a16:creationId xmlns:a16="http://schemas.microsoft.com/office/drawing/2014/main" xmlns="" id="{BD554F58-5E8E-48ED-8ED9-A0BD06E6F218}"/>
+                <a16:creationId xmlns="" xmlns:a16="http://schemas.microsoft.com/office/drawing/2014/main" id="{BD554F58-5E8E-48ED-8ED9-A0BD06E6F218}"/>
               </a:ext>
             </a:extLst>
           </p:cNvPr>
@@ -2220,7 +2222,7 @@
           <p:cNvPr id="3" name="Content Placeholder 2">
             <a:extLst>
               <a:ext uri="{FF2B5EF4-FFF2-40B4-BE49-F238E27FC236}">
-                <a16:creationId xmlns:a16="http://schemas.microsoft.com/office/drawing/2014/main" xmlns="" id="{88E32398-FD1A-4262-BB8C-6CFB63C85CED}"/>
+                <a16:creationId xmlns="" xmlns:a16="http://schemas.microsoft.com/office/drawing/2014/main" id="{88E32398-FD1A-4262-BB8C-6CFB63C85CED}"/>
               </a:ext>
             </a:extLst>
           </p:cNvPr>
@@ -2311,7 +2313,7 @@
           <p:cNvPr id="4" name="Text Placeholder 3">
             <a:extLst>
               <a:ext uri="{FF2B5EF4-FFF2-40B4-BE49-F238E27FC236}">
-                <a16:creationId xmlns:a16="http://schemas.microsoft.com/office/drawing/2014/main" xmlns="" id="{373EAC1B-2FB9-4226-BCA0-E5D3B01D6FA0}"/>
+                <a16:creationId xmlns="" xmlns:a16="http://schemas.microsoft.com/office/drawing/2014/main" id="{373EAC1B-2FB9-4226-BCA0-E5D3B01D6FA0}"/>
               </a:ext>
             </a:extLst>
           </p:cNvPr>
@@ -2382,7 +2384,7 @@
           <p:cNvPr id="5" name="Date Placeholder 4">
             <a:extLst>
               <a:ext uri="{FF2B5EF4-FFF2-40B4-BE49-F238E27FC236}">
-                <a16:creationId xmlns:a16="http://schemas.microsoft.com/office/drawing/2014/main" xmlns="" id="{D639F409-5438-45DD-BECC-62B7B0AAF361}"/>
+                <a16:creationId xmlns="" xmlns:a16="http://schemas.microsoft.com/office/drawing/2014/main" id="{D639F409-5438-45DD-BECC-62B7B0AAF361}"/>
               </a:ext>
             </a:extLst>
           </p:cNvPr>
@@ -2400,7 +2402,7 @@
           <a:p>
             <a:fld id="{2F956D3E-0B91-471C-9743-3F865EE6F573}" type="datetimeFigureOut">
               <a:rPr lang="en-AU" smtClean="0"/>
-              <a:t>17/08/2018</a:t>
+              <a:t>20/08/2018</a:t>
             </a:fld>
             <a:endParaRPr lang="en-AU"/>
           </a:p>
@@ -2411,7 +2413,7 @@
           <p:cNvPr id="6" name="Footer Placeholder 5">
             <a:extLst>
               <a:ext uri="{FF2B5EF4-FFF2-40B4-BE49-F238E27FC236}">
-                <a16:creationId xmlns:a16="http://schemas.microsoft.com/office/drawing/2014/main" xmlns="" id="{2311AAC2-3F58-465D-8275-AAB451586BBE}"/>
+                <a16:creationId xmlns="" xmlns:a16="http://schemas.microsoft.com/office/drawing/2014/main" id="{2311AAC2-3F58-465D-8275-AAB451586BBE}"/>
               </a:ext>
             </a:extLst>
           </p:cNvPr>
@@ -2436,7 +2438,7 @@
           <p:cNvPr id="7" name="Slide Number Placeholder 6">
             <a:extLst>
               <a:ext uri="{FF2B5EF4-FFF2-40B4-BE49-F238E27FC236}">
-                <a16:creationId xmlns:a16="http://schemas.microsoft.com/office/drawing/2014/main" xmlns="" id="{4076C87A-5864-468D-9EE2-7F4B0C093074}"/>
+                <a16:creationId xmlns="" xmlns:a16="http://schemas.microsoft.com/office/drawing/2014/main" id="{4076C87A-5864-468D-9EE2-7F4B0C093074}"/>
               </a:ext>
             </a:extLst>
           </p:cNvPr>
@@ -2495,7 +2497,7 @@
           <p:cNvPr id="2" name="Title 1">
             <a:extLst>
               <a:ext uri="{FF2B5EF4-FFF2-40B4-BE49-F238E27FC236}">
-                <a16:creationId xmlns:a16="http://schemas.microsoft.com/office/drawing/2014/main" xmlns="" id="{B5D51929-B485-4C5E-86DE-E6E2074D6CE5}"/>
+                <a16:creationId xmlns="" xmlns:a16="http://schemas.microsoft.com/office/drawing/2014/main" id="{B5D51929-B485-4C5E-86DE-E6E2074D6CE5}"/>
               </a:ext>
             </a:extLst>
           </p:cNvPr>
@@ -2533,7 +2535,7 @@
           <p:cNvPr id="3" name="Picture Placeholder 2">
             <a:extLst>
               <a:ext uri="{FF2B5EF4-FFF2-40B4-BE49-F238E27FC236}">
-                <a16:creationId xmlns:a16="http://schemas.microsoft.com/office/drawing/2014/main" xmlns="" id="{745CAD50-DBFD-4B1E-8C5A-FEC1D2159DDB}"/>
+                <a16:creationId xmlns="" xmlns:a16="http://schemas.microsoft.com/office/drawing/2014/main" id="{745CAD50-DBFD-4B1E-8C5A-FEC1D2159DDB}"/>
               </a:ext>
             </a:extLst>
           </p:cNvPr>
@@ -2600,7 +2602,7 @@
           <p:cNvPr id="4" name="Text Placeholder 3">
             <a:extLst>
               <a:ext uri="{FF2B5EF4-FFF2-40B4-BE49-F238E27FC236}">
-                <a16:creationId xmlns:a16="http://schemas.microsoft.com/office/drawing/2014/main" xmlns="" id="{56CA1066-373C-4A49-B657-9EE7DCD0952D}"/>
+                <a16:creationId xmlns="" xmlns:a16="http://schemas.microsoft.com/office/drawing/2014/main" id="{56CA1066-373C-4A49-B657-9EE7DCD0952D}"/>
               </a:ext>
             </a:extLst>
           </p:cNvPr>
@@ -2671,7 +2673,7 @@
           <p:cNvPr id="5" name="Date Placeholder 4">
             <a:extLst>
               <a:ext uri="{FF2B5EF4-FFF2-40B4-BE49-F238E27FC236}">
-                <a16:creationId xmlns:a16="http://schemas.microsoft.com/office/drawing/2014/main" xmlns="" id="{D4F04E1C-BF5B-43FA-9CA9-C4A3872ABD47}"/>
+                <a16:creationId xmlns="" xmlns:a16="http://schemas.microsoft.com/office/drawing/2014/main" id="{D4F04E1C-BF5B-43FA-9CA9-C4A3872ABD47}"/>
               </a:ext>
             </a:extLst>
           </p:cNvPr>
@@ -2689,7 +2691,7 @@
           <a:p>
             <a:fld id="{2F956D3E-0B91-471C-9743-3F865EE6F573}" type="datetimeFigureOut">
               <a:rPr lang="en-AU" smtClean="0"/>
-              <a:t>17/08/2018</a:t>
+              <a:t>20/08/2018</a:t>
             </a:fld>
             <a:endParaRPr lang="en-AU"/>
           </a:p>
@@ -2700,7 +2702,7 @@
           <p:cNvPr id="6" name="Footer Placeholder 5">
             <a:extLst>
               <a:ext uri="{FF2B5EF4-FFF2-40B4-BE49-F238E27FC236}">
-                <a16:creationId xmlns:a16="http://schemas.microsoft.com/office/drawing/2014/main" xmlns="" id="{B3F3C200-5776-44B6-80D6-B576FC6FE4A1}"/>
+                <a16:creationId xmlns="" xmlns:a16="http://schemas.microsoft.com/office/drawing/2014/main" id="{B3F3C200-5776-44B6-80D6-B576FC6FE4A1}"/>
               </a:ext>
             </a:extLst>
           </p:cNvPr>
@@ -2725,7 +2727,7 @@
           <p:cNvPr id="7" name="Slide Number Placeholder 6">
             <a:extLst>
               <a:ext uri="{FF2B5EF4-FFF2-40B4-BE49-F238E27FC236}">
-                <a16:creationId xmlns:a16="http://schemas.microsoft.com/office/drawing/2014/main" xmlns="" id="{C83FA351-8092-4D78-A9C7-A20A77930D3D}"/>
+                <a16:creationId xmlns="" xmlns:a16="http://schemas.microsoft.com/office/drawing/2014/main" id="{C83FA351-8092-4D78-A9C7-A20A77930D3D}"/>
               </a:ext>
             </a:extLst>
           </p:cNvPr>
@@ -2789,7 +2791,7 @@
           <p:cNvPr id="2" name="Title Placeholder 1">
             <a:extLst>
               <a:ext uri="{FF2B5EF4-FFF2-40B4-BE49-F238E27FC236}">
-                <a16:creationId xmlns:a16="http://schemas.microsoft.com/office/drawing/2014/main" xmlns="" id="{417237BA-4865-4280-8BD0-E6D106DFB608}"/>
+                <a16:creationId xmlns="" xmlns:a16="http://schemas.microsoft.com/office/drawing/2014/main" id="{417237BA-4865-4280-8BD0-E6D106DFB608}"/>
               </a:ext>
             </a:extLst>
           </p:cNvPr>
@@ -2828,7 +2830,7 @@
           <p:cNvPr id="3" name="Text Placeholder 2">
             <a:extLst>
               <a:ext uri="{FF2B5EF4-FFF2-40B4-BE49-F238E27FC236}">
-                <a16:creationId xmlns:a16="http://schemas.microsoft.com/office/drawing/2014/main" xmlns="" id="{CFD6DF4C-CD43-4DDE-9E26-4DAB0E753402}"/>
+                <a16:creationId xmlns="" xmlns:a16="http://schemas.microsoft.com/office/drawing/2014/main" id="{CFD6DF4C-CD43-4DDE-9E26-4DAB0E753402}"/>
               </a:ext>
             </a:extLst>
           </p:cNvPr>
@@ -2896,7 +2898,7 @@
           <p:cNvPr id="4" name="Date Placeholder 3">
             <a:extLst>
               <a:ext uri="{FF2B5EF4-FFF2-40B4-BE49-F238E27FC236}">
-                <a16:creationId xmlns:a16="http://schemas.microsoft.com/office/drawing/2014/main" xmlns="" id="{4E8F96A9-316E-4272-B736-3B7A5BEFB368}"/>
+                <a16:creationId xmlns="" xmlns:a16="http://schemas.microsoft.com/office/drawing/2014/main" id="{4E8F96A9-316E-4272-B736-3B7A5BEFB368}"/>
               </a:ext>
             </a:extLst>
           </p:cNvPr>
@@ -2932,7 +2934,7 @@
           <a:p>
             <a:fld id="{2F956D3E-0B91-471C-9743-3F865EE6F573}" type="datetimeFigureOut">
               <a:rPr lang="en-AU" smtClean="0"/>
-              <a:t>17/08/2018</a:t>
+              <a:t>20/08/2018</a:t>
             </a:fld>
             <a:endParaRPr lang="en-AU"/>
           </a:p>
@@ -2943,7 +2945,7 @@
           <p:cNvPr id="5" name="Footer Placeholder 4">
             <a:extLst>
               <a:ext uri="{FF2B5EF4-FFF2-40B4-BE49-F238E27FC236}">
-                <a16:creationId xmlns:a16="http://schemas.microsoft.com/office/drawing/2014/main" xmlns="" id="{5B9B060F-4139-42DD-835A-DD48B4C35B93}"/>
+                <a16:creationId xmlns="" xmlns:a16="http://schemas.microsoft.com/office/drawing/2014/main" id="{5B9B060F-4139-42DD-835A-DD48B4C35B93}"/>
               </a:ext>
             </a:extLst>
           </p:cNvPr>
@@ -2986,7 +2988,7 @@
           <p:cNvPr id="6" name="Slide Number Placeholder 5">
             <a:extLst>
               <a:ext uri="{FF2B5EF4-FFF2-40B4-BE49-F238E27FC236}">
-                <a16:creationId xmlns:a16="http://schemas.microsoft.com/office/drawing/2014/main" xmlns="" id="{419ED261-D27A-4F8B-A664-31C7824BE2CC}"/>
+                <a16:creationId xmlns="" xmlns:a16="http://schemas.microsoft.com/office/drawing/2014/main" id="{419ED261-D27A-4F8B-A664-31C7824BE2CC}"/>
               </a:ext>
             </a:extLst>
           </p:cNvPr>
@@ -3354,7 +3356,7 @@
           <p:cNvPr id="4" name="Rectangle: Rounded Corners 3">
             <a:extLst>
               <a:ext uri="{FF2B5EF4-FFF2-40B4-BE49-F238E27FC236}">
-                <a16:creationId xmlns:a16="http://schemas.microsoft.com/office/drawing/2014/main" xmlns="" id="{54D0FB8B-B098-491A-AD31-AD421AB902EF}"/>
+                <a16:creationId xmlns="" xmlns:a16="http://schemas.microsoft.com/office/drawing/2014/main" id="{54D0FB8B-B098-491A-AD31-AD421AB902EF}"/>
               </a:ext>
             </a:extLst>
           </p:cNvPr>
@@ -3413,7 +3415,7 @@
           <p:cNvPr id="5" name="Rectangle: Rounded Corners 4">
             <a:extLst>
               <a:ext uri="{FF2B5EF4-FFF2-40B4-BE49-F238E27FC236}">
-                <a16:creationId xmlns:a16="http://schemas.microsoft.com/office/drawing/2014/main" xmlns="" id="{5675C345-97DA-44C4-8895-174F9B25EB74}"/>
+                <a16:creationId xmlns="" xmlns:a16="http://schemas.microsoft.com/office/drawing/2014/main" id="{5675C345-97DA-44C4-8895-174F9B25EB74}"/>
               </a:ext>
             </a:extLst>
           </p:cNvPr>
@@ -3472,7 +3474,7 @@
           <p:cNvPr id="10" name="Straight Arrow Connector 9">
             <a:extLst>
               <a:ext uri="{FF2B5EF4-FFF2-40B4-BE49-F238E27FC236}">
-                <a16:creationId xmlns:a16="http://schemas.microsoft.com/office/drawing/2014/main" xmlns="" id="{2738494B-22BB-4E16-AA8E-063441F62080}"/>
+                <a16:creationId xmlns="" xmlns:a16="http://schemas.microsoft.com/office/drawing/2014/main" id="{2738494B-22BB-4E16-AA8E-063441F62080}"/>
               </a:ext>
             </a:extLst>
           </p:cNvPr>
@@ -3514,7 +3516,7 @@
           <p:cNvPr id="11" name="TextBox 10">
             <a:extLst>
               <a:ext uri="{FF2B5EF4-FFF2-40B4-BE49-F238E27FC236}">
-                <a16:creationId xmlns:a16="http://schemas.microsoft.com/office/drawing/2014/main" xmlns="" id="{EA0207FA-CB6D-4700-A943-37A35E7A7F6C}"/>
+                <a16:creationId xmlns="" xmlns:a16="http://schemas.microsoft.com/office/drawing/2014/main" id="{EA0207FA-CB6D-4700-A943-37A35E7A7F6C}"/>
               </a:ext>
             </a:extLst>
           </p:cNvPr>
@@ -3550,7 +3552,7 @@
           <p:cNvPr id="12" name="Rectangle: Rounded Corners 11">
             <a:extLst>
               <a:ext uri="{FF2B5EF4-FFF2-40B4-BE49-F238E27FC236}">
-                <a16:creationId xmlns:a16="http://schemas.microsoft.com/office/drawing/2014/main" xmlns="" id="{0172D6A7-F319-4C98-BCFD-58AB9FFA137C}"/>
+                <a16:creationId xmlns="" xmlns:a16="http://schemas.microsoft.com/office/drawing/2014/main" id="{0172D6A7-F319-4C98-BCFD-58AB9FFA137C}"/>
               </a:ext>
             </a:extLst>
           </p:cNvPr>
@@ -3609,7 +3611,7 @@
           <p:cNvPr id="13" name="Rectangle: Rounded Corners 12">
             <a:extLst>
               <a:ext uri="{FF2B5EF4-FFF2-40B4-BE49-F238E27FC236}">
-                <a16:creationId xmlns:a16="http://schemas.microsoft.com/office/drawing/2014/main" xmlns="" id="{351768B8-B0F4-49E5-A1C4-CB95780972A0}"/>
+                <a16:creationId xmlns="" xmlns:a16="http://schemas.microsoft.com/office/drawing/2014/main" id="{351768B8-B0F4-49E5-A1C4-CB95780972A0}"/>
               </a:ext>
             </a:extLst>
           </p:cNvPr>
@@ -3668,7 +3670,7 @@
           <p:cNvPr id="14" name="Rectangle: Rounded Corners 13">
             <a:extLst>
               <a:ext uri="{FF2B5EF4-FFF2-40B4-BE49-F238E27FC236}">
-                <a16:creationId xmlns:a16="http://schemas.microsoft.com/office/drawing/2014/main" xmlns="" id="{C3BAB69B-ADA0-48E1-A7A3-2F500C2A407E}"/>
+                <a16:creationId xmlns="" xmlns:a16="http://schemas.microsoft.com/office/drawing/2014/main" id="{C3BAB69B-ADA0-48E1-A7A3-2F500C2A407E}"/>
               </a:ext>
             </a:extLst>
           </p:cNvPr>
@@ -3727,7 +3729,7 @@
           <p:cNvPr id="15" name="Rectangle: Rounded Corners 14">
             <a:extLst>
               <a:ext uri="{FF2B5EF4-FFF2-40B4-BE49-F238E27FC236}">
-                <a16:creationId xmlns:a16="http://schemas.microsoft.com/office/drawing/2014/main" xmlns="" id="{415FC0F5-4B41-4A53-9189-AE991ED2BD31}"/>
+                <a16:creationId xmlns="" xmlns:a16="http://schemas.microsoft.com/office/drawing/2014/main" id="{415FC0F5-4B41-4A53-9189-AE991ED2BD31}"/>
               </a:ext>
             </a:extLst>
           </p:cNvPr>
@@ -3786,7 +3788,7 @@
           <p:cNvPr id="16" name="Rectangle: Rounded Corners 15">
             <a:extLst>
               <a:ext uri="{FF2B5EF4-FFF2-40B4-BE49-F238E27FC236}">
-                <a16:creationId xmlns:a16="http://schemas.microsoft.com/office/drawing/2014/main" xmlns="" id="{80DE7B24-B7E9-47B6-8E88-EC972ED19123}"/>
+                <a16:creationId xmlns="" xmlns:a16="http://schemas.microsoft.com/office/drawing/2014/main" id="{80DE7B24-B7E9-47B6-8E88-EC972ED19123}"/>
               </a:ext>
             </a:extLst>
           </p:cNvPr>
@@ -3845,7 +3847,7 @@
           <p:cNvPr id="17" name="Connector: Elbow 16">
             <a:extLst>
               <a:ext uri="{FF2B5EF4-FFF2-40B4-BE49-F238E27FC236}">
-                <a16:creationId xmlns:a16="http://schemas.microsoft.com/office/drawing/2014/main" xmlns="" id="{64514852-CA0B-4B22-9112-9C0EFB8F9B9B}"/>
+                <a16:creationId xmlns="" xmlns:a16="http://schemas.microsoft.com/office/drawing/2014/main" id="{64514852-CA0B-4B22-9112-9C0EFB8F9B9B}"/>
               </a:ext>
             </a:extLst>
           </p:cNvPr>
@@ -3893,7 +3895,7 @@
           <p:cNvPr id="20" name="Connector: Elbow 19">
             <a:extLst>
               <a:ext uri="{FF2B5EF4-FFF2-40B4-BE49-F238E27FC236}">
-                <a16:creationId xmlns:a16="http://schemas.microsoft.com/office/drawing/2014/main" xmlns="" id="{E118E15D-38EF-455D-87FB-59C64F2455B6}"/>
+                <a16:creationId xmlns="" xmlns:a16="http://schemas.microsoft.com/office/drawing/2014/main" id="{E118E15D-38EF-455D-87FB-59C64F2455B6}"/>
               </a:ext>
             </a:extLst>
           </p:cNvPr>
@@ -3941,7 +3943,7 @@
           <p:cNvPr id="23" name="Connector: Elbow 22">
             <a:extLst>
               <a:ext uri="{FF2B5EF4-FFF2-40B4-BE49-F238E27FC236}">
-                <a16:creationId xmlns:a16="http://schemas.microsoft.com/office/drawing/2014/main" xmlns="" id="{B493C084-F212-492E-957C-8BEA879E995D}"/>
+                <a16:creationId xmlns="" xmlns:a16="http://schemas.microsoft.com/office/drawing/2014/main" id="{B493C084-F212-492E-957C-8BEA879E995D}"/>
               </a:ext>
             </a:extLst>
           </p:cNvPr>
@@ -3989,7 +3991,7 @@
           <p:cNvPr id="30" name="Rectangle: Rounded Corners 29">
             <a:extLst>
               <a:ext uri="{FF2B5EF4-FFF2-40B4-BE49-F238E27FC236}">
-                <a16:creationId xmlns:a16="http://schemas.microsoft.com/office/drawing/2014/main" xmlns="" id="{19F24737-7B63-4E7B-9AE5-A87497FA6FAF}"/>
+                <a16:creationId xmlns="" xmlns:a16="http://schemas.microsoft.com/office/drawing/2014/main" id="{19F24737-7B63-4E7B-9AE5-A87497FA6FAF}"/>
               </a:ext>
             </a:extLst>
           </p:cNvPr>
@@ -4048,7 +4050,7 @@
           <p:cNvPr id="31" name="Rectangle: Rounded Corners 30">
             <a:extLst>
               <a:ext uri="{FF2B5EF4-FFF2-40B4-BE49-F238E27FC236}">
-                <a16:creationId xmlns:a16="http://schemas.microsoft.com/office/drawing/2014/main" xmlns="" id="{7BC2DA58-1C14-4D8B-9AF3-E14F6FAD8FC0}"/>
+                <a16:creationId xmlns="" xmlns:a16="http://schemas.microsoft.com/office/drawing/2014/main" id="{7BC2DA58-1C14-4D8B-9AF3-E14F6FAD8FC0}"/>
               </a:ext>
             </a:extLst>
           </p:cNvPr>
@@ -4107,7 +4109,7 @@
           <p:cNvPr id="32" name="Rectangle: Rounded Corners 31">
             <a:extLst>
               <a:ext uri="{FF2B5EF4-FFF2-40B4-BE49-F238E27FC236}">
-                <a16:creationId xmlns:a16="http://schemas.microsoft.com/office/drawing/2014/main" xmlns="" id="{A2415D34-9AEB-4D3C-8B85-9A65A96218FE}"/>
+                <a16:creationId xmlns="" xmlns:a16="http://schemas.microsoft.com/office/drawing/2014/main" id="{A2415D34-9AEB-4D3C-8B85-9A65A96218FE}"/>
               </a:ext>
             </a:extLst>
           </p:cNvPr>
@@ -4166,7 +4168,7 @@
           <p:cNvPr id="33" name="Connector: Elbow 32">
             <a:extLst>
               <a:ext uri="{FF2B5EF4-FFF2-40B4-BE49-F238E27FC236}">
-                <a16:creationId xmlns:a16="http://schemas.microsoft.com/office/drawing/2014/main" xmlns="" id="{821A3089-B696-4653-B73B-39B49F027466}"/>
+                <a16:creationId xmlns="" xmlns:a16="http://schemas.microsoft.com/office/drawing/2014/main" id="{821A3089-B696-4653-B73B-39B49F027466}"/>
               </a:ext>
             </a:extLst>
           </p:cNvPr>
@@ -4214,7 +4216,7 @@
           <p:cNvPr id="36" name="Connector: Elbow 35">
             <a:extLst>
               <a:ext uri="{FF2B5EF4-FFF2-40B4-BE49-F238E27FC236}">
-                <a16:creationId xmlns:a16="http://schemas.microsoft.com/office/drawing/2014/main" xmlns="" id="{0E570848-FE64-4E6A-A947-1CBC1911E97A}"/>
+                <a16:creationId xmlns="" xmlns:a16="http://schemas.microsoft.com/office/drawing/2014/main" id="{0E570848-FE64-4E6A-A947-1CBC1911E97A}"/>
               </a:ext>
             </a:extLst>
           </p:cNvPr>
@@ -4262,7 +4264,7 @@
           <p:cNvPr id="8" name="Straight Arrow Connector 7">
             <a:extLst>
               <a:ext uri="{FF2B5EF4-FFF2-40B4-BE49-F238E27FC236}">
-                <a16:creationId xmlns:a16="http://schemas.microsoft.com/office/drawing/2014/main" xmlns="" id="{02FF8AEF-9744-4B1C-ACB9-E3241ACF27D1}"/>
+                <a16:creationId xmlns="" xmlns:a16="http://schemas.microsoft.com/office/drawing/2014/main" id="{02FF8AEF-9744-4B1C-ACB9-E3241ACF27D1}"/>
               </a:ext>
             </a:extLst>
           </p:cNvPr>
@@ -4307,7 +4309,7 @@
           <p:cNvPr id="25" name="Rectangle: Rounded Corners 24">
             <a:extLst>
               <a:ext uri="{FF2B5EF4-FFF2-40B4-BE49-F238E27FC236}">
-                <a16:creationId xmlns:a16="http://schemas.microsoft.com/office/drawing/2014/main" xmlns="" id="{509E733A-9C35-48BC-B1CE-379C573000FE}"/>
+                <a16:creationId xmlns="" xmlns:a16="http://schemas.microsoft.com/office/drawing/2014/main" id="{509E733A-9C35-48BC-B1CE-379C573000FE}"/>
               </a:ext>
             </a:extLst>
           </p:cNvPr>
@@ -4366,7 +4368,7 @@
           <p:cNvPr id="26" name="Straight Arrow Connector 25">
             <a:extLst>
               <a:ext uri="{FF2B5EF4-FFF2-40B4-BE49-F238E27FC236}">
-                <a16:creationId xmlns:a16="http://schemas.microsoft.com/office/drawing/2014/main" xmlns="" id="{45BB73C4-0487-4332-804D-0640F1C24DD7}"/>
+                <a16:creationId xmlns="" xmlns:a16="http://schemas.microsoft.com/office/drawing/2014/main" id="{45BB73C4-0487-4332-804D-0640F1C24DD7}"/>
               </a:ext>
             </a:extLst>
           </p:cNvPr>
@@ -4413,7 +4415,7 @@
           <p:cNvPr id="29" name="TextBox 28">
             <a:extLst>
               <a:ext uri="{FF2B5EF4-FFF2-40B4-BE49-F238E27FC236}">
-                <a16:creationId xmlns:a16="http://schemas.microsoft.com/office/drawing/2014/main" xmlns="" id="{ECF64CE6-E66F-4FF9-8239-2D9801A3273B}"/>
+                <a16:creationId xmlns="" xmlns:a16="http://schemas.microsoft.com/office/drawing/2014/main" id="{ECF64CE6-E66F-4FF9-8239-2D9801A3273B}"/>
               </a:ext>
             </a:extLst>
           </p:cNvPr>
@@ -4449,7 +4451,7 @@
           <p:cNvPr id="34" name="Connector: Elbow 33">
             <a:extLst>
               <a:ext uri="{FF2B5EF4-FFF2-40B4-BE49-F238E27FC236}">
-                <a16:creationId xmlns:a16="http://schemas.microsoft.com/office/drawing/2014/main" xmlns="" id="{762DA317-C2C5-4F35-8BEE-2475336742C9}"/>
+                <a16:creationId xmlns="" xmlns:a16="http://schemas.microsoft.com/office/drawing/2014/main" id="{762DA317-C2C5-4F35-8BEE-2475336742C9}"/>
               </a:ext>
             </a:extLst>
           </p:cNvPr>
@@ -4498,7 +4500,7 @@
           <p:cNvPr id="35" name="Connector: Elbow 34">
             <a:extLst>
               <a:ext uri="{FF2B5EF4-FFF2-40B4-BE49-F238E27FC236}">
-                <a16:creationId xmlns:a16="http://schemas.microsoft.com/office/drawing/2014/main" xmlns="" id="{326F3BCB-F2A3-492C-A8F3-20922107B29D}"/>
+                <a16:creationId xmlns="" xmlns:a16="http://schemas.microsoft.com/office/drawing/2014/main" id="{326F3BCB-F2A3-492C-A8F3-20922107B29D}"/>
               </a:ext>
             </a:extLst>
           </p:cNvPr>
@@ -4547,7 +4549,7 @@
           <p:cNvPr id="37" name="Connector: Elbow 36">
             <a:extLst>
               <a:ext uri="{FF2B5EF4-FFF2-40B4-BE49-F238E27FC236}">
-                <a16:creationId xmlns:a16="http://schemas.microsoft.com/office/drawing/2014/main" xmlns="" id="{D78C9AF8-6E97-4A41-9699-F00133FB72EE}"/>
+                <a16:creationId xmlns="" xmlns:a16="http://schemas.microsoft.com/office/drawing/2014/main" id="{D78C9AF8-6E97-4A41-9699-F00133FB72EE}"/>
               </a:ext>
             </a:extLst>
           </p:cNvPr>
@@ -4596,7 +4598,7 @@
           <p:cNvPr id="83" name="TextBox 82">
             <a:extLst>
               <a:ext uri="{FF2B5EF4-FFF2-40B4-BE49-F238E27FC236}">
-                <a16:creationId xmlns:a16="http://schemas.microsoft.com/office/drawing/2014/main" xmlns="" id="{C34CC880-1902-497C-A44A-571D93EAD548}"/>
+                <a16:creationId xmlns="" xmlns:a16="http://schemas.microsoft.com/office/drawing/2014/main" id="{C34CC880-1902-497C-A44A-571D93EAD548}"/>
               </a:ext>
             </a:extLst>
           </p:cNvPr>
@@ -4631,7 +4633,7 @@
           <p:cNvPr id="84" name="TextBox 83">
             <a:extLst>
               <a:ext uri="{FF2B5EF4-FFF2-40B4-BE49-F238E27FC236}">
-                <a16:creationId xmlns:a16="http://schemas.microsoft.com/office/drawing/2014/main" xmlns="" id="{582DAA28-77DF-48AB-A0FA-7D0944EEA418}"/>
+                <a16:creationId xmlns="" xmlns:a16="http://schemas.microsoft.com/office/drawing/2014/main" id="{582DAA28-77DF-48AB-A0FA-7D0944EEA418}"/>
               </a:ext>
             </a:extLst>
           </p:cNvPr>
@@ -4666,7 +4668,7 @@
           <p:cNvPr id="85" name="TextBox 84">
             <a:extLst>
               <a:ext uri="{FF2B5EF4-FFF2-40B4-BE49-F238E27FC236}">
-                <a16:creationId xmlns:a16="http://schemas.microsoft.com/office/drawing/2014/main" xmlns="" id="{35632462-2816-4AB9-8863-E2858DF02B69}"/>
+                <a16:creationId xmlns="" xmlns:a16="http://schemas.microsoft.com/office/drawing/2014/main" id="{35632462-2816-4AB9-8863-E2858DF02B69}"/>
               </a:ext>
             </a:extLst>
           </p:cNvPr>
@@ -4701,7 +4703,7 @@
           <p:cNvPr id="98" name="Connector: Elbow 97">
             <a:extLst>
               <a:ext uri="{FF2B5EF4-FFF2-40B4-BE49-F238E27FC236}">
-                <a16:creationId xmlns:a16="http://schemas.microsoft.com/office/drawing/2014/main" xmlns="" id="{A1F2BECA-1D96-4FF9-8754-645C1D7726F8}"/>
+                <a16:creationId xmlns="" xmlns:a16="http://schemas.microsoft.com/office/drawing/2014/main" id="{A1F2BECA-1D96-4FF9-8754-645C1D7726F8}"/>
               </a:ext>
             </a:extLst>
           </p:cNvPr>
@@ -4750,7 +4752,7 @@
           <p:cNvPr id="101" name="Connector: Elbow 100">
             <a:extLst>
               <a:ext uri="{FF2B5EF4-FFF2-40B4-BE49-F238E27FC236}">
-                <a16:creationId xmlns:a16="http://schemas.microsoft.com/office/drawing/2014/main" xmlns="" id="{36519D8D-4EA4-45AD-AD01-BCA533BD100D}"/>
+                <a16:creationId xmlns="" xmlns:a16="http://schemas.microsoft.com/office/drawing/2014/main" id="{36519D8D-4EA4-45AD-AD01-BCA533BD100D}"/>
               </a:ext>
             </a:extLst>
           </p:cNvPr>
@@ -4799,7 +4801,7 @@
           <p:cNvPr id="104" name="TextBox 103">
             <a:extLst>
               <a:ext uri="{FF2B5EF4-FFF2-40B4-BE49-F238E27FC236}">
-                <a16:creationId xmlns:a16="http://schemas.microsoft.com/office/drawing/2014/main" xmlns="" id="{6D855CC4-9F24-4FB0-84C5-F540689823DA}"/>
+                <a16:creationId xmlns="" xmlns:a16="http://schemas.microsoft.com/office/drawing/2014/main" id="{6D855CC4-9F24-4FB0-84C5-F540689823DA}"/>
               </a:ext>
             </a:extLst>
           </p:cNvPr>
@@ -4834,7 +4836,7 @@
           <p:cNvPr id="105" name="TextBox 104">
             <a:extLst>
               <a:ext uri="{FF2B5EF4-FFF2-40B4-BE49-F238E27FC236}">
-                <a16:creationId xmlns:a16="http://schemas.microsoft.com/office/drawing/2014/main" xmlns="" id="{312F8B0D-878E-4CFD-AF2D-6C5C84BC7C3F}"/>
+                <a16:creationId xmlns="" xmlns:a16="http://schemas.microsoft.com/office/drawing/2014/main" id="{312F8B0D-878E-4CFD-AF2D-6C5C84BC7C3F}"/>
               </a:ext>
             </a:extLst>
           </p:cNvPr>
@@ -4869,7 +4871,7 @@
           <p:cNvPr id="106" name="Connector: Elbow 105">
             <a:extLst>
               <a:ext uri="{FF2B5EF4-FFF2-40B4-BE49-F238E27FC236}">
-                <a16:creationId xmlns:a16="http://schemas.microsoft.com/office/drawing/2014/main" xmlns="" id="{AFDAAF80-D279-45C4-BA1C-63276C92DDEA}"/>
+                <a16:creationId xmlns="" xmlns:a16="http://schemas.microsoft.com/office/drawing/2014/main" id="{AFDAAF80-D279-45C4-BA1C-63276C92DDEA}"/>
               </a:ext>
             </a:extLst>
           </p:cNvPr>
@@ -4918,7 +4920,7 @@
           <p:cNvPr id="109" name="TextBox 108">
             <a:extLst>
               <a:ext uri="{FF2B5EF4-FFF2-40B4-BE49-F238E27FC236}">
-                <a16:creationId xmlns:a16="http://schemas.microsoft.com/office/drawing/2014/main" xmlns="" id="{68F80759-A938-4EC4-AB28-CF35C69A0B12}"/>
+                <a16:creationId xmlns="" xmlns:a16="http://schemas.microsoft.com/office/drawing/2014/main" id="{68F80759-A938-4EC4-AB28-CF35C69A0B12}"/>
               </a:ext>
             </a:extLst>
           </p:cNvPr>
@@ -10266,6 +10268,1464 @@
     <p:extLst>
       <p:ext uri="{BB962C8B-B14F-4D97-AF65-F5344CB8AC3E}">
         <p14:creationId xmlns:p14="http://schemas.microsoft.com/office/powerpoint/2010/main" val="2009638835"/>
+      </p:ext>
+    </p:extLst>
+  </p:cSld>
+  <p:clrMapOvr>
+    <a:masterClrMapping/>
+  </p:clrMapOvr>
+</p:sld>
+</file>
+
+<file path=ppt/slides/slide4.xml><?xml version="1.0" encoding="utf-8"?>
+<p:sld xmlns:a="http://schemas.openxmlformats.org/drawingml/2006/main" xmlns:r="http://schemas.openxmlformats.org/officeDocument/2006/relationships" xmlns:p="http://schemas.openxmlformats.org/presentationml/2006/main">
+  <p:cSld>
+    <p:spTree>
+      <p:nvGrpSpPr>
+        <p:cNvPr id="1" name=""/>
+        <p:cNvGrpSpPr/>
+        <p:nvPr/>
+      </p:nvGrpSpPr>
+      <p:grpSpPr>
+        <a:xfrm>
+          <a:off x="0" y="0"/>
+          <a:ext cx="0" cy="0"/>
+          <a:chOff x="0" y="0"/>
+          <a:chExt cx="0" cy="0"/>
+        </a:xfrm>
+      </p:grpSpPr>
+      <p:graphicFrame>
+        <p:nvGraphicFramePr>
+          <p:cNvPr id="4" name="Table 3"/>
+          <p:cNvGraphicFramePr>
+            <a:graphicFrameLocks noGrp="1"/>
+          </p:cNvGraphicFramePr>
+          <p:nvPr>
+            <p:extLst>
+              <p:ext uri="{D42A27DB-BD31-4B8C-83A1-F6EECF244321}">
+                <p14:modId xmlns:p14="http://schemas.microsoft.com/office/powerpoint/2010/main" val="2291872127"/>
+              </p:ext>
+            </p:extLst>
+          </p:nvPr>
+        </p:nvGraphicFramePr>
+        <p:xfrm>
+          <a:off x="1136650" y="2415114"/>
+          <a:ext cx="4705350" cy="365760"/>
+        </p:xfrm>
+        <a:graphic>
+          <a:graphicData uri="http://schemas.openxmlformats.org/drawingml/2006/table">
+            <a:tbl>
+              <a:tblPr firstRow="1" bandRow="1">
+                <a:tableStyleId>{5C22544A-7EE6-4342-B048-85BDC9FD1C3A}</a:tableStyleId>
+              </a:tblPr>
+              <a:tblGrid>
+                <a:gridCol w="1568450"/>
+                <a:gridCol w="1568450"/>
+                <a:gridCol w="1568450"/>
+              </a:tblGrid>
+              <a:tr h="311151">
+                <a:tc>
+                  <a:txBody>
+                    <a:bodyPr/>
+                    <a:lstStyle/>
+                    <a:p>
+                      <a:r>
+                        <a:rPr lang="en-AU" dirty="0" smtClean="0"/>
+                        <a:t>Permissions</a:t>
+                      </a:r>
+                      <a:endParaRPr lang="en-AU" dirty="0"/>
+                    </a:p>
+                  </a:txBody>
+                  <a:tcPr>
+                    <a:solidFill>
+                      <a:schemeClr val="accent1">
+                        <a:lumMod val="75000"/>
+                      </a:schemeClr>
+                    </a:solidFill>
+                  </a:tcPr>
+                </a:tc>
+                <a:tc>
+                  <a:txBody>
+                    <a:bodyPr/>
+                    <a:lstStyle/>
+                    <a:p>
+                      <a:r>
+                        <a:rPr lang="en-AU" dirty="0" smtClean="0"/>
+                        <a:t>Obligations</a:t>
+                      </a:r>
+                      <a:endParaRPr lang="en-AU" dirty="0"/>
+                    </a:p>
+                  </a:txBody>
+                  <a:tcPr/>
+                </a:tc>
+                <a:tc>
+                  <a:txBody>
+                    <a:bodyPr/>
+                    <a:lstStyle/>
+                    <a:p>
+                      <a:r>
+                        <a:rPr lang="en-AU" dirty="0" smtClean="0"/>
+                        <a:t>Prohibitions</a:t>
+                      </a:r>
+                      <a:endParaRPr lang="en-AU" dirty="0"/>
+                    </a:p>
+                  </a:txBody>
+                  <a:tcPr/>
+                </a:tc>
+              </a:tr>
+            </a:tbl>
+          </a:graphicData>
+        </a:graphic>
+      </p:graphicFrame>
+      <p:sp>
+        <p:nvSpPr>
+          <p:cNvPr id="5" name="TextBox 4"/>
+          <p:cNvSpPr txBox="1"/>
+          <p:nvPr/>
+        </p:nvSpPr>
+        <p:spPr>
+          <a:xfrm>
+            <a:off x="4521200" y="1653976"/>
+            <a:ext cx="3486852" cy="523220"/>
+          </a:xfrm>
+          <a:prstGeom prst="rect">
+            <a:avLst/>
+          </a:prstGeom>
+          <a:noFill/>
+        </p:spPr>
+        <p:txBody>
+          <a:bodyPr wrap="none" rtlCol="0">
+            <a:spAutoFit/>
+          </a:bodyPr>
+          <a:lstStyle/>
+          <a:p>
+            <a:r>
+              <a:rPr lang="en-AU" sz="2800" b="1" dirty="0" smtClean="0"/>
+              <a:t>SEARCH FOR A POLICY</a:t>
+            </a:r>
+            <a:endParaRPr lang="en-AU" sz="2800" b="1" dirty="0"/>
+          </a:p>
+        </p:txBody>
+      </p:sp>
+      <p:sp>
+        <p:nvSpPr>
+          <p:cNvPr id="7" name="TextBox 6"/>
+          <p:cNvSpPr txBox="1"/>
+          <p:nvPr/>
+        </p:nvSpPr>
+        <p:spPr>
+          <a:xfrm>
+            <a:off x="1569846" y="2971313"/>
+            <a:ext cx="3622338" cy="369332"/>
+          </a:xfrm>
+          <a:prstGeom prst="rect">
+            <a:avLst/>
+          </a:prstGeom>
+          <a:noFill/>
+        </p:spPr>
+        <p:txBody>
+          <a:bodyPr wrap="none" rtlCol="0">
+            <a:spAutoFit/>
+          </a:bodyPr>
+          <a:lstStyle/>
+          <a:p>
+            <a:r>
+              <a:rPr lang="en-AU" dirty="0" smtClean="0"/>
+              <a:t>Select the permissions for your asset</a:t>
+            </a:r>
+            <a:endParaRPr lang="en-AU" dirty="0"/>
+          </a:p>
+        </p:txBody>
+      </p:sp>
+      <p:sp>
+        <p:nvSpPr>
+          <p:cNvPr id="9" name="TextBox 8"/>
+          <p:cNvSpPr txBox="1"/>
+          <p:nvPr/>
+        </p:nvSpPr>
+        <p:spPr>
+          <a:xfrm>
+            <a:off x="1569846" y="3584000"/>
+            <a:ext cx="3622338" cy="369332"/>
+          </a:xfrm>
+          <a:prstGeom prst="rect">
+            <a:avLst/>
+          </a:prstGeom>
+          <a:noFill/>
+          <a:ln>
+            <a:solidFill>
+              <a:schemeClr val="tx1"/>
+            </a:solidFill>
+          </a:ln>
+        </p:spPr>
+        <p:txBody>
+          <a:bodyPr wrap="square" rtlCol="0">
+            <a:spAutoFit/>
+          </a:bodyPr>
+          <a:lstStyle/>
+          <a:p>
+            <a:r>
+              <a:rPr lang="en-AU" dirty="0" smtClean="0"/>
+              <a:t>Choose an option        </a:t>
+            </a:r>
+            <a:endParaRPr lang="en-AU" dirty="0"/>
+          </a:p>
+        </p:txBody>
+      </p:sp>
+      <p:sp>
+        <p:nvSpPr>
+          <p:cNvPr id="10" name="Chevron 9"/>
+          <p:cNvSpPr/>
+          <p:nvPr/>
+        </p:nvSpPr>
+        <p:spPr>
+          <a:xfrm rot="5400000">
+            <a:off x="4852795" y="3684000"/>
+            <a:ext cx="186267" cy="184520"/>
+          </a:xfrm>
+          <a:prstGeom prst="chevron">
+            <a:avLst/>
+          </a:prstGeom>
+        </p:spPr>
+        <p:style>
+          <a:lnRef idx="2">
+            <a:schemeClr val="accent1">
+              <a:shade val="50000"/>
+            </a:schemeClr>
+          </a:lnRef>
+          <a:fillRef idx="1">
+            <a:schemeClr val="accent1"/>
+          </a:fillRef>
+          <a:effectRef idx="0">
+            <a:schemeClr val="accent1"/>
+          </a:effectRef>
+          <a:fontRef idx="minor">
+            <a:schemeClr val="lt1"/>
+          </a:fontRef>
+        </p:style>
+        <p:txBody>
+          <a:bodyPr rtlCol="0" anchor="ctr"/>
+          <a:lstStyle/>
+          <a:p>
+            <a:pPr algn="ctr"/>
+            <a:endParaRPr lang="en-AU">
+              <a:solidFill>
+                <a:schemeClr val="tx1"/>
+              </a:solidFill>
+            </a:endParaRPr>
+          </a:p>
+        </p:txBody>
+      </p:sp>
+      <p:graphicFrame>
+        <p:nvGraphicFramePr>
+          <p:cNvPr id="13" name="Table 12"/>
+          <p:cNvGraphicFramePr>
+            <a:graphicFrameLocks noGrp="1"/>
+          </p:cNvGraphicFramePr>
+          <p:nvPr>
+            <p:extLst>
+              <p:ext uri="{D42A27DB-BD31-4B8C-83A1-F6EECF244321}">
+                <p14:modId xmlns:p14="http://schemas.microsoft.com/office/powerpoint/2010/main" val="3766132299"/>
+              </p:ext>
+            </p:extLst>
+          </p:nvPr>
+        </p:nvGraphicFramePr>
+        <p:xfrm>
+          <a:off x="6705598" y="2415114"/>
+          <a:ext cx="4284133" cy="2590800"/>
+        </p:xfrm>
+        <a:graphic>
+          <a:graphicData uri="http://schemas.openxmlformats.org/drawingml/2006/table">
+            <a:tbl>
+              <a:tblPr firstRow="1" bandRow="1">
+                <a:tableStyleId>{5C22544A-7EE6-4342-B048-85BDC9FD1C3A}</a:tableStyleId>
+              </a:tblPr>
+              <a:tblGrid>
+                <a:gridCol w="4284133"/>
+              </a:tblGrid>
+              <a:tr h="0">
+                <a:tc>
+                  <a:txBody>
+                    <a:bodyPr/>
+                    <a:lstStyle/>
+                    <a:p>
+                      <a:r>
+                        <a:rPr lang="en-AU" dirty="0" smtClean="0"/>
+                        <a:t>Currently</a:t>
+                      </a:r>
+                      <a:r>
+                        <a:rPr lang="en-AU" baseline="0" dirty="0" smtClean="0"/>
+                        <a:t> searching for:</a:t>
+                      </a:r>
+                      <a:endParaRPr lang="en-AU" dirty="0"/>
+                    </a:p>
+                  </a:txBody>
+                  <a:tcPr/>
+                </a:tc>
+              </a:tr>
+              <a:tr h="370840">
+                <a:tc>
+                  <a:txBody>
+                    <a:bodyPr/>
+                    <a:lstStyle/>
+                    <a:p>
+                      <a:r>
+                        <a:rPr lang="en-AU" b="1" dirty="0" smtClean="0"/>
+                        <a:t>Permissions</a:t>
+                      </a:r>
+                    </a:p>
+                  </a:txBody>
+                  <a:tcPr/>
+                </a:tc>
+              </a:tr>
+              <a:tr h="370840">
+                <a:tc>
+                  <a:txBody>
+                    <a:bodyPr/>
+                    <a:lstStyle/>
+                    <a:p>
+                      <a:r>
+                        <a:rPr lang="en-AU" dirty="0" smtClean="0"/>
+                        <a:t>    Derive</a:t>
+                      </a:r>
+                      <a:endParaRPr lang="en-AU" dirty="0"/>
+                    </a:p>
+                  </a:txBody>
+                  <a:tcPr/>
+                </a:tc>
+              </a:tr>
+              <a:tr h="370840">
+                <a:tc>
+                  <a:txBody>
+                    <a:bodyPr/>
+                    <a:lstStyle/>
+                    <a:p>
+                      <a:r>
+                        <a:rPr lang="en-AU" b="1" dirty="0" smtClean="0"/>
+                        <a:t>Obligations</a:t>
+                      </a:r>
+                      <a:endParaRPr lang="en-AU" b="1" dirty="0"/>
+                    </a:p>
+                  </a:txBody>
+                  <a:tcPr/>
+                </a:tc>
+              </a:tr>
+              <a:tr h="370840">
+                <a:tc>
+                  <a:txBody>
+                    <a:bodyPr/>
+                    <a:lstStyle/>
+                    <a:p>
+                      <a:r>
+                        <a:rPr lang="en-AU" dirty="0" smtClean="0"/>
+                        <a:t>    Attach policy</a:t>
+                      </a:r>
+                      <a:endParaRPr lang="en-AU" dirty="0"/>
+                    </a:p>
+                  </a:txBody>
+                  <a:tcPr/>
+                </a:tc>
+              </a:tr>
+              <a:tr h="370840">
+                <a:tc>
+                  <a:txBody>
+                    <a:bodyPr/>
+                    <a:lstStyle/>
+                    <a:p>
+                      <a:r>
+                        <a:rPr lang="en-AU" b="1" dirty="0" smtClean="0"/>
+                        <a:t>Prohibitions</a:t>
+                      </a:r>
+                      <a:endParaRPr lang="en-AU" b="1" dirty="0"/>
+                    </a:p>
+                  </a:txBody>
+                  <a:tcPr/>
+                </a:tc>
+              </a:tr>
+              <a:tr h="370840">
+                <a:tc>
+                  <a:txBody>
+                    <a:bodyPr/>
+                    <a:lstStyle/>
+                    <a:p>
+                      <a:r>
+                        <a:rPr lang="en-AU" dirty="0" smtClean="0"/>
+                        <a:t>    Commercialize</a:t>
+                      </a:r>
+                      <a:endParaRPr lang="en-AU" dirty="0"/>
+                    </a:p>
+                  </a:txBody>
+                  <a:tcPr/>
+                </a:tc>
+              </a:tr>
+            </a:tbl>
+          </a:graphicData>
+        </a:graphic>
+      </p:graphicFrame>
+      <p:sp>
+        <p:nvSpPr>
+          <p:cNvPr id="14" name="Rectangle 13"/>
+          <p:cNvSpPr/>
+          <p:nvPr/>
+        </p:nvSpPr>
+        <p:spPr>
+          <a:xfrm>
+            <a:off x="2178050" y="4555065"/>
+            <a:ext cx="2622549" cy="450849"/>
+          </a:xfrm>
+          <a:prstGeom prst="rect">
+            <a:avLst/>
+          </a:prstGeom>
+        </p:spPr>
+        <p:style>
+          <a:lnRef idx="2">
+            <a:schemeClr val="accent1">
+              <a:shade val="50000"/>
+            </a:schemeClr>
+          </a:lnRef>
+          <a:fillRef idx="1">
+            <a:schemeClr val="accent1"/>
+          </a:fillRef>
+          <a:effectRef idx="0">
+            <a:schemeClr val="accent1"/>
+          </a:effectRef>
+          <a:fontRef idx="minor">
+            <a:schemeClr val="lt1"/>
+          </a:fontRef>
+        </p:style>
+        <p:txBody>
+          <a:bodyPr rtlCol="0" anchor="ctr"/>
+          <a:lstStyle/>
+          <a:p>
+            <a:pPr algn="ctr"/>
+            <a:r>
+              <a:rPr lang="en-AU" dirty="0" smtClean="0"/>
+              <a:t>Search Policies</a:t>
+            </a:r>
+            <a:endParaRPr lang="en-AU" dirty="0"/>
+          </a:p>
+        </p:txBody>
+      </p:sp>
+    </p:spTree>
+    <p:extLst>
+      <p:ext uri="{BB962C8B-B14F-4D97-AF65-F5344CB8AC3E}">
+        <p14:creationId xmlns:p14="http://schemas.microsoft.com/office/powerpoint/2010/main" val="784406558"/>
+      </p:ext>
+    </p:extLst>
+  </p:cSld>
+  <p:clrMapOvr>
+    <a:masterClrMapping/>
+  </p:clrMapOvr>
+</p:sld>
+</file>
+
+<file path=ppt/slides/slide5.xml><?xml version="1.0" encoding="utf-8"?>
+<p:sld xmlns:a="http://schemas.openxmlformats.org/drawingml/2006/main" xmlns:r="http://schemas.openxmlformats.org/officeDocument/2006/relationships" xmlns:p="http://schemas.openxmlformats.org/presentationml/2006/main">
+  <p:cSld>
+    <p:spTree>
+      <p:nvGrpSpPr>
+        <p:cNvPr id="1" name=""/>
+        <p:cNvGrpSpPr/>
+        <p:nvPr/>
+      </p:nvGrpSpPr>
+      <p:grpSpPr>
+        <a:xfrm>
+          <a:off x="0" y="0"/>
+          <a:ext cx="0" cy="0"/>
+          <a:chOff x="0" y="0"/>
+          <a:chExt cx="0" cy="0"/>
+        </a:xfrm>
+      </p:grpSpPr>
+      <p:sp>
+        <p:nvSpPr>
+          <p:cNvPr id="4" name="TextBox 3"/>
+          <p:cNvSpPr txBox="1"/>
+          <p:nvPr/>
+        </p:nvSpPr>
+        <p:spPr>
+          <a:xfrm>
+            <a:off x="4148667" y="3863"/>
+            <a:ext cx="3486852" cy="523220"/>
+          </a:xfrm>
+          <a:prstGeom prst="rect">
+            <a:avLst/>
+          </a:prstGeom>
+          <a:noFill/>
+        </p:spPr>
+        <p:txBody>
+          <a:bodyPr wrap="none" rtlCol="0">
+            <a:spAutoFit/>
+          </a:bodyPr>
+          <a:lstStyle/>
+          <a:p>
+            <a:r>
+              <a:rPr lang="en-AU" sz="2800" b="1" dirty="0" smtClean="0"/>
+              <a:t>SEARCH FOR A POLICY</a:t>
+            </a:r>
+            <a:endParaRPr lang="en-AU" sz="2800" b="1" dirty="0"/>
+          </a:p>
+        </p:txBody>
+      </p:sp>
+      <p:sp>
+        <p:nvSpPr>
+          <p:cNvPr id="5" name="TextBox 4"/>
+          <p:cNvSpPr txBox="1"/>
+          <p:nvPr/>
+        </p:nvSpPr>
+        <p:spPr>
+          <a:xfrm>
+            <a:off x="904605" y="500422"/>
+            <a:ext cx="5648595" cy="307777"/>
+          </a:xfrm>
+          <a:prstGeom prst="rect">
+            <a:avLst/>
+          </a:prstGeom>
+          <a:noFill/>
+        </p:spPr>
+        <p:txBody>
+          <a:bodyPr wrap="square" rtlCol="0">
+            <a:spAutoFit/>
+          </a:bodyPr>
+          <a:lstStyle/>
+          <a:p>
+            <a:r>
+              <a:rPr lang="en-AU" sz="1400" b="1" dirty="0" smtClean="0">
+                <a:solidFill>
+                  <a:schemeClr val="accent6">
+                    <a:lumMod val="75000"/>
+                  </a:schemeClr>
+                </a:solidFill>
+              </a:rPr>
+              <a:t>The following policies are a perfect fit with your requirements</a:t>
+            </a:r>
+            <a:endParaRPr lang="en-AU" sz="1400" b="1" dirty="0">
+              <a:solidFill>
+                <a:schemeClr val="accent6">
+                  <a:lumMod val="75000"/>
+                </a:schemeClr>
+              </a:solidFill>
+            </a:endParaRPr>
+          </a:p>
+        </p:txBody>
+      </p:sp>
+      <p:sp>
+        <p:nvSpPr>
+          <p:cNvPr id="6" name="Oval 5"/>
+          <p:cNvSpPr/>
+          <p:nvPr/>
+        </p:nvSpPr>
+        <p:spPr>
+          <a:xfrm>
+            <a:off x="549005" y="545844"/>
+            <a:ext cx="227271" cy="216932"/>
+          </a:xfrm>
+          <a:prstGeom prst="ellipse">
+            <a:avLst/>
+          </a:prstGeom>
+          <a:solidFill>
+            <a:schemeClr val="accent6">
+              <a:lumMod val="75000"/>
+            </a:schemeClr>
+          </a:solidFill>
+          <a:ln>
+            <a:solidFill>
+              <a:schemeClr val="accent6">
+                <a:lumMod val="75000"/>
+              </a:schemeClr>
+            </a:solidFill>
+          </a:ln>
+        </p:spPr>
+        <p:style>
+          <a:lnRef idx="2">
+            <a:schemeClr val="accent1">
+              <a:shade val="50000"/>
+            </a:schemeClr>
+          </a:lnRef>
+          <a:fillRef idx="1">
+            <a:schemeClr val="accent1"/>
+          </a:fillRef>
+          <a:effectRef idx="0">
+            <a:schemeClr val="accent1"/>
+          </a:effectRef>
+          <a:fontRef idx="minor">
+            <a:schemeClr val="lt1"/>
+          </a:fontRef>
+        </p:style>
+        <p:txBody>
+          <a:bodyPr rtlCol="0" anchor="ctr"/>
+          <a:lstStyle/>
+          <a:p>
+            <a:pPr algn="ctr"/>
+            <a:endParaRPr lang="en-AU"/>
+          </a:p>
+        </p:txBody>
+      </p:sp>
+      <p:graphicFrame>
+        <p:nvGraphicFramePr>
+          <p:cNvPr id="8" name="Table 7"/>
+          <p:cNvGraphicFramePr>
+            <a:graphicFrameLocks noGrp="1"/>
+          </p:cNvGraphicFramePr>
+          <p:nvPr>
+            <p:extLst>
+              <p:ext uri="{D42A27DB-BD31-4B8C-83A1-F6EECF244321}">
+                <p14:modId xmlns:p14="http://schemas.microsoft.com/office/powerpoint/2010/main" val="3042206945"/>
+              </p:ext>
+            </p:extLst>
+          </p:nvPr>
+        </p:nvGraphicFramePr>
+        <p:xfrm>
+          <a:off x="6862083" y="876877"/>
+          <a:ext cx="4284133" cy="2538727"/>
+        </p:xfrm>
+        <a:graphic>
+          <a:graphicData uri="http://schemas.openxmlformats.org/drawingml/2006/table">
+            <a:tbl>
+              <a:tblPr firstRow="1" bandRow="1">
+                <a:tableStyleId>{5C22544A-7EE6-4342-B048-85BDC9FD1C3A}</a:tableStyleId>
+              </a:tblPr>
+              <a:tblGrid>
+                <a:gridCol w="4284133"/>
+              </a:tblGrid>
+              <a:tr h="0">
+                <a:tc>
+                  <a:txBody>
+                    <a:bodyPr/>
+                    <a:lstStyle/>
+                    <a:p>
+                      <a:r>
+                        <a:rPr lang="en-AU" sz="1400" dirty="0" smtClean="0"/>
+                        <a:t>Currently</a:t>
+                      </a:r>
+                      <a:r>
+                        <a:rPr lang="en-AU" sz="1400" baseline="0" dirty="0" smtClean="0"/>
+                        <a:t> searching for:</a:t>
+                      </a:r>
+                      <a:endParaRPr lang="en-AU" sz="1400" dirty="0"/>
+                    </a:p>
+                  </a:txBody>
+                  <a:tcPr/>
+                </a:tc>
+              </a:tr>
+              <a:tr h="370840">
+                <a:tc>
+                  <a:txBody>
+                    <a:bodyPr/>
+                    <a:lstStyle/>
+                    <a:p>
+                      <a:r>
+                        <a:rPr lang="en-AU" sz="1400" b="1" dirty="0" smtClean="0"/>
+                        <a:t>Permissions</a:t>
+                      </a:r>
+                    </a:p>
+                  </a:txBody>
+                  <a:tcPr/>
+                </a:tc>
+              </a:tr>
+              <a:tr h="370840">
+                <a:tc>
+                  <a:txBody>
+                    <a:bodyPr/>
+                    <a:lstStyle/>
+                    <a:p>
+                      <a:r>
+                        <a:rPr lang="en-AU" sz="1400" dirty="0" smtClean="0"/>
+                        <a:t>    Derive</a:t>
+                      </a:r>
+                      <a:endParaRPr lang="en-AU" sz="1400" dirty="0"/>
+                    </a:p>
+                  </a:txBody>
+                  <a:tcPr/>
+                </a:tc>
+              </a:tr>
+              <a:tr h="370840">
+                <a:tc>
+                  <a:txBody>
+                    <a:bodyPr/>
+                    <a:lstStyle/>
+                    <a:p>
+                      <a:r>
+                        <a:rPr lang="en-AU" sz="1400" b="1" dirty="0" smtClean="0"/>
+                        <a:t>Obligations</a:t>
+                      </a:r>
+                      <a:endParaRPr lang="en-AU" sz="1400" b="1" dirty="0"/>
+                    </a:p>
+                  </a:txBody>
+                  <a:tcPr/>
+                </a:tc>
+              </a:tr>
+              <a:tr h="370840">
+                <a:tc>
+                  <a:txBody>
+                    <a:bodyPr/>
+                    <a:lstStyle/>
+                    <a:p>
+                      <a:r>
+                        <a:rPr lang="en-AU" sz="1400" dirty="0" smtClean="0"/>
+                        <a:t>    Attach policy</a:t>
+                      </a:r>
+                      <a:endParaRPr lang="en-AU" sz="1400" dirty="0"/>
+                    </a:p>
+                  </a:txBody>
+                  <a:tcPr/>
+                </a:tc>
+              </a:tr>
+              <a:tr h="370840">
+                <a:tc>
+                  <a:txBody>
+                    <a:bodyPr/>
+                    <a:lstStyle/>
+                    <a:p>
+                      <a:r>
+                        <a:rPr lang="en-AU" sz="1400" b="1" dirty="0" smtClean="0"/>
+                        <a:t>Prohibitions</a:t>
+                      </a:r>
+                      <a:endParaRPr lang="en-AU" sz="1400" b="1" dirty="0"/>
+                    </a:p>
+                  </a:txBody>
+                  <a:tcPr/>
+                </a:tc>
+              </a:tr>
+              <a:tr h="379727">
+                <a:tc>
+                  <a:txBody>
+                    <a:bodyPr/>
+                    <a:lstStyle/>
+                    <a:p>
+                      <a:r>
+                        <a:rPr lang="en-AU" sz="1400" dirty="0" smtClean="0"/>
+                        <a:t>    Commercialize</a:t>
+                      </a:r>
+                      <a:endParaRPr lang="en-AU" sz="1400" dirty="0"/>
+                    </a:p>
+                  </a:txBody>
+                  <a:tcPr/>
+                </a:tc>
+              </a:tr>
+            </a:tbl>
+          </a:graphicData>
+        </a:graphic>
+      </p:graphicFrame>
+      <p:sp>
+        <p:nvSpPr>
+          <p:cNvPr id="11" name="Oval 10"/>
+          <p:cNvSpPr/>
+          <p:nvPr/>
+        </p:nvSpPr>
+        <p:spPr>
+          <a:xfrm>
+            <a:off x="519800" y="2293671"/>
+            <a:ext cx="227271" cy="216932"/>
+          </a:xfrm>
+          <a:prstGeom prst="ellipse">
+            <a:avLst/>
+          </a:prstGeom>
+          <a:solidFill>
+            <a:schemeClr val="accent5">
+              <a:lumMod val="75000"/>
+            </a:schemeClr>
+          </a:solidFill>
+          <a:ln>
+            <a:solidFill>
+              <a:schemeClr val="accent5">
+                <a:lumMod val="75000"/>
+              </a:schemeClr>
+            </a:solidFill>
+          </a:ln>
+        </p:spPr>
+        <p:style>
+          <a:lnRef idx="2">
+            <a:schemeClr val="accent1">
+              <a:shade val="50000"/>
+            </a:schemeClr>
+          </a:lnRef>
+          <a:fillRef idx="1">
+            <a:schemeClr val="accent1"/>
+          </a:fillRef>
+          <a:effectRef idx="0">
+            <a:schemeClr val="accent1"/>
+          </a:effectRef>
+          <a:fontRef idx="minor">
+            <a:schemeClr val="lt1"/>
+          </a:fontRef>
+        </p:style>
+        <p:txBody>
+          <a:bodyPr rtlCol="0" anchor="ctr"/>
+          <a:lstStyle/>
+          <a:p>
+            <a:pPr algn="ctr"/>
+            <a:endParaRPr lang="en-AU" sz="1400"/>
+          </a:p>
+        </p:txBody>
+      </p:sp>
+      <p:sp>
+        <p:nvSpPr>
+          <p:cNvPr id="12" name="TextBox 11"/>
+          <p:cNvSpPr txBox="1"/>
+          <p:nvPr/>
+        </p:nvSpPr>
+        <p:spPr>
+          <a:xfrm>
+            <a:off x="875400" y="2113949"/>
+            <a:ext cx="5648596" cy="523220"/>
+          </a:xfrm>
+          <a:prstGeom prst="rect">
+            <a:avLst/>
+          </a:prstGeom>
+          <a:noFill/>
+        </p:spPr>
+        <p:txBody>
+          <a:bodyPr wrap="square" rtlCol="0">
+            <a:spAutoFit/>
+          </a:bodyPr>
+          <a:lstStyle/>
+          <a:p>
+            <a:r>
+              <a:rPr lang="en-AU" sz="1400" b="1" dirty="0" smtClean="0">
+                <a:solidFill>
+                  <a:schemeClr val="accent5">
+                    <a:lumMod val="75000"/>
+                  </a:schemeClr>
+                </a:solidFill>
+              </a:rPr>
+              <a:t>The following policies are compatible with your requirements, but have extra conditions</a:t>
+            </a:r>
+            <a:endParaRPr lang="en-AU" sz="1400" b="1" dirty="0">
+              <a:solidFill>
+                <a:schemeClr val="accent5">
+                  <a:lumMod val="75000"/>
+                </a:schemeClr>
+              </a:solidFill>
+            </a:endParaRPr>
+          </a:p>
+        </p:txBody>
+      </p:sp>
+      <p:graphicFrame>
+        <p:nvGraphicFramePr>
+          <p:cNvPr id="15" name="Table 14"/>
+          <p:cNvGraphicFramePr>
+            <a:graphicFrameLocks noGrp="1"/>
+          </p:cNvGraphicFramePr>
+          <p:nvPr>
+            <p:extLst>
+              <p:ext uri="{D42A27DB-BD31-4B8C-83A1-F6EECF244321}">
+                <p14:modId xmlns:p14="http://schemas.microsoft.com/office/powerpoint/2010/main" val="2793067061"/>
+              </p:ext>
+            </p:extLst>
+          </p:nvPr>
+        </p:nvGraphicFramePr>
+        <p:xfrm>
+          <a:off x="406397" y="1243330"/>
+          <a:ext cx="6146801" cy="870619"/>
+        </p:xfrm>
+        <a:graphic>
+          <a:graphicData uri="http://schemas.openxmlformats.org/drawingml/2006/table">
+            <a:tbl>
+              <a:tblPr firstRow="1" bandRow="1">
+                <a:tableStyleId>{10A1B5D5-9B99-4C35-A422-299274C87663}</a:tableStyleId>
+              </a:tblPr>
+              <a:tblGrid>
+                <a:gridCol w="6146801"/>
+              </a:tblGrid>
+              <a:tr h="244939">
+                <a:tc>
+                  <a:txBody>
+                    <a:bodyPr/>
+                    <a:lstStyle/>
+                    <a:p>
+                      <a:r>
+                        <a:rPr lang="en-AU" sz="1400" dirty="0" smtClean="0"/>
+                        <a:t>Example Policy</a:t>
+                      </a:r>
+                      <a:endParaRPr lang="en-AU" sz="1400" dirty="0"/>
+                    </a:p>
+                  </a:txBody>
+                  <a:tcPr/>
+                </a:tc>
+              </a:tr>
+              <a:tr h="565819">
+                <a:tc>
+                  <a:txBody>
+                    <a:bodyPr/>
+                    <a:lstStyle/>
+                    <a:p>
+                      <a:pPr algn="ctr"/>
+                      <a:endParaRPr lang="en-AU" dirty="0"/>
+                    </a:p>
+                  </a:txBody>
+                  <a:tcPr/>
+                </a:tc>
+              </a:tr>
+            </a:tbl>
+          </a:graphicData>
+        </a:graphic>
+      </p:graphicFrame>
+      <p:sp>
+        <p:nvSpPr>
+          <p:cNvPr id="17" name="TextBox 16"/>
+          <p:cNvSpPr txBox="1"/>
+          <p:nvPr/>
+        </p:nvSpPr>
+        <p:spPr>
+          <a:xfrm>
+            <a:off x="2857349" y="1642810"/>
+            <a:ext cx="1010533" cy="307777"/>
+          </a:xfrm>
+          <a:prstGeom prst="rect">
+            <a:avLst/>
+          </a:prstGeom>
+          <a:solidFill>
+            <a:schemeClr val="tx2">
+              <a:lumMod val="75000"/>
+            </a:schemeClr>
+          </a:solidFill>
+          <a:ln>
+            <a:solidFill>
+              <a:schemeClr val="tx2">
+                <a:lumMod val="75000"/>
+              </a:schemeClr>
+            </a:solidFill>
+          </a:ln>
+        </p:spPr>
+        <p:txBody>
+          <a:bodyPr wrap="none" rtlCol="0">
+            <a:spAutoFit/>
+          </a:bodyPr>
+          <a:lstStyle/>
+          <a:p>
+            <a:r>
+              <a:rPr lang="en-AU" sz="1400" dirty="0" smtClean="0">
+                <a:solidFill>
+                  <a:schemeClr val="bg1"/>
+                </a:solidFill>
+              </a:rPr>
+              <a:t>View Policy</a:t>
+            </a:r>
+            <a:endParaRPr lang="en-AU" sz="1400" dirty="0">
+              <a:solidFill>
+                <a:schemeClr val="bg1"/>
+              </a:solidFill>
+            </a:endParaRPr>
+          </a:p>
+        </p:txBody>
+      </p:sp>
+      <p:graphicFrame>
+        <p:nvGraphicFramePr>
+          <p:cNvPr id="18" name="Table 17"/>
+          <p:cNvGraphicFramePr>
+            <a:graphicFrameLocks noGrp="1"/>
+          </p:cNvGraphicFramePr>
+          <p:nvPr>
+            <p:extLst>
+              <p:ext uri="{D42A27DB-BD31-4B8C-83A1-F6EECF244321}">
+                <p14:modId xmlns:p14="http://schemas.microsoft.com/office/powerpoint/2010/main" val="1192505945"/>
+              </p:ext>
+            </p:extLst>
+          </p:nvPr>
+        </p:nvGraphicFramePr>
+        <p:xfrm>
+          <a:off x="406397" y="876877"/>
+          <a:ext cx="6146801" cy="304800"/>
+        </p:xfrm>
+        <a:graphic>
+          <a:graphicData uri="http://schemas.openxmlformats.org/drawingml/2006/table">
+            <a:tbl>
+              <a:tblPr firstRow="1" bandRow="1">
+                <a:tableStyleId>{10A1B5D5-9B99-4C35-A422-299274C87663}</a:tableStyleId>
+              </a:tblPr>
+              <a:tblGrid>
+                <a:gridCol w="6146801"/>
+              </a:tblGrid>
+              <a:tr h="283103">
+                <a:tc>
+                  <a:txBody>
+                    <a:bodyPr/>
+                    <a:lstStyle/>
+                    <a:p>
+                      <a:r>
+                        <a:rPr lang="en-AU" sz="1400" dirty="0" smtClean="0"/>
+                        <a:t>Example Policy</a:t>
+                      </a:r>
+                      <a:endParaRPr lang="en-AU" sz="1400" dirty="0"/>
+                    </a:p>
+                  </a:txBody>
+                  <a:tcPr/>
+                </a:tc>
+              </a:tr>
+            </a:tbl>
+          </a:graphicData>
+        </a:graphic>
+      </p:graphicFrame>
+      <p:graphicFrame>
+        <p:nvGraphicFramePr>
+          <p:cNvPr id="20" name="Table 19"/>
+          <p:cNvGraphicFramePr>
+            <a:graphicFrameLocks noGrp="1"/>
+          </p:cNvGraphicFramePr>
+          <p:nvPr>
+            <p:extLst>
+              <p:ext uri="{D42A27DB-BD31-4B8C-83A1-F6EECF244321}">
+                <p14:modId xmlns:p14="http://schemas.microsoft.com/office/powerpoint/2010/main" val="1693345187"/>
+              </p:ext>
+            </p:extLst>
+          </p:nvPr>
+        </p:nvGraphicFramePr>
+        <p:xfrm>
+          <a:off x="406397" y="3023678"/>
+          <a:ext cx="6146801" cy="1306161"/>
+        </p:xfrm>
+        <a:graphic>
+          <a:graphicData uri="http://schemas.openxmlformats.org/drawingml/2006/table">
+            <a:tbl>
+              <a:tblPr firstRow="1" bandRow="1">
+                <a:tableStyleId>{5C22544A-7EE6-4342-B048-85BDC9FD1C3A}</a:tableStyleId>
+              </a:tblPr>
+              <a:tblGrid>
+                <a:gridCol w="6146801"/>
+              </a:tblGrid>
+              <a:tr h="262078">
+                <a:tc>
+                  <a:txBody>
+                    <a:bodyPr/>
+                    <a:lstStyle/>
+                    <a:p>
+                      <a:r>
+                        <a:rPr lang="en-AU" sz="1400" dirty="0" smtClean="0"/>
+                        <a:t>Example Policy</a:t>
+                      </a:r>
+                      <a:endParaRPr lang="en-AU" sz="1400" dirty="0"/>
+                    </a:p>
+                  </a:txBody>
+                  <a:tcPr/>
+                </a:tc>
+              </a:tr>
+              <a:tr h="1001361">
+                <a:tc>
+                  <a:txBody>
+                    <a:bodyPr/>
+                    <a:lstStyle/>
+                    <a:p>
+                      <a:r>
+                        <a:rPr lang="en-AU" sz="1400" dirty="0" smtClean="0"/>
+                        <a:t>Extra conditions</a:t>
+                      </a:r>
+                    </a:p>
+                    <a:p>
+                      <a:r>
+                        <a:rPr lang="en-AU" sz="1400" dirty="0" smtClean="0"/>
+                        <a:t>Obligations: Attribute</a:t>
+                      </a:r>
+                      <a:endParaRPr lang="en-AU" sz="1400" dirty="0"/>
+                    </a:p>
+                  </a:txBody>
+                  <a:tcPr/>
+                </a:tc>
+              </a:tr>
+            </a:tbl>
+          </a:graphicData>
+        </a:graphic>
+      </p:graphicFrame>
+      <p:sp>
+        <p:nvSpPr>
+          <p:cNvPr id="21" name="TextBox 20"/>
+          <p:cNvSpPr txBox="1"/>
+          <p:nvPr/>
+        </p:nvSpPr>
+        <p:spPr>
+          <a:xfrm>
+            <a:off x="2857348" y="3885797"/>
+            <a:ext cx="1010533" cy="307777"/>
+          </a:xfrm>
+          <a:prstGeom prst="rect">
+            <a:avLst/>
+          </a:prstGeom>
+          <a:solidFill>
+            <a:schemeClr val="tx2">
+              <a:lumMod val="75000"/>
+            </a:schemeClr>
+          </a:solidFill>
+          <a:ln>
+            <a:solidFill>
+              <a:schemeClr val="tx2">
+                <a:lumMod val="75000"/>
+              </a:schemeClr>
+            </a:solidFill>
+          </a:ln>
+        </p:spPr>
+        <p:txBody>
+          <a:bodyPr wrap="none" rtlCol="0">
+            <a:spAutoFit/>
+          </a:bodyPr>
+          <a:lstStyle/>
+          <a:p>
+            <a:r>
+              <a:rPr lang="en-AU" sz="1400" dirty="0" smtClean="0">
+                <a:solidFill>
+                  <a:schemeClr val="bg1"/>
+                </a:solidFill>
+              </a:rPr>
+              <a:t>View Policy</a:t>
+            </a:r>
+            <a:endParaRPr lang="en-AU" sz="1400" dirty="0">
+              <a:solidFill>
+                <a:schemeClr val="bg1"/>
+              </a:solidFill>
+            </a:endParaRPr>
+          </a:p>
+        </p:txBody>
+      </p:sp>
+      <p:sp>
+        <p:nvSpPr>
+          <p:cNvPr id="22" name="Oval 21"/>
+          <p:cNvSpPr/>
+          <p:nvPr/>
+        </p:nvSpPr>
+        <p:spPr>
+          <a:xfrm>
+            <a:off x="512662" y="4884176"/>
+            <a:ext cx="227271" cy="216932"/>
+          </a:xfrm>
+          <a:prstGeom prst="ellipse">
+            <a:avLst/>
+          </a:prstGeom>
+          <a:solidFill>
+            <a:schemeClr val="accent2"/>
+          </a:solidFill>
+          <a:ln>
+            <a:solidFill>
+              <a:schemeClr val="accent2"/>
+            </a:solidFill>
+          </a:ln>
+        </p:spPr>
+        <p:style>
+          <a:lnRef idx="2">
+            <a:schemeClr val="accent1">
+              <a:shade val="50000"/>
+            </a:schemeClr>
+          </a:lnRef>
+          <a:fillRef idx="1">
+            <a:schemeClr val="accent1"/>
+          </a:fillRef>
+          <a:effectRef idx="0">
+            <a:schemeClr val="accent1"/>
+          </a:effectRef>
+          <a:fontRef idx="minor">
+            <a:schemeClr val="lt1"/>
+          </a:fontRef>
+        </p:style>
+        <p:txBody>
+          <a:bodyPr rtlCol="0" anchor="ctr"/>
+          <a:lstStyle/>
+          <a:p>
+            <a:pPr algn="ctr"/>
+            <a:endParaRPr lang="en-AU" sz="1400"/>
+          </a:p>
+        </p:txBody>
+      </p:sp>
+      <p:sp>
+        <p:nvSpPr>
+          <p:cNvPr id="23" name="TextBox 22"/>
+          <p:cNvSpPr txBox="1"/>
+          <p:nvPr/>
+        </p:nvSpPr>
+        <p:spPr>
+          <a:xfrm>
+            <a:off x="875400" y="4809258"/>
+            <a:ext cx="5648596" cy="307777"/>
+          </a:xfrm>
+          <a:prstGeom prst="rect">
+            <a:avLst/>
+          </a:prstGeom>
+          <a:noFill/>
+        </p:spPr>
+        <p:txBody>
+          <a:bodyPr wrap="square" rtlCol="0">
+            <a:spAutoFit/>
+          </a:bodyPr>
+          <a:lstStyle/>
+          <a:p>
+            <a:r>
+              <a:rPr lang="en-AU" sz="1400" b="1" dirty="0" smtClean="0">
+                <a:solidFill>
+                  <a:schemeClr val="accent2"/>
+                </a:solidFill>
+              </a:rPr>
+              <a:t>The following policies are missing some requirements</a:t>
+            </a:r>
+            <a:endParaRPr lang="en-AU" sz="1400" b="1" dirty="0">
+              <a:solidFill>
+                <a:schemeClr val="accent2"/>
+              </a:solidFill>
+            </a:endParaRPr>
+          </a:p>
+        </p:txBody>
+      </p:sp>
+      <p:graphicFrame>
+        <p:nvGraphicFramePr>
+          <p:cNvPr id="24" name="Table 23"/>
+          <p:cNvGraphicFramePr>
+            <a:graphicFrameLocks noGrp="1"/>
+          </p:cNvGraphicFramePr>
+          <p:nvPr>
+            <p:extLst>
+              <p:ext uri="{D42A27DB-BD31-4B8C-83A1-F6EECF244321}">
+                <p14:modId xmlns:p14="http://schemas.microsoft.com/office/powerpoint/2010/main" val="2425172002"/>
+              </p:ext>
+            </p:extLst>
+          </p:nvPr>
+        </p:nvGraphicFramePr>
+        <p:xfrm>
+          <a:off x="377194" y="5228579"/>
+          <a:ext cx="6146801" cy="1554941"/>
+        </p:xfrm>
+        <a:graphic>
+          <a:graphicData uri="http://schemas.openxmlformats.org/drawingml/2006/table">
+            <a:tbl>
+              <a:tblPr firstRow="1" bandRow="1">
+                <a:tableStyleId>{21E4AEA4-8DFA-4A89-87EB-49C32662AFE0}</a:tableStyleId>
+              </a:tblPr>
+              <a:tblGrid>
+                <a:gridCol w="6146801"/>
+              </a:tblGrid>
+              <a:tr h="390345">
+                <a:tc>
+                  <a:txBody>
+                    <a:bodyPr/>
+                    <a:lstStyle/>
+                    <a:p>
+                      <a:r>
+                        <a:rPr lang="en-AU" sz="1400" dirty="0" smtClean="0"/>
+                        <a:t>Example Policy</a:t>
+                      </a:r>
+                      <a:endParaRPr lang="en-AU" sz="1400" dirty="0"/>
+                    </a:p>
+                  </a:txBody>
+                  <a:tcPr/>
+                </a:tc>
+              </a:tr>
+              <a:tr h="1164596">
+                <a:tc>
+                  <a:txBody>
+                    <a:bodyPr/>
+                    <a:lstStyle/>
+                    <a:p>
+                      <a:r>
+                        <a:rPr lang="en-AU" sz="1400" dirty="0" smtClean="0"/>
+                        <a:t>Missing conditions</a:t>
+                      </a:r>
+                    </a:p>
+                    <a:p>
+                      <a:r>
+                        <a:rPr lang="en-AU" sz="1400" dirty="0" smtClean="0"/>
+                        <a:t>Prohibitions: Commercialize</a:t>
+                      </a:r>
+                      <a:endParaRPr lang="en-AU" sz="1400" dirty="0"/>
+                    </a:p>
+                  </a:txBody>
+                  <a:tcPr/>
+                </a:tc>
+              </a:tr>
+            </a:tbl>
+          </a:graphicData>
+        </a:graphic>
+      </p:graphicFrame>
+      <p:sp>
+        <p:nvSpPr>
+          <p:cNvPr id="25" name="TextBox 24"/>
+          <p:cNvSpPr txBox="1"/>
+          <p:nvPr/>
+        </p:nvSpPr>
+        <p:spPr>
+          <a:xfrm>
+            <a:off x="2788728" y="6093839"/>
+            <a:ext cx="1010533" cy="307777"/>
+          </a:xfrm>
+          <a:prstGeom prst="rect">
+            <a:avLst/>
+          </a:prstGeom>
+          <a:solidFill>
+            <a:schemeClr val="tx2">
+              <a:lumMod val="75000"/>
+            </a:schemeClr>
+          </a:solidFill>
+          <a:ln>
+            <a:solidFill>
+              <a:schemeClr val="tx2">
+                <a:lumMod val="75000"/>
+              </a:schemeClr>
+            </a:solidFill>
+          </a:ln>
+        </p:spPr>
+        <p:txBody>
+          <a:bodyPr wrap="none" rtlCol="0">
+            <a:spAutoFit/>
+          </a:bodyPr>
+          <a:lstStyle/>
+          <a:p>
+            <a:r>
+              <a:rPr lang="en-AU" sz="1400" dirty="0" smtClean="0">
+                <a:solidFill>
+                  <a:schemeClr val="bg1"/>
+                </a:solidFill>
+              </a:rPr>
+              <a:t>View Policy</a:t>
+            </a:r>
+            <a:endParaRPr lang="en-AU" sz="1400" dirty="0">
+              <a:solidFill>
+                <a:schemeClr val="bg1"/>
+              </a:solidFill>
+            </a:endParaRPr>
+          </a:p>
+        </p:txBody>
+      </p:sp>
+      <p:graphicFrame>
+        <p:nvGraphicFramePr>
+          <p:cNvPr id="26" name="Table 25"/>
+          <p:cNvGraphicFramePr>
+            <a:graphicFrameLocks noGrp="1"/>
+          </p:cNvGraphicFramePr>
+          <p:nvPr>
+            <p:extLst>
+              <p:ext uri="{D42A27DB-BD31-4B8C-83A1-F6EECF244321}">
+                <p14:modId xmlns:p14="http://schemas.microsoft.com/office/powerpoint/2010/main" val="1056508236"/>
+              </p:ext>
+            </p:extLst>
+          </p:nvPr>
+        </p:nvGraphicFramePr>
+        <p:xfrm>
+          <a:off x="406397" y="2675721"/>
+          <a:ext cx="6146801" cy="304800"/>
+        </p:xfrm>
+        <a:graphic>
+          <a:graphicData uri="http://schemas.openxmlformats.org/drawingml/2006/table">
+            <a:tbl>
+              <a:tblPr firstRow="1" bandRow="1">
+                <a:tableStyleId>{B301B821-A1FF-4177-AEE7-76D212191A09}</a:tableStyleId>
+              </a:tblPr>
+              <a:tblGrid>
+                <a:gridCol w="6146801"/>
+              </a:tblGrid>
+              <a:tr h="140781">
+                <a:tc>
+                  <a:txBody>
+                    <a:bodyPr/>
+                    <a:lstStyle/>
+                    <a:p>
+                      <a:r>
+                        <a:rPr lang="en-AU" sz="1400" dirty="0" smtClean="0"/>
+                        <a:t>Example Policy</a:t>
+                      </a:r>
+                      <a:endParaRPr lang="en-AU" sz="1400" dirty="0"/>
+                    </a:p>
+                  </a:txBody>
+                  <a:tcPr/>
+                </a:tc>
+              </a:tr>
+            </a:tbl>
+          </a:graphicData>
+        </a:graphic>
+      </p:graphicFrame>
+      <p:graphicFrame>
+        <p:nvGraphicFramePr>
+          <p:cNvPr id="27" name="Table 26"/>
+          <p:cNvGraphicFramePr>
+            <a:graphicFrameLocks noGrp="1"/>
+          </p:cNvGraphicFramePr>
+          <p:nvPr>
+            <p:extLst>
+              <p:ext uri="{D42A27DB-BD31-4B8C-83A1-F6EECF244321}">
+                <p14:modId xmlns:p14="http://schemas.microsoft.com/office/powerpoint/2010/main" val="2996667979"/>
+              </p:ext>
+            </p:extLst>
+          </p:nvPr>
+        </p:nvGraphicFramePr>
+        <p:xfrm>
+          <a:off x="406397" y="4401488"/>
+          <a:ext cx="6146801" cy="304800"/>
+        </p:xfrm>
+        <a:graphic>
+          <a:graphicData uri="http://schemas.openxmlformats.org/drawingml/2006/table">
+            <a:tbl>
+              <a:tblPr firstRow="1" bandRow="1">
+                <a:tableStyleId>{B301B821-A1FF-4177-AEE7-76D212191A09}</a:tableStyleId>
+              </a:tblPr>
+              <a:tblGrid>
+                <a:gridCol w="6146801"/>
+              </a:tblGrid>
+              <a:tr h="140781">
+                <a:tc>
+                  <a:txBody>
+                    <a:bodyPr/>
+                    <a:lstStyle/>
+                    <a:p>
+                      <a:r>
+                        <a:rPr lang="en-AU" sz="1400" dirty="0" smtClean="0"/>
+                        <a:t>Example Policy</a:t>
+                      </a:r>
+                      <a:endParaRPr lang="en-AU" sz="1400" dirty="0"/>
+                    </a:p>
+                  </a:txBody>
+                  <a:tcPr/>
+                </a:tc>
+              </a:tr>
+            </a:tbl>
+          </a:graphicData>
+        </a:graphic>
+      </p:graphicFrame>
+      <p:sp>
+        <p:nvSpPr>
+          <p:cNvPr id="28" name="TextBox 27"/>
+          <p:cNvSpPr txBox="1"/>
+          <p:nvPr/>
+        </p:nvSpPr>
+        <p:spPr>
+          <a:xfrm>
+            <a:off x="8333572" y="3522869"/>
+            <a:ext cx="1341154" cy="307777"/>
+          </a:xfrm>
+          <a:prstGeom prst="rect">
+            <a:avLst/>
+          </a:prstGeom>
+          <a:solidFill>
+            <a:schemeClr val="tx2">
+              <a:lumMod val="75000"/>
+            </a:schemeClr>
+          </a:solidFill>
+          <a:ln>
+            <a:solidFill>
+              <a:schemeClr val="tx2">
+                <a:lumMod val="75000"/>
+              </a:schemeClr>
+            </a:solidFill>
+          </a:ln>
+        </p:spPr>
+        <p:txBody>
+          <a:bodyPr wrap="square" rtlCol="0">
+            <a:spAutoFit/>
+          </a:bodyPr>
+          <a:lstStyle/>
+          <a:p>
+            <a:pPr algn="ctr"/>
+            <a:r>
+              <a:rPr lang="en-AU" sz="1400" dirty="0" smtClean="0">
+                <a:solidFill>
+                  <a:schemeClr val="bg1"/>
+                </a:solidFill>
+              </a:rPr>
+              <a:t>Search Again</a:t>
+            </a:r>
+            <a:endParaRPr lang="en-AU" sz="1400" dirty="0">
+              <a:solidFill>
+                <a:schemeClr val="bg1"/>
+              </a:solidFill>
+            </a:endParaRPr>
+          </a:p>
+        </p:txBody>
+      </p:sp>
+    </p:spTree>
+    <p:extLst>
+      <p:ext uri="{BB962C8B-B14F-4D97-AF65-F5344CB8AC3E}">
+        <p14:creationId xmlns:p14="http://schemas.microsoft.com/office/powerpoint/2010/main" val="3932157316"/>
       </p:ext>
     </p:extLst>
   </p:cSld>

</xml_diff>

<commit_message>
Added alternate mockup for policy search page
</commit_message>
<xml_diff>
--- a/_docs/DataModel.pptx
+++ b/_docs/DataModel.pptx
@@ -9,7 +9,8 @@
     <p:sldId id="259" r:id="rId3"/>
     <p:sldId id="257" r:id="rId4"/>
     <p:sldId id="260" r:id="rId5"/>
-    <p:sldId id="261" r:id="rId6"/>
+    <p:sldId id="262" r:id="rId6"/>
+    <p:sldId id="261" r:id="rId7"/>
   </p:sldIdLst>
   <p:sldSz cx="12192000" cy="6858000"/>
   <p:notesSz cx="6858000" cy="9144000"/>
@@ -10738,6 +10739,577 @@
       </p:grpSpPr>
       <p:sp>
         <p:nvSpPr>
+          <p:cNvPr id="5" name="TextBox 4"/>
+          <p:cNvSpPr txBox="1"/>
+          <p:nvPr/>
+        </p:nvSpPr>
+        <p:spPr>
+          <a:xfrm>
+            <a:off x="4521200" y="1653976"/>
+            <a:ext cx="3486852" cy="523220"/>
+          </a:xfrm>
+          <a:prstGeom prst="rect">
+            <a:avLst/>
+          </a:prstGeom>
+          <a:noFill/>
+        </p:spPr>
+        <p:txBody>
+          <a:bodyPr wrap="none" rtlCol="0">
+            <a:spAutoFit/>
+          </a:bodyPr>
+          <a:lstStyle/>
+          <a:p>
+            <a:r>
+              <a:rPr lang="en-AU" sz="2800" b="1" dirty="0" smtClean="0"/>
+              <a:t>SEARCH FOR A POLICY</a:t>
+            </a:r>
+            <a:endParaRPr lang="en-AU" sz="2800" b="1" dirty="0"/>
+          </a:p>
+        </p:txBody>
+      </p:sp>
+      <p:graphicFrame>
+        <p:nvGraphicFramePr>
+          <p:cNvPr id="9" name="Table 8"/>
+          <p:cNvGraphicFramePr>
+            <a:graphicFrameLocks noGrp="1"/>
+          </p:cNvGraphicFramePr>
+          <p:nvPr>
+            <p:extLst>
+              <p:ext uri="{D42A27DB-BD31-4B8C-83A1-F6EECF244321}">
+                <p14:modId xmlns:p14="http://schemas.microsoft.com/office/powerpoint/2010/main" val="164205851"/>
+              </p:ext>
+            </p:extLst>
+          </p:nvPr>
+        </p:nvGraphicFramePr>
+        <p:xfrm>
+          <a:off x="6705598" y="2415114"/>
+          <a:ext cx="4284133" cy="2590800"/>
+        </p:xfrm>
+        <a:graphic>
+          <a:graphicData uri="http://schemas.openxmlformats.org/drawingml/2006/table">
+            <a:tbl>
+              <a:tblPr firstRow="1" bandRow="1">
+                <a:tableStyleId>{5C22544A-7EE6-4342-B048-85BDC9FD1C3A}</a:tableStyleId>
+              </a:tblPr>
+              <a:tblGrid>
+                <a:gridCol w="4284133"/>
+              </a:tblGrid>
+              <a:tr h="0">
+                <a:tc>
+                  <a:txBody>
+                    <a:bodyPr/>
+                    <a:lstStyle/>
+                    <a:p>
+                      <a:r>
+                        <a:rPr lang="en-AU" dirty="0" smtClean="0"/>
+                        <a:t>Currently</a:t>
+                      </a:r>
+                      <a:r>
+                        <a:rPr lang="en-AU" baseline="0" dirty="0" smtClean="0"/>
+                        <a:t> searching for:</a:t>
+                      </a:r>
+                      <a:endParaRPr lang="en-AU" dirty="0"/>
+                    </a:p>
+                  </a:txBody>
+                  <a:tcPr/>
+                </a:tc>
+              </a:tr>
+              <a:tr h="370840">
+                <a:tc>
+                  <a:txBody>
+                    <a:bodyPr/>
+                    <a:lstStyle/>
+                    <a:p>
+                      <a:r>
+                        <a:rPr lang="en-AU" b="1" dirty="0" smtClean="0"/>
+                        <a:t>Permissions</a:t>
+                      </a:r>
+                    </a:p>
+                  </a:txBody>
+                  <a:tcPr/>
+                </a:tc>
+              </a:tr>
+              <a:tr h="370840">
+                <a:tc>
+                  <a:txBody>
+                    <a:bodyPr/>
+                    <a:lstStyle/>
+                    <a:p>
+                      <a:r>
+                        <a:rPr lang="en-AU" dirty="0" smtClean="0"/>
+                        <a:t>    Derive</a:t>
+                      </a:r>
+                      <a:endParaRPr lang="en-AU" dirty="0"/>
+                    </a:p>
+                  </a:txBody>
+                  <a:tcPr/>
+                </a:tc>
+              </a:tr>
+              <a:tr h="370840">
+                <a:tc>
+                  <a:txBody>
+                    <a:bodyPr/>
+                    <a:lstStyle/>
+                    <a:p>
+                      <a:r>
+                        <a:rPr lang="en-AU" b="1" dirty="0" smtClean="0"/>
+                        <a:t>Obligations</a:t>
+                      </a:r>
+                      <a:endParaRPr lang="en-AU" b="1" dirty="0"/>
+                    </a:p>
+                  </a:txBody>
+                  <a:tcPr/>
+                </a:tc>
+              </a:tr>
+              <a:tr h="370840">
+                <a:tc>
+                  <a:txBody>
+                    <a:bodyPr/>
+                    <a:lstStyle/>
+                    <a:p>
+                      <a:r>
+                        <a:rPr lang="en-AU" dirty="0" smtClean="0"/>
+                        <a:t>    Attach policy</a:t>
+                      </a:r>
+                      <a:endParaRPr lang="en-AU" dirty="0"/>
+                    </a:p>
+                  </a:txBody>
+                  <a:tcPr/>
+                </a:tc>
+              </a:tr>
+              <a:tr h="370840">
+                <a:tc>
+                  <a:txBody>
+                    <a:bodyPr/>
+                    <a:lstStyle/>
+                    <a:p>
+                      <a:r>
+                        <a:rPr lang="en-AU" b="1" dirty="0" smtClean="0"/>
+                        <a:t>Prohibitions</a:t>
+                      </a:r>
+                      <a:endParaRPr lang="en-AU" b="1" dirty="0"/>
+                    </a:p>
+                  </a:txBody>
+                  <a:tcPr/>
+                </a:tc>
+              </a:tr>
+              <a:tr h="370840">
+                <a:tc>
+                  <a:txBody>
+                    <a:bodyPr/>
+                    <a:lstStyle/>
+                    <a:p>
+                      <a:r>
+                        <a:rPr lang="en-AU" dirty="0" smtClean="0"/>
+                        <a:t>    Commercialize</a:t>
+                      </a:r>
+                      <a:endParaRPr lang="en-AU" dirty="0"/>
+                    </a:p>
+                  </a:txBody>
+                  <a:tcPr/>
+                </a:tc>
+              </a:tr>
+            </a:tbl>
+          </a:graphicData>
+        </a:graphic>
+      </p:graphicFrame>
+      <p:sp>
+        <p:nvSpPr>
+          <p:cNvPr id="10" name="Rectangle 9"/>
+          <p:cNvSpPr/>
+          <p:nvPr/>
+        </p:nvSpPr>
+        <p:spPr>
+          <a:xfrm>
+            <a:off x="2148623" y="3389877"/>
+            <a:ext cx="2622549" cy="450849"/>
+          </a:xfrm>
+          <a:prstGeom prst="rect">
+            <a:avLst/>
+          </a:prstGeom>
+        </p:spPr>
+        <p:style>
+          <a:lnRef idx="2">
+            <a:schemeClr val="accent1">
+              <a:shade val="50000"/>
+            </a:schemeClr>
+          </a:lnRef>
+          <a:fillRef idx="1">
+            <a:schemeClr val="accent1"/>
+          </a:fillRef>
+          <a:effectRef idx="0">
+            <a:schemeClr val="accent1"/>
+          </a:effectRef>
+          <a:fontRef idx="minor">
+            <a:schemeClr val="lt1"/>
+          </a:fontRef>
+        </p:style>
+        <p:txBody>
+          <a:bodyPr rtlCol="0" anchor="ctr"/>
+          <a:lstStyle/>
+          <a:p>
+            <a:pPr algn="ctr"/>
+            <a:r>
+              <a:rPr lang="en-AU" dirty="0" smtClean="0"/>
+              <a:t>Search Policies</a:t>
+            </a:r>
+            <a:endParaRPr lang="en-AU" dirty="0"/>
+          </a:p>
+        </p:txBody>
+      </p:sp>
+      <p:sp>
+        <p:nvSpPr>
+          <p:cNvPr id="11" name="TextBox 10"/>
+          <p:cNvSpPr txBox="1"/>
+          <p:nvPr/>
+        </p:nvSpPr>
+        <p:spPr>
+          <a:xfrm>
+            <a:off x="290286" y="406400"/>
+            <a:ext cx="1038361" cy="369332"/>
+          </a:xfrm>
+          <a:prstGeom prst="rect">
+            <a:avLst/>
+          </a:prstGeom>
+          <a:noFill/>
+        </p:spPr>
+        <p:txBody>
+          <a:bodyPr wrap="none" rtlCol="0">
+            <a:spAutoFit/>
+          </a:bodyPr>
+          <a:lstStyle/>
+          <a:p>
+            <a:r>
+              <a:rPr lang="en-AU" dirty="0" smtClean="0"/>
+              <a:t>alternate</a:t>
+            </a:r>
+            <a:endParaRPr lang="en-AU" dirty="0"/>
+          </a:p>
+        </p:txBody>
+      </p:sp>
+      <p:sp>
+        <p:nvSpPr>
+          <p:cNvPr id="12" name="TextBox 11"/>
+          <p:cNvSpPr txBox="1"/>
+          <p:nvPr/>
+        </p:nvSpPr>
+        <p:spPr>
+          <a:xfrm>
+            <a:off x="346663" y="2439262"/>
+            <a:ext cx="1991041" cy="369332"/>
+          </a:xfrm>
+          <a:prstGeom prst="rect">
+            <a:avLst/>
+          </a:prstGeom>
+          <a:solidFill>
+            <a:schemeClr val="accent1"/>
+          </a:solidFill>
+          <a:ln>
+            <a:solidFill>
+              <a:schemeClr val="accent1"/>
+            </a:solidFill>
+          </a:ln>
+        </p:spPr>
+        <p:txBody>
+          <a:bodyPr wrap="square" rtlCol="0">
+            <a:spAutoFit/>
+          </a:bodyPr>
+          <a:lstStyle/>
+          <a:p>
+            <a:r>
+              <a:rPr lang="en-AU" dirty="0" smtClean="0">
+                <a:solidFill>
+                  <a:schemeClr val="bg1"/>
+                </a:solidFill>
+              </a:rPr>
+              <a:t>Add Permission</a:t>
+            </a:r>
+            <a:endParaRPr lang="en-AU" dirty="0">
+              <a:solidFill>
+                <a:schemeClr val="bg1"/>
+              </a:solidFill>
+            </a:endParaRPr>
+          </a:p>
+        </p:txBody>
+      </p:sp>
+      <p:sp>
+        <p:nvSpPr>
+          <p:cNvPr id="13" name="TextBox 12"/>
+          <p:cNvSpPr txBox="1"/>
+          <p:nvPr/>
+        </p:nvSpPr>
+        <p:spPr>
+          <a:xfrm>
+            <a:off x="2531064" y="2439262"/>
+            <a:ext cx="1852248" cy="369332"/>
+          </a:xfrm>
+          <a:prstGeom prst="rect">
+            <a:avLst/>
+          </a:prstGeom>
+          <a:solidFill>
+            <a:schemeClr val="accent1"/>
+          </a:solidFill>
+          <a:ln>
+            <a:solidFill>
+              <a:schemeClr val="accent1"/>
+            </a:solidFill>
+          </a:ln>
+        </p:spPr>
+        <p:txBody>
+          <a:bodyPr wrap="square" rtlCol="0">
+            <a:spAutoFit/>
+          </a:bodyPr>
+          <a:lstStyle/>
+          <a:p>
+            <a:r>
+              <a:rPr lang="en-AU" dirty="0" smtClean="0">
+                <a:solidFill>
+                  <a:schemeClr val="bg1"/>
+                </a:solidFill>
+              </a:rPr>
+              <a:t>Add Obligation</a:t>
+            </a:r>
+            <a:endParaRPr lang="en-AU" dirty="0">
+              <a:solidFill>
+                <a:schemeClr val="bg1"/>
+              </a:solidFill>
+            </a:endParaRPr>
+          </a:p>
+        </p:txBody>
+      </p:sp>
+      <p:sp>
+        <p:nvSpPr>
+          <p:cNvPr id="14" name="TextBox 13"/>
+          <p:cNvSpPr txBox="1"/>
+          <p:nvPr/>
+        </p:nvSpPr>
+        <p:spPr>
+          <a:xfrm>
+            <a:off x="4576672" y="2439262"/>
+            <a:ext cx="1960709" cy="369332"/>
+          </a:xfrm>
+          <a:prstGeom prst="rect">
+            <a:avLst/>
+          </a:prstGeom>
+          <a:solidFill>
+            <a:schemeClr val="accent1"/>
+          </a:solidFill>
+          <a:ln>
+            <a:solidFill>
+              <a:schemeClr val="accent1"/>
+            </a:solidFill>
+          </a:ln>
+        </p:spPr>
+        <p:txBody>
+          <a:bodyPr wrap="square" rtlCol="0">
+            <a:spAutoFit/>
+          </a:bodyPr>
+          <a:lstStyle/>
+          <a:p>
+            <a:r>
+              <a:rPr lang="en-AU" dirty="0" smtClean="0">
+                <a:solidFill>
+                  <a:schemeClr val="bg1"/>
+                </a:solidFill>
+              </a:rPr>
+              <a:t>Add Prohibition</a:t>
+            </a:r>
+            <a:endParaRPr lang="en-AU" dirty="0">
+              <a:solidFill>
+                <a:schemeClr val="bg1"/>
+              </a:solidFill>
+            </a:endParaRPr>
+          </a:p>
+        </p:txBody>
+      </p:sp>
+      <p:sp>
+        <p:nvSpPr>
+          <p:cNvPr id="15" name="Chevron 14"/>
+          <p:cNvSpPr/>
+          <p:nvPr/>
+        </p:nvSpPr>
+        <p:spPr>
+          <a:xfrm rot="5400000">
+            <a:off x="1963229" y="2557301"/>
+            <a:ext cx="186267" cy="184520"/>
+          </a:xfrm>
+          <a:prstGeom prst="chevron">
+            <a:avLst/>
+          </a:prstGeom>
+          <a:solidFill>
+            <a:schemeClr val="bg1"/>
+          </a:solidFill>
+          <a:ln>
+            <a:solidFill>
+              <a:schemeClr val="tx1"/>
+            </a:solidFill>
+          </a:ln>
+        </p:spPr>
+        <p:style>
+          <a:lnRef idx="2">
+            <a:schemeClr val="accent1">
+              <a:shade val="50000"/>
+            </a:schemeClr>
+          </a:lnRef>
+          <a:fillRef idx="1">
+            <a:schemeClr val="accent1"/>
+          </a:fillRef>
+          <a:effectRef idx="0">
+            <a:schemeClr val="accent1"/>
+          </a:effectRef>
+          <a:fontRef idx="minor">
+            <a:schemeClr val="lt1"/>
+          </a:fontRef>
+        </p:style>
+        <p:txBody>
+          <a:bodyPr rtlCol="0" anchor="ctr"/>
+          <a:lstStyle/>
+          <a:p>
+            <a:pPr algn="ctr"/>
+            <a:endParaRPr lang="en-AU">
+              <a:solidFill>
+                <a:schemeClr val="tx1"/>
+              </a:solidFill>
+            </a:endParaRPr>
+          </a:p>
+        </p:txBody>
+      </p:sp>
+      <p:sp>
+        <p:nvSpPr>
+          <p:cNvPr id="16" name="Chevron 15"/>
+          <p:cNvSpPr/>
+          <p:nvPr/>
+        </p:nvSpPr>
+        <p:spPr>
+          <a:xfrm rot="5400000">
+            <a:off x="4087555" y="2557301"/>
+            <a:ext cx="186267" cy="184520"/>
+          </a:xfrm>
+          <a:prstGeom prst="chevron">
+            <a:avLst/>
+          </a:prstGeom>
+          <a:solidFill>
+            <a:schemeClr val="bg1"/>
+          </a:solidFill>
+          <a:ln>
+            <a:solidFill>
+              <a:schemeClr val="tx1"/>
+            </a:solidFill>
+          </a:ln>
+        </p:spPr>
+        <p:style>
+          <a:lnRef idx="2">
+            <a:schemeClr val="accent1">
+              <a:shade val="50000"/>
+            </a:schemeClr>
+          </a:lnRef>
+          <a:fillRef idx="1">
+            <a:schemeClr val="accent1"/>
+          </a:fillRef>
+          <a:effectRef idx="0">
+            <a:schemeClr val="accent1"/>
+          </a:effectRef>
+          <a:fontRef idx="minor">
+            <a:schemeClr val="lt1"/>
+          </a:fontRef>
+        </p:style>
+        <p:txBody>
+          <a:bodyPr rtlCol="0" anchor="ctr"/>
+          <a:lstStyle/>
+          <a:p>
+            <a:pPr algn="ctr"/>
+            <a:endParaRPr lang="en-AU">
+              <a:solidFill>
+                <a:schemeClr val="tx1"/>
+              </a:solidFill>
+            </a:endParaRPr>
+          </a:p>
+        </p:txBody>
+      </p:sp>
+      <p:sp>
+        <p:nvSpPr>
+          <p:cNvPr id="17" name="Chevron 16"/>
+          <p:cNvSpPr/>
+          <p:nvPr/>
+        </p:nvSpPr>
+        <p:spPr>
+          <a:xfrm rot="5400000">
+            <a:off x="6210409" y="2531668"/>
+            <a:ext cx="186267" cy="184520"/>
+          </a:xfrm>
+          <a:prstGeom prst="chevron">
+            <a:avLst/>
+          </a:prstGeom>
+          <a:solidFill>
+            <a:schemeClr val="bg1"/>
+          </a:solidFill>
+          <a:ln>
+            <a:solidFill>
+              <a:schemeClr val="tx1"/>
+            </a:solidFill>
+          </a:ln>
+        </p:spPr>
+        <p:style>
+          <a:lnRef idx="2">
+            <a:schemeClr val="accent1">
+              <a:shade val="50000"/>
+            </a:schemeClr>
+          </a:lnRef>
+          <a:fillRef idx="1">
+            <a:schemeClr val="accent1"/>
+          </a:fillRef>
+          <a:effectRef idx="0">
+            <a:schemeClr val="accent1"/>
+          </a:effectRef>
+          <a:fontRef idx="minor">
+            <a:schemeClr val="lt1"/>
+          </a:fontRef>
+        </p:style>
+        <p:txBody>
+          <a:bodyPr rtlCol="0" anchor="ctr"/>
+          <a:lstStyle/>
+          <a:p>
+            <a:pPr algn="ctr"/>
+            <a:endParaRPr lang="en-AU">
+              <a:solidFill>
+                <a:schemeClr val="tx1"/>
+              </a:solidFill>
+            </a:endParaRPr>
+          </a:p>
+        </p:txBody>
+      </p:sp>
+    </p:spTree>
+    <p:extLst>
+      <p:ext uri="{BB962C8B-B14F-4D97-AF65-F5344CB8AC3E}">
+        <p14:creationId xmlns:p14="http://schemas.microsoft.com/office/powerpoint/2010/main" val="2197898747"/>
+      </p:ext>
+    </p:extLst>
+  </p:cSld>
+  <p:clrMapOvr>
+    <a:masterClrMapping/>
+  </p:clrMapOvr>
+</p:sld>
+</file>
+
+<file path=ppt/slides/slide6.xml><?xml version="1.0" encoding="utf-8"?>
+<p:sld xmlns:a="http://schemas.openxmlformats.org/drawingml/2006/main" xmlns:r="http://schemas.openxmlformats.org/officeDocument/2006/relationships" xmlns:p="http://schemas.openxmlformats.org/presentationml/2006/main">
+  <p:cSld>
+    <p:spTree>
+      <p:nvGrpSpPr>
+        <p:cNvPr id="1" name=""/>
+        <p:cNvGrpSpPr/>
+        <p:nvPr/>
+      </p:nvGrpSpPr>
+      <p:grpSpPr>
+        <a:xfrm>
+          <a:off x="0" y="0"/>
+          <a:ext cx="0" cy="0"/>
+          <a:chOff x="0" y="0"/>
+          <a:chExt cx="0" cy="0"/>
+        </a:xfrm>
+      </p:grpSpPr>
+      <p:sp>
+        <p:nvSpPr>
           <p:cNvPr id="4" name="TextBox 3"/>
           <p:cNvSpPr txBox="1"/>
           <p:nvPr/>

</xml_diff>

<commit_message>
Simplified Assignees and Assignors by removing Party table. Updated diagrams. Added policy_has_rule(), rule_has_action(), rule_has_assignor(), and rule_has_assignee() to db_access.py. Keeping unit tests up to date.
</commit_message>
<xml_diff>
--- a/_docs/DataModel.pptx
+++ b/_docs/DataModel.pptx
@@ -139,7 +139,7 @@
           <p:cNvPr id="2" name="Title 1">
             <a:extLst>
               <a:ext uri="{FF2B5EF4-FFF2-40B4-BE49-F238E27FC236}">
-                <a16:creationId xmlns="" xmlns:a16="http://schemas.microsoft.com/office/drawing/2014/main" id="{7812FAD9-B738-4E2B-A9F3-7D6DA8649C7B}"/>
+                <a16:creationId xmlns:a16="http://schemas.microsoft.com/office/drawing/2014/main" xmlns="" id="{7812FAD9-B738-4E2B-A9F3-7D6DA8649C7B}"/>
               </a:ext>
             </a:extLst>
           </p:cNvPr>
@@ -177,7 +177,7 @@
           <p:cNvPr id="3" name="Subtitle 2">
             <a:extLst>
               <a:ext uri="{FF2B5EF4-FFF2-40B4-BE49-F238E27FC236}">
-                <a16:creationId xmlns="" xmlns:a16="http://schemas.microsoft.com/office/drawing/2014/main" id="{CED3ABCF-AD94-42E3-95E2-D5E653DEF63F}"/>
+                <a16:creationId xmlns:a16="http://schemas.microsoft.com/office/drawing/2014/main" xmlns="" id="{CED3ABCF-AD94-42E3-95E2-D5E653DEF63F}"/>
               </a:ext>
             </a:extLst>
           </p:cNvPr>
@@ -248,7 +248,7 @@
           <p:cNvPr id="4" name="Date Placeholder 3">
             <a:extLst>
               <a:ext uri="{FF2B5EF4-FFF2-40B4-BE49-F238E27FC236}">
-                <a16:creationId xmlns="" xmlns:a16="http://schemas.microsoft.com/office/drawing/2014/main" id="{5AB92BAC-2DD4-42CE-9065-E2518728CD65}"/>
+                <a16:creationId xmlns:a16="http://schemas.microsoft.com/office/drawing/2014/main" xmlns="" id="{5AB92BAC-2DD4-42CE-9065-E2518728CD65}"/>
               </a:ext>
             </a:extLst>
           </p:cNvPr>
@@ -266,7 +266,7 @@
           <a:p>
             <a:fld id="{2F956D3E-0B91-471C-9743-3F865EE6F573}" type="datetimeFigureOut">
               <a:rPr lang="en-AU" smtClean="0"/>
-              <a:t>20/08/2018</a:t>
+              <a:t>22/08/2018</a:t>
             </a:fld>
             <a:endParaRPr lang="en-AU"/>
           </a:p>
@@ -277,7 +277,7 @@
           <p:cNvPr id="5" name="Footer Placeholder 4">
             <a:extLst>
               <a:ext uri="{FF2B5EF4-FFF2-40B4-BE49-F238E27FC236}">
-                <a16:creationId xmlns="" xmlns:a16="http://schemas.microsoft.com/office/drawing/2014/main" id="{137C3D4C-B868-4F83-8919-AE7F2500E437}"/>
+                <a16:creationId xmlns:a16="http://schemas.microsoft.com/office/drawing/2014/main" xmlns="" id="{137C3D4C-B868-4F83-8919-AE7F2500E437}"/>
               </a:ext>
             </a:extLst>
           </p:cNvPr>
@@ -302,7 +302,7 @@
           <p:cNvPr id="6" name="Slide Number Placeholder 5">
             <a:extLst>
               <a:ext uri="{FF2B5EF4-FFF2-40B4-BE49-F238E27FC236}">
-                <a16:creationId xmlns="" xmlns:a16="http://schemas.microsoft.com/office/drawing/2014/main" id="{ABBB53F0-83D7-42D4-90A5-7D5EE7C0AAD3}"/>
+                <a16:creationId xmlns:a16="http://schemas.microsoft.com/office/drawing/2014/main" xmlns="" id="{ABBB53F0-83D7-42D4-90A5-7D5EE7C0AAD3}"/>
               </a:ext>
             </a:extLst>
           </p:cNvPr>
@@ -361,7 +361,7 @@
           <p:cNvPr id="2" name="Title 1">
             <a:extLst>
               <a:ext uri="{FF2B5EF4-FFF2-40B4-BE49-F238E27FC236}">
-                <a16:creationId xmlns="" xmlns:a16="http://schemas.microsoft.com/office/drawing/2014/main" id="{EDEAE3B1-565C-4AD8-A67C-7D2C44ECA18D}"/>
+                <a16:creationId xmlns:a16="http://schemas.microsoft.com/office/drawing/2014/main" xmlns="" id="{EDEAE3B1-565C-4AD8-A67C-7D2C44ECA18D}"/>
               </a:ext>
             </a:extLst>
           </p:cNvPr>
@@ -390,7 +390,7 @@
           <p:cNvPr id="3" name="Vertical Text Placeholder 2">
             <a:extLst>
               <a:ext uri="{FF2B5EF4-FFF2-40B4-BE49-F238E27FC236}">
-                <a16:creationId xmlns="" xmlns:a16="http://schemas.microsoft.com/office/drawing/2014/main" id="{89499874-28E0-4013-933C-7A7F4857D944}"/>
+                <a16:creationId xmlns:a16="http://schemas.microsoft.com/office/drawing/2014/main" xmlns="" id="{89499874-28E0-4013-933C-7A7F4857D944}"/>
               </a:ext>
             </a:extLst>
           </p:cNvPr>
@@ -448,7 +448,7 @@
           <p:cNvPr id="4" name="Date Placeholder 3">
             <a:extLst>
               <a:ext uri="{FF2B5EF4-FFF2-40B4-BE49-F238E27FC236}">
-                <a16:creationId xmlns="" xmlns:a16="http://schemas.microsoft.com/office/drawing/2014/main" id="{30B68540-FC47-4085-8638-DE11BCE14D7E}"/>
+                <a16:creationId xmlns:a16="http://schemas.microsoft.com/office/drawing/2014/main" xmlns="" id="{30B68540-FC47-4085-8638-DE11BCE14D7E}"/>
               </a:ext>
             </a:extLst>
           </p:cNvPr>
@@ -466,7 +466,7 @@
           <a:p>
             <a:fld id="{2F956D3E-0B91-471C-9743-3F865EE6F573}" type="datetimeFigureOut">
               <a:rPr lang="en-AU" smtClean="0"/>
-              <a:t>20/08/2018</a:t>
+              <a:t>22/08/2018</a:t>
             </a:fld>
             <a:endParaRPr lang="en-AU"/>
           </a:p>
@@ -477,7 +477,7 @@
           <p:cNvPr id="5" name="Footer Placeholder 4">
             <a:extLst>
               <a:ext uri="{FF2B5EF4-FFF2-40B4-BE49-F238E27FC236}">
-                <a16:creationId xmlns="" xmlns:a16="http://schemas.microsoft.com/office/drawing/2014/main" id="{149BDF69-9D0A-4871-B742-85D1C27ACA21}"/>
+                <a16:creationId xmlns:a16="http://schemas.microsoft.com/office/drawing/2014/main" xmlns="" id="{149BDF69-9D0A-4871-B742-85D1C27ACA21}"/>
               </a:ext>
             </a:extLst>
           </p:cNvPr>
@@ -502,7 +502,7 @@
           <p:cNvPr id="6" name="Slide Number Placeholder 5">
             <a:extLst>
               <a:ext uri="{FF2B5EF4-FFF2-40B4-BE49-F238E27FC236}">
-                <a16:creationId xmlns="" xmlns:a16="http://schemas.microsoft.com/office/drawing/2014/main" id="{BAC96E6A-25E9-4A3D-BDE5-E881314DE0D7}"/>
+                <a16:creationId xmlns:a16="http://schemas.microsoft.com/office/drawing/2014/main" xmlns="" id="{BAC96E6A-25E9-4A3D-BDE5-E881314DE0D7}"/>
               </a:ext>
             </a:extLst>
           </p:cNvPr>
@@ -561,7 +561,7 @@
           <p:cNvPr id="2" name="Vertical Title 1">
             <a:extLst>
               <a:ext uri="{FF2B5EF4-FFF2-40B4-BE49-F238E27FC236}">
-                <a16:creationId xmlns="" xmlns:a16="http://schemas.microsoft.com/office/drawing/2014/main" id="{8BD4BC0C-9CFC-4FB2-B5C6-6EEC1B7F772D}"/>
+                <a16:creationId xmlns:a16="http://schemas.microsoft.com/office/drawing/2014/main" xmlns="" id="{8BD4BC0C-9CFC-4FB2-B5C6-6EEC1B7F772D}"/>
               </a:ext>
             </a:extLst>
           </p:cNvPr>
@@ -595,7 +595,7 @@
           <p:cNvPr id="3" name="Vertical Text Placeholder 2">
             <a:extLst>
               <a:ext uri="{FF2B5EF4-FFF2-40B4-BE49-F238E27FC236}">
-                <a16:creationId xmlns="" xmlns:a16="http://schemas.microsoft.com/office/drawing/2014/main" id="{5CF7FA3D-9ABB-49C7-AF65-E0869B2150C9}"/>
+                <a16:creationId xmlns:a16="http://schemas.microsoft.com/office/drawing/2014/main" xmlns="" id="{5CF7FA3D-9ABB-49C7-AF65-E0869B2150C9}"/>
               </a:ext>
             </a:extLst>
           </p:cNvPr>
@@ -658,7 +658,7 @@
           <p:cNvPr id="4" name="Date Placeholder 3">
             <a:extLst>
               <a:ext uri="{FF2B5EF4-FFF2-40B4-BE49-F238E27FC236}">
-                <a16:creationId xmlns="" xmlns:a16="http://schemas.microsoft.com/office/drawing/2014/main" id="{FBF00D9E-50E5-4276-BC40-27125BC1B69A}"/>
+                <a16:creationId xmlns:a16="http://schemas.microsoft.com/office/drawing/2014/main" xmlns="" id="{FBF00D9E-50E5-4276-BC40-27125BC1B69A}"/>
               </a:ext>
             </a:extLst>
           </p:cNvPr>
@@ -676,7 +676,7 @@
           <a:p>
             <a:fld id="{2F956D3E-0B91-471C-9743-3F865EE6F573}" type="datetimeFigureOut">
               <a:rPr lang="en-AU" smtClean="0"/>
-              <a:t>20/08/2018</a:t>
+              <a:t>22/08/2018</a:t>
             </a:fld>
             <a:endParaRPr lang="en-AU"/>
           </a:p>
@@ -687,7 +687,7 @@
           <p:cNvPr id="5" name="Footer Placeholder 4">
             <a:extLst>
               <a:ext uri="{FF2B5EF4-FFF2-40B4-BE49-F238E27FC236}">
-                <a16:creationId xmlns="" xmlns:a16="http://schemas.microsoft.com/office/drawing/2014/main" id="{3AA20A04-EE64-4C85-A4C3-C674E216B21E}"/>
+                <a16:creationId xmlns:a16="http://schemas.microsoft.com/office/drawing/2014/main" xmlns="" id="{3AA20A04-EE64-4C85-A4C3-C674E216B21E}"/>
               </a:ext>
             </a:extLst>
           </p:cNvPr>
@@ -712,7 +712,7 @@
           <p:cNvPr id="6" name="Slide Number Placeholder 5">
             <a:extLst>
               <a:ext uri="{FF2B5EF4-FFF2-40B4-BE49-F238E27FC236}">
-                <a16:creationId xmlns="" xmlns:a16="http://schemas.microsoft.com/office/drawing/2014/main" id="{0F34C053-3886-4674-85D6-13CCCB876AEC}"/>
+                <a16:creationId xmlns:a16="http://schemas.microsoft.com/office/drawing/2014/main" xmlns="" id="{0F34C053-3886-4674-85D6-13CCCB876AEC}"/>
               </a:ext>
             </a:extLst>
           </p:cNvPr>
@@ -771,7 +771,7 @@
           <p:cNvPr id="2" name="Title 1">
             <a:extLst>
               <a:ext uri="{FF2B5EF4-FFF2-40B4-BE49-F238E27FC236}">
-                <a16:creationId xmlns="" xmlns:a16="http://schemas.microsoft.com/office/drawing/2014/main" id="{6D70D093-F0D3-479C-B65D-3031107C0DF1}"/>
+                <a16:creationId xmlns:a16="http://schemas.microsoft.com/office/drawing/2014/main" xmlns="" id="{6D70D093-F0D3-479C-B65D-3031107C0DF1}"/>
               </a:ext>
             </a:extLst>
           </p:cNvPr>
@@ -800,7 +800,7 @@
           <p:cNvPr id="3" name="Content Placeholder 2">
             <a:extLst>
               <a:ext uri="{FF2B5EF4-FFF2-40B4-BE49-F238E27FC236}">
-                <a16:creationId xmlns="" xmlns:a16="http://schemas.microsoft.com/office/drawing/2014/main" id="{19F2333E-AD72-4069-9999-D316EB1D2BE2}"/>
+                <a16:creationId xmlns:a16="http://schemas.microsoft.com/office/drawing/2014/main" xmlns="" id="{19F2333E-AD72-4069-9999-D316EB1D2BE2}"/>
               </a:ext>
             </a:extLst>
           </p:cNvPr>
@@ -858,7 +858,7 @@
           <p:cNvPr id="4" name="Date Placeholder 3">
             <a:extLst>
               <a:ext uri="{FF2B5EF4-FFF2-40B4-BE49-F238E27FC236}">
-                <a16:creationId xmlns="" xmlns:a16="http://schemas.microsoft.com/office/drawing/2014/main" id="{A5D0C69D-8EED-4855-9D9D-192FA0501F24}"/>
+                <a16:creationId xmlns:a16="http://schemas.microsoft.com/office/drawing/2014/main" xmlns="" id="{A5D0C69D-8EED-4855-9D9D-192FA0501F24}"/>
               </a:ext>
             </a:extLst>
           </p:cNvPr>
@@ -876,7 +876,7 @@
           <a:p>
             <a:fld id="{2F956D3E-0B91-471C-9743-3F865EE6F573}" type="datetimeFigureOut">
               <a:rPr lang="en-AU" smtClean="0"/>
-              <a:t>20/08/2018</a:t>
+              <a:t>22/08/2018</a:t>
             </a:fld>
             <a:endParaRPr lang="en-AU"/>
           </a:p>
@@ -887,7 +887,7 @@
           <p:cNvPr id="5" name="Footer Placeholder 4">
             <a:extLst>
               <a:ext uri="{FF2B5EF4-FFF2-40B4-BE49-F238E27FC236}">
-                <a16:creationId xmlns="" xmlns:a16="http://schemas.microsoft.com/office/drawing/2014/main" id="{3E40E1C3-407E-4CDD-B265-40C6EAF109CB}"/>
+                <a16:creationId xmlns:a16="http://schemas.microsoft.com/office/drawing/2014/main" xmlns="" id="{3E40E1C3-407E-4CDD-B265-40C6EAF109CB}"/>
               </a:ext>
             </a:extLst>
           </p:cNvPr>
@@ -912,7 +912,7 @@
           <p:cNvPr id="6" name="Slide Number Placeholder 5">
             <a:extLst>
               <a:ext uri="{FF2B5EF4-FFF2-40B4-BE49-F238E27FC236}">
-                <a16:creationId xmlns="" xmlns:a16="http://schemas.microsoft.com/office/drawing/2014/main" id="{845BB6A8-2931-4612-9030-020514B9DFCC}"/>
+                <a16:creationId xmlns:a16="http://schemas.microsoft.com/office/drawing/2014/main" xmlns="" id="{845BB6A8-2931-4612-9030-020514B9DFCC}"/>
               </a:ext>
             </a:extLst>
           </p:cNvPr>
@@ -971,7 +971,7 @@
           <p:cNvPr id="2" name="Title 1">
             <a:extLst>
               <a:ext uri="{FF2B5EF4-FFF2-40B4-BE49-F238E27FC236}">
-                <a16:creationId xmlns="" xmlns:a16="http://schemas.microsoft.com/office/drawing/2014/main" id="{9648ED28-6C5E-4B58-8121-9279F11D3D73}"/>
+                <a16:creationId xmlns:a16="http://schemas.microsoft.com/office/drawing/2014/main" xmlns="" id="{9648ED28-6C5E-4B58-8121-9279F11D3D73}"/>
               </a:ext>
             </a:extLst>
           </p:cNvPr>
@@ -1009,7 +1009,7 @@
           <p:cNvPr id="3" name="Text Placeholder 2">
             <a:extLst>
               <a:ext uri="{FF2B5EF4-FFF2-40B4-BE49-F238E27FC236}">
-                <a16:creationId xmlns="" xmlns:a16="http://schemas.microsoft.com/office/drawing/2014/main" id="{B243195A-3915-4922-B15F-B46A8AB41FEA}"/>
+                <a16:creationId xmlns:a16="http://schemas.microsoft.com/office/drawing/2014/main" xmlns="" id="{B243195A-3915-4922-B15F-B46A8AB41FEA}"/>
               </a:ext>
             </a:extLst>
           </p:cNvPr>
@@ -1134,7 +1134,7 @@
           <p:cNvPr id="4" name="Date Placeholder 3">
             <a:extLst>
               <a:ext uri="{FF2B5EF4-FFF2-40B4-BE49-F238E27FC236}">
-                <a16:creationId xmlns="" xmlns:a16="http://schemas.microsoft.com/office/drawing/2014/main" id="{33A69456-A0E9-4808-8AD0-8E412F7B6478}"/>
+                <a16:creationId xmlns:a16="http://schemas.microsoft.com/office/drawing/2014/main" xmlns="" id="{33A69456-A0E9-4808-8AD0-8E412F7B6478}"/>
               </a:ext>
             </a:extLst>
           </p:cNvPr>
@@ -1152,7 +1152,7 @@
           <a:p>
             <a:fld id="{2F956D3E-0B91-471C-9743-3F865EE6F573}" type="datetimeFigureOut">
               <a:rPr lang="en-AU" smtClean="0"/>
-              <a:t>20/08/2018</a:t>
+              <a:t>22/08/2018</a:t>
             </a:fld>
             <a:endParaRPr lang="en-AU"/>
           </a:p>
@@ -1163,7 +1163,7 @@
           <p:cNvPr id="5" name="Footer Placeholder 4">
             <a:extLst>
               <a:ext uri="{FF2B5EF4-FFF2-40B4-BE49-F238E27FC236}">
-                <a16:creationId xmlns="" xmlns:a16="http://schemas.microsoft.com/office/drawing/2014/main" id="{E0CD1CF0-CD4A-49A3-A5A3-C4241E2A5F63}"/>
+                <a16:creationId xmlns:a16="http://schemas.microsoft.com/office/drawing/2014/main" xmlns="" id="{E0CD1CF0-CD4A-49A3-A5A3-C4241E2A5F63}"/>
               </a:ext>
             </a:extLst>
           </p:cNvPr>
@@ -1188,7 +1188,7 @@
           <p:cNvPr id="6" name="Slide Number Placeholder 5">
             <a:extLst>
               <a:ext uri="{FF2B5EF4-FFF2-40B4-BE49-F238E27FC236}">
-                <a16:creationId xmlns="" xmlns:a16="http://schemas.microsoft.com/office/drawing/2014/main" id="{977DB6D3-8C4E-4ED5-9327-2DCA26535F2F}"/>
+                <a16:creationId xmlns:a16="http://schemas.microsoft.com/office/drawing/2014/main" xmlns="" id="{977DB6D3-8C4E-4ED5-9327-2DCA26535F2F}"/>
               </a:ext>
             </a:extLst>
           </p:cNvPr>
@@ -1247,7 +1247,7 @@
           <p:cNvPr id="2" name="Title 1">
             <a:extLst>
               <a:ext uri="{FF2B5EF4-FFF2-40B4-BE49-F238E27FC236}">
-                <a16:creationId xmlns="" xmlns:a16="http://schemas.microsoft.com/office/drawing/2014/main" id="{07C65CDB-FECB-413B-B3E2-B8B3289BE67F}"/>
+                <a16:creationId xmlns:a16="http://schemas.microsoft.com/office/drawing/2014/main" xmlns="" id="{07C65CDB-FECB-413B-B3E2-B8B3289BE67F}"/>
               </a:ext>
             </a:extLst>
           </p:cNvPr>
@@ -1276,7 +1276,7 @@
           <p:cNvPr id="3" name="Content Placeholder 2">
             <a:extLst>
               <a:ext uri="{FF2B5EF4-FFF2-40B4-BE49-F238E27FC236}">
-                <a16:creationId xmlns="" xmlns:a16="http://schemas.microsoft.com/office/drawing/2014/main" id="{2E6195E5-493D-470C-8030-A76CAC535D10}"/>
+                <a16:creationId xmlns:a16="http://schemas.microsoft.com/office/drawing/2014/main" xmlns="" id="{2E6195E5-493D-470C-8030-A76CAC535D10}"/>
               </a:ext>
             </a:extLst>
           </p:cNvPr>
@@ -1339,7 +1339,7 @@
           <p:cNvPr id="4" name="Content Placeholder 3">
             <a:extLst>
               <a:ext uri="{FF2B5EF4-FFF2-40B4-BE49-F238E27FC236}">
-                <a16:creationId xmlns="" xmlns:a16="http://schemas.microsoft.com/office/drawing/2014/main" id="{4F75BA75-06D0-4C8F-978B-E8DD198357AB}"/>
+                <a16:creationId xmlns:a16="http://schemas.microsoft.com/office/drawing/2014/main" xmlns="" id="{4F75BA75-06D0-4C8F-978B-E8DD198357AB}"/>
               </a:ext>
             </a:extLst>
           </p:cNvPr>
@@ -1402,7 +1402,7 @@
           <p:cNvPr id="5" name="Date Placeholder 4">
             <a:extLst>
               <a:ext uri="{FF2B5EF4-FFF2-40B4-BE49-F238E27FC236}">
-                <a16:creationId xmlns="" xmlns:a16="http://schemas.microsoft.com/office/drawing/2014/main" id="{B8464B70-E9DB-4711-87B7-24F57EF07851}"/>
+                <a16:creationId xmlns:a16="http://schemas.microsoft.com/office/drawing/2014/main" xmlns="" id="{B8464B70-E9DB-4711-87B7-24F57EF07851}"/>
               </a:ext>
             </a:extLst>
           </p:cNvPr>
@@ -1420,7 +1420,7 @@
           <a:p>
             <a:fld id="{2F956D3E-0B91-471C-9743-3F865EE6F573}" type="datetimeFigureOut">
               <a:rPr lang="en-AU" smtClean="0"/>
-              <a:t>20/08/2018</a:t>
+              <a:t>22/08/2018</a:t>
             </a:fld>
             <a:endParaRPr lang="en-AU"/>
           </a:p>
@@ -1431,7 +1431,7 @@
           <p:cNvPr id="6" name="Footer Placeholder 5">
             <a:extLst>
               <a:ext uri="{FF2B5EF4-FFF2-40B4-BE49-F238E27FC236}">
-                <a16:creationId xmlns="" xmlns:a16="http://schemas.microsoft.com/office/drawing/2014/main" id="{749AD7CE-527F-410D-975F-A7CD735BDEDC}"/>
+                <a16:creationId xmlns:a16="http://schemas.microsoft.com/office/drawing/2014/main" xmlns="" id="{749AD7CE-527F-410D-975F-A7CD735BDEDC}"/>
               </a:ext>
             </a:extLst>
           </p:cNvPr>
@@ -1456,7 +1456,7 @@
           <p:cNvPr id="7" name="Slide Number Placeholder 6">
             <a:extLst>
               <a:ext uri="{FF2B5EF4-FFF2-40B4-BE49-F238E27FC236}">
-                <a16:creationId xmlns="" xmlns:a16="http://schemas.microsoft.com/office/drawing/2014/main" id="{255D3E42-D06E-4C32-A2BC-75DE87B576C3}"/>
+                <a16:creationId xmlns:a16="http://schemas.microsoft.com/office/drawing/2014/main" xmlns="" id="{255D3E42-D06E-4C32-A2BC-75DE87B576C3}"/>
               </a:ext>
             </a:extLst>
           </p:cNvPr>
@@ -1515,7 +1515,7 @@
           <p:cNvPr id="2" name="Title 1">
             <a:extLst>
               <a:ext uri="{FF2B5EF4-FFF2-40B4-BE49-F238E27FC236}">
-                <a16:creationId xmlns="" xmlns:a16="http://schemas.microsoft.com/office/drawing/2014/main" id="{BE6E0455-D9EF-42F6-B509-7FDC251CFDAF}"/>
+                <a16:creationId xmlns:a16="http://schemas.microsoft.com/office/drawing/2014/main" xmlns="" id="{BE6E0455-D9EF-42F6-B509-7FDC251CFDAF}"/>
               </a:ext>
             </a:extLst>
           </p:cNvPr>
@@ -1549,7 +1549,7 @@
           <p:cNvPr id="3" name="Text Placeholder 2">
             <a:extLst>
               <a:ext uri="{FF2B5EF4-FFF2-40B4-BE49-F238E27FC236}">
-                <a16:creationId xmlns="" xmlns:a16="http://schemas.microsoft.com/office/drawing/2014/main" id="{5117D045-1AD3-424F-855E-BD6F9FACDA1A}"/>
+                <a16:creationId xmlns:a16="http://schemas.microsoft.com/office/drawing/2014/main" xmlns="" id="{5117D045-1AD3-424F-855E-BD6F9FACDA1A}"/>
               </a:ext>
             </a:extLst>
           </p:cNvPr>
@@ -1620,7 +1620,7 @@
           <p:cNvPr id="4" name="Content Placeholder 3">
             <a:extLst>
               <a:ext uri="{FF2B5EF4-FFF2-40B4-BE49-F238E27FC236}">
-                <a16:creationId xmlns="" xmlns:a16="http://schemas.microsoft.com/office/drawing/2014/main" id="{CC38E2F2-5E09-477C-BF9F-8B671E6613BE}"/>
+                <a16:creationId xmlns:a16="http://schemas.microsoft.com/office/drawing/2014/main" xmlns="" id="{CC38E2F2-5E09-477C-BF9F-8B671E6613BE}"/>
               </a:ext>
             </a:extLst>
           </p:cNvPr>
@@ -1683,7 +1683,7 @@
           <p:cNvPr id="5" name="Text Placeholder 4">
             <a:extLst>
               <a:ext uri="{FF2B5EF4-FFF2-40B4-BE49-F238E27FC236}">
-                <a16:creationId xmlns="" xmlns:a16="http://schemas.microsoft.com/office/drawing/2014/main" id="{3A15ED3B-D38C-4255-B016-9BFE9335B63D}"/>
+                <a16:creationId xmlns:a16="http://schemas.microsoft.com/office/drawing/2014/main" xmlns="" id="{3A15ED3B-D38C-4255-B016-9BFE9335B63D}"/>
               </a:ext>
             </a:extLst>
           </p:cNvPr>
@@ -1754,7 +1754,7 @@
           <p:cNvPr id="6" name="Content Placeholder 5">
             <a:extLst>
               <a:ext uri="{FF2B5EF4-FFF2-40B4-BE49-F238E27FC236}">
-                <a16:creationId xmlns="" xmlns:a16="http://schemas.microsoft.com/office/drawing/2014/main" id="{63DAE8AA-C177-4A26-BEC1-435C0D5B2971}"/>
+                <a16:creationId xmlns:a16="http://schemas.microsoft.com/office/drawing/2014/main" xmlns="" id="{63DAE8AA-C177-4A26-BEC1-435C0D5B2971}"/>
               </a:ext>
             </a:extLst>
           </p:cNvPr>
@@ -1817,7 +1817,7 @@
           <p:cNvPr id="7" name="Date Placeholder 6">
             <a:extLst>
               <a:ext uri="{FF2B5EF4-FFF2-40B4-BE49-F238E27FC236}">
-                <a16:creationId xmlns="" xmlns:a16="http://schemas.microsoft.com/office/drawing/2014/main" id="{C91A1DD9-FE74-4BC2-9DFA-85266C81AE87}"/>
+                <a16:creationId xmlns:a16="http://schemas.microsoft.com/office/drawing/2014/main" xmlns="" id="{C91A1DD9-FE74-4BC2-9DFA-85266C81AE87}"/>
               </a:ext>
             </a:extLst>
           </p:cNvPr>
@@ -1835,7 +1835,7 @@
           <a:p>
             <a:fld id="{2F956D3E-0B91-471C-9743-3F865EE6F573}" type="datetimeFigureOut">
               <a:rPr lang="en-AU" smtClean="0"/>
-              <a:t>20/08/2018</a:t>
+              <a:t>22/08/2018</a:t>
             </a:fld>
             <a:endParaRPr lang="en-AU"/>
           </a:p>
@@ -1846,7 +1846,7 @@
           <p:cNvPr id="8" name="Footer Placeholder 7">
             <a:extLst>
               <a:ext uri="{FF2B5EF4-FFF2-40B4-BE49-F238E27FC236}">
-                <a16:creationId xmlns="" xmlns:a16="http://schemas.microsoft.com/office/drawing/2014/main" id="{03468399-9983-447A-A9C7-60841A2101A5}"/>
+                <a16:creationId xmlns:a16="http://schemas.microsoft.com/office/drawing/2014/main" xmlns="" id="{03468399-9983-447A-A9C7-60841A2101A5}"/>
               </a:ext>
             </a:extLst>
           </p:cNvPr>
@@ -1871,7 +1871,7 @@
           <p:cNvPr id="9" name="Slide Number Placeholder 8">
             <a:extLst>
               <a:ext uri="{FF2B5EF4-FFF2-40B4-BE49-F238E27FC236}">
-                <a16:creationId xmlns="" xmlns:a16="http://schemas.microsoft.com/office/drawing/2014/main" id="{FF353AE5-8C6E-44F3-BD0C-9BE8FC31A3C4}"/>
+                <a16:creationId xmlns:a16="http://schemas.microsoft.com/office/drawing/2014/main" xmlns="" id="{FF353AE5-8C6E-44F3-BD0C-9BE8FC31A3C4}"/>
               </a:ext>
             </a:extLst>
           </p:cNvPr>
@@ -1930,7 +1930,7 @@
           <p:cNvPr id="2" name="Title 1">
             <a:extLst>
               <a:ext uri="{FF2B5EF4-FFF2-40B4-BE49-F238E27FC236}">
-                <a16:creationId xmlns="" xmlns:a16="http://schemas.microsoft.com/office/drawing/2014/main" id="{11AB4E18-777A-4059-8FE3-0C744DDCEF11}"/>
+                <a16:creationId xmlns:a16="http://schemas.microsoft.com/office/drawing/2014/main" xmlns="" id="{11AB4E18-777A-4059-8FE3-0C744DDCEF11}"/>
               </a:ext>
             </a:extLst>
           </p:cNvPr>
@@ -1959,7 +1959,7 @@
           <p:cNvPr id="3" name="Date Placeholder 2">
             <a:extLst>
               <a:ext uri="{FF2B5EF4-FFF2-40B4-BE49-F238E27FC236}">
-                <a16:creationId xmlns="" xmlns:a16="http://schemas.microsoft.com/office/drawing/2014/main" id="{EBBA3A6C-B2BF-4415-9EFA-485140AC1C20}"/>
+                <a16:creationId xmlns:a16="http://schemas.microsoft.com/office/drawing/2014/main" xmlns="" id="{EBBA3A6C-B2BF-4415-9EFA-485140AC1C20}"/>
               </a:ext>
             </a:extLst>
           </p:cNvPr>
@@ -1977,7 +1977,7 @@
           <a:p>
             <a:fld id="{2F956D3E-0B91-471C-9743-3F865EE6F573}" type="datetimeFigureOut">
               <a:rPr lang="en-AU" smtClean="0"/>
-              <a:t>20/08/2018</a:t>
+              <a:t>22/08/2018</a:t>
             </a:fld>
             <a:endParaRPr lang="en-AU"/>
           </a:p>
@@ -1988,7 +1988,7 @@
           <p:cNvPr id="4" name="Footer Placeholder 3">
             <a:extLst>
               <a:ext uri="{FF2B5EF4-FFF2-40B4-BE49-F238E27FC236}">
-                <a16:creationId xmlns="" xmlns:a16="http://schemas.microsoft.com/office/drawing/2014/main" id="{979E66C2-27F5-4ADA-B05B-28A7E30C72C4}"/>
+                <a16:creationId xmlns:a16="http://schemas.microsoft.com/office/drawing/2014/main" xmlns="" id="{979E66C2-27F5-4ADA-B05B-28A7E30C72C4}"/>
               </a:ext>
             </a:extLst>
           </p:cNvPr>
@@ -2013,7 +2013,7 @@
           <p:cNvPr id="5" name="Slide Number Placeholder 4">
             <a:extLst>
               <a:ext uri="{FF2B5EF4-FFF2-40B4-BE49-F238E27FC236}">
-                <a16:creationId xmlns="" xmlns:a16="http://schemas.microsoft.com/office/drawing/2014/main" id="{339F570E-2EBF-491A-B1A3-7B0020A39D87}"/>
+                <a16:creationId xmlns:a16="http://schemas.microsoft.com/office/drawing/2014/main" xmlns="" id="{339F570E-2EBF-491A-B1A3-7B0020A39D87}"/>
               </a:ext>
             </a:extLst>
           </p:cNvPr>
@@ -2072,7 +2072,7 @@
           <p:cNvPr id="2" name="Date Placeholder 1">
             <a:extLst>
               <a:ext uri="{FF2B5EF4-FFF2-40B4-BE49-F238E27FC236}">
-                <a16:creationId xmlns="" xmlns:a16="http://schemas.microsoft.com/office/drawing/2014/main" id="{31CC9DF5-DDBA-4A27-A2BE-EE4875C95E73}"/>
+                <a16:creationId xmlns:a16="http://schemas.microsoft.com/office/drawing/2014/main" xmlns="" id="{31CC9DF5-DDBA-4A27-A2BE-EE4875C95E73}"/>
               </a:ext>
             </a:extLst>
           </p:cNvPr>
@@ -2090,7 +2090,7 @@
           <a:p>
             <a:fld id="{2F956D3E-0B91-471C-9743-3F865EE6F573}" type="datetimeFigureOut">
               <a:rPr lang="en-AU" smtClean="0"/>
-              <a:t>20/08/2018</a:t>
+              <a:t>22/08/2018</a:t>
             </a:fld>
             <a:endParaRPr lang="en-AU"/>
           </a:p>
@@ -2101,7 +2101,7 @@
           <p:cNvPr id="3" name="Footer Placeholder 2">
             <a:extLst>
               <a:ext uri="{FF2B5EF4-FFF2-40B4-BE49-F238E27FC236}">
-                <a16:creationId xmlns="" xmlns:a16="http://schemas.microsoft.com/office/drawing/2014/main" id="{5E855F50-D457-4213-B498-4635BD853470}"/>
+                <a16:creationId xmlns:a16="http://schemas.microsoft.com/office/drawing/2014/main" xmlns="" id="{5E855F50-D457-4213-B498-4635BD853470}"/>
               </a:ext>
             </a:extLst>
           </p:cNvPr>
@@ -2126,7 +2126,7 @@
           <p:cNvPr id="4" name="Slide Number Placeholder 3">
             <a:extLst>
               <a:ext uri="{FF2B5EF4-FFF2-40B4-BE49-F238E27FC236}">
-                <a16:creationId xmlns="" xmlns:a16="http://schemas.microsoft.com/office/drawing/2014/main" id="{1424F85B-ACD9-4362-A6F2-B7C48F575113}"/>
+                <a16:creationId xmlns:a16="http://schemas.microsoft.com/office/drawing/2014/main" xmlns="" id="{1424F85B-ACD9-4362-A6F2-B7C48F575113}"/>
               </a:ext>
             </a:extLst>
           </p:cNvPr>
@@ -2185,7 +2185,7 @@
           <p:cNvPr id="2" name="Title 1">
             <a:extLst>
               <a:ext uri="{FF2B5EF4-FFF2-40B4-BE49-F238E27FC236}">
-                <a16:creationId xmlns="" xmlns:a16="http://schemas.microsoft.com/office/drawing/2014/main" id="{BD554F58-5E8E-48ED-8ED9-A0BD06E6F218}"/>
+                <a16:creationId xmlns:a16="http://schemas.microsoft.com/office/drawing/2014/main" xmlns="" id="{BD554F58-5E8E-48ED-8ED9-A0BD06E6F218}"/>
               </a:ext>
             </a:extLst>
           </p:cNvPr>
@@ -2223,7 +2223,7 @@
           <p:cNvPr id="3" name="Content Placeholder 2">
             <a:extLst>
               <a:ext uri="{FF2B5EF4-FFF2-40B4-BE49-F238E27FC236}">
-                <a16:creationId xmlns="" xmlns:a16="http://schemas.microsoft.com/office/drawing/2014/main" id="{88E32398-FD1A-4262-BB8C-6CFB63C85CED}"/>
+                <a16:creationId xmlns:a16="http://schemas.microsoft.com/office/drawing/2014/main" xmlns="" id="{88E32398-FD1A-4262-BB8C-6CFB63C85CED}"/>
               </a:ext>
             </a:extLst>
           </p:cNvPr>
@@ -2314,7 +2314,7 @@
           <p:cNvPr id="4" name="Text Placeholder 3">
             <a:extLst>
               <a:ext uri="{FF2B5EF4-FFF2-40B4-BE49-F238E27FC236}">
-                <a16:creationId xmlns="" xmlns:a16="http://schemas.microsoft.com/office/drawing/2014/main" id="{373EAC1B-2FB9-4226-BCA0-E5D3B01D6FA0}"/>
+                <a16:creationId xmlns:a16="http://schemas.microsoft.com/office/drawing/2014/main" xmlns="" id="{373EAC1B-2FB9-4226-BCA0-E5D3B01D6FA0}"/>
               </a:ext>
             </a:extLst>
           </p:cNvPr>
@@ -2385,7 +2385,7 @@
           <p:cNvPr id="5" name="Date Placeholder 4">
             <a:extLst>
               <a:ext uri="{FF2B5EF4-FFF2-40B4-BE49-F238E27FC236}">
-                <a16:creationId xmlns="" xmlns:a16="http://schemas.microsoft.com/office/drawing/2014/main" id="{D639F409-5438-45DD-BECC-62B7B0AAF361}"/>
+                <a16:creationId xmlns:a16="http://schemas.microsoft.com/office/drawing/2014/main" xmlns="" id="{D639F409-5438-45DD-BECC-62B7B0AAF361}"/>
               </a:ext>
             </a:extLst>
           </p:cNvPr>
@@ -2403,7 +2403,7 @@
           <a:p>
             <a:fld id="{2F956D3E-0B91-471C-9743-3F865EE6F573}" type="datetimeFigureOut">
               <a:rPr lang="en-AU" smtClean="0"/>
-              <a:t>20/08/2018</a:t>
+              <a:t>22/08/2018</a:t>
             </a:fld>
             <a:endParaRPr lang="en-AU"/>
           </a:p>
@@ -2414,7 +2414,7 @@
           <p:cNvPr id="6" name="Footer Placeholder 5">
             <a:extLst>
               <a:ext uri="{FF2B5EF4-FFF2-40B4-BE49-F238E27FC236}">
-                <a16:creationId xmlns="" xmlns:a16="http://schemas.microsoft.com/office/drawing/2014/main" id="{2311AAC2-3F58-465D-8275-AAB451586BBE}"/>
+                <a16:creationId xmlns:a16="http://schemas.microsoft.com/office/drawing/2014/main" xmlns="" id="{2311AAC2-3F58-465D-8275-AAB451586BBE}"/>
               </a:ext>
             </a:extLst>
           </p:cNvPr>
@@ -2439,7 +2439,7 @@
           <p:cNvPr id="7" name="Slide Number Placeholder 6">
             <a:extLst>
               <a:ext uri="{FF2B5EF4-FFF2-40B4-BE49-F238E27FC236}">
-                <a16:creationId xmlns="" xmlns:a16="http://schemas.microsoft.com/office/drawing/2014/main" id="{4076C87A-5864-468D-9EE2-7F4B0C093074}"/>
+                <a16:creationId xmlns:a16="http://schemas.microsoft.com/office/drawing/2014/main" xmlns="" id="{4076C87A-5864-468D-9EE2-7F4B0C093074}"/>
               </a:ext>
             </a:extLst>
           </p:cNvPr>
@@ -2498,7 +2498,7 @@
           <p:cNvPr id="2" name="Title 1">
             <a:extLst>
               <a:ext uri="{FF2B5EF4-FFF2-40B4-BE49-F238E27FC236}">
-                <a16:creationId xmlns="" xmlns:a16="http://schemas.microsoft.com/office/drawing/2014/main" id="{B5D51929-B485-4C5E-86DE-E6E2074D6CE5}"/>
+                <a16:creationId xmlns:a16="http://schemas.microsoft.com/office/drawing/2014/main" xmlns="" id="{B5D51929-B485-4C5E-86DE-E6E2074D6CE5}"/>
               </a:ext>
             </a:extLst>
           </p:cNvPr>
@@ -2536,7 +2536,7 @@
           <p:cNvPr id="3" name="Picture Placeholder 2">
             <a:extLst>
               <a:ext uri="{FF2B5EF4-FFF2-40B4-BE49-F238E27FC236}">
-                <a16:creationId xmlns="" xmlns:a16="http://schemas.microsoft.com/office/drawing/2014/main" id="{745CAD50-DBFD-4B1E-8C5A-FEC1D2159DDB}"/>
+                <a16:creationId xmlns:a16="http://schemas.microsoft.com/office/drawing/2014/main" xmlns="" id="{745CAD50-DBFD-4B1E-8C5A-FEC1D2159DDB}"/>
               </a:ext>
             </a:extLst>
           </p:cNvPr>
@@ -2603,7 +2603,7 @@
           <p:cNvPr id="4" name="Text Placeholder 3">
             <a:extLst>
               <a:ext uri="{FF2B5EF4-FFF2-40B4-BE49-F238E27FC236}">
-                <a16:creationId xmlns="" xmlns:a16="http://schemas.microsoft.com/office/drawing/2014/main" id="{56CA1066-373C-4A49-B657-9EE7DCD0952D}"/>
+                <a16:creationId xmlns:a16="http://schemas.microsoft.com/office/drawing/2014/main" xmlns="" id="{56CA1066-373C-4A49-B657-9EE7DCD0952D}"/>
               </a:ext>
             </a:extLst>
           </p:cNvPr>
@@ -2674,7 +2674,7 @@
           <p:cNvPr id="5" name="Date Placeholder 4">
             <a:extLst>
               <a:ext uri="{FF2B5EF4-FFF2-40B4-BE49-F238E27FC236}">
-                <a16:creationId xmlns="" xmlns:a16="http://schemas.microsoft.com/office/drawing/2014/main" id="{D4F04E1C-BF5B-43FA-9CA9-C4A3872ABD47}"/>
+                <a16:creationId xmlns:a16="http://schemas.microsoft.com/office/drawing/2014/main" xmlns="" id="{D4F04E1C-BF5B-43FA-9CA9-C4A3872ABD47}"/>
               </a:ext>
             </a:extLst>
           </p:cNvPr>
@@ -2692,7 +2692,7 @@
           <a:p>
             <a:fld id="{2F956D3E-0B91-471C-9743-3F865EE6F573}" type="datetimeFigureOut">
               <a:rPr lang="en-AU" smtClean="0"/>
-              <a:t>20/08/2018</a:t>
+              <a:t>22/08/2018</a:t>
             </a:fld>
             <a:endParaRPr lang="en-AU"/>
           </a:p>
@@ -2703,7 +2703,7 @@
           <p:cNvPr id="6" name="Footer Placeholder 5">
             <a:extLst>
               <a:ext uri="{FF2B5EF4-FFF2-40B4-BE49-F238E27FC236}">
-                <a16:creationId xmlns="" xmlns:a16="http://schemas.microsoft.com/office/drawing/2014/main" id="{B3F3C200-5776-44B6-80D6-B576FC6FE4A1}"/>
+                <a16:creationId xmlns:a16="http://schemas.microsoft.com/office/drawing/2014/main" xmlns="" id="{B3F3C200-5776-44B6-80D6-B576FC6FE4A1}"/>
               </a:ext>
             </a:extLst>
           </p:cNvPr>
@@ -2728,7 +2728,7 @@
           <p:cNvPr id="7" name="Slide Number Placeholder 6">
             <a:extLst>
               <a:ext uri="{FF2B5EF4-FFF2-40B4-BE49-F238E27FC236}">
-                <a16:creationId xmlns="" xmlns:a16="http://schemas.microsoft.com/office/drawing/2014/main" id="{C83FA351-8092-4D78-A9C7-A20A77930D3D}"/>
+                <a16:creationId xmlns:a16="http://schemas.microsoft.com/office/drawing/2014/main" xmlns="" id="{C83FA351-8092-4D78-A9C7-A20A77930D3D}"/>
               </a:ext>
             </a:extLst>
           </p:cNvPr>
@@ -2792,7 +2792,7 @@
           <p:cNvPr id="2" name="Title Placeholder 1">
             <a:extLst>
               <a:ext uri="{FF2B5EF4-FFF2-40B4-BE49-F238E27FC236}">
-                <a16:creationId xmlns="" xmlns:a16="http://schemas.microsoft.com/office/drawing/2014/main" id="{417237BA-4865-4280-8BD0-E6D106DFB608}"/>
+                <a16:creationId xmlns:a16="http://schemas.microsoft.com/office/drawing/2014/main" xmlns="" id="{417237BA-4865-4280-8BD0-E6D106DFB608}"/>
               </a:ext>
             </a:extLst>
           </p:cNvPr>
@@ -2831,7 +2831,7 @@
           <p:cNvPr id="3" name="Text Placeholder 2">
             <a:extLst>
               <a:ext uri="{FF2B5EF4-FFF2-40B4-BE49-F238E27FC236}">
-                <a16:creationId xmlns="" xmlns:a16="http://schemas.microsoft.com/office/drawing/2014/main" id="{CFD6DF4C-CD43-4DDE-9E26-4DAB0E753402}"/>
+                <a16:creationId xmlns:a16="http://schemas.microsoft.com/office/drawing/2014/main" xmlns="" id="{CFD6DF4C-CD43-4DDE-9E26-4DAB0E753402}"/>
               </a:ext>
             </a:extLst>
           </p:cNvPr>
@@ -2899,7 +2899,7 @@
           <p:cNvPr id="4" name="Date Placeholder 3">
             <a:extLst>
               <a:ext uri="{FF2B5EF4-FFF2-40B4-BE49-F238E27FC236}">
-                <a16:creationId xmlns="" xmlns:a16="http://schemas.microsoft.com/office/drawing/2014/main" id="{4E8F96A9-316E-4272-B736-3B7A5BEFB368}"/>
+                <a16:creationId xmlns:a16="http://schemas.microsoft.com/office/drawing/2014/main" xmlns="" id="{4E8F96A9-316E-4272-B736-3B7A5BEFB368}"/>
               </a:ext>
             </a:extLst>
           </p:cNvPr>
@@ -2935,7 +2935,7 @@
           <a:p>
             <a:fld id="{2F956D3E-0B91-471C-9743-3F865EE6F573}" type="datetimeFigureOut">
               <a:rPr lang="en-AU" smtClean="0"/>
-              <a:t>20/08/2018</a:t>
+              <a:t>22/08/2018</a:t>
             </a:fld>
             <a:endParaRPr lang="en-AU"/>
           </a:p>
@@ -2946,7 +2946,7 @@
           <p:cNvPr id="5" name="Footer Placeholder 4">
             <a:extLst>
               <a:ext uri="{FF2B5EF4-FFF2-40B4-BE49-F238E27FC236}">
-                <a16:creationId xmlns="" xmlns:a16="http://schemas.microsoft.com/office/drawing/2014/main" id="{5B9B060F-4139-42DD-835A-DD48B4C35B93}"/>
+                <a16:creationId xmlns:a16="http://schemas.microsoft.com/office/drawing/2014/main" xmlns="" id="{5B9B060F-4139-42DD-835A-DD48B4C35B93}"/>
               </a:ext>
             </a:extLst>
           </p:cNvPr>
@@ -2989,7 +2989,7 @@
           <p:cNvPr id="6" name="Slide Number Placeholder 5">
             <a:extLst>
               <a:ext uri="{FF2B5EF4-FFF2-40B4-BE49-F238E27FC236}">
-                <a16:creationId xmlns="" xmlns:a16="http://schemas.microsoft.com/office/drawing/2014/main" id="{419ED261-D27A-4F8B-A664-31C7824BE2CC}"/>
+                <a16:creationId xmlns:a16="http://schemas.microsoft.com/office/drawing/2014/main" xmlns="" id="{419ED261-D27A-4F8B-A664-31C7824BE2CC}"/>
               </a:ext>
             </a:extLst>
           </p:cNvPr>
@@ -3357,7 +3357,7 @@
           <p:cNvPr id="4" name="Rectangle: Rounded Corners 3">
             <a:extLst>
               <a:ext uri="{FF2B5EF4-FFF2-40B4-BE49-F238E27FC236}">
-                <a16:creationId xmlns="" xmlns:a16="http://schemas.microsoft.com/office/drawing/2014/main" id="{54D0FB8B-B098-491A-AD31-AD421AB902EF}"/>
+                <a16:creationId xmlns:a16="http://schemas.microsoft.com/office/drawing/2014/main" xmlns="" id="{54D0FB8B-B098-491A-AD31-AD421AB902EF}"/>
               </a:ext>
             </a:extLst>
           </p:cNvPr>
@@ -3416,7 +3416,7 @@
           <p:cNvPr id="5" name="Rectangle: Rounded Corners 4">
             <a:extLst>
               <a:ext uri="{FF2B5EF4-FFF2-40B4-BE49-F238E27FC236}">
-                <a16:creationId xmlns="" xmlns:a16="http://schemas.microsoft.com/office/drawing/2014/main" id="{5675C345-97DA-44C4-8895-174F9B25EB74}"/>
+                <a16:creationId xmlns:a16="http://schemas.microsoft.com/office/drawing/2014/main" xmlns="" id="{5675C345-97DA-44C4-8895-174F9B25EB74}"/>
               </a:ext>
             </a:extLst>
           </p:cNvPr>
@@ -3475,7 +3475,7 @@
           <p:cNvPr id="10" name="Straight Arrow Connector 9">
             <a:extLst>
               <a:ext uri="{FF2B5EF4-FFF2-40B4-BE49-F238E27FC236}">
-                <a16:creationId xmlns="" xmlns:a16="http://schemas.microsoft.com/office/drawing/2014/main" id="{2738494B-22BB-4E16-AA8E-063441F62080}"/>
+                <a16:creationId xmlns:a16="http://schemas.microsoft.com/office/drawing/2014/main" xmlns="" id="{2738494B-22BB-4E16-AA8E-063441F62080}"/>
               </a:ext>
             </a:extLst>
           </p:cNvPr>
@@ -3517,7 +3517,7 @@
           <p:cNvPr id="11" name="TextBox 10">
             <a:extLst>
               <a:ext uri="{FF2B5EF4-FFF2-40B4-BE49-F238E27FC236}">
-                <a16:creationId xmlns="" xmlns:a16="http://schemas.microsoft.com/office/drawing/2014/main" id="{EA0207FA-CB6D-4700-A943-37A35E7A7F6C}"/>
+                <a16:creationId xmlns:a16="http://schemas.microsoft.com/office/drawing/2014/main" xmlns="" id="{EA0207FA-CB6D-4700-A943-37A35E7A7F6C}"/>
               </a:ext>
             </a:extLst>
           </p:cNvPr>
@@ -3553,7 +3553,7 @@
           <p:cNvPr id="12" name="Rectangle: Rounded Corners 11">
             <a:extLst>
               <a:ext uri="{FF2B5EF4-FFF2-40B4-BE49-F238E27FC236}">
-                <a16:creationId xmlns="" xmlns:a16="http://schemas.microsoft.com/office/drawing/2014/main" id="{0172D6A7-F319-4C98-BCFD-58AB9FFA137C}"/>
+                <a16:creationId xmlns:a16="http://schemas.microsoft.com/office/drawing/2014/main" xmlns="" id="{0172D6A7-F319-4C98-BCFD-58AB9FFA137C}"/>
               </a:ext>
             </a:extLst>
           </p:cNvPr>
@@ -3612,7 +3612,7 @@
           <p:cNvPr id="13" name="Rectangle: Rounded Corners 12">
             <a:extLst>
               <a:ext uri="{FF2B5EF4-FFF2-40B4-BE49-F238E27FC236}">
-                <a16:creationId xmlns="" xmlns:a16="http://schemas.microsoft.com/office/drawing/2014/main" id="{351768B8-B0F4-49E5-A1C4-CB95780972A0}"/>
+                <a16:creationId xmlns:a16="http://schemas.microsoft.com/office/drawing/2014/main" xmlns="" id="{351768B8-B0F4-49E5-A1C4-CB95780972A0}"/>
               </a:ext>
             </a:extLst>
           </p:cNvPr>
@@ -3671,7 +3671,7 @@
           <p:cNvPr id="14" name="Rectangle: Rounded Corners 13">
             <a:extLst>
               <a:ext uri="{FF2B5EF4-FFF2-40B4-BE49-F238E27FC236}">
-                <a16:creationId xmlns="" xmlns:a16="http://schemas.microsoft.com/office/drawing/2014/main" id="{C3BAB69B-ADA0-48E1-A7A3-2F500C2A407E}"/>
+                <a16:creationId xmlns:a16="http://schemas.microsoft.com/office/drawing/2014/main" xmlns="" id="{C3BAB69B-ADA0-48E1-A7A3-2F500C2A407E}"/>
               </a:ext>
             </a:extLst>
           </p:cNvPr>
@@ -3730,7 +3730,7 @@
           <p:cNvPr id="15" name="Rectangle: Rounded Corners 14">
             <a:extLst>
               <a:ext uri="{FF2B5EF4-FFF2-40B4-BE49-F238E27FC236}">
-                <a16:creationId xmlns="" xmlns:a16="http://schemas.microsoft.com/office/drawing/2014/main" id="{415FC0F5-4B41-4A53-9189-AE991ED2BD31}"/>
+                <a16:creationId xmlns:a16="http://schemas.microsoft.com/office/drawing/2014/main" xmlns="" id="{415FC0F5-4B41-4A53-9189-AE991ED2BD31}"/>
               </a:ext>
             </a:extLst>
           </p:cNvPr>
@@ -3789,7 +3789,7 @@
           <p:cNvPr id="16" name="Rectangle: Rounded Corners 15">
             <a:extLst>
               <a:ext uri="{FF2B5EF4-FFF2-40B4-BE49-F238E27FC236}">
-                <a16:creationId xmlns="" xmlns:a16="http://schemas.microsoft.com/office/drawing/2014/main" id="{80DE7B24-B7E9-47B6-8E88-EC972ED19123}"/>
+                <a16:creationId xmlns:a16="http://schemas.microsoft.com/office/drawing/2014/main" xmlns="" id="{80DE7B24-B7E9-47B6-8E88-EC972ED19123}"/>
               </a:ext>
             </a:extLst>
           </p:cNvPr>
@@ -3848,7 +3848,7 @@
           <p:cNvPr id="17" name="Connector: Elbow 16">
             <a:extLst>
               <a:ext uri="{FF2B5EF4-FFF2-40B4-BE49-F238E27FC236}">
-                <a16:creationId xmlns="" xmlns:a16="http://schemas.microsoft.com/office/drawing/2014/main" id="{64514852-CA0B-4B22-9112-9C0EFB8F9B9B}"/>
+                <a16:creationId xmlns:a16="http://schemas.microsoft.com/office/drawing/2014/main" xmlns="" id="{64514852-CA0B-4B22-9112-9C0EFB8F9B9B}"/>
               </a:ext>
             </a:extLst>
           </p:cNvPr>
@@ -3896,7 +3896,7 @@
           <p:cNvPr id="20" name="Connector: Elbow 19">
             <a:extLst>
               <a:ext uri="{FF2B5EF4-FFF2-40B4-BE49-F238E27FC236}">
-                <a16:creationId xmlns="" xmlns:a16="http://schemas.microsoft.com/office/drawing/2014/main" id="{E118E15D-38EF-455D-87FB-59C64F2455B6}"/>
+                <a16:creationId xmlns:a16="http://schemas.microsoft.com/office/drawing/2014/main" xmlns="" id="{E118E15D-38EF-455D-87FB-59C64F2455B6}"/>
               </a:ext>
             </a:extLst>
           </p:cNvPr>
@@ -3944,7 +3944,7 @@
           <p:cNvPr id="23" name="Connector: Elbow 22">
             <a:extLst>
               <a:ext uri="{FF2B5EF4-FFF2-40B4-BE49-F238E27FC236}">
-                <a16:creationId xmlns="" xmlns:a16="http://schemas.microsoft.com/office/drawing/2014/main" id="{B493C084-F212-492E-957C-8BEA879E995D}"/>
+                <a16:creationId xmlns:a16="http://schemas.microsoft.com/office/drawing/2014/main" xmlns="" id="{B493C084-F212-492E-957C-8BEA879E995D}"/>
               </a:ext>
             </a:extLst>
           </p:cNvPr>
@@ -3992,7 +3992,7 @@
           <p:cNvPr id="30" name="Rectangle: Rounded Corners 29">
             <a:extLst>
               <a:ext uri="{FF2B5EF4-FFF2-40B4-BE49-F238E27FC236}">
-                <a16:creationId xmlns="" xmlns:a16="http://schemas.microsoft.com/office/drawing/2014/main" id="{19F24737-7B63-4E7B-9AE5-A87497FA6FAF}"/>
+                <a16:creationId xmlns:a16="http://schemas.microsoft.com/office/drawing/2014/main" xmlns="" id="{19F24737-7B63-4E7B-9AE5-A87497FA6FAF}"/>
               </a:ext>
             </a:extLst>
           </p:cNvPr>
@@ -4051,7 +4051,7 @@
           <p:cNvPr id="31" name="Rectangle: Rounded Corners 30">
             <a:extLst>
               <a:ext uri="{FF2B5EF4-FFF2-40B4-BE49-F238E27FC236}">
-                <a16:creationId xmlns="" xmlns:a16="http://schemas.microsoft.com/office/drawing/2014/main" id="{7BC2DA58-1C14-4D8B-9AF3-E14F6FAD8FC0}"/>
+                <a16:creationId xmlns:a16="http://schemas.microsoft.com/office/drawing/2014/main" xmlns="" id="{7BC2DA58-1C14-4D8B-9AF3-E14F6FAD8FC0}"/>
               </a:ext>
             </a:extLst>
           </p:cNvPr>
@@ -4110,7 +4110,7 @@
           <p:cNvPr id="32" name="Rectangle: Rounded Corners 31">
             <a:extLst>
               <a:ext uri="{FF2B5EF4-FFF2-40B4-BE49-F238E27FC236}">
-                <a16:creationId xmlns="" xmlns:a16="http://schemas.microsoft.com/office/drawing/2014/main" id="{A2415D34-9AEB-4D3C-8B85-9A65A96218FE}"/>
+                <a16:creationId xmlns:a16="http://schemas.microsoft.com/office/drawing/2014/main" xmlns="" id="{A2415D34-9AEB-4D3C-8B85-9A65A96218FE}"/>
               </a:ext>
             </a:extLst>
           </p:cNvPr>
@@ -4169,7 +4169,7 @@
           <p:cNvPr id="33" name="Connector: Elbow 32">
             <a:extLst>
               <a:ext uri="{FF2B5EF4-FFF2-40B4-BE49-F238E27FC236}">
-                <a16:creationId xmlns="" xmlns:a16="http://schemas.microsoft.com/office/drawing/2014/main" id="{821A3089-B696-4653-B73B-39B49F027466}"/>
+                <a16:creationId xmlns:a16="http://schemas.microsoft.com/office/drawing/2014/main" xmlns="" id="{821A3089-B696-4653-B73B-39B49F027466}"/>
               </a:ext>
             </a:extLst>
           </p:cNvPr>
@@ -4217,7 +4217,7 @@
           <p:cNvPr id="36" name="Connector: Elbow 35">
             <a:extLst>
               <a:ext uri="{FF2B5EF4-FFF2-40B4-BE49-F238E27FC236}">
-                <a16:creationId xmlns="" xmlns:a16="http://schemas.microsoft.com/office/drawing/2014/main" id="{0E570848-FE64-4E6A-A947-1CBC1911E97A}"/>
+                <a16:creationId xmlns:a16="http://schemas.microsoft.com/office/drawing/2014/main" xmlns="" id="{0E570848-FE64-4E6A-A947-1CBC1911E97A}"/>
               </a:ext>
             </a:extLst>
           </p:cNvPr>
@@ -4265,7 +4265,7 @@
           <p:cNvPr id="8" name="Straight Arrow Connector 7">
             <a:extLst>
               <a:ext uri="{FF2B5EF4-FFF2-40B4-BE49-F238E27FC236}">
-                <a16:creationId xmlns="" xmlns:a16="http://schemas.microsoft.com/office/drawing/2014/main" id="{02FF8AEF-9744-4B1C-ACB9-E3241ACF27D1}"/>
+                <a16:creationId xmlns:a16="http://schemas.microsoft.com/office/drawing/2014/main" xmlns="" id="{02FF8AEF-9744-4B1C-ACB9-E3241ACF27D1}"/>
               </a:ext>
             </a:extLst>
           </p:cNvPr>
@@ -4310,7 +4310,7 @@
           <p:cNvPr id="25" name="Rectangle: Rounded Corners 24">
             <a:extLst>
               <a:ext uri="{FF2B5EF4-FFF2-40B4-BE49-F238E27FC236}">
-                <a16:creationId xmlns="" xmlns:a16="http://schemas.microsoft.com/office/drawing/2014/main" id="{509E733A-9C35-48BC-B1CE-379C573000FE}"/>
+                <a16:creationId xmlns:a16="http://schemas.microsoft.com/office/drawing/2014/main" xmlns="" id="{509E733A-9C35-48BC-B1CE-379C573000FE}"/>
               </a:ext>
             </a:extLst>
           </p:cNvPr>
@@ -4369,7 +4369,7 @@
           <p:cNvPr id="26" name="Straight Arrow Connector 25">
             <a:extLst>
               <a:ext uri="{FF2B5EF4-FFF2-40B4-BE49-F238E27FC236}">
-                <a16:creationId xmlns="" xmlns:a16="http://schemas.microsoft.com/office/drawing/2014/main" id="{45BB73C4-0487-4332-804D-0640F1C24DD7}"/>
+                <a16:creationId xmlns:a16="http://schemas.microsoft.com/office/drawing/2014/main" xmlns="" id="{45BB73C4-0487-4332-804D-0640F1C24DD7}"/>
               </a:ext>
             </a:extLst>
           </p:cNvPr>
@@ -4416,7 +4416,7 @@
           <p:cNvPr id="29" name="TextBox 28">
             <a:extLst>
               <a:ext uri="{FF2B5EF4-FFF2-40B4-BE49-F238E27FC236}">
-                <a16:creationId xmlns="" xmlns:a16="http://schemas.microsoft.com/office/drawing/2014/main" id="{ECF64CE6-E66F-4FF9-8239-2D9801A3273B}"/>
+                <a16:creationId xmlns:a16="http://schemas.microsoft.com/office/drawing/2014/main" xmlns="" id="{ECF64CE6-E66F-4FF9-8239-2D9801A3273B}"/>
               </a:ext>
             </a:extLst>
           </p:cNvPr>
@@ -4452,7 +4452,7 @@
           <p:cNvPr id="34" name="Connector: Elbow 33">
             <a:extLst>
               <a:ext uri="{FF2B5EF4-FFF2-40B4-BE49-F238E27FC236}">
-                <a16:creationId xmlns="" xmlns:a16="http://schemas.microsoft.com/office/drawing/2014/main" id="{762DA317-C2C5-4F35-8BEE-2475336742C9}"/>
+                <a16:creationId xmlns:a16="http://schemas.microsoft.com/office/drawing/2014/main" xmlns="" id="{762DA317-C2C5-4F35-8BEE-2475336742C9}"/>
               </a:ext>
             </a:extLst>
           </p:cNvPr>
@@ -4501,7 +4501,7 @@
           <p:cNvPr id="35" name="Connector: Elbow 34">
             <a:extLst>
               <a:ext uri="{FF2B5EF4-FFF2-40B4-BE49-F238E27FC236}">
-                <a16:creationId xmlns="" xmlns:a16="http://schemas.microsoft.com/office/drawing/2014/main" id="{326F3BCB-F2A3-492C-A8F3-20922107B29D}"/>
+                <a16:creationId xmlns:a16="http://schemas.microsoft.com/office/drawing/2014/main" xmlns="" id="{326F3BCB-F2A3-492C-A8F3-20922107B29D}"/>
               </a:ext>
             </a:extLst>
           </p:cNvPr>
@@ -4550,7 +4550,7 @@
           <p:cNvPr id="37" name="Connector: Elbow 36">
             <a:extLst>
               <a:ext uri="{FF2B5EF4-FFF2-40B4-BE49-F238E27FC236}">
-                <a16:creationId xmlns="" xmlns:a16="http://schemas.microsoft.com/office/drawing/2014/main" id="{D78C9AF8-6E97-4A41-9699-F00133FB72EE}"/>
+                <a16:creationId xmlns:a16="http://schemas.microsoft.com/office/drawing/2014/main" xmlns="" id="{D78C9AF8-6E97-4A41-9699-F00133FB72EE}"/>
               </a:ext>
             </a:extLst>
           </p:cNvPr>
@@ -4599,7 +4599,7 @@
           <p:cNvPr id="83" name="TextBox 82">
             <a:extLst>
               <a:ext uri="{FF2B5EF4-FFF2-40B4-BE49-F238E27FC236}">
-                <a16:creationId xmlns="" xmlns:a16="http://schemas.microsoft.com/office/drawing/2014/main" id="{C34CC880-1902-497C-A44A-571D93EAD548}"/>
+                <a16:creationId xmlns:a16="http://schemas.microsoft.com/office/drawing/2014/main" xmlns="" id="{C34CC880-1902-497C-A44A-571D93EAD548}"/>
               </a:ext>
             </a:extLst>
           </p:cNvPr>
@@ -4634,7 +4634,7 @@
           <p:cNvPr id="84" name="TextBox 83">
             <a:extLst>
               <a:ext uri="{FF2B5EF4-FFF2-40B4-BE49-F238E27FC236}">
-                <a16:creationId xmlns="" xmlns:a16="http://schemas.microsoft.com/office/drawing/2014/main" id="{582DAA28-77DF-48AB-A0FA-7D0944EEA418}"/>
+                <a16:creationId xmlns:a16="http://schemas.microsoft.com/office/drawing/2014/main" xmlns="" id="{582DAA28-77DF-48AB-A0FA-7D0944EEA418}"/>
               </a:ext>
             </a:extLst>
           </p:cNvPr>
@@ -4669,7 +4669,7 @@
           <p:cNvPr id="85" name="TextBox 84">
             <a:extLst>
               <a:ext uri="{FF2B5EF4-FFF2-40B4-BE49-F238E27FC236}">
-                <a16:creationId xmlns="" xmlns:a16="http://schemas.microsoft.com/office/drawing/2014/main" id="{35632462-2816-4AB9-8863-E2858DF02B69}"/>
+                <a16:creationId xmlns:a16="http://schemas.microsoft.com/office/drawing/2014/main" xmlns="" id="{35632462-2816-4AB9-8863-E2858DF02B69}"/>
               </a:ext>
             </a:extLst>
           </p:cNvPr>
@@ -4704,7 +4704,7 @@
           <p:cNvPr id="98" name="Connector: Elbow 97">
             <a:extLst>
               <a:ext uri="{FF2B5EF4-FFF2-40B4-BE49-F238E27FC236}">
-                <a16:creationId xmlns="" xmlns:a16="http://schemas.microsoft.com/office/drawing/2014/main" id="{A1F2BECA-1D96-4FF9-8754-645C1D7726F8}"/>
+                <a16:creationId xmlns:a16="http://schemas.microsoft.com/office/drawing/2014/main" xmlns="" id="{A1F2BECA-1D96-4FF9-8754-645C1D7726F8}"/>
               </a:ext>
             </a:extLst>
           </p:cNvPr>
@@ -4753,7 +4753,7 @@
           <p:cNvPr id="101" name="Connector: Elbow 100">
             <a:extLst>
               <a:ext uri="{FF2B5EF4-FFF2-40B4-BE49-F238E27FC236}">
-                <a16:creationId xmlns="" xmlns:a16="http://schemas.microsoft.com/office/drawing/2014/main" id="{36519D8D-4EA4-45AD-AD01-BCA533BD100D}"/>
+                <a16:creationId xmlns:a16="http://schemas.microsoft.com/office/drawing/2014/main" xmlns="" id="{36519D8D-4EA4-45AD-AD01-BCA533BD100D}"/>
               </a:ext>
             </a:extLst>
           </p:cNvPr>
@@ -4802,7 +4802,7 @@
           <p:cNvPr id="104" name="TextBox 103">
             <a:extLst>
               <a:ext uri="{FF2B5EF4-FFF2-40B4-BE49-F238E27FC236}">
-                <a16:creationId xmlns="" xmlns:a16="http://schemas.microsoft.com/office/drawing/2014/main" id="{6D855CC4-9F24-4FB0-84C5-F540689823DA}"/>
+                <a16:creationId xmlns:a16="http://schemas.microsoft.com/office/drawing/2014/main" xmlns="" id="{6D855CC4-9F24-4FB0-84C5-F540689823DA}"/>
               </a:ext>
             </a:extLst>
           </p:cNvPr>
@@ -4837,7 +4837,7 @@
           <p:cNvPr id="105" name="TextBox 104">
             <a:extLst>
               <a:ext uri="{FF2B5EF4-FFF2-40B4-BE49-F238E27FC236}">
-                <a16:creationId xmlns="" xmlns:a16="http://schemas.microsoft.com/office/drawing/2014/main" id="{312F8B0D-878E-4CFD-AF2D-6C5C84BC7C3F}"/>
+                <a16:creationId xmlns:a16="http://schemas.microsoft.com/office/drawing/2014/main" xmlns="" id="{312F8B0D-878E-4CFD-AF2D-6C5C84BC7C3F}"/>
               </a:ext>
             </a:extLst>
           </p:cNvPr>
@@ -4872,7 +4872,7 @@
           <p:cNvPr id="106" name="Connector: Elbow 105">
             <a:extLst>
               <a:ext uri="{FF2B5EF4-FFF2-40B4-BE49-F238E27FC236}">
-                <a16:creationId xmlns="" xmlns:a16="http://schemas.microsoft.com/office/drawing/2014/main" id="{AFDAAF80-D279-45C4-BA1C-63276C92DDEA}"/>
+                <a16:creationId xmlns:a16="http://schemas.microsoft.com/office/drawing/2014/main" xmlns="" id="{AFDAAF80-D279-45C4-BA1C-63276C92DDEA}"/>
               </a:ext>
             </a:extLst>
           </p:cNvPr>
@@ -4921,7 +4921,7 @@
           <p:cNvPr id="109" name="TextBox 108">
             <a:extLst>
               <a:ext uri="{FF2B5EF4-FFF2-40B4-BE49-F238E27FC236}">
-                <a16:creationId xmlns="" xmlns:a16="http://schemas.microsoft.com/office/drawing/2014/main" id="{68F80759-A938-4EC4-AB28-CF35C69A0B12}"/>
+                <a16:creationId xmlns:a16="http://schemas.microsoft.com/office/drawing/2014/main" xmlns="" id="{68F80759-A938-4EC4-AB28-CF35C69A0B12}"/>
               </a:ext>
             </a:extLst>
           </p:cNvPr>
@@ -4990,14 +4990,14 @@
           <p:nvPr>
             <p:extLst>
               <p:ext uri="{D42A27DB-BD31-4B8C-83A1-F6EECF244321}">
-                <p14:modId xmlns:p14="http://schemas.microsoft.com/office/powerpoint/2010/main" val="684467582"/>
+                <p14:modId xmlns:p14="http://schemas.microsoft.com/office/powerpoint/2010/main" val="2121050427"/>
               </p:ext>
             </p:extLst>
           </p:nvPr>
         </p:nvGraphicFramePr>
         <p:xfrm>
           <a:off x="2381813" y="825137"/>
-          <a:ext cx="1413861" cy="4572000"/>
+          <a:ext cx="1583148" cy="4404360"/>
         </p:xfrm>
         <a:graphic>
           <a:graphicData uri="http://schemas.openxmlformats.org/drawingml/2006/table">
@@ -5006,7 +5006,7 @@
                 <a:tableStyleId>{5C22544A-7EE6-4342-B048-85BDC9FD1C3A}</a:tableStyleId>
               </a:tblPr>
               <a:tblGrid>
-                <a:gridCol w="1413861"/>
+                <a:gridCol w="1583148"/>
               </a:tblGrid>
               <a:tr h="0">
                 <a:tc>
@@ -6648,14 +6648,14 @@
           <p:nvPr>
             <p:extLst>
               <p:ext uri="{D42A27DB-BD31-4B8C-83A1-F6EECF244321}">
-                <p14:modId xmlns:p14="http://schemas.microsoft.com/office/powerpoint/2010/main" val="3273842253"/>
+                <p14:modId xmlns:p14="http://schemas.microsoft.com/office/powerpoint/2010/main" val="637469376"/>
               </p:ext>
             </p:extLst>
           </p:nvPr>
         </p:nvGraphicFramePr>
         <p:xfrm>
-          <a:off x="7454558" y="3290207"/>
-          <a:ext cx="1918682" cy="3108960"/>
+          <a:off x="7521871" y="2877603"/>
+          <a:ext cx="1914122" cy="1554480"/>
         </p:xfrm>
         <a:graphic>
           <a:graphicData uri="http://schemas.openxmlformats.org/drawingml/2006/table">
@@ -6664,7 +6664,7 @@
                 <a:tableStyleId>{5C22544A-7EE6-4342-B048-85BDC9FD1C3A}</a:tableStyleId>
               </a:tblPr>
               <a:tblGrid>
-                <a:gridCol w="1918682"/>
+                <a:gridCol w="1914122"/>
               </a:tblGrid>
               <a:tr h="0">
                 <a:tc>
@@ -6675,7 +6675,7 @@
                       <a:pPr algn="ctr"/>
                       <a:r>
                         <a:rPr lang="en-AU" sz="1100" dirty="0" smtClean="0"/>
-                        <a:t>Party</a:t>
+                        <a:t>Assignor</a:t>
                       </a:r>
                       <a:endParaRPr lang="en-AU" sz="1100" dirty="0"/>
                     </a:p>
@@ -6789,7 +6789,7 @@
                     <a:p>
                       <a:r>
                         <a:rPr lang="en-AU" sz="1100" dirty="0" err="1" smtClean="0"/>
-                        <a:t>create_party</a:t>
+                        <a:t>add_assignor_to_rule</a:t>
                       </a:r>
                       <a:r>
                         <a:rPr lang="en-AU" sz="1100" dirty="0" smtClean="0"/>
@@ -6837,7 +6837,7 @@
                     <a:p>
                       <a:r>
                         <a:rPr lang="en-AU" sz="1100" dirty="0" err="1" smtClean="0"/>
-                        <a:t>delete_party</a:t>
+                        <a:t>remove_assignor_from_rule</a:t>
                       </a:r>
                       <a:r>
                         <a:rPr lang="en-AU" sz="1100" dirty="0" smtClean="0"/>
@@ -6876,7 +6876,7 @@
                     <a:p>
                       <a:r>
                         <a:rPr lang="en-AU" sz="1100" dirty="0" err="1" smtClean="0"/>
-                        <a:t>party_exists</a:t>
+                        <a:t>get_assignors_for_rule</a:t>
                       </a:r>
                       <a:r>
                         <a:rPr lang="en-AU" sz="1100" dirty="0" smtClean="0"/>
@@ -6915,244 +6915,14 @@
                     <a:p>
                       <a:r>
                         <a:rPr lang="en-AU" sz="1100" dirty="0" err="1" smtClean="0"/>
-                        <a:t>get_all_parties</a:t>
-                      </a:r>
-                      <a:r>
-                        <a:rPr lang="en-AU" sz="1100" dirty="0" smtClean="0"/>
-                        <a:t>()</a:t>
-                      </a:r>
-                      <a:endParaRPr lang="en-AU" sz="1100" dirty="0"/>
-                    </a:p>
-                  </a:txBody>
-                  <a:tcPr>
-                    <a:lnL w="12700" cap="flat" cmpd="sng" algn="ctr">
-                      <a:solidFill>
-                        <a:schemeClr val="tx1"/>
-                      </a:solidFill>
-                      <a:prstDash val="solid"/>
-                      <a:round/>
-                      <a:headEnd type="none" w="med" len="med"/>
-                      <a:tailEnd type="none" w="med" len="med"/>
-                    </a:lnL>
-                    <a:lnR w="12700" cap="flat" cmpd="sng" algn="ctr">
-                      <a:solidFill>
-                        <a:schemeClr val="tx1"/>
-                      </a:solidFill>
-                      <a:prstDash val="solid"/>
-                      <a:round/>
-                      <a:headEnd type="none" w="med" len="med"/>
-                      <a:tailEnd type="none" w="med" len="med"/>
-                    </a:lnR>
-                  </a:tcPr>
-                </a:tc>
-              </a:tr>
-              <a:tr h="0">
-                <a:tc>
-                  <a:txBody>
-                    <a:bodyPr/>
-                    <a:lstStyle/>
-                    <a:p>
-                      <a:r>
-                        <a:rPr lang="en-AU" sz="1100" dirty="0" err="1" smtClean="0"/>
-                        <a:t>add_assignor_to_rule</a:t>
-                      </a:r>
-                      <a:r>
-                        <a:rPr lang="en-AU" sz="1100" dirty="0" smtClean="0"/>
-                        <a:t>()</a:t>
-                      </a:r>
-                      <a:endParaRPr lang="en-AU" sz="1100" dirty="0"/>
-                    </a:p>
-                  </a:txBody>
-                  <a:tcPr>
-                    <a:lnL w="12700" cap="flat" cmpd="sng" algn="ctr">
-                      <a:solidFill>
-                        <a:schemeClr val="tx1"/>
-                      </a:solidFill>
-                      <a:prstDash val="solid"/>
-                      <a:round/>
-                      <a:headEnd type="none" w="med" len="med"/>
-                      <a:tailEnd type="none" w="med" len="med"/>
-                    </a:lnL>
-                    <a:lnR w="12700" cap="flat" cmpd="sng" algn="ctr">
-                      <a:solidFill>
-                        <a:schemeClr val="tx1"/>
-                      </a:solidFill>
-                      <a:prstDash val="solid"/>
-                      <a:round/>
-                      <a:headEnd type="none" w="med" len="med"/>
-                      <a:tailEnd type="none" w="med" len="med"/>
-                    </a:lnR>
-                  </a:tcPr>
-                </a:tc>
-              </a:tr>
-              <a:tr h="0">
-                <a:tc>
-                  <a:txBody>
-                    <a:bodyPr/>
-                    <a:lstStyle/>
-                    <a:p>
-                      <a:r>
-                        <a:rPr lang="en-AU" sz="1100" dirty="0" err="1" smtClean="0"/>
-                        <a:t>remove_assignor_from_rule</a:t>
-                      </a:r>
-                      <a:r>
-                        <a:rPr lang="en-AU" sz="1100" dirty="0" smtClean="0"/>
-                        <a:t>()</a:t>
-                      </a:r>
-                      <a:endParaRPr lang="en-AU" sz="1100" dirty="0"/>
-                    </a:p>
-                  </a:txBody>
-                  <a:tcPr>
-                    <a:lnL w="12700" cap="flat" cmpd="sng" algn="ctr">
-                      <a:solidFill>
-                        <a:schemeClr val="tx1"/>
-                      </a:solidFill>
-                      <a:prstDash val="solid"/>
-                      <a:round/>
-                      <a:headEnd type="none" w="med" len="med"/>
-                      <a:tailEnd type="none" w="med" len="med"/>
-                    </a:lnL>
-                    <a:lnR w="12700" cap="flat" cmpd="sng" algn="ctr">
-                      <a:solidFill>
-                        <a:schemeClr val="tx1"/>
-                      </a:solidFill>
-                      <a:prstDash val="solid"/>
-                      <a:round/>
-                      <a:headEnd type="none" w="med" len="med"/>
-                      <a:tailEnd type="none" w="med" len="med"/>
-                    </a:lnR>
-                  </a:tcPr>
-                </a:tc>
-              </a:tr>
-              <a:tr h="0">
-                <a:tc>
-                  <a:txBody>
-                    <a:bodyPr/>
-                    <a:lstStyle/>
-                    <a:p>
-                      <a:r>
-                        <a:rPr lang="en-AU" sz="1100" dirty="0" err="1" smtClean="0"/>
-                        <a:t>get_assignors_for_rule</a:t>
-                      </a:r>
-                      <a:r>
-                        <a:rPr lang="en-AU" sz="1100" dirty="0" smtClean="0"/>
-                        <a:t>()</a:t>
-                      </a:r>
-                      <a:endParaRPr lang="en-AU" sz="1100" dirty="0"/>
-                    </a:p>
-                  </a:txBody>
-                  <a:tcPr>
-                    <a:lnL w="12700" cap="flat" cmpd="sng" algn="ctr">
-                      <a:solidFill>
-                        <a:schemeClr val="tx1"/>
-                      </a:solidFill>
-                      <a:prstDash val="solid"/>
-                      <a:round/>
-                      <a:headEnd type="none" w="med" len="med"/>
-                      <a:tailEnd type="none" w="med" len="med"/>
-                    </a:lnL>
-                    <a:lnR w="12700" cap="flat" cmpd="sng" algn="ctr">
-                      <a:solidFill>
-                        <a:schemeClr val="tx1"/>
-                      </a:solidFill>
-                      <a:prstDash val="solid"/>
-                      <a:round/>
-                      <a:headEnd type="none" w="med" len="med"/>
-                      <a:tailEnd type="none" w="med" len="med"/>
-                    </a:lnR>
-                  </a:tcPr>
-                </a:tc>
-              </a:tr>
-              <a:tr h="0">
-                <a:tc>
-                  <a:txBody>
-                    <a:bodyPr/>
-                    <a:lstStyle/>
-                    <a:p>
-                      <a:r>
-                        <a:rPr lang="en-AU" sz="1100" dirty="0" err="1" smtClean="0"/>
-                        <a:t>add_assignee_to_rule</a:t>
-                      </a:r>
-                      <a:r>
-                        <a:rPr lang="en-AU" sz="1100" dirty="0" smtClean="0"/>
-                        <a:t>()</a:t>
-                      </a:r>
-                      <a:endParaRPr lang="en-AU" sz="1100" dirty="0"/>
-                    </a:p>
-                  </a:txBody>
-                  <a:tcPr>
-                    <a:lnL w="12700" cap="flat" cmpd="sng" algn="ctr">
-                      <a:solidFill>
-                        <a:schemeClr val="tx1"/>
-                      </a:solidFill>
-                      <a:prstDash val="solid"/>
-                      <a:round/>
-                      <a:headEnd type="none" w="med" len="med"/>
-                      <a:tailEnd type="none" w="med" len="med"/>
-                    </a:lnL>
-                    <a:lnR w="12700" cap="flat" cmpd="sng" algn="ctr">
-                      <a:solidFill>
-                        <a:schemeClr val="tx1"/>
-                      </a:solidFill>
-                      <a:prstDash val="solid"/>
-                      <a:round/>
-                      <a:headEnd type="none" w="med" len="med"/>
-                      <a:tailEnd type="none" w="med" len="med"/>
-                    </a:lnR>
-                  </a:tcPr>
-                </a:tc>
-              </a:tr>
-              <a:tr h="0">
-                <a:tc>
-                  <a:txBody>
-                    <a:bodyPr/>
-                    <a:lstStyle/>
-                    <a:p>
-                      <a:r>
-                        <a:rPr lang="en-AU" sz="1100" dirty="0" err="1" smtClean="0"/>
-                        <a:t>remove_assignee_from_rule</a:t>
-                      </a:r>
-                      <a:r>
-                        <a:rPr lang="en-AU" sz="1100" dirty="0" smtClean="0"/>
-                        <a:t>()</a:t>
-                      </a:r>
-                      <a:endParaRPr lang="en-AU" sz="1100" dirty="0"/>
-                    </a:p>
-                  </a:txBody>
-                  <a:tcPr>
-                    <a:lnL w="12700" cap="flat" cmpd="sng" algn="ctr">
-                      <a:solidFill>
-                        <a:schemeClr val="tx1"/>
-                      </a:solidFill>
-                      <a:prstDash val="solid"/>
-                      <a:round/>
-                      <a:headEnd type="none" w="med" len="med"/>
-                      <a:tailEnd type="none" w="med" len="med"/>
-                    </a:lnL>
-                    <a:lnR w="12700" cap="flat" cmpd="sng" algn="ctr">
-                      <a:solidFill>
-                        <a:schemeClr val="tx1"/>
-                      </a:solidFill>
-                      <a:prstDash val="solid"/>
-                      <a:round/>
-                      <a:headEnd type="none" w="med" len="med"/>
-                      <a:tailEnd type="none" w="med" len="med"/>
-                    </a:lnR>
-                  </a:tcPr>
-                </a:tc>
-              </a:tr>
-              <a:tr h="0">
-                <a:tc>
-                  <a:txBody>
-                    <a:bodyPr/>
-                    <a:lstStyle/>
-                    <a:p>
-                      <a:r>
-                        <a:rPr lang="en-AU" sz="1100" dirty="0" err="1" smtClean="0"/>
-                        <a:t>get_assignees_for_rule</a:t>
-                      </a:r>
-                      <a:r>
-                        <a:rPr lang="en-AU" sz="1100" dirty="0" smtClean="0"/>
+                        <a:t>rule</a:t>
+                      </a:r>
+                      <a:r>
+                        <a:rPr lang="en-AU" sz="1100" baseline="0" dirty="0" err="1" smtClean="0"/>
+                        <a:t>_has_assignor</a:t>
+                      </a:r>
+                      <a:r>
+                        <a:rPr lang="en-AU" sz="1100" baseline="0" dirty="0" smtClean="0"/>
                         <a:t>()</a:t>
                       </a:r>
                       <a:endParaRPr lang="en-AU" sz="1100" dirty="0"/>
@@ -7739,8 +7509,8 @@
         </p:nvCxnSpPr>
         <p:spPr>
           <a:xfrm>
-            <a:off x="3795674" y="3409950"/>
-            <a:ext cx="788031" cy="0"/>
+            <a:off x="3957839" y="3409949"/>
+            <a:ext cx="646467" cy="1"/>
           </a:xfrm>
           <a:prstGeom prst="straightConnector1">
             <a:avLst/>
@@ -7772,7 +7542,7 @@
         </p:nvSpPr>
         <p:spPr>
           <a:xfrm>
-            <a:off x="3795212" y="3132950"/>
+            <a:off x="3929973" y="3132950"/>
             <a:ext cx="284052" cy="276999"/>
           </a:xfrm>
           <a:prstGeom prst="rect">
@@ -7859,13 +7629,15 @@
       <p:cxnSp>
         <p:nvCxnSpPr>
           <p:cNvPr id="26" name="Straight Arrow Connector 25"/>
-          <p:cNvCxnSpPr/>
+          <p:cNvCxnSpPr>
+            <a:endCxn id="11" idx="1"/>
+          </p:cNvCxnSpPr>
           <p:nvPr/>
         </p:nvCxnSpPr>
         <p:spPr>
           <a:xfrm>
             <a:off x="6385870" y="3409949"/>
-            <a:ext cx="1068688" cy="800101"/>
+            <a:ext cx="1136001" cy="244894"/>
           </a:xfrm>
           <a:prstGeom prst="straightConnector1">
             <a:avLst/>
@@ -7957,6 +7729,36 @@
         <p:spPr>
           <a:xfrm>
             <a:off x="6346978" y="3215661"/>
+            <a:ext cx="263214" cy="276999"/>
+          </a:xfrm>
+          <a:prstGeom prst="rect">
+            <a:avLst/>
+          </a:prstGeom>
+          <a:noFill/>
+        </p:spPr>
+        <p:txBody>
+          <a:bodyPr wrap="none" rtlCol="0">
+            <a:spAutoFit/>
+          </a:bodyPr>
+          <a:lstStyle/>
+          <a:p>
+            <a:r>
+              <a:rPr lang="en-AU" sz="1200" dirty="0"/>
+              <a:t>1</a:t>
+            </a:r>
+            <a:endParaRPr lang="en-AU" sz="1200" dirty="0"/>
+          </a:p>
+        </p:txBody>
+      </p:sp>
+      <p:sp>
+        <p:nvSpPr>
+          <p:cNvPr id="30" name="TextBox 29"/>
+          <p:cNvSpPr txBox="1"/>
+          <p:nvPr/>
+        </p:nvSpPr>
+        <p:spPr>
+          <a:xfrm>
+            <a:off x="7286951" y="3654843"/>
             <a:ext cx="284052" cy="276999"/>
           </a:xfrm>
           <a:prstGeom prst="rect">
@@ -7974,19 +7776,377 @@
               <a:rPr lang="en-AU" sz="1200" dirty="0"/>
               <a:t>N</a:t>
             </a:r>
+            <a:endParaRPr lang="en-AU" sz="1200" dirty="0"/>
           </a:p>
         </p:txBody>
       </p:sp>
+      <p:graphicFrame>
+        <p:nvGraphicFramePr>
+          <p:cNvPr id="23" name="Table 22"/>
+          <p:cNvGraphicFramePr>
+            <a:graphicFrameLocks noGrp="1"/>
+          </p:cNvGraphicFramePr>
+          <p:nvPr>
+            <p:extLst>
+              <p:ext uri="{D42A27DB-BD31-4B8C-83A1-F6EECF244321}">
+                <p14:modId xmlns:p14="http://schemas.microsoft.com/office/powerpoint/2010/main" val="1196088702"/>
+              </p:ext>
+            </p:extLst>
+          </p:nvPr>
+        </p:nvGraphicFramePr>
+        <p:xfrm>
+          <a:off x="7521871" y="4619897"/>
+          <a:ext cx="1914122" cy="1554480"/>
+        </p:xfrm>
+        <a:graphic>
+          <a:graphicData uri="http://schemas.openxmlformats.org/drawingml/2006/table">
+            <a:tbl>
+              <a:tblPr firstRow="1" bandRow="1">
+                <a:tableStyleId>{5C22544A-7EE6-4342-B048-85BDC9FD1C3A}</a:tableStyleId>
+              </a:tblPr>
+              <a:tblGrid>
+                <a:gridCol w="1914122"/>
+              </a:tblGrid>
+              <a:tr h="0">
+                <a:tc>
+                  <a:txBody>
+                    <a:bodyPr/>
+                    <a:lstStyle/>
+                    <a:p>
+                      <a:pPr algn="ctr"/>
+                      <a:r>
+                        <a:rPr lang="en-AU" sz="1100" dirty="0" smtClean="0"/>
+                        <a:t>Assignee</a:t>
+                      </a:r>
+                      <a:endParaRPr lang="en-AU" sz="1100" dirty="0"/>
+                    </a:p>
+                  </a:txBody>
+                  <a:tcPr>
+                    <a:lnL w="12700" cap="flat" cmpd="sng" algn="ctr">
+                      <a:solidFill>
+                        <a:schemeClr val="tx1"/>
+                      </a:solidFill>
+                      <a:prstDash val="solid"/>
+                      <a:round/>
+                      <a:headEnd type="none" w="med" len="med"/>
+                      <a:tailEnd type="none" w="med" len="med"/>
+                    </a:lnL>
+                    <a:lnR w="12700" cap="flat" cmpd="sng" algn="ctr">
+                      <a:solidFill>
+                        <a:schemeClr val="tx1"/>
+                      </a:solidFill>
+                      <a:prstDash val="solid"/>
+                      <a:round/>
+                      <a:headEnd type="none" w="med" len="med"/>
+                      <a:tailEnd type="none" w="med" len="med"/>
+                    </a:lnR>
+                    <a:lnT w="12700" cap="flat" cmpd="sng" algn="ctr">
+                      <a:solidFill>
+                        <a:schemeClr val="tx1"/>
+                      </a:solidFill>
+                      <a:prstDash val="solid"/>
+                      <a:round/>
+                      <a:headEnd type="none" w="med" len="med"/>
+                      <a:tailEnd type="none" w="med" len="med"/>
+                    </a:lnT>
+                    <a:lnB w="12700" cap="flat" cmpd="sng" algn="ctr">
+                      <a:solidFill>
+                        <a:schemeClr val="tx1"/>
+                      </a:solidFill>
+                      <a:prstDash val="solid"/>
+                      <a:round/>
+                      <a:headEnd type="none" w="med" len="med"/>
+                      <a:tailEnd type="none" w="med" len="med"/>
+                    </a:lnB>
+                  </a:tcPr>
+                </a:tc>
+              </a:tr>
+              <a:tr h="0">
+                <a:tc>
+                  <a:txBody>
+                    <a:bodyPr/>
+                    <a:lstStyle/>
+                    <a:p>
+                      <a:r>
+                        <a:rPr lang="en-AU" sz="1100" dirty="0" smtClean="0"/>
+                        <a:t>URI: string (</a:t>
+                      </a:r>
+                      <a:r>
+                        <a:rPr lang="en-AU" sz="1100" dirty="0" err="1" smtClean="0"/>
+                        <a:t>uri</a:t>
+                      </a:r>
+                      <a:r>
+                        <a:rPr lang="en-AU" sz="1100" dirty="0" smtClean="0"/>
+                        <a:t>)</a:t>
+                      </a:r>
+                      <a:endParaRPr lang="en-AU" sz="1100" dirty="0"/>
+                    </a:p>
+                  </a:txBody>
+                  <a:tcPr>
+                    <a:lnL w="12700" cap="flat" cmpd="sng" algn="ctr">
+                      <a:solidFill>
+                        <a:schemeClr val="tx1"/>
+                      </a:solidFill>
+                      <a:prstDash val="solid"/>
+                      <a:round/>
+                      <a:headEnd type="none" w="med" len="med"/>
+                      <a:tailEnd type="none" w="med" len="med"/>
+                    </a:lnL>
+                    <a:lnR w="12700" cap="flat" cmpd="sng" algn="ctr">
+                      <a:solidFill>
+                        <a:schemeClr val="tx1"/>
+                      </a:solidFill>
+                      <a:prstDash val="solid"/>
+                      <a:round/>
+                      <a:headEnd type="none" w="med" len="med"/>
+                      <a:tailEnd type="none" w="med" len="med"/>
+                    </a:lnR>
+                    <a:lnT w="12700" cap="flat" cmpd="sng" algn="ctr">
+                      <a:solidFill>
+                        <a:schemeClr val="tx1"/>
+                      </a:solidFill>
+                      <a:prstDash val="solid"/>
+                      <a:round/>
+                      <a:headEnd type="none" w="med" len="med"/>
+                      <a:tailEnd type="none" w="med" len="med"/>
+                    </a:lnT>
+                    <a:lnB w="12700" cap="flat" cmpd="sng" algn="ctr">
+                      <a:solidFill>
+                        <a:schemeClr val="tx1"/>
+                      </a:solidFill>
+                      <a:prstDash val="solid"/>
+                      <a:round/>
+                      <a:headEnd type="none" w="med" len="med"/>
+                      <a:tailEnd type="none" w="med" len="med"/>
+                    </a:lnB>
+                  </a:tcPr>
+                </a:tc>
+              </a:tr>
+              <a:tr h="0">
+                <a:tc>
+                  <a:txBody>
+                    <a:bodyPr/>
+                    <a:lstStyle/>
+                    <a:p>
+                      <a:r>
+                        <a:rPr lang="en-AU" sz="1100" dirty="0" err="1" smtClean="0"/>
+                        <a:t>add_assignee_to_rule</a:t>
+                      </a:r>
+                      <a:r>
+                        <a:rPr lang="en-AU" sz="1100" dirty="0" smtClean="0"/>
+                        <a:t>()</a:t>
+                      </a:r>
+                      <a:endParaRPr lang="en-AU" sz="1100" dirty="0"/>
+                    </a:p>
+                  </a:txBody>
+                  <a:tcPr>
+                    <a:lnL w="12700" cap="flat" cmpd="sng" algn="ctr">
+                      <a:solidFill>
+                        <a:schemeClr val="tx1"/>
+                      </a:solidFill>
+                      <a:prstDash val="solid"/>
+                      <a:round/>
+                      <a:headEnd type="none" w="med" len="med"/>
+                      <a:tailEnd type="none" w="med" len="med"/>
+                    </a:lnL>
+                    <a:lnR w="12700" cap="flat" cmpd="sng" algn="ctr">
+                      <a:solidFill>
+                        <a:schemeClr val="tx1"/>
+                      </a:solidFill>
+                      <a:prstDash val="solid"/>
+                      <a:round/>
+                      <a:headEnd type="none" w="med" len="med"/>
+                      <a:tailEnd type="none" w="med" len="med"/>
+                    </a:lnR>
+                    <a:lnT w="12700" cap="flat" cmpd="sng" algn="ctr">
+                      <a:solidFill>
+                        <a:schemeClr val="tx1"/>
+                      </a:solidFill>
+                      <a:prstDash val="solid"/>
+                      <a:round/>
+                      <a:headEnd type="none" w="med" len="med"/>
+                      <a:tailEnd type="none" w="med" len="med"/>
+                    </a:lnT>
+                  </a:tcPr>
+                </a:tc>
+              </a:tr>
+              <a:tr h="0">
+                <a:tc>
+                  <a:txBody>
+                    <a:bodyPr/>
+                    <a:lstStyle/>
+                    <a:p>
+                      <a:r>
+                        <a:rPr lang="en-AU" sz="1100" dirty="0" err="1" smtClean="0"/>
+                        <a:t>remove_assignee_from_rule</a:t>
+                      </a:r>
+                      <a:r>
+                        <a:rPr lang="en-AU" sz="1100" dirty="0" smtClean="0"/>
+                        <a:t>()</a:t>
+                      </a:r>
+                      <a:endParaRPr lang="en-AU" sz="1100" dirty="0"/>
+                    </a:p>
+                  </a:txBody>
+                  <a:tcPr>
+                    <a:lnL w="12700" cap="flat" cmpd="sng" algn="ctr">
+                      <a:solidFill>
+                        <a:schemeClr val="tx1"/>
+                      </a:solidFill>
+                      <a:prstDash val="solid"/>
+                      <a:round/>
+                      <a:headEnd type="none" w="med" len="med"/>
+                      <a:tailEnd type="none" w="med" len="med"/>
+                    </a:lnL>
+                    <a:lnR w="12700" cap="flat" cmpd="sng" algn="ctr">
+                      <a:solidFill>
+                        <a:schemeClr val="tx1"/>
+                      </a:solidFill>
+                      <a:prstDash val="solid"/>
+                      <a:round/>
+                      <a:headEnd type="none" w="med" len="med"/>
+                      <a:tailEnd type="none" w="med" len="med"/>
+                    </a:lnR>
+                  </a:tcPr>
+                </a:tc>
+              </a:tr>
+              <a:tr h="0">
+                <a:tc>
+                  <a:txBody>
+                    <a:bodyPr/>
+                    <a:lstStyle/>
+                    <a:p>
+                      <a:r>
+                        <a:rPr lang="en-AU" sz="1100" dirty="0" err="1" smtClean="0"/>
+                        <a:t>get_assignees_for_rule</a:t>
+                      </a:r>
+                      <a:r>
+                        <a:rPr lang="en-AU" sz="1100" dirty="0" smtClean="0"/>
+                        <a:t>()</a:t>
+                      </a:r>
+                      <a:endParaRPr lang="en-AU" sz="1100" dirty="0"/>
+                    </a:p>
+                  </a:txBody>
+                  <a:tcPr>
+                    <a:lnL w="12700" cap="flat" cmpd="sng" algn="ctr">
+                      <a:solidFill>
+                        <a:schemeClr val="tx1"/>
+                      </a:solidFill>
+                      <a:prstDash val="solid"/>
+                      <a:round/>
+                      <a:headEnd type="none" w="med" len="med"/>
+                      <a:tailEnd type="none" w="med" len="med"/>
+                    </a:lnL>
+                    <a:lnR w="12700" cap="flat" cmpd="sng" algn="ctr">
+                      <a:solidFill>
+                        <a:schemeClr val="tx1"/>
+                      </a:solidFill>
+                      <a:prstDash val="solid"/>
+                      <a:round/>
+                      <a:headEnd type="none" w="med" len="med"/>
+                      <a:tailEnd type="none" w="med" len="med"/>
+                    </a:lnR>
+                  </a:tcPr>
+                </a:tc>
+              </a:tr>
+              <a:tr h="0">
+                <a:tc>
+                  <a:txBody>
+                    <a:bodyPr/>
+                    <a:lstStyle/>
+                    <a:p>
+                      <a:r>
+                        <a:rPr lang="en-AU" sz="1100" dirty="0" err="1" smtClean="0"/>
+                        <a:t>rule</a:t>
+                      </a:r>
+                      <a:r>
+                        <a:rPr lang="en-AU" sz="1100" baseline="0" dirty="0" err="1" smtClean="0"/>
+                        <a:t>_has_assignee</a:t>
+                      </a:r>
+                      <a:r>
+                        <a:rPr lang="en-AU" sz="1100" baseline="0" dirty="0" smtClean="0"/>
+                        <a:t>()</a:t>
+                      </a:r>
+                      <a:endParaRPr lang="en-AU" sz="1100" dirty="0"/>
+                    </a:p>
+                  </a:txBody>
+                  <a:tcPr>
+                    <a:lnL w="12700" cap="flat" cmpd="sng" algn="ctr">
+                      <a:solidFill>
+                        <a:schemeClr val="tx1"/>
+                      </a:solidFill>
+                      <a:prstDash val="solid"/>
+                      <a:round/>
+                      <a:headEnd type="none" w="med" len="med"/>
+                      <a:tailEnd type="none" w="med" len="med"/>
+                    </a:lnL>
+                    <a:lnR w="12700" cap="flat" cmpd="sng" algn="ctr">
+                      <a:solidFill>
+                        <a:schemeClr val="tx1"/>
+                      </a:solidFill>
+                      <a:prstDash val="solid"/>
+                      <a:round/>
+                      <a:headEnd type="none" w="med" len="med"/>
+                      <a:tailEnd type="none" w="med" len="med"/>
+                    </a:lnR>
+                    <a:lnB w="12700" cap="flat" cmpd="sng" algn="ctr">
+                      <a:solidFill>
+                        <a:schemeClr val="tx1"/>
+                      </a:solidFill>
+                      <a:prstDash val="solid"/>
+                      <a:round/>
+                      <a:headEnd type="none" w="med" len="med"/>
+                      <a:tailEnd type="none" w="med" len="med"/>
+                    </a:lnB>
+                  </a:tcPr>
+                </a:tc>
+              </a:tr>
+            </a:tbl>
+          </a:graphicData>
+        </a:graphic>
+      </p:graphicFrame>
+      <p:cxnSp>
+        <p:nvCxnSpPr>
+          <p:cNvPr id="5" name="Straight Arrow Connector 4"/>
+          <p:cNvCxnSpPr/>
+          <p:nvPr/>
+        </p:nvCxnSpPr>
+        <p:spPr>
+          <a:xfrm>
+            <a:off x="6385870" y="3793342"/>
+            <a:ext cx="1136001" cy="1232016"/>
+          </a:xfrm>
+          <a:prstGeom prst="straightConnector1">
+            <a:avLst/>
+          </a:prstGeom>
+          <a:ln>
+            <a:tailEnd type="triangle"/>
+          </a:ln>
+        </p:spPr>
+        <p:style>
+          <a:lnRef idx="1">
+            <a:schemeClr val="accent1"/>
+          </a:lnRef>
+          <a:fillRef idx="0">
+            <a:schemeClr val="accent1"/>
+          </a:fillRef>
+          <a:effectRef idx="0">
+            <a:schemeClr val="accent1"/>
+          </a:effectRef>
+          <a:fontRef idx="minor">
+            <a:schemeClr val="tx1"/>
+          </a:fontRef>
+        </p:style>
+      </p:cxnSp>
       <p:sp>
         <p:nvSpPr>
-          <p:cNvPr id="30" name="TextBox 29"/>
+          <p:cNvPr id="25" name="TextBox 24"/>
           <p:cNvSpPr txBox="1"/>
           <p:nvPr/>
         </p:nvSpPr>
         <p:spPr>
           <a:xfrm>
-            <a:off x="7144903" y="4131421"/>
-            <a:ext cx="316112" cy="276999"/>
+            <a:off x="6324130" y="3872106"/>
+            <a:ext cx="263214" cy="276999"/>
           </a:xfrm>
           <a:prstGeom prst="rect">
             <a:avLst/>
@@ -8000,8 +8160,38 @@
           <a:lstStyle/>
           <a:p>
             <a:r>
-              <a:rPr lang="en-AU" sz="1200" dirty="0" smtClean="0"/>
-              <a:t>M</a:t>
+              <a:rPr lang="en-AU" sz="1200" dirty="0"/>
+              <a:t>1</a:t>
+            </a:r>
+            <a:endParaRPr lang="en-AU" sz="1200" dirty="0"/>
+          </a:p>
+        </p:txBody>
+      </p:sp>
+      <p:sp>
+        <p:nvSpPr>
+          <p:cNvPr id="31" name="TextBox 30"/>
+          <p:cNvSpPr txBox="1"/>
+          <p:nvPr/>
+        </p:nvSpPr>
+        <p:spPr>
+          <a:xfrm>
+            <a:off x="7206949" y="4886858"/>
+            <a:ext cx="284052" cy="276999"/>
+          </a:xfrm>
+          <a:prstGeom prst="rect">
+            <a:avLst/>
+          </a:prstGeom>
+          <a:noFill/>
+        </p:spPr>
+        <p:txBody>
+          <a:bodyPr wrap="none" rtlCol="0">
+            <a:spAutoFit/>
+          </a:bodyPr>
+          <a:lstStyle/>
+          <a:p>
+            <a:r>
+              <a:rPr lang="en-AU" sz="1200" dirty="0"/>
+              <a:t>N</a:t>
             </a:r>
             <a:endParaRPr lang="en-AU" sz="1200" dirty="0"/>
           </a:p>
@@ -9518,95 +9708,6 @@
       </p:cxnSp>
       <p:graphicFrame>
         <p:nvGraphicFramePr>
-          <p:cNvPr id="53" name="Table 52"/>
-          <p:cNvGraphicFramePr>
-            <a:graphicFrameLocks noGrp="1"/>
-          </p:cNvGraphicFramePr>
-          <p:nvPr>
-            <p:extLst>
-              <p:ext uri="{D42A27DB-BD31-4B8C-83A1-F6EECF244321}">
-                <p14:modId xmlns:p14="http://schemas.microsoft.com/office/powerpoint/2010/main" val="3217417250"/>
-              </p:ext>
-            </p:extLst>
-          </p:nvPr>
-        </p:nvGraphicFramePr>
-        <p:xfrm>
-          <a:off x="4556333" y="1401599"/>
-          <a:ext cx="1029196" cy="518160"/>
-        </p:xfrm>
-        <a:graphic>
-          <a:graphicData uri="http://schemas.openxmlformats.org/drawingml/2006/table">
-            <a:tbl>
-              <a:tblPr firstRow="1" bandRow="1">
-                <a:tableStyleId>{5C22544A-7EE6-4342-B048-85BDC9FD1C3A}</a:tableStyleId>
-              </a:tblPr>
-              <a:tblGrid>
-                <a:gridCol w="460102"/>
-                <a:gridCol w="569094"/>
-              </a:tblGrid>
-              <a:tr h="227008">
-                <a:tc gridSpan="2">
-                  <a:txBody>
-                    <a:bodyPr/>
-                    <a:lstStyle/>
-                    <a:p>
-                      <a:pPr algn="ctr"/>
-                      <a:r>
-                        <a:rPr lang="en-AU" sz="1100" dirty="0" smtClean="0"/>
-                        <a:t>Party</a:t>
-                      </a:r>
-                      <a:endParaRPr lang="en-AU" sz="1100" dirty="0"/>
-                    </a:p>
-                  </a:txBody>
-                  <a:tcPr/>
-                </a:tc>
-                <a:tc hMerge="1">
-                  <a:txBody>
-                    <a:bodyPr/>
-                    <a:lstStyle/>
-                    <a:p>
-                      <a:endParaRPr lang="en-AU" dirty="0"/>
-                    </a:p>
-                  </a:txBody>
-                  <a:tcPr/>
-                </a:tc>
-              </a:tr>
-              <a:tr h="232449">
-                <a:tc>
-                  <a:txBody>
-                    <a:bodyPr/>
-                    <a:lstStyle/>
-                    <a:p>
-                      <a:r>
-                        <a:rPr lang="en-AU" sz="1100" dirty="0" err="1" smtClean="0"/>
-                        <a:t>uri</a:t>
-                      </a:r>
-                      <a:endParaRPr lang="en-AU" sz="1100" dirty="0"/>
-                    </a:p>
-                  </a:txBody>
-                  <a:tcPr/>
-                </a:tc>
-                <a:tc>
-                  <a:txBody>
-                    <a:bodyPr/>
-                    <a:lstStyle/>
-                    <a:p>
-                      <a:r>
-                        <a:rPr lang="en-AU" sz="1100" dirty="0" smtClean="0"/>
-                        <a:t>text</a:t>
-                      </a:r>
-                      <a:endParaRPr lang="en-AU" sz="1100" dirty="0"/>
-                    </a:p>
-                  </a:txBody>
-                  <a:tcPr/>
-                </a:tc>
-              </a:tr>
-            </a:tbl>
-          </a:graphicData>
-        </a:graphic>
-      </p:graphicFrame>
-      <p:graphicFrame>
-        <p:nvGraphicFramePr>
           <p:cNvPr id="54" name="Table 53"/>
           <p:cNvGraphicFramePr>
             <a:graphicFrameLocks noGrp="1"/>
@@ -9614,7 +9715,7 @@
           <p:nvPr>
             <p:extLst>
               <p:ext uri="{D42A27DB-BD31-4B8C-83A1-F6EECF244321}">
-                <p14:modId xmlns:p14="http://schemas.microsoft.com/office/powerpoint/2010/main" val="2181716243"/>
+                <p14:modId xmlns:p14="http://schemas.microsoft.com/office/powerpoint/2010/main" val="2096142140"/>
               </p:ext>
             </p:extLst>
           </p:nvPr>
@@ -9641,8 +9742,8 @@
                     <a:p>
                       <a:pPr algn="ctr"/>
                       <a:r>
-                        <a:rPr lang="en-AU" sz="1100" dirty="0" err="1" smtClean="0"/>
-                        <a:t>RuleHasAssignor</a:t>
+                        <a:rPr lang="en-AU" sz="1100" dirty="0" smtClean="0"/>
+                        <a:t>Assignor</a:t>
                       </a:r>
                       <a:endParaRPr lang="en-AU" sz="1100" dirty="0"/>
                     </a:p>
@@ -9668,7 +9769,7 @@
                     <a:p>
                       <a:r>
                         <a:rPr lang="en-AU" sz="1100" b="1" i="1" dirty="0" err="1" smtClean="0"/>
-                        <a:t>party_uri</a:t>
+                        <a:t>assignor_uri</a:t>
                       </a:r>
                       <a:endParaRPr lang="en-AU" sz="1100" b="1" i="1" dirty="0"/>
                     </a:p>
@@ -9733,7 +9834,7 @@
           <p:nvPr>
             <p:extLst>
               <p:ext uri="{D42A27DB-BD31-4B8C-83A1-F6EECF244321}">
-                <p14:modId xmlns:p14="http://schemas.microsoft.com/office/powerpoint/2010/main" val="693576311"/>
+                <p14:modId xmlns:p14="http://schemas.microsoft.com/office/powerpoint/2010/main" val="3346870376"/>
               </p:ext>
             </p:extLst>
           </p:nvPr>
@@ -9749,8 +9850,8 @@
                 <a:tableStyleId>{5C22544A-7EE6-4342-B048-85BDC9FD1C3A}</a:tableStyleId>
               </a:tblPr>
               <a:tblGrid>
-                <a:gridCol w="744025"/>
-                <a:gridCol w="654627"/>
+                <a:gridCol w="954721"/>
+                <a:gridCol w="443931"/>
               </a:tblGrid>
               <a:tr h="123793">
                 <a:tc gridSpan="2">
@@ -9760,8 +9861,8 @@
                     <a:p>
                       <a:pPr algn="ctr"/>
                       <a:r>
-                        <a:rPr lang="en-AU" sz="1100" dirty="0" err="1" smtClean="0"/>
-                        <a:t>RuleHasAssignee</a:t>
+                        <a:rPr lang="en-AU" sz="1100" dirty="0" smtClean="0"/>
+                        <a:t>Assignee</a:t>
                       </a:r>
                       <a:endParaRPr lang="en-AU" sz="1100" dirty="0"/>
                     </a:p>
@@ -9787,7 +9888,7 @@
                     <a:p>
                       <a:r>
                         <a:rPr lang="en-AU" sz="1100" b="1" i="1" dirty="0" err="1" smtClean="0"/>
-                        <a:t>party_uri</a:t>
+                        <a:t>assignee_uri</a:t>
                       </a:r>
                       <a:endParaRPr lang="en-AU" sz="1100" b="1" i="1" dirty="0"/>
                     </a:p>
@@ -9880,41 +9981,6 @@
       </p:cxnSp>
       <p:cxnSp>
         <p:nvCxnSpPr>
-          <p:cNvPr id="63" name="Straight Arrow Connector 62"/>
-          <p:cNvCxnSpPr>
-            <a:stCxn id="54" idx="3"/>
-          </p:cNvCxnSpPr>
-          <p:nvPr/>
-        </p:nvCxnSpPr>
-        <p:spPr>
-          <a:xfrm>
-            <a:off x="3663652" y="1801167"/>
-            <a:ext cx="892681" cy="0"/>
-          </a:xfrm>
-          <a:prstGeom prst="straightConnector1">
-            <a:avLst/>
-          </a:prstGeom>
-          <a:ln>
-            <a:tailEnd type="triangle"/>
-          </a:ln>
-        </p:spPr>
-        <p:style>
-          <a:lnRef idx="1">
-            <a:schemeClr val="accent1"/>
-          </a:lnRef>
-          <a:fillRef idx="0">
-            <a:schemeClr val="accent1"/>
-          </a:fillRef>
-          <a:effectRef idx="0">
-            <a:schemeClr val="accent1"/>
-          </a:effectRef>
-          <a:fontRef idx="minor">
-            <a:schemeClr val="tx1"/>
-          </a:fontRef>
-        </p:style>
-      </p:cxnSp>
-      <p:cxnSp>
-        <p:nvCxnSpPr>
           <p:cNvPr id="65" name="Straight Arrow Connector 64"/>
           <p:cNvCxnSpPr/>
           <p:nvPr/>
@@ -9923,41 +9989,6 @@
           <a:xfrm flipH="1">
             <a:off x="5758205" y="2022735"/>
             <a:ext cx="948056" cy="969847"/>
-          </a:xfrm>
-          <a:prstGeom prst="straightConnector1">
-            <a:avLst/>
-          </a:prstGeom>
-          <a:ln>
-            <a:tailEnd type="triangle"/>
-          </a:ln>
-        </p:spPr>
-        <p:style>
-          <a:lnRef idx="1">
-            <a:schemeClr val="accent1"/>
-          </a:lnRef>
-          <a:fillRef idx="0">
-            <a:schemeClr val="accent1"/>
-          </a:fillRef>
-          <a:effectRef idx="0">
-            <a:schemeClr val="accent1"/>
-          </a:effectRef>
-          <a:fontRef idx="minor">
-            <a:schemeClr val="tx1"/>
-          </a:fontRef>
-        </p:style>
-      </p:cxnSp>
-      <p:cxnSp>
-        <p:nvCxnSpPr>
-          <p:cNvPr id="67" name="Straight Arrow Connector 66"/>
-          <p:cNvCxnSpPr>
-            <a:stCxn id="55" idx="1"/>
-          </p:cNvCxnSpPr>
-          <p:nvPr/>
-        </p:nvCxnSpPr>
-        <p:spPr>
-          <a:xfrm flipH="1">
-            <a:off x="5585529" y="1767151"/>
-            <a:ext cx="1120732" cy="34016"/>
           </a:xfrm>
           <a:prstGeom prst="straightConnector1">
             <a:avLst/>

</xml_diff>

<commit_message>
Fixed bug where licence search page would not load. Fixed bug where logo alt text appears when licence has no logo. Two similar rules given different labels.
</commit_message>
<xml_diff>
--- a/_docs/DataModel.pptx
+++ b/_docs/DataModel.pptx
@@ -11,6 +11,7 @@
     <p:sldId id="260" r:id="rId5"/>
     <p:sldId id="262" r:id="rId6"/>
     <p:sldId id="261" r:id="rId7"/>
+    <p:sldId id="263" r:id="rId8"/>
   </p:sldIdLst>
   <p:sldSz cx="12192000" cy="6858000"/>
   <p:notesSz cx="6858000" cy="9144000"/>
@@ -139,7 +140,7 @@
           <p:cNvPr id="2" name="Title 1">
             <a:extLst>
               <a:ext uri="{FF2B5EF4-FFF2-40B4-BE49-F238E27FC236}">
-                <a16:creationId xmlns:a16="http://schemas.microsoft.com/office/drawing/2014/main" xmlns="" id="{7812FAD9-B738-4E2B-A9F3-7D6DA8649C7B}"/>
+                <a16:creationId xmlns="" xmlns:a16="http://schemas.microsoft.com/office/drawing/2014/main" id="{7812FAD9-B738-4E2B-A9F3-7D6DA8649C7B}"/>
               </a:ext>
             </a:extLst>
           </p:cNvPr>
@@ -177,7 +178,7 @@
           <p:cNvPr id="3" name="Subtitle 2">
             <a:extLst>
               <a:ext uri="{FF2B5EF4-FFF2-40B4-BE49-F238E27FC236}">
-                <a16:creationId xmlns:a16="http://schemas.microsoft.com/office/drawing/2014/main" xmlns="" id="{CED3ABCF-AD94-42E3-95E2-D5E653DEF63F}"/>
+                <a16:creationId xmlns="" xmlns:a16="http://schemas.microsoft.com/office/drawing/2014/main" id="{CED3ABCF-AD94-42E3-95E2-D5E653DEF63F}"/>
               </a:ext>
             </a:extLst>
           </p:cNvPr>
@@ -248,7 +249,7 @@
           <p:cNvPr id="4" name="Date Placeholder 3">
             <a:extLst>
               <a:ext uri="{FF2B5EF4-FFF2-40B4-BE49-F238E27FC236}">
-                <a16:creationId xmlns:a16="http://schemas.microsoft.com/office/drawing/2014/main" xmlns="" id="{5AB92BAC-2DD4-42CE-9065-E2518728CD65}"/>
+                <a16:creationId xmlns="" xmlns:a16="http://schemas.microsoft.com/office/drawing/2014/main" id="{5AB92BAC-2DD4-42CE-9065-E2518728CD65}"/>
               </a:ext>
             </a:extLst>
           </p:cNvPr>
@@ -266,7 +267,7 @@
           <a:p>
             <a:fld id="{2F956D3E-0B91-471C-9743-3F865EE6F573}" type="datetimeFigureOut">
               <a:rPr lang="en-AU" smtClean="0"/>
-              <a:t>22/08/2018</a:t>
+              <a:t>30/08/2018</a:t>
             </a:fld>
             <a:endParaRPr lang="en-AU"/>
           </a:p>
@@ -277,7 +278,7 @@
           <p:cNvPr id="5" name="Footer Placeholder 4">
             <a:extLst>
               <a:ext uri="{FF2B5EF4-FFF2-40B4-BE49-F238E27FC236}">
-                <a16:creationId xmlns:a16="http://schemas.microsoft.com/office/drawing/2014/main" xmlns="" id="{137C3D4C-B868-4F83-8919-AE7F2500E437}"/>
+                <a16:creationId xmlns="" xmlns:a16="http://schemas.microsoft.com/office/drawing/2014/main" id="{137C3D4C-B868-4F83-8919-AE7F2500E437}"/>
               </a:ext>
             </a:extLst>
           </p:cNvPr>
@@ -302,7 +303,7 @@
           <p:cNvPr id="6" name="Slide Number Placeholder 5">
             <a:extLst>
               <a:ext uri="{FF2B5EF4-FFF2-40B4-BE49-F238E27FC236}">
-                <a16:creationId xmlns:a16="http://schemas.microsoft.com/office/drawing/2014/main" xmlns="" id="{ABBB53F0-83D7-42D4-90A5-7D5EE7C0AAD3}"/>
+                <a16:creationId xmlns="" xmlns:a16="http://schemas.microsoft.com/office/drawing/2014/main" id="{ABBB53F0-83D7-42D4-90A5-7D5EE7C0AAD3}"/>
               </a:ext>
             </a:extLst>
           </p:cNvPr>
@@ -361,7 +362,7 @@
           <p:cNvPr id="2" name="Title 1">
             <a:extLst>
               <a:ext uri="{FF2B5EF4-FFF2-40B4-BE49-F238E27FC236}">
-                <a16:creationId xmlns:a16="http://schemas.microsoft.com/office/drawing/2014/main" xmlns="" id="{EDEAE3B1-565C-4AD8-A67C-7D2C44ECA18D}"/>
+                <a16:creationId xmlns="" xmlns:a16="http://schemas.microsoft.com/office/drawing/2014/main" id="{EDEAE3B1-565C-4AD8-A67C-7D2C44ECA18D}"/>
               </a:ext>
             </a:extLst>
           </p:cNvPr>
@@ -390,7 +391,7 @@
           <p:cNvPr id="3" name="Vertical Text Placeholder 2">
             <a:extLst>
               <a:ext uri="{FF2B5EF4-FFF2-40B4-BE49-F238E27FC236}">
-                <a16:creationId xmlns:a16="http://schemas.microsoft.com/office/drawing/2014/main" xmlns="" id="{89499874-28E0-4013-933C-7A7F4857D944}"/>
+                <a16:creationId xmlns="" xmlns:a16="http://schemas.microsoft.com/office/drawing/2014/main" id="{89499874-28E0-4013-933C-7A7F4857D944}"/>
               </a:ext>
             </a:extLst>
           </p:cNvPr>
@@ -448,7 +449,7 @@
           <p:cNvPr id="4" name="Date Placeholder 3">
             <a:extLst>
               <a:ext uri="{FF2B5EF4-FFF2-40B4-BE49-F238E27FC236}">
-                <a16:creationId xmlns:a16="http://schemas.microsoft.com/office/drawing/2014/main" xmlns="" id="{30B68540-FC47-4085-8638-DE11BCE14D7E}"/>
+                <a16:creationId xmlns="" xmlns:a16="http://schemas.microsoft.com/office/drawing/2014/main" id="{30B68540-FC47-4085-8638-DE11BCE14D7E}"/>
               </a:ext>
             </a:extLst>
           </p:cNvPr>
@@ -466,7 +467,7 @@
           <a:p>
             <a:fld id="{2F956D3E-0B91-471C-9743-3F865EE6F573}" type="datetimeFigureOut">
               <a:rPr lang="en-AU" smtClean="0"/>
-              <a:t>22/08/2018</a:t>
+              <a:t>30/08/2018</a:t>
             </a:fld>
             <a:endParaRPr lang="en-AU"/>
           </a:p>
@@ -477,7 +478,7 @@
           <p:cNvPr id="5" name="Footer Placeholder 4">
             <a:extLst>
               <a:ext uri="{FF2B5EF4-FFF2-40B4-BE49-F238E27FC236}">
-                <a16:creationId xmlns:a16="http://schemas.microsoft.com/office/drawing/2014/main" xmlns="" id="{149BDF69-9D0A-4871-B742-85D1C27ACA21}"/>
+                <a16:creationId xmlns="" xmlns:a16="http://schemas.microsoft.com/office/drawing/2014/main" id="{149BDF69-9D0A-4871-B742-85D1C27ACA21}"/>
               </a:ext>
             </a:extLst>
           </p:cNvPr>
@@ -502,7 +503,7 @@
           <p:cNvPr id="6" name="Slide Number Placeholder 5">
             <a:extLst>
               <a:ext uri="{FF2B5EF4-FFF2-40B4-BE49-F238E27FC236}">
-                <a16:creationId xmlns:a16="http://schemas.microsoft.com/office/drawing/2014/main" xmlns="" id="{BAC96E6A-25E9-4A3D-BDE5-E881314DE0D7}"/>
+                <a16:creationId xmlns="" xmlns:a16="http://schemas.microsoft.com/office/drawing/2014/main" id="{BAC96E6A-25E9-4A3D-BDE5-E881314DE0D7}"/>
               </a:ext>
             </a:extLst>
           </p:cNvPr>
@@ -561,7 +562,7 @@
           <p:cNvPr id="2" name="Vertical Title 1">
             <a:extLst>
               <a:ext uri="{FF2B5EF4-FFF2-40B4-BE49-F238E27FC236}">
-                <a16:creationId xmlns:a16="http://schemas.microsoft.com/office/drawing/2014/main" xmlns="" id="{8BD4BC0C-9CFC-4FB2-B5C6-6EEC1B7F772D}"/>
+                <a16:creationId xmlns="" xmlns:a16="http://schemas.microsoft.com/office/drawing/2014/main" id="{8BD4BC0C-9CFC-4FB2-B5C6-6EEC1B7F772D}"/>
               </a:ext>
             </a:extLst>
           </p:cNvPr>
@@ -595,7 +596,7 @@
           <p:cNvPr id="3" name="Vertical Text Placeholder 2">
             <a:extLst>
               <a:ext uri="{FF2B5EF4-FFF2-40B4-BE49-F238E27FC236}">
-                <a16:creationId xmlns:a16="http://schemas.microsoft.com/office/drawing/2014/main" xmlns="" id="{5CF7FA3D-9ABB-49C7-AF65-E0869B2150C9}"/>
+                <a16:creationId xmlns="" xmlns:a16="http://schemas.microsoft.com/office/drawing/2014/main" id="{5CF7FA3D-9ABB-49C7-AF65-E0869B2150C9}"/>
               </a:ext>
             </a:extLst>
           </p:cNvPr>
@@ -658,7 +659,7 @@
           <p:cNvPr id="4" name="Date Placeholder 3">
             <a:extLst>
               <a:ext uri="{FF2B5EF4-FFF2-40B4-BE49-F238E27FC236}">
-                <a16:creationId xmlns:a16="http://schemas.microsoft.com/office/drawing/2014/main" xmlns="" id="{FBF00D9E-50E5-4276-BC40-27125BC1B69A}"/>
+                <a16:creationId xmlns="" xmlns:a16="http://schemas.microsoft.com/office/drawing/2014/main" id="{FBF00D9E-50E5-4276-BC40-27125BC1B69A}"/>
               </a:ext>
             </a:extLst>
           </p:cNvPr>
@@ -676,7 +677,7 @@
           <a:p>
             <a:fld id="{2F956D3E-0B91-471C-9743-3F865EE6F573}" type="datetimeFigureOut">
               <a:rPr lang="en-AU" smtClean="0"/>
-              <a:t>22/08/2018</a:t>
+              <a:t>30/08/2018</a:t>
             </a:fld>
             <a:endParaRPr lang="en-AU"/>
           </a:p>
@@ -687,7 +688,7 @@
           <p:cNvPr id="5" name="Footer Placeholder 4">
             <a:extLst>
               <a:ext uri="{FF2B5EF4-FFF2-40B4-BE49-F238E27FC236}">
-                <a16:creationId xmlns:a16="http://schemas.microsoft.com/office/drawing/2014/main" xmlns="" id="{3AA20A04-EE64-4C85-A4C3-C674E216B21E}"/>
+                <a16:creationId xmlns="" xmlns:a16="http://schemas.microsoft.com/office/drawing/2014/main" id="{3AA20A04-EE64-4C85-A4C3-C674E216B21E}"/>
               </a:ext>
             </a:extLst>
           </p:cNvPr>
@@ -712,7 +713,7 @@
           <p:cNvPr id="6" name="Slide Number Placeholder 5">
             <a:extLst>
               <a:ext uri="{FF2B5EF4-FFF2-40B4-BE49-F238E27FC236}">
-                <a16:creationId xmlns:a16="http://schemas.microsoft.com/office/drawing/2014/main" xmlns="" id="{0F34C053-3886-4674-85D6-13CCCB876AEC}"/>
+                <a16:creationId xmlns="" xmlns:a16="http://schemas.microsoft.com/office/drawing/2014/main" id="{0F34C053-3886-4674-85D6-13CCCB876AEC}"/>
               </a:ext>
             </a:extLst>
           </p:cNvPr>
@@ -771,7 +772,7 @@
           <p:cNvPr id="2" name="Title 1">
             <a:extLst>
               <a:ext uri="{FF2B5EF4-FFF2-40B4-BE49-F238E27FC236}">
-                <a16:creationId xmlns:a16="http://schemas.microsoft.com/office/drawing/2014/main" xmlns="" id="{6D70D093-F0D3-479C-B65D-3031107C0DF1}"/>
+                <a16:creationId xmlns="" xmlns:a16="http://schemas.microsoft.com/office/drawing/2014/main" id="{6D70D093-F0D3-479C-B65D-3031107C0DF1}"/>
               </a:ext>
             </a:extLst>
           </p:cNvPr>
@@ -800,7 +801,7 @@
           <p:cNvPr id="3" name="Content Placeholder 2">
             <a:extLst>
               <a:ext uri="{FF2B5EF4-FFF2-40B4-BE49-F238E27FC236}">
-                <a16:creationId xmlns:a16="http://schemas.microsoft.com/office/drawing/2014/main" xmlns="" id="{19F2333E-AD72-4069-9999-D316EB1D2BE2}"/>
+                <a16:creationId xmlns="" xmlns:a16="http://schemas.microsoft.com/office/drawing/2014/main" id="{19F2333E-AD72-4069-9999-D316EB1D2BE2}"/>
               </a:ext>
             </a:extLst>
           </p:cNvPr>
@@ -858,7 +859,7 @@
           <p:cNvPr id="4" name="Date Placeholder 3">
             <a:extLst>
               <a:ext uri="{FF2B5EF4-FFF2-40B4-BE49-F238E27FC236}">
-                <a16:creationId xmlns:a16="http://schemas.microsoft.com/office/drawing/2014/main" xmlns="" id="{A5D0C69D-8EED-4855-9D9D-192FA0501F24}"/>
+                <a16:creationId xmlns="" xmlns:a16="http://schemas.microsoft.com/office/drawing/2014/main" id="{A5D0C69D-8EED-4855-9D9D-192FA0501F24}"/>
               </a:ext>
             </a:extLst>
           </p:cNvPr>
@@ -876,7 +877,7 @@
           <a:p>
             <a:fld id="{2F956D3E-0B91-471C-9743-3F865EE6F573}" type="datetimeFigureOut">
               <a:rPr lang="en-AU" smtClean="0"/>
-              <a:t>22/08/2018</a:t>
+              <a:t>30/08/2018</a:t>
             </a:fld>
             <a:endParaRPr lang="en-AU"/>
           </a:p>
@@ -887,7 +888,7 @@
           <p:cNvPr id="5" name="Footer Placeholder 4">
             <a:extLst>
               <a:ext uri="{FF2B5EF4-FFF2-40B4-BE49-F238E27FC236}">
-                <a16:creationId xmlns:a16="http://schemas.microsoft.com/office/drawing/2014/main" xmlns="" id="{3E40E1C3-407E-4CDD-B265-40C6EAF109CB}"/>
+                <a16:creationId xmlns="" xmlns:a16="http://schemas.microsoft.com/office/drawing/2014/main" id="{3E40E1C3-407E-4CDD-B265-40C6EAF109CB}"/>
               </a:ext>
             </a:extLst>
           </p:cNvPr>
@@ -912,7 +913,7 @@
           <p:cNvPr id="6" name="Slide Number Placeholder 5">
             <a:extLst>
               <a:ext uri="{FF2B5EF4-FFF2-40B4-BE49-F238E27FC236}">
-                <a16:creationId xmlns:a16="http://schemas.microsoft.com/office/drawing/2014/main" xmlns="" id="{845BB6A8-2931-4612-9030-020514B9DFCC}"/>
+                <a16:creationId xmlns="" xmlns:a16="http://schemas.microsoft.com/office/drawing/2014/main" id="{845BB6A8-2931-4612-9030-020514B9DFCC}"/>
               </a:ext>
             </a:extLst>
           </p:cNvPr>
@@ -971,7 +972,7 @@
           <p:cNvPr id="2" name="Title 1">
             <a:extLst>
               <a:ext uri="{FF2B5EF4-FFF2-40B4-BE49-F238E27FC236}">
-                <a16:creationId xmlns:a16="http://schemas.microsoft.com/office/drawing/2014/main" xmlns="" id="{9648ED28-6C5E-4B58-8121-9279F11D3D73}"/>
+                <a16:creationId xmlns="" xmlns:a16="http://schemas.microsoft.com/office/drawing/2014/main" id="{9648ED28-6C5E-4B58-8121-9279F11D3D73}"/>
               </a:ext>
             </a:extLst>
           </p:cNvPr>
@@ -1009,7 +1010,7 @@
           <p:cNvPr id="3" name="Text Placeholder 2">
             <a:extLst>
               <a:ext uri="{FF2B5EF4-FFF2-40B4-BE49-F238E27FC236}">
-                <a16:creationId xmlns:a16="http://schemas.microsoft.com/office/drawing/2014/main" xmlns="" id="{B243195A-3915-4922-B15F-B46A8AB41FEA}"/>
+                <a16:creationId xmlns="" xmlns:a16="http://schemas.microsoft.com/office/drawing/2014/main" id="{B243195A-3915-4922-B15F-B46A8AB41FEA}"/>
               </a:ext>
             </a:extLst>
           </p:cNvPr>
@@ -1134,7 +1135,7 @@
           <p:cNvPr id="4" name="Date Placeholder 3">
             <a:extLst>
               <a:ext uri="{FF2B5EF4-FFF2-40B4-BE49-F238E27FC236}">
-                <a16:creationId xmlns:a16="http://schemas.microsoft.com/office/drawing/2014/main" xmlns="" id="{33A69456-A0E9-4808-8AD0-8E412F7B6478}"/>
+                <a16:creationId xmlns="" xmlns:a16="http://schemas.microsoft.com/office/drawing/2014/main" id="{33A69456-A0E9-4808-8AD0-8E412F7B6478}"/>
               </a:ext>
             </a:extLst>
           </p:cNvPr>
@@ -1152,7 +1153,7 @@
           <a:p>
             <a:fld id="{2F956D3E-0B91-471C-9743-3F865EE6F573}" type="datetimeFigureOut">
               <a:rPr lang="en-AU" smtClean="0"/>
-              <a:t>22/08/2018</a:t>
+              <a:t>30/08/2018</a:t>
             </a:fld>
             <a:endParaRPr lang="en-AU"/>
           </a:p>
@@ -1163,7 +1164,7 @@
           <p:cNvPr id="5" name="Footer Placeholder 4">
             <a:extLst>
               <a:ext uri="{FF2B5EF4-FFF2-40B4-BE49-F238E27FC236}">
-                <a16:creationId xmlns:a16="http://schemas.microsoft.com/office/drawing/2014/main" xmlns="" id="{E0CD1CF0-CD4A-49A3-A5A3-C4241E2A5F63}"/>
+                <a16:creationId xmlns="" xmlns:a16="http://schemas.microsoft.com/office/drawing/2014/main" id="{E0CD1CF0-CD4A-49A3-A5A3-C4241E2A5F63}"/>
               </a:ext>
             </a:extLst>
           </p:cNvPr>
@@ -1188,7 +1189,7 @@
           <p:cNvPr id="6" name="Slide Number Placeholder 5">
             <a:extLst>
               <a:ext uri="{FF2B5EF4-FFF2-40B4-BE49-F238E27FC236}">
-                <a16:creationId xmlns:a16="http://schemas.microsoft.com/office/drawing/2014/main" xmlns="" id="{977DB6D3-8C4E-4ED5-9327-2DCA26535F2F}"/>
+                <a16:creationId xmlns="" xmlns:a16="http://schemas.microsoft.com/office/drawing/2014/main" id="{977DB6D3-8C4E-4ED5-9327-2DCA26535F2F}"/>
               </a:ext>
             </a:extLst>
           </p:cNvPr>
@@ -1247,7 +1248,7 @@
           <p:cNvPr id="2" name="Title 1">
             <a:extLst>
               <a:ext uri="{FF2B5EF4-FFF2-40B4-BE49-F238E27FC236}">
-                <a16:creationId xmlns:a16="http://schemas.microsoft.com/office/drawing/2014/main" xmlns="" id="{07C65CDB-FECB-413B-B3E2-B8B3289BE67F}"/>
+                <a16:creationId xmlns="" xmlns:a16="http://schemas.microsoft.com/office/drawing/2014/main" id="{07C65CDB-FECB-413B-B3E2-B8B3289BE67F}"/>
               </a:ext>
             </a:extLst>
           </p:cNvPr>
@@ -1276,7 +1277,7 @@
           <p:cNvPr id="3" name="Content Placeholder 2">
             <a:extLst>
               <a:ext uri="{FF2B5EF4-FFF2-40B4-BE49-F238E27FC236}">
-                <a16:creationId xmlns:a16="http://schemas.microsoft.com/office/drawing/2014/main" xmlns="" id="{2E6195E5-493D-470C-8030-A76CAC535D10}"/>
+                <a16:creationId xmlns="" xmlns:a16="http://schemas.microsoft.com/office/drawing/2014/main" id="{2E6195E5-493D-470C-8030-A76CAC535D10}"/>
               </a:ext>
             </a:extLst>
           </p:cNvPr>
@@ -1339,7 +1340,7 @@
           <p:cNvPr id="4" name="Content Placeholder 3">
             <a:extLst>
               <a:ext uri="{FF2B5EF4-FFF2-40B4-BE49-F238E27FC236}">
-                <a16:creationId xmlns:a16="http://schemas.microsoft.com/office/drawing/2014/main" xmlns="" id="{4F75BA75-06D0-4C8F-978B-E8DD198357AB}"/>
+                <a16:creationId xmlns="" xmlns:a16="http://schemas.microsoft.com/office/drawing/2014/main" id="{4F75BA75-06D0-4C8F-978B-E8DD198357AB}"/>
               </a:ext>
             </a:extLst>
           </p:cNvPr>
@@ -1402,7 +1403,7 @@
           <p:cNvPr id="5" name="Date Placeholder 4">
             <a:extLst>
               <a:ext uri="{FF2B5EF4-FFF2-40B4-BE49-F238E27FC236}">
-                <a16:creationId xmlns:a16="http://schemas.microsoft.com/office/drawing/2014/main" xmlns="" id="{B8464B70-E9DB-4711-87B7-24F57EF07851}"/>
+                <a16:creationId xmlns="" xmlns:a16="http://schemas.microsoft.com/office/drawing/2014/main" id="{B8464B70-E9DB-4711-87B7-24F57EF07851}"/>
               </a:ext>
             </a:extLst>
           </p:cNvPr>
@@ -1420,7 +1421,7 @@
           <a:p>
             <a:fld id="{2F956D3E-0B91-471C-9743-3F865EE6F573}" type="datetimeFigureOut">
               <a:rPr lang="en-AU" smtClean="0"/>
-              <a:t>22/08/2018</a:t>
+              <a:t>30/08/2018</a:t>
             </a:fld>
             <a:endParaRPr lang="en-AU"/>
           </a:p>
@@ -1431,7 +1432,7 @@
           <p:cNvPr id="6" name="Footer Placeholder 5">
             <a:extLst>
               <a:ext uri="{FF2B5EF4-FFF2-40B4-BE49-F238E27FC236}">
-                <a16:creationId xmlns:a16="http://schemas.microsoft.com/office/drawing/2014/main" xmlns="" id="{749AD7CE-527F-410D-975F-A7CD735BDEDC}"/>
+                <a16:creationId xmlns="" xmlns:a16="http://schemas.microsoft.com/office/drawing/2014/main" id="{749AD7CE-527F-410D-975F-A7CD735BDEDC}"/>
               </a:ext>
             </a:extLst>
           </p:cNvPr>
@@ -1456,7 +1457,7 @@
           <p:cNvPr id="7" name="Slide Number Placeholder 6">
             <a:extLst>
               <a:ext uri="{FF2B5EF4-FFF2-40B4-BE49-F238E27FC236}">
-                <a16:creationId xmlns:a16="http://schemas.microsoft.com/office/drawing/2014/main" xmlns="" id="{255D3E42-D06E-4C32-A2BC-75DE87B576C3}"/>
+                <a16:creationId xmlns="" xmlns:a16="http://schemas.microsoft.com/office/drawing/2014/main" id="{255D3E42-D06E-4C32-A2BC-75DE87B576C3}"/>
               </a:ext>
             </a:extLst>
           </p:cNvPr>
@@ -1515,7 +1516,7 @@
           <p:cNvPr id="2" name="Title 1">
             <a:extLst>
               <a:ext uri="{FF2B5EF4-FFF2-40B4-BE49-F238E27FC236}">
-                <a16:creationId xmlns:a16="http://schemas.microsoft.com/office/drawing/2014/main" xmlns="" id="{BE6E0455-D9EF-42F6-B509-7FDC251CFDAF}"/>
+                <a16:creationId xmlns="" xmlns:a16="http://schemas.microsoft.com/office/drawing/2014/main" id="{BE6E0455-D9EF-42F6-B509-7FDC251CFDAF}"/>
               </a:ext>
             </a:extLst>
           </p:cNvPr>
@@ -1549,7 +1550,7 @@
           <p:cNvPr id="3" name="Text Placeholder 2">
             <a:extLst>
               <a:ext uri="{FF2B5EF4-FFF2-40B4-BE49-F238E27FC236}">
-                <a16:creationId xmlns:a16="http://schemas.microsoft.com/office/drawing/2014/main" xmlns="" id="{5117D045-1AD3-424F-855E-BD6F9FACDA1A}"/>
+                <a16:creationId xmlns="" xmlns:a16="http://schemas.microsoft.com/office/drawing/2014/main" id="{5117D045-1AD3-424F-855E-BD6F9FACDA1A}"/>
               </a:ext>
             </a:extLst>
           </p:cNvPr>
@@ -1620,7 +1621,7 @@
           <p:cNvPr id="4" name="Content Placeholder 3">
             <a:extLst>
               <a:ext uri="{FF2B5EF4-FFF2-40B4-BE49-F238E27FC236}">
-                <a16:creationId xmlns:a16="http://schemas.microsoft.com/office/drawing/2014/main" xmlns="" id="{CC38E2F2-5E09-477C-BF9F-8B671E6613BE}"/>
+                <a16:creationId xmlns="" xmlns:a16="http://schemas.microsoft.com/office/drawing/2014/main" id="{CC38E2F2-5E09-477C-BF9F-8B671E6613BE}"/>
               </a:ext>
             </a:extLst>
           </p:cNvPr>
@@ -1683,7 +1684,7 @@
           <p:cNvPr id="5" name="Text Placeholder 4">
             <a:extLst>
               <a:ext uri="{FF2B5EF4-FFF2-40B4-BE49-F238E27FC236}">
-                <a16:creationId xmlns:a16="http://schemas.microsoft.com/office/drawing/2014/main" xmlns="" id="{3A15ED3B-D38C-4255-B016-9BFE9335B63D}"/>
+                <a16:creationId xmlns="" xmlns:a16="http://schemas.microsoft.com/office/drawing/2014/main" id="{3A15ED3B-D38C-4255-B016-9BFE9335B63D}"/>
               </a:ext>
             </a:extLst>
           </p:cNvPr>
@@ -1754,7 +1755,7 @@
           <p:cNvPr id="6" name="Content Placeholder 5">
             <a:extLst>
               <a:ext uri="{FF2B5EF4-FFF2-40B4-BE49-F238E27FC236}">
-                <a16:creationId xmlns:a16="http://schemas.microsoft.com/office/drawing/2014/main" xmlns="" id="{63DAE8AA-C177-4A26-BEC1-435C0D5B2971}"/>
+                <a16:creationId xmlns="" xmlns:a16="http://schemas.microsoft.com/office/drawing/2014/main" id="{63DAE8AA-C177-4A26-BEC1-435C0D5B2971}"/>
               </a:ext>
             </a:extLst>
           </p:cNvPr>
@@ -1817,7 +1818,7 @@
           <p:cNvPr id="7" name="Date Placeholder 6">
             <a:extLst>
               <a:ext uri="{FF2B5EF4-FFF2-40B4-BE49-F238E27FC236}">
-                <a16:creationId xmlns:a16="http://schemas.microsoft.com/office/drawing/2014/main" xmlns="" id="{C91A1DD9-FE74-4BC2-9DFA-85266C81AE87}"/>
+                <a16:creationId xmlns="" xmlns:a16="http://schemas.microsoft.com/office/drawing/2014/main" id="{C91A1DD9-FE74-4BC2-9DFA-85266C81AE87}"/>
               </a:ext>
             </a:extLst>
           </p:cNvPr>
@@ -1835,7 +1836,7 @@
           <a:p>
             <a:fld id="{2F956D3E-0B91-471C-9743-3F865EE6F573}" type="datetimeFigureOut">
               <a:rPr lang="en-AU" smtClean="0"/>
-              <a:t>22/08/2018</a:t>
+              <a:t>30/08/2018</a:t>
             </a:fld>
             <a:endParaRPr lang="en-AU"/>
           </a:p>
@@ -1846,7 +1847,7 @@
           <p:cNvPr id="8" name="Footer Placeholder 7">
             <a:extLst>
               <a:ext uri="{FF2B5EF4-FFF2-40B4-BE49-F238E27FC236}">
-                <a16:creationId xmlns:a16="http://schemas.microsoft.com/office/drawing/2014/main" xmlns="" id="{03468399-9983-447A-A9C7-60841A2101A5}"/>
+                <a16:creationId xmlns="" xmlns:a16="http://schemas.microsoft.com/office/drawing/2014/main" id="{03468399-9983-447A-A9C7-60841A2101A5}"/>
               </a:ext>
             </a:extLst>
           </p:cNvPr>
@@ -1871,7 +1872,7 @@
           <p:cNvPr id="9" name="Slide Number Placeholder 8">
             <a:extLst>
               <a:ext uri="{FF2B5EF4-FFF2-40B4-BE49-F238E27FC236}">
-                <a16:creationId xmlns:a16="http://schemas.microsoft.com/office/drawing/2014/main" xmlns="" id="{FF353AE5-8C6E-44F3-BD0C-9BE8FC31A3C4}"/>
+                <a16:creationId xmlns="" xmlns:a16="http://schemas.microsoft.com/office/drawing/2014/main" id="{FF353AE5-8C6E-44F3-BD0C-9BE8FC31A3C4}"/>
               </a:ext>
             </a:extLst>
           </p:cNvPr>
@@ -1930,7 +1931,7 @@
           <p:cNvPr id="2" name="Title 1">
             <a:extLst>
               <a:ext uri="{FF2B5EF4-FFF2-40B4-BE49-F238E27FC236}">
-                <a16:creationId xmlns:a16="http://schemas.microsoft.com/office/drawing/2014/main" xmlns="" id="{11AB4E18-777A-4059-8FE3-0C744DDCEF11}"/>
+                <a16:creationId xmlns="" xmlns:a16="http://schemas.microsoft.com/office/drawing/2014/main" id="{11AB4E18-777A-4059-8FE3-0C744DDCEF11}"/>
               </a:ext>
             </a:extLst>
           </p:cNvPr>
@@ -1959,7 +1960,7 @@
           <p:cNvPr id="3" name="Date Placeholder 2">
             <a:extLst>
               <a:ext uri="{FF2B5EF4-FFF2-40B4-BE49-F238E27FC236}">
-                <a16:creationId xmlns:a16="http://schemas.microsoft.com/office/drawing/2014/main" xmlns="" id="{EBBA3A6C-B2BF-4415-9EFA-485140AC1C20}"/>
+                <a16:creationId xmlns="" xmlns:a16="http://schemas.microsoft.com/office/drawing/2014/main" id="{EBBA3A6C-B2BF-4415-9EFA-485140AC1C20}"/>
               </a:ext>
             </a:extLst>
           </p:cNvPr>
@@ -1977,7 +1978,7 @@
           <a:p>
             <a:fld id="{2F956D3E-0B91-471C-9743-3F865EE6F573}" type="datetimeFigureOut">
               <a:rPr lang="en-AU" smtClean="0"/>
-              <a:t>22/08/2018</a:t>
+              <a:t>30/08/2018</a:t>
             </a:fld>
             <a:endParaRPr lang="en-AU"/>
           </a:p>
@@ -1988,7 +1989,7 @@
           <p:cNvPr id="4" name="Footer Placeholder 3">
             <a:extLst>
               <a:ext uri="{FF2B5EF4-FFF2-40B4-BE49-F238E27FC236}">
-                <a16:creationId xmlns:a16="http://schemas.microsoft.com/office/drawing/2014/main" xmlns="" id="{979E66C2-27F5-4ADA-B05B-28A7E30C72C4}"/>
+                <a16:creationId xmlns="" xmlns:a16="http://schemas.microsoft.com/office/drawing/2014/main" id="{979E66C2-27F5-4ADA-B05B-28A7E30C72C4}"/>
               </a:ext>
             </a:extLst>
           </p:cNvPr>
@@ -2013,7 +2014,7 @@
           <p:cNvPr id="5" name="Slide Number Placeholder 4">
             <a:extLst>
               <a:ext uri="{FF2B5EF4-FFF2-40B4-BE49-F238E27FC236}">
-                <a16:creationId xmlns:a16="http://schemas.microsoft.com/office/drawing/2014/main" xmlns="" id="{339F570E-2EBF-491A-B1A3-7B0020A39D87}"/>
+                <a16:creationId xmlns="" xmlns:a16="http://schemas.microsoft.com/office/drawing/2014/main" id="{339F570E-2EBF-491A-B1A3-7B0020A39D87}"/>
               </a:ext>
             </a:extLst>
           </p:cNvPr>
@@ -2072,7 +2073,7 @@
           <p:cNvPr id="2" name="Date Placeholder 1">
             <a:extLst>
               <a:ext uri="{FF2B5EF4-FFF2-40B4-BE49-F238E27FC236}">
-                <a16:creationId xmlns:a16="http://schemas.microsoft.com/office/drawing/2014/main" xmlns="" id="{31CC9DF5-DDBA-4A27-A2BE-EE4875C95E73}"/>
+                <a16:creationId xmlns="" xmlns:a16="http://schemas.microsoft.com/office/drawing/2014/main" id="{31CC9DF5-DDBA-4A27-A2BE-EE4875C95E73}"/>
               </a:ext>
             </a:extLst>
           </p:cNvPr>
@@ -2090,7 +2091,7 @@
           <a:p>
             <a:fld id="{2F956D3E-0B91-471C-9743-3F865EE6F573}" type="datetimeFigureOut">
               <a:rPr lang="en-AU" smtClean="0"/>
-              <a:t>22/08/2018</a:t>
+              <a:t>30/08/2018</a:t>
             </a:fld>
             <a:endParaRPr lang="en-AU"/>
           </a:p>
@@ -2101,7 +2102,7 @@
           <p:cNvPr id="3" name="Footer Placeholder 2">
             <a:extLst>
               <a:ext uri="{FF2B5EF4-FFF2-40B4-BE49-F238E27FC236}">
-                <a16:creationId xmlns:a16="http://schemas.microsoft.com/office/drawing/2014/main" xmlns="" id="{5E855F50-D457-4213-B498-4635BD853470}"/>
+                <a16:creationId xmlns="" xmlns:a16="http://schemas.microsoft.com/office/drawing/2014/main" id="{5E855F50-D457-4213-B498-4635BD853470}"/>
               </a:ext>
             </a:extLst>
           </p:cNvPr>
@@ -2126,7 +2127,7 @@
           <p:cNvPr id="4" name="Slide Number Placeholder 3">
             <a:extLst>
               <a:ext uri="{FF2B5EF4-FFF2-40B4-BE49-F238E27FC236}">
-                <a16:creationId xmlns:a16="http://schemas.microsoft.com/office/drawing/2014/main" xmlns="" id="{1424F85B-ACD9-4362-A6F2-B7C48F575113}"/>
+                <a16:creationId xmlns="" xmlns:a16="http://schemas.microsoft.com/office/drawing/2014/main" id="{1424F85B-ACD9-4362-A6F2-B7C48F575113}"/>
               </a:ext>
             </a:extLst>
           </p:cNvPr>
@@ -2185,7 +2186,7 @@
           <p:cNvPr id="2" name="Title 1">
             <a:extLst>
               <a:ext uri="{FF2B5EF4-FFF2-40B4-BE49-F238E27FC236}">
-                <a16:creationId xmlns:a16="http://schemas.microsoft.com/office/drawing/2014/main" xmlns="" id="{BD554F58-5E8E-48ED-8ED9-A0BD06E6F218}"/>
+                <a16:creationId xmlns="" xmlns:a16="http://schemas.microsoft.com/office/drawing/2014/main" id="{BD554F58-5E8E-48ED-8ED9-A0BD06E6F218}"/>
               </a:ext>
             </a:extLst>
           </p:cNvPr>
@@ -2223,7 +2224,7 @@
           <p:cNvPr id="3" name="Content Placeholder 2">
             <a:extLst>
               <a:ext uri="{FF2B5EF4-FFF2-40B4-BE49-F238E27FC236}">
-                <a16:creationId xmlns:a16="http://schemas.microsoft.com/office/drawing/2014/main" xmlns="" id="{88E32398-FD1A-4262-BB8C-6CFB63C85CED}"/>
+                <a16:creationId xmlns="" xmlns:a16="http://schemas.microsoft.com/office/drawing/2014/main" id="{88E32398-FD1A-4262-BB8C-6CFB63C85CED}"/>
               </a:ext>
             </a:extLst>
           </p:cNvPr>
@@ -2314,7 +2315,7 @@
           <p:cNvPr id="4" name="Text Placeholder 3">
             <a:extLst>
               <a:ext uri="{FF2B5EF4-FFF2-40B4-BE49-F238E27FC236}">
-                <a16:creationId xmlns:a16="http://schemas.microsoft.com/office/drawing/2014/main" xmlns="" id="{373EAC1B-2FB9-4226-BCA0-E5D3B01D6FA0}"/>
+                <a16:creationId xmlns="" xmlns:a16="http://schemas.microsoft.com/office/drawing/2014/main" id="{373EAC1B-2FB9-4226-BCA0-E5D3B01D6FA0}"/>
               </a:ext>
             </a:extLst>
           </p:cNvPr>
@@ -2385,7 +2386,7 @@
           <p:cNvPr id="5" name="Date Placeholder 4">
             <a:extLst>
               <a:ext uri="{FF2B5EF4-FFF2-40B4-BE49-F238E27FC236}">
-                <a16:creationId xmlns:a16="http://schemas.microsoft.com/office/drawing/2014/main" xmlns="" id="{D639F409-5438-45DD-BECC-62B7B0AAF361}"/>
+                <a16:creationId xmlns="" xmlns:a16="http://schemas.microsoft.com/office/drawing/2014/main" id="{D639F409-5438-45DD-BECC-62B7B0AAF361}"/>
               </a:ext>
             </a:extLst>
           </p:cNvPr>
@@ -2403,7 +2404,7 @@
           <a:p>
             <a:fld id="{2F956D3E-0B91-471C-9743-3F865EE6F573}" type="datetimeFigureOut">
               <a:rPr lang="en-AU" smtClean="0"/>
-              <a:t>22/08/2018</a:t>
+              <a:t>30/08/2018</a:t>
             </a:fld>
             <a:endParaRPr lang="en-AU"/>
           </a:p>
@@ -2414,7 +2415,7 @@
           <p:cNvPr id="6" name="Footer Placeholder 5">
             <a:extLst>
               <a:ext uri="{FF2B5EF4-FFF2-40B4-BE49-F238E27FC236}">
-                <a16:creationId xmlns:a16="http://schemas.microsoft.com/office/drawing/2014/main" xmlns="" id="{2311AAC2-3F58-465D-8275-AAB451586BBE}"/>
+                <a16:creationId xmlns="" xmlns:a16="http://schemas.microsoft.com/office/drawing/2014/main" id="{2311AAC2-3F58-465D-8275-AAB451586BBE}"/>
               </a:ext>
             </a:extLst>
           </p:cNvPr>
@@ -2439,7 +2440,7 @@
           <p:cNvPr id="7" name="Slide Number Placeholder 6">
             <a:extLst>
               <a:ext uri="{FF2B5EF4-FFF2-40B4-BE49-F238E27FC236}">
-                <a16:creationId xmlns:a16="http://schemas.microsoft.com/office/drawing/2014/main" xmlns="" id="{4076C87A-5864-468D-9EE2-7F4B0C093074}"/>
+                <a16:creationId xmlns="" xmlns:a16="http://schemas.microsoft.com/office/drawing/2014/main" id="{4076C87A-5864-468D-9EE2-7F4B0C093074}"/>
               </a:ext>
             </a:extLst>
           </p:cNvPr>
@@ -2498,7 +2499,7 @@
           <p:cNvPr id="2" name="Title 1">
             <a:extLst>
               <a:ext uri="{FF2B5EF4-FFF2-40B4-BE49-F238E27FC236}">
-                <a16:creationId xmlns:a16="http://schemas.microsoft.com/office/drawing/2014/main" xmlns="" id="{B5D51929-B485-4C5E-86DE-E6E2074D6CE5}"/>
+                <a16:creationId xmlns="" xmlns:a16="http://schemas.microsoft.com/office/drawing/2014/main" id="{B5D51929-B485-4C5E-86DE-E6E2074D6CE5}"/>
               </a:ext>
             </a:extLst>
           </p:cNvPr>
@@ -2536,7 +2537,7 @@
           <p:cNvPr id="3" name="Picture Placeholder 2">
             <a:extLst>
               <a:ext uri="{FF2B5EF4-FFF2-40B4-BE49-F238E27FC236}">
-                <a16:creationId xmlns:a16="http://schemas.microsoft.com/office/drawing/2014/main" xmlns="" id="{745CAD50-DBFD-4B1E-8C5A-FEC1D2159DDB}"/>
+                <a16:creationId xmlns="" xmlns:a16="http://schemas.microsoft.com/office/drawing/2014/main" id="{745CAD50-DBFD-4B1E-8C5A-FEC1D2159DDB}"/>
               </a:ext>
             </a:extLst>
           </p:cNvPr>
@@ -2603,7 +2604,7 @@
           <p:cNvPr id="4" name="Text Placeholder 3">
             <a:extLst>
               <a:ext uri="{FF2B5EF4-FFF2-40B4-BE49-F238E27FC236}">
-                <a16:creationId xmlns:a16="http://schemas.microsoft.com/office/drawing/2014/main" xmlns="" id="{56CA1066-373C-4A49-B657-9EE7DCD0952D}"/>
+                <a16:creationId xmlns="" xmlns:a16="http://schemas.microsoft.com/office/drawing/2014/main" id="{56CA1066-373C-4A49-B657-9EE7DCD0952D}"/>
               </a:ext>
             </a:extLst>
           </p:cNvPr>
@@ -2674,7 +2675,7 @@
           <p:cNvPr id="5" name="Date Placeholder 4">
             <a:extLst>
               <a:ext uri="{FF2B5EF4-FFF2-40B4-BE49-F238E27FC236}">
-                <a16:creationId xmlns:a16="http://schemas.microsoft.com/office/drawing/2014/main" xmlns="" id="{D4F04E1C-BF5B-43FA-9CA9-C4A3872ABD47}"/>
+                <a16:creationId xmlns="" xmlns:a16="http://schemas.microsoft.com/office/drawing/2014/main" id="{D4F04E1C-BF5B-43FA-9CA9-C4A3872ABD47}"/>
               </a:ext>
             </a:extLst>
           </p:cNvPr>
@@ -2692,7 +2693,7 @@
           <a:p>
             <a:fld id="{2F956D3E-0B91-471C-9743-3F865EE6F573}" type="datetimeFigureOut">
               <a:rPr lang="en-AU" smtClean="0"/>
-              <a:t>22/08/2018</a:t>
+              <a:t>30/08/2018</a:t>
             </a:fld>
             <a:endParaRPr lang="en-AU"/>
           </a:p>
@@ -2703,7 +2704,7 @@
           <p:cNvPr id="6" name="Footer Placeholder 5">
             <a:extLst>
               <a:ext uri="{FF2B5EF4-FFF2-40B4-BE49-F238E27FC236}">
-                <a16:creationId xmlns:a16="http://schemas.microsoft.com/office/drawing/2014/main" xmlns="" id="{B3F3C200-5776-44B6-80D6-B576FC6FE4A1}"/>
+                <a16:creationId xmlns="" xmlns:a16="http://schemas.microsoft.com/office/drawing/2014/main" id="{B3F3C200-5776-44B6-80D6-B576FC6FE4A1}"/>
               </a:ext>
             </a:extLst>
           </p:cNvPr>
@@ -2728,7 +2729,7 @@
           <p:cNvPr id="7" name="Slide Number Placeholder 6">
             <a:extLst>
               <a:ext uri="{FF2B5EF4-FFF2-40B4-BE49-F238E27FC236}">
-                <a16:creationId xmlns:a16="http://schemas.microsoft.com/office/drawing/2014/main" xmlns="" id="{C83FA351-8092-4D78-A9C7-A20A77930D3D}"/>
+                <a16:creationId xmlns="" xmlns:a16="http://schemas.microsoft.com/office/drawing/2014/main" id="{C83FA351-8092-4D78-A9C7-A20A77930D3D}"/>
               </a:ext>
             </a:extLst>
           </p:cNvPr>
@@ -2792,7 +2793,7 @@
           <p:cNvPr id="2" name="Title Placeholder 1">
             <a:extLst>
               <a:ext uri="{FF2B5EF4-FFF2-40B4-BE49-F238E27FC236}">
-                <a16:creationId xmlns:a16="http://schemas.microsoft.com/office/drawing/2014/main" xmlns="" id="{417237BA-4865-4280-8BD0-E6D106DFB608}"/>
+                <a16:creationId xmlns="" xmlns:a16="http://schemas.microsoft.com/office/drawing/2014/main" id="{417237BA-4865-4280-8BD0-E6D106DFB608}"/>
               </a:ext>
             </a:extLst>
           </p:cNvPr>
@@ -2831,7 +2832,7 @@
           <p:cNvPr id="3" name="Text Placeholder 2">
             <a:extLst>
               <a:ext uri="{FF2B5EF4-FFF2-40B4-BE49-F238E27FC236}">
-                <a16:creationId xmlns:a16="http://schemas.microsoft.com/office/drawing/2014/main" xmlns="" id="{CFD6DF4C-CD43-4DDE-9E26-4DAB0E753402}"/>
+                <a16:creationId xmlns="" xmlns:a16="http://schemas.microsoft.com/office/drawing/2014/main" id="{CFD6DF4C-CD43-4DDE-9E26-4DAB0E753402}"/>
               </a:ext>
             </a:extLst>
           </p:cNvPr>
@@ -2899,7 +2900,7 @@
           <p:cNvPr id="4" name="Date Placeholder 3">
             <a:extLst>
               <a:ext uri="{FF2B5EF4-FFF2-40B4-BE49-F238E27FC236}">
-                <a16:creationId xmlns:a16="http://schemas.microsoft.com/office/drawing/2014/main" xmlns="" id="{4E8F96A9-316E-4272-B736-3B7A5BEFB368}"/>
+                <a16:creationId xmlns="" xmlns:a16="http://schemas.microsoft.com/office/drawing/2014/main" id="{4E8F96A9-316E-4272-B736-3B7A5BEFB368}"/>
               </a:ext>
             </a:extLst>
           </p:cNvPr>
@@ -2935,7 +2936,7 @@
           <a:p>
             <a:fld id="{2F956D3E-0B91-471C-9743-3F865EE6F573}" type="datetimeFigureOut">
               <a:rPr lang="en-AU" smtClean="0"/>
-              <a:t>22/08/2018</a:t>
+              <a:t>30/08/2018</a:t>
             </a:fld>
             <a:endParaRPr lang="en-AU"/>
           </a:p>
@@ -2946,7 +2947,7 @@
           <p:cNvPr id="5" name="Footer Placeholder 4">
             <a:extLst>
               <a:ext uri="{FF2B5EF4-FFF2-40B4-BE49-F238E27FC236}">
-                <a16:creationId xmlns:a16="http://schemas.microsoft.com/office/drawing/2014/main" xmlns="" id="{5B9B060F-4139-42DD-835A-DD48B4C35B93}"/>
+                <a16:creationId xmlns="" xmlns:a16="http://schemas.microsoft.com/office/drawing/2014/main" id="{5B9B060F-4139-42DD-835A-DD48B4C35B93}"/>
               </a:ext>
             </a:extLst>
           </p:cNvPr>
@@ -2989,7 +2990,7 @@
           <p:cNvPr id="6" name="Slide Number Placeholder 5">
             <a:extLst>
               <a:ext uri="{FF2B5EF4-FFF2-40B4-BE49-F238E27FC236}">
-                <a16:creationId xmlns:a16="http://schemas.microsoft.com/office/drawing/2014/main" xmlns="" id="{419ED261-D27A-4F8B-A664-31C7824BE2CC}"/>
+                <a16:creationId xmlns="" xmlns:a16="http://schemas.microsoft.com/office/drawing/2014/main" id="{419ED261-D27A-4F8B-A664-31C7824BE2CC}"/>
               </a:ext>
             </a:extLst>
           </p:cNvPr>
@@ -3357,7 +3358,7 @@
           <p:cNvPr id="4" name="Rectangle: Rounded Corners 3">
             <a:extLst>
               <a:ext uri="{FF2B5EF4-FFF2-40B4-BE49-F238E27FC236}">
-                <a16:creationId xmlns:a16="http://schemas.microsoft.com/office/drawing/2014/main" xmlns="" id="{54D0FB8B-B098-491A-AD31-AD421AB902EF}"/>
+                <a16:creationId xmlns="" xmlns:a16="http://schemas.microsoft.com/office/drawing/2014/main" id="{54D0FB8B-B098-491A-AD31-AD421AB902EF}"/>
               </a:ext>
             </a:extLst>
           </p:cNvPr>
@@ -3416,7 +3417,7 @@
           <p:cNvPr id="5" name="Rectangle: Rounded Corners 4">
             <a:extLst>
               <a:ext uri="{FF2B5EF4-FFF2-40B4-BE49-F238E27FC236}">
-                <a16:creationId xmlns:a16="http://schemas.microsoft.com/office/drawing/2014/main" xmlns="" id="{5675C345-97DA-44C4-8895-174F9B25EB74}"/>
+                <a16:creationId xmlns="" xmlns:a16="http://schemas.microsoft.com/office/drawing/2014/main" id="{5675C345-97DA-44C4-8895-174F9B25EB74}"/>
               </a:ext>
             </a:extLst>
           </p:cNvPr>
@@ -3475,7 +3476,7 @@
           <p:cNvPr id="10" name="Straight Arrow Connector 9">
             <a:extLst>
               <a:ext uri="{FF2B5EF4-FFF2-40B4-BE49-F238E27FC236}">
-                <a16:creationId xmlns:a16="http://schemas.microsoft.com/office/drawing/2014/main" xmlns="" id="{2738494B-22BB-4E16-AA8E-063441F62080}"/>
+                <a16:creationId xmlns="" xmlns:a16="http://schemas.microsoft.com/office/drawing/2014/main" id="{2738494B-22BB-4E16-AA8E-063441F62080}"/>
               </a:ext>
             </a:extLst>
           </p:cNvPr>
@@ -3517,7 +3518,7 @@
           <p:cNvPr id="11" name="TextBox 10">
             <a:extLst>
               <a:ext uri="{FF2B5EF4-FFF2-40B4-BE49-F238E27FC236}">
-                <a16:creationId xmlns:a16="http://schemas.microsoft.com/office/drawing/2014/main" xmlns="" id="{EA0207FA-CB6D-4700-A943-37A35E7A7F6C}"/>
+                <a16:creationId xmlns="" xmlns:a16="http://schemas.microsoft.com/office/drawing/2014/main" id="{EA0207FA-CB6D-4700-A943-37A35E7A7F6C}"/>
               </a:ext>
             </a:extLst>
           </p:cNvPr>
@@ -3553,7 +3554,7 @@
           <p:cNvPr id="12" name="Rectangle: Rounded Corners 11">
             <a:extLst>
               <a:ext uri="{FF2B5EF4-FFF2-40B4-BE49-F238E27FC236}">
-                <a16:creationId xmlns:a16="http://schemas.microsoft.com/office/drawing/2014/main" xmlns="" id="{0172D6A7-F319-4C98-BCFD-58AB9FFA137C}"/>
+                <a16:creationId xmlns="" xmlns:a16="http://schemas.microsoft.com/office/drawing/2014/main" id="{0172D6A7-F319-4C98-BCFD-58AB9FFA137C}"/>
               </a:ext>
             </a:extLst>
           </p:cNvPr>
@@ -3612,7 +3613,7 @@
           <p:cNvPr id="13" name="Rectangle: Rounded Corners 12">
             <a:extLst>
               <a:ext uri="{FF2B5EF4-FFF2-40B4-BE49-F238E27FC236}">
-                <a16:creationId xmlns:a16="http://schemas.microsoft.com/office/drawing/2014/main" xmlns="" id="{351768B8-B0F4-49E5-A1C4-CB95780972A0}"/>
+                <a16:creationId xmlns="" xmlns:a16="http://schemas.microsoft.com/office/drawing/2014/main" id="{351768B8-B0F4-49E5-A1C4-CB95780972A0}"/>
               </a:ext>
             </a:extLst>
           </p:cNvPr>
@@ -3671,7 +3672,7 @@
           <p:cNvPr id="14" name="Rectangle: Rounded Corners 13">
             <a:extLst>
               <a:ext uri="{FF2B5EF4-FFF2-40B4-BE49-F238E27FC236}">
-                <a16:creationId xmlns:a16="http://schemas.microsoft.com/office/drawing/2014/main" xmlns="" id="{C3BAB69B-ADA0-48E1-A7A3-2F500C2A407E}"/>
+                <a16:creationId xmlns="" xmlns:a16="http://schemas.microsoft.com/office/drawing/2014/main" id="{C3BAB69B-ADA0-48E1-A7A3-2F500C2A407E}"/>
               </a:ext>
             </a:extLst>
           </p:cNvPr>
@@ -3730,7 +3731,7 @@
           <p:cNvPr id="15" name="Rectangle: Rounded Corners 14">
             <a:extLst>
               <a:ext uri="{FF2B5EF4-FFF2-40B4-BE49-F238E27FC236}">
-                <a16:creationId xmlns:a16="http://schemas.microsoft.com/office/drawing/2014/main" xmlns="" id="{415FC0F5-4B41-4A53-9189-AE991ED2BD31}"/>
+                <a16:creationId xmlns="" xmlns:a16="http://schemas.microsoft.com/office/drawing/2014/main" id="{415FC0F5-4B41-4A53-9189-AE991ED2BD31}"/>
               </a:ext>
             </a:extLst>
           </p:cNvPr>
@@ -3789,7 +3790,7 @@
           <p:cNvPr id="16" name="Rectangle: Rounded Corners 15">
             <a:extLst>
               <a:ext uri="{FF2B5EF4-FFF2-40B4-BE49-F238E27FC236}">
-                <a16:creationId xmlns:a16="http://schemas.microsoft.com/office/drawing/2014/main" xmlns="" id="{80DE7B24-B7E9-47B6-8E88-EC972ED19123}"/>
+                <a16:creationId xmlns="" xmlns:a16="http://schemas.microsoft.com/office/drawing/2014/main" id="{80DE7B24-B7E9-47B6-8E88-EC972ED19123}"/>
               </a:ext>
             </a:extLst>
           </p:cNvPr>
@@ -3848,7 +3849,7 @@
           <p:cNvPr id="17" name="Connector: Elbow 16">
             <a:extLst>
               <a:ext uri="{FF2B5EF4-FFF2-40B4-BE49-F238E27FC236}">
-                <a16:creationId xmlns:a16="http://schemas.microsoft.com/office/drawing/2014/main" xmlns="" id="{64514852-CA0B-4B22-9112-9C0EFB8F9B9B}"/>
+                <a16:creationId xmlns="" xmlns:a16="http://schemas.microsoft.com/office/drawing/2014/main" id="{64514852-CA0B-4B22-9112-9C0EFB8F9B9B}"/>
               </a:ext>
             </a:extLst>
           </p:cNvPr>
@@ -3896,7 +3897,7 @@
           <p:cNvPr id="20" name="Connector: Elbow 19">
             <a:extLst>
               <a:ext uri="{FF2B5EF4-FFF2-40B4-BE49-F238E27FC236}">
-                <a16:creationId xmlns:a16="http://schemas.microsoft.com/office/drawing/2014/main" xmlns="" id="{E118E15D-38EF-455D-87FB-59C64F2455B6}"/>
+                <a16:creationId xmlns="" xmlns:a16="http://schemas.microsoft.com/office/drawing/2014/main" id="{E118E15D-38EF-455D-87FB-59C64F2455B6}"/>
               </a:ext>
             </a:extLst>
           </p:cNvPr>
@@ -3944,7 +3945,7 @@
           <p:cNvPr id="23" name="Connector: Elbow 22">
             <a:extLst>
               <a:ext uri="{FF2B5EF4-FFF2-40B4-BE49-F238E27FC236}">
-                <a16:creationId xmlns:a16="http://schemas.microsoft.com/office/drawing/2014/main" xmlns="" id="{B493C084-F212-492E-957C-8BEA879E995D}"/>
+                <a16:creationId xmlns="" xmlns:a16="http://schemas.microsoft.com/office/drawing/2014/main" id="{B493C084-F212-492E-957C-8BEA879E995D}"/>
               </a:ext>
             </a:extLst>
           </p:cNvPr>
@@ -3992,7 +3993,7 @@
           <p:cNvPr id="30" name="Rectangle: Rounded Corners 29">
             <a:extLst>
               <a:ext uri="{FF2B5EF4-FFF2-40B4-BE49-F238E27FC236}">
-                <a16:creationId xmlns:a16="http://schemas.microsoft.com/office/drawing/2014/main" xmlns="" id="{19F24737-7B63-4E7B-9AE5-A87497FA6FAF}"/>
+                <a16:creationId xmlns="" xmlns:a16="http://schemas.microsoft.com/office/drawing/2014/main" id="{19F24737-7B63-4E7B-9AE5-A87497FA6FAF}"/>
               </a:ext>
             </a:extLst>
           </p:cNvPr>
@@ -4051,7 +4052,7 @@
           <p:cNvPr id="31" name="Rectangle: Rounded Corners 30">
             <a:extLst>
               <a:ext uri="{FF2B5EF4-FFF2-40B4-BE49-F238E27FC236}">
-                <a16:creationId xmlns:a16="http://schemas.microsoft.com/office/drawing/2014/main" xmlns="" id="{7BC2DA58-1C14-4D8B-9AF3-E14F6FAD8FC0}"/>
+                <a16:creationId xmlns="" xmlns:a16="http://schemas.microsoft.com/office/drawing/2014/main" id="{7BC2DA58-1C14-4D8B-9AF3-E14F6FAD8FC0}"/>
               </a:ext>
             </a:extLst>
           </p:cNvPr>
@@ -4110,7 +4111,7 @@
           <p:cNvPr id="32" name="Rectangle: Rounded Corners 31">
             <a:extLst>
               <a:ext uri="{FF2B5EF4-FFF2-40B4-BE49-F238E27FC236}">
-                <a16:creationId xmlns:a16="http://schemas.microsoft.com/office/drawing/2014/main" xmlns="" id="{A2415D34-9AEB-4D3C-8B85-9A65A96218FE}"/>
+                <a16:creationId xmlns="" xmlns:a16="http://schemas.microsoft.com/office/drawing/2014/main" id="{A2415D34-9AEB-4D3C-8B85-9A65A96218FE}"/>
               </a:ext>
             </a:extLst>
           </p:cNvPr>
@@ -4169,7 +4170,7 @@
           <p:cNvPr id="33" name="Connector: Elbow 32">
             <a:extLst>
               <a:ext uri="{FF2B5EF4-FFF2-40B4-BE49-F238E27FC236}">
-                <a16:creationId xmlns:a16="http://schemas.microsoft.com/office/drawing/2014/main" xmlns="" id="{821A3089-B696-4653-B73B-39B49F027466}"/>
+                <a16:creationId xmlns="" xmlns:a16="http://schemas.microsoft.com/office/drawing/2014/main" id="{821A3089-B696-4653-B73B-39B49F027466}"/>
               </a:ext>
             </a:extLst>
           </p:cNvPr>
@@ -4217,7 +4218,7 @@
           <p:cNvPr id="36" name="Connector: Elbow 35">
             <a:extLst>
               <a:ext uri="{FF2B5EF4-FFF2-40B4-BE49-F238E27FC236}">
-                <a16:creationId xmlns:a16="http://schemas.microsoft.com/office/drawing/2014/main" xmlns="" id="{0E570848-FE64-4E6A-A947-1CBC1911E97A}"/>
+                <a16:creationId xmlns="" xmlns:a16="http://schemas.microsoft.com/office/drawing/2014/main" id="{0E570848-FE64-4E6A-A947-1CBC1911E97A}"/>
               </a:ext>
             </a:extLst>
           </p:cNvPr>
@@ -4265,7 +4266,7 @@
           <p:cNvPr id="8" name="Straight Arrow Connector 7">
             <a:extLst>
               <a:ext uri="{FF2B5EF4-FFF2-40B4-BE49-F238E27FC236}">
-                <a16:creationId xmlns:a16="http://schemas.microsoft.com/office/drawing/2014/main" xmlns="" id="{02FF8AEF-9744-4B1C-ACB9-E3241ACF27D1}"/>
+                <a16:creationId xmlns="" xmlns:a16="http://schemas.microsoft.com/office/drawing/2014/main" id="{02FF8AEF-9744-4B1C-ACB9-E3241ACF27D1}"/>
               </a:ext>
             </a:extLst>
           </p:cNvPr>
@@ -4310,7 +4311,7 @@
           <p:cNvPr id="25" name="Rectangle: Rounded Corners 24">
             <a:extLst>
               <a:ext uri="{FF2B5EF4-FFF2-40B4-BE49-F238E27FC236}">
-                <a16:creationId xmlns:a16="http://schemas.microsoft.com/office/drawing/2014/main" xmlns="" id="{509E733A-9C35-48BC-B1CE-379C573000FE}"/>
+                <a16:creationId xmlns="" xmlns:a16="http://schemas.microsoft.com/office/drawing/2014/main" id="{509E733A-9C35-48BC-B1CE-379C573000FE}"/>
               </a:ext>
             </a:extLst>
           </p:cNvPr>
@@ -4369,7 +4370,7 @@
           <p:cNvPr id="26" name="Straight Arrow Connector 25">
             <a:extLst>
               <a:ext uri="{FF2B5EF4-FFF2-40B4-BE49-F238E27FC236}">
-                <a16:creationId xmlns:a16="http://schemas.microsoft.com/office/drawing/2014/main" xmlns="" id="{45BB73C4-0487-4332-804D-0640F1C24DD7}"/>
+                <a16:creationId xmlns="" xmlns:a16="http://schemas.microsoft.com/office/drawing/2014/main" id="{45BB73C4-0487-4332-804D-0640F1C24DD7}"/>
               </a:ext>
             </a:extLst>
           </p:cNvPr>
@@ -4416,7 +4417,7 @@
           <p:cNvPr id="29" name="TextBox 28">
             <a:extLst>
               <a:ext uri="{FF2B5EF4-FFF2-40B4-BE49-F238E27FC236}">
-                <a16:creationId xmlns:a16="http://schemas.microsoft.com/office/drawing/2014/main" xmlns="" id="{ECF64CE6-E66F-4FF9-8239-2D9801A3273B}"/>
+                <a16:creationId xmlns="" xmlns:a16="http://schemas.microsoft.com/office/drawing/2014/main" id="{ECF64CE6-E66F-4FF9-8239-2D9801A3273B}"/>
               </a:ext>
             </a:extLst>
           </p:cNvPr>
@@ -4452,7 +4453,7 @@
           <p:cNvPr id="34" name="Connector: Elbow 33">
             <a:extLst>
               <a:ext uri="{FF2B5EF4-FFF2-40B4-BE49-F238E27FC236}">
-                <a16:creationId xmlns:a16="http://schemas.microsoft.com/office/drawing/2014/main" xmlns="" id="{762DA317-C2C5-4F35-8BEE-2475336742C9}"/>
+                <a16:creationId xmlns="" xmlns:a16="http://schemas.microsoft.com/office/drawing/2014/main" id="{762DA317-C2C5-4F35-8BEE-2475336742C9}"/>
               </a:ext>
             </a:extLst>
           </p:cNvPr>
@@ -4501,7 +4502,7 @@
           <p:cNvPr id="35" name="Connector: Elbow 34">
             <a:extLst>
               <a:ext uri="{FF2B5EF4-FFF2-40B4-BE49-F238E27FC236}">
-                <a16:creationId xmlns:a16="http://schemas.microsoft.com/office/drawing/2014/main" xmlns="" id="{326F3BCB-F2A3-492C-A8F3-20922107B29D}"/>
+                <a16:creationId xmlns="" xmlns:a16="http://schemas.microsoft.com/office/drawing/2014/main" id="{326F3BCB-F2A3-492C-A8F3-20922107B29D}"/>
               </a:ext>
             </a:extLst>
           </p:cNvPr>
@@ -4550,7 +4551,7 @@
           <p:cNvPr id="37" name="Connector: Elbow 36">
             <a:extLst>
               <a:ext uri="{FF2B5EF4-FFF2-40B4-BE49-F238E27FC236}">
-                <a16:creationId xmlns:a16="http://schemas.microsoft.com/office/drawing/2014/main" xmlns="" id="{D78C9AF8-6E97-4A41-9699-F00133FB72EE}"/>
+                <a16:creationId xmlns="" xmlns:a16="http://schemas.microsoft.com/office/drawing/2014/main" id="{D78C9AF8-6E97-4A41-9699-F00133FB72EE}"/>
               </a:ext>
             </a:extLst>
           </p:cNvPr>
@@ -4599,7 +4600,7 @@
           <p:cNvPr id="83" name="TextBox 82">
             <a:extLst>
               <a:ext uri="{FF2B5EF4-FFF2-40B4-BE49-F238E27FC236}">
-                <a16:creationId xmlns:a16="http://schemas.microsoft.com/office/drawing/2014/main" xmlns="" id="{C34CC880-1902-497C-A44A-571D93EAD548}"/>
+                <a16:creationId xmlns="" xmlns:a16="http://schemas.microsoft.com/office/drawing/2014/main" id="{C34CC880-1902-497C-A44A-571D93EAD548}"/>
               </a:ext>
             </a:extLst>
           </p:cNvPr>
@@ -4634,7 +4635,7 @@
           <p:cNvPr id="84" name="TextBox 83">
             <a:extLst>
               <a:ext uri="{FF2B5EF4-FFF2-40B4-BE49-F238E27FC236}">
-                <a16:creationId xmlns:a16="http://schemas.microsoft.com/office/drawing/2014/main" xmlns="" id="{582DAA28-77DF-48AB-A0FA-7D0944EEA418}"/>
+                <a16:creationId xmlns="" xmlns:a16="http://schemas.microsoft.com/office/drawing/2014/main" id="{582DAA28-77DF-48AB-A0FA-7D0944EEA418}"/>
               </a:ext>
             </a:extLst>
           </p:cNvPr>
@@ -4669,7 +4670,7 @@
           <p:cNvPr id="85" name="TextBox 84">
             <a:extLst>
               <a:ext uri="{FF2B5EF4-FFF2-40B4-BE49-F238E27FC236}">
-                <a16:creationId xmlns:a16="http://schemas.microsoft.com/office/drawing/2014/main" xmlns="" id="{35632462-2816-4AB9-8863-E2858DF02B69}"/>
+                <a16:creationId xmlns="" xmlns:a16="http://schemas.microsoft.com/office/drawing/2014/main" id="{35632462-2816-4AB9-8863-E2858DF02B69}"/>
               </a:ext>
             </a:extLst>
           </p:cNvPr>
@@ -4704,7 +4705,7 @@
           <p:cNvPr id="98" name="Connector: Elbow 97">
             <a:extLst>
               <a:ext uri="{FF2B5EF4-FFF2-40B4-BE49-F238E27FC236}">
-                <a16:creationId xmlns:a16="http://schemas.microsoft.com/office/drawing/2014/main" xmlns="" id="{A1F2BECA-1D96-4FF9-8754-645C1D7726F8}"/>
+                <a16:creationId xmlns="" xmlns:a16="http://schemas.microsoft.com/office/drawing/2014/main" id="{A1F2BECA-1D96-4FF9-8754-645C1D7726F8}"/>
               </a:ext>
             </a:extLst>
           </p:cNvPr>
@@ -4753,7 +4754,7 @@
           <p:cNvPr id="101" name="Connector: Elbow 100">
             <a:extLst>
               <a:ext uri="{FF2B5EF4-FFF2-40B4-BE49-F238E27FC236}">
-                <a16:creationId xmlns:a16="http://schemas.microsoft.com/office/drawing/2014/main" xmlns="" id="{36519D8D-4EA4-45AD-AD01-BCA533BD100D}"/>
+                <a16:creationId xmlns="" xmlns:a16="http://schemas.microsoft.com/office/drawing/2014/main" id="{36519D8D-4EA4-45AD-AD01-BCA533BD100D}"/>
               </a:ext>
             </a:extLst>
           </p:cNvPr>
@@ -4802,7 +4803,7 @@
           <p:cNvPr id="104" name="TextBox 103">
             <a:extLst>
               <a:ext uri="{FF2B5EF4-FFF2-40B4-BE49-F238E27FC236}">
-                <a16:creationId xmlns:a16="http://schemas.microsoft.com/office/drawing/2014/main" xmlns="" id="{6D855CC4-9F24-4FB0-84C5-F540689823DA}"/>
+                <a16:creationId xmlns="" xmlns:a16="http://schemas.microsoft.com/office/drawing/2014/main" id="{6D855CC4-9F24-4FB0-84C5-F540689823DA}"/>
               </a:ext>
             </a:extLst>
           </p:cNvPr>
@@ -4837,7 +4838,7 @@
           <p:cNvPr id="105" name="TextBox 104">
             <a:extLst>
               <a:ext uri="{FF2B5EF4-FFF2-40B4-BE49-F238E27FC236}">
-                <a16:creationId xmlns:a16="http://schemas.microsoft.com/office/drawing/2014/main" xmlns="" id="{312F8B0D-878E-4CFD-AF2D-6C5C84BC7C3F}"/>
+                <a16:creationId xmlns="" xmlns:a16="http://schemas.microsoft.com/office/drawing/2014/main" id="{312F8B0D-878E-4CFD-AF2D-6C5C84BC7C3F}"/>
               </a:ext>
             </a:extLst>
           </p:cNvPr>
@@ -4872,7 +4873,7 @@
           <p:cNvPr id="106" name="Connector: Elbow 105">
             <a:extLst>
               <a:ext uri="{FF2B5EF4-FFF2-40B4-BE49-F238E27FC236}">
-                <a16:creationId xmlns:a16="http://schemas.microsoft.com/office/drawing/2014/main" xmlns="" id="{AFDAAF80-D279-45C4-BA1C-63276C92DDEA}"/>
+                <a16:creationId xmlns="" xmlns:a16="http://schemas.microsoft.com/office/drawing/2014/main" id="{AFDAAF80-D279-45C4-BA1C-63276C92DDEA}"/>
               </a:ext>
             </a:extLst>
           </p:cNvPr>
@@ -4921,7 +4922,7 @@
           <p:cNvPr id="109" name="TextBox 108">
             <a:extLst>
               <a:ext uri="{FF2B5EF4-FFF2-40B4-BE49-F238E27FC236}">
-                <a16:creationId xmlns:a16="http://schemas.microsoft.com/office/drawing/2014/main" xmlns="" id="{68F80759-A938-4EC4-AB28-CF35C69A0B12}"/>
+                <a16:creationId xmlns="" xmlns:a16="http://schemas.microsoft.com/office/drawing/2014/main" id="{68F80759-A938-4EC4-AB28-CF35C69A0B12}"/>
               </a:ext>
             </a:extLst>
           </p:cNvPr>
@@ -7746,7 +7747,6 @@
               <a:rPr lang="en-AU" sz="1200" dirty="0"/>
               <a:t>1</a:t>
             </a:r>
-            <a:endParaRPr lang="en-AU" sz="1200" dirty="0"/>
           </a:p>
         </p:txBody>
       </p:sp>
@@ -7776,7 +7776,6 @@
               <a:rPr lang="en-AU" sz="1200" dirty="0"/>
               <a:t>N</a:t>
             </a:r>
-            <a:endParaRPr lang="en-AU" sz="1200" dirty="0"/>
           </a:p>
         </p:txBody>
       </p:sp>
@@ -8163,7 +8162,6 @@
               <a:rPr lang="en-AU" sz="1200" dirty="0"/>
               <a:t>1</a:t>
             </a:r>
-            <a:endParaRPr lang="en-AU" sz="1200" dirty="0"/>
           </a:p>
         </p:txBody>
       </p:sp>
@@ -8193,7 +8191,6 @@
               <a:rPr lang="en-AU" sz="1200" dirty="0"/>
               <a:t>N</a:t>
             </a:r>
-            <a:endParaRPr lang="en-AU" sz="1200" dirty="0"/>
           </a:p>
         </p:txBody>
       </p:sp>
@@ -12335,6 +12332,479 @@
   <p:clrMapOvr>
     <a:masterClrMapping/>
   </p:clrMapOvr>
+</p:sld>
+</file>
+
+<file path=ppt/slides/slide7.xml><?xml version="1.0" encoding="utf-8"?>
+<p:sld xmlns:a="http://schemas.openxmlformats.org/drawingml/2006/main" xmlns:r="http://schemas.openxmlformats.org/officeDocument/2006/relationships" xmlns:p="http://schemas.openxmlformats.org/presentationml/2006/main">
+  <p:cSld>
+    <p:spTree>
+      <p:nvGrpSpPr>
+        <p:cNvPr id="1" name=""/>
+        <p:cNvGrpSpPr/>
+        <p:nvPr/>
+      </p:nvGrpSpPr>
+      <p:grpSpPr>
+        <a:xfrm>
+          <a:off x="0" y="0"/>
+          <a:ext cx="0" cy="0"/>
+          <a:chOff x="0" y="0"/>
+          <a:chExt cx="0" cy="0"/>
+        </a:xfrm>
+      </p:grpSpPr>
+      <p:sp>
+        <p:nvSpPr>
+          <p:cNvPr id="9" name="Rectangle 8"/>
+          <p:cNvSpPr/>
+          <p:nvPr/>
+        </p:nvSpPr>
+        <p:spPr>
+          <a:xfrm>
+            <a:off x="2569776" y="1213945"/>
+            <a:ext cx="1655383" cy="804042"/>
+          </a:xfrm>
+          <a:prstGeom prst="rect">
+            <a:avLst/>
+          </a:prstGeom>
+        </p:spPr>
+        <p:style>
+          <a:lnRef idx="2">
+            <a:schemeClr val="dk1"/>
+          </a:lnRef>
+          <a:fillRef idx="1">
+            <a:schemeClr val="lt1"/>
+          </a:fillRef>
+          <a:effectRef idx="0">
+            <a:schemeClr val="dk1"/>
+          </a:effectRef>
+          <a:fontRef idx="minor">
+            <a:schemeClr val="dk1"/>
+          </a:fontRef>
+        </p:style>
+        <p:txBody>
+          <a:bodyPr rtlCol="0" anchor="ctr"/>
+          <a:lstStyle/>
+          <a:p>
+            <a:pPr algn="ctr"/>
+            <a:r>
+              <a:rPr lang="en-AU" dirty="0" smtClean="0"/>
+              <a:t>Select Rules (or create own)</a:t>
+            </a:r>
+            <a:endParaRPr lang="en-AU" dirty="0"/>
+          </a:p>
+        </p:txBody>
+      </p:sp>
+      <p:cxnSp>
+        <p:nvCxnSpPr>
+          <p:cNvPr id="11" name="Straight Arrow Connector 10"/>
+          <p:cNvCxnSpPr/>
+          <p:nvPr/>
+        </p:nvCxnSpPr>
+        <p:spPr>
+          <a:xfrm>
+            <a:off x="1954924" y="1602829"/>
+            <a:ext cx="614852" cy="0"/>
+          </a:xfrm>
+          <a:prstGeom prst="straightConnector1">
+            <a:avLst/>
+          </a:prstGeom>
+          <a:ln>
+            <a:tailEnd type="triangle"/>
+          </a:ln>
+        </p:spPr>
+        <p:style>
+          <a:lnRef idx="3">
+            <a:schemeClr val="dk1"/>
+          </a:lnRef>
+          <a:fillRef idx="0">
+            <a:schemeClr val="dk1"/>
+          </a:fillRef>
+          <a:effectRef idx="2">
+            <a:schemeClr val="dk1"/>
+          </a:effectRef>
+          <a:fontRef idx="minor">
+            <a:schemeClr val="tx1"/>
+          </a:fontRef>
+        </p:style>
+      </p:cxnSp>
+      <p:sp>
+        <p:nvSpPr>
+          <p:cNvPr id="12" name="Rectangle 11"/>
+          <p:cNvSpPr/>
+          <p:nvPr/>
+        </p:nvSpPr>
+        <p:spPr>
+          <a:xfrm>
+            <a:off x="4840011" y="1213945"/>
+            <a:ext cx="1592320" cy="804042"/>
+          </a:xfrm>
+          <a:prstGeom prst="rect">
+            <a:avLst/>
+          </a:prstGeom>
+        </p:spPr>
+        <p:style>
+          <a:lnRef idx="2">
+            <a:schemeClr val="dk1"/>
+          </a:lnRef>
+          <a:fillRef idx="1">
+            <a:schemeClr val="lt1"/>
+          </a:fillRef>
+          <a:effectRef idx="0">
+            <a:schemeClr val="dk1"/>
+          </a:effectRef>
+          <a:fontRef idx="minor">
+            <a:schemeClr val="dk1"/>
+          </a:fontRef>
+        </p:style>
+        <p:txBody>
+          <a:bodyPr rtlCol="0" anchor="ctr"/>
+          <a:lstStyle/>
+          <a:p>
+            <a:pPr algn="ctr"/>
+            <a:r>
+              <a:rPr lang="en-AU" dirty="0" smtClean="0"/>
+              <a:t>Check if Licence exists</a:t>
+            </a:r>
+            <a:endParaRPr lang="en-AU" dirty="0"/>
+          </a:p>
+        </p:txBody>
+      </p:sp>
+      <p:cxnSp>
+        <p:nvCxnSpPr>
+          <p:cNvPr id="13" name="Straight Arrow Connector 12"/>
+          <p:cNvCxnSpPr>
+            <a:endCxn id="12" idx="1"/>
+          </p:cNvCxnSpPr>
+          <p:nvPr/>
+        </p:nvCxnSpPr>
+        <p:spPr>
+          <a:xfrm>
+            <a:off x="4225159" y="1615966"/>
+            <a:ext cx="614852" cy="0"/>
+          </a:xfrm>
+          <a:prstGeom prst="straightConnector1">
+            <a:avLst/>
+          </a:prstGeom>
+          <a:ln>
+            <a:tailEnd type="triangle"/>
+          </a:ln>
+        </p:spPr>
+        <p:style>
+          <a:lnRef idx="3">
+            <a:schemeClr val="dk1"/>
+          </a:lnRef>
+          <a:fillRef idx="0">
+            <a:schemeClr val="dk1"/>
+          </a:fillRef>
+          <a:effectRef idx="2">
+            <a:schemeClr val="dk1"/>
+          </a:effectRef>
+          <a:fontRef idx="minor">
+            <a:schemeClr val="tx1"/>
+          </a:fontRef>
+        </p:style>
+      </p:cxnSp>
+      <p:sp>
+        <p:nvSpPr>
+          <p:cNvPr id="24" name="Diamond 23"/>
+          <p:cNvSpPr/>
+          <p:nvPr/>
+        </p:nvSpPr>
+        <p:spPr>
+          <a:xfrm>
+            <a:off x="7047183" y="1213945"/>
+            <a:ext cx="945931" cy="804042"/>
+          </a:xfrm>
+          <a:prstGeom prst="diamond">
+            <a:avLst/>
+          </a:prstGeom>
+        </p:spPr>
+        <p:style>
+          <a:lnRef idx="2">
+            <a:schemeClr val="dk1"/>
+          </a:lnRef>
+          <a:fillRef idx="1">
+            <a:schemeClr val="lt1"/>
+          </a:fillRef>
+          <a:effectRef idx="0">
+            <a:schemeClr val="dk1"/>
+          </a:effectRef>
+          <a:fontRef idx="minor">
+            <a:schemeClr val="dk1"/>
+          </a:fontRef>
+        </p:style>
+        <p:txBody>
+          <a:bodyPr rtlCol="0" anchor="ctr"/>
+          <a:lstStyle/>
+          <a:p>
+            <a:pPr algn="ctr"/>
+            <a:endParaRPr lang="en-AU"/>
+          </a:p>
+        </p:txBody>
+      </p:sp>
+      <p:cxnSp>
+        <p:nvCxnSpPr>
+          <p:cNvPr id="25" name="Straight Arrow Connector 24"/>
+          <p:cNvCxnSpPr/>
+          <p:nvPr/>
+        </p:nvCxnSpPr>
+        <p:spPr>
+          <a:xfrm>
+            <a:off x="6432331" y="1615966"/>
+            <a:ext cx="614852" cy="0"/>
+          </a:xfrm>
+          <a:prstGeom prst="straightConnector1">
+            <a:avLst/>
+          </a:prstGeom>
+          <a:ln>
+            <a:tailEnd type="triangle"/>
+          </a:ln>
+        </p:spPr>
+        <p:style>
+          <a:lnRef idx="3">
+            <a:schemeClr val="dk1"/>
+          </a:lnRef>
+          <a:fillRef idx="0">
+            <a:schemeClr val="dk1"/>
+          </a:fillRef>
+          <a:effectRef idx="2">
+            <a:schemeClr val="dk1"/>
+          </a:effectRef>
+          <a:fontRef idx="minor">
+            <a:schemeClr val="tx1"/>
+          </a:fontRef>
+        </p:style>
+      </p:cxnSp>
+      <p:sp>
+        <p:nvSpPr>
+          <p:cNvPr id="26" name="Rectangle 25"/>
+          <p:cNvSpPr/>
+          <p:nvPr/>
+        </p:nvSpPr>
+        <p:spPr>
+          <a:xfrm>
+            <a:off x="8600088" y="1213945"/>
+            <a:ext cx="1592320" cy="804042"/>
+          </a:xfrm>
+          <a:prstGeom prst="rect">
+            <a:avLst/>
+          </a:prstGeom>
+        </p:spPr>
+        <p:style>
+          <a:lnRef idx="2">
+            <a:schemeClr val="dk1"/>
+          </a:lnRef>
+          <a:fillRef idx="1">
+            <a:schemeClr val="lt1"/>
+          </a:fillRef>
+          <a:effectRef idx="0">
+            <a:schemeClr val="dk1"/>
+          </a:effectRef>
+          <a:fontRef idx="minor">
+            <a:schemeClr val="dk1"/>
+          </a:fontRef>
+        </p:style>
+        <p:txBody>
+          <a:bodyPr rtlCol="0" anchor="ctr"/>
+          <a:lstStyle/>
+          <a:p>
+            <a:pPr algn="ctr"/>
+            <a:r>
+              <a:rPr lang="en-AU" dirty="0" smtClean="0"/>
+              <a:t>Reuse</a:t>
+            </a:r>
+            <a:endParaRPr lang="en-AU" dirty="0"/>
+          </a:p>
+        </p:txBody>
+      </p:sp>
+      <p:sp>
+        <p:nvSpPr>
+          <p:cNvPr id="27" name="Rectangle 26"/>
+          <p:cNvSpPr/>
+          <p:nvPr/>
+        </p:nvSpPr>
+        <p:spPr>
+          <a:xfrm>
+            <a:off x="6496997" y="2623333"/>
+            <a:ext cx="2046301" cy="1108842"/>
+          </a:xfrm>
+          <a:prstGeom prst="rect">
+            <a:avLst/>
+          </a:prstGeom>
+        </p:spPr>
+        <p:style>
+          <a:lnRef idx="2">
+            <a:schemeClr val="dk1"/>
+          </a:lnRef>
+          <a:fillRef idx="1">
+            <a:schemeClr val="lt1"/>
+          </a:fillRef>
+          <a:effectRef idx="0">
+            <a:schemeClr val="dk1"/>
+          </a:effectRef>
+          <a:fontRef idx="minor">
+            <a:schemeClr val="dk1"/>
+          </a:fontRef>
+        </p:style>
+        <p:txBody>
+          <a:bodyPr rtlCol="0" anchor="ctr"/>
+          <a:lstStyle/>
+          <a:p>
+            <a:pPr algn="ctr"/>
+            <a:r>
+              <a:rPr lang="en-AU" dirty="0" smtClean="0"/>
+              <a:t>Fill out additional information and create licence</a:t>
+            </a:r>
+            <a:endParaRPr lang="en-AU" dirty="0"/>
+          </a:p>
+        </p:txBody>
+      </p:sp>
+      <p:cxnSp>
+        <p:nvCxnSpPr>
+          <p:cNvPr id="28" name="Straight Arrow Connector 27"/>
+          <p:cNvCxnSpPr/>
+          <p:nvPr/>
+        </p:nvCxnSpPr>
+        <p:spPr>
+          <a:xfrm>
+            <a:off x="7985236" y="1602829"/>
+            <a:ext cx="614852" cy="0"/>
+          </a:xfrm>
+          <a:prstGeom prst="straightConnector1">
+            <a:avLst/>
+          </a:prstGeom>
+          <a:ln>
+            <a:tailEnd type="triangle"/>
+          </a:ln>
+        </p:spPr>
+        <p:style>
+          <a:lnRef idx="3">
+            <a:schemeClr val="dk1"/>
+          </a:lnRef>
+          <a:fillRef idx="0">
+            <a:schemeClr val="dk1"/>
+          </a:fillRef>
+          <a:effectRef idx="2">
+            <a:schemeClr val="dk1"/>
+          </a:effectRef>
+          <a:fontRef idx="minor">
+            <a:schemeClr val="tx1"/>
+          </a:fontRef>
+        </p:style>
+      </p:cxnSp>
+      <p:cxnSp>
+        <p:nvCxnSpPr>
+          <p:cNvPr id="30" name="Straight Arrow Connector 29"/>
+          <p:cNvCxnSpPr>
+            <a:stCxn id="24" idx="2"/>
+            <a:endCxn id="27" idx="0"/>
+          </p:cNvCxnSpPr>
+          <p:nvPr/>
+        </p:nvCxnSpPr>
+        <p:spPr>
+          <a:xfrm flipH="1">
+            <a:off x="7520148" y="2017987"/>
+            <a:ext cx="1" cy="605346"/>
+          </a:xfrm>
+          <a:prstGeom prst="straightConnector1">
+            <a:avLst/>
+          </a:prstGeom>
+          <a:ln>
+            <a:tailEnd type="triangle"/>
+          </a:ln>
+        </p:spPr>
+        <p:style>
+          <a:lnRef idx="3">
+            <a:schemeClr val="dk1"/>
+          </a:lnRef>
+          <a:fillRef idx="0">
+            <a:schemeClr val="dk1"/>
+          </a:fillRef>
+          <a:effectRef idx="2">
+            <a:schemeClr val="dk1"/>
+          </a:effectRef>
+          <a:fontRef idx="minor">
+            <a:schemeClr val="tx1"/>
+          </a:fontRef>
+        </p:style>
+      </p:cxnSp>
+      <p:sp>
+        <p:nvSpPr>
+          <p:cNvPr id="32" name="TextBox 31"/>
+          <p:cNvSpPr txBox="1"/>
+          <p:nvPr/>
+        </p:nvSpPr>
+        <p:spPr>
+          <a:xfrm>
+            <a:off x="7993114" y="1246634"/>
+            <a:ext cx="485518" cy="369332"/>
+          </a:xfrm>
+          <a:prstGeom prst="rect">
+            <a:avLst/>
+          </a:prstGeom>
+          <a:noFill/>
+        </p:spPr>
+        <p:txBody>
+          <a:bodyPr wrap="none" rtlCol="0">
+            <a:spAutoFit/>
+          </a:bodyPr>
+          <a:lstStyle/>
+          <a:p>
+            <a:r>
+              <a:rPr lang="en-AU" dirty="0" smtClean="0"/>
+              <a:t>Yes</a:t>
+            </a:r>
+            <a:endParaRPr lang="en-AU" dirty="0"/>
+          </a:p>
+        </p:txBody>
+      </p:sp>
+      <p:sp>
+        <p:nvSpPr>
+          <p:cNvPr id="33" name="TextBox 32"/>
+          <p:cNvSpPr txBox="1"/>
+          <p:nvPr/>
+        </p:nvSpPr>
+        <p:spPr>
+          <a:xfrm>
+            <a:off x="7604544" y="2146582"/>
+            <a:ext cx="455574" cy="369332"/>
+          </a:xfrm>
+          <a:prstGeom prst="rect">
+            <a:avLst/>
+          </a:prstGeom>
+          <a:noFill/>
+        </p:spPr>
+        <p:txBody>
+          <a:bodyPr wrap="none" rtlCol="0">
+            <a:spAutoFit/>
+          </a:bodyPr>
+          <a:lstStyle/>
+          <a:p>
+            <a:r>
+              <a:rPr lang="en-AU" dirty="0" smtClean="0"/>
+              <a:t>No</a:t>
+            </a:r>
+            <a:endParaRPr lang="en-AU" dirty="0"/>
+          </a:p>
+        </p:txBody>
+      </p:sp>
+    </p:spTree>
+    <p:extLst>
+      <p:ext uri="{BB962C8B-B14F-4D97-AF65-F5344CB8AC3E}">
+        <p14:creationId xmlns:p14="http://schemas.microsoft.com/office/powerpoint/2010/main" val="1764938760"/>
+      </p:ext>
+    </p:extLst>
+  </p:cSld>
+  <p:clrMapOvr>
+    <a:masterClrMapping/>
+  </p:clrMapOvr>
+  <p:timing>
+    <p:tnLst>
+      <p:par>
+        <p:cTn id="1" dur="indefinite" restart="never" nodeType="tmRoot"/>
+      </p:par>
+    </p:tnLst>
+  </p:timing>
 </p:sld>
 </file>
 

</xml_diff>